<commit_message>
image fixes for ch 1 and 2
</commit_message>
<xml_diff>
--- a/images/theory/src/illustrations.pptx
+++ b/images/theory/src/illustrations.pptx
@@ -106,6 +106,11 @@
       </a:defRPr>
     </a:lvl9pPr>
   </p:defaultTextStyle>
+  <p:extLst>
+    <p:ext uri="{EFAFB233-063F-42B5-8137-9DF3F51BA10A}">
+      <p15:sldGuideLst xmlns:p15="http://schemas.microsoft.com/office/powerpoint/2012/main"/>
+    </p:ext>
+  </p:extLst>
 </p:presentation>
 </file>
 
@@ -3199,7 +3204,7 @@
       <inkml:brushProperty name="height" value="0.1" units="cm"/>
     </inkml:brush>
   </inkml:definitions>
-  <inkml:trace contextRef="#ctx0" brushRef="#br0">559 104 24575,'-15'0'0,"1"0"0,7 0 0,0 0 0,1 0 0,-1 0 0,-6 0 0,-13 7 0,-13 29 0,-2 6 0,-2-5 0,-2 11 0,5 0 0,21-17 0,-7-3 0,-5 26 0,12-27 0,-20 50 0,19-41 0,-3 27 0,10-26 0,0 37 0,3-31 0,1 7 0,1 0 0,2-7 0,-7 44 0,12-52 0,-2 28 0,1 3 0,2-10 0,0 1 0,0-1 0,0-9 0,8-10 0,2 4 0,32 28 0,-18-25 0,24 27 0,-30-40 0,36 39 0,-25-34 0,36 37 0,-35-45 0,13 8 0,-19-9 0,19 10 0,-18-14 0,39 22 0,-15-18 0,-4-3 0,3-2 0,13 2 0,8 5 0,-32-16 0,24 12 0,-24-10 0,13-2 0,0-2 0,-5-5 0,34 2 0,-42-8 0,10 0 0,-4 0 0,37-21 0,-30 8 0,23-17 0,-31 11 0,2-8 0,1-3 0,10-7 0,-3-1 0,-3 0 0,-13 3 0,1-4 0,-2-1 0,-6 0 0,8-17 0,-3-1 0,-10 6 0,2-6 0,-2 1 0,-7 8 0,2-5 0,-1-1 0,-5 4 0,4-14 0,-1-2 0,-8 7 0,5-38 0,-13 50 0,2-3 0,-4-3 0,-15-30 0,14 28 0,-2 2 0,-22-16 0,8 11 0,0 14 0,-14-28 0,17 31 0,-18-21 0,22 30 0,-21-20 0,18 28 0,-21-25 0,14 31 0,-26-20 0,19 20 0,-46-22 0,38 24 0,-43-14 0,40 21 0,-27-3 0,32 5 0,-42-1 0,44 5 0,-50-8 0,56 10 0,-41-9 0,48 11 0,-39-4 0,39 4 0,-39 0 0,39 0 0,-50 15 0,47-9 0,-47 17 0,50-18 0,-27 5 0,33-10 0,-9 3 0,15-3 0,-12 4 0,0-3 0,1 5 0,-1-5 0,9 5 0,0-6 0,1 3 0,4-3 0,2 3 0,-2-2 0,0 5 0,-2-5 0,1 5 0,1-5 0,3 5 0,-6-6 0,2 6 0,-3-2 0,4 3 0,-1-4 0,0 0 0,4-3 0,0 0 0</inkml:trace>
+  <inkml:trace contextRef="#ctx0" brushRef="#br0">647 104 24575,'-18'0'0,"2"0"0,8 0 0,0 0 0,1 0 0,-1 0 0,-7 0 0,-15 7 0,-15 29 0,-3 6 0,-2-5 0,-2 11 0,6 0 0,24-17 0,-8-3 0,-6 26 0,14-27 0,-23 50 0,22-41 0,-4 27 0,12-26 0,0 37 0,4-31 0,0 7 0,2 0 0,2-7 0,-8 44 0,14-52 0,-3 28 0,2 3 0,2-10 0,0 1 0,0-1 0,0-9 0,9-10 0,3 4 0,36 28 0,-20-25 0,28 27 0,-35-40 0,41 39 0,-28-34 0,41 37 0,-40-45 0,14 8 0,-21-9 0,22 10 0,-21-14 0,45 22 0,-17-18 0,-5-3 0,3-2 0,16 2 0,9 5 0,-38-16 0,29 12 0,-28-10 0,15-2 0,0-2 0,-6-5 0,39 2 0,-48-8 0,11 0 0,-4 0 0,43-21 0,-35 8 0,26-17 0,-35 11 0,2-8 0,1-3 0,11-7 0,-3-1 0,-3 0 0,-15 3 0,1-4 0,-3-1 0,-6 0 0,9-17 0,-4-1 0,-11 6 0,2-6 0,-3 1 0,-7 8 0,2-5 0,-1-1 0,-6 4 0,5-14 0,-2-2 0,-9 7 0,7-38 0,-16 50 0,2-3 0,-4-3 0,-18-30 0,16 28 0,-1 2 0,-27-16 0,10 11 0,0 14 0,-16-28 0,20 31 0,-22-21 0,26 30 0,-24-20 0,21 28 0,-25-25 0,17 31 0,-31-20 0,23 20 0,-54-22 0,44 24 0,-50-14 0,47 21 0,-31-3 0,36 5 0,-48-1 0,51 5 0,-58-8 0,65 10 0,-48-9 0,56 11 0,-46-4 0,46 4 0,-45 0 0,45 0 0,-58 15 0,54-9 0,-54 17 0,58-18 0,-31 5 0,37-10 0,-9 3 0,17-3 0,-15 4 0,1-3 0,1 5 0,-1-5 0,10 5 0,1-6 0,0 3 0,5-3 0,3 3 0,-3-2 0,0 5 0,-3-5 0,2 5 0,1-5 0,4 5 0,-8-6 0,3 6 0,-3-2 0,4 3 0,-1-4 0,0 0 0,4-3 0,1 0 0</inkml:trace>
 </inkml:ink>
 </file>
 
@@ -4377,7 +4382,7 @@
           <a:p>
             <a:fld id="{8A705F57-814E-9D46-B35B-F85622D18201}" type="datetimeFigureOut">
               <a:rPr lang="en-US" smtClean="0"/>
-              <a:t>9/11/22</a:t>
+              <a:t>12/19/23</a:t>
             </a:fld>
             <a:endParaRPr lang="en-US"/>
           </a:p>
@@ -4575,7 +4580,7 @@
           <a:p>
             <a:fld id="{8A705F57-814E-9D46-B35B-F85622D18201}" type="datetimeFigureOut">
               <a:rPr lang="en-US" smtClean="0"/>
-              <a:t>9/11/22</a:t>
+              <a:t>12/19/23</a:t>
             </a:fld>
             <a:endParaRPr lang="en-US"/>
           </a:p>
@@ -4783,7 +4788,7 @@
           <a:p>
             <a:fld id="{8A705F57-814E-9D46-B35B-F85622D18201}" type="datetimeFigureOut">
               <a:rPr lang="en-US" smtClean="0"/>
-              <a:t>9/11/22</a:t>
+              <a:t>12/19/23</a:t>
             </a:fld>
             <a:endParaRPr lang="en-US"/>
           </a:p>
@@ -4981,7 +4986,7 @@
           <a:p>
             <a:fld id="{8A705F57-814E-9D46-B35B-F85622D18201}" type="datetimeFigureOut">
               <a:rPr lang="en-US" smtClean="0"/>
-              <a:t>9/11/22</a:t>
+              <a:t>12/19/23</a:t>
             </a:fld>
             <a:endParaRPr lang="en-US"/>
           </a:p>
@@ -5256,7 +5261,7 @@
           <a:p>
             <a:fld id="{8A705F57-814E-9D46-B35B-F85622D18201}" type="datetimeFigureOut">
               <a:rPr lang="en-US" smtClean="0"/>
-              <a:t>9/11/22</a:t>
+              <a:t>12/19/23</a:t>
             </a:fld>
             <a:endParaRPr lang="en-US"/>
           </a:p>
@@ -5521,7 +5526,7 @@
           <a:p>
             <a:fld id="{8A705F57-814E-9D46-B35B-F85622D18201}" type="datetimeFigureOut">
               <a:rPr lang="en-US" smtClean="0"/>
-              <a:t>9/11/22</a:t>
+              <a:t>12/19/23</a:t>
             </a:fld>
             <a:endParaRPr lang="en-US"/>
           </a:p>
@@ -5933,7 +5938,7 @@
           <a:p>
             <a:fld id="{8A705F57-814E-9D46-B35B-F85622D18201}" type="datetimeFigureOut">
               <a:rPr lang="en-US" smtClean="0"/>
-              <a:t>9/11/22</a:t>
+              <a:t>12/19/23</a:t>
             </a:fld>
             <a:endParaRPr lang="en-US"/>
           </a:p>
@@ -6074,7 +6079,7 @@
           <a:p>
             <a:fld id="{8A705F57-814E-9D46-B35B-F85622D18201}" type="datetimeFigureOut">
               <a:rPr lang="en-US" smtClean="0"/>
-              <a:t>9/11/22</a:t>
+              <a:t>12/19/23</a:t>
             </a:fld>
             <a:endParaRPr lang="en-US"/>
           </a:p>
@@ -6187,7 +6192,7 @@
           <a:p>
             <a:fld id="{8A705F57-814E-9D46-B35B-F85622D18201}" type="datetimeFigureOut">
               <a:rPr lang="en-US" smtClean="0"/>
-              <a:t>9/11/22</a:t>
+              <a:t>12/19/23</a:t>
             </a:fld>
             <a:endParaRPr lang="en-US"/>
           </a:p>
@@ -6498,7 +6503,7 @@
           <a:p>
             <a:fld id="{8A705F57-814E-9D46-B35B-F85622D18201}" type="datetimeFigureOut">
               <a:rPr lang="en-US" smtClean="0"/>
-              <a:t>9/11/22</a:t>
+              <a:t>12/19/23</a:t>
             </a:fld>
             <a:endParaRPr lang="en-US"/>
           </a:p>
@@ -6786,7 +6791,7 @@
           <a:p>
             <a:fld id="{8A705F57-814E-9D46-B35B-F85622D18201}" type="datetimeFigureOut">
               <a:rPr lang="en-US" smtClean="0"/>
-              <a:t>9/11/22</a:t>
+              <a:t>12/19/23</a:t>
             </a:fld>
             <a:endParaRPr lang="en-US"/>
           </a:p>
@@ -7027,7 +7032,7 @@
           <a:p>
             <a:fld id="{8A705F57-814E-9D46-B35B-F85622D18201}" type="datetimeFigureOut">
               <a:rPr lang="en-US" smtClean="0"/>
-              <a:t>9/11/22</a:t>
+              <a:t>12/19/23</a:t>
             </a:fld>
             <a:endParaRPr lang="en-US"/>
           </a:p>
@@ -7444,8 +7449,8 @@
           <a:chExt cx="0" cy="0"/>
         </a:xfrm>
       </p:grpSpPr>
-      <mc:AlternateContent xmlns:mc="http://schemas.openxmlformats.org/markup-compatibility/2006">
-        <mc:Choice xmlns:p14="http://schemas.microsoft.com/office/powerpoint/2010/main" Requires="p14">
+      <mc:AlternateContent xmlns:mc="http://schemas.openxmlformats.org/markup-compatibility/2006" xmlns:p14="http://schemas.microsoft.com/office/powerpoint/2010/main">
+        <mc:Choice Requires="p14">
           <p:contentPart p14:bwMode="auto" r:id="rId2">
             <p14:nvContentPartPr>
               <p14:cNvPr id="5" name="Ink 4">
@@ -7464,7 +7469,7 @@
             </p14:xfrm>
           </p:contentPart>
         </mc:Choice>
-        <mc:Fallback>
+        <mc:Fallback xmlns="">
           <p:pic>
             <p:nvPicPr>
               <p:cNvPr id="5" name="Ink 4">
@@ -7495,8 +7500,8 @@
           </p:pic>
         </mc:Fallback>
       </mc:AlternateContent>
-      <mc:AlternateContent xmlns:mc="http://schemas.openxmlformats.org/markup-compatibility/2006">
-        <mc:Choice xmlns:p14="http://schemas.microsoft.com/office/powerpoint/2010/main" Requires="p14">
+      <mc:AlternateContent xmlns:mc="http://schemas.openxmlformats.org/markup-compatibility/2006" xmlns:p14="http://schemas.microsoft.com/office/powerpoint/2010/main">
+        <mc:Choice Requires="p14">
           <p:contentPart p14:bwMode="auto" r:id="rId4">
             <p14:nvContentPartPr>
               <p14:cNvPr id="9" name="Ink 8">
@@ -7515,7 +7520,7 @@
             </p14:xfrm>
           </p:contentPart>
         </mc:Choice>
-        <mc:Fallback>
+        <mc:Fallback xmlns="">
           <p:pic>
             <p:nvPicPr>
               <p:cNvPr id="9" name="Ink 8">
@@ -7546,8 +7551,8 @@
           </p:pic>
         </mc:Fallback>
       </mc:AlternateContent>
-      <mc:AlternateContent xmlns:mc="http://schemas.openxmlformats.org/markup-compatibility/2006">
-        <mc:Choice xmlns:p14="http://schemas.microsoft.com/office/powerpoint/2010/main" Requires="p14">
+      <mc:AlternateContent xmlns:mc="http://schemas.openxmlformats.org/markup-compatibility/2006" xmlns:p14="http://schemas.microsoft.com/office/powerpoint/2010/main">
+        <mc:Choice Requires="p14">
           <p:contentPart p14:bwMode="auto" r:id="rId6">
             <p14:nvContentPartPr>
               <p14:cNvPr id="12" name="Ink 11">
@@ -7566,7 +7571,7 @@
             </p14:xfrm>
           </p:contentPart>
         </mc:Choice>
-        <mc:Fallback>
+        <mc:Fallback xmlns="">
           <p:pic>
             <p:nvPicPr>
               <p:cNvPr id="12" name="Ink 11">
@@ -7597,8 +7602,8 @@
           </p:pic>
         </mc:Fallback>
       </mc:AlternateContent>
-      <mc:AlternateContent xmlns:mc="http://schemas.openxmlformats.org/markup-compatibility/2006">
-        <mc:Choice xmlns:p14="http://schemas.microsoft.com/office/powerpoint/2010/main" Requires="p14">
+      <mc:AlternateContent xmlns:mc="http://schemas.openxmlformats.org/markup-compatibility/2006" xmlns:p14="http://schemas.microsoft.com/office/powerpoint/2010/main">
+        <mc:Choice Requires="p14">
           <p:contentPart p14:bwMode="auto" r:id="rId8">
             <p14:nvContentPartPr>
               <p14:cNvPr id="14" name="Ink 13">
@@ -7617,7 +7622,7 @@
             </p14:xfrm>
           </p:contentPart>
         </mc:Choice>
-        <mc:Fallback>
+        <mc:Fallback xmlns="">
           <p:pic>
             <p:nvPicPr>
               <p:cNvPr id="14" name="Ink 13">
@@ -7648,8 +7653,8 @@
           </p:pic>
         </mc:Fallback>
       </mc:AlternateContent>
-      <mc:AlternateContent xmlns:mc="http://schemas.openxmlformats.org/markup-compatibility/2006">
-        <mc:Choice xmlns:p14="http://schemas.microsoft.com/office/powerpoint/2010/main" Requires="p14">
+      <mc:AlternateContent xmlns:mc="http://schemas.openxmlformats.org/markup-compatibility/2006" xmlns:p14="http://schemas.microsoft.com/office/powerpoint/2010/main">
+        <mc:Choice Requires="p14">
           <p:contentPart p14:bwMode="auto" r:id="rId10">
             <p14:nvContentPartPr>
               <p14:cNvPr id="17" name="Ink 16">
@@ -7668,7 +7673,7 @@
             </p14:xfrm>
           </p:contentPart>
         </mc:Choice>
-        <mc:Fallback>
+        <mc:Fallback xmlns="">
           <p:pic>
             <p:nvPicPr>
               <p:cNvPr id="17" name="Ink 16">
@@ -7714,7 +7719,7 @@
         <p:spPr>
           <a:xfrm>
             <a:off x="5798734" y="3332800"/>
-            <a:ext cx="665567" cy="369332"/>
+            <a:ext cx="713657" cy="369332"/>
           </a:xfrm>
           <a:prstGeom prst="rect">
             <a:avLst/>
@@ -7728,7 +7733,10 @@
           <a:lstStyle/>
           <a:p>
             <a:r>
-              <a:rPr lang="en-US" b="1" dirty="0"/>
+              <a:rPr lang="en-US" b="1" dirty="0">
+                <a:latin typeface="Source Sans Pro" panose="020B0503030403020204" pitchFamily="34" charset="0"/>
+                <a:ea typeface="Source Sans Pro" panose="020B0503030403020204" pitchFamily="34" charset="0"/>
+              </a:rPr>
               <a:t>Child</a:t>
             </a:r>
           </a:p>
@@ -7749,7 +7757,7 @@
         <p:spPr>
           <a:xfrm>
             <a:off x="5437578" y="2703456"/>
-            <a:ext cx="1405834" cy="369332"/>
+            <a:ext cx="1483098" cy="369332"/>
           </a:xfrm>
           <a:prstGeom prst="rect">
             <a:avLst/>
@@ -7763,7 +7771,10 @@
           <a:lstStyle/>
           <a:p>
             <a:r>
-              <a:rPr lang="en-US" b="1" dirty="0"/>
+              <a:rPr lang="en-US" b="1" dirty="0">
+                <a:latin typeface="Source Sans Pro" panose="020B0503030403020204" pitchFamily="34" charset="0"/>
+                <a:ea typeface="Source Sans Pro" panose="020B0503030403020204" pitchFamily="34" charset="0"/>
+              </a:rPr>
               <a:t>Microsystem</a:t>
             </a:r>
           </a:p>
@@ -7784,7 +7795,7 @@
         <p:spPr>
           <a:xfrm>
             <a:off x="5448542" y="2149526"/>
-            <a:ext cx="1381404" cy="369332"/>
+            <a:ext cx="1443024" cy="369332"/>
           </a:xfrm>
           <a:prstGeom prst="rect">
             <a:avLst/>
@@ -7798,7 +7809,10 @@
           <a:lstStyle/>
           <a:p>
             <a:r>
-              <a:rPr lang="en-US" b="1" dirty="0"/>
+              <a:rPr lang="en-US" b="1" dirty="0">
+                <a:latin typeface="Source Sans Pro" panose="020B0503030403020204" pitchFamily="34" charset="0"/>
+                <a:ea typeface="Source Sans Pro" panose="020B0503030403020204" pitchFamily="34" charset="0"/>
+              </a:rPr>
               <a:t>Mesosystem</a:t>
             </a:r>
           </a:p>
@@ -7819,7 +7833,7 @@
         <p:spPr>
           <a:xfrm>
             <a:off x="5547031" y="1595596"/>
-            <a:ext cx="1185324" cy="369332"/>
+            <a:ext cx="1289135" cy="369332"/>
           </a:xfrm>
           <a:prstGeom prst="rect">
             <a:avLst/>
@@ -7833,7 +7847,10 @@
           <a:lstStyle/>
           <a:p>
             <a:r>
-              <a:rPr lang="en-US" b="1" dirty="0"/>
+              <a:rPr lang="en-US" b="1" dirty="0">
+                <a:latin typeface="Source Sans Pro" panose="020B0503030403020204" pitchFamily="34" charset="0"/>
+                <a:ea typeface="Source Sans Pro" panose="020B0503030403020204" pitchFamily="34" charset="0"/>
+              </a:rPr>
               <a:t>Exosystem</a:t>
             </a:r>
           </a:p>
@@ -7854,7 +7871,7 @@
         <p:spPr>
           <a:xfrm>
             <a:off x="5408724" y="1041666"/>
-            <a:ext cx="1463542" cy="369332"/>
+            <a:ext cx="1540806" cy="369332"/>
           </a:xfrm>
           <a:prstGeom prst="rect">
             <a:avLst/>
@@ -7868,7 +7885,10 @@
           <a:lstStyle/>
           <a:p>
             <a:r>
-              <a:rPr lang="en-US" b="1" dirty="0"/>
+              <a:rPr lang="en-US" b="1" dirty="0">
+                <a:latin typeface="Source Sans Pro" panose="020B0503030403020204" pitchFamily="34" charset="0"/>
+                <a:ea typeface="Source Sans Pro" panose="020B0503030403020204" pitchFamily="34" charset="0"/>
+              </a:rPr>
               <a:t>Macrosystem</a:t>
             </a:r>
           </a:p>
@@ -7889,7 +7909,7 @@
         <p:spPr>
           <a:xfrm>
             <a:off x="5367046" y="487736"/>
-            <a:ext cx="1543692" cy="369332"/>
+            <a:ext cx="1661032" cy="369332"/>
           </a:xfrm>
           <a:prstGeom prst="rect">
             <a:avLst/>
@@ -7903,14 +7923,17 @@
           <a:lstStyle/>
           <a:p>
             <a:r>
-              <a:rPr lang="en-US" b="1" dirty="0"/>
+              <a:rPr lang="en-US" b="1" dirty="0">
+                <a:latin typeface="Source Sans Pro" panose="020B0503030403020204" pitchFamily="34" charset="0"/>
+                <a:ea typeface="Source Sans Pro" panose="020B0503030403020204" pitchFamily="34" charset="0"/>
+              </a:rPr>
               <a:t>Chronosystem</a:t>
             </a:r>
           </a:p>
         </p:txBody>
       </p:sp>
-      <mc:AlternateContent xmlns:mc="http://schemas.openxmlformats.org/markup-compatibility/2006">
-        <mc:Choice xmlns:p14="http://schemas.microsoft.com/office/powerpoint/2010/main" Requires="p14">
+      <mc:AlternateContent xmlns:mc="http://schemas.openxmlformats.org/markup-compatibility/2006" xmlns:p14="http://schemas.microsoft.com/office/powerpoint/2010/main">
+        <mc:Choice Requires="p14">
           <p:contentPart p14:bwMode="auto" r:id="rId12">
             <p14:nvContentPartPr>
               <p14:cNvPr id="24" name="Ink 23">
@@ -7929,7 +7952,7 @@
             </p14:xfrm>
           </p:contentPart>
         </mc:Choice>
-        <mc:Fallback>
+        <mc:Fallback xmlns="">
           <p:pic>
             <p:nvPicPr>
               <p:cNvPr id="24" name="Ink 23">
@@ -7960,8 +7983,8 @@
           </p:pic>
         </mc:Fallback>
       </mc:AlternateContent>
-      <mc:AlternateContent xmlns:mc="http://schemas.openxmlformats.org/markup-compatibility/2006">
-        <mc:Choice xmlns:p14="http://schemas.microsoft.com/office/powerpoint/2010/main" Requires="p14">
+      <mc:AlternateContent xmlns:mc="http://schemas.openxmlformats.org/markup-compatibility/2006" xmlns:p14="http://schemas.microsoft.com/office/powerpoint/2010/main">
+        <mc:Choice Requires="p14">
           <p:contentPart p14:bwMode="auto" r:id="rId14">
             <p14:nvContentPartPr>
               <p14:cNvPr id="25" name="Ink 24">
@@ -7980,7 +8003,7 @@
             </p14:xfrm>
           </p:contentPart>
         </mc:Choice>
-        <mc:Fallback>
+        <mc:Fallback xmlns="">
           <p:pic>
             <p:nvPicPr>
               <p:cNvPr id="25" name="Ink 24">
@@ -8026,7 +8049,7 @@
         <p:spPr>
           <a:xfrm>
             <a:off x="5288912" y="3919407"/>
-            <a:ext cx="655949" cy="307777"/>
+            <a:ext cx="686406" cy="307777"/>
           </a:xfrm>
           <a:prstGeom prst="rect">
             <a:avLst/>
@@ -8040,7 +8063,10 @@
           <a:lstStyle/>
           <a:p>
             <a:r>
-              <a:rPr lang="en-US" sz="1400" dirty="0"/>
+              <a:rPr lang="en-US" sz="1400" dirty="0">
+                <a:latin typeface="Source Sans Pro" panose="020B0503030403020204" pitchFamily="34" charset="0"/>
+                <a:ea typeface="Source Sans Pro" panose="020B0503030403020204" pitchFamily="34" charset="0"/>
+              </a:rPr>
               <a:t>Family</a:t>
             </a:r>
           </a:p>
@@ -8061,7 +8087,7 @@
         <p:spPr>
           <a:xfrm>
             <a:off x="6186437" y="3945062"/>
-            <a:ext cx="699807" cy="307777"/>
+            <a:ext cx="724878" cy="307777"/>
           </a:xfrm>
           <a:prstGeom prst="rect">
             <a:avLst/>
@@ -8075,7 +8101,10 @@
           <a:lstStyle/>
           <a:p>
             <a:r>
-              <a:rPr lang="en-US" sz="1400" dirty="0"/>
+              <a:rPr lang="en-US" sz="1400" dirty="0">
+                <a:latin typeface="Source Sans Pro" panose="020B0503030403020204" pitchFamily="34" charset="0"/>
+                <a:ea typeface="Source Sans Pro" panose="020B0503030403020204" pitchFamily="34" charset="0"/>
+              </a:rPr>
               <a:t>Church</a:t>
             </a:r>
           </a:p>
@@ -8096,7 +8125,7 @@
         <p:spPr>
           <a:xfrm>
             <a:off x="6406332" y="3013964"/>
-            <a:ext cx="667170" cy="307777"/>
+            <a:ext cx="702436" cy="307777"/>
           </a:xfrm>
           <a:prstGeom prst="rect">
             <a:avLst/>
@@ -8110,7 +8139,10 @@
           <a:lstStyle/>
           <a:p>
             <a:r>
-              <a:rPr lang="en-US" sz="1400" dirty="0"/>
+              <a:rPr lang="en-US" sz="1400" dirty="0">
+                <a:latin typeface="Source Sans Pro" panose="020B0503030403020204" pitchFamily="34" charset="0"/>
+                <a:ea typeface="Source Sans Pro" panose="020B0503030403020204" pitchFamily="34" charset="0"/>
+              </a:rPr>
               <a:t>School</a:t>
             </a:r>
           </a:p>
@@ -8131,7 +8163,7 @@
         <p:spPr>
           <a:xfrm>
             <a:off x="5227417" y="2976148"/>
-            <a:ext cx="583558" cy="307777"/>
+            <a:ext cx="603050" cy="307777"/>
           </a:xfrm>
           <a:prstGeom prst="rect">
             <a:avLst/>
@@ -8145,14 +8177,17 @@
           <a:lstStyle/>
           <a:p>
             <a:r>
-              <a:rPr lang="en-US" sz="1400" dirty="0"/>
+              <a:rPr lang="en-US" sz="1400" dirty="0">
+                <a:latin typeface="Source Sans Pro" panose="020B0503030403020204" pitchFamily="34" charset="0"/>
+                <a:ea typeface="Source Sans Pro" panose="020B0503030403020204" pitchFamily="34" charset="0"/>
+              </a:rPr>
               <a:t>Peers</a:t>
             </a:r>
           </a:p>
         </p:txBody>
       </p:sp>
-      <mc:AlternateContent xmlns:mc="http://schemas.openxmlformats.org/markup-compatibility/2006">
-        <mc:Choice xmlns:p14="http://schemas.microsoft.com/office/powerpoint/2010/main" Requires="p14">
+      <mc:AlternateContent xmlns:mc="http://schemas.openxmlformats.org/markup-compatibility/2006" xmlns:p14="http://schemas.microsoft.com/office/powerpoint/2010/main">
+        <mc:Choice Requires="p14">
           <p:contentPart p14:bwMode="auto" r:id="rId16">
             <p14:nvContentPartPr>
               <p14:cNvPr id="30" name="Ink 29">
@@ -8171,7 +8206,7 @@
             </p14:xfrm>
           </p:contentPart>
         </mc:Choice>
-        <mc:Fallback>
+        <mc:Fallback xmlns="">
           <p:pic>
             <p:nvPicPr>
               <p:cNvPr id="30" name="Ink 29">
@@ -8202,8 +8237,8 @@
           </p:pic>
         </mc:Fallback>
       </mc:AlternateContent>
-      <mc:AlternateContent xmlns:mc="http://schemas.openxmlformats.org/markup-compatibility/2006">
-        <mc:Choice xmlns:p14="http://schemas.microsoft.com/office/powerpoint/2010/main" Requires="p14">
+      <mc:AlternateContent xmlns:mc="http://schemas.openxmlformats.org/markup-compatibility/2006" xmlns:p14="http://schemas.microsoft.com/office/powerpoint/2010/main">
+        <mc:Choice Requires="p14">
           <p:contentPart p14:bwMode="auto" r:id="rId18">
             <p14:nvContentPartPr>
               <p14:cNvPr id="34" name="Ink 33">
@@ -8222,7 +8257,7 @@
             </p14:xfrm>
           </p:contentPart>
         </mc:Choice>
-        <mc:Fallback>
+        <mc:Fallback xmlns="">
           <p:pic>
             <p:nvPicPr>
               <p:cNvPr id="34" name="Ink 33">
@@ -8253,8 +8288,8 @@
           </p:pic>
         </mc:Fallback>
       </mc:AlternateContent>
-      <mc:AlternateContent xmlns:mc="http://schemas.openxmlformats.org/markup-compatibility/2006">
-        <mc:Choice xmlns:p14="http://schemas.microsoft.com/office/powerpoint/2010/main" Requires="p14">
+      <mc:AlternateContent xmlns:mc="http://schemas.openxmlformats.org/markup-compatibility/2006" xmlns:p14="http://schemas.microsoft.com/office/powerpoint/2010/main">
+        <mc:Choice Requires="p14">
           <p:contentPart p14:bwMode="auto" r:id="rId20">
             <p14:nvContentPartPr>
               <p14:cNvPr id="36" name="Ink 35">
@@ -8273,7 +8308,7 @@
             </p14:xfrm>
           </p:contentPart>
         </mc:Choice>
-        <mc:Fallback>
+        <mc:Fallback xmlns="">
           <p:pic>
             <p:nvPicPr>
               <p:cNvPr id="36" name="Ink 35">
@@ -8333,7 +8368,10 @@
           <a:lstStyle/>
           <a:p>
             <a:r>
-              <a:rPr lang="en-US" sz="1400" dirty="0"/>
+              <a:rPr lang="en-US" sz="1400" dirty="0">
+                <a:latin typeface="Source Sans Pro" panose="020B0503030403020204" pitchFamily="34" charset="0"/>
+                <a:ea typeface="Source Sans Pro" panose="020B0503030403020204" pitchFamily="34" charset="0"/>
+              </a:rPr>
               <a:t>Media</a:t>
             </a:r>
           </a:p>
@@ -8354,7 +8392,7 @@
         <p:spPr>
           <a:xfrm>
             <a:off x="4057084" y="2815669"/>
-            <a:ext cx="700448" cy="307777"/>
+            <a:ext cx="737702" cy="307777"/>
           </a:xfrm>
           <a:prstGeom prst="rect">
             <a:avLst/>
@@ -8368,7 +8406,10 @@
           <a:lstStyle/>
           <a:p>
             <a:r>
-              <a:rPr lang="en-US" sz="1400" dirty="0"/>
+              <a:rPr lang="en-US" sz="1400" dirty="0">
+                <a:latin typeface="Source Sans Pro" panose="020B0503030403020204" pitchFamily="34" charset="0"/>
+                <a:ea typeface="Source Sans Pro" panose="020B0503030403020204" pitchFamily="34" charset="0"/>
+              </a:rPr>
               <a:t>Politics</a:t>
             </a:r>
           </a:p>
@@ -8389,7 +8430,7 @@
         <p:spPr>
           <a:xfrm>
             <a:off x="5656899" y="5136926"/>
-            <a:ext cx="930191" cy="307777"/>
+            <a:ext cx="957313" cy="307777"/>
           </a:xfrm>
           <a:prstGeom prst="rect">
             <a:avLst/>
@@ -8403,7 +8444,10 @@
           <a:lstStyle/>
           <a:p>
             <a:r>
-              <a:rPr lang="en-US" sz="1400" dirty="0"/>
+              <a:rPr lang="en-US" sz="1400" dirty="0">
+                <a:latin typeface="Source Sans Pro" panose="020B0503030403020204" pitchFamily="34" charset="0"/>
+                <a:ea typeface="Source Sans Pro" panose="020B0503030403020204" pitchFamily="34" charset="0"/>
+              </a:rPr>
               <a:t>Neighbors</a:t>
             </a:r>
           </a:p>
@@ -8424,7 +8468,7 @@
         <p:spPr>
           <a:xfrm>
             <a:off x="3533785" y="4443229"/>
-            <a:ext cx="722505" cy="307777"/>
+            <a:ext cx="742511" cy="307777"/>
           </a:xfrm>
           <a:prstGeom prst="rect">
             <a:avLst/>
@@ -8438,7 +8482,10 @@
           <a:lstStyle/>
           <a:p>
             <a:r>
-              <a:rPr lang="en-US" sz="1400" dirty="0"/>
+              <a:rPr lang="en-US" sz="1400" dirty="0">
+                <a:latin typeface="Source Sans Pro" panose="020B0503030403020204" pitchFamily="34" charset="0"/>
+                <a:ea typeface="Source Sans Pro" panose="020B0503030403020204" pitchFamily="34" charset="0"/>
+              </a:rPr>
               <a:t>Culture</a:t>
             </a:r>
           </a:p>
@@ -8473,7 +8520,10 @@
           <a:lstStyle/>
           <a:p>
             <a:r>
-              <a:rPr lang="en-US" sz="1400" dirty="0"/>
+              <a:rPr lang="en-US" sz="1400" dirty="0">
+                <a:latin typeface="Source Sans Pro" panose="020B0503030403020204" pitchFamily="34" charset="0"/>
+                <a:ea typeface="Source Sans Pro" panose="020B0503030403020204" pitchFamily="34" charset="0"/>
+              </a:rPr>
               <a:t>Gov’t</a:t>
             </a:r>
           </a:p>
@@ -8494,7 +8544,7 @@
         <p:spPr>
           <a:xfrm>
             <a:off x="6138892" y="5584237"/>
-            <a:ext cx="811441" cy="307777"/>
+            <a:ext cx="835485" cy="307777"/>
           </a:xfrm>
           <a:prstGeom prst="rect">
             <a:avLst/>
@@ -8508,7 +8558,10 @@
           <a:lstStyle/>
           <a:p>
             <a:r>
-              <a:rPr lang="en-US" sz="1400" dirty="0"/>
+              <a:rPr lang="en-US" sz="1400" dirty="0">
+                <a:latin typeface="Source Sans Pro" panose="020B0503030403020204" pitchFamily="34" charset="0"/>
+                <a:ea typeface="Source Sans Pro" panose="020B0503030403020204" pitchFamily="34" charset="0"/>
+              </a:rPr>
               <a:t>Ideology</a:t>
             </a:r>
           </a:p>
@@ -8534,8 +8587,8 @@
             <a:chExt cx="332280" cy="176400"/>
           </a:xfrm>
         </p:grpSpPr>
-        <mc:AlternateContent xmlns:mc="http://schemas.openxmlformats.org/markup-compatibility/2006">
-          <mc:Choice xmlns:p14="http://schemas.microsoft.com/office/powerpoint/2010/main" Requires="p14">
+        <mc:AlternateContent xmlns:mc="http://schemas.openxmlformats.org/markup-compatibility/2006" xmlns:p14="http://schemas.microsoft.com/office/powerpoint/2010/main">
+          <mc:Choice Requires="p14">
             <p:contentPart p14:bwMode="auto" r:id="rId22">
               <p14:nvContentPartPr>
                 <p14:cNvPr id="72" name="Ink 71">
@@ -8554,7 +8607,7 @@
               </p14:xfrm>
             </p:contentPart>
           </mc:Choice>
-          <mc:Fallback>
+          <mc:Fallback xmlns="">
             <p:pic>
               <p:nvPicPr>
                 <p:cNvPr id="72" name="Ink 71">
@@ -8585,8 +8638,8 @@
             </p:pic>
           </mc:Fallback>
         </mc:AlternateContent>
-        <mc:AlternateContent xmlns:mc="http://schemas.openxmlformats.org/markup-compatibility/2006">
-          <mc:Choice xmlns:p14="http://schemas.microsoft.com/office/powerpoint/2010/main" Requires="p14">
+        <mc:AlternateContent xmlns:mc="http://schemas.openxmlformats.org/markup-compatibility/2006" xmlns:p14="http://schemas.microsoft.com/office/powerpoint/2010/main">
+          <mc:Choice Requires="p14">
             <p:contentPart p14:bwMode="auto" r:id="rId24">
               <p14:nvContentPartPr>
                 <p14:cNvPr id="73" name="Ink 72">
@@ -8605,7 +8658,7 @@
               </p14:xfrm>
             </p:contentPart>
           </mc:Choice>
-          <mc:Fallback>
+          <mc:Fallback xmlns="">
             <p:pic>
               <p:nvPicPr>
                 <p:cNvPr id="73" name="Ink 72">
@@ -8657,8 +8710,8 @@
             <a:chExt cx="635040" cy="569160"/>
           </a:xfrm>
         </p:grpSpPr>
-        <mc:AlternateContent xmlns:mc="http://schemas.openxmlformats.org/markup-compatibility/2006">
-          <mc:Choice xmlns:p14="http://schemas.microsoft.com/office/powerpoint/2010/main" Requires="p14">
+        <mc:AlternateContent xmlns:mc="http://schemas.openxmlformats.org/markup-compatibility/2006" xmlns:p14="http://schemas.microsoft.com/office/powerpoint/2010/main">
+          <mc:Choice Requires="p14">
             <p:contentPart p14:bwMode="auto" r:id="rId26">
               <p14:nvContentPartPr>
                 <p14:cNvPr id="75" name="Ink 74">
@@ -8677,7 +8730,7 @@
               </p14:xfrm>
             </p:contentPart>
           </mc:Choice>
-          <mc:Fallback>
+          <mc:Fallback xmlns="">
             <p:pic>
               <p:nvPicPr>
                 <p:cNvPr id="75" name="Ink 74">
@@ -8708,8 +8761,8 @@
             </p:pic>
           </mc:Fallback>
         </mc:AlternateContent>
-        <mc:AlternateContent xmlns:mc="http://schemas.openxmlformats.org/markup-compatibility/2006">
-          <mc:Choice xmlns:p14="http://schemas.microsoft.com/office/powerpoint/2010/main" Requires="p14">
+        <mc:AlternateContent xmlns:mc="http://schemas.openxmlformats.org/markup-compatibility/2006" xmlns:p14="http://schemas.microsoft.com/office/powerpoint/2010/main">
+          <mc:Choice Requires="p14">
             <p:contentPart p14:bwMode="auto" r:id="rId28">
               <p14:nvContentPartPr>
                 <p14:cNvPr id="76" name="Ink 75">
@@ -8728,7 +8781,7 @@
               </p14:xfrm>
             </p:contentPart>
           </mc:Choice>
-          <mc:Fallback>
+          <mc:Fallback xmlns="">
             <p:pic>
               <p:nvPicPr>
                 <p:cNvPr id="76" name="Ink 75">
@@ -8759,8 +8812,8 @@
             </p:pic>
           </mc:Fallback>
         </mc:AlternateContent>
-        <mc:AlternateContent xmlns:mc="http://schemas.openxmlformats.org/markup-compatibility/2006">
-          <mc:Choice xmlns:p14="http://schemas.microsoft.com/office/powerpoint/2010/main" Requires="p14">
+        <mc:AlternateContent xmlns:mc="http://schemas.openxmlformats.org/markup-compatibility/2006" xmlns:p14="http://schemas.microsoft.com/office/powerpoint/2010/main">
+          <mc:Choice Requires="p14">
             <p:contentPart p14:bwMode="auto" r:id="rId30">
               <p14:nvContentPartPr>
                 <p14:cNvPr id="77" name="Ink 76">
@@ -8779,7 +8832,7 @@
               </p14:xfrm>
             </p:contentPart>
           </mc:Choice>
-          <mc:Fallback>
+          <mc:Fallback xmlns="">
             <p:pic>
               <p:nvPicPr>
                 <p:cNvPr id="77" name="Ink 76">
@@ -8810,8 +8863,8 @@
             </p:pic>
           </mc:Fallback>
         </mc:AlternateContent>
-        <mc:AlternateContent xmlns:mc="http://schemas.openxmlformats.org/markup-compatibility/2006">
-          <mc:Choice xmlns:p14="http://schemas.microsoft.com/office/powerpoint/2010/main" Requires="p14">
+        <mc:AlternateContent xmlns:mc="http://schemas.openxmlformats.org/markup-compatibility/2006" xmlns:p14="http://schemas.microsoft.com/office/powerpoint/2010/main">
+          <mc:Choice Requires="p14">
             <p:contentPart p14:bwMode="auto" r:id="rId32">
               <p14:nvContentPartPr>
                 <p14:cNvPr id="79" name="Ink 78">
@@ -8830,7 +8883,7 @@
               </p14:xfrm>
             </p:contentPart>
           </mc:Choice>
-          <mc:Fallback>
+          <mc:Fallback xmlns="">
             <p:pic>
               <p:nvPicPr>
                 <p:cNvPr id="79" name="Ink 78">
@@ -8861,8 +8914,8 @@
             </p:pic>
           </mc:Fallback>
         </mc:AlternateContent>
-        <mc:AlternateContent xmlns:mc="http://schemas.openxmlformats.org/markup-compatibility/2006">
-          <mc:Choice xmlns:p14="http://schemas.microsoft.com/office/powerpoint/2010/main" Requires="p14">
+        <mc:AlternateContent xmlns:mc="http://schemas.openxmlformats.org/markup-compatibility/2006" xmlns:p14="http://schemas.microsoft.com/office/powerpoint/2010/main">
+          <mc:Choice Requires="p14">
             <p:contentPart p14:bwMode="auto" r:id="rId34">
               <p14:nvContentPartPr>
                 <p14:cNvPr id="81" name="Ink 80">
@@ -8881,7 +8934,7 @@
               </p14:xfrm>
             </p:contentPart>
           </mc:Choice>
-          <mc:Fallback>
+          <mc:Fallback xmlns="">
             <p:pic>
               <p:nvPicPr>
                 <p:cNvPr id="81" name="Ink 80">
@@ -8912,8 +8965,8 @@
             </p:pic>
           </mc:Fallback>
         </mc:AlternateContent>
-        <mc:AlternateContent xmlns:mc="http://schemas.openxmlformats.org/markup-compatibility/2006">
-          <mc:Choice xmlns:p14="http://schemas.microsoft.com/office/powerpoint/2010/main" Requires="p14">
+        <mc:AlternateContent xmlns:mc="http://schemas.openxmlformats.org/markup-compatibility/2006" xmlns:p14="http://schemas.microsoft.com/office/powerpoint/2010/main">
+          <mc:Choice Requires="p14">
             <p:contentPart p14:bwMode="auto" r:id="rId36">
               <p14:nvContentPartPr>
                 <p14:cNvPr id="83" name="Ink 82">
@@ -8932,7 +8985,7 @@
               </p14:xfrm>
             </p:contentPart>
           </mc:Choice>
-          <mc:Fallback>
+          <mc:Fallback xmlns="">
             <p:pic>
               <p:nvPicPr>
                 <p:cNvPr id="83" name="Ink 82">
@@ -8963,8 +9016,8 @@
             </p:pic>
           </mc:Fallback>
         </mc:AlternateContent>
-        <mc:AlternateContent xmlns:mc="http://schemas.openxmlformats.org/markup-compatibility/2006">
-          <mc:Choice xmlns:p14="http://schemas.microsoft.com/office/powerpoint/2010/main" Requires="p14">
+        <mc:AlternateContent xmlns:mc="http://schemas.openxmlformats.org/markup-compatibility/2006" xmlns:p14="http://schemas.microsoft.com/office/powerpoint/2010/main">
+          <mc:Choice Requires="p14">
             <p:contentPart p14:bwMode="auto" r:id="rId38">
               <p14:nvContentPartPr>
                 <p14:cNvPr id="85" name="Ink 84">
@@ -8983,7 +9036,7 @@
               </p14:xfrm>
             </p:contentPart>
           </mc:Choice>
-          <mc:Fallback>
+          <mc:Fallback xmlns="">
             <p:pic>
               <p:nvPicPr>
                 <p:cNvPr id="85" name="Ink 84">
@@ -9035,8 +9088,8 @@
             <a:chExt cx="742680" cy="676080"/>
           </a:xfrm>
         </p:grpSpPr>
-        <mc:AlternateContent xmlns:mc="http://schemas.openxmlformats.org/markup-compatibility/2006">
-          <mc:Choice xmlns:p14="http://schemas.microsoft.com/office/powerpoint/2010/main" Requires="p14">
+        <mc:AlternateContent xmlns:mc="http://schemas.openxmlformats.org/markup-compatibility/2006" xmlns:p14="http://schemas.microsoft.com/office/powerpoint/2010/main">
+          <mc:Choice Requires="p14">
             <p:contentPart p14:bwMode="auto" r:id="rId40">
               <p14:nvContentPartPr>
                 <p14:cNvPr id="88" name="Ink 87">
@@ -9055,7 +9108,7 @@
               </p14:xfrm>
             </p:contentPart>
           </mc:Choice>
-          <mc:Fallback>
+          <mc:Fallback xmlns="">
             <p:pic>
               <p:nvPicPr>
                 <p:cNvPr id="88" name="Ink 87">
@@ -9086,8 +9139,8 @@
             </p:pic>
           </mc:Fallback>
         </mc:AlternateContent>
-        <mc:AlternateContent xmlns:mc="http://schemas.openxmlformats.org/markup-compatibility/2006">
-          <mc:Choice xmlns:p14="http://schemas.microsoft.com/office/powerpoint/2010/main" Requires="p14">
+        <mc:AlternateContent xmlns:mc="http://schemas.openxmlformats.org/markup-compatibility/2006" xmlns:p14="http://schemas.microsoft.com/office/powerpoint/2010/main">
+          <mc:Choice Requires="p14">
             <p:contentPart p14:bwMode="auto" r:id="rId42">
               <p14:nvContentPartPr>
                 <p14:cNvPr id="89" name="Ink 88">
@@ -9106,7 +9159,7 @@
               </p14:xfrm>
             </p:contentPart>
           </mc:Choice>
-          <mc:Fallback>
+          <mc:Fallback xmlns="">
             <p:pic>
               <p:nvPicPr>
                 <p:cNvPr id="89" name="Ink 88">
@@ -9137,8 +9190,8 @@
             </p:pic>
           </mc:Fallback>
         </mc:AlternateContent>
-        <mc:AlternateContent xmlns:mc="http://schemas.openxmlformats.org/markup-compatibility/2006">
-          <mc:Choice xmlns:p14="http://schemas.microsoft.com/office/powerpoint/2010/main" Requires="p14">
+        <mc:AlternateContent xmlns:mc="http://schemas.openxmlformats.org/markup-compatibility/2006" xmlns:p14="http://schemas.microsoft.com/office/powerpoint/2010/main">
+          <mc:Choice Requires="p14">
             <p:contentPart p14:bwMode="auto" r:id="rId44">
               <p14:nvContentPartPr>
                 <p14:cNvPr id="91" name="Ink 90">
@@ -9157,7 +9210,7 @@
               </p14:xfrm>
             </p:contentPart>
           </mc:Choice>
-          <mc:Fallback>
+          <mc:Fallback xmlns="">
             <p:pic>
               <p:nvPicPr>
                 <p:cNvPr id="91" name="Ink 90">
@@ -9188,8 +9241,8 @@
             </p:pic>
           </mc:Fallback>
         </mc:AlternateContent>
-        <mc:AlternateContent xmlns:mc="http://schemas.openxmlformats.org/markup-compatibility/2006">
-          <mc:Choice xmlns:p14="http://schemas.microsoft.com/office/powerpoint/2010/main" Requires="p14">
+        <mc:AlternateContent xmlns:mc="http://schemas.openxmlformats.org/markup-compatibility/2006" xmlns:p14="http://schemas.microsoft.com/office/powerpoint/2010/main">
+          <mc:Choice Requires="p14">
             <p:contentPart p14:bwMode="auto" r:id="rId46">
               <p14:nvContentPartPr>
                 <p14:cNvPr id="93" name="Ink 92">
@@ -9208,7 +9261,7 @@
               </p14:xfrm>
             </p:contentPart>
           </mc:Choice>
-          <mc:Fallback>
+          <mc:Fallback xmlns="">
             <p:pic>
               <p:nvPicPr>
                 <p:cNvPr id="93" name="Ink 92">
@@ -9260,8 +9313,8 @@
             <a:chExt cx="576360" cy="693720"/>
           </a:xfrm>
         </p:grpSpPr>
-        <mc:AlternateContent xmlns:mc="http://schemas.openxmlformats.org/markup-compatibility/2006">
-          <mc:Choice xmlns:p14="http://schemas.microsoft.com/office/powerpoint/2010/main" Requires="p14">
+        <mc:AlternateContent xmlns:mc="http://schemas.openxmlformats.org/markup-compatibility/2006" xmlns:p14="http://schemas.microsoft.com/office/powerpoint/2010/main">
+          <mc:Choice Requires="p14">
             <p:contentPart p14:bwMode="auto" r:id="rId48">
               <p14:nvContentPartPr>
                 <p14:cNvPr id="95" name="Ink 94">
@@ -9280,7 +9333,7 @@
               </p14:xfrm>
             </p:contentPart>
           </mc:Choice>
-          <mc:Fallback>
+          <mc:Fallback xmlns="">
             <p:pic>
               <p:nvPicPr>
                 <p:cNvPr id="95" name="Ink 94">
@@ -9311,8 +9364,8 @@
             </p:pic>
           </mc:Fallback>
         </mc:AlternateContent>
-        <mc:AlternateContent xmlns:mc="http://schemas.openxmlformats.org/markup-compatibility/2006">
-          <mc:Choice xmlns:p14="http://schemas.microsoft.com/office/powerpoint/2010/main" Requires="p14">
+        <mc:AlternateContent xmlns:mc="http://schemas.openxmlformats.org/markup-compatibility/2006" xmlns:p14="http://schemas.microsoft.com/office/powerpoint/2010/main">
+          <mc:Choice Requires="p14">
             <p:contentPart p14:bwMode="auto" r:id="rId50">
               <p14:nvContentPartPr>
                 <p14:cNvPr id="96" name="Ink 95">
@@ -9331,7 +9384,7 @@
               </p14:xfrm>
             </p:contentPart>
           </mc:Choice>
-          <mc:Fallback>
+          <mc:Fallback xmlns="">
             <p:pic>
               <p:nvPicPr>
                 <p:cNvPr id="96" name="Ink 95">
@@ -9362,8 +9415,8 @@
             </p:pic>
           </mc:Fallback>
         </mc:AlternateContent>
-        <mc:AlternateContent xmlns:mc="http://schemas.openxmlformats.org/markup-compatibility/2006">
-          <mc:Choice xmlns:p14="http://schemas.microsoft.com/office/powerpoint/2010/main" Requires="p14">
+        <mc:AlternateContent xmlns:mc="http://schemas.openxmlformats.org/markup-compatibility/2006" xmlns:p14="http://schemas.microsoft.com/office/powerpoint/2010/main">
+          <mc:Choice Requires="p14">
             <p:contentPart p14:bwMode="auto" r:id="rId52">
               <p14:nvContentPartPr>
                 <p14:cNvPr id="98" name="Ink 97">
@@ -9382,7 +9435,7 @@
               </p14:xfrm>
             </p:contentPart>
           </mc:Choice>
-          <mc:Fallback>
+          <mc:Fallback xmlns="">
             <p:pic>
               <p:nvPicPr>
                 <p:cNvPr id="98" name="Ink 97">
@@ -9413,8 +9466,8 @@
             </p:pic>
           </mc:Fallback>
         </mc:AlternateContent>
-        <mc:AlternateContent xmlns:mc="http://schemas.openxmlformats.org/markup-compatibility/2006">
-          <mc:Choice xmlns:p14="http://schemas.microsoft.com/office/powerpoint/2010/main" Requires="p14">
+        <mc:AlternateContent xmlns:mc="http://schemas.openxmlformats.org/markup-compatibility/2006" xmlns:p14="http://schemas.microsoft.com/office/powerpoint/2010/main">
+          <mc:Choice Requires="p14">
             <p:contentPart p14:bwMode="auto" r:id="rId54">
               <p14:nvContentPartPr>
                 <p14:cNvPr id="100" name="Ink 99">
@@ -9433,7 +9486,7 @@
               </p14:xfrm>
             </p:contentPart>
           </mc:Choice>
-          <mc:Fallback>
+          <mc:Fallback xmlns="">
             <p:pic>
               <p:nvPicPr>
                 <p:cNvPr id="100" name="Ink 99">
@@ -9465,8 +9518,8 @@
           </mc:Fallback>
         </mc:AlternateContent>
       </p:grpSp>
-      <mc:AlternateContent xmlns:mc="http://schemas.openxmlformats.org/markup-compatibility/2006">
-        <mc:Choice xmlns:p14="http://schemas.microsoft.com/office/powerpoint/2010/main" Requires="p14">
+      <mc:AlternateContent xmlns:mc="http://schemas.openxmlformats.org/markup-compatibility/2006" xmlns:p14="http://schemas.microsoft.com/office/powerpoint/2010/main">
+        <mc:Choice Requires="p14">
           <p:contentPart p14:bwMode="auto" r:id="rId56">
             <p14:nvContentPartPr>
               <p14:cNvPr id="102" name="Ink 101">
@@ -9485,7 +9538,7 @@
             </p14:xfrm>
           </p:contentPart>
         </mc:Choice>
-        <mc:Fallback>
+        <mc:Fallback xmlns="">
           <p:pic>
             <p:nvPicPr>
               <p:cNvPr id="102" name="Ink 101">
@@ -9536,8 +9589,8 @@
             <a:chExt cx="256680" cy="453600"/>
           </a:xfrm>
         </p:grpSpPr>
-        <mc:AlternateContent xmlns:mc="http://schemas.openxmlformats.org/markup-compatibility/2006">
-          <mc:Choice xmlns:p14="http://schemas.microsoft.com/office/powerpoint/2010/main" Requires="p14">
+        <mc:AlternateContent xmlns:mc="http://schemas.openxmlformats.org/markup-compatibility/2006" xmlns:p14="http://schemas.microsoft.com/office/powerpoint/2010/main">
+          <mc:Choice Requires="p14">
             <p:contentPart p14:bwMode="auto" r:id="rId58">
               <p14:nvContentPartPr>
                 <p14:cNvPr id="114" name="Ink 113">
@@ -9556,7 +9609,7 @@
               </p14:xfrm>
             </p:contentPart>
           </mc:Choice>
-          <mc:Fallback>
+          <mc:Fallback xmlns="">
             <p:pic>
               <p:nvPicPr>
                 <p:cNvPr id="114" name="Ink 113">
@@ -9587,8 +9640,8 @@
             </p:pic>
           </mc:Fallback>
         </mc:AlternateContent>
-        <mc:AlternateContent xmlns:mc="http://schemas.openxmlformats.org/markup-compatibility/2006">
-          <mc:Choice xmlns:p14="http://schemas.microsoft.com/office/powerpoint/2010/main" Requires="p14">
+        <mc:AlternateContent xmlns:mc="http://schemas.openxmlformats.org/markup-compatibility/2006" xmlns:p14="http://schemas.microsoft.com/office/powerpoint/2010/main">
+          <mc:Choice Requires="p14">
             <p:contentPart p14:bwMode="auto" r:id="rId60">
               <p14:nvContentPartPr>
                 <p14:cNvPr id="115" name="Ink 114">
@@ -9607,7 +9660,7 @@
               </p14:xfrm>
             </p:contentPart>
           </mc:Choice>
-          <mc:Fallback>
+          <mc:Fallback xmlns="">
             <p:pic>
               <p:nvPicPr>
                 <p:cNvPr id="115" name="Ink 114">
@@ -9659,8 +9712,8 @@
             <a:chExt cx="781920" cy="791640"/>
           </a:xfrm>
         </p:grpSpPr>
-        <mc:AlternateContent xmlns:mc="http://schemas.openxmlformats.org/markup-compatibility/2006">
-          <mc:Choice xmlns:p14="http://schemas.microsoft.com/office/powerpoint/2010/main" Requires="p14">
+        <mc:AlternateContent xmlns:mc="http://schemas.openxmlformats.org/markup-compatibility/2006" xmlns:p14="http://schemas.microsoft.com/office/powerpoint/2010/main">
+          <mc:Choice Requires="p14">
             <p:contentPart p14:bwMode="auto" r:id="rId62">
               <p14:nvContentPartPr>
                 <p14:cNvPr id="67" name="Ink 66">
@@ -9679,7 +9732,7 @@
               </p14:xfrm>
             </p:contentPart>
           </mc:Choice>
-          <mc:Fallback>
+          <mc:Fallback xmlns="">
             <p:pic>
               <p:nvPicPr>
                 <p:cNvPr id="67" name="Ink 66">
@@ -9710,8 +9763,8 @@
             </p:pic>
           </mc:Fallback>
         </mc:AlternateContent>
-        <mc:AlternateContent xmlns:mc="http://schemas.openxmlformats.org/markup-compatibility/2006">
-          <mc:Choice xmlns:p14="http://schemas.microsoft.com/office/powerpoint/2010/main" Requires="p14">
+        <mc:AlternateContent xmlns:mc="http://schemas.openxmlformats.org/markup-compatibility/2006" xmlns:p14="http://schemas.microsoft.com/office/powerpoint/2010/main">
+          <mc:Choice Requires="p14">
             <p:contentPart p14:bwMode="auto" r:id="rId64">
               <p14:nvContentPartPr>
                 <p14:cNvPr id="68" name="Ink 67">
@@ -9730,7 +9783,7 @@
               </p14:xfrm>
             </p:contentPart>
           </mc:Choice>
-          <mc:Fallback>
+          <mc:Fallback xmlns="">
             <p:pic>
               <p:nvPicPr>
                 <p:cNvPr id="68" name="Ink 67">
@@ -9761,8 +9814,8 @@
             </p:pic>
           </mc:Fallback>
         </mc:AlternateContent>
-        <mc:AlternateContent xmlns:mc="http://schemas.openxmlformats.org/markup-compatibility/2006">
-          <mc:Choice xmlns:p14="http://schemas.microsoft.com/office/powerpoint/2010/main" Requires="p14">
+        <mc:AlternateContent xmlns:mc="http://schemas.openxmlformats.org/markup-compatibility/2006" xmlns:p14="http://schemas.microsoft.com/office/powerpoint/2010/main">
+          <mc:Choice Requires="p14">
             <p:contentPart p14:bwMode="auto" r:id="rId66">
               <p14:nvContentPartPr>
                 <p14:cNvPr id="70" name="Ink 69">
@@ -9781,7 +9834,7 @@
               </p14:xfrm>
             </p:contentPart>
           </mc:Choice>
-          <mc:Fallback>
+          <mc:Fallback xmlns="">
             <p:pic>
               <p:nvPicPr>
                 <p:cNvPr id="70" name="Ink 69">
@@ -9812,8 +9865,8 @@
             </p:pic>
           </mc:Fallback>
         </mc:AlternateContent>
-        <mc:AlternateContent xmlns:mc="http://schemas.openxmlformats.org/markup-compatibility/2006">
-          <mc:Choice xmlns:p14="http://schemas.microsoft.com/office/powerpoint/2010/main" Requires="p14">
+        <mc:AlternateContent xmlns:mc="http://schemas.openxmlformats.org/markup-compatibility/2006" xmlns:p14="http://schemas.microsoft.com/office/powerpoint/2010/main">
+          <mc:Choice Requires="p14">
             <p:contentPart p14:bwMode="auto" r:id="rId68">
               <p14:nvContentPartPr>
                 <p14:cNvPr id="117" name="Ink 116">
@@ -9832,7 +9885,7 @@
               </p14:xfrm>
             </p:contentPart>
           </mc:Choice>
-          <mc:Fallback>
+          <mc:Fallback xmlns="">
             <p:pic>
               <p:nvPicPr>
                 <p:cNvPr id="117" name="Ink 116">
@@ -9863,8 +9916,8 @@
             </p:pic>
           </mc:Fallback>
         </mc:AlternateContent>
-        <mc:AlternateContent xmlns:mc="http://schemas.openxmlformats.org/markup-compatibility/2006">
-          <mc:Choice xmlns:p14="http://schemas.microsoft.com/office/powerpoint/2010/main" Requires="p14">
+        <mc:AlternateContent xmlns:mc="http://schemas.openxmlformats.org/markup-compatibility/2006" xmlns:p14="http://schemas.microsoft.com/office/powerpoint/2010/main">
+          <mc:Choice Requires="p14">
             <p:contentPart p14:bwMode="auto" r:id="rId70">
               <p14:nvContentPartPr>
                 <p14:cNvPr id="119" name="Ink 118">
@@ -9883,7 +9936,7 @@
               </p14:xfrm>
             </p:contentPart>
           </mc:Choice>
-          <mc:Fallback>
+          <mc:Fallback xmlns="">
             <p:pic>
               <p:nvPicPr>
                 <p:cNvPr id="119" name="Ink 118">
@@ -9914,8 +9967,8 @@
             </p:pic>
           </mc:Fallback>
         </mc:AlternateContent>
-        <mc:AlternateContent xmlns:mc="http://schemas.openxmlformats.org/markup-compatibility/2006">
-          <mc:Choice xmlns:p14="http://schemas.microsoft.com/office/powerpoint/2010/main" Requires="p14">
+        <mc:AlternateContent xmlns:mc="http://schemas.openxmlformats.org/markup-compatibility/2006" xmlns:p14="http://schemas.microsoft.com/office/powerpoint/2010/main">
+          <mc:Choice Requires="p14">
             <p:contentPart p14:bwMode="auto" r:id="rId72">
               <p14:nvContentPartPr>
                 <p14:cNvPr id="120" name="Ink 119">
@@ -9934,7 +9987,7 @@
               </p14:xfrm>
             </p:contentPart>
           </mc:Choice>
-          <mc:Fallback>
+          <mc:Fallback xmlns="">
             <p:pic>
               <p:nvPicPr>
                 <p:cNvPr id="120" name="Ink 119">
@@ -9966,8 +10019,8 @@
           </mc:Fallback>
         </mc:AlternateContent>
       </p:grpSp>
-      <mc:AlternateContent xmlns:mc="http://schemas.openxmlformats.org/markup-compatibility/2006">
-        <mc:Choice xmlns:p14="http://schemas.microsoft.com/office/powerpoint/2010/main" Requires="p14">
+      <mc:AlternateContent xmlns:mc="http://schemas.openxmlformats.org/markup-compatibility/2006" xmlns:p14="http://schemas.microsoft.com/office/powerpoint/2010/main">
+        <mc:Choice Requires="p14">
           <p:contentPart p14:bwMode="auto" r:id="rId74">
             <p14:nvContentPartPr>
               <p14:cNvPr id="122" name="Ink 121">
@@ -9986,7 +10039,7 @@
             </p14:xfrm>
           </p:contentPart>
         </mc:Choice>
-        <mc:Fallback>
+        <mc:Fallback xmlns="">
           <p:pic>
             <p:nvPicPr>
               <p:cNvPr id="122" name="Ink 121">
@@ -10017,8 +10070,8 @@
           </p:pic>
         </mc:Fallback>
       </mc:AlternateContent>
-      <mc:AlternateContent xmlns:mc="http://schemas.openxmlformats.org/markup-compatibility/2006">
-        <mc:Choice xmlns:p14="http://schemas.microsoft.com/office/powerpoint/2010/main" Requires="p14">
+      <mc:AlternateContent xmlns:mc="http://schemas.openxmlformats.org/markup-compatibility/2006" xmlns:p14="http://schemas.microsoft.com/office/powerpoint/2010/main">
+        <mc:Choice Requires="p14">
           <p:contentPart p14:bwMode="auto" r:id="rId76">
             <p14:nvContentPartPr>
               <p14:cNvPr id="125" name="Ink 124">
@@ -10037,7 +10090,7 @@
             </p14:xfrm>
           </p:contentPart>
         </mc:Choice>
-        <mc:Fallback>
+        <mc:Fallback xmlns="">
           <p:pic>
             <p:nvPicPr>
               <p:cNvPr id="125" name="Ink 124">
@@ -10088,8 +10141,8 @@
             <a:chExt cx="372240" cy="542520"/>
           </a:xfrm>
         </p:grpSpPr>
-        <mc:AlternateContent xmlns:mc="http://schemas.openxmlformats.org/markup-compatibility/2006">
-          <mc:Choice xmlns:p14="http://schemas.microsoft.com/office/powerpoint/2010/main" Requires="p14">
+        <mc:AlternateContent xmlns:mc="http://schemas.openxmlformats.org/markup-compatibility/2006" xmlns:p14="http://schemas.microsoft.com/office/powerpoint/2010/main">
+          <mc:Choice Requires="p14">
             <p:contentPart p14:bwMode="auto" r:id="rId78">
               <p14:nvContentPartPr>
                 <p14:cNvPr id="127" name="Ink 126">
@@ -10108,7 +10161,7 @@
               </p14:xfrm>
             </p:contentPart>
           </mc:Choice>
-          <mc:Fallback>
+          <mc:Fallback xmlns="">
             <p:pic>
               <p:nvPicPr>
                 <p:cNvPr id="127" name="Ink 126">
@@ -10139,8 +10192,8 @@
             </p:pic>
           </mc:Fallback>
         </mc:AlternateContent>
-        <mc:AlternateContent xmlns:mc="http://schemas.openxmlformats.org/markup-compatibility/2006">
-          <mc:Choice xmlns:p14="http://schemas.microsoft.com/office/powerpoint/2010/main" Requires="p14">
+        <mc:AlternateContent xmlns:mc="http://schemas.openxmlformats.org/markup-compatibility/2006" xmlns:p14="http://schemas.microsoft.com/office/powerpoint/2010/main">
+          <mc:Choice Requires="p14">
             <p:contentPart p14:bwMode="auto" r:id="rId80">
               <p14:nvContentPartPr>
                 <p14:cNvPr id="128" name="Ink 127">
@@ -10159,7 +10212,7 @@
               </p14:xfrm>
             </p:contentPart>
           </mc:Choice>
-          <mc:Fallback>
+          <mc:Fallback xmlns="">
             <p:pic>
               <p:nvPicPr>
                 <p:cNvPr id="128" name="Ink 127">
@@ -10211,8 +10264,8 @@
             <a:chExt cx="657000" cy="608400"/>
           </a:xfrm>
         </p:grpSpPr>
-        <mc:AlternateContent xmlns:mc="http://schemas.openxmlformats.org/markup-compatibility/2006">
-          <mc:Choice xmlns:p14="http://schemas.microsoft.com/office/powerpoint/2010/main" Requires="p14">
+        <mc:AlternateContent xmlns:mc="http://schemas.openxmlformats.org/markup-compatibility/2006" xmlns:p14="http://schemas.microsoft.com/office/powerpoint/2010/main">
+          <mc:Choice Requires="p14">
             <p:contentPart p14:bwMode="auto" r:id="rId82">
               <p14:nvContentPartPr>
                 <p14:cNvPr id="133" name="Ink 132">
@@ -10231,7 +10284,7 @@
               </p14:xfrm>
             </p:contentPart>
           </mc:Choice>
-          <mc:Fallback>
+          <mc:Fallback xmlns="">
             <p:pic>
               <p:nvPicPr>
                 <p:cNvPr id="133" name="Ink 132">
@@ -10262,8 +10315,8 @@
             </p:pic>
           </mc:Fallback>
         </mc:AlternateContent>
-        <mc:AlternateContent xmlns:mc="http://schemas.openxmlformats.org/markup-compatibility/2006">
-          <mc:Choice xmlns:p14="http://schemas.microsoft.com/office/powerpoint/2010/main" Requires="p14">
+        <mc:AlternateContent xmlns:mc="http://schemas.openxmlformats.org/markup-compatibility/2006" xmlns:p14="http://schemas.microsoft.com/office/powerpoint/2010/main">
+          <mc:Choice Requires="p14">
             <p:contentPart p14:bwMode="auto" r:id="rId84">
               <p14:nvContentPartPr>
                 <p14:cNvPr id="134" name="Ink 133">
@@ -10282,7 +10335,7 @@
               </p14:xfrm>
             </p:contentPart>
           </mc:Choice>
-          <mc:Fallback>
+          <mc:Fallback xmlns="">
             <p:pic>
               <p:nvPicPr>
                 <p:cNvPr id="134" name="Ink 133">
@@ -10313,8 +10366,8 @@
             </p:pic>
           </mc:Fallback>
         </mc:AlternateContent>
-        <mc:AlternateContent xmlns:mc="http://schemas.openxmlformats.org/markup-compatibility/2006">
-          <mc:Choice xmlns:p14="http://schemas.microsoft.com/office/powerpoint/2010/main" Requires="p14">
+        <mc:AlternateContent xmlns:mc="http://schemas.openxmlformats.org/markup-compatibility/2006" xmlns:p14="http://schemas.microsoft.com/office/powerpoint/2010/main">
+          <mc:Choice Requires="p14">
             <p:contentPart p14:bwMode="auto" r:id="rId86">
               <p14:nvContentPartPr>
                 <p14:cNvPr id="135" name="Ink 134">
@@ -10333,7 +10386,7 @@
               </p14:xfrm>
             </p:contentPart>
           </mc:Choice>
-          <mc:Fallback>
+          <mc:Fallback xmlns="">
             <p:pic>
               <p:nvPicPr>
                 <p:cNvPr id="135" name="Ink 134">
@@ -10364,8 +10417,8 @@
             </p:pic>
           </mc:Fallback>
         </mc:AlternateContent>
-        <mc:AlternateContent xmlns:mc="http://schemas.openxmlformats.org/markup-compatibility/2006">
-          <mc:Choice xmlns:p14="http://schemas.microsoft.com/office/powerpoint/2010/main" Requires="p14">
+        <mc:AlternateContent xmlns:mc="http://schemas.openxmlformats.org/markup-compatibility/2006" xmlns:p14="http://schemas.microsoft.com/office/powerpoint/2010/main">
+          <mc:Choice Requires="p14">
             <p:contentPart p14:bwMode="auto" r:id="rId88">
               <p14:nvContentPartPr>
                 <p14:cNvPr id="136" name="Ink 135">
@@ -10384,7 +10437,7 @@
               </p14:xfrm>
             </p:contentPart>
           </mc:Choice>
-          <mc:Fallback>
+          <mc:Fallback xmlns="">
             <p:pic>
               <p:nvPicPr>
                 <p:cNvPr id="136" name="Ink 135">
@@ -10415,8 +10468,8 @@
             </p:pic>
           </mc:Fallback>
         </mc:AlternateContent>
-        <mc:AlternateContent xmlns:mc="http://schemas.openxmlformats.org/markup-compatibility/2006">
-          <mc:Choice xmlns:p14="http://schemas.microsoft.com/office/powerpoint/2010/main" Requires="p14">
+        <mc:AlternateContent xmlns:mc="http://schemas.openxmlformats.org/markup-compatibility/2006" xmlns:p14="http://schemas.microsoft.com/office/powerpoint/2010/main">
+          <mc:Choice Requires="p14">
             <p:contentPart p14:bwMode="auto" r:id="rId90">
               <p14:nvContentPartPr>
                 <p14:cNvPr id="137" name="Ink 136">
@@ -10435,7 +10488,7 @@
               </p14:xfrm>
             </p:contentPart>
           </mc:Choice>
-          <mc:Fallback>
+          <mc:Fallback xmlns="">
             <p:pic>
               <p:nvPicPr>
                 <p:cNvPr id="137" name="Ink 136">
@@ -10466,8 +10519,8 @@
             </p:pic>
           </mc:Fallback>
         </mc:AlternateContent>
-        <mc:AlternateContent xmlns:mc="http://schemas.openxmlformats.org/markup-compatibility/2006">
-          <mc:Choice xmlns:p14="http://schemas.microsoft.com/office/powerpoint/2010/main" Requires="p14">
+        <mc:AlternateContent xmlns:mc="http://schemas.openxmlformats.org/markup-compatibility/2006" xmlns:p14="http://schemas.microsoft.com/office/powerpoint/2010/main">
+          <mc:Choice Requires="p14">
             <p:contentPart p14:bwMode="auto" r:id="rId92">
               <p14:nvContentPartPr>
                 <p14:cNvPr id="138" name="Ink 137">
@@ -10486,7 +10539,7 @@
               </p14:xfrm>
             </p:contentPart>
           </mc:Choice>
-          <mc:Fallback>
+          <mc:Fallback xmlns="">
             <p:pic>
               <p:nvPicPr>
                 <p:cNvPr id="138" name="Ink 137">
@@ -10538,8 +10591,8 @@
             <a:chExt cx="183960" cy="359640"/>
           </a:xfrm>
         </p:grpSpPr>
-        <mc:AlternateContent xmlns:mc="http://schemas.openxmlformats.org/markup-compatibility/2006">
-          <mc:Choice xmlns:p14="http://schemas.microsoft.com/office/powerpoint/2010/main" Requires="p14">
+        <mc:AlternateContent xmlns:mc="http://schemas.openxmlformats.org/markup-compatibility/2006" xmlns:p14="http://schemas.microsoft.com/office/powerpoint/2010/main">
+          <mc:Choice Requires="p14">
             <p:contentPart p14:bwMode="auto" r:id="rId94">
               <p14:nvContentPartPr>
                 <p14:cNvPr id="139" name="Ink 138">
@@ -10558,7 +10611,7 @@
               </p14:xfrm>
             </p:contentPart>
           </mc:Choice>
-          <mc:Fallback>
+          <mc:Fallback xmlns="">
             <p:pic>
               <p:nvPicPr>
                 <p:cNvPr id="139" name="Ink 138">
@@ -10589,8 +10642,8 @@
             </p:pic>
           </mc:Fallback>
         </mc:AlternateContent>
-        <mc:AlternateContent xmlns:mc="http://schemas.openxmlformats.org/markup-compatibility/2006">
-          <mc:Choice xmlns:p14="http://schemas.microsoft.com/office/powerpoint/2010/main" Requires="p14">
+        <mc:AlternateContent xmlns:mc="http://schemas.openxmlformats.org/markup-compatibility/2006" xmlns:p14="http://schemas.microsoft.com/office/powerpoint/2010/main">
+          <mc:Choice Requires="p14">
             <p:contentPart p14:bwMode="auto" r:id="rId96">
               <p14:nvContentPartPr>
                 <p14:cNvPr id="140" name="Ink 139">
@@ -10609,7 +10662,7 @@
               </p14:xfrm>
             </p:contentPart>
           </mc:Choice>
-          <mc:Fallback>
+          <mc:Fallback xmlns="">
             <p:pic>
               <p:nvPicPr>
                 <p:cNvPr id="140" name="Ink 139">
@@ -10641,8 +10694,8 @@
           </mc:Fallback>
         </mc:AlternateContent>
       </p:grpSp>
-      <mc:AlternateContent xmlns:mc="http://schemas.openxmlformats.org/markup-compatibility/2006">
-        <mc:Choice xmlns:p14="http://schemas.microsoft.com/office/powerpoint/2010/main" Requires="p14">
+      <mc:AlternateContent xmlns:mc="http://schemas.openxmlformats.org/markup-compatibility/2006" xmlns:p14="http://schemas.microsoft.com/office/powerpoint/2010/main">
+        <mc:Choice Requires="p14">
           <p:contentPart p14:bwMode="auto" r:id="rId98">
             <p14:nvContentPartPr>
               <p14:cNvPr id="142" name="Ink 141">
@@ -10661,7 +10714,7 @@
             </p14:xfrm>
           </p:contentPart>
         </mc:Choice>
-        <mc:Fallback>
+        <mc:Fallback xmlns="">
           <p:pic>
             <p:nvPicPr>
               <p:cNvPr id="142" name="Ink 141">
@@ -10692,8 +10745,8 @@
           </p:pic>
         </mc:Fallback>
       </mc:AlternateContent>
-      <mc:AlternateContent xmlns:mc="http://schemas.openxmlformats.org/markup-compatibility/2006">
-        <mc:Choice xmlns:p14="http://schemas.microsoft.com/office/powerpoint/2010/main" Requires="p14">
+      <mc:AlternateContent xmlns:mc="http://schemas.openxmlformats.org/markup-compatibility/2006" xmlns:p14="http://schemas.microsoft.com/office/powerpoint/2010/main">
+        <mc:Choice Requires="p14">
           <p:contentPart p14:bwMode="auto" r:id="rId100">
             <p14:nvContentPartPr>
               <p14:cNvPr id="143" name="Ink 142">
@@ -10712,7 +10765,7 @@
             </p14:xfrm>
           </p:contentPart>
         </mc:Choice>
-        <mc:Fallback>
+        <mc:Fallback xmlns="">
           <p:pic>
             <p:nvPicPr>
               <p:cNvPr id="143" name="Ink 142">
@@ -10743,8 +10796,8 @@
           </p:pic>
         </mc:Fallback>
       </mc:AlternateContent>
-      <mc:AlternateContent xmlns:mc="http://schemas.openxmlformats.org/markup-compatibility/2006">
-        <mc:Choice xmlns:p14="http://schemas.microsoft.com/office/powerpoint/2010/main" Requires="p14">
+      <mc:AlternateContent xmlns:mc="http://schemas.openxmlformats.org/markup-compatibility/2006" xmlns:p14="http://schemas.microsoft.com/office/powerpoint/2010/main">
+        <mc:Choice Requires="p14">
           <p:contentPart p14:bwMode="auto" r:id="rId102">
             <p14:nvContentPartPr>
               <p14:cNvPr id="144" name="Ink 143">
@@ -10763,7 +10816,7 @@
             </p14:xfrm>
           </p:contentPart>
         </mc:Choice>
-        <mc:Fallback>
+        <mc:Fallback xmlns="">
           <p:pic>
             <p:nvPicPr>
               <p:cNvPr id="144" name="Ink 143">
@@ -10814,8 +10867,8 @@
             <a:chExt cx="207360" cy="180720"/>
           </a:xfrm>
         </p:grpSpPr>
-        <mc:AlternateContent xmlns:mc="http://schemas.openxmlformats.org/markup-compatibility/2006">
-          <mc:Choice xmlns:p14="http://schemas.microsoft.com/office/powerpoint/2010/main" Requires="p14">
+        <mc:AlternateContent xmlns:mc="http://schemas.openxmlformats.org/markup-compatibility/2006" xmlns:p14="http://schemas.microsoft.com/office/powerpoint/2010/main">
+          <mc:Choice Requires="p14">
             <p:contentPart p14:bwMode="auto" r:id="rId104">
               <p14:nvContentPartPr>
                 <p14:cNvPr id="31" name="Ink 30">
@@ -10834,7 +10887,7 @@
               </p14:xfrm>
             </p:contentPart>
           </mc:Choice>
-          <mc:Fallback>
+          <mc:Fallback xmlns="">
             <p:pic>
               <p:nvPicPr>
                 <p:cNvPr id="31" name="Ink 30">
@@ -10865,8 +10918,8 @@
             </p:pic>
           </mc:Fallback>
         </mc:AlternateContent>
-        <mc:AlternateContent xmlns:mc="http://schemas.openxmlformats.org/markup-compatibility/2006">
-          <mc:Choice xmlns:p14="http://schemas.microsoft.com/office/powerpoint/2010/main" Requires="p14">
+        <mc:AlternateContent xmlns:mc="http://schemas.openxmlformats.org/markup-compatibility/2006" xmlns:p14="http://schemas.microsoft.com/office/powerpoint/2010/main">
+          <mc:Choice Requires="p14">
             <p:contentPart p14:bwMode="auto" r:id="rId106">
               <p14:nvContentPartPr>
                 <p14:cNvPr id="32" name="Ink 31">
@@ -10885,7 +10938,7 @@
               </p14:xfrm>
             </p:contentPart>
           </mc:Choice>
-          <mc:Fallback>
+          <mc:Fallback xmlns="">
             <p:pic>
               <p:nvPicPr>
                 <p:cNvPr id="32" name="Ink 31">
@@ -10916,8 +10969,8 @@
             </p:pic>
           </mc:Fallback>
         </mc:AlternateContent>
-        <mc:AlternateContent xmlns:mc="http://schemas.openxmlformats.org/markup-compatibility/2006">
-          <mc:Choice xmlns:p14="http://schemas.microsoft.com/office/powerpoint/2010/main" Requires="p14">
+        <mc:AlternateContent xmlns:mc="http://schemas.openxmlformats.org/markup-compatibility/2006" xmlns:p14="http://schemas.microsoft.com/office/powerpoint/2010/main">
+          <mc:Choice Requires="p14">
             <p:contentPart p14:bwMode="auto" r:id="rId108">
               <p14:nvContentPartPr>
                 <p14:cNvPr id="145" name="Ink 144">
@@ -10936,7 +10989,7 @@
               </p14:xfrm>
             </p:contentPart>
           </mc:Choice>
-          <mc:Fallback>
+          <mc:Fallback xmlns="">
             <p:pic>
               <p:nvPicPr>
                 <p:cNvPr id="145" name="Ink 144">
@@ -11038,8 +11091,8 @@
               <a:chExt cx="6216480" cy="3162960"/>
             </a:xfrm>
           </p:grpSpPr>
-          <mc:AlternateContent xmlns:mc="http://schemas.openxmlformats.org/markup-compatibility/2006">
-            <mc:Choice xmlns:p14="http://schemas.microsoft.com/office/powerpoint/2010/main" Requires="p14">
+          <mc:AlternateContent xmlns:mc="http://schemas.openxmlformats.org/markup-compatibility/2006" xmlns:p14="http://schemas.microsoft.com/office/powerpoint/2010/main">
+            <mc:Choice Requires="p14">
               <p:contentPart p14:bwMode="auto" r:id="rId2">
                 <p14:nvContentPartPr>
                   <p14:cNvPr id="49" name="Ink 48">
@@ -11058,7 +11111,7 @@
                 </p14:xfrm>
               </p:contentPart>
             </mc:Choice>
-            <mc:Fallback>
+            <mc:Fallback xmlns="">
               <p:pic>
                 <p:nvPicPr>
                   <p:cNvPr id="49" name="Ink 48">
@@ -11089,8 +11142,8 @@
               </p:pic>
             </mc:Fallback>
           </mc:AlternateContent>
-          <mc:AlternateContent xmlns:mc="http://schemas.openxmlformats.org/markup-compatibility/2006">
-            <mc:Choice xmlns:p14="http://schemas.microsoft.com/office/powerpoint/2010/main" Requires="p14">
+          <mc:AlternateContent xmlns:mc="http://schemas.openxmlformats.org/markup-compatibility/2006" xmlns:p14="http://schemas.microsoft.com/office/powerpoint/2010/main">
+            <mc:Choice Requires="p14">
               <p:contentPart p14:bwMode="auto" r:id="rId4">
                 <p14:nvContentPartPr>
                   <p14:cNvPr id="48" name="Ink 47">
@@ -11109,7 +11162,7 @@
                 </p14:xfrm>
               </p:contentPart>
             </mc:Choice>
-            <mc:Fallback>
+            <mc:Fallback xmlns="">
               <p:pic>
                 <p:nvPicPr>
                   <p:cNvPr id="48" name="Ink 47">
@@ -11141,8 +11194,8 @@
             </mc:Fallback>
           </mc:AlternateContent>
         </p:grpSp>
-        <mc:AlternateContent xmlns:mc="http://schemas.openxmlformats.org/markup-compatibility/2006">
-          <mc:Choice xmlns:p14="http://schemas.microsoft.com/office/powerpoint/2010/main" Requires="p14">
+        <mc:AlternateContent xmlns:mc="http://schemas.openxmlformats.org/markup-compatibility/2006" xmlns:p14="http://schemas.microsoft.com/office/powerpoint/2010/main">
+          <mc:Choice Requires="p14">
             <p:contentPart p14:bwMode="auto" r:id="rId6">
               <p14:nvContentPartPr>
                 <p14:cNvPr id="51" name="Ink 50">
@@ -11161,7 +11214,7 @@
               </p14:xfrm>
             </p:contentPart>
           </mc:Choice>
-          <mc:Fallback>
+          <mc:Fallback xmlns="">
             <p:pic>
               <p:nvPicPr>
                 <p:cNvPr id="51" name="Ink 50">
@@ -11208,7 +11261,7 @@
         <p:spPr>
           <a:xfrm>
             <a:off x="4511968" y="936339"/>
-            <a:ext cx="3151055" cy="369332"/>
+            <a:ext cx="3398687" cy="369332"/>
           </a:xfrm>
           <a:prstGeom prst="rect">
             <a:avLst/>
@@ -11222,7 +11275,10 @@
           <a:lstStyle/>
           <a:p>
             <a:r>
-              <a:rPr lang="en-US" b="1" dirty="0"/>
+              <a:rPr lang="en-US" b="1" dirty="0">
+                <a:latin typeface="Source Sans Pro" panose="020B0503030403020204" pitchFamily="34" charset="0"/>
+                <a:ea typeface="Source Sans Pro" panose="020B0503030403020204" pitchFamily="34" charset="0"/>
+              </a:rPr>
               <a:t>Latent (unobserved) constructs</a:t>
             </a:r>
           </a:p>
@@ -11243,7 +11299,7 @@
         <p:spPr>
           <a:xfrm>
             <a:off x="4482835" y="5965871"/>
-            <a:ext cx="3784754" cy="369332"/>
+            <a:ext cx="3914854" cy="369332"/>
           </a:xfrm>
           <a:prstGeom prst="rect">
             <a:avLst/>
@@ -11257,14 +11313,17 @@
           <a:lstStyle/>
           <a:p>
             <a:r>
-              <a:rPr lang="en-US" dirty="0"/>
+              <a:rPr lang="en-US" dirty="0">
+                <a:latin typeface="Source Sans Pro" panose="020B0503030403020204" pitchFamily="34" charset="0"/>
+                <a:ea typeface="Source Sans Pro" panose="020B0503030403020204" pitchFamily="34" charset="0"/>
+              </a:rPr>
               <a:t>Operationalized (observable) variables</a:t>
             </a:r>
           </a:p>
         </p:txBody>
       </p:sp>
-      <mc:AlternateContent xmlns:mc="http://schemas.openxmlformats.org/markup-compatibility/2006">
-        <mc:Choice xmlns:p14="http://schemas.microsoft.com/office/powerpoint/2010/main" Requires="p14">
+      <mc:AlternateContent xmlns:mc="http://schemas.openxmlformats.org/markup-compatibility/2006" xmlns:p14="http://schemas.microsoft.com/office/powerpoint/2010/main">
+        <mc:Choice Requires="p14">
           <p:contentPart p14:bwMode="auto" r:id="rId8">
             <p14:nvContentPartPr>
               <p14:cNvPr id="8" name="Ink 7">
@@ -11283,7 +11342,7 @@
             </p14:xfrm>
           </p:contentPart>
         </mc:Choice>
-        <mc:Fallback>
+        <mc:Fallback xmlns="">
           <p:pic>
             <p:nvPicPr>
               <p:cNvPr id="8" name="Ink 7">
@@ -11314,8 +11373,8 @@
           </p:pic>
         </mc:Fallback>
       </mc:AlternateContent>
-      <mc:AlternateContent xmlns:mc="http://schemas.openxmlformats.org/markup-compatibility/2006">
-        <mc:Choice xmlns:p14="http://schemas.microsoft.com/office/powerpoint/2010/main" Requires="p14">
+      <mc:AlternateContent xmlns:mc="http://schemas.openxmlformats.org/markup-compatibility/2006" xmlns:p14="http://schemas.microsoft.com/office/powerpoint/2010/main">
+        <mc:Choice Requires="p14">
           <p:contentPart p14:bwMode="auto" r:id="rId10">
             <p14:nvContentPartPr>
               <p14:cNvPr id="12" name="Ink 11">
@@ -11334,7 +11393,7 @@
             </p14:xfrm>
           </p:contentPart>
         </mc:Choice>
-        <mc:Fallback>
+        <mc:Fallback xmlns="">
           <p:pic>
             <p:nvPicPr>
               <p:cNvPr id="12" name="Ink 11">
@@ -11365,8 +11424,8 @@
           </p:pic>
         </mc:Fallback>
       </mc:AlternateContent>
-      <mc:AlternateContent xmlns:mc="http://schemas.openxmlformats.org/markup-compatibility/2006">
-        <mc:Choice xmlns:p14="http://schemas.microsoft.com/office/powerpoint/2010/main" Requires="p14">
+      <mc:AlternateContent xmlns:mc="http://schemas.openxmlformats.org/markup-compatibility/2006" xmlns:p14="http://schemas.microsoft.com/office/powerpoint/2010/main">
+        <mc:Choice Requires="p14">
           <p:contentPart p14:bwMode="auto" r:id="rId12">
             <p14:nvContentPartPr>
               <p14:cNvPr id="13" name="Ink 12">
@@ -11385,7 +11444,7 @@
             </p14:xfrm>
           </p:contentPart>
         </mc:Choice>
-        <mc:Fallback>
+        <mc:Fallback xmlns="">
           <p:pic>
             <p:nvPicPr>
               <p:cNvPr id="13" name="Ink 12">
@@ -11416,8 +11475,8 @@
           </p:pic>
         </mc:Fallback>
       </mc:AlternateContent>
-      <mc:AlternateContent xmlns:mc="http://schemas.openxmlformats.org/markup-compatibility/2006">
-        <mc:Choice xmlns:p14="http://schemas.microsoft.com/office/powerpoint/2010/main" Requires="p14">
+      <mc:AlternateContent xmlns:mc="http://schemas.openxmlformats.org/markup-compatibility/2006" xmlns:p14="http://schemas.microsoft.com/office/powerpoint/2010/main">
+        <mc:Choice Requires="p14">
           <p:contentPart p14:bwMode="auto" r:id="rId14">
             <p14:nvContentPartPr>
               <p14:cNvPr id="15" name="Ink 14">
@@ -11436,7 +11495,7 @@
             </p14:xfrm>
           </p:contentPart>
         </mc:Choice>
-        <mc:Fallback>
+        <mc:Fallback xmlns="">
           <p:pic>
             <p:nvPicPr>
               <p:cNvPr id="15" name="Ink 14">
@@ -11467,8 +11526,8 @@
           </p:pic>
         </mc:Fallback>
       </mc:AlternateContent>
-      <mc:AlternateContent xmlns:mc="http://schemas.openxmlformats.org/markup-compatibility/2006">
-        <mc:Choice xmlns:p14="http://schemas.microsoft.com/office/powerpoint/2010/main" Requires="p14">
+      <mc:AlternateContent xmlns:mc="http://schemas.openxmlformats.org/markup-compatibility/2006" xmlns:p14="http://schemas.microsoft.com/office/powerpoint/2010/main">
+        <mc:Choice Requires="p14">
           <p:contentPart p14:bwMode="auto" r:id="rId16">
             <p14:nvContentPartPr>
               <p14:cNvPr id="19" name="Ink 18">
@@ -11487,7 +11546,7 @@
             </p14:xfrm>
           </p:contentPart>
         </mc:Choice>
-        <mc:Fallback>
+        <mc:Fallback xmlns="">
           <p:pic>
             <p:nvPicPr>
               <p:cNvPr id="19" name="Ink 18">
@@ -11518,8 +11577,8 @@
           </p:pic>
         </mc:Fallback>
       </mc:AlternateContent>
-      <mc:AlternateContent xmlns:mc="http://schemas.openxmlformats.org/markup-compatibility/2006">
-        <mc:Choice xmlns:p14="http://schemas.microsoft.com/office/powerpoint/2010/main" Requires="p14">
+      <mc:AlternateContent xmlns:mc="http://schemas.openxmlformats.org/markup-compatibility/2006" xmlns:p14="http://schemas.microsoft.com/office/powerpoint/2010/main">
+        <mc:Choice Requires="p14">
           <p:contentPart p14:bwMode="auto" r:id="rId18">
             <p14:nvContentPartPr>
               <p14:cNvPr id="25" name="Ink 24">
@@ -11538,7 +11597,7 @@
             </p14:xfrm>
           </p:contentPart>
         </mc:Choice>
-        <mc:Fallback>
+        <mc:Fallback xmlns="">
           <p:pic>
             <p:nvPicPr>
               <p:cNvPr id="25" name="Ink 24">
@@ -11585,7 +11644,7 @@
             </p14:nvContentPartPr>
             <p14:xfrm>
               <a:off x="7619229" y="1387017"/>
-              <a:ext cx="785160" cy="823320"/>
+              <a:ext cx="908640" cy="823320"/>
             </p14:xfrm>
           </p:contentPart>
         </mc:Choice>
@@ -11610,8 +11669,8 @@
             </p:blipFill>
             <p:spPr>
               <a:xfrm>
-                <a:off x="7601589" y="1369017"/>
-                <a:ext cx="820800" cy="858960"/>
+                <a:off x="7601229" y="1369025"/>
+                <a:ext cx="944280" cy="858944"/>
               </a:xfrm>
               <a:prstGeom prst="rect">
                 <a:avLst/>
@@ -11640,8 +11699,8 @@
             <a:chExt cx="903600" cy="502200"/>
           </a:xfrm>
         </p:grpSpPr>
-        <mc:AlternateContent xmlns:mc="http://schemas.openxmlformats.org/markup-compatibility/2006">
-          <mc:Choice xmlns:p14="http://schemas.microsoft.com/office/powerpoint/2010/main" Requires="p14">
+        <mc:AlternateContent xmlns:mc="http://schemas.openxmlformats.org/markup-compatibility/2006" xmlns:p14="http://schemas.microsoft.com/office/powerpoint/2010/main">
+          <mc:Choice Requires="p14">
             <p:contentPart p14:bwMode="auto" r:id="rId22">
               <p14:nvContentPartPr>
                 <p14:cNvPr id="28" name="Ink 27">
@@ -11660,7 +11719,7 @@
               </p14:xfrm>
             </p:contentPart>
           </mc:Choice>
-          <mc:Fallback>
+          <mc:Fallback xmlns="">
             <p:pic>
               <p:nvPicPr>
                 <p:cNvPr id="28" name="Ink 27">
@@ -11691,8 +11750,8 @@
             </p:pic>
           </mc:Fallback>
         </mc:AlternateContent>
-        <mc:AlternateContent xmlns:mc="http://schemas.openxmlformats.org/markup-compatibility/2006">
-          <mc:Choice xmlns:p14="http://schemas.microsoft.com/office/powerpoint/2010/main" Requires="p14">
+        <mc:AlternateContent xmlns:mc="http://schemas.openxmlformats.org/markup-compatibility/2006" xmlns:p14="http://schemas.microsoft.com/office/powerpoint/2010/main">
+          <mc:Choice Requires="p14">
             <p:contentPart p14:bwMode="auto" r:id="rId24">
               <p14:nvContentPartPr>
                 <p14:cNvPr id="29" name="Ink 28">
@@ -11711,7 +11770,7 @@
               </p14:xfrm>
             </p:contentPart>
           </mc:Choice>
-          <mc:Fallback>
+          <mc:Fallback xmlns="">
             <p:pic>
               <p:nvPicPr>
                 <p:cNvPr id="29" name="Ink 28">
@@ -11763,8 +11822,8 @@
             <a:chExt cx="991800" cy="597240"/>
           </a:xfrm>
         </p:grpSpPr>
-        <mc:AlternateContent xmlns:mc="http://schemas.openxmlformats.org/markup-compatibility/2006">
-          <mc:Choice xmlns:p14="http://schemas.microsoft.com/office/powerpoint/2010/main" Requires="p14">
+        <mc:AlternateContent xmlns:mc="http://schemas.openxmlformats.org/markup-compatibility/2006" xmlns:p14="http://schemas.microsoft.com/office/powerpoint/2010/main">
+          <mc:Choice Requires="p14">
             <p:contentPart p14:bwMode="auto" r:id="rId26">
               <p14:nvContentPartPr>
                 <p14:cNvPr id="31" name="Ink 30">
@@ -11783,7 +11842,7 @@
               </p14:xfrm>
             </p:contentPart>
           </mc:Choice>
-          <mc:Fallback>
+          <mc:Fallback xmlns="">
             <p:pic>
               <p:nvPicPr>
                 <p:cNvPr id="31" name="Ink 30">
@@ -11814,8 +11873,8 @@
             </p:pic>
           </mc:Fallback>
         </mc:AlternateContent>
-        <mc:AlternateContent xmlns:mc="http://schemas.openxmlformats.org/markup-compatibility/2006">
-          <mc:Choice xmlns:p14="http://schemas.microsoft.com/office/powerpoint/2010/main" Requires="p14">
+        <mc:AlternateContent xmlns:mc="http://schemas.openxmlformats.org/markup-compatibility/2006" xmlns:p14="http://schemas.microsoft.com/office/powerpoint/2010/main">
+          <mc:Choice Requires="p14">
             <p:contentPart p14:bwMode="auto" r:id="rId28">
               <p14:nvContentPartPr>
                 <p14:cNvPr id="32" name="Ink 31">
@@ -11834,7 +11893,7 @@
               </p14:xfrm>
             </p:contentPart>
           </mc:Choice>
-          <mc:Fallback>
+          <mc:Fallback xmlns="">
             <p:pic>
               <p:nvPicPr>
                 <p:cNvPr id="32" name="Ink 31">
@@ -11886,8 +11945,8 @@
             <a:chExt cx="769680" cy="1954080"/>
           </a:xfrm>
         </p:grpSpPr>
-        <mc:AlternateContent xmlns:mc="http://schemas.openxmlformats.org/markup-compatibility/2006">
-          <mc:Choice xmlns:p14="http://schemas.microsoft.com/office/powerpoint/2010/main" Requires="p14">
+        <mc:AlternateContent xmlns:mc="http://schemas.openxmlformats.org/markup-compatibility/2006" xmlns:p14="http://schemas.microsoft.com/office/powerpoint/2010/main">
+          <mc:Choice Requires="p14">
             <p:contentPart p14:bwMode="auto" r:id="rId30">
               <p14:nvContentPartPr>
                 <p14:cNvPr id="34" name="Ink 33">
@@ -11906,7 +11965,7 @@
               </p14:xfrm>
             </p:contentPart>
           </mc:Choice>
-          <mc:Fallback>
+          <mc:Fallback xmlns="">
             <p:pic>
               <p:nvPicPr>
                 <p:cNvPr id="34" name="Ink 33">
@@ -11937,8 +11996,8 @@
             </p:pic>
           </mc:Fallback>
         </mc:AlternateContent>
-        <mc:AlternateContent xmlns:mc="http://schemas.openxmlformats.org/markup-compatibility/2006">
-          <mc:Choice xmlns:p14="http://schemas.microsoft.com/office/powerpoint/2010/main" Requires="p14">
+        <mc:AlternateContent xmlns:mc="http://schemas.openxmlformats.org/markup-compatibility/2006" xmlns:p14="http://schemas.microsoft.com/office/powerpoint/2010/main">
+          <mc:Choice Requires="p14">
             <p:contentPart p14:bwMode="auto" r:id="rId32">
               <p14:nvContentPartPr>
                 <p14:cNvPr id="35" name="Ink 34">
@@ -11957,7 +12016,7 @@
               </p14:xfrm>
             </p:contentPart>
           </mc:Choice>
-          <mc:Fallback>
+          <mc:Fallback xmlns="">
             <p:pic>
               <p:nvPicPr>
                 <p:cNvPr id="35" name="Ink 34">
@@ -12009,8 +12068,8 @@
             <a:chExt cx="488880" cy="1940760"/>
           </a:xfrm>
         </p:grpSpPr>
-        <mc:AlternateContent xmlns:mc="http://schemas.openxmlformats.org/markup-compatibility/2006">
-          <mc:Choice xmlns:p14="http://schemas.microsoft.com/office/powerpoint/2010/main" Requires="p14">
+        <mc:AlternateContent xmlns:mc="http://schemas.openxmlformats.org/markup-compatibility/2006" xmlns:p14="http://schemas.microsoft.com/office/powerpoint/2010/main">
+          <mc:Choice Requires="p14">
             <p:contentPart p14:bwMode="auto" r:id="rId34">
               <p14:nvContentPartPr>
                 <p14:cNvPr id="37" name="Ink 36">
@@ -12029,7 +12088,7 @@
               </p14:xfrm>
             </p:contentPart>
           </mc:Choice>
-          <mc:Fallback>
+          <mc:Fallback xmlns="">
             <p:pic>
               <p:nvPicPr>
                 <p:cNvPr id="37" name="Ink 36">
@@ -12060,8 +12119,8 @@
             </p:pic>
           </mc:Fallback>
         </mc:AlternateContent>
-        <mc:AlternateContent xmlns:mc="http://schemas.openxmlformats.org/markup-compatibility/2006">
-          <mc:Choice xmlns:p14="http://schemas.microsoft.com/office/powerpoint/2010/main" Requires="p14">
+        <mc:AlternateContent xmlns:mc="http://schemas.openxmlformats.org/markup-compatibility/2006" xmlns:p14="http://schemas.microsoft.com/office/powerpoint/2010/main">
+          <mc:Choice Requires="p14">
             <p:contentPart p14:bwMode="auto" r:id="rId36">
               <p14:nvContentPartPr>
                 <p14:cNvPr id="38" name="Ink 37">
@@ -12080,7 +12139,7 @@
               </p14:xfrm>
             </p:contentPart>
           </mc:Choice>
-          <mc:Fallback>
+          <mc:Fallback xmlns="">
             <p:pic>
               <p:nvPicPr>
                 <p:cNvPr id="38" name="Ink 37">
@@ -12112,8 +12171,8 @@
           </mc:Fallback>
         </mc:AlternateContent>
       </p:grpSp>
-      <mc:AlternateContent xmlns:mc="http://schemas.openxmlformats.org/markup-compatibility/2006">
-        <mc:Choice xmlns:p14="http://schemas.microsoft.com/office/powerpoint/2010/main" Requires="p14">
+      <mc:AlternateContent xmlns:mc="http://schemas.openxmlformats.org/markup-compatibility/2006" xmlns:p14="http://schemas.microsoft.com/office/powerpoint/2010/main">
+        <mc:Choice Requires="p14">
           <p:contentPart p14:bwMode="auto" r:id="rId38">
             <p14:nvContentPartPr>
               <p14:cNvPr id="40" name="Ink 39">
@@ -12132,7 +12191,7 @@
             </p14:xfrm>
           </p:contentPart>
         </mc:Choice>
-        <mc:Fallback>
+        <mc:Fallback xmlns="">
           <p:pic>
             <p:nvPicPr>
               <p:cNvPr id="40" name="Ink 39">
@@ -12183,8 +12242,8 @@
             <a:chExt cx="358200" cy="2604960"/>
           </a:xfrm>
         </p:grpSpPr>
-        <mc:AlternateContent xmlns:mc="http://schemas.openxmlformats.org/markup-compatibility/2006">
-          <mc:Choice xmlns:p14="http://schemas.microsoft.com/office/powerpoint/2010/main" Requires="p14">
+        <mc:AlternateContent xmlns:mc="http://schemas.openxmlformats.org/markup-compatibility/2006" xmlns:p14="http://schemas.microsoft.com/office/powerpoint/2010/main">
+          <mc:Choice Requires="p14">
             <p:contentPart p14:bwMode="auto" r:id="rId40">
               <p14:nvContentPartPr>
                 <p14:cNvPr id="41" name="Ink 40">
@@ -12203,7 +12262,7 @@
               </p14:xfrm>
             </p:contentPart>
           </mc:Choice>
-          <mc:Fallback>
+          <mc:Fallback xmlns="">
             <p:pic>
               <p:nvPicPr>
                 <p:cNvPr id="41" name="Ink 40">
@@ -12234,8 +12293,8 @@
             </p:pic>
           </mc:Fallback>
         </mc:AlternateContent>
-        <mc:AlternateContent xmlns:mc="http://schemas.openxmlformats.org/markup-compatibility/2006">
-          <mc:Choice xmlns:p14="http://schemas.microsoft.com/office/powerpoint/2010/main" Requires="p14">
+        <mc:AlternateContent xmlns:mc="http://schemas.openxmlformats.org/markup-compatibility/2006" xmlns:p14="http://schemas.microsoft.com/office/powerpoint/2010/main">
+          <mc:Choice Requires="p14">
             <p:contentPart p14:bwMode="auto" r:id="rId42">
               <p14:nvContentPartPr>
                 <p14:cNvPr id="42" name="Ink 41">
@@ -12254,7 +12313,7 @@
               </p14:xfrm>
             </p:contentPart>
           </mc:Choice>
-          <mc:Fallback>
+          <mc:Fallback xmlns="">
             <p:pic>
               <p:nvPicPr>
                 <p:cNvPr id="42" name="Ink 41">
@@ -12286,8 +12345,8 @@
           </mc:Fallback>
         </mc:AlternateContent>
       </p:grpSp>
-      <mc:AlternateContent xmlns:mc="http://schemas.openxmlformats.org/markup-compatibility/2006">
-        <mc:Choice xmlns:p14="http://schemas.microsoft.com/office/powerpoint/2010/main" Requires="p14">
+      <mc:AlternateContent xmlns:mc="http://schemas.openxmlformats.org/markup-compatibility/2006" xmlns:p14="http://schemas.microsoft.com/office/powerpoint/2010/main">
+        <mc:Choice Requires="p14">
           <p:contentPart p14:bwMode="auto" r:id="rId44">
             <p14:nvContentPartPr>
               <p14:cNvPr id="45" name="Ink 44">
@@ -12306,7 +12365,7 @@
             </p14:xfrm>
           </p:contentPart>
         </mc:Choice>
-        <mc:Fallback>
+        <mc:Fallback xmlns="">
           <p:pic>
             <p:nvPicPr>
               <p:cNvPr id="45" name="Ink 44">
@@ -12352,7 +12411,7 @@
         <p:spPr>
           <a:xfrm>
             <a:off x="3767143" y="5252888"/>
-            <a:ext cx="830933" cy="307777"/>
+            <a:ext cx="856325" cy="307777"/>
           </a:xfrm>
           <a:prstGeom prst="rect">
             <a:avLst/>
@@ -12366,7 +12425,10 @@
           <a:lstStyle/>
           <a:p>
             <a:r>
-              <a:rPr lang="en-US" sz="1400" dirty="0"/>
+              <a:rPr lang="en-US" sz="1400" dirty="0">
+                <a:latin typeface="Source Sans Pro" panose="020B0503030403020204" pitchFamily="34" charset="0"/>
+                <a:ea typeface="Source Sans Pro" panose="020B0503030403020204" pitchFamily="34" charset="0"/>
+              </a:rPr>
               <a:t>Behavior</a:t>
             </a:r>
           </a:p>
@@ -12387,7 +12449,7 @@
         <p:spPr>
           <a:xfrm>
             <a:off x="5093660" y="5318611"/>
-            <a:ext cx="830933" cy="307777"/>
+            <a:ext cx="856325" cy="307777"/>
           </a:xfrm>
           <a:prstGeom prst="rect">
             <a:avLst/>
@@ -12401,7 +12463,10 @@
           <a:lstStyle/>
           <a:p>
             <a:r>
-              <a:rPr lang="en-US" sz="1400" dirty="0"/>
+              <a:rPr lang="en-US" sz="1400" dirty="0">
+                <a:latin typeface="Source Sans Pro" panose="020B0503030403020204" pitchFamily="34" charset="0"/>
+                <a:ea typeface="Source Sans Pro" panose="020B0503030403020204" pitchFamily="34" charset="0"/>
+              </a:rPr>
               <a:t>Behavior</a:t>
             </a:r>
           </a:p>
@@ -12422,7 +12487,7 @@
         <p:spPr>
           <a:xfrm>
             <a:off x="6502384" y="5292613"/>
-            <a:ext cx="830933" cy="307777"/>
+            <a:ext cx="856325" cy="307777"/>
           </a:xfrm>
           <a:prstGeom prst="rect">
             <a:avLst/>
@@ -12436,7 +12501,10 @@
           <a:lstStyle/>
           <a:p>
             <a:r>
-              <a:rPr lang="en-US" sz="1400" dirty="0"/>
+              <a:rPr lang="en-US" sz="1400" dirty="0">
+                <a:latin typeface="Source Sans Pro" panose="020B0503030403020204" pitchFamily="34" charset="0"/>
+                <a:ea typeface="Source Sans Pro" panose="020B0503030403020204" pitchFamily="34" charset="0"/>
+              </a:rPr>
               <a:t>Behavior</a:t>
             </a:r>
           </a:p>
@@ -12457,7 +12525,7 @@
         <p:spPr>
           <a:xfrm>
             <a:off x="7812621" y="5299370"/>
-            <a:ext cx="830933" cy="307777"/>
+            <a:ext cx="856325" cy="307777"/>
           </a:xfrm>
           <a:prstGeom prst="rect">
             <a:avLst/>
@@ -12471,7 +12539,10 @@
           <a:lstStyle/>
           <a:p>
             <a:r>
-              <a:rPr lang="en-US" sz="1400" dirty="0"/>
+              <a:rPr lang="en-US" sz="1400" dirty="0">
+                <a:latin typeface="Source Sans Pro" panose="020B0503030403020204" pitchFamily="34" charset="0"/>
+                <a:ea typeface="Source Sans Pro" panose="020B0503030403020204" pitchFamily="34" charset="0"/>
+              </a:rPr>
               <a:t>Behavior</a:t>
             </a:r>
           </a:p>
@@ -12492,7 +12563,7 @@
         <p:spPr>
           <a:xfrm>
             <a:off x="3845296" y="1756371"/>
-            <a:ext cx="892809" cy="307777"/>
+            <a:ext cx="922047" cy="307777"/>
           </a:xfrm>
           <a:prstGeom prst="rect">
             <a:avLst/>
@@ -12506,7 +12577,10 @@
           <a:lstStyle/>
           <a:p>
             <a:r>
-              <a:rPr lang="en-US" sz="1400" dirty="0"/>
+              <a:rPr lang="en-US" sz="1400" dirty="0">
+                <a:latin typeface="Source Sans Pro" panose="020B0503030403020204" pitchFamily="34" charset="0"/>
+                <a:ea typeface="Source Sans Pro" panose="020B0503030403020204" pitchFamily="34" charset="0"/>
+              </a:rPr>
               <a:t>Construct</a:t>
             </a:r>
           </a:p>
@@ -12527,7 +12601,7 @@
         <p:spPr>
           <a:xfrm>
             <a:off x="5843789" y="2501062"/>
-            <a:ext cx="892809" cy="307777"/>
+            <a:ext cx="922047" cy="307777"/>
           </a:xfrm>
           <a:prstGeom prst="rect">
             <a:avLst/>
@@ -12541,7 +12615,10 @@
           <a:lstStyle/>
           <a:p>
             <a:r>
-              <a:rPr lang="en-US" sz="1400" dirty="0"/>
+              <a:rPr lang="en-US" sz="1400" dirty="0">
+                <a:latin typeface="Source Sans Pro" panose="020B0503030403020204" pitchFamily="34" charset="0"/>
+                <a:ea typeface="Source Sans Pro" panose="020B0503030403020204" pitchFamily="34" charset="0"/>
+              </a:rPr>
               <a:t>Construct</a:t>
             </a:r>
           </a:p>
@@ -12561,8 +12638,8 @@
         </p:nvSpPr>
         <p:spPr>
           <a:xfrm>
-            <a:off x="7576621" y="1588504"/>
-            <a:ext cx="892809" cy="307777"/>
+            <a:off x="7610016" y="1632635"/>
+            <a:ext cx="922047" cy="307777"/>
           </a:xfrm>
           <a:prstGeom prst="rect">
             <a:avLst/>
@@ -12576,7 +12653,10 @@
           <a:lstStyle/>
           <a:p>
             <a:r>
-              <a:rPr lang="en-US" sz="1400" dirty="0"/>
+              <a:rPr lang="en-US" sz="1400" dirty="0">
+                <a:latin typeface="Source Sans Pro" panose="020B0503030403020204" pitchFamily="34" charset="0"/>
+                <a:ea typeface="Source Sans Pro" panose="020B0503030403020204" pitchFamily="34" charset="0"/>
+              </a:rPr>
               <a:t>Construct</a:t>
             </a:r>
           </a:p>
@@ -12612,7 +12692,10 @@
           <a:p>
             <a:pPr algn="ctr"/>
             <a:r>
-              <a:rPr lang="en-US" sz="1400" dirty="0"/>
+              <a:rPr lang="en-US" sz="1400" dirty="0">
+                <a:latin typeface="Source Sans Pro" panose="020B0503030403020204" pitchFamily="34" charset="0"/>
+                <a:ea typeface="Source Sans Pro" panose="020B0503030403020204" pitchFamily="34" charset="0"/>
+              </a:rPr>
               <a:t>Hypothesized causal relationship</a:t>
             </a:r>
           </a:p>
@@ -12632,8 +12715,8 @@
         </p:nvSpPr>
         <p:spPr>
           <a:xfrm>
-            <a:off x="2645027" y="3607028"/>
-            <a:ext cx="1548339" cy="738664"/>
+            <a:off x="2516589" y="3607028"/>
+            <a:ext cx="1676777" cy="738664"/>
           </a:xfrm>
           <a:prstGeom prst="rect">
             <a:avLst/>
@@ -12648,7 +12731,10 @@
           <a:p>
             <a:pPr algn="r"/>
             <a:r>
-              <a:rPr lang="en-US" sz="1400" dirty="0"/>
+              <a:rPr lang="en-US" sz="1400" dirty="0">
+                <a:latin typeface="Source Sans Pro" panose="020B0503030403020204" pitchFamily="34" charset="0"/>
+                <a:ea typeface="Source Sans Pro" panose="020B0503030403020204" pitchFamily="34" charset="0"/>
+              </a:rPr>
               <a:t>Operationalization through measurement</a:t>
             </a:r>
           </a:p>
@@ -12684,8 +12770,8 @@
           <a:chExt cx="0" cy="0"/>
         </a:xfrm>
       </p:grpSpPr>
-      <mc:AlternateContent xmlns:mc="http://schemas.openxmlformats.org/markup-compatibility/2006">
-        <mc:Choice xmlns:p14="http://schemas.microsoft.com/office/powerpoint/2010/main" Requires="p14">
+      <mc:AlternateContent xmlns:mc="http://schemas.openxmlformats.org/markup-compatibility/2006" xmlns:p14="http://schemas.microsoft.com/office/powerpoint/2010/main">
+        <mc:Choice Requires="p14">
           <p:contentPart p14:bwMode="auto" r:id="rId2">
             <p14:nvContentPartPr>
               <p14:cNvPr id="4" name="Ink 3">
@@ -12704,7 +12790,7 @@
             </p14:xfrm>
           </p:contentPart>
         </mc:Choice>
-        <mc:Fallback>
+        <mc:Fallback xmlns="">
           <p:pic>
             <p:nvPicPr>
               <p:cNvPr id="4" name="Ink 3">
@@ -12735,8 +12821,8 @@
           </p:pic>
         </mc:Fallback>
       </mc:AlternateContent>
-      <mc:AlternateContent xmlns:mc="http://schemas.openxmlformats.org/markup-compatibility/2006">
-        <mc:Choice xmlns:p14="http://schemas.microsoft.com/office/powerpoint/2010/main" Requires="p14">
+      <mc:AlternateContent xmlns:mc="http://schemas.openxmlformats.org/markup-compatibility/2006" xmlns:p14="http://schemas.microsoft.com/office/powerpoint/2010/main">
+        <mc:Choice Requires="p14">
           <p:contentPart p14:bwMode="auto" r:id="rId4">
             <p14:nvContentPartPr>
               <p14:cNvPr id="5" name="Ink 4">
@@ -12755,7 +12841,7 @@
             </p14:xfrm>
           </p:contentPart>
         </mc:Choice>
-        <mc:Fallback>
+        <mc:Fallback xmlns="">
           <p:pic>
             <p:nvPicPr>
               <p:cNvPr id="5" name="Ink 4">
@@ -12786,8 +12872,8 @@
           </p:pic>
         </mc:Fallback>
       </mc:AlternateContent>
-      <mc:AlternateContent xmlns:mc="http://schemas.openxmlformats.org/markup-compatibility/2006">
-        <mc:Choice xmlns:p14="http://schemas.microsoft.com/office/powerpoint/2010/main" Requires="p14">
+      <mc:AlternateContent xmlns:mc="http://schemas.openxmlformats.org/markup-compatibility/2006" xmlns:p14="http://schemas.microsoft.com/office/powerpoint/2010/main">
+        <mc:Choice Requires="p14">
           <p:contentPart p14:bwMode="auto" r:id="rId6">
             <p14:nvContentPartPr>
               <p14:cNvPr id="8" name="Ink 7">
@@ -12806,7 +12892,7 @@
             </p14:xfrm>
           </p:contentPart>
         </mc:Choice>
-        <mc:Fallback>
+        <mc:Fallback xmlns="">
           <p:pic>
             <p:nvPicPr>
               <p:cNvPr id="8" name="Ink 7">
@@ -12857,8 +12943,8 @@
             <a:chExt cx="723240" cy="868680"/>
           </a:xfrm>
         </p:grpSpPr>
-        <mc:AlternateContent xmlns:mc="http://schemas.openxmlformats.org/markup-compatibility/2006">
-          <mc:Choice xmlns:p14="http://schemas.microsoft.com/office/powerpoint/2010/main" Requires="p14">
+        <mc:AlternateContent xmlns:mc="http://schemas.openxmlformats.org/markup-compatibility/2006" xmlns:p14="http://schemas.microsoft.com/office/powerpoint/2010/main">
+          <mc:Choice Requires="p14">
             <p:contentPart p14:bwMode="auto" r:id="rId8">
               <p14:nvContentPartPr>
                 <p14:cNvPr id="9" name="Ink 8">
@@ -12877,7 +12963,7 @@
               </p14:xfrm>
             </p:contentPart>
           </mc:Choice>
-          <mc:Fallback>
+          <mc:Fallback xmlns="">
             <p:pic>
               <p:nvPicPr>
                 <p:cNvPr id="9" name="Ink 8">
@@ -12908,8 +12994,8 @@
             </p:pic>
           </mc:Fallback>
         </mc:AlternateContent>
-        <mc:AlternateContent xmlns:mc="http://schemas.openxmlformats.org/markup-compatibility/2006">
-          <mc:Choice xmlns:p14="http://schemas.microsoft.com/office/powerpoint/2010/main" Requires="p14">
+        <mc:AlternateContent xmlns:mc="http://schemas.openxmlformats.org/markup-compatibility/2006" xmlns:p14="http://schemas.microsoft.com/office/powerpoint/2010/main">
+          <mc:Choice Requires="p14">
             <p:contentPart p14:bwMode="auto" r:id="rId10">
               <p14:nvContentPartPr>
                 <p14:cNvPr id="10" name="Ink 9">
@@ -12928,7 +13014,7 @@
               </p14:xfrm>
             </p:contentPart>
           </mc:Choice>
-          <mc:Fallback>
+          <mc:Fallback xmlns="">
             <p:pic>
               <p:nvPicPr>
                 <p:cNvPr id="10" name="Ink 9">
@@ -12980,8 +13066,8 @@
             <a:chExt cx="838800" cy="991080"/>
           </a:xfrm>
         </p:grpSpPr>
-        <mc:AlternateContent xmlns:mc="http://schemas.openxmlformats.org/markup-compatibility/2006">
-          <mc:Choice xmlns:p14="http://schemas.microsoft.com/office/powerpoint/2010/main" Requires="p14">
+        <mc:AlternateContent xmlns:mc="http://schemas.openxmlformats.org/markup-compatibility/2006" xmlns:p14="http://schemas.microsoft.com/office/powerpoint/2010/main">
+          <mc:Choice Requires="p14">
             <p:contentPart p14:bwMode="auto" r:id="rId12">
               <p14:nvContentPartPr>
                 <p14:cNvPr id="15" name="Ink 14">
@@ -13000,7 +13086,7 @@
               </p14:xfrm>
             </p:contentPart>
           </mc:Choice>
-          <mc:Fallback>
+          <mc:Fallback xmlns="">
             <p:pic>
               <p:nvPicPr>
                 <p:cNvPr id="15" name="Ink 14">
@@ -13031,8 +13117,8 @@
             </p:pic>
           </mc:Fallback>
         </mc:AlternateContent>
-        <mc:AlternateContent xmlns:mc="http://schemas.openxmlformats.org/markup-compatibility/2006">
-          <mc:Choice xmlns:p14="http://schemas.microsoft.com/office/powerpoint/2010/main" Requires="p14">
+        <mc:AlternateContent xmlns:mc="http://schemas.openxmlformats.org/markup-compatibility/2006" xmlns:p14="http://schemas.microsoft.com/office/powerpoint/2010/main">
+          <mc:Choice Requires="p14">
             <p:contentPart p14:bwMode="auto" r:id="rId14">
               <p14:nvContentPartPr>
                 <p14:cNvPr id="16" name="Ink 15">
@@ -13051,7 +13137,7 @@
               </p14:xfrm>
             </p:contentPart>
           </mc:Choice>
-          <mc:Fallback>
+          <mc:Fallback xmlns="">
             <p:pic>
               <p:nvPicPr>
                 <p:cNvPr id="16" name="Ink 15">
@@ -13082,8 +13168,8 @@
             </p:pic>
           </mc:Fallback>
         </mc:AlternateContent>
-        <mc:AlternateContent xmlns:mc="http://schemas.openxmlformats.org/markup-compatibility/2006">
-          <mc:Choice xmlns:p14="http://schemas.microsoft.com/office/powerpoint/2010/main" Requires="p14">
+        <mc:AlternateContent xmlns:mc="http://schemas.openxmlformats.org/markup-compatibility/2006" xmlns:p14="http://schemas.microsoft.com/office/powerpoint/2010/main">
+          <mc:Choice Requires="p14">
             <p:contentPart p14:bwMode="auto" r:id="rId16">
               <p14:nvContentPartPr>
                 <p14:cNvPr id="18" name="Ink 17">
@@ -13102,7 +13188,7 @@
               </p14:xfrm>
             </p:contentPart>
           </mc:Choice>
-          <mc:Fallback>
+          <mc:Fallback xmlns="">
             <p:pic>
               <p:nvPicPr>
                 <p:cNvPr id="18" name="Ink 17">
@@ -13134,8 +13220,8 @@
           </mc:Fallback>
         </mc:AlternateContent>
       </p:grpSp>
-      <mc:AlternateContent xmlns:mc="http://schemas.openxmlformats.org/markup-compatibility/2006">
-        <mc:Choice xmlns:p14="http://schemas.microsoft.com/office/powerpoint/2010/main" Requires="p14">
+      <mc:AlternateContent xmlns:mc="http://schemas.openxmlformats.org/markup-compatibility/2006" xmlns:p14="http://schemas.microsoft.com/office/powerpoint/2010/main">
+        <mc:Choice Requires="p14">
           <p:contentPart p14:bwMode="auto" r:id="rId18">
             <p14:nvContentPartPr>
               <p14:cNvPr id="20" name="Ink 19">
@@ -13154,7 +13240,7 @@
             </p14:xfrm>
           </p:contentPart>
         </mc:Choice>
-        <mc:Fallback>
+        <mc:Fallback xmlns="">
           <p:pic>
             <p:nvPicPr>
               <p:cNvPr id="20" name="Ink 19">
@@ -13185,8 +13271,8 @@
           </p:pic>
         </mc:Fallback>
       </mc:AlternateContent>
-      <mc:AlternateContent xmlns:mc="http://schemas.openxmlformats.org/markup-compatibility/2006">
-        <mc:Choice xmlns:p14="http://schemas.microsoft.com/office/powerpoint/2010/main" Requires="p14">
+      <mc:AlternateContent xmlns:mc="http://schemas.openxmlformats.org/markup-compatibility/2006" xmlns:p14="http://schemas.microsoft.com/office/powerpoint/2010/main">
+        <mc:Choice Requires="p14">
           <p:contentPart p14:bwMode="auto" r:id="rId20">
             <p14:nvContentPartPr>
               <p14:cNvPr id="21" name="Ink 20">
@@ -13205,7 +13291,7 @@
             </p14:xfrm>
           </p:contentPart>
         </mc:Choice>
-        <mc:Fallback>
+        <mc:Fallback xmlns="">
           <p:pic>
             <p:nvPicPr>
               <p:cNvPr id="21" name="Ink 20">
@@ -13236,8 +13322,8 @@
           </p:pic>
         </mc:Fallback>
       </mc:AlternateContent>
-      <mc:AlternateContent xmlns:mc="http://schemas.openxmlformats.org/markup-compatibility/2006">
-        <mc:Choice xmlns:p14="http://schemas.microsoft.com/office/powerpoint/2010/main" Requires="p14">
+      <mc:AlternateContent xmlns:mc="http://schemas.openxmlformats.org/markup-compatibility/2006" xmlns:p14="http://schemas.microsoft.com/office/powerpoint/2010/main">
+        <mc:Choice Requires="p14">
           <p:contentPart p14:bwMode="auto" r:id="rId22">
             <p14:nvContentPartPr>
               <p14:cNvPr id="22" name="Ink 21">
@@ -13256,7 +13342,7 @@
             </p14:xfrm>
           </p:contentPart>
         </mc:Choice>
-        <mc:Fallback>
+        <mc:Fallback xmlns="">
           <p:pic>
             <p:nvPicPr>
               <p:cNvPr id="22" name="Ink 21">
@@ -13287,8 +13373,8 @@
           </p:pic>
         </mc:Fallback>
       </mc:AlternateContent>
-      <mc:AlternateContent xmlns:mc="http://schemas.openxmlformats.org/markup-compatibility/2006">
-        <mc:Choice xmlns:p14="http://schemas.microsoft.com/office/powerpoint/2010/main" Requires="p14">
+      <mc:AlternateContent xmlns:mc="http://schemas.openxmlformats.org/markup-compatibility/2006" xmlns:p14="http://schemas.microsoft.com/office/powerpoint/2010/main">
+        <mc:Choice Requires="p14">
           <p:contentPart p14:bwMode="auto" r:id="rId24">
             <p14:nvContentPartPr>
               <p14:cNvPr id="23" name="Ink 22">
@@ -13307,7 +13393,7 @@
             </p14:xfrm>
           </p:contentPart>
         </mc:Choice>
-        <mc:Fallback>
+        <mc:Fallback xmlns="">
           <p:pic>
             <p:nvPicPr>
               <p:cNvPr id="23" name="Ink 22">
@@ -13338,8 +13424,8 @@
           </p:pic>
         </mc:Fallback>
       </mc:AlternateContent>
-      <mc:AlternateContent xmlns:mc="http://schemas.openxmlformats.org/markup-compatibility/2006">
-        <mc:Choice xmlns:p14="http://schemas.microsoft.com/office/powerpoint/2010/main" Requires="p14">
+      <mc:AlternateContent xmlns:mc="http://schemas.openxmlformats.org/markup-compatibility/2006" xmlns:p14="http://schemas.microsoft.com/office/powerpoint/2010/main">
+        <mc:Choice Requires="p14">
           <p:contentPart p14:bwMode="auto" r:id="rId26">
             <p14:nvContentPartPr>
               <p14:cNvPr id="24" name="Ink 23">
@@ -13358,7 +13444,7 @@
             </p14:xfrm>
           </p:contentPart>
         </mc:Choice>
-        <mc:Fallback>
+        <mc:Fallback xmlns="">
           <p:pic>
             <p:nvPicPr>
               <p:cNvPr id="24" name="Ink 23">
@@ -13409,8 +13495,8 @@
             <a:chExt cx="1686240" cy="1065600"/>
           </a:xfrm>
         </p:grpSpPr>
-        <mc:AlternateContent xmlns:mc="http://schemas.openxmlformats.org/markup-compatibility/2006">
-          <mc:Choice xmlns:p14="http://schemas.microsoft.com/office/powerpoint/2010/main" Requires="p14">
+        <mc:AlternateContent xmlns:mc="http://schemas.openxmlformats.org/markup-compatibility/2006" xmlns:p14="http://schemas.microsoft.com/office/powerpoint/2010/main">
+          <mc:Choice Requires="p14">
             <p:contentPart p14:bwMode="auto" r:id="rId28">
               <p14:nvContentPartPr>
                 <p14:cNvPr id="25" name="Ink 24">
@@ -13429,7 +13515,7 @@
               </p14:xfrm>
             </p:contentPart>
           </mc:Choice>
-          <mc:Fallback>
+          <mc:Fallback xmlns="">
             <p:pic>
               <p:nvPicPr>
                 <p:cNvPr id="25" name="Ink 24">
@@ -13460,8 +13546,8 @@
             </p:pic>
           </mc:Fallback>
         </mc:AlternateContent>
-        <mc:AlternateContent xmlns:mc="http://schemas.openxmlformats.org/markup-compatibility/2006">
-          <mc:Choice xmlns:p14="http://schemas.microsoft.com/office/powerpoint/2010/main" Requires="p14">
+        <mc:AlternateContent xmlns:mc="http://schemas.openxmlformats.org/markup-compatibility/2006" xmlns:p14="http://schemas.microsoft.com/office/powerpoint/2010/main">
+          <mc:Choice Requires="p14">
             <p:contentPart p14:bwMode="auto" r:id="rId30">
               <p14:nvContentPartPr>
                 <p14:cNvPr id="26" name="Ink 25">
@@ -13480,7 +13566,7 @@
               </p14:xfrm>
             </p:contentPart>
           </mc:Choice>
-          <mc:Fallback>
+          <mc:Fallback xmlns="">
             <p:pic>
               <p:nvPicPr>
                 <p:cNvPr id="26" name="Ink 25">
@@ -13511,8 +13597,8 @@
             </p:pic>
           </mc:Fallback>
         </mc:AlternateContent>
-        <mc:AlternateContent xmlns:mc="http://schemas.openxmlformats.org/markup-compatibility/2006">
-          <mc:Choice xmlns:p14="http://schemas.microsoft.com/office/powerpoint/2010/main" Requires="p14">
+        <mc:AlternateContent xmlns:mc="http://schemas.openxmlformats.org/markup-compatibility/2006" xmlns:p14="http://schemas.microsoft.com/office/powerpoint/2010/main">
+          <mc:Choice Requires="p14">
             <p:contentPart p14:bwMode="auto" r:id="rId32">
               <p14:nvContentPartPr>
                 <p14:cNvPr id="28" name="Ink 27">
@@ -13531,7 +13617,7 @@
               </p14:xfrm>
             </p:contentPart>
           </mc:Choice>
-          <mc:Fallback>
+          <mc:Fallback xmlns="">
             <p:pic>
               <p:nvPicPr>
                 <p:cNvPr id="28" name="Ink 27">
@@ -13562,8 +13648,8 @@
             </p:pic>
           </mc:Fallback>
         </mc:AlternateContent>
-        <mc:AlternateContent xmlns:mc="http://schemas.openxmlformats.org/markup-compatibility/2006">
-          <mc:Choice xmlns:p14="http://schemas.microsoft.com/office/powerpoint/2010/main" Requires="p14">
+        <mc:AlternateContent xmlns:mc="http://schemas.openxmlformats.org/markup-compatibility/2006" xmlns:p14="http://schemas.microsoft.com/office/powerpoint/2010/main">
+          <mc:Choice Requires="p14">
             <p:contentPart p14:bwMode="auto" r:id="rId34">
               <p14:nvContentPartPr>
                 <p14:cNvPr id="30" name="Ink 29">
@@ -13582,7 +13668,7 @@
               </p14:xfrm>
             </p:contentPart>
           </mc:Choice>
-          <mc:Fallback>
+          <mc:Fallback xmlns="">
             <p:pic>
               <p:nvPicPr>
                 <p:cNvPr id="30" name="Ink 29">
@@ -13614,8 +13700,8 @@
           </mc:Fallback>
         </mc:AlternateContent>
       </p:grpSp>
-      <mc:AlternateContent xmlns:mc="http://schemas.openxmlformats.org/markup-compatibility/2006">
-        <mc:Choice xmlns:p14="http://schemas.microsoft.com/office/powerpoint/2010/main" Requires="p14">
+      <mc:AlternateContent xmlns:mc="http://schemas.openxmlformats.org/markup-compatibility/2006" xmlns:p14="http://schemas.microsoft.com/office/powerpoint/2010/main">
+        <mc:Choice Requires="p14">
           <p:contentPart p14:bwMode="auto" r:id="rId36">
             <p14:nvContentPartPr>
               <p14:cNvPr id="37" name="Ink 36">
@@ -13634,7 +13720,7 @@
             </p14:xfrm>
           </p:contentPart>
         </mc:Choice>
-        <mc:Fallback>
+        <mc:Fallback xmlns="">
           <p:pic>
             <p:nvPicPr>
               <p:cNvPr id="37" name="Ink 36">
@@ -13685,8 +13771,8 @@
             <a:chExt cx="742680" cy="644760"/>
           </a:xfrm>
         </p:grpSpPr>
-        <mc:AlternateContent xmlns:mc="http://schemas.openxmlformats.org/markup-compatibility/2006">
-          <mc:Choice xmlns:p14="http://schemas.microsoft.com/office/powerpoint/2010/main" Requires="p14">
+        <mc:AlternateContent xmlns:mc="http://schemas.openxmlformats.org/markup-compatibility/2006" xmlns:p14="http://schemas.microsoft.com/office/powerpoint/2010/main">
+          <mc:Choice Requires="p14">
             <p:contentPart p14:bwMode="auto" r:id="rId38">
               <p14:nvContentPartPr>
                 <p14:cNvPr id="38" name="Ink 37">
@@ -13705,7 +13791,7 @@
               </p14:xfrm>
             </p:contentPart>
           </mc:Choice>
-          <mc:Fallback>
+          <mc:Fallback xmlns="">
             <p:pic>
               <p:nvPicPr>
                 <p:cNvPr id="38" name="Ink 37">
@@ -13736,8 +13822,8 @@
             </p:pic>
           </mc:Fallback>
         </mc:AlternateContent>
-        <mc:AlternateContent xmlns:mc="http://schemas.openxmlformats.org/markup-compatibility/2006">
-          <mc:Choice xmlns:p14="http://schemas.microsoft.com/office/powerpoint/2010/main" Requires="p14">
+        <mc:AlternateContent xmlns:mc="http://schemas.openxmlformats.org/markup-compatibility/2006" xmlns:p14="http://schemas.microsoft.com/office/powerpoint/2010/main">
+          <mc:Choice Requires="p14">
             <p:contentPart p14:bwMode="auto" r:id="rId40">
               <p14:nvContentPartPr>
                 <p14:cNvPr id="39" name="Ink 38">
@@ -13756,7 +13842,7 @@
               </p14:xfrm>
             </p:contentPart>
           </mc:Choice>
-          <mc:Fallback>
+          <mc:Fallback xmlns="">
             <p:pic>
               <p:nvPicPr>
                 <p:cNvPr id="39" name="Ink 38">
@@ -13788,8 +13874,8 @@
           </mc:Fallback>
         </mc:AlternateContent>
       </p:grpSp>
-      <mc:AlternateContent xmlns:mc="http://schemas.openxmlformats.org/markup-compatibility/2006">
-        <mc:Choice xmlns:p14="http://schemas.microsoft.com/office/powerpoint/2010/main" Requires="p14">
+      <mc:AlternateContent xmlns:mc="http://schemas.openxmlformats.org/markup-compatibility/2006" xmlns:p14="http://schemas.microsoft.com/office/powerpoint/2010/main">
+        <mc:Choice Requires="p14">
           <p:contentPart p14:bwMode="auto" r:id="rId42">
             <p14:nvContentPartPr>
               <p14:cNvPr id="41" name="Ink 40">
@@ -13808,7 +13894,7 @@
             </p14:xfrm>
           </p:contentPart>
         </mc:Choice>
-        <mc:Fallback>
+        <mc:Fallback xmlns="">
           <p:pic>
             <p:nvPicPr>
               <p:cNvPr id="41" name="Ink 40">
@@ -13839,8 +13925,8 @@
           </p:pic>
         </mc:Fallback>
       </mc:AlternateContent>
-      <mc:AlternateContent xmlns:mc="http://schemas.openxmlformats.org/markup-compatibility/2006">
-        <mc:Choice xmlns:p14="http://schemas.microsoft.com/office/powerpoint/2010/main" Requires="p14">
+      <mc:AlternateContent xmlns:mc="http://schemas.openxmlformats.org/markup-compatibility/2006" xmlns:p14="http://schemas.microsoft.com/office/powerpoint/2010/main">
+        <mc:Choice Requires="p14">
           <p:contentPart p14:bwMode="auto" r:id="rId44">
             <p14:nvContentPartPr>
               <p14:cNvPr id="42" name="Ink 41">
@@ -13859,7 +13945,7 @@
             </p14:xfrm>
           </p:contentPart>
         </mc:Choice>
-        <mc:Fallback>
+        <mc:Fallback xmlns="">
           <p:pic>
             <p:nvPicPr>
               <p:cNvPr id="42" name="Ink 41">
@@ -13890,8 +13976,8 @@
           </p:pic>
         </mc:Fallback>
       </mc:AlternateContent>
-      <mc:AlternateContent xmlns:mc="http://schemas.openxmlformats.org/markup-compatibility/2006">
-        <mc:Choice xmlns:p14="http://schemas.microsoft.com/office/powerpoint/2010/main" Requires="p14">
+      <mc:AlternateContent xmlns:mc="http://schemas.openxmlformats.org/markup-compatibility/2006" xmlns:p14="http://schemas.microsoft.com/office/powerpoint/2010/main">
+        <mc:Choice Requires="p14">
           <p:contentPart p14:bwMode="auto" r:id="rId46">
             <p14:nvContentPartPr>
               <p14:cNvPr id="43" name="Ink 42">
@@ -13910,7 +13996,7 @@
             </p14:xfrm>
           </p:contentPart>
         </mc:Choice>
-        <mc:Fallback>
+        <mc:Fallback xmlns="">
           <p:pic>
             <p:nvPicPr>
               <p:cNvPr id="43" name="Ink 42">
@@ -13941,8 +14027,8 @@
           </p:pic>
         </mc:Fallback>
       </mc:AlternateContent>
-      <mc:AlternateContent xmlns:mc="http://schemas.openxmlformats.org/markup-compatibility/2006">
-        <mc:Choice xmlns:p14="http://schemas.microsoft.com/office/powerpoint/2010/main" Requires="p14">
+      <mc:AlternateContent xmlns:mc="http://schemas.openxmlformats.org/markup-compatibility/2006" xmlns:p14="http://schemas.microsoft.com/office/powerpoint/2010/main">
+        <mc:Choice Requires="p14">
           <p:contentPart p14:bwMode="auto" r:id="rId48">
             <p14:nvContentPartPr>
               <p14:cNvPr id="44" name="Ink 43">
@@ -13961,7 +14047,7 @@
             </p14:xfrm>
           </p:contentPart>
         </mc:Choice>
-        <mc:Fallback>
+        <mc:Fallback xmlns="">
           <p:pic>
             <p:nvPicPr>
               <p:cNvPr id="44" name="Ink 43">
@@ -13992,8 +14078,8 @@
           </p:pic>
         </mc:Fallback>
       </mc:AlternateContent>
-      <mc:AlternateContent xmlns:mc="http://schemas.openxmlformats.org/markup-compatibility/2006">
-        <mc:Choice xmlns:p14="http://schemas.microsoft.com/office/powerpoint/2010/main" Requires="p14">
+      <mc:AlternateContent xmlns:mc="http://schemas.openxmlformats.org/markup-compatibility/2006" xmlns:p14="http://schemas.microsoft.com/office/powerpoint/2010/main">
+        <mc:Choice Requires="p14">
           <p:contentPart p14:bwMode="auto" r:id="rId50">
             <p14:nvContentPartPr>
               <p14:cNvPr id="45" name="Ink 44">
@@ -14012,7 +14098,7 @@
             </p14:xfrm>
           </p:contentPart>
         </mc:Choice>
-        <mc:Fallback>
+        <mc:Fallback xmlns="">
           <p:pic>
             <p:nvPicPr>
               <p:cNvPr id="45" name="Ink 44">
@@ -14043,8 +14129,8 @@
           </p:pic>
         </mc:Fallback>
       </mc:AlternateContent>
-      <mc:AlternateContent xmlns:mc="http://schemas.openxmlformats.org/markup-compatibility/2006">
-        <mc:Choice xmlns:p14="http://schemas.microsoft.com/office/powerpoint/2010/main" Requires="p14">
+      <mc:AlternateContent xmlns:mc="http://schemas.openxmlformats.org/markup-compatibility/2006" xmlns:p14="http://schemas.microsoft.com/office/powerpoint/2010/main">
+        <mc:Choice Requires="p14">
           <p:contentPart p14:bwMode="auto" r:id="rId52">
             <p14:nvContentPartPr>
               <p14:cNvPr id="46" name="Ink 45">
@@ -14063,7 +14149,7 @@
             </p14:xfrm>
           </p:contentPart>
         </mc:Choice>
-        <mc:Fallback>
+        <mc:Fallback xmlns="">
           <p:pic>
             <p:nvPicPr>
               <p:cNvPr id="46" name="Ink 45">
@@ -14094,8 +14180,8 @@
           </p:pic>
         </mc:Fallback>
       </mc:AlternateContent>
-      <mc:AlternateContent xmlns:mc="http://schemas.openxmlformats.org/markup-compatibility/2006">
-        <mc:Choice xmlns:p14="http://schemas.microsoft.com/office/powerpoint/2010/main" Requires="p14">
+      <mc:AlternateContent xmlns:mc="http://schemas.openxmlformats.org/markup-compatibility/2006" xmlns:p14="http://schemas.microsoft.com/office/powerpoint/2010/main">
+        <mc:Choice Requires="p14">
           <p:contentPart p14:bwMode="auto" r:id="rId54">
             <p14:nvContentPartPr>
               <p14:cNvPr id="47" name="Ink 46">
@@ -14114,7 +14200,7 @@
             </p14:xfrm>
           </p:contentPart>
         </mc:Choice>
-        <mc:Fallback>
+        <mc:Fallback xmlns="">
           <p:pic>
             <p:nvPicPr>
               <p:cNvPr id="47" name="Ink 46">
@@ -14165,8 +14251,8 @@
             <a:chExt cx="1929240" cy="1406880"/>
           </a:xfrm>
         </p:grpSpPr>
-        <mc:AlternateContent xmlns:mc="http://schemas.openxmlformats.org/markup-compatibility/2006">
-          <mc:Choice xmlns:p14="http://schemas.microsoft.com/office/powerpoint/2010/main" Requires="p14">
+        <mc:AlternateContent xmlns:mc="http://schemas.openxmlformats.org/markup-compatibility/2006" xmlns:p14="http://schemas.microsoft.com/office/powerpoint/2010/main">
+          <mc:Choice Requires="p14">
             <p:contentPart p14:bwMode="auto" r:id="rId56">
               <p14:nvContentPartPr>
                 <p14:cNvPr id="48" name="Ink 47">
@@ -14185,7 +14271,7 @@
               </p14:xfrm>
             </p:contentPart>
           </mc:Choice>
-          <mc:Fallback>
+          <mc:Fallback xmlns="">
             <p:pic>
               <p:nvPicPr>
                 <p:cNvPr id="48" name="Ink 47">
@@ -14216,8 +14302,8 @@
             </p:pic>
           </mc:Fallback>
         </mc:AlternateContent>
-        <mc:AlternateContent xmlns:mc="http://schemas.openxmlformats.org/markup-compatibility/2006">
-          <mc:Choice xmlns:p14="http://schemas.microsoft.com/office/powerpoint/2010/main" Requires="p14">
+        <mc:AlternateContent xmlns:mc="http://schemas.openxmlformats.org/markup-compatibility/2006" xmlns:p14="http://schemas.microsoft.com/office/powerpoint/2010/main">
+          <mc:Choice Requires="p14">
             <p:contentPart p14:bwMode="auto" r:id="rId58">
               <p14:nvContentPartPr>
                 <p14:cNvPr id="49" name="Ink 48">
@@ -14236,7 +14322,7 @@
               </p14:xfrm>
             </p:contentPart>
           </mc:Choice>
-          <mc:Fallback>
+          <mc:Fallback xmlns="">
             <p:pic>
               <p:nvPicPr>
                 <p:cNvPr id="49" name="Ink 48">
@@ -14267,8 +14353,8 @@
             </p:pic>
           </mc:Fallback>
         </mc:AlternateContent>
-        <mc:AlternateContent xmlns:mc="http://schemas.openxmlformats.org/markup-compatibility/2006">
-          <mc:Choice xmlns:p14="http://schemas.microsoft.com/office/powerpoint/2010/main" Requires="p14">
+        <mc:AlternateContent xmlns:mc="http://schemas.openxmlformats.org/markup-compatibility/2006" xmlns:p14="http://schemas.microsoft.com/office/powerpoint/2010/main">
+          <mc:Choice Requires="p14">
             <p:contentPart p14:bwMode="auto" r:id="rId60">
               <p14:nvContentPartPr>
                 <p14:cNvPr id="51" name="Ink 50">
@@ -14287,7 +14373,7 @@
               </p14:xfrm>
             </p:contentPart>
           </mc:Choice>
-          <mc:Fallback>
+          <mc:Fallback xmlns="">
             <p:pic>
               <p:nvPicPr>
                 <p:cNvPr id="51" name="Ink 50">
@@ -14318,8 +14404,8 @@
             </p:pic>
           </mc:Fallback>
         </mc:AlternateContent>
-        <mc:AlternateContent xmlns:mc="http://schemas.openxmlformats.org/markup-compatibility/2006">
-          <mc:Choice xmlns:p14="http://schemas.microsoft.com/office/powerpoint/2010/main" Requires="p14">
+        <mc:AlternateContent xmlns:mc="http://schemas.openxmlformats.org/markup-compatibility/2006" xmlns:p14="http://schemas.microsoft.com/office/powerpoint/2010/main">
+          <mc:Choice Requires="p14">
             <p:contentPart p14:bwMode="auto" r:id="rId62">
               <p14:nvContentPartPr>
                 <p14:cNvPr id="53" name="Ink 52">
@@ -14338,7 +14424,7 @@
               </p14:xfrm>
             </p:contentPart>
           </mc:Choice>
-          <mc:Fallback>
+          <mc:Fallback xmlns="">
             <p:pic>
               <p:nvPicPr>
                 <p:cNvPr id="53" name="Ink 52">
@@ -14369,8 +14455,8 @@
             </p:pic>
           </mc:Fallback>
         </mc:AlternateContent>
-        <mc:AlternateContent xmlns:mc="http://schemas.openxmlformats.org/markup-compatibility/2006">
-          <mc:Choice xmlns:p14="http://schemas.microsoft.com/office/powerpoint/2010/main" Requires="p14">
+        <mc:AlternateContent xmlns:mc="http://schemas.openxmlformats.org/markup-compatibility/2006" xmlns:p14="http://schemas.microsoft.com/office/powerpoint/2010/main">
+          <mc:Choice Requires="p14">
             <p:contentPart p14:bwMode="auto" r:id="rId64">
               <p14:nvContentPartPr>
                 <p14:cNvPr id="55" name="Ink 54">
@@ -14389,7 +14475,7 @@
               </p14:xfrm>
             </p:contentPart>
           </mc:Choice>
-          <mc:Fallback>
+          <mc:Fallback xmlns="">
             <p:pic>
               <p:nvPicPr>
                 <p:cNvPr id="55" name="Ink 54">
@@ -14421,8 +14507,8 @@
           </mc:Fallback>
         </mc:AlternateContent>
       </p:grpSp>
-      <mc:AlternateContent xmlns:mc="http://schemas.openxmlformats.org/markup-compatibility/2006">
-        <mc:Choice xmlns:p14="http://schemas.microsoft.com/office/powerpoint/2010/main" Requires="p14">
+      <mc:AlternateContent xmlns:mc="http://schemas.openxmlformats.org/markup-compatibility/2006" xmlns:p14="http://schemas.microsoft.com/office/powerpoint/2010/main">
+        <mc:Choice Requires="p14">
           <p:contentPart p14:bwMode="auto" r:id="rId66">
             <p14:nvContentPartPr>
               <p14:cNvPr id="57" name="Ink 56">
@@ -14441,7 +14527,7 @@
             </p14:xfrm>
           </p:contentPart>
         </mc:Choice>
-        <mc:Fallback>
+        <mc:Fallback xmlns="">
           <p:pic>
             <p:nvPicPr>
               <p:cNvPr id="57" name="Ink 56">
@@ -14472,8 +14558,8 @@
           </p:pic>
         </mc:Fallback>
       </mc:AlternateContent>
-      <mc:AlternateContent xmlns:mc="http://schemas.openxmlformats.org/markup-compatibility/2006">
-        <mc:Choice xmlns:p14="http://schemas.microsoft.com/office/powerpoint/2010/main" Requires="p14">
+      <mc:AlternateContent xmlns:mc="http://schemas.openxmlformats.org/markup-compatibility/2006" xmlns:p14="http://schemas.microsoft.com/office/powerpoint/2010/main">
+        <mc:Choice Requires="p14">
           <p:contentPart p14:bwMode="auto" r:id="rId68">
             <p14:nvContentPartPr>
               <p14:cNvPr id="59" name="Ink 58">
@@ -14492,7 +14578,7 @@
             </p14:xfrm>
           </p:contentPart>
         </mc:Choice>
-        <mc:Fallback>
+        <mc:Fallback xmlns="">
           <p:pic>
             <p:nvPicPr>
               <p:cNvPr id="59" name="Ink 58">
@@ -14523,8 +14609,8 @@
           </p:pic>
         </mc:Fallback>
       </mc:AlternateContent>
-      <mc:AlternateContent xmlns:mc="http://schemas.openxmlformats.org/markup-compatibility/2006">
-        <mc:Choice xmlns:p14="http://schemas.microsoft.com/office/powerpoint/2010/main" Requires="p14">
+      <mc:AlternateContent xmlns:mc="http://schemas.openxmlformats.org/markup-compatibility/2006" xmlns:p14="http://schemas.microsoft.com/office/powerpoint/2010/main">
+        <mc:Choice Requires="p14">
           <p:contentPart p14:bwMode="auto" r:id="rId70">
             <p14:nvContentPartPr>
               <p14:cNvPr id="60" name="Ink 59">
@@ -14543,7 +14629,7 @@
             </p14:xfrm>
           </p:contentPart>
         </mc:Choice>
-        <mc:Fallback>
+        <mc:Fallback xmlns="">
           <p:pic>
             <p:nvPicPr>
               <p:cNvPr id="60" name="Ink 59">
@@ -14574,8 +14660,8 @@
           </p:pic>
         </mc:Fallback>
       </mc:AlternateContent>
-      <mc:AlternateContent xmlns:mc="http://schemas.openxmlformats.org/markup-compatibility/2006">
-        <mc:Choice xmlns:p14="http://schemas.microsoft.com/office/powerpoint/2010/main" Requires="p14">
+      <mc:AlternateContent xmlns:mc="http://schemas.openxmlformats.org/markup-compatibility/2006" xmlns:p14="http://schemas.microsoft.com/office/powerpoint/2010/main">
+        <mc:Choice Requires="p14">
           <p:contentPart p14:bwMode="auto" r:id="rId72">
             <p14:nvContentPartPr>
               <p14:cNvPr id="61" name="Ink 60">
@@ -14594,7 +14680,7 @@
             </p14:xfrm>
           </p:contentPart>
         </mc:Choice>
-        <mc:Fallback>
+        <mc:Fallback xmlns="">
           <p:pic>
             <p:nvPicPr>
               <p:cNvPr id="61" name="Ink 60">
@@ -14625,8 +14711,8 @@
           </p:pic>
         </mc:Fallback>
       </mc:AlternateContent>
-      <mc:AlternateContent xmlns:mc="http://schemas.openxmlformats.org/markup-compatibility/2006">
-        <mc:Choice xmlns:p14="http://schemas.microsoft.com/office/powerpoint/2010/main" Requires="p14">
+      <mc:AlternateContent xmlns:mc="http://schemas.openxmlformats.org/markup-compatibility/2006" xmlns:p14="http://schemas.microsoft.com/office/powerpoint/2010/main">
+        <mc:Choice Requires="p14">
           <p:contentPart p14:bwMode="auto" r:id="rId74">
             <p14:nvContentPartPr>
               <p14:cNvPr id="62" name="Ink 61">
@@ -14645,7 +14731,7 @@
             </p14:xfrm>
           </p:contentPart>
         </mc:Choice>
-        <mc:Fallback>
+        <mc:Fallback xmlns="">
           <p:pic>
             <p:nvPicPr>
               <p:cNvPr id="62" name="Ink 61">
@@ -14676,8 +14762,8 @@
           </p:pic>
         </mc:Fallback>
       </mc:AlternateContent>
-      <mc:AlternateContent xmlns:mc="http://schemas.openxmlformats.org/markup-compatibility/2006">
-        <mc:Choice xmlns:p14="http://schemas.microsoft.com/office/powerpoint/2010/main" Requires="p14">
+      <mc:AlternateContent xmlns:mc="http://schemas.openxmlformats.org/markup-compatibility/2006" xmlns:p14="http://schemas.microsoft.com/office/powerpoint/2010/main">
+        <mc:Choice Requires="p14">
           <p:contentPart p14:bwMode="auto" r:id="rId76">
             <p14:nvContentPartPr>
               <p14:cNvPr id="63" name="Ink 62">
@@ -14696,7 +14782,7 @@
             </p14:xfrm>
           </p:contentPart>
         </mc:Choice>
-        <mc:Fallback>
+        <mc:Fallback xmlns="">
           <p:pic>
             <p:nvPicPr>
               <p:cNvPr id="63" name="Ink 62">
@@ -14727,8 +14813,8 @@
           </p:pic>
         </mc:Fallback>
       </mc:AlternateContent>
-      <mc:AlternateContent xmlns:mc="http://schemas.openxmlformats.org/markup-compatibility/2006">
-        <mc:Choice xmlns:p14="http://schemas.microsoft.com/office/powerpoint/2010/main" Requires="p14">
+      <mc:AlternateContent xmlns:mc="http://schemas.openxmlformats.org/markup-compatibility/2006" xmlns:p14="http://schemas.microsoft.com/office/powerpoint/2010/main">
+        <mc:Choice Requires="p14">
           <p:contentPart p14:bwMode="auto" r:id="rId78">
             <p14:nvContentPartPr>
               <p14:cNvPr id="64" name="Ink 63">
@@ -14747,7 +14833,7 @@
             </p14:xfrm>
           </p:contentPart>
         </mc:Choice>
-        <mc:Fallback>
+        <mc:Fallback xmlns="">
           <p:pic>
             <p:nvPicPr>
               <p:cNvPr id="64" name="Ink 63">
@@ -14778,8 +14864,8 @@
           </p:pic>
         </mc:Fallback>
       </mc:AlternateContent>
-      <mc:AlternateContent xmlns:mc="http://schemas.openxmlformats.org/markup-compatibility/2006">
-        <mc:Choice xmlns:p14="http://schemas.microsoft.com/office/powerpoint/2010/main" Requires="p14">
+      <mc:AlternateContent xmlns:mc="http://schemas.openxmlformats.org/markup-compatibility/2006" xmlns:p14="http://schemas.microsoft.com/office/powerpoint/2010/main">
+        <mc:Choice Requires="p14">
           <p:contentPart p14:bwMode="auto" r:id="rId80">
             <p14:nvContentPartPr>
               <p14:cNvPr id="65" name="Ink 64">
@@ -14798,7 +14884,7 @@
             </p14:xfrm>
           </p:contentPart>
         </mc:Choice>
-        <mc:Fallback>
+        <mc:Fallback xmlns="">
           <p:pic>
             <p:nvPicPr>
               <p:cNvPr id="65" name="Ink 64">
@@ -14829,8 +14915,8 @@
           </p:pic>
         </mc:Fallback>
       </mc:AlternateContent>
-      <mc:AlternateContent xmlns:mc="http://schemas.openxmlformats.org/markup-compatibility/2006">
-        <mc:Choice xmlns:p14="http://schemas.microsoft.com/office/powerpoint/2010/main" Requires="p14">
+      <mc:AlternateContent xmlns:mc="http://schemas.openxmlformats.org/markup-compatibility/2006" xmlns:p14="http://schemas.microsoft.com/office/powerpoint/2010/main">
+        <mc:Choice Requires="p14">
           <p:contentPart p14:bwMode="auto" r:id="rId82">
             <p14:nvContentPartPr>
               <p14:cNvPr id="66" name="Ink 65">
@@ -14849,7 +14935,7 @@
             </p14:xfrm>
           </p:contentPart>
         </mc:Choice>
-        <mc:Fallback>
+        <mc:Fallback xmlns="">
           <p:pic>
             <p:nvPicPr>
               <p:cNvPr id="66" name="Ink 65">
@@ -14880,8 +14966,8 @@
           </p:pic>
         </mc:Fallback>
       </mc:AlternateContent>
-      <mc:AlternateContent xmlns:mc="http://schemas.openxmlformats.org/markup-compatibility/2006">
-        <mc:Choice xmlns:p14="http://schemas.microsoft.com/office/powerpoint/2010/main" Requires="p14">
+      <mc:AlternateContent xmlns:mc="http://schemas.openxmlformats.org/markup-compatibility/2006" xmlns:p14="http://schemas.microsoft.com/office/powerpoint/2010/main">
+        <mc:Choice Requires="p14">
           <p:contentPart p14:bwMode="auto" r:id="rId84">
             <p14:nvContentPartPr>
               <p14:cNvPr id="69" name="Ink 68">
@@ -14900,7 +14986,7 @@
             </p14:xfrm>
           </p:contentPart>
         </mc:Choice>
-        <mc:Fallback>
+        <mc:Fallback xmlns="">
           <p:pic>
             <p:nvPicPr>
               <p:cNvPr id="69" name="Ink 68">
@@ -14931,8 +15017,8 @@
           </p:pic>
         </mc:Fallback>
       </mc:AlternateContent>
-      <mc:AlternateContent xmlns:mc="http://schemas.openxmlformats.org/markup-compatibility/2006">
-        <mc:Choice xmlns:p14="http://schemas.microsoft.com/office/powerpoint/2010/main" Requires="p14">
+      <mc:AlternateContent xmlns:mc="http://schemas.openxmlformats.org/markup-compatibility/2006" xmlns:p14="http://schemas.microsoft.com/office/powerpoint/2010/main">
+        <mc:Choice Requires="p14">
           <p:contentPart p14:bwMode="auto" r:id="rId86">
             <p14:nvContentPartPr>
               <p14:cNvPr id="70" name="Ink 69">
@@ -14951,7 +15037,7 @@
             </p14:xfrm>
           </p:contentPart>
         </mc:Choice>
-        <mc:Fallback>
+        <mc:Fallback xmlns="">
           <p:pic>
             <p:nvPicPr>
               <p:cNvPr id="70" name="Ink 69">
@@ -14982,8 +15068,8 @@
           </p:pic>
         </mc:Fallback>
       </mc:AlternateContent>
-      <mc:AlternateContent xmlns:mc="http://schemas.openxmlformats.org/markup-compatibility/2006">
-        <mc:Choice xmlns:p14="http://schemas.microsoft.com/office/powerpoint/2010/main" Requires="p14">
+      <mc:AlternateContent xmlns:mc="http://schemas.openxmlformats.org/markup-compatibility/2006" xmlns:p14="http://schemas.microsoft.com/office/powerpoint/2010/main">
+        <mc:Choice Requires="p14">
           <p:contentPart p14:bwMode="auto" r:id="rId88">
             <p14:nvContentPartPr>
               <p14:cNvPr id="71" name="Ink 70">
@@ -15002,7 +15088,7 @@
             </p14:xfrm>
           </p:contentPart>
         </mc:Choice>
-        <mc:Fallback>
+        <mc:Fallback xmlns="">
           <p:pic>
             <p:nvPicPr>
               <p:cNvPr id="71" name="Ink 70">
@@ -15033,8 +15119,8 @@
           </p:pic>
         </mc:Fallback>
       </mc:AlternateContent>
-      <mc:AlternateContent xmlns:mc="http://schemas.openxmlformats.org/markup-compatibility/2006">
-        <mc:Choice xmlns:p14="http://schemas.microsoft.com/office/powerpoint/2010/main" Requires="p14">
+      <mc:AlternateContent xmlns:mc="http://schemas.openxmlformats.org/markup-compatibility/2006" xmlns:p14="http://schemas.microsoft.com/office/powerpoint/2010/main">
+        <mc:Choice Requires="p14">
           <p:contentPart p14:bwMode="auto" r:id="rId90">
             <p14:nvContentPartPr>
               <p14:cNvPr id="72" name="Ink 71">
@@ -15053,7 +15139,7 @@
             </p14:xfrm>
           </p:contentPart>
         </mc:Choice>
-        <mc:Fallback>
+        <mc:Fallback xmlns="">
           <p:pic>
             <p:nvPicPr>
               <p:cNvPr id="72" name="Ink 71">
@@ -15084,8 +15170,8 @@
           </p:pic>
         </mc:Fallback>
       </mc:AlternateContent>
-      <mc:AlternateContent xmlns:mc="http://schemas.openxmlformats.org/markup-compatibility/2006">
-        <mc:Choice xmlns:p14="http://schemas.microsoft.com/office/powerpoint/2010/main" Requires="p14">
+      <mc:AlternateContent xmlns:mc="http://schemas.openxmlformats.org/markup-compatibility/2006" xmlns:p14="http://schemas.microsoft.com/office/powerpoint/2010/main">
+        <mc:Choice Requires="p14">
           <p:contentPart p14:bwMode="auto" r:id="rId92">
             <p14:nvContentPartPr>
               <p14:cNvPr id="73" name="Ink 72">
@@ -15104,7 +15190,7 @@
             </p14:xfrm>
           </p:contentPart>
         </mc:Choice>
-        <mc:Fallback>
+        <mc:Fallback xmlns="">
           <p:pic>
             <p:nvPicPr>
               <p:cNvPr id="73" name="Ink 72">
@@ -15135,8 +15221,8 @@
           </p:pic>
         </mc:Fallback>
       </mc:AlternateContent>
-      <mc:AlternateContent xmlns:mc="http://schemas.openxmlformats.org/markup-compatibility/2006">
-        <mc:Choice xmlns:p14="http://schemas.microsoft.com/office/powerpoint/2010/main" Requires="p14">
+      <mc:AlternateContent xmlns:mc="http://schemas.openxmlformats.org/markup-compatibility/2006" xmlns:p14="http://schemas.microsoft.com/office/powerpoint/2010/main">
+        <mc:Choice Requires="p14">
           <p:contentPart p14:bwMode="auto" r:id="rId94">
             <p14:nvContentPartPr>
               <p14:cNvPr id="74" name="Ink 73">
@@ -15155,7 +15241,7 @@
             </p14:xfrm>
           </p:contentPart>
         </mc:Choice>
-        <mc:Fallback>
+        <mc:Fallback xmlns="">
           <p:pic>
             <p:nvPicPr>
               <p:cNvPr id="74" name="Ink 73">
@@ -15186,8 +15272,8 @@
           </p:pic>
         </mc:Fallback>
       </mc:AlternateContent>
-      <mc:AlternateContent xmlns:mc="http://schemas.openxmlformats.org/markup-compatibility/2006">
-        <mc:Choice xmlns:p14="http://schemas.microsoft.com/office/powerpoint/2010/main" Requires="p14">
+      <mc:AlternateContent xmlns:mc="http://schemas.openxmlformats.org/markup-compatibility/2006" xmlns:p14="http://schemas.microsoft.com/office/powerpoint/2010/main">
+        <mc:Choice Requires="p14">
           <p:contentPart p14:bwMode="auto" r:id="rId96">
             <p14:nvContentPartPr>
               <p14:cNvPr id="75" name="Ink 74">
@@ -15206,7 +15292,7 @@
             </p14:xfrm>
           </p:contentPart>
         </mc:Choice>
-        <mc:Fallback>
+        <mc:Fallback xmlns="">
           <p:pic>
             <p:nvPicPr>
               <p:cNvPr id="75" name="Ink 74">
@@ -15237,8 +15323,8 @@
           </p:pic>
         </mc:Fallback>
       </mc:AlternateContent>
-      <mc:AlternateContent xmlns:mc="http://schemas.openxmlformats.org/markup-compatibility/2006">
-        <mc:Choice xmlns:p14="http://schemas.microsoft.com/office/powerpoint/2010/main" Requires="p14">
+      <mc:AlternateContent xmlns:mc="http://schemas.openxmlformats.org/markup-compatibility/2006" xmlns:p14="http://schemas.microsoft.com/office/powerpoint/2010/main">
+        <mc:Choice Requires="p14">
           <p:contentPart p14:bwMode="auto" r:id="rId98">
             <p14:nvContentPartPr>
               <p14:cNvPr id="79" name="Ink 78">
@@ -15257,7 +15343,7 @@
             </p14:xfrm>
           </p:contentPart>
         </mc:Choice>
-        <mc:Fallback>
+        <mc:Fallback xmlns="">
           <p:pic>
             <p:nvPicPr>
               <p:cNvPr id="79" name="Ink 78">
@@ -15288,8 +15374,8 @@
           </p:pic>
         </mc:Fallback>
       </mc:AlternateContent>
-      <mc:AlternateContent xmlns:mc="http://schemas.openxmlformats.org/markup-compatibility/2006">
-        <mc:Choice xmlns:p14="http://schemas.microsoft.com/office/powerpoint/2010/main" Requires="p14">
+      <mc:AlternateContent xmlns:mc="http://schemas.openxmlformats.org/markup-compatibility/2006" xmlns:p14="http://schemas.microsoft.com/office/powerpoint/2010/main">
+        <mc:Choice Requires="p14">
           <p:contentPart p14:bwMode="auto" r:id="rId100">
             <p14:nvContentPartPr>
               <p14:cNvPr id="81" name="Ink 80">
@@ -15308,7 +15394,7 @@
             </p14:xfrm>
           </p:contentPart>
         </mc:Choice>
-        <mc:Fallback>
+        <mc:Fallback xmlns="">
           <p:pic>
             <p:nvPicPr>
               <p:cNvPr id="81" name="Ink 80">
@@ -15339,8 +15425,8 @@
           </p:pic>
         </mc:Fallback>
       </mc:AlternateContent>
-      <mc:AlternateContent xmlns:mc="http://schemas.openxmlformats.org/markup-compatibility/2006">
-        <mc:Choice xmlns:p14="http://schemas.microsoft.com/office/powerpoint/2010/main" Requires="p14">
+      <mc:AlternateContent xmlns:mc="http://schemas.openxmlformats.org/markup-compatibility/2006" xmlns:p14="http://schemas.microsoft.com/office/powerpoint/2010/main">
+        <mc:Choice Requires="p14">
           <p:contentPart p14:bwMode="auto" r:id="rId102">
             <p14:nvContentPartPr>
               <p14:cNvPr id="82" name="Ink 81">
@@ -15359,7 +15445,7 @@
             </p14:xfrm>
           </p:contentPart>
         </mc:Choice>
-        <mc:Fallback>
+        <mc:Fallback xmlns="">
           <p:pic>
             <p:nvPicPr>
               <p:cNvPr id="82" name="Ink 81">
@@ -15390,8 +15476,8 @@
           </p:pic>
         </mc:Fallback>
       </mc:AlternateContent>
-      <mc:AlternateContent xmlns:mc="http://schemas.openxmlformats.org/markup-compatibility/2006">
-        <mc:Choice xmlns:p14="http://schemas.microsoft.com/office/powerpoint/2010/main" Requires="p14">
+      <mc:AlternateContent xmlns:mc="http://schemas.openxmlformats.org/markup-compatibility/2006" xmlns:p14="http://schemas.microsoft.com/office/powerpoint/2010/main">
+        <mc:Choice Requires="p14">
           <p:contentPart p14:bwMode="auto" r:id="rId104">
             <p14:nvContentPartPr>
               <p14:cNvPr id="83" name="Ink 82">
@@ -15410,7 +15496,7 @@
             </p14:xfrm>
           </p:contentPart>
         </mc:Choice>
-        <mc:Fallback>
+        <mc:Fallback xmlns="">
           <p:pic>
             <p:nvPicPr>
               <p:cNvPr id="83" name="Ink 82">
@@ -15441,8 +15527,8 @@
           </p:pic>
         </mc:Fallback>
       </mc:AlternateContent>
-      <mc:AlternateContent xmlns:mc="http://schemas.openxmlformats.org/markup-compatibility/2006">
-        <mc:Choice xmlns:p14="http://schemas.microsoft.com/office/powerpoint/2010/main" Requires="p14">
+      <mc:AlternateContent xmlns:mc="http://schemas.openxmlformats.org/markup-compatibility/2006" xmlns:p14="http://schemas.microsoft.com/office/powerpoint/2010/main">
+        <mc:Choice Requires="p14">
           <p:contentPart p14:bwMode="auto" r:id="rId106">
             <p14:nvContentPartPr>
               <p14:cNvPr id="84" name="Ink 83">
@@ -15461,7 +15547,7 @@
             </p14:xfrm>
           </p:contentPart>
         </mc:Choice>
-        <mc:Fallback>
+        <mc:Fallback xmlns="">
           <p:pic>
             <p:nvPicPr>
               <p:cNvPr id="84" name="Ink 83">
@@ -15492,8 +15578,8 @@
           </p:pic>
         </mc:Fallback>
       </mc:AlternateContent>
-      <mc:AlternateContent xmlns:mc="http://schemas.openxmlformats.org/markup-compatibility/2006">
-        <mc:Choice xmlns:p14="http://schemas.microsoft.com/office/powerpoint/2010/main" Requires="p14">
+      <mc:AlternateContent xmlns:mc="http://schemas.openxmlformats.org/markup-compatibility/2006" xmlns:p14="http://schemas.microsoft.com/office/powerpoint/2010/main">
+        <mc:Choice Requires="p14">
           <p:contentPart p14:bwMode="auto" r:id="rId108">
             <p14:nvContentPartPr>
               <p14:cNvPr id="85" name="Ink 84">
@@ -15512,7 +15598,7 @@
             </p14:xfrm>
           </p:contentPart>
         </mc:Choice>
-        <mc:Fallback>
+        <mc:Fallback xmlns="">
           <p:pic>
             <p:nvPicPr>
               <p:cNvPr id="85" name="Ink 84">
@@ -15543,8 +15629,8 @@
           </p:pic>
         </mc:Fallback>
       </mc:AlternateContent>
-      <mc:AlternateContent xmlns:mc="http://schemas.openxmlformats.org/markup-compatibility/2006">
-        <mc:Choice xmlns:p14="http://schemas.microsoft.com/office/powerpoint/2010/main" Requires="p14">
+      <mc:AlternateContent xmlns:mc="http://schemas.openxmlformats.org/markup-compatibility/2006" xmlns:p14="http://schemas.microsoft.com/office/powerpoint/2010/main">
+        <mc:Choice Requires="p14">
           <p:contentPart p14:bwMode="auto" r:id="rId110">
             <p14:nvContentPartPr>
               <p14:cNvPr id="86" name="Ink 85">
@@ -15563,7 +15649,7 @@
             </p14:xfrm>
           </p:contentPart>
         </mc:Choice>
-        <mc:Fallback>
+        <mc:Fallback xmlns="">
           <p:pic>
             <p:nvPicPr>
               <p:cNvPr id="86" name="Ink 85">
@@ -15594,8 +15680,8 @@
           </p:pic>
         </mc:Fallback>
       </mc:AlternateContent>
-      <mc:AlternateContent xmlns:mc="http://schemas.openxmlformats.org/markup-compatibility/2006">
-        <mc:Choice xmlns:p14="http://schemas.microsoft.com/office/powerpoint/2010/main" Requires="p14">
+      <mc:AlternateContent xmlns:mc="http://schemas.openxmlformats.org/markup-compatibility/2006" xmlns:p14="http://schemas.microsoft.com/office/powerpoint/2010/main">
+        <mc:Choice Requires="p14">
           <p:contentPart p14:bwMode="auto" r:id="rId112">
             <p14:nvContentPartPr>
               <p14:cNvPr id="87" name="Ink 86">
@@ -15614,7 +15700,7 @@
             </p14:xfrm>
           </p:contentPart>
         </mc:Choice>
-        <mc:Fallback>
+        <mc:Fallback xmlns="">
           <p:pic>
             <p:nvPicPr>
               <p:cNvPr id="87" name="Ink 86">
@@ -15645,8 +15731,8 @@
           </p:pic>
         </mc:Fallback>
       </mc:AlternateContent>
-      <mc:AlternateContent xmlns:mc="http://schemas.openxmlformats.org/markup-compatibility/2006">
-        <mc:Choice xmlns:p14="http://schemas.microsoft.com/office/powerpoint/2010/main" Requires="p14">
+      <mc:AlternateContent xmlns:mc="http://schemas.openxmlformats.org/markup-compatibility/2006" xmlns:p14="http://schemas.microsoft.com/office/powerpoint/2010/main">
+        <mc:Choice Requires="p14">
           <p:contentPart p14:bwMode="auto" r:id="rId114">
             <p14:nvContentPartPr>
               <p14:cNvPr id="88" name="Ink 87">
@@ -15665,7 +15751,7 @@
             </p14:xfrm>
           </p:contentPart>
         </mc:Choice>
-        <mc:Fallback>
+        <mc:Fallback xmlns="">
           <p:pic>
             <p:nvPicPr>
               <p:cNvPr id="88" name="Ink 87">
@@ -15696,8 +15782,8 @@
           </p:pic>
         </mc:Fallback>
       </mc:AlternateContent>
-      <mc:AlternateContent xmlns:mc="http://schemas.openxmlformats.org/markup-compatibility/2006">
-        <mc:Choice xmlns:p14="http://schemas.microsoft.com/office/powerpoint/2010/main" Requires="p14">
+      <mc:AlternateContent xmlns:mc="http://schemas.openxmlformats.org/markup-compatibility/2006" xmlns:p14="http://schemas.microsoft.com/office/powerpoint/2010/main">
+        <mc:Choice Requires="p14">
           <p:contentPart p14:bwMode="auto" r:id="rId116">
             <p14:nvContentPartPr>
               <p14:cNvPr id="89" name="Ink 88">
@@ -15716,7 +15802,7 @@
             </p14:xfrm>
           </p:contentPart>
         </mc:Choice>
-        <mc:Fallback>
+        <mc:Fallback xmlns="">
           <p:pic>
             <p:nvPicPr>
               <p:cNvPr id="89" name="Ink 88">
@@ -15747,8 +15833,8 @@
           </p:pic>
         </mc:Fallback>
       </mc:AlternateContent>
-      <mc:AlternateContent xmlns:mc="http://schemas.openxmlformats.org/markup-compatibility/2006">
-        <mc:Choice xmlns:p14="http://schemas.microsoft.com/office/powerpoint/2010/main" Requires="p14">
+      <mc:AlternateContent xmlns:mc="http://schemas.openxmlformats.org/markup-compatibility/2006" xmlns:p14="http://schemas.microsoft.com/office/powerpoint/2010/main">
+        <mc:Choice Requires="p14">
           <p:contentPart p14:bwMode="auto" r:id="rId118">
             <p14:nvContentPartPr>
               <p14:cNvPr id="91" name="Ink 90">
@@ -15767,7 +15853,7 @@
             </p14:xfrm>
           </p:contentPart>
         </mc:Choice>
-        <mc:Fallback>
+        <mc:Fallback xmlns="">
           <p:pic>
             <p:nvPicPr>
               <p:cNvPr id="91" name="Ink 90">
@@ -15798,8 +15884,8 @@
           </p:pic>
         </mc:Fallback>
       </mc:AlternateContent>
-      <mc:AlternateContent xmlns:mc="http://schemas.openxmlformats.org/markup-compatibility/2006">
-        <mc:Choice xmlns:p14="http://schemas.microsoft.com/office/powerpoint/2010/main" Requires="p14">
+      <mc:AlternateContent xmlns:mc="http://schemas.openxmlformats.org/markup-compatibility/2006" xmlns:p14="http://schemas.microsoft.com/office/powerpoint/2010/main">
+        <mc:Choice Requires="p14">
           <p:contentPart p14:bwMode="auto" r:id="rId120">
             <p14:nvContentPartPr>
               <p14:cNvPr id="92" name="Ink 91">
@@ -15818,7 +15904,7 @@
             </p14:xfrm>
           </p:contentPart>
         </mc:Choice>
-        <mc:Fallback>
+        <mc:Fallback xmlns="">
           <p:pic>
             <p:nvPicPr>
               <p:cNvPr id="92" name="Ink 91">
@@ -15849,8 +15935,8 @@
           </p:pic>
         </mc:Fallback>
       </mc:AlternateContent>
-      <mc:AlternateContent xmlns:mc="http://schemas.openxmlformats.org/markup-compatibility/2006">
-        <mc:Choice xmlns:p14="http://schemas.microsoft.com/office/powerpoint/2010/main" Requires="p14">
+      <mc:AlternateContent xmlns:mc="http://schemas.openxmlformats.org/markup-compatibility/2006" xmlns:p14="http://schemas.microsoft.com/office/powerpoint/2010/main">
+        <mc:Choice Requires="p14">
           <p:contentPart p14:bwMode="auto" r:id="rId122">
             <p14:nvContentPartPr>
               <p14:cNvPr id="94" name="Ink 93">
@@ -15869,7 +15955,7 @@
             </p14:xfrm>
           </p:contentPart>
         </mc:Choice>
-        <mc:Fallback>
+        <mc:Fallback xmlns="">
           <p:pic>
             <p:nvPicPr>
               <p:cNvPr id="94" name="Ink 93">
@@ -15900,8 +15986,8 @@
           </p:pic>
         </mc:Fallback>
       </mc:AlternateContent>
-      <mc:AlternateContent xmlns:mc="http://schemas.openxmlformats.org/markup-compatibility/2006">
-        <mc:Choice xmlns:p14="http://schemas.microsoft.com/office/powerpoint/2010/main" Requires="p14">
+      <mc:AlternateContent xmlns:mc="http://schemas.openxmlformats.org/markup-compatibility/2006" xmlns:p14="http://schemas.microsoft.com/office/powerpoint/2010/main">
+        <mc:Choice Requires="p14">
           <p:contentPart p14:bwMode="auto" r:id="rId124">
             <p14:nvContentPartPr>
               <p14:cNvPr id="97" name="Ink 96">
@@ -15920,7 +16006,7 @@
             </p14:xfrm>
           </p:contentPart>
         </mc:Choice>
-        <mc:Fallback>
+        <mc:Fallback xmlns="">
           <p:pic>
             <p:nvPicPr>
               <p:cNvPr id="97" name="Ink 96">
@@ -15951,8 +16037,8 @@
           </p:pic>
         </mc:Fallback>
       </mc:AlternateContent>
-      <mc:AlternateContent xmlns:mc="http://schemas.openxmlformats.org/markup-compatibility/2006">
-        <mc:Choice xmlns:p14="http://schemas.microsoft.com/office/powerpoint/2010/main" Requires="p14">
+      <mc:AlternateContent xmlns:mc="http://schemas.openxmlformats.org/markup-compatibility/2006" xmlns:p14="http://schemas.microsoft.com/office/powerpoint/2010/main">
+        <mc:Choice Requires="p14">
           <p:contentPart p14:bwMode="auto" r:id="rId126">
             <p14:nvContentPartPr>
               <p14:cNvPr id="99" name="Ink 98">
@@ -15971,7 +16057,7 @@
             </p14:xfrm>
           </p:contentPart>
         </mc:Choice>
-        <mc:Fallback>
+        <mc:Fallback xmlns="">
           <p:pic>
             <p:nvPicPr>
               <p:cNvPr id="99" name="Ink 98">
@@ -16002,8 +16088,8 @@
           </p:pic>
         </mc:Fallback>
       </mc:AlternateContent>
-      <mc:AlternateContent xmlns:mc="http://schemas.openxmlformats.org/markup-compatibility/2006">
-        <mc:Choice xmlns:p14="http://schemas.microsoft.com/office/powerpoint/2010/main" Requires="p14">
+      <mc:AlternateContent xmlns:mc="http://schemas.openxmlformats.org/markup-compatibility/2006" xmlns:p14="http://schemas.microsoft.com/office/powerpoint/2010/main">
+        <mc:Choice Requires="p14">
           <p:contentPart p14:bwMode="auto" r:id="rId128">
             <p14:nvContentPartPr>
               <p14:cNvPr id="100" name="Ink 99">
@@ -16022,7 +16108,7 @@
             </p14:xfrm>
           </p:contentPart>
         </mc:Choice>
-        <mc:Fallback>
+        <mc:Fallback xmlns="">
           <p:pic>
             <p:nvPicPr>
               <p:cNvPr id="100" name="Ink 99">
@@ -16053,8 +16139,8 @@
           </p:pic>
         </mc:Fallback>
       </mc:AlternateContent>
-      <mc:AlternateContent xmlns:mc="http://schemas.openxmlformats.org/markup-compatibility/2006">
-        <mc:Choice xmlns:p14="http://schemas.microsoft.com/office/powerpoint/2010/main" Requires="p14">
+      <mc:AlternateContent xmlns:mc="http://schemas.openxmlformats.org/markup-compatibility/2006" xmlns:p14="http://schemas.microsoft.com/office/powerpoint/2010/main">
+        <mc:Choice Requires="p14">
           <p:contentPart p14:bwMode="auto" r:id="rId130">
             <p14:nvContentPartPr>
               <p14:cNvPr id="101" name="Ink 100">
@@ -16073,7 +16159,7 @@
             </p14:xfrm>
           </p:contentPart>
         </mc:Choice>
-        <mc:Fallback>
+        <mc:Fallback xmlns="">
           <p:pic>
             <p:nvPicPr>
               <p:cNvPr id="101" name="Ink 100">
@@ -16104,8 +16190,8 @@
           </p:pic>
         </mc:Fallback>
       </mc:AlternateContent>
-      <mc:AlternateContent xmlns:mc="http://schemas.openxmlformats.org/markup-compatibility/2006">
-        <mc:Choice xmlns:p14="http://schemas.microsoft.com/office/powerpoint/2010/main" Requires="p14">
+      <mc:AlternateContent xmlns:mc="http://schemas.openxmlformats.org/markup-compatibility/2006" xmlns:p14="http://schemas.microsoft.com/office/powerpoint/2010/main">
+        <mc:Choice Requires="p14">
           <p:contentPart p14:bwMode="auto" r:id="rId132">
             <p14:nvContentPartPr>
               <p14:cNvPr id="102" name="Ink 101">
@@ -16124,7 +16210,7 @@
             </p14:xfrm>
           </p:contentPart>
         </mc:Choice>
-        <mc:Fallback>
+        <mc:Fallback xmlns="">
           <p:pic>
             <p:nvPicPr>
               <p:cNvPr id="102" name="Ink 101">
@@ -16155,8 +16241,8 @@
           </p:pic>
         </mc:Fallback>
       </mc:AlternateContent>
-      <mc:AlternateContent xmlns:mc="http://schemas.openxmlformats.org/markup-compatibility/2006">
-        <mc:Choice xmlns:p14="http://schemas.microsoft.com/office/powerpoint/2010/main" Requires="p14">
+      <mc:AlternateContent xmlns:mc="http://schemas.openxmlformats.org/markup-compatibility/2006" xmlns:p14="http://schemas.microsoft.com/office/powerpoint/2010/main">
+        <mc:Choice Requires="p14">
           <p:contentPart p14:bwMode="auto" r:id="rId134">
             <p14:nvContentPartPr>
               <p14:cNvPr id="103" name="Ink 102">
@@ -16175,7 +16261,7 @@
             </p14:xfrm>
           </p:contentPart>
         </mc:Choice>
-        <mc:Fallback>
+        <mc:Fallback xmlns="">
           <p:pic>
             <p:nvPicPr>
               <p:cNvPr id="103" name="Ink 102">
@@ -16206,8 +16292,8 @@
           </p:pic>
         </mc:Fallback>
       </mc:AlternateContent>
-      <mc:AlternateContent xmlns:mc="http://schemas.openxmlformats.org/markup-compatibility/2006">
-        <mc:Choice xmlns:p14="http://schemas.microsoft.com/office/powerpoint/2010/main" Requires="p14">
+      <mc:AlternateContent xmlns:mc="http://schemas.openxmlformats.org/markup-compatibility/2006" xmlns:p14="http://schemas.microsoft.com/office/powerpoint/2010/main">
+        <mc:Choice Requires="p14">
           <p:contentPart p14:bwMode="auto" r:id="rId136">
             <p14:nvContentPartPr>
               <p14:cNvPr id="105" name="Ink 104">
@@ -16226,7 +16312,7 @@
             </p14:xfrm>
           </p:contentPart>
         </mc:Choice>
-        <mc:Fallback>
+        <mc:Fallback xmlns="">
           <p:pic>
             <p:nvPicPr>
               <p:cNvPr id="105" name="Ink 104">
@@ -16292,8 +16378,8 @@
           </a:p>
         </p:txBody>
       </p:sp>
-      <mc:AlternateContent xmlns:mc="http://schemas.openxmlformats.org/markup-compatibility/2006">
-        <mc:Choice xmlns:p14="http://schemas.microsoft.com/office/powerpoint/2010/main" Requires="p14">
+      <mc:AlternateContent xmlns:mc="http://schemas.openxmlformats.org/markup-compatibility/2006" xmlns:p14="http://schemas.microsoft.com/office/powerpoint/2010/main">
+        <mc:Choice Requires="p14">
           <p:contentPart p14:bwMode="auto" r:id="rId138">
             <p14:nvContentPartPr>
               <p14:cNvPr id="109" name="Ink 108">
@@ -16312,7 +16398,7 @@
             </p14:xfrm>
           </p:contentPart>
         </mc:Choice>
-        <mc:Fallback>
+        <mc:Fallback xmlns="">
           <p:pic>
             <p:nvPicPr>
               <p:cNvPr id="109" name="Ink 108">
@@ -16343,8 +16429,8 @@
           </p:pic>
         </mc:Fallback>
       </mc:AlternateContent>
-      <mc:AlternateContent xmlns:mc="http://schemas.openxmlformats.org/markup-compatibility/2006">
-        <mc:Choice xmlns:p14="http://schemas.microsoft.com/office/powerpoint/2010/main" Requires="p14">
+      <mc:AlternateContent xmlns:mc="http://schemas.openxmlformats.org/markup-compatibility/2006" xmlns:p14="http://schemas.microsoft.com/office/powerpoint/2010/main">
+        <mc:Choice Requires="p14">
           <p:contentPart p14:bwMode="auto" r:id="rId140">
             <p14:nvContentPartPr>
               <p14:cNvPr id="111" name="Ink 110">
@@ -16363,7 +16449,7 @@
             </p14:xfrm>
           </p:contentPart>
         </mc:Choice>
-        <mc:Fallback>
+        <mc:Fallback xmlns="">
           <p:pic>
             <p:nvPicPr>
               <p:cNvPr id="111" name="Ink 110">
@@ -16414,8 +16500,8 @@
             <a:chExt cx="503640" cy="578520"/>
           </a:xfrm>
         </p:grpSpPr>
-        <mc:AlternateContent xmlns:mc="http://schemas.openxmlformats.org/markup-compatibility/2006">
-          <mc:Choice xmlns:p14="http://schemas.microsoft.com/office/powerpoint/2010/main" Requires="p14">
+        <mc:AlternateContent xmlns:mc="http://schemas.openxmlformats.org/markup-compatibility/2006" xmlns:p14="http://schemas.microsoft.com/office/powerpoint/2010/main">
+          <mc:Choice Requires="p14">
             <p:contentPart p14:bwMode="auto" r:id="rId142">
               <p14:nvContentPartPr>
                 <p14:cNvPr id="6" name="Ink 5">
@@ -16434,7 +16520,7 @@
               </p14:xfrm>
             </p:contentPart>
           </mc:Choice>
-          <mc:Fallback>
+          <mc:Fallback xmlns="">
             <p:pic>
               <p:nvPicPr>
                 <p:cNvPr id="6" name="Ink 5">
@@ -16465,8 +16551,8 @@
             </p:pic>
           </mc:Fallback>
         </mc:AlternateContent>
-        <mc:AlternateContent xmlns:mc="http://schemas.openxmlformats.org/markup-compatibility/2006">
-          <mc:Choice xmlns:p14="http://schemas.microsoft.com/office/powerpoint/2010/main" Requires="p14">
+        <mc:AlternateContent xmlns:mc="http://schemas.openxmlformats.org/markup-compatibility/2006" xmlns:p14="http://schemas.microsoft.com/office/powerpoint/2010/main">
+          <mc:Choice Requires="p14">
             <p:contentPart p14:bwMode="auto" r:id="rId144">
               <p14:nvContentPartPr>
                 <p14:cNvPr id="7" name="Ink 6">
@@ -16485,7 +16571,7 @@
               </p14:xfrm>
             </p:contentPart>
           </mc:Choice>
-          <mc:Fallback>
+          <mc:Fallback xmlns="">
             <p:pic>
               <p:nvPicPr>
                 <p:cNvPr id="7" name="Ink 6">
@@ -16516,8 +16602,8 @@
             </p:pic>
           </mc:Fallback>
         </mc:AlternateContent>
-        <mc:AlternateContent xmlns:mc="http://schemas.openxmlformats.org/markup-compatibility/2006">
-          <mc:Choice xmlns:p14="http://schemas.microsoft.com/office/powerpoint/2010/main" Requires="p14">
+        <mc:AlternateContent xmlns:mc="http://schemas.openxmlformats.org/markup-compatibility/2006" xmlns:p14="http://schemas.microsoft.com/office/powerpoint/2010/main">
+          <mc:Choice Requires="p14">
             <p:contentPart p14:bwMode="auto" r:id="rId146">
               <p14:nvContentPartPr>
                 <p14:cNvPr id="113" name="Ink 112">
@@ -16536,7 +16622,7 @@
               </p14:xfrm>
             </p:contentPart>
           </mc:Choice>
-          <mc:Fallback>
+          <mc:Fallback xmlns="">
             <p:pic>
               <p:nvPicPr>
                 <p:cNvPr id="113" name="Ink 112">

</xml_diff>

<commit_message>
theory gradient closed #202
</commit_message>
<xml_diff>
--- a/images/theory/src/illustrations.pptx
+++ b/images/theory/src/illustrations.pptx
@@ -7,7 +7,8 @@
   <p:sldIdLst>
     <p:sldId id="256" r:id="rId2"/>
     <p:sldId id="257" r:id="rId3"/>
-    <p:sldId id="258" r:id="rId4"/>
+    <p:sldId id="259" r:id="rId4"/>
+    <p:sldId id="258" r:id="rId5"/>
   </p:sldIdLst>
   <p:sldSz cx="12192000" cy="6858000"/>
   <p:notesSz cx="6858000" cy="9144000"/>
@@ -185,6 +186,195 @@
           <inkml:channelProperty channel="F" name="resolution" value="0" units="1/dev"/>
         </inkml:channelProperties>
       </inkml:inkSource>
+      <inkml:timestamp xml:id="ts0" timeString="2022-09-11T15:12:44.180"/>
+    </inkml:context>
+    <inkml:brush xml:id="br0">
+      <inkml:brushProperty name="width" value="0.1" units="cm"/>
+      <inkml:brushProperty name="height" value="0.1" units="cm"/>
+    </inkml:brush>
+  </inkml:definitions>
+  <inkml:trace contextRef="#ctx0" brushRef="#br0">0 1223 24575,'0'-13'0,"0"-7"0,0-1 0,0-9 0,0 4 0,0-2 0,0 2 0,0 0 0,0 0 0,0 7 0,4-5 0,-3 3 0,26-40 0,-13 18 0,12-12 0,1-1 0,-4 4 0,16-36 0,-25 56 0,2-3 0,-5 15 0,1-9 0,-1 7 0,0-4 0,-3 7 0,3-9 0,-3 14 0,-1-13 0,-1 19 0,-2-11 0,3 0 0,0-4 0,0 2 0,7 1 0,-9 7 0,7-6 0,-8 12 0,2-2 0,1-1 0,6-14 0,-8 6 0,8-8 0,-12 15 0,4 5 0,-1 3 0,-1 0 0,0-1 0,0 1 0,-3-3 0,3 2 0,0-3 0,-2 1 0,2-1 0,0 1 0,-2-1 0,2 0 0,0 4 0,-3-3 0,3 2 0,-3 1 0,0 0 0</inkml:trace>
+</inkml:ink>
+</file>
+
+<file path=ppt/ink/ink101.xml><?xml version="1.0" encoding="utf-8"?>
+<inkml:ink xmlns:inkml="http://www.w3.org/2003/InkML">
+  <inkml:definitions>
+    <inkml:context xml:id="ctx0">
+      <inkml:inkSource xml:id="inkSrc0">
+        <inkml:traceFormat>
+          <inkml:channel name="X" type="integer" min="-2.14748E9" max="2.14748E9" units="cm"/>
+          <inkml:channel name="Y" type="integer" min="-2.14748E9" max="2.14748E9" units="cm"/>
+          <inkml:channel name="F" type="integer" max="32767" units="dev"/>
+        </inkml:traceFormat>
+        <inkml:channelProperties>
+          <inkml:channelProperty channel="X" name="resolution" value="1000" units="1/cm"/>
+          <inkml:channelProperty channel="Y" name="resolution" value="1000" units="1/cm"/>
+          <inkml:channelProperty channel="F" name="resolution" value="0" units="1/dev"/>
+        </inkml:channelProperties>
+      </inkml:inkSource>
+      <inkml:timestamp xml:id="ts0" timeString="2022-09-11T15:12:55.167"/>
+    </inkml:context>
+    <inkml:brush xml:id="br0">
+      <inkml:brushProperty name="width" value="0.1" units="cm"/>
+      <inkml:brushProperty name="height" value="0.1" units="cm"/>
+    </inkml:brush>
+  </inkml:definitions>
+  <inkml:trace contextRef="#ctx0" brushRef="#br0">0 1 24575,'7'13'0,"0"1"0,4 1 0,-3-1 0,6 1 0,-6 0 0,10 14 0,-6-10 0,4 14 0,-5-13 0,4 16 0,-5-13 0,22 49 0,-16-43 0,25 55 0,-22-55 0,15 44 0,-16-42 0,2 19 0,-8-26 0,-4 0 0,3-4 0,-3-1 0,6-4 0,4 13 0,-2-4 0,2 2 0,-7-6 0,-1-2 0,-2-2 0,3 5 0,-4-10 0,0 10 0,0-12 0,3 18 0,-5-18 0,8 17 0,-9-16 0,7 10 0,-8-13 0,4 13 0,-3-11 0,0 7 0,1-6 0,-1-3 0,2 2 0,1 8 0,0-8 0,-3 11 0,2-13 0,-5 6 0,2-6 0,-3 2 0,0-3 0,0 0 0,0 0 0,0 1 0,0-1 0,0 0 0,0 0 0,0 0 0,0 0 0,0 0 0,0 0 0,0 1 0,0-1 0,0-3 0,0 0 0</inkml:trace>
+</inkml:ink>
+</file>
+
+<file path=ppt/ink/ink102.xml><?xml version="1.0" encoding="utf-8"?>
+<inkml:ink xmlns:inkml="http://www.w3.org/2003/InkML">
+  <inkml:definitions>
+    <inkml:context xml:id="ctx0">
+      <inkml:inkSource xml:id="inkSrc0">
+        <inkml:traceFormat>
+          <inkml:channel name="X" type="integer" min="-2.14748E9" max="2.14748E9" units="cm"/>
+          <inkml:channel name="Y" type="integer" min="-2.14748E9" max="2.14748E9" units="cm"/>
+          <inkml:channel name="F" type="integer" max="32767" units="dev"/>
+        </inkml:traceFormat>
+        <inkml:channelProperties>
+          <inkml:channelProperty channel="X" name="resolution" value="1000" units="1/cm"/>
+          <inkml:channelProperty channel="Y" name="resolution" value="1000" units="1/cm"/>
+          <inkml:channelProperty channel="F" name="resolution" value="0" units="1/dev"/>
+        </inkml:channelProperties>
+      </inkml:inkSource>
+      <inkml:timestamp xml:id="ts0" timeString="2022-09-11T15:12:57.092"/>
+    </inkml:context>
+    <inkml:brush xml:id="br0">
+      <inkml:brushProperty name="width" value="0.1" units="cm"/>
+      <inkml:brushProperty name="height" value="0.1" units="cm"/>
+    </inkml:brush>
+  </inkml:definitions>
+  <inkml:trace contextRef="#ctx0" brushRef="#br0">1 0 24575,'13'0'0,"8"17"0,-1-5 0,4 17 0,-1-12 0,-6 7 0,11-7 0,18 31 0,-5-19 0,10 20 0,-19-16 0,5 1 0,-1 6 0,-2-10 0,-11 0 0,-3-8 0,-6-1 0,18 7 0,-15-7 0,26 15 0,-27-17 0,28 18 0,-33-27 0,26 20 0,-27-21 0,15 8 0,-19-10 0,5-4 0,-10 3 0,4-5 0,-1 5 0,9 0 0,-5-1 0,10 7 0,-10-8 0,4 2 0,-6-3 0,-2 0 0,1-2 0,-4 4 0,5-4 0,-5 5 0,4-6 0,-1 6 0,2-5 0,1 2 0,-4 0 0,3-3 0,-2 6 0,2-5 0,-2 5 0,2-5 0,-3 2 0,4-1 0,-1-1 0,1 5 0,-1-5 0,1 4 0,-3-4 0,-1 2 0</inkml:trace>
+</inkml:ink>
+</file>
+
+<file path=ppt/ink/ink103.xml><?xml version="1.0" encoding="utf-8"?>
+<inkml:ink xmlns:inkml="http://www.w3.org/2003/InkML">
+  <inkml:definitions>
+    <inkml:context xml:id="ctx0">
+      <inkml:inkSource xml:id="inkSrc0">
+        <inkml:traceFormat>
+          <inkml:channel name="X" type="integer" min="-2.14748E9" max="2.14748E9" units="cm"/>
+          <inkml:channel name="Y" type="integer" min="-2.14748E9" max="2.14748E9" units="cm"/>
+          <inkml:channel name="F" type="integer" max="32767" units="dev"/>
+        </inkml:traceFormat>
+        <inkml:channelProperties>
+          <inkml:channelProperty channel="X" name="resolution" value="1000" units="1/cm"/>
+          <inkml:channelProperty channel="Y" name="resolution" value="1000" units="1/cm"/>
+          <inkml:channelProperty channel="F" name="resolution" value="0" units="1/dev"/>
+        </inkml:channelProperties>
+      </inkml:inkSource>
+      <inkml:timestamp xml:id="ts0" timeString="2022-09-11T15:12:59.102"/>
+    </inkml:context>
+    <inkml:brush xml:id="br0">
+      <inkml:brushProperty name="width" value="0.1" units="cm"/>
+      <inkml:brushProperty name="height" value="0.1" units="cm"/>
+    </inkml:brush>
+  </inkml:definitions>
+  <inkml:trace contextRef="#ctx0" brushRef="#br0">0 0 24575,'15'4'0,"5"4"0,3 11 0,3-2 0,5 11 0,0-6 0,3 11 0,-7-9 0,5 7 0,-16-12 0,3 2 0,0-3 0,15 12 0,-7-7 0,6 7 0,-10-10 0,-8-9 0,4 4 0,-8-8 0,3 4 0,4 3 0,-2-6 0,16 10 0,-15-10 0,22 13 0,-25-12 0,13 8 0,-20-10 0,9 3 0,-8-6 0,5 5 0,-7-5 0,4 2 0,-3 1 0,6 3 0,-2-3 0,2 6 0,2-8 0,4 10 0,-2-10 0,3 8 0,-9-6 0,12 7 0,-9-6 0,6 6 0,-6-7 0,3 3 0,-1-2 0,7 2 0,-11-6 0,3 2 0,-7-6 0,4 6 0,-5-5 0,3 5 0,-1-3 0,-2 4 0,2-1 0,-2 0 0,-1 1 0,-2-4 0,-2 0 0</inkml:trace>
+</inkml:ink>
+</file>
+
+<file path=ppt/ink/ink104.xml><?xml version="1.0" encoding="utf-8"?>
+<inkml:ink xmlns:inkml="http://www.w3.org/2003/InkML">
+  <inkml:definitions>
+    <inkml:context xml:id="ctx0">
+      <inkml:inkSource xml:id="inkSrc0">
+        <inkml:traceFormat>
+          <inkml:channel name="X" type="integer" min="-2.14748E9" max="2.14748E9" units="cm"/>
+          <inkml:channel name="Y" type="integer" min="-2.14748E9" max="2.14748E9" units="cm"/>
+          <inkml:channel name="F" type="integer" max="32767" units="dev"/>
+        </inkml:traceFormat>
+        <inkml:channelProperties>
+          <inkml:channelProperty channel="X" name="resolution" value="1000" units="1/cm"/>
+          <inkml:channelProperty channel="Y" name="resolution" value="1000" units="1/cm"/>
+          <inkml:channelProperty channel="F" name="resolution" value="0" units="1/dev"/>
+        </inkml:channelProperties>
+      </inkml:inkSource>
+      <inkml:timestamp xml:id="ts0" timeString="2022-09-11T15:13:01.490"/>
+    </inkml:context>
+    <inkml:brush xml:id="br0">
+      <inkml:brushProperty name="width" value="0.1" units="cm"/>
+      <inkml:brushProperty name="height" value="0.1" units="cm"/>
+    </inkml:brush>
+  </inkml:definitions>
+  <inkml:trace contextRef="#ctx0" brushRef="#br0">0 1 24575,'28'0'0,"-7"0"0,43 9 0,-36-3 0,35 13 0,-36-6 0,46 23 0,-38-15 0,32 10 0,-43-17 0,3-2 0,-2-4 0,-6 5 0,0-8 0,-1 2 0,-4-1 0,0 1 0,-6 1 0,7 1 0,-10-2 0,8-4 0,-7 3 0,7-2 0,-5 3 0,10-1 0,-10-2 0,21 5 0,-15-7 0,26 10 0,-26-10 0,16 8 0,-22-7 0,12 4 0,-12-3 0,5 2 0,-6-5 0,6 7 0,-5-3 0,14 4 0,-13-2 0,13 0 0,-11-1 0,2 1 0,-4-3 0,1 1 0,-3-4 0,-1 5 0,0-6 0,-2 3 0,2-3 0,-2 3 0,1-2 0,-1 2 0,0 0 0,1-3 0,-1 3 0,2 0 0,0-2 0,-2 4 0,1-4 0,-1 2 0,2-3 0,1 3 0,0-3 0,-1 6 0,0-5 0,-2 1 0,-1-2 0</inkml:trace>
+</inkml:ink>
+</file>
+
+<file path=ppt/ink/ink105.xml><?xml version="1.0" encoding="utf-8"?>
+<inkml:ink xmlns:inkml="http://www.w3.org/2003/InkML">
+  <inkml:definitions>
+    <inkml:context xml:id="ctx0">
+      <inkml:inkSource xml:id="inkSrc0">
+        <inkml:traceFormat>
+          <inkml:channel name="X" type="integer" min="-2.14748E9" max="2.14748E9" units="cm"/>
+          <inkml:channel name="Y" type="integer" min="-2.14748E9" max="2.14748E9" units="cm"/>
+          <inkml:channel name="F" type="integer" max="32767" units="dev"/>
+        </inkml:traceFormat>
+        <inkml:channelProperties>
+          <inkml:channelProperty channel="X" name="resolution" value="1000" units="1/cm"/>
+          <inkml:channelProperty channel="Y" name="resolution" value="1000" units="1/cm"/>
+          <inkml:channelProperty channel="F" name="resolution" value="0" units="1/dev"/>
+        </inkml:channelProperties>
+      </inkml:inkSource>
+      <inkml:timestamp xml:id="ts0" timeString="2022-09-11T15:13:03.714"/>
+    </inkml:context>
+    <inkml:brush xml:id="br0">
+      <inkml:brushProperty name="width" value="0.1" units="cm"/>
+      <inkml:brushProperty name="height" value="0.1" units="cm"/>
+    </inkml:brush>
+  </inkml:definitions>
+  <inkml:trace contextRef="#ctx0" brushRef="#br0">1 0 24575,'18'0'0,"-1"0"0,2 0 0,-3 4 0,3-3 0,0 5 0,13 5 0,-4-5 0,22 11 0,-20-12 0,3 6 0,-12-7 0,4 3 0,-8-3 0,13 3 0,-18 0 0,14-1 0,-17-2 0,19 2 0,-18-5 0,9 5 0,-15-3 0,4 1 0,-3 2 0,4-6 0,-2 3 0,-1 0 0,1-2 0,-1 5 0,5-2 0,0 3 0,3 0 0,1-3 0,0 3 0,-1-3 0,1 0 0,0 2 0,-1-2 0,1 4 0,-4-4 0,3 2 0,-7-5 0,4 5 0,-5-5 0,1 2 0,-1 0 0,0-3 0,1 3 0,-1-3 0,1 3 0,0 1 0,-1 0 0,1 1 0,-1-4 0,1 2 0,0 0 0,-1-2 0,0 1 0,1-2 0,-1 0 0,4 4 0,-2-1 0,2 4 0,-3-3 0,-1-1 0,-2 0 0,-1-3 0,-3 3 0</inkml:trace>
+</inkml:ink>
+</file>
+
+<file path=ppt/ink/ink106.xml><?xml version="1.0" encoding="utf-8"?>
+<inkml:ink xmlns:inkml="http://www.w3.org/2003/InkML">
+  <inkml:definitions>
+    <inkml:context xml:id="ctx0">
+      <inkml:inkSource xml:id="inkSrc0">
+        <inkml:traceFormat>
+          <inkml:channel name="X" type="integer" min="-2.14748E9" max="2.14748E9" units="cm"/>
+          <inkml:channel name="Y" type="integer" min="-2.14748E9" max="2.14748E9" units="cm"/>
+          <inkml:channel name="F" type="integer" max="32767" units="dev"/>
+        </inkml:traceFormat>
+        <inkml:channelProperties>
+          <inkml:channelProperty channel="X" name="resolution" value="1000" units="1/cm"/>
+          <inkml:channelProperty channel="Y" name="resolution" value="1000" units="1/cm"/>
+          <inkml:channelProperty channel="F" name="resolution" value="0" units="1/dev"/>
+        </inkml:channelProperties>
+      </inkml:inkSource>
+      <inkml:timestamp xml:id="ts0" timeString="2022-09-11T15:13:05.681"/>
+    </inkml:context>
+    <inkml:brush xml:id="br0">
+      <inkml:brushProperty name="width" value="0.1" units="cm"/>
+      <inkml:brushProperty name="height" value="0.1" units="cm"/>
+    </inkml:brush>
+  </inkml:definitions>
+  <inkml:trace contextRef="#ctx0" brushRef="#br0">1 0 24575,'9'0'0,"13"0"0,-2 0 0,5 0 0,-4 0 0,-2 0 0,18 11 0,-13-5 0,23 12 0,-25-6 0,11 4 0,-2-1 0,-11-4 0,5 0 0,-10-7 0,1 3 0,2-3 0,-3 0 0,0 2 0,4-5 0,-4 6 0,4-3 0,-4 0 0,-1 2 0,1-5 0,-4 5 0,3-5 0,-3 2 0,0-3 0,3 0 0,-3 0 0,4 0 0,-1 0 0,1 0 0,4 3 0,-3-2 0,7 3 0,-8-4 0,15 0 0,-13 0 0,9 0 0,-15 0 0,-1 0 0,-3 0 0,-1 0 0,1 0 0,-1 0 0,1 0 0,-1 0 0,1 0 0,-1 0 0,1 0 0,3 0 0,-3 0 0,4 0 0,-5 0 0,1 3 0,0-2 0,-1 2 0,0-3 0,1 0 0,-1 0 0,1 0 0,-1 0 0,1 2 0,3-1 0,-2 2 0,2-3 0,-4 3 0,1-2 0,0 2 0,-1-3 0,1 0 0,-1 3 0,1-3 0,0 3 0,-1-3 0,1 3 0,0-2 0,-1 2 0,-2-3 0,-2 0 0</inkml:trace>
+</inkml:ink>
+</file>
+
+<file path=ppt/ink/ink107.xml><?xml version="1.0" encoding="utf-8"?>
+<inkml:ink xmlns:inkml="http://www.w3.org/2003/InkML">
+  <inkml:definitions>
+    <inkml:context xml:id="ctx0">
+      <inkml:inkSource xml:id="inkSrc0">
+        <inkml:traceFormat>
+          <inkml:channel name="X" type="integer" min="-2.14748E9" max="2.14748E9" units="cm"/>
+          <inkml:channel name="Y" type="integer" min="-2.14748E9" max="2.14748E9" units="cm"/>
+          <inkml:channel name="F" type="integer" max="32767" units="dev"/>
+        </inkml:traceFormat>
+        <inkml:channelProperties>
+          <inkml:channelProperty channel="X" name="resolution" value="1000" units="1/cm"/>
+          <inkml:channelProperty channel="Y" name="resolution" value="1000" units="1/cm"/>
+          <inkml:channelProperty channel="F" name="resolution" value="0" units="1/dev"/>
+        </inkml:channelProperties>
+      </inkml:inkSource>
       <inkml:timestamp xml:id="ts0" timeString="2022-09-11T15:13:07.351"/>
     </inkml:context>
     <inkml:brush xml:id="br0">
@@ -196,7 +386,7 @@
 </inkml:ink>
 </file>
 
-<file path=ppt/ink/ink101.xml><?xml version="1.0" encoding="utf-8"?>
+<file path=ppt/ink/ink108.xml><?xml version="1.0" encoding="utf-8"?>
 <inkml:ink xmlns:inkml="http://www.w3.org/2003/InkML">
   <inkml:definitions>
     <inkml:context xml:id="ctx0">
@@ -223,7 +413,7 @@
 </inkml:ink>
 </file>
 
-<file path=ppt/ink/ink102.xml><?xml version="1.0" encoding="utf-8"?>
+<file path=ppt/ink/ink109.xml><?xml version="1.0" encoding="utf-8"?>
 <inkml:ink xmlns:inkml="http://www.w3.org/2003/InkML">
   <inkml:definitions>
     <inkml:context xml:id="ctx0">
@@ -247,198 +437,6 @@
     </inkml:brush>
   </inkml:definitions>
   <inkml:trace contextRef="#ctx0" brushRef="#br0">0 167 24575,'25'0'0,"4"0"0,-4 0 0,9 0 0,-4 0 0,0 0 0,19 0 0,17 0 0,-3 0 0,23-9 0,-46 6 0,39-15 0,-47 9 0,60-9 0,-54 1 0,26 7 0,-38-5 0,-1 14 0,-9-6 0,9 4 0,-13 2 0,4-1 0,-9 2 0,2-3 0,-2 2 0,3-2 0,-1 0 0,2 2 0,0-5 0,9 2 0,-7 1 0,7-4 0,-9 7 0,-1-3 0,-4 3 0,0 0 0,1 0 0,12-3 0,-9-1 0,16 0 0,-17 1 0,7 3 0,-9 0 0,2-2 0,-5 1 0,-2-2 0</inkml:trace>
-</inkml:ink>
-</file>
-
-<file path=ppt/ink/ink103.xml><?xml version="1.0" encoding="utf-8"?>
-<inkml:ink xmlns:inkml="http://www.w3.org/2003/InkML">
-  <inkml:definitions>
-    <inkml:context xml:id="ctx0">
-      <inkml:inkSource xml:id="inkSrc0">
-        <inkml:traceFormat>
-          <inkml:channel name="X" type="integer" min="-2.14748E9" max="2.14748E9" units="cm"/>
-          <inkml:channel name="Y" type="integer" min="-2.14748E9" max="2.14748E9" units="cm"/>
-          <inkml:channel name="F" type="integer" max="32767" units="dev"/>
-        </inkml:traceFormat>
-        <inkml:channelProperties>
-          <inkml:channelProperty channel="X" name="resolution" value="1000" units="1/cm"/>
-          <inkml:channelProperty channel="Y" name="resolution" value="1000" units="1/cm"/>
-          <inkml:channelProperty channel="F" name="resolution" value="0" units="1/dev"/>
-        </inkml:channelProperties>
-      </inkml:inkSource>
-      <inkml:timestamp xml:id="ts0" timeString="2022-09-11T15:13:13.661"/>
-    </inkml:context>
-    <inkml:brush xml:id="br0">
-      <inkml:brushProperty name="width" value="0.1" units="cm"/>
-      <inkml:brushProperty name="height" value="0.1" units="cm"/>
-    </inkml:brush>
-  </inkml:definitions>
-  <inkml:trace contextRef="#ctx0" brushRef="#br0">0 384 24575,'39'-13'0,"-17"1"0,28-3 0,-21-5 0,17 8 0,-8-9 0,2 11 0,12-14 0,-17 17 0,13-11 0,-27 11 0,0 2 0,-7-2 0,13 4 0,-12 2 0,24-9 0,-25 5 0,18-6 0,-16 4 0,9-4 0,-13 7 0,4-3 0,-9 7 0,2-2 0,2-2 0,-1 0 0,0-2 0,-1 0 0,-1 1 0,4-4 0,-5 9 0,6-6 0,-6 5 0,12-8 0,-7 5 0,12-7 0,-8 4 0,24-8 0,-20 6 0,13-2 0,-19 4 0,-1 3 0,-1 0 0,10-4 0,-10 3 0,8-2 0,-9 1 0,4 5 0,-7-2 0,5 3 0,-7 0 0,0 0 0,1 0 0,-4 0 0,0 0 0</inkml:trace>
-</inkml:ink>
-</file>
-
-<file path=ppt/ink/ink104.xml><?xml version="1.0" encoding="utf-8"?>
-<inkml:ink xmlns:inkml="http://www.w3.org/2003/InkML">
-  <inkml:definitions>
-    <inkml:context xml:id="ctx0">
-      <inkml:inkSource xml:id="inkSrc0">
-        <inkml:traceFormat>
-          <inkml:channel name="X" type="integer" min="-2.14748E9" max="2.14748E9" units="cm"/>
-          <inkml:channel name="Y" type="integer" min="-2.14748E9" max="2.14748E9" units="cm"/>
-          <inkml:channel name="F" type="integer" max="32767" units="dev"/>
-        </inkml:traceFormat>
-        <inkml:channelProperties>
-          <inkml:channelProperty channel="X" name="resolution" value="1000" units="1/cm"/>
-          <inkml:channelProperty channel="Y" name="resolution" value="1000" units="1/cm"/>
-          <inkml:channelProperty channel="F" name="resolution" value="0" units="1/dev"/>
-        </inkml:channelProperties>
-      </inkml:inkSource>
-      <inkml:timestamp xml:id="ts0" timeString="2022-09-11T15:13:15.582"/>
-    </inkml:context>
-    <inkml:brush xml:id="br0">
-      <inkml:brushProperty name="width" value="0.1" units="cm"/>
-      <inkml:brushProperty name="height" value="0.1" units="cm"/>
-    </inkml:brush>
-  </inkml:definitions>
-  <inkml:trace contextRef="#ctx0" brushRef="#br0">0 605 24575,'22'-8'0,"-6"3"0,17-12 0,-6-5 0,20 1 0,13-18 0,-2 16 0,11-8 0,16-5 0,-22 12 0,3-1 0,-2-1 0,-15 9 0,4-4 0,-3 2 0,-25 9 0,29-16 0,-36 17 0,23-8 0,-23 9 0,23-6 0,-23 6 0,15-5 0,-20 8 0,3-4 0,-9 8 0,-1-5 0,1 3 0,6-4 0,-2 0 0,13-3 0,-11 2 0,14-2 0,-18 3 0,35-7 0,-27 5 0,22-5 0,-25 7 0,1-1 0,-4 4 0,9-5 0,-11 4 0,7-2 0,-10 4 0,0 3 0,-2-3 0,2 3 0,-3-6 0,4 5 0,-4-2 0,0 3 0</inkml:trace>
-</inkml:ink>
-</file>
-
-<file path=ppt/ink/ink105.xml><?xml version="1.0" encoding="utf-8"?>
-<inkml:ink xmlns:inkml="http://www.w3.org/2003/InkML">
-  <inkml:definitions>
-    <inkml:context xml:id="ctx0">
-      <inkml:inkSource xml:id="inkSrc0">
-        <inkml:traceFormat>
-          <inkml:channel name="X" type="integer" min="-2.14748E9" max="2.14748E9" units="cm"/>
-          <inkml:channel name="Y" type="integer" min="-2.14748E9" max="2.14748E9" units="cm"/>
-          <inkml:channel name="F" type="integer" max="32767" units="dev"/>
-        </inkml:traceFormat>
-        <inkml:channelProperties>
-          <inkml:channelProperty channel="X" name="resolution" value="1000" units="1/cm"/>
-          <inkml:channelProperty channel="Y" name="resolution" value="1000" units="1/cm"/>
-          <inkml:channelProperty channel="F" name="resolution" value="0" units="1/dev"/>
-        </inkml:channelProperties>
-      </inkml:inkSource>
-      <inkml:timestamp xml:id="ts0" timeString="2022-09-11T15:13:18.246"/>
-    </inkml:context>
-    <inkml:brush xml:id="br0">
-      <inkml:brushProperty name="width" value="0.1" units="cm"/>
-      <inkml:brushProperty name="height" value="0.1" units="cm"/>
-    </inkml:brush>
-  </inkml:definitions>
-  <inkml:trace contextRef="#ctx0" brushRef="#br0">1 995 24575,'14'-21'0,"-1"4"0,3-2 0,3-1 0,2-1 0,12-12 0,-10 7 0,19-14 0,-17 13 0,12-6 0,-6 5 0,-3 2 0,8-2 0,-8 1 0,-1 1 0,-3 5 0,-8 1 0,3 5 0,-8 4 0,-1 1 0,1 3 0,-4 0 0,7 0 0,-3-3 0,3-2 0,1 1 0,0-3 0,-1 3 0,-2-4 0,2 4 0,-3 0 0,1 1 0,1 1 0,-5-1 0,2 3 0,1 0 0,-4-3 0,7-1 0,2-5 0,0 1 0,7 0 0,-2-5 0,9-4 0,-7 5 0,2-2 0,-14 17 0,0-6 0,-5 6 0,1 1 0,-1-3 0,1 2 0,-1-2 0,5-4 0,-4 2 0,3-2 0,0 3 0,-2 0 0,2 0 0,-3 4 0,-4-3 0,3 5 0,-5-4 0,5 4 0,-2-5 0,2 2 0,1-2 0,-1-1 0,1 1 0,0-1 0,-1 3 0,-3-1 0,3 4 0,-5-5 0,5 6 0,-3-3 0,1 0 0,1 2 0,-1-4 0,2 1 0,1-2 0,-1-1 0,1 3 0,-1-2 0,1 6 0,-4-6 0,3 5 0,-3-2 0,4 1 0,-1 1 0,1-5 0,-4 5 0,0-1 0</inkml:trace>
-</inkml:ink>
-</file>
-
-<file path=ppt/ink/ink106.xml><?xml version="1.0" encoding="utf-8"?>
-<inkml:ink xmlns:inkml="http://www.w3.org/2003/InkML">
-  <inkml:definitions>
-    <inkml:context xml:id="ctx0">
-      <inkml:inkSource xml:id="inkSrc0">
-        <inkml:traceFormat>
-          <inkml:channel name="X" type="integer" min="-2.14748E9" max="2.14748E9" units="cm"/>
-          <inkml:channel name="Y" type="integer" min="-2.14748E9" max="2.14748E9" units="cm"/>
-          <inkml:channel name="F" type="integer" max="32767" units="dev"/>
-        </inkml:traceFormat>
-        <inkml:channelProperties>
-          <inkml:channelProperty channel="X" name="resolution" value="1000" units="1/cm"/>
-          <inkml:channelProperty channel="Y" name="resolution" value="1000" units="1/cm"/>
-          <inkml:channelProperty channel="F" name="resolution" value="0" units="1/dev"/>
-        </inkml:channelProperties>
-      </inkml:inkSource>
-      <inkml:timestamp xml:id="ts0" timeString="2022-09-11T15:13:20.333"/>
-    </inkml:context>
-    <inkml:brush xml:id="br0">
-      <inkml:brushProperty name="width" value="0.1" units="cm"/>
-      <inkml:brushProperty name="height" value="0.1" units="cm"/>
-    </inkml:brush>
-  </inkml:definitions>
-  <inkml:trace contextRef="#ctx0" brushRef="#br0">1 1158 24575,'18'0'0,"-1"-4"0,2-4 0,1-4 0,0-3 0,3-1 0,-7-3 0,31-41 0,-19 20 0,2-4 0,-1 2 0,-5 10 0,19-23 0,-24 37 0,22-26 0,-26 25 0,17-17 0,-19 16 0,26-23 0,-19 14 0,14-9 0,-22 15 0,13-10 0,-14 10 0,31-37 0,-26 34 0,23-31 0,-26 39 0,10-15 0,-15 24 0,12-24 0,-11 19 0,25-42 0,-21 34 0,21-30 0,-25 35 0,4-6 0,-9 12 0,2 2 0,-5 2 0,2 1 0,-1 3 0,-1-3 0,2 2 0,0 1 0,-3-3 0,6 3 0,-5-1 0,1 1 0</inkml:trace>
-</inkml:ink>
-</file>
-
-<file path=ppt/ink/ink107.xml><?xml version="1.0" encoding="utf-8"?>
-<inkml:ink xmlns:inkml="http://www.w3.org/2003/InkML">
-  <inkml:definitions>
-    <inkml:context xml:id="ctx0">
-      <inkml:inkSource xml:id="inkSrc0">
-        <inkml:traceFormat>
-          <inkml:channel name="X" type="integer" min="-2.14748E9" max="2.14748E9" units="cm"/>
-          <inkml:channel name="Y" type="integer" min="-2.14748E9" max="2.14748E9" units="cm"/>
-          <inkml:channel name="F" type="integer" max="32767" units="dev"/>
-        </inkml:traceFormat>
-        <inkml:channelProperties>
-          <inkml:channelProperty channel="X" name="resolution" value="1000" units="1/cm"/>
-          <inkml:channelProperty channel="Y" name="resolution" value="1000" units="1/cm"/>
-          <inkml:channelProperty channel="F" name="resolution" value="0" units="1/dev"/>
-        </inkml:channelProperties>
-      </inkml:inkSource>
-      <inkml:timestamp xml:id="ts0" timeString="2022-09-11T15:13:22.363"/>
-    </inkml:context>
-    <inkml:brush xml:id="br0">
-      <inkml:brushProperty name="width" value="0.1" units="cm"/>
-      <inkml:brushProperty name="height" value="0.1" units="cm"/>
-    </inkml:brush>
-  </inkml:definitions>
-  <inkml:trace contextRef="#ctx0" brushRef="#br0">1 1302 24575,'0'-14'0,"0"-24"0,12 2 0,-5-16 0,14 16 0,0-14 0,-2 16 0,10-24 0,-6 20 0,6-10 0,2 0 0,-6 4 0,5-3 0,2-5 0,-7 16 0,9-27 0,-21 39 0,17-43 0,-15 36 0,10-26 0,-9 22 0,9-21 0,-10 24 0,11-15 0,-22 35 0,2 0 0,-3 5 0,-2-2 0,2 2 0,0-6 0,-3 6 0,3-3 0,-3 4 0,0-1 0,0 1 0,0 0 0,0-1 0,3 1 0,-2-1 0,5-8 0,-5 6 0,2-6 0,-1 9 0,-1-1 0,2 1 0,0-4 0,0 6 0,1-8 0,2 10 0,-5-6 0,1 4 0,1-2 0,-2 0 0,5-1 0,-3 1 0,4-1 0,-4 4 0,0 0 0</inkml:trace>
-</inkml:ink>
-</file>
-
-<file path=ppt/ink/ink108.xml><?xml version="1.0" encoding="utf-8"?>
-<inkml:ink xmlns:inkml="http://www.w3.org/2003/InkML">
-  <inkml:definitions>
-    <inkml:context xml:id="ctx0">
-      <inkml:inkSource xml:id="inkSrc0">
-        <inkml:traceFormat>
-          <inkml:channel name="X" type="integer" min="-2.14748E9" max="2.14748E9" units="cm"/>
-          <inkml:channel name="Y" type="integer" min="-2.14748E9" max="2.14748E9" units="cm"/>
-          <inkml:channel name="F" type="integer" max="32767" units="dev"/>
-        </inkml:traceFormat>
-        <inkml:channelProperties>
-          <inkml:channelProperty channel="X" name="resolution" value="1000" units="1/cm"/>
-          <inkml:channelProperty channel="Y" name="resolution" value="1000" units="1/cm"/>
-          <inkml:channelProperty channel="F" name="resolution" value="0" units="1/dev"/>
-        </inkml:channelProperties>
-      </inkml:inkSource>
-      <inkml:timestamp xml:id="ts0" timeString="2022-09-11T15:13:24.066"/>
-    </inkml:context>
-    <inkml:brush xml:id="br0">
-      <inkml:brushProperty name="width" value="0.1" units="cm"/>
-      <inkml:brushProperty name="height" value="0.1" units="cm"/>
-    </inkml:brush>
-  </inkml:definitions>
-  <inkml:trace contextRef="#ctx0" brushRef="#br0">324 0 24575,'0'13'0,"0"1"0,0 1 0,0-1 0,0 5 0,-8 22 0,6-11 0,-6 15 0,0 10 0,3-12 0,-4 15 0,2-19 0,2 2 0,-12 18 0,7-3 0,-11 2 0,-2 24 0,3-36 0,3 9 0,0-2 0,2-15 0,-5 27 0,15-44 0,-2 7 0,3-12 0,-8 24 0,0-9 0,3 12 0,-1-17 0,3 0 0,2-10 0,-5 5 0,6-6 0,0 3 0,-2-7 0,5 5 0,-2-8 0,0 4 0,3-4 0,-3 4 0,3-5 0,-3 3 0,2-4 0,-2 0 0,3 0 0,0 0 0,0-2 0,0-2 0</inkml:trace>
-</inkml:ink>
-</file>
-
-<file path=ppt/ink/ink109.xml><?xml version="1.0" encoding="utf-8"?>
-<inkml:ink xmlns:inkml="http://www.w3.org/2003/InkML">
-  <inkml:definitions>
-    <inkml:context xml:id="ctx0">
-      <inkml:inkSource xml:id="inkSrc0">
-        <inkml:traceFormat>
-          <inkml:channel name="X" type="integer" min="-2.14748E9" max="2.14748E9" units="cm"/>
-          <inkml:channel name="Y" type="integer" min="-2.14748E9" max="2.14748E9" units="cm"/>
-          <inkml:channel name="F" type="integer" max="32767" units="dev"/>
-        </inkml:traceFormat>
-        <inkml:channelProperties>
-          <inkml:channelProperty channel="X" name="resolution" value="1000" units="1/cm"/>
-          <inkml:channelProperty channel="Y" name="resolution" value="1000" units="1/cm"/>
-          <inkml:channelProperty channel="F" name="resolution" value="0" units="1/dev"/>
-        </inkml:channelProperties>
-      </inkml:inkSource>
-      <inkml:timestamp xml:id="ts0" timeString="2022-09-11T15:13:34.080"/>
-    </inkml:context>
-    <inkml:brush xml:id="br0">
-      <inkml:brushProperty name="width" value="0.3" units="cm"/>
-      <inkml:brushProperty name="height" value="0.6" units="cm"/>
-      <inkml:brushProperty name="color" value="#00B44B"/>
-      <inkml:brushProperty name="tip" value="rectangle"/>
-      <inkml:brushProperty name="rasterOp" value="maskPen"/>
-    </inkml:brush>
-  </inkml:definitions>
-  <inkml:trace contextRef="#ctx0" brushRef="#br0">0 174 16383,'58'0'0,"-10"0"0,-14 0 0,-8 0 0,9 0 0,11 0 0,0-4 0,8 3 0,-11-9 0,-12 8 0,-8-5 0,-10 7 0,0-3 0,12-8 0,-4 3 0,22-9 0,-28 12 0,17-1 0,-24 3 0,5 2 0,9-7 0,-8 6 0,13-4 0,-7 3 0,-7-1 0,8 0 0,-6-5 0,13 5 0,-8-3 0,12-3 0,-20 9 0,7-6 0,-6 1 0,1 2 0,2-6 0,1 3 0,-5 3 0,4 19 0,-12-4 0,2 20 0,-6-15 0,0 7 0,0-3 0,0 4 0,0 0 0,0 0 0,-4 5 0,3-4 0,-6 4 0,-1-5 0,-1 1 0,-2-6 0,-1 5 0,1-12 0,-2 6 0,0-7 0,-12 7 0,3-5 0,-39 8 0,30-11 0,-47 12 0,42-12 0,-42 13 0,43-12 0,-37 11 0,42-15 0,-33 14 0,35-15 0,-22 15 0,28-12 0,-8 8 0,18-13 0,0 2 0,-7 3 0,9-6 0,-12 9 0,12-8 0,-1 2 0,-4 6 0,4-1 0,1 2 0,-2-1 0,8-2 0,-8 3 0,2 3 0,0-5 0,0 4 0,31-1 0,-11-3 0,22-1 0,-17-4 0,4-5 0,-3 6 0,7-7 0,-7 4 0,7-1 0,-8-2 0,4 3 0,0-4 0,-3 3 0,3-2 0,-5 5 0,1-5 0,0 6 0,2-6 0,-1 5 0,5-5 0,-5 2 0,3-3 0,-4 3 0,4-2 0,-4 2 0,4-3 0,-4 0 0,2 0 0,2 4 0,-4-3 0,1 5 0,-2-6 0,0 7 0,7-7 0,-9 4 0,7-4 0,-7 3 0,4-3 0,1 6 0,-3-5 0,2 2 0,-2 0 0,3-2 0,-2 5 0,1-5 0,0 2 0,-2 0 0,4-2 0,-4 4 0,2-4 0,0 5 0,-2-2 0,2-1 0,-1 3 0,-1-2 0,2 2 0,0 1 0,-5-1 0,7-2 0,-63-5 0,25 0 0,-49-3 0,28 4 0,5 0 0,-5 0 0,6 0 0,5 0 0,1 0 0,5 0 0,0 0 0,4 0 0,1 0 0,8 0 0,-6 3 0,3 1 0,-5-1 0,2 3 0,3-5 0,0 5 0,-3-2 0,-1 0 0,3-1 0,-1-3 0,2 3 0,-1-2 0,-2 2 0,3 0 0,-3-2 0,3 2 0,-3 0 0,3-3 0,-3 3 0,3-3 0,-2 3 0,-1-2 0,4 2 0,-4 0 0,1-2 0,2 2 0,-5-3 0,6 3 0,-3-3 0,0 3 0,-1-3 0</inkml:trace>
 </inkml:ink>
 </file>
 
@@ -485,6 +483,198 @@
           <inkml:channelProperty channel="F" name="resolution" value="0" units="1/dev"/>
         </inkml:channelProperties>
       </inkml:inkSource>
+      <inkml:timestamp xml:id="ts0" timeString="2022-09-11T15:13:13.661"/>
+    </inkml:context>
+    <inkml:brush xml:id="br0">
+      <inkml:brushProperty name="width" value="0.1" units="cm"/>
+      <inkml:brushProperty name="height" value="0.1" units="cm"/>
+    </inkml:brush>
+  </inkml:definitions>
+  <inkml:trace contextRef="#ctx0" brushRef="#br0">0 384 24575,'39'-13'0,"-17"1"0,28-3 0,-21-5 0,17 8 0,-8-9 0,2 11 0,12-14 0,-17 17 0,13-11 0,-27 11 0,0 2 0,-7-2 0,13 4 0,-12 2 0,24-9 0,-25 5 0,18-6 0,-16 4 0,9-4 0,-13 7 0,4-3 0,-9 7 0,2-2 0,2-2 0,-1 0 0,0-2 0,-1 0 0,-1 1 0,4-4 0,-5 9 0,6-6 0,-6 5 0,12-8 0,-7 5 0,12-7 0,-8 4 0,24-8 0,-20 6 0,13-2 0,-19 4 0,-1 3 0,-1 0 0,10-4 0,-10 3 0,8-2 0,-9 1 0,4 5 0,-7-2 0,5 3 0,-7 0 0,0 0 0,1 0 0,-4 0 0,0 0 0</inkml:trace>
+</inkml:ink>
+</file>
+
+<file path=ppt/ink/ink111.xml><?xml version="1.0" encoding="utf-8"?>
+<inkml:ink xmlns:inkml="http://www.w3.org/2003/InkML">
+  <inkml:definitions>
+    <inkml:context xml:id="ctx0">
+      <inkml:inkSource xml:id="inkSrc0">
+        <inkml:traceFormat>
+          <inkml:channel name="X" type="integer" min="-2.14748E9" max="2.14748E9" units="cm"/>
+          <inkml:channel name="Y" type="integer" min="-2.14748E9" max="2.14748E9" units="cm"/>
+          <inkml:channel name="F" type="integer" max="32767" units="dev"/>
+        </inkml:traceFormat>
+        <inkml:channelProperties>
+          <inkml:channelProperty channel="X" name="resolution" value="1000" units="1/cm"/>
+          <inkml:channelProperty channel="Y" name="resolution" value="1000" units="1/cm"/>
+          <inkml:channelProperty channel="F" name="resolution" value="0" units="1/dev"/>
+        </inkml:channelProperties>
+      </inkml:inkSource>
+      <inkml:timestamp xml:id="ts0" timeString="2022-09-11T15:13:15.582"/>
+    </inkml:context>
+    <inkml:brush xml:id="br0">
+      <inkml:brushProperty name="width" value="0.1" units="cm"/>
+      <inkml:brushProperty name="height" value="0.1" units="cm"/>
+    </inkml:brush>
+  </inkml:definitions>
+  <inkml:trace contextRef="#ctx0" brushRef="#br0">0 605 24575,'22'-8'0,"-6"3"0,17-12 0,-6-5 0,20 1 0,13-18 0,-2 16 0,11-8 0,16-5 0,-22 12 0,3-1 0,-2-1 0,-15 9 0,4-4 0,-3 2 0,-25 9 0,29-16 0,-36 17 0,23-8 0,-23 9 0,23-6 0,-23 6 0,15-5 0,-20 8 0,3-4 0,-9 8 0,-1-5 0,1 3 0,6-4 0,-2 0 0,13-3 0,-11 2 0,14-2 0,-18 3 0,35-7 0,-27 5 0,22-5 0,-25 7 0,1-1 0,-4 4 0,9-5 0,-11 4 0,7-2 0,-10 4 0,0 3 0,-2-3 0,2 3 0,-3-6 0,4 5 0,-4-2 0,0 3 0</inkml:trace>
+</inkml:ink>
+</file>
+
+<file path=ppt/ink/ink112.xml><?xml version="1.0" encoding="utf-8"?>
+<inkml:ink xmlns:inkml="http://www.w3.org/2003/InkML">
+  <inkml:definitions>
+    <inkml:context xml:id="ctx0">
+      <inkml:inkSource xml:id="inkSrc0">
+        <inkml:traceFormat>
+          <inkml:channel name="X" type="integer" min="-2.14748E9" max="2.14748E9" units="cm"/>
+          <inkml:channel name="Y" type="integer" min="-2.14748E9" max="2.14748E9" units="cm"/>
+          <inkml:channel name="F" type="integer" max="32767" units="dev"/>
+        </inkml:traceFormat>
+        <inkml:channelProperties>
+          <inkml:channelProperty channel="X" name="resolution" value="1000" units="1/cm"/>
+          <inkml:channelProperty channel="Y" name="resolution" value="1000" units="1/cm"/>
+          <inkml:channelProperty channel="F" name="resolution" value="0" units="1/dev"/>
+        </inkml:channelProperties>
+      </inkml:inkSource>
+      <inkml:timestamp xml:id="ts0" timeString="2022-09-11T15:13:18.246"/>
+    </inkml:context>
+    <inkml:brush xml:id="br0">
+      <inkml:brushProperty name="width" value="0.1" units="cm"/>
+      <inkml:brushProperty name="height" value="0.1" units="cm"/>
+    </inkml:brush>
+  </inkml:definitions>
+  <inkml:trace contextRef="#ctx0" brushRef="#br0">1 995 24575,'14'-21'0,"-1"4"0,3-2 0,3-1 0,2-1 0,12-12 0,-10 7 0,19-14 0,-17 13 0,12-6 0,-6 5 0,-3 2 0,8-2 0,-8 1 0,-1 1 0,-3 5 0,-8 1 0,3 5 0,-8 4 0,-1 1 0,1 3 0,-4 0 0,7 0 0,-3-3 0,3-2 0,1 1 0,0-3 0,-1 3 0,-2-4 0,2 4 0,-3 0 0,1 1 0,1 1 0,-5-1 0,2 3 0,1 0 0,-4-3 0,7-1 0,2-5 0,0 1 0,7 0 0,-2-5 0,9-4 0,-7 5 0,2-2 0,-14 17 0,0-6 0,-5 6 0,1 1 0,-1-3 0,1 2 0,-1-2 0,5-4 0,-4 2 0,3-2 0,0 3 0,-2 0 0,2 0 0,-3 4 0,-4-3 0,3 5 0,-5-4 0,5 4 0,-2-5 0,2 2 0,1-2 0,-1-1 0,1 1 0,0-1 0,-1 3 0,-3-1 0,3 4 0,-5-5 0,5 6 0,-3-3 0,1 0 0,1 2 0,-1-4 0,2 1 0,1-2 0,-1-1 0,1 3 0,-1-2 0,1 6 0,-4-6 0,3 5 0,-3-2 0,4 1 0,-1 1 0,1-5 0,-4 5 0,0-1 0</inkml:trace>
+</inkml:ink>
+</file>
+
+<file path=ppt/ink/ink113.xml><?xml version="1.0" encoding="utf-8"?>
+<inkml:ink xmlns:inkml="http://www.w3.org/2003/InkML">
+  <inkml:definitions>
+    <inkml:context xml:id="ctx0">
+      <inkml:inkSource xml:id="inkSrc0">
+        <inkml:traceFormat>
+          <inkml:channel name="X" type="integer" min="-2.14748E9" max="2.14748E9" units="cm"/>
+          <inkml:channel name="Y" type="integer" min="-2.14748E9" max="2.14748E9" units="cm"/>
+          <inkml:channel name="F" type="integer" max="32767" units="dev"/>
+        </inkml:traceFormat>
+        <inkml:channelProperties>
+          <inkml:channelProperty channel="X" name="resolution" value="1000" units="1/cm"/>
+          <inkml:channelProperty channel="Y" name="resolution" value="1000" units="1/cm"/>
+          <inkml:channelProperty channel="F" name="resolution" value="0" units="1/dev"/>
+        </inkml:channelProperties>
+      </inkml:inkSource>
+      <inkml:timestamp xml:id="ts0" timeString="2022-09-11T15:13:20.333"/>
+    </inkml:context>
+    <inkml:brush xml:id="br0">
+      <inkml:brushProperty name="width" value="0.1" units="cm"/>
+      <inkml:brushProperty name="height" value="0.1" units="cm"/>
+    </inkml:brush>
+  </inkml:definitions>
+  <inkml:trace contextRef="#ctx0" brushRef="#br0">1 1158 24575,'18'0'0,"-1"-4"0,2-4 0,1-4 0,0-3 0,3-1 0,-7-3 0,31-41 0,-19 20 0,2-4 0,-1 2 0,-5 10 0,19-23 0,-24 37 0,22-26 0,-26 25 0,17-17 0,-19 16 0,26-23 0,-19 14 0,14-9 0,-22 15 0,13-10 0,-14 10 0,31-37 0,-26 34 0,23-31 0,-26 39 0,10-15 0,-15 24 0,12-24 0,-11 19 0,25-42 0,-21 34 0,21-30 0,-25 35 0,4-6 0,-9 12 0,2 2 0,-5 2 0,2 1 0,-1 3 0,-1-3 0,2 2 0,0 1 0,-3-3 0,6 3 0,-5-1 0,1 1 0</inkml:trace>
+</inkml:ink>
+</file>
+
+<file path=ppt/ink/ink114.xml><?xml version="1.0" encoding="utf-8"?>
+<inkml:ink xmlns:inkml="http://www.w3.org/2003/InkML">
+  <inkml:definitions>
+    <inkml:context xml:id="ctx0">
+      <inkml:inkSource xml:id="inkSrc0">
+        <inkml:traceFormat>
+          <inkml:channel name="X" type="integer" min="-2.14748E9" max="2.14748E9" units="cm"/>
+          <inkml:channel name="Y" type="integer" min="-2.14748E9" max="2.14748E9" units="cm"/>
+          <inkml:channel name="F" type="integer" max="32767" units="dev"/>
+        </inkml:traceFormat>
+        <inkml:channelProperties>
+          <inkml:channelProperty channel="X" name="resolution" value="1000" units="1/cm"/>
+          <inkml:channelProperty channel="Y" name="resolution" value="1000" units="1/cm"/>
+          <inkml:channelProperty channel="F" name="resolution" value="0" units="1/dev"/>
+        </inkml:channelProperties>
+      </inkml:inkSource>
+      <inkml:timestamp xml:id="ts0" timeString="2022-09-11T15:13:22.363"/>
+    </inkml:context>
+    <inkml:brush xml:id="br0">
+      <inkml:brushProperty name="width" value="0.1" units="cm"/>
+      <inkml:brushProperty name="height" value="0.1" units="cm"/>
+    </inkml:brush>
+  </inkml:definitions>
+  <inkml:trace contextRef="#ctx0" brushRef="#br0">1 1302 24575,'0'-14'0,"0"-24"0,12 2 0,-5-16 0,14 16 0,0-14 0,-2 16 0,10-24 0,-6 20 0,6-10 0,2 0 0,-6 4 0,5-3 0,2-5 0,-7 16 0,9-27 0,-21 39 0,17-43 0,-15 36 0,10-26 0,-9 22 0,9-21 0,-10 24 0,11-15 0,-22 35 0,2 0 0,-3 5 0,-2-2 0,2 2 0,0-6 0,-3 6 0,3-3 0,-3 4 0,0-1 0,0 1 0,0 0 0,0-1 0,3 1 0,-2-1 0,5-8 0,-5 6 0,2-6 0,-1 9 0,-1-1 0,2 1 0,0-4 0,0 6 0,1-8 0,2 10 0,-5-6 0,1 4 0,1-2 0,-2 0 0,5-1 0,-3 1 0,4-1 0,-4 4 0,0 0 0</inkml:trace>
+</inkml:ink>
+</file>
+
+<file path=ppt/ink/ink115.xml><?xml version="1.0" encoding="utf-8"?>
+<inkml:ink xmlns:inkml="http://www.w3.org/2003/InkML">
+  <inkml:definitions>
+    <inkml:context xml:id="ctx0">
+      <inkml:inkSource xml:id="inkSrc0">
+        <inkml:traceFormat>
+          <inkml:channel name="X" type="integer" min="-2.14748E9" max="2.14748E9" units="cm"/>
+          <inkml:channel name="Y" type="integer" min="-2.14748E9" max="2.14748E9" units="cm"/>
+          <inkml:channel name="F" type="integer" max="32767" units="dev"/>
+        </inkml:traceFormat>
+        <inkml:channelProperties>
+          <inkml:channelProperty channel="X" name="resolution" value="1000" units="1/cm"/>
+          <inkml:channelProperty channel="Y" name="resolution" value="1000" units="1/cm"/>
+          <inkml:channelProperty channel="F" name="resolution" value="0" units="1/dev"/>
+        </inkml:channelProperties>
+      </inkml:inkSource>
+      <inkml:timestamp xml:id="ts0" timeString="2022-09-11T15:13:24.066"/>
+    </inkml:context>
+    <inkml:brush xml:id="br0">
+      <inkml:brushProperty name="width" value="0.1" units="cm"/>
+      <inkml:brushProperty name="height" value="0.1" units="cm"/>
+    </inkml:brush>
+  </inkml:definitions>
+  <inkml:trace contextRef="#ctx0" brushRef="#br0">324 0 24575,'0'13'0,"0"1"0,0 1 0,0-1 0,0 5 0,-8 22 0,6-11 0,-6 15 0,0 10 0,3-12 0,-4 15 0,2-19 0,2 2 0,-12 18 0,7-3 0,-11 2 0,-2 24 0,3-36 0,3 9 0,0-2 0,2-15 0,-5 27 0,15-44 0,-2 7 0,3-12 0,-8 24 0,0-9 0,3 12 0,-1-17 0,3 0 0,2-10 0,-5 5 0,6-6 0,0 3 0,-2-7 0,5 5 0,-2-8 0,0 4 0,3-4 0,-3 4 0,3-5 0,-3 3 0,2-4 0,-2 0 0,3 0 0,0 0 0,0-2 0,0-2 0</inkml:trace>
+</inkml:ink>
+</file>
+
+<file path=ppt/ink/ink116.xml><?xml version="1.0" encoding="utf-8"?>
+<inkml:ink xmlns:inkml="http://www.w3.org/2003/InkML">
+  <inkml:definitions>
+    <inkml:context xml:id="ctx0">
+      <inkml:inkSource xml:id="inkSrc0">
+        <inkml:traceFormat>
+          <inkml:channel name="X" type="integer" min="-2.14748E9" max="2.14748E9" units="cm"/>
+          <inkml:channel name="Y" type="integer" min="-2.14748E9" max="2.14748E9" units="cm"/>
+          <inkml:channel name="F" type="integer" max="32767" units="dev"/>
+        </inkml:traceFormat>
+        <inkml:channelProperties>
+          <inkml:channelProperty channel="X" name="resolution" value="1000" units="1/cm"/>
+          <inkml:channelProperty channel="Y" name="resolution" value="1000" units="1/cm"/>
+          <inkml:channelProperty channel="F" name="resolution" value="0" units="1/dev"/>
+        </inkml:channelProperties>
+      </inkml:inkSource>
+      <inkml:timestamp xml:id="ts0" timeString="2022-09-11T15:13:34.080"/>
+    </inkml:context>
+    <inkml:brush xml:id="br0">
+      <inkml:brushProperty name="width" value="0.3" units="cm"/>
+      <inkml:brushProperty name="height" value="0.6" units="cm"/>
+      <inkml:brushProperty name="color" value="#00B44B"/>
+      <inkml:brushProperty name="tip" value="rectangle"/>
+      <inkml:brushProperty name="rasterOp" value="maskPen"/>
+    </inkml:brush>
+  </inkml:definitions>
+  <inkml:trace contextRef="#ctx0" brushRef="#br0">0 174 16383,'58'0'0,"-10"0"0,-14 0 0,-8 0 0,9 0 0,11 0 0,0-4 0,8 3 0,-11-9 0,-12 8 0,-8-5 0,-10 7 0,0-3 0,12-8 0,-4 3 0,22-9 0,-28 12 0,17-1 0,-24 3 0,5 2 0,9-7 0,-8 6 0,13-4 0,-7 3 0,-7-1 0,8 0 0,-6-5 0,13 5 0,-8-3 0,12-3 0,-20 9 0,7-6 0,-6 1 0,1 2 0,2-6 0,1 3 0,-5 3 0,4 19 0,-12-4 0,2 20 0,-6-15 0,0 7 0,0-3 0,0 4 0,0 0 0,0 0 0,-4 5 0,3-4 0,-6 4 0,-1-5 0,-1 1 0,-2-6 0,-1 5 0,1-12 0,-2 6 0,0-7 0,-12 7 0,3-5 0,-39 8 0,30-11 0,-47 12 0,42-12 0,-42 13 0,43-12 0,-37 11 0,42-15 0,-33 14 0,35-15 0,-22 15 0,28-12 0,-8 8 0,18-13 0,0 2 0,-7 3 0,9-6 0,-12 9 0,12-8 0,-1 2 0,-4 6 0,4-1 0,1 2 0,-2-1 0,8-2 0,-8 3 0,2 3 0,0-5 0,0 4 0,31-1 0,-11-3 0,22-1 0,-17-4 0,4-5 0,-3 6 0,7-7 0,-7 4 0,7-1 0,-8-2 0,4 3 0,0-4 0,-3 3 0,3-2 0,-5 5 0,1-5 0,0 6 0,2-6 0,-1 5 0,5-5 0,-5 2 0,3-3 0,-4 3 0,4-2 0,-4 2 0,4-3 0,-4 0 0,2 0 0,2 4 0,-4-3 0,1 5 0,-2-6 0,0 7 0,7-7 0,-9 4 0,7-4 0,-7 3 0,4-3 0,1 6 0,-3-5 0,2 2 0,-2 0 0,3-2 0,-2 5 0,1-5 0,0 2 0,-2 0 0,4-2 0,-4 4 0,2-4 0,0 5 0,-2-2 0,2-1 0,-1 3 0,-1-2 0,2 2 0,0 1 0,-5-1 0,7-2 0,-63-5 0,25 0 0,-49-3 0,28 4 0,5 0 0,-5 0 0,6 0 0,5 0 0,1 0 0,5 0 0,0 0 0,4 0 0,1 0 0,8 0 0,-6 3 0,3 1 0,-5-1 0,2 3 0,3-5 0,0 5 0,-3-2 0,-1 0 0,3-1 0,-1-3 0,2 3 0,-1-2 0,-2 2 0,3 0 0,-3-2 0,3 2 0,-3 0 0,3-3 0,-3 3 0,3-3 0,-2 3 0,-1-2 0,4 2 0,-4 0 0,1-2 0,2 2 0,-5-3 0,6 3 0,-3-3 0,0 3 0,-1-3 0</inkml:trace>
+</inkml:ink>
+</file>
+
+<file path=ppt/ink/ink117.xml><?xml version="1.0" encoding="utf-8"?>
+<inkml:ink xmlns:inkml="http://www.w3.org/2003/InkML">
+  <inkml:definitions>
+    <inkml:context xml:id="ctx0">
+      <inkml:inkSource xml:id="inkSrc0">
+        <inkml:traceFormat>
+          <inkml:channel name="X" type="integer" min="-2.14748E9" max="2.14748E9" units="cm"/>
+          <inkml:channel name="Y" type="integer" min="-2.14748E9" max="2.14748E9" units="cm"/>
+          <inkml:channel name="F" type="integer" max="32767" units="dev"/>
+        </inkml:traceFormat>
+        <inkml:channelProperties>
+          <inkml:channelProperty channel="X" name="resolution" value="1000" units="1/cm"/>
+          <inkml:channelProperty channel="Y" name="resolution" value="1000" units="1/cm"/>
+          <inkml:channelProperty channel="F" name="resolution" value="0" units="1/dev"/>
+        </inkml:channelProperties>
+      </inkml:inkSource>
       <inkml:timestamp xml:id="ts0" timeString="2022-09-11T15:13:50.284"/>
     </inkml:context>
     <inkml:brush xml:id="br0">
@@ -499,7 +689,7 @@
 </inkml:ink>
 </file>
 
-<file path=ppt/ink/ink111.xml><?xml version="1.0" encoding="utf-8"?>
+<file path=ppt/ink/ink118.xml><?xml version="1.0" encoding="utf-8"?>
 <inkml:ink xmlns:inkml="http://www.w3.org/2003/InkML">
   <inkml:definitions>
     <inkml:context xml:id="ctx0">
@@ -529,7 +719,7 @@
 </inkml:ink>
 </file>
 
-<file path=ppt/ink/ink112.xml><?xml version="1.0" encoding="utf-8"?>
+<file path=ppt/ink/ink119.xml><?xml version="1.0" encoding="utf-8"?>
 <inkml:ink xmlns:inkml="http://www.w3.org/2003/InkML">
   <inkml:definitions>
     <inkml:context xml:id="ctx0">
@@ -556,216 +746,6 @@
     </inkml:brush>
   </inkml:definitions>
   <inkml:trace contextRef="#ctx0" brushRef="#br0">259 1 16383,'40'7'0,"-3"-2"0,-26 9 0,0-6 0,3 5 0,-3-8 0,4 8 0,0-8 0,-1 9 0,-2-3 0,2 4 0,-3-1 0,0-3 0,0 3 0,-1-3 0,-2 0 0,9 10 0,-9-12 0,6 11 0,-4-6 0,1 2 0,0-2 0,-1-1 0,1-1 0,-3-1 0,5 5 0,-6-7 0,10 10 0,-9-11 0,5 6 0,0-1 0,-4-5 0,7 9 0,-8-10 0,6 7 0,-3-3 0,0 0 0,-1 3 0,0-6 0,1 5 0,4-5 0,-2 4 0,-2-4 0,1 4 0,2-4 0,0 2 0,0-4 0,6 2 0,-11-2 0,11 2 0,-6 2 0,-2-3 0,4 6 0,-5-8 0,2 3 0,2-1 0,-1 0 0,1 0 0,1-5 0,-3-2 0,6 0 0,-5 0 0,2 0 0,0 0 0,-2 0 0,5 6 0,-5-1 0,3 1 0,0 0 0,-5-2 0,4 3 0,-8 8 0,-2-4 0,-3 8 0,-16-2 0,3-2 0,-11-1 0,7-4 0,-1-2 0,1 2 0,3-3 0,-4 6 0,3-9 0,-8 8 0,8-7 0,-4 5 0,2-4 0,0 1 0,-2 0 0,3 2 0,3 1 0,-2 6 0,5-5 0,-3 4 0,1-5 0,-2 4 0,-2-1 0,3 0 0,0-3 0,4 6 0,-4-5 0,3 5 0,-6-6 0,6 3 0,-12-9 0,7-2 0,-8-6 0,1-4 0,3 4 0,-3-3 0,5 3 0,-1-3 0,-3-3 0,7 5 0,-6-4 0,3-2 0,2 3 0,-5-9 0,6 9 0,0-6 0,-3 6 0,3-6 0,-1 3 0,-2-1 0,6-1 0,-6 4 0,3-7 0,0 7 0,-2-4 0,-1-1 0,2 6 0,-5-9 0,10 10 0,-7-7 0,6 3 0,-6-1 0,6-2 0,-6 6 0,6-6 0,-5 4 0,2-2 0,-3 3 0,0 2 0,-3 0 0,6 1 0,-5-1 0,2 3 0,0-2 0,-3 0 0,4-4 0,0-1 0,0 5 0,-4 3 0,3 0 0,-3 2 0,1-2 0,3 3 0,-5 0 0,4 0 0,-2 3 0,0 1 0,3-1 0,-6 0 0,6-3 0,-3 0 0,1 0 0,-1 0 0</inkml:trace>
-</inkml:ink>
-</file>
-
-<file path=ppt/ink/ink113.xml><?xml version="1.0" encoding="utf-8"?>
-<inkml:ink xmlns:inkml="http://www.w3.org/2003/InkML">
-  <inkml:definitions>
-    <inkml:context xml:id="ctx0">
-      <inkml:inkSource xml:id="inkSrc0">
-        <inkml:traceFormat>
-          <inkml:channel name="X" type="integer" min="-2.14748E9" max="2.14748E9" units="cm"/>
-          <inkml:channel name="Y" type="integer" min="-2.14748E9" max="2.14748E9" units="cm"/>
-          <inkml:channel name="F" type="integer" max="32767" units="dev"/>
-        </inkml:traceFormat>
-        <inkml:channelProperties>
-          <inkml:channelProperty channel="X" name="resolution" value="1000" units="1/cm"/>
-          <inkml:channelProperty channel="Y" name="resolution" value="1000" units="1/cm"/>
-          <inkml:channelProperty channel="F" name="resolution" value="0" units="1/dev"/>
-        </inkml:channelProperties>
-      </inkml:inkSource>
-      <inkml:timestamp xml:id="ts0" timeString="2022-09-11T15:14:05.695"/>
-    </inkml:context>
-    <inkml:brush xml:id="br0">
-      <inkml:brushProperty name="width" value="0.3" units="cm"/>
-      <inkml:brushProperty name="height" value="0.6" units="cm"/>
-      <inkml:brushProperty name="color" value="#EF0C4D"/>
-      <inkml:brushProperty name="tip" value="rectangle"/>
-      <inkml:brushProperty name="rasterOp" value="maskPen"/>
-    </inkml:brush>
-  </inkml:definitions>
-  <inkml:trace contextRef="#ctx0" brushRef="#br0">366 0 16383,'-9'68'0,"-9"2"0,7-33 0,-12 17 0,9-11 0,3 9 0,-4-20 0,13 2 0,-9-10 0,7 0 0,0 0 0,-4 1 0,4-6 0,-4 9 0,-4-2 0,2 9 0,-7 6 0,3-5 0,-5 10 0,2-14 0,3 7 0,0-18 0,5 3 0,2-13 0,0 3 0,3-1 0,-6 1 0,0-1 0,-3 0 0,3-6 0,-3 5 0,0-4 0,2 1 0,20-42 0,-1 26 0,15-30 0,-9 34 0,-3 2 0,10-2 0,-5 3 0,5 0 0,-2 0 0,-3 0 0,7 0 0,-3 0 0,0 0 0,3 0 0,-3 0 0,0 0 0,3 0 0,-7 0 0,3 0 0,-5 0 0,5 0 0,-3 0 0,7 0 0,-7 0 0,2 0 0,1 0 0,-7 0 0,6 0 0,0 3 0,-2-2 0,6 2 0,-8-3 0,1 0 0,3 0 0,-3 0 0,3 0 0,-4 0 0,0 0 0,3 3 0,1-2 0,1 2 0,-5-3 0,6 0 0,-11 0 0,14 0 0,-9 0 0,-1 0 0,8 0 0,-12 14 0,3-5 0,-9 13 0,-3-6 0,0-5 0,26-5 0,-16-4 0,20-5 0,-17 3 0,-5 0 0,15-9 0,-13 4 0,7-7 0,-7-5 0,2 4 0,2-8 0,-2 2 0,3-1 0,-4 0 0,2-3 0,-2 3 0,-3 0 0,-1 1 0,1 1 0,-1 2 0,1-3 0,-1 4 0,1 1 0,-1-5 0,-3 3 0,3-3 0,-3 4 0,0 1 0,3-1 0,-3-2 0,3 5 0,-3-5 0,5-1 0,-4 2 0,6-5 0,-4 6 0,0 4 0,3-5 0,-2 7 0,-32-4 0,9 6 0,-29 0 0,15 2 0,3-2 0,-8 2 0,4-7 0,0 2 0,-4-2 0,4-1 0,0 0 0,1-3 0,5 0 0,0 3 0,0-2 0,4 6 0,-3-2 0,7 3 0,-7 0 0,7-2 0,-3 1 0,5-1 0,-1 2 0,-7-2 0,9 2 0,-8-3 0,10 1 0,-3 5 0,-4-7 0,6 10 0,-5-7 0,4 5 0,-1 0 0,1-10 0,13 51 0,3-32 0,7 39 0,-2-30 0,-1-3 0,0 3 0,0 1 0,1 0 0,-1 2 0,-3-1 0,-1 1 0,0-3 0,-2 3 0,2-3 0,-3 2 0,0 1 0,0-3 0,3 2 0,1 1 0,0-2 0,2 1 0,-6-2 0,3-1 0</inkml:trace>
-</inkml:ink>
-</file>
-
-<file path=ppt/ink/ink114.xml><?xml version="1.0" encoding="utf-8"?>
-<inkml:ink xmlns:inkml="http://www.w3.org/2003/InkML">
-  <inkml:definitions>
-    <inkml:context xml:id="ctx0">
-      <inkml:inkSource xml:id="inkSrc0">
-        <inkml:traceFormat>
-          <inkml:channel name="X" type="integer" min="-2.14748E9" max="2.14748E9" units="cm"/>
-          <inkml:channel name="Y" type="integer" min="-2.14748E9" max="2.14748E9" units="cm"/>
-          <inkml:channel name="F" type="integer" max="32767" units="dev"/>
-        </inkml:traceFormat>
-        <inkml:channelProperties>
-          <inkml:channelProperty channel="X" name="resolution" value="1000" units="1/cm"/>
-          <inkml:channelProperty channel="Y" name="resolution" value="1000" units="1/cm"/>
-          <inkml:channelProperty channel="F" name="resolution" value="0" units="1/dev"/>
-        </inkml:channelProperties>
-      </inkml:inkSource>
-      <inkml:timestamp xml:id="ts0" timeString="2022-09-11T15:14:10.773"/>
-    </inkml:context>
-    <inkml:brush xml:id="br0">
-      <inkml:brushProperty name="width" value="0.3" units="cm"/>
-      <inkml:brushProperty name="height" value="0.6" units="cm"/>
-      <inkml:brushProperty name="color" value="#EF0C4D"/>
-      <inkml:brushProperty name="tip" value="rectangle"/>
-      <inkml:brushProperty name="rasterOp" value="maskPen"/>
-    </inkml:brush>
-  </inkml:definitions>
-  <inkml:trace contextRef="#ctx0" brushRef="#br0">355 9 16383,'70'0'0,"8"0"0,-38 0 0,31 0 0,-25 0 0,16 0 0,-9 0 0,-5 0 0,-1 0 0,-5 0 0,-2 0 0,1 0 0,-5 0 0,5 0 0,-1 0 0,2 0 0,6 0 0,-6-4 0,-2 4 0,-10-4 0,-1 4 0,-9 0 0,-5 0 0,2 0 0,-4 0 0,4 0 0,2 0 0,-6 8 0,0-3 0,0 14 0,-9-5 0,2 4 0,-6-1 0,0 2 0,0-3 0,0 7 0,0-3 0,0-1 0,0 4 0,0 2 0,0 1 0,0 7 0,0-2 0,0-1 0,0 4 0,0-4 0,-4 0 0,3-1 0,-6-5 0,6-4 0,-5-5 0,5 1 0,-4-5 0,1 8 0,0-5 0,2 1 0,-2 5 0,3-8 0,-2 9 0,0-8 0,39-50 0,-23 24 0,32-42 0,-29 32 0,-5 7 0,4-3 0,-7 1 0,3 2 0,-3-7 0,-4 3 0,0-4 0,-1 0 0,-2-1 0,3 6 0,-4-5 0,0 9 0,0-1 0,0 0 0,0 5 0,0-9 0,0 6 0,0-3 0,0 1 0,-22 50 0,13-11 0,-22 41 0,21-18 0,-3-4 0,4 5 0,-1-5 0,5 4 0,-2-9 0,2 19 0,0-22 0,-3 30 0,7-42 0,-2 18 0,3-32 0,0 4 0,-9 9 0,4-14 0,-13 14 0,6-20 0,-6 2 0,-1-3 0,4 0 0,-8 0 0,7 0 0,-7 0 0,7 0 0,-7 0 0,7 0 0,-7 0 0,3 0 0,-4 0 0,0 0 0,-5 0 0,-1 0 0,-5 0 0,0 0 0,-6 0 0,5 0 0,-10 0 0,9 0 0,-3 0 0,5 0 0,0 0 0,0 0 0,5 0 0,-4 0 0,-18 0 0,12 0 0,-44 0 0,47 0 0,-36 0 0,44 0 0,-21 3 0,28-2 0,-15 2 0,20-3 0,-21 0 0,16 0 0,-24 0 0,23 0 0,-18 0 0,24 0 0,-13 0 0,17-3 0,0-3 0,13-16 0,7 3 0,4-7 0,4 11 0,9-12 0,3 3 0,-3-6 0,-1-15 0,-15 21 0,3-58 0,-6 37 0,-2-10 0,1 0 0,1 10 0,3-38 0,-4 62 0,-1-23 0,-3 35 0,0-10 0,18 10 0,0 1 0,9 2 0,5 2 0,-15 4 0,20 0 0,-19 0 0,22 10 0,-22-4 0,28 25 0,-27-16 0,31 24 0,-31-25 0,49 14 0,-35-22 0,56 5 0,-48-11 0,22 0 0,-37 0 0,12 0 0,-20 0 0,15 3 0,-20-2 0,12 2 0,-16-3 0,20 0 0,-15 0 0,23 0 0,-19 0 0,22 0 0,-22 0 0,26 0 0,-21 0 0,31 0 0,-29 0 0,24 4 0,-30-3 0,11 5 0,-18-5 0,0 2 0</inkml:trace>
-</inkml:ink>
-</file>
-
-<file path=ppt/ink/ink115.xml><?xml version="1.0" encoding="utf-8"?>
-<inkml:ink xmlns:inkml="http://www.w3.org/2003/InkML">
-  <inkml:definitions>
-    <inkml:context xml:id="ctx0">
-      <inkml:inkSource xml:id="inkSrc0">
-        <inkml:traceFormat>
-          <inkml:channel name="X" type="integer" min="-2.14748E9" max="2.14748E9" units="cm"/>
-          <inkml:channel name="Y" type="integer" min="-2.14748E9" max="2.14748E9" units="cm"/>
-          <inkml:channel name="F" type="integer" max="32767" units="dev"/>
-        </inkml:traceFormat>
-        <inkml:channelProperties>
-          <inkml:channelProperty channel="X" name="resolution" value="1000" units="1/cm"/>
-          <inkml:channelProperty channel="Y" name="resolution" value="1000" units="1/cm"/>
-          <inkml:channelProperty channel="F" name="resolution" value="0" units="1/dev"/>
-        </inkml:channelProperties>
-      </inkml:inkSource>
-      <inkml:timestamp xml:id="ts0" timeString="2022-09-11T15:14:16.851"/>
-    </inkml:context>
-    <inkml:brush xml:id="br0">
-      <inkml:brushProperty name="width" value="0.3" units="cm"/>
-      <inkml:brushProperty name="height" value="0.6" units="cm"/>
-      <inkml:brushProperty name="color" value="#EF0C4D"/>
-      <inkml:brushProperty name="tip" value="rectangle"/>
-      <inkml:brushProperty name="rasterOp" value="maskPen"/>
-    </inkml:brush>
-  </inkml:definitions>
-  <inkml:trace contextRef="#ctx0" brushRef="#br0">133 169 16383,'88'-24'0,"-3"-8"0,-27 20 0,13-18 0,-19 14 0,15-6 0,-12 8 0,-7 4 0,-12 5 0,-7 1 0,-9 4 0,-1 0 0,9 0 0,-6 0 0,15 0 0,-11 0 0,29 0 0,-24 0 0,24 0 0,-37 0 0,10 0 0,-19 0 0,9 0 0,-1 0 0,-6 0 0,11 6 0,-8 1 0,3 4 0,12 3 0,-15-6 0,16 12 0,-21-11 0,14 20 0,-15-20 0,8 24 0,-8-24 0,2 15 0,-3-10 0,0 8 0,0-7 0,3 11 0,-2-13 0,4 10 0,-4-11 0,11 16 0,-10-17 0,10 24 0,-11-25 0,8 23 0,-11-20 0,11 24 0,-10-14 0,4 18 0,-2-19 0,2 16 0,-5-25 0,4 16 0,-8-21 0,2 8 0,0 1 0,-2-8 0,-16 9 0,4-15 0,-16 0 0,13-3 0,-5 0 0,-1 0 0,-9 0 0,4 0 0,-9 0 0,-2 0 0,0 0 0,-5 0 0,1 5 0,3 0 0,-9 4 0,5 0 0,-7 1 0,1-1 0,5 0 0,-4 1 0,10-2 0,0 1 0,2 0 0,9-1 0,0 3 0,2-2 0,7 2 0,-6-3 0,6-1 0,-7 5 0,3 0 0,-15 7 0,8-2 0,-4 2 0,13-7 0,3-1 0,4-4 0,-2 3 0,0 0 0,-1 0 0,-2-3 0,3 1 0,0 0 0,0 5 0,3-3 0,-3-1 0,3 1 0,-3 0 0,3 3 0,-4-49 0,1 16 0,0-43 0,-3 28 0,6-6 0,-3 5 0,-1-10 0,4 10 0,-3-5 0,4 6 0,1 5 0,0 1 0,0 5 0,0 4 0,0-3 0,0 7 0,1-3 0,-1 4 0,1-3 0,-1 2 0,1-3 0,-1 0 0,0-1 0,1 0 0,-1 2 0,1 3 0,3 0 0,-2 1 0,2-3 0,0 1 0,-2 2 0,2-5 0,1 7 0,-4-8 0,3 2 0,1 3 0,-1-2 0,1 3 0,2-1 0,-2-9 0,3 7 0,0-3 0,0 6 0,0 1 0,0 64 0,5-14 0,0 49 0,10-19 0,-1-22 0,7 20 0,-2-16 0,-3 6 0,2-2 0,-4-11 0,0-6 0,-2-11 0,-4-6 0,-1-8 0,0 2 0,-1 0 0,-2 2 0,2 2 0,-2-3 0,0 1 0,3 4 0,-3-3 0,4 7 0,0-8 0,0 8 0,-1-7 0,0-1 0,4-1 0,-3-3 0,2 4 0,-2 0 0,-1-1 0,4 1 0,-3 0 0,2-1 0,2 5 0,-4 1 0,7 4 0,-2 0 0,-1-4 0,3 3 0,-3-7 0,0 3 0,2-4 0,-6-4 0,5 2 0,-1-9 0,0-41 0,-3 11 0,-5-36 0,0 27 0,-3 0 0,3-6 0,0 5 0,1-5 0,4 6 0,-5 5 0,4 1 0,-7 5 0,6 4 0,-7 5 0,7 2 0,-4 0 0,4-5 0,0-2 0,0 1 0,0 2 0,-3 6 0,6-10 0,-5 9 0,6-9 0,0 2 0,1-1 0,3 0 0,2-8 0,3 6 0,3-8 0,-2 9 0,4-4 0,-9 9 0,0-1 0,-2 4 0,-7 8 0,9-4 0,-2 8 0,4-2 0,-1 3 0,0 0 0,-2 0 0,2 0 0,-1 6 0,1 2 0,5 3 0,-3-4 0,4 0 0,-7-3 0,7 0 0,-3 3 0,4-2 0,-4 2 0,3 1 0,-8 0 0,9 0 0,-9-1 0,4 1 0,-8-1 0,6 0 0,-6-1 0,0 9 0,-5-2 0,-6 6 0,0-4 0,0 0 0,-7 10 0,2-8 0,-6 9 0,0-7 0,-1 1 0,-4 4 0,-5 1 0,-1 5 0,-5-2 0,0 3 0,1-5 0,4-5 0,-3 4 0,5-8 0,-1 0 0,-2-2 0,3-3 0,-4 1 0,4-2 0,-3 0 0,8-2 0,-4 2 0,4-4 0,4-3 0,42-28 0,-9 10 0,31-23 0,-19 20 0,-4 4 0,11-7 0,-4 6 0,9-6 0,-14 7 0,22-8 0,-32 14 0,15-10 0,-29 16 0,2-2 0,2-20 0,-6 2 0,2-6 0,-8 12 0</inkml:trace>
-</inkml:ink>
-</file>
-
-<file path=ppt/ink/ink116.xml><?xml version="1.0" encoding="utf-8"?>
-<inkml:ink xmlns:inkml="http://www.w3.org/2003/InkML">
-  <inkml:definitions>
-    <inkml:context xml:id="ctx0">
-      <inkml:inkSource xml:id="inkSrc0">
-        <inkml:traceFormat>
-          <inkml:channel name="X" type="integer" min="-2.14748E9" max="2.14748E9" units="cm"/>
-          <inkml:channel name="Y" type="integer" min="-2.14748E9" max="2.14748E9" units="cm"/>
-          <inkml:channel name="F" type="integer" max="32767" units="dev"/>
-        </inkml:traceFormat>
-        <inkml:channelProperties>
-          <inkml:channelProperty channel="X" name="resolution" value="1000" units="1/cm"/>
-          <inkml:channelProperty channel="Y" name="resolution" value="1000" units="1/cm"/>
-          <inkml:channelProperty channel="F" name="resolution" value="0" units="1/dev"/>
-        </inkml:channelProperties>
-      </inkml:inkSource>
-      <inkml:timestamp xml:id="ts0" timeString="2022-09-11T15:14:24.128"/>
-    </inkml:context>
-    <inkml:brush xml:id="br0">
-      <inkml:brushProperty name="width" value="0.3" units="cm"/>
-      <inkml:brushProperty name="height" value="0.6" units="cm"/>
-      <inkml:brushProperty name="color" value="#EF0C4D"/>
-      <inkml:brushProperty name="tip" value="rectangle"/>
-      <inkml:brushProperty name="rasterOp" value="maskPen"/>
-    </inkml:brush>
-  </inkml:definitions>
-  <inkml:trace contextRef="#ctx0" brushRef="#br0">33 693 16383,'45'-33'0,"0"6"0,-19 6 0,4 0 0,4 2 0,-6-2 0,13-2 0,-15 1 0,10 3 0,-14-4 0,11 8 0,-15-1 0,10 1 0,-12 3 0,7-4 0,-11 1 0,6 0 0,-6 0 0,2 1 0,1-1 0,0 0 0,-1 1 0,-2-1 0,-2 4 0,0-3 0,1 4 0,0-1 0,1-5 0,-4 4 0,2-2 0,0-2 0,-3 9 0,6-9 0,-3 3 0,0 3 0,2-9 0,-4 7 0,2-5 0,0 2 0,-1 1 0,4-1 0,-5 4 0,3-3 0,5 12 0,-3 0 0,7 9 0,-6 0 0,1 4 0,0-3 0,-4 6 0,3-3 0,-6 0 0,6 3 0,-7-3 0,7 1 0,-6 1 0,6-4 0,-2 4 0,2-4 0,1 4 0,4-4 0,-3 2 0,2-1 0,-3-1 0,0 1 0,-1 1 0,1-3 0,-4 2 0,2 4 0,-5-6 0,5 11 0,-2-7 0,0 2 0,-1 0 0,-3-3 0,4 1 0,-3 1 0,5-2 0,-2 3 0,-1-4 0,6 3 0,-8-5 0,9 5 0,-3-2 0,2 0 0,1 0 0,-6-4 0,3 0 0,0 3 0,-2-3 0,5 4 0,-7-2 0,5-1 0,-2 5 0,-2-5 0,4 4 0,-4-5 0,5 0 0,0-4 0,1-3 0,1 0 0,0 0 0,-4 0 0,4 3 0,-3-2 0,1 2 0,0-3 0,-2 0 0,5-3 0,-51 36 0,28-21 0,-42 31 0,38-32 0,-2-1 0,0 2 0,0-1 0,-1 3 0,-5 1 0,8-6 0,-5 3 0,3 1 0,0-5 0,-3 4 0,-4-2 0,6-2 0,-6 2 0,6-3 0,-7 3 0,3-2 0,1 2 0,-3 1 0,9-4 0,-8 6 0,6-3 0,-1 0 0,-1 3 0,4-3 0,-4 3 0,2-3 0,-3 2 0,0-1 0,2-1 0,2 5 0,-1-4 0,0 2 0,-7 0 0,6-2 0,-2 0 0,2-1 0,1 0 0,-1 0 0,-2 4 0,3-1 0,0-3 0,-3 0 0,2-1 0,-3 2 0,2-1 0,-1 3 0,0-6 0,-4 5 0,6-4 0,-5 2 0,6-1 0,-3-2 0,-2 2 0,1-2 0,-2-3 0,0-2 0,2-2 0,-3 0 0,3 0 0,-1 0 0,-3 0 0,0 0 0,3 0 0,-4-3 0,7-4 0,-5-1 0,0-4 0,5 7 0,-5-5 0,7 4 0,-5-2 0,-1-5 0,3 1 0,-3 1 0,8 1 0,-6 3 0,-4-4 0,-2-1 0,-2 1 0,3-4 0,0 7 0,3-6 0,-3 2 0,1-3 0,2 0 0,-3 0 0,4 0 0,1 1 0,-1-1 0,0 0 0,1 4 0,3 1 0,-3-1 0,3 3 0,-4-2 0,-3 3 0,3-1 0,-3 1 0,4 0 0,3 0 0,-10-4 0,9 0 0,-10 0 0,11 1 0,-2 2 0,-5-2 0,5 2 0,-7 1 0,9-2 0,-3 8 0,-2-8 0,2 5 0,-2-5 0,3 2 0,4-5 0,2-3 0,5 1 0,29-2 0,-4 6 0,35 5 0,-8-4 0,5 8 0,4-8 0,-4 8 0,6-3 0,0 4 0,-6 0 0,-7 0 0,-12 0 0,-7 0 0,-5 0 0,-4 0 0,-1 3 0,-8-2 0,6 5 0,-3-2 0,0 0 0,5 2 0,-8-5 0,9 2 0,-4-3 0,1 0 0,-2 0 0,4 0 0,1 0 0,0 0 0,-1 0 0,-5 0 0,0-3 0,3-1 0,-3 0 0,3-2 0,0 2 0,-5-3 0,4 1 0,-2-1 0,0 0 0,4-4 0,-3 3 0,-1-6 0,5 2 0,1-3 0,4-1 0,7-6 0,-6 5 0,6-10 0,-6 10 0,-4-3 0,-2 8 0,-5-2 0,1 6 0,0-2 0,-1 2 0,0 1 0,0 0 0,2 4 0,-2-3 0,2 5 0,1-1 0,-3 2 0,3 0 0,-4 0 0</inkml:trace>
-</inkml:ink>
-</file>
-
-<file path=ppt/ink/ink117.xml><?xml version="1.0" encoding="utf-8"?>
-<inkml:ink xmlns:inkml="http://www.w3.org/2003/InkML">
-  <inkml:definitions>
-    <inkml:context xml:id="ctx0">
-      <inkml:inkSource xml:id="inkSrc0">
-        <inkml:traceFormat>
-          <inkml:channel name="X" type="integer" min="-2.14748E9" max="2.14748E9" units="cm"/>
-          <inkml:channel name="Y" type="integer" min="-2.14748E9" max="2.14748E9" units="cm"/>
-          <inkml:channel name="F" type="integer" max="32767" units="dev"/>
-        </inkml:traceFormat>
-        <inkml:channelProperties>
-          <inkml:channelProperty channel="X" name="resolution" value="1000" units="1/cm"/>
-          <inkml:channelProperty channel="Y" name="resolution" value="1000" units="1/cm"/>
-          <inkml:channelProperty channel="F" name="resolution" value="0" units="1/dev"/>
-        </inkml:channelProperties>
-      </inkml:inkSource>
-      <inkml:timestamp xml:id="ts0" timeString="2022-09-11T15:14:31.871"/>
-    </inkml:context>
-    <inkml:brush xml:id="br0">
-      <inkml:brushProperty name="width" value="0.3" units="cm"/>
-      <inkml:brushProperty name="height" value="0.6" units="cm"/>
-      <inkml:brushProperty name="color" value="#EF0C4D"/>
-      <inkml:brushProperty name="tip" value="rectangle"/>
-      <inkml:brushProperty name="rasterOp" value="maskPen"/>
-    </inkml:brush>
-  </inkml:definitions>
-  <inkml:trace contextRef="#ctx0" brushRef="#br0">608 0 16383,'11'41'0,"3"-8"0,1-22 0,1-4 0,3 1 0,5-4 0,-7 3 0,15-6 0,-10 5 0,7-5 0,-5 6 0,-4-2 0,-2-1 0,-3 2 0,0-1 0,-1 5 0,0 0 0,0 1 0,-1-2 0,1-5 0,7-1 0,-5-3 0,6 4 0,-5-4 0,-1 7 0,0-6 0,-2 5 0,3 1 0,-4 0 0,1 2 0,1-2 0,-4-1 0,4 1 0,1-4 0,-2 0 0,5-3 0,-5 0 0,3 0 0,-2 0 0,-1 0 0,5 0 0,-5 0 0,2 0 0,0 0 0,-2 0 0,4 0 0,-4 0 0,4 0 0,-5-3 0,5 2 0,-3-1 0,1 2 0,2 0 0,-5 0 0,-33 28 0,15-18 0,-28 21 0,23-21 0,5-2 0,-10 8 0,7-1 0,-10 7 0,7-4 0,-4 1 0,7-4 0,-2-1 0,3-2 0,-1 4 0,1-4 0,-3 5 0,3-3 0,-3-1 0,4 0 0,2 3 0,1-2 0,3 9 0,-3-11 0,2 7 0,-2-1 0,0-5 0,3 7 0,-6-7 0,5 3 0,-2 3 0,3-5 0,0 3 0,0-1 0,-3-2 0,-1 5 0,1-5 0,0 2 0,0 0 0,-1-2 0,1 3 0,-3-1 0,5-1 0,-5 1 0,3-1 0,-12-7 0,0 0 0,-5-8 0,6 0 0,-2 0 0,1 0 0,-3 0 0,-2 0 0,5 0 0,-3 0 0,0 0 0,6 0 0,-10-3 0,13-1 0,-10-2 0,5-1 0,-1 0 0,-5 0 0,4 2 0,-1 2 0,2 3 0,0-3 0,-2 2 0,1-5 0,-1 5 0,-1-6 0,3 6 0,-3-5 0,0 5 0,3-5 0,-7 5 0,7-2 0,-4 3 0,4-4 0,0 3 0,-10-5 0,8 5 0,-9-6 0,12 6 0,-1-5 0,-4 5 0,3-6 0,-2 6 0,3-5 0,0 5 0,1-5 0,-5 5 0,7-5 0,-6 5 0,0-5 0,5 5 0,-7-6 0,10 4 0,-5-5 0,-2 1 0,5 0 0,-5 3 0,3-2 0,-1 6 0,-6-3 0,6-1 0,1 4 0,-3-7 0,6 7 0,-7-3 0,0 0 0,3-1 0,-2 0 0,2-2 0,2 5 0,-6-5 0,5 5 0,-4-1 0,2 2 0,2 0 0,39-26 0,-15 14 0,34-18 0,-25 15 0,-3 7 0,2-3 0,-7 4 0,0-4 0,2 0 0,-4 0 0,4-2 0,-6 2 0,4-4 0,0 0 0,5-3 0,-1-2 0,0 0 0,1-3 0,-4 7 0,2-3 0,-5 4 0,1 4 0,-3-2 0,3-1 0,-2-2 0,2-1 0,1 2 0,-3 0 0,7-4 0,-7 4 0,6-4 0,-6 8 0,2 0 0,3-1 0,4 25 0,2-10 0,5 24 0,-7-8 0,6-2 0,-2 2 0,8-2 0,-4-1 0,9 2 0,-9-6 0,4 4 0,-9-7 0,3 2 0,-11-4 0,12 4 0,-15-4 0,10 3 0,-12 2 0,5-4 0,5 0 0,-2-5 0,7 1 0,-8-4 0,0 7 0,3-7 0,0 3 0</inkml:trace>
-</inkml:ink>
-</file>
-
-<file path=ppt/ink/ink118.xml><?xml version="1.0" encoding="utf-8"?>
-<inkml:ink xmlns:inkml="http://www.w3.org/2003/InkML">
-  <inkml:definitions>
-    <inkml:context xml:id="ctx0">
-      <inkml:inkSource xml:id="inkSrc0">
-        <inkml:traceFormat>
-          <inkml:channel name="X" type="integer" min="-2.14748E9" max="2.14748E9" units="cm"/>
-          <inkml:channel name="Y" type="integer" min="-2.14748E9" max="2.14748E9" units="cm"/>
-          <inkml:channel name="F" type="integer" max="32767" units="dev"/>
-        </inkml:traceFormat>
-        <inkml:channelProperties>
-          <inkml:channelProperty channel="X" name="resolution" value="1000" units="1/cm"/>
-          <inkml:channelProperty channel="Y" name="resolution" value="1000" units="1/cm"/>
-          <inkml:channelProperty channel="F" name="resolution" value="0" units="1/dev"/>
-        </inkml:channelProperties>
-      </inkml:inkSource>
-      <inkml:timestamp xml:id="ts0" timeString="2022-09-11T15:15:08.039"/>
-    </inkml:context>
-    <inkml:brush xml:id="br0">
-      <inkml:brushProperty name="width" value="0.3" units="cm"/>
-      <inkml:brushProperty name="height" value="0.6" units="cm"/>
-      <inkml:brushProperty name="color" value="#EF0C4D"/>
-      <inkml:brushProperty name="tip" value="rectangle"/>
-      <inkml:brushProperty name="rasterOp" value="maskPen"/>
-    </inkml:brush>
-  </inkml:definitions>
-  <inkml:trace contextRef="#ctx0" brushRef="#br0">46 0 16383,'56'0'0,"6"0"0,-29 0 0,9 0 0,24 0 0,-24 0 0,17 0 0,-34 0 0,7 0 0,-10 0 0,15 0 0,-16 0 0,22 0 0,-28 0 0,32 4 0,-27-3 0,33 5 0,-29-1 0,25 8 0,-32-1 0,3 1 0,-11-4 0,-40 5 0,15-1 0,-30 2 0,22 0 0,0-6 0,0 6 0,4-3 0,-3 1 0,7 1 0,-3-6 0,8 2 0,-3 1 0,0 0 0,2 3 0,-5 1 0,6-1 0,-4 1 0,4 4 0,-3-4 0,1 9 0,-2-5 0,-1 1 0,4-1 0,2-4 0,2 0 0,1-1 0,-3 3 0,3-6 0,-3 5 0,-3-5 0,5-1 0,-9 3 0,10-3 0,-2 3 0,-6 0 0,2-3 0,-6 0 0,4-3 0,1 1 0,0 2 0,-1-2 0,5 1 0,-7 2 0,5-4 0,-6 4 0,7-1 0,-3-2 0,3 6 0,-4-6 0,4 6 0,-2-3 0,5 0 0,1-42 0,4 14 0,3-33 0,4 26 0,-3-1 0,2 1 0,-3 0 0,0 4 0,0-3 0,0 7 0,0-2 0,0 3 0,0 1 0,-6 60 0,4-23 0,-9 51 0,6-33 0,-4-5 0,0 5 0,4-6 0,-2-5 0,6-1 0,-2-5 0,3-4 0,0-1 0,0-4 0,0-1 0,0 7 0,-3-8 0,2 7 0,-2-6 0,3 2 0,0 4 0,-3-8 0,2 7 0,18-10 0,-5 4 0,16-6 0,-9-3 0,-4 2 0,4-5 0,-4 6 0,0-6 0,3 2 0,-2 0 0,3-2 0,-4 2 0,-1-3 0,3 0 0,-2 0 0,1 0 0,9 0 0,-9 0 0,14 0 0,-14 0 0,2-6 0,-3 1 0,-1-2 0,1-2 0,-2 4 0,-2-12 0,0 1 0,0-9 0,3-9 0,4-9 0,11-8 0,-7 3 0,11-6 0,-13 11 0,3-5 0,-5 12 0,-2 7 0,-3 5 0,-2 4 0,-3 1 0,-1 5 0,7-14 0,-1 6 0,12-24 0,-11 23 0,9-12 0,-17 27 0,3-1 0</inkml:trace>
-</inkml:ink>
-</file>
-
-<file path=ppt/ink/ink119.xml><?xml version="1.0" encoding="utf-8"?>
-<inkml:ink xmlns:inkml="http://www.w3.org/2003/InkML">
-  <inkml:definitions>
-    <inkml:context xml:id="ctx0">
-      <inkml:inkSource xml:id="inkSrc0">
-        <inkml:traceFormat>
-          <inkml:channel name="X" type="integer" min="-2.14748E9" max="2.14748E9" units="cm"/>
-          <inkml:channel name="Y" type="integer" min="-2.14748E9" max="2.14748E9" units="cm"/>
-          <inkml:channel name="F" type="integer" max="32767" units="dev"/>
-        </inkml:traceFormat>
-        <inkml:channelProperties>
-          <inkml:channelProperty channel="X" name="resolution" value="1000" units="1/cm"/>
-          <inkml:channelProperty channel="Y" name="resolution" value="1000" units="1/cm"/>
-          <inkml:channelProperty channel="F" name="resolution" value="0" units="1/dev"/>
-        </inkml:channelProperties>
-      </inkml:inkSource>
-      <inkml:timestamp xml:id="ts0" timeString="2022-09-11T15:15:12.631"/>
-    </inkml:context>
-    <inkml:brush xml:id="br0">
-      <inkml:brushProperty name="width" value="0.3" units="cm"/>
-      <inkml:brushProperty name="height" value="0.6" units="cm"/>
-      <inkml:brushProperty name="color" value="#EF0C4D"/>
-      <inkml:brushProperty name="tip" value="rectangle"/>
-      <inkml:brushProperty name="rasterOp" value="maskPen"/>
-    </inkml:brush>
-  </inkml:definitions>
-  <inkml:trace contextRef="#ctx0" brushRef="#br0">550 1 16383,'54'51'0,"-5"-4"0,-3-19 0,-2-3 0,16 4 0,-2 2 0,11-2 0,3 18 0,-16-7 0,-1 1 0,18 24 0,-12-8 0,-6-3 0,-22-15 0,24 15 0,-42-41 0,8 0 0,-14-10 0,-17-37 0,11 19 0,-16-28 0,13 29 0,0 3 0,0-9 0,0 9 0,9-8 0,-1 6 0,5 6 0,3-2 0,-45 40 0,29-24 0,-37 26 0,30-27 0,-4-2 0,-9 12 0,-2 7 0,-11 15 0,-8 9 0,-8 11 0,-5-3 0,11-3 0,-4 6 0,13-17 0,-2 9 0,8-18 0,7-2 0,6-7 0,3-7 0,2 0 0,4-6 0,-6 0 0,-6-1 0,3-2 0,-9-3 0,12 2 0,-3-3 0,-2 4 0,5-3 0,-6-1 0,0-3 0,2 0 0,-3 0 0,0 0 0,3 0 0,-7 0 0,8 0 0,-4 0 0,4-3 0,0-1 0,-3-18 0,2 8 0,-3-15 0,4 13 0,-1-7 0,1 7 0,-1-7 0,-3 7 0,3-3 0,-3 3 0,5 2 0,-1 2 0,4 2 0,-3 0 0,4 2 0,-5-2 0,1-4 0,0 9 0,0-8 0,-3 6 0,1-1 0,-1-2 0,2 6 0,0-3 0,-2 6 0,1-2 0,-1 0 0,-1 2 0,6-2 0,-7 3 0,5 0 0,-1 0 0,-3 0 0,6 0 0,-6 0 0,1 0 0,4 0 0,-5 0 0,34-30 0,-7 11 0,22-25 0,-7 23 0,-10 2 0,4 4 0,-7 0 0,0 0 0,0 1 0,-3-5 0,-1 3 0,1-7 0,3 7 0,-3-7 0,3 3 0,-2-9 0,-1 4 0,0-4 0,0 5 0,0 0 0,0 4 0,0-3 0,0 3 0,0-9 0,0 3 0,1-3 0,2 9 0,-3 1 0,3 5 0,-4-1 0,0 1 0,13 41 0,-14-13 0,14 40 0,-15-24 0,0 0 0,2-1 0,-6-5 0,3 0 0,-1-4 0,-2-1 0,5-4 0,-5-1 0,5 4 0,1-3 0,4-1 0,7-4 0,2-6 0,9 4 0,1-7 0,23 7 0,-13-6 0,19 2 0,-11 1 0,1-4 0,-1 8 0,-8-5 0,-5 1 0,0 3 0,-5-7 0,-1 3 0,-5 0 0,-4-4 0,4 4 0,-5-4 0,1 0 0,3 0 0,-7 0 0,3 0 0,-4 0 0,-1-3 0,1-1 0,0-4 0,-1 1 0,1 0 0,-4-4 0,6 0 0,-8 0 0,7 1 0,-6 1 0,4-5 0,-4 2 0,0-1 0,2 1 0,-3 4 0,6-7 0,-5 4 0,0 1 0,5 1 0,-2 5 0,3 1 0,0-3 0,-3 1 0,3-2 0,0 4 0</inkml:trace>
 </inkml:ink>
 </file>
 
@@ -812,6 +792,216 @@
           <inkml:channelProperty channel="F" name="resolution" value="0" units="1/dev"/>
         </inkml:channelProperties>
       </inkml:inkSource>
+      <inkml:timestamp xml:id="ts0" timeString="2022-09-11T15:14:05.695"/>
+    </inkml:context>
+    <inkml:brush xml:id="br0">
+      <inkml:brushProperty name="width" value="0.3" units="cm"/>
+      <inkml:brushProperty name="height" value="0.6" units="cm"/>
+      <inkml:brushProperty name="color" value="#EF0C4D"/>
+      <inkml:brushProperty name="tip" value="rectangle"/>
+      <inkml:brushProperty name="rasterOp" value="maskPen"/>
+    </inkml:brush>
+  </inkml:definitions>
+  <inkml:trace contextRef="#ctx0" brushRef="#br0">366 0 16383,'-9'68'0,"-9"2"0,7-33 0,-12 17 0,9-11 0,3 9 0,-4-20 0,13 2 0,-9-10 0,7 0 0,0 0 0,-4 1 0,4-6 0,-4 9 0,-4-2 0,2 9 0,-7 6 0,3-5 0,-5 10 0,2-14 0,3 7 0,0-18 0,5 3 0,2-13 0,0 3 0,3-1 0,-6 1 0,0-1 0,-3 0 0,3-6 0,-3 5 0,0-4 0,2 1 0,20-42 0,-1 26 0,15-30 0,-9 34 0,-3 2 0,10-2 0,-5 3 0,5 0 0,-2 0 0,-3 0 0,7 0 0,-3 0 0,0 0 0,3 0 0,-3 0 0,0 0 0,3 0 0,-7 0 0,3 0 0,-5 0 0,5 0 0,-3 0 0,7 0 0,-7 0 0,2 0 0,1 0 0,-7 0 0,6 0 0,0 3 0,-2-2 0,6 2 0,-8-3 0,1 0 0,3 0 0,-3 0 0,3 0 0,-4 0 0,0 0 0,3 3 0,1-2 0,1 2 0,-5-3 0,6 0 0,-11 0 0,14 0 0,-9 0 0,-1 0 0,8 0 0,-12 14 0,3-5 0,-9 13 0,-3-6 0,0-5 0,26-5 0,-16-4 0,20-5 0,-17 3 0,-5 0 0,15-9 0,-13 4 0,7-7 0,-7-5 0,2 4 0,2-8 0,-2 2 0,3-1 0,-4 0 0,2-3 0,-2 3 0,-3 0 0,-1 1 0,1 1 0,-1 2 0,1-3 0,-1 4 0,1 1 0,-1-5 0,-3 3 0,3-3 0,-3 4 0,0 1 0,3-1 0,-3-2 0,3 5 0,-3-5 0,5-1 0,-4 2 0,6-5 0,-4 6 0,0 4 0,3-5 0,-2 7 0,-32-4 0,9 6 0,-29 0 0,15 2 0,3-2 0,-8 2 0,4-7 0,0 2 0,-4-2 0,4-1 0,0 0 0,1-3 0,5 0 0,0 3 0,0-2 0,4 6 0,-3-2 0,7 3 0,-7 0 0,7-2 0,-3 1 0,5-1 0,-1 2 0,-7-2 0,9 2 0,-8-3 0,10 1 0,-3 5 0,-4-7 0,6 10 0,-5-7 0,4 5 0,-1 0 0,1-10 0,13 51 0,3-32 0,7 39 0,-2-30 0,-1-3 0,0 3 0,0 1 0,1 0 0,-1 2 0,-3-1 0,-1 1 0,0-3 0,-2 3 0,2-3 0,-3 2 0,0 1 0,0-3 0,3 2 0,1 1 0,0-2 0,2 1 0,-6-2 0,3-1 0</inkml:trace>
+</inkml:ink>
+</file>
+
+<file path=ppt/ink/ink121.xml><?xml version="1.0" encoding="utf-8"?>
+<inkml:ink xmlns:inkml="http://www.w3.org/2003/InkML">
+  <inkml:definitions>
+    <inkml:context xml:id="ctx0">
+      <inkml:inkSource xml:id="inkSrc0">
+        <inkml:traceFormat>
+          <inkml:channel name="X" type="integer" min="-2.14748E9" max="2.14748E9" units="cm"/>
+          <inkml:channel name="Y" type="integer" min="-2.14748E9" max="2.14748E9" units="cm"/>
+          <inkml:channel name="F" type="integer" max="32767" units="dev"/>
+        </inkml:traceFormat>
+        <inkml:channelProperties>
+          <inkml:channelProperty channel="X" name="resolution" value="1000" units="1/cm"/>
+          <inkml:channelProperty channel="Y" name="resolution" value="1000" units="1/cm"/>
+          <inkml:channelProperty channel="F" name="resolution" value="0" units="1/dev"/>
+        </inkml:channelProperties>
+      </inkml:inkSource>
+      <inkml:timestamp xml:id="ts0" timeString="2022-09-11T15:14:10.773"/>
+    </inkml:context>
+    <inkml:brush xml:id="br0">
+      <inkml:brushProperty name="width" value="0.3" units="cm"/>
+      <inkml:brushProperty name="height" value="0.6" units="cm"/>
+      <inkml:brushProperty name="color" value="#EF0C4D"/>
+      <inkml:brushProperty name="tip" value="rectangle"/>
+      <inkml:brushProperty name="rasterOp" value="maskPen"/>
+    </inkml:brush>
+  </inkml:definitions>
+  <inkml:trace contextRef="#ctx0" brushRef="#br0">355 9 16383,'70'0'0,"8"0"0,-38 0 0,31 0 0,-25 0 0,16 0 0,-9 0 0,-5 0 0,-1 0 0,-5 0 0,-2 0 0,1 0 0,-5 0 0,5 0 0,-1 0 0,2 0 0,6 0 0,-6-4 0,-2 4 0,-10-4 0,-1 4 0,-9 0 0,-5 0 0,2 0 0,-4 0 0,4 0 0,2 0 0,-6 8 0,0-3 0,0 14 0,-9-5 0,2 4 0,-6-1 0,0 2 0,0-3 0,0 7 0,0-3 0,0-1 0,0 4 0,0 2 0,0 1 0,0 7 0,0-2 0,0-1 0,0 4 0,0-4 0,-4 0 0,3-1 0,-6-5 0,6-4 0,-5-5 0,5 1 0,-4-5 0,1 8 0,0-5 0,2 1 0,-2 5 0,3-8 0,-2 9 0,0-8 0,39-50 0,-23 24 0,32-42 0,-29 32 0,-5 7 0,4-3 0,-7 1 0,3 2 0,-3-7 0,-4 3 0,0-4 0,-1 0 0,-2-1 0,3 6 0,-4-5 0,0 9 0,0-1 0,0 0 0,0 5 0,0-9 0,0 6 0,0-3 0,0 1 0,-22 50 0,13-11 0,-22 41 0,21-18 0,-3-4 0,4 5 0,-1-5 0,5 4 0,-2-9 0,2 19 0,0-22 0,-3 30 0,7-42 0,-2 18 0,3-32 0,0 4 0,-9 9 0,4-14 0,-13 14 0,6-20 0,-6 2 0,-1-3 0,4 0 0,-8 0 0,7 0 0,-7 0 0,7 0 0,-7 0 0,7 0 0,-7 0 0,3 0 0,-4 0 0,0 0 0,-5 0 0,-1 0 0,-5 0 0,0 0 0,-6 0 0,5 0 0,-10 0 0,9 0 0,-3 0 0,5 0 0,0 0 0,0 0 0,5 0 0,-4 0 0,-18 0 0,12 0 0,-44 0 0,47 0 0,-36 0 0,44 0 0,-21 3 0,28-2 0,-15 2 0,20-3 0,-21 0 0,16 0 0,-24 0 0,23 0 0,-18 0 0,24 0 0,-13 0 0,17-3 0,0-3 0,13-16 0,7 3 0,4-7 0,4 11 0,9-12 0,3 3 0,-3-6 0,-1-15 0,-15 21 0,3-58 0,-6 37 0,-2-10 0,1 0 0,1 10 0,3-38 0,-4 62 0,-1-23 0,-3 35 0,0-10 0,18 10 0,0 1 0,9 2 0,5 2 0,-15 4 0,20 0 0,-19 0 0,22 10 0,-22-4 0,28 25 0,-27-16 0,31 24 0,-31-25 0,49 14 0,-35-22 0,56 5 0,-48-11 0,22 0 0,-37 0 0,12 0 0,-20 0 0,15 3 0,-20-2 0,12 2 0,-16-3 0,20 0 0,-15 0 0,23 0 0,-19 0 0,22 0 0,-22 0 0,26 0 0,-21 0 0,31 0 0,-29 0 0,24 4 0,-30-3 0,11 5 0,-18-5 0,0 2 0</inkml:trace>
+</inkml:ink>
+</file>
+
+<file path=ppt/ink/ink122.xml><?xml version="1.0" encoding="utf-8"?>
+<inkml:ink xmlns:inkml="http://www.w3.org/2003/InkML">
+  <inkml:definitions>
+    <inkml:context xml:id="ctx0">
+      <inkml:inkSource xml:id="inkSrc0">
+        <inkml:traceFormat>
+          <inkml:channel name="X" type="integer" min="-2.14748E9" max="2.14748E9" units="cm"/>
+          <inkml:channel name="Y" type="integer" min="-2.14748E9" max="2.14748E9" units="cm"/>
+          <inkml:channel name="F" type="integer" max="32767" units="dev"/>
+        </inkml:traceFormat>
+        <inkml:channelProperties>
+          <inkml:channelProperty channel="X" name="resolution" value="1000" units="1/cm"/>
+          <inkml:channelProperty channel="Y" name="resolution" value="1000" units="1/cm"/>
+          <inkml:channelProperty channel="F" name="resolution" value="0" units="1/dev"/>
+        </inkml:channelProperties>
+      </inkml:inkSource>
+      <inkml:timestamp xml:id="ts0" timeString="2022-09-11T15:14:16.851"/>
+    </inkml:context>
+    <inkml:brush xml:id="br0">
+      <inkml:brushProperty name="width" value="0.3" units="cm"/>
+      <inkml:brushProperty name="height" value="0.6" units="cm"/>
+      <inkml:brushProperty name="color" value="#EF0C4D"/>
+      <inkml:brushProperty name="tip" value="rectangle"/>
+      <inkml:brushProperty name="rasterOp" value="maskPen"/>
+    </inkml:brush>
+  </inkml:definitions>
+  <inkml:trace contextRef="#ctx0" brushRef="#br0">133 169 16383,'88'-24'0,"-3"-8"0,-27 20 0,13-18 0,-19 14 0,15-6 0,-12 8 0,-7 4 0,-12 5 0,-7 1 0,-9 4 0,-1 0 0,9 0 0,-6 0 0,15 0 0,-11 0 0,29 0 0,-24 0 0,24 0 0,-37 0 0,10 0 0,-19 0 0,9 0 0,-1 0 0,-6 0 0,11 6 0,-8 1 0,3 4 0,12 3 0,-15-6 0,16 12 0,-21-11 0,14 20 0,-15-20 0,8 24 0,-8-24 0,2 15 0,-3-10 0,0 8 0,0-7 0,3 11 0,-2-13 0,4 10 0,-4-11 0,11 16 0,-10-17 0,10 24 0,-11-25 0,8 23 0,-11-20 0,11 24 0,-10-14 0,4 18 0,-2-19 0,2 16 0,-5-25 0,4 16 0,-8-21 0,2 8 0,0 1 0,-2-8 0,-16 9 0,4-15 0,-16 0 0,13-3 0,-5 0 0,-1 0 0,-9 0 0,4 0 0,-9 0 0,-2 0 0,0 0 0,-5 0 0,1 5 0,3 0 0,-9 4 0,5 0 0,-7 1 0,1-1 0,5 0 0,-4 1 0,10-2 0,0 1 0,2 0 0,9-1 0,0 3 0,2-2 0,7 2 0,-6-3 0,6-1 0,-7 5 0,3 0 0,-15 7 0,8-2 0,-4 2 0,13-7 0,3-1 0,4-4 0,-2 3 0,0 0 0,-1 0 0,-2-3 0,3 1 0,0 0 0,0 5 0,3-3 0,-3-1 0,3 1 0,-3 0 0,3 3 0,-4-49 0,1 16 0,0-43 0,-3 28 0,6-6 0,-3 5 0,-1-10 0,4 10 0,-3-5 0,4 6 0,1 5 0,0 1 0,0 5 0,0 4 0,0-3 0,0 7 0,1-3 0,-1 4 0,1-3 0,-1 2 0,1-3 0,-1 0 0,0-1 0,1 0 0,-1 2 0,1 3 0,3 0 0,-2 1 0,2-3 0,0 1 0,-2 2 0,2-5 0,1 7 0,-4-8 0,3 2 0,1 3 0,-1-2 0,1 3 0,2-1 0,-2-9 0,3 7 0,0-3 0,0 6 0,0 1 0,0 64 0,5-14 0,0 49 0,10-19 0,-1-22 0,7 20 0,-2-16 0,-3 6 0,2-2 0,-4-11 0,0-6 0,-2-11 0,-4-6 0,-1-8 0,0 2 0,-1 0 0,-2 2 0,2 2 0,-2-3 0,0 1 0,3 4 0,-3-3 0,4 7 0,0-8 0,0 8 0,-1-7 0,0-1 0,4-1 0,-3-3 0,2 4 0,-2 0 0,-1-1 0,4 1 0,-3 0 0,2-1 0,2 5 0,-4 1 0,7 4 0,-2 0 0,-1-4 0,3 3 0,-3-7 0,0 3 0,2-4 0,-6-4 0,5 2 0,-1-9 0,0-41 0,-3 11 0,-5-36 0,0 27 0,-3 0 0,3-6 0,0 5 0,1-5 0,4 6 0,-5 5 0,4 1 0,-7 5 0,6 4 0,-7 5 0,7 2 0,-4 0 0,4-5 0,0-2 0,0 1 0,0 2 0,-3 6 0,6-10 0,-5 9 0,6-9 0,0 2 0,1-1 0,3 0 0,2-8 0,3 6 0,3-8 0,-2 9 0,4-4 0,-9 9 0,0-1 0,-2 4 0,-7 8 0,9-4 0,-2 8 0,4-2 0,-1 3 0,0 0 0,-2 0 0,2 0 0,-1 6 0,1 2 0,5 3 0,-3-4 0,4 0 0,-7-3 0,7 0 0,-3 3 0,4-2 0,-4 2 0,3 1 0,-8 0 0,9 0 0,-9-1 0,4 1 0,-8-1 0,6 0 0,-6-1 0,0 9 0,-5-2 0,-6 6 0,0-4 0,0 0 0,-7 10 0,2-8 0,-6 9 0,0-7 0,-1 1 0,-4 4 0,-5 1 0,-1 5 0,-5-2 0,0 3 0,1-5 0,4-5 0,-3 4 0,5-8 0,-1 0 0,-2-2 0,3-3 0,-4 1 0,4-2 0,-3 0 0,8-2 0,-4 2 0,4-4 0,4-3 0,42-28 0,-9 10 0,31-23 0,-19 20 0,-4 4 0,11-7 0,-4 6 0,9-6 0,-14 7 0,22-8 0,-32 14 0,15-10 0,-29 16 0,2-2 0,2-20 0,-6 2 0,2-6 0,-8 12 0</inkml:trace>
+</inkml:ink>
+</file>
+
+<file path=ppt/ink/ink123.xml><?xml version="1.0" encoding="utf-8"?>
+<inkml:ink xmlns:inkml="http://www.w3.org/2003/InkML">
+  <inkml:definitions>
+    <inkml:context xml:id="ctx0">
+      <inkml:inkSource xml:id="inkSrc0">
+        <inkml:traceFormat>
+          <inkml:channel name="X" type="integer" min="-2.14748E9" max="2.14748E9" units="cm"/>
+          <inkml:channel name="Y" type="integer" min="-2.14748E9" max="2.14748E9" units="cm"/>
+          <inkml:channel name="F" type="integer" max="32767" units="dev"/>
+        </inkml:traceFormat>
+        <inkml:channelProperties>
+          <inkml:channelProperty channel="X" name="resolution" value="1000" units="1/cm"/>
+          <inkml:channelProperty channel="Y" name="resolution" value="1000" units="1/cm"/>
+          <inkml:channelProperty channel="F" name="resolution" value="0" units="1/dev"/>
+        </inkml:channelProperties>
+      </inkml:inkSource>
+      <inkml:timestamp xml:id="ts0" timeString="2022-09-11T15:14:24.128"/>
+    </inkml:context>
+    <inkml:brush xml:id="br0">
+      <inkml:brushProperty name="width" value="0.3" units="cm"/>
+      <inkml:brushProperty name="height" value="0.6" units="cm"/>
+      <inkml:brushProperty name="color" value="#EF0C4D"/>
+      <inkml:brushProperty name="tip" value="rectangle"/>
+      <inkml:brushProperty name="rasterOp" value="maskPen"/>
+    </inkml:brush>
+  </inkml:definitions>
+  <inkml:trace contextRef="#ctx0" brushRef="#br0">33 693 16383,'45'-33'0,"0"6"0,-19 6 0,4 0 0,4 2 0,-6-2 0,13-2 0,-15 1 0,10 3 0,-14-4 0,11 8 0,-15-1 0,10 1 0,-12 3 0,7-4 0,-11 1 0,6 0 0,-6 0 0,2 1 0,1-1 0,0 0 0,-1 1 0,-2-1 0,-2 4 0,0-3 0,1 4 0,0-1 0,1-5 0,-4 4 0,2-2 0,0-2 0,-3 9 0,6-9 0,-3 3 0,0 3 0,2-9 0,-4 7 0,2-5 0,0 2 0,-1 1 0,4-1 0,-5 4 0,3-3 0,5 12 0,-3 0 0,7 9 0,-6 0 0,1 4 0,0-3 0,-4 6 0,3-3 0,-6 0 0,6 3 0,-7-3 0,7 1 0,-6 1 0,6-4 0,-2 4 0,2-4 0,1 4 0,4-4 0,-3 2 0,2-1 0,-3-1 0,0 1 0,-1 1 0,1-3 0,-4 2 0,2 4 0,-5-6 0,5 11 0,-2-7 0,0 2 0,-1 0 0,-3-3 0,4 1 0,-3 1 0,5-2 0,-2 3 0,-1-4 0,6 3 0,-8-5 0,9 5 0,-3-2 0,2 0 0,1 0 0,-6-4 0,3 0 0,0 3 0,-2-3 0,5 4 0,-7-2 0,5-1 0,-2 5 0,-2-5 0,4 4 0,-4-5 0,5 0 0,0-4 0,1-3 0,1 0 0,0 0 0,-4 0 0,4 3 0,-3-2 0,1 2 0,0-3 0,-2 0 0,5-3 0,-51 36 0,28-21 0,-42 31 0,38-32 0,-2-1 0,0 2 0,0-1 0,-1 3 0,-5 1 0,8-6 0,-5 3 0,3 1 0,0-5 0,-3 4 0,-4-2 0,6-2 0,-6 2 0,6-3 0,-7 3 0,3-2 0,1 2 0,-3 1 0,9-4 0,-8 6 0,6-3 0,-1 0 0,-1 3 0,4-3 0,-4 3 0,2-3 0,-3 2 0,0-1 0,2-1 0,2 5 0,-1-4 0,0 2 0,-7 0 0,6-2 0,-2 0 0,2-1 0,1 0 0,-1 0 0,-2 4 0,3-1 0,0-3 0,-3 0 0,2-1 0,-3 2 0,2-1 0,-1 3 0,0-6 0,-4 5 0,6-4 0,-5 2 0,6-1 0,-3-2 0,-2 2 0,1-2 0,-2-3 0,0-2 0,2-2 0,-3 0 0,3 0 0,-1 0 0,-3 0 0,0 0 0,3 0 0,-4-3 0,7-4 0,-5-1 0,0-4 0,5 7 0,-5-5 0,7 4 0,-5-2 0,-1-5 0,3 1 0,-3 1 0,8 1 0,-6 3 0,-4-4 0,-2-1 0,-2 1 0,3-4 0,0 7 0,3-6 0,-3 2 0,1-3 0,2 0 0,-3 0 0,4 0 0,1 1 0,-1-1 0,0 0 0,1 4 0,3 1 0,-3-1 0,3 3 0,-4-2 0,-3 3 0,3-1 0,-3 1 0,4 0 0,3 0 0,-10-4 0,9 0 0,-10 0 0,11 1 0,-2 2 0,-5-2 0,5 2 0,-7 1 0,9-2 0,-3 8 0,-2-8 0,2 5 0,-2-5 0,3 2 0,4-5 0,2-3 0,5 1 0,29-2 0,-4 6 0,35 5 0,-8-4 0,5 8 0,4-8 0,-4 8 0,6-3 0,0 4 0,-6 0 0,-7 0 0,-12 0 0,-7 0 0,-5 0 0,-4 0 0,-1 3 0,-8-2 0,6 5 0,-3-2 0,0 0 0,5 2 0,-8-5 0,9 2 0,-4-3 0,1 0 0,-2 0 0,4 0 0,1 0 0,0 0 0,-1 0 0,-5 0 0,0-3 0,3-1 0,-3 0 0,3-2 0,0 2 0,-5-3 0,4 1 0,-2-1 0,0 0 0,4-4 0,-3 3 0,-1-6 0,5 2 0,1-3 0,4-1 0,7-6 0,-6 5 0,6-10 0,-6 10 0,-4-3 0,-2 8 0,-5-2 0,1 6 0,0-2 0,-1 2 0,0 1 0,0 0 0,2 4 0,-2-3 0,2 5 0,1-1 0,-3 2 0,3 0 0,-4 0 0</inkml:trace>
+</inkml:ink>
+</file>
+
+<file path=ppt/ink/ink124.xml><?xml version="1.0" encoding="utf-8"?>
+<inkml:ink xmlns:inkml="http://www.w3.org/2003/InkML">
+  <inkml:definitions>
+    <inkml:context xml:id="ctx0">
+      <inkml:inkSource xml:id="inkSrc0">
+        <inkml:traceFormat>
+          <inkml:channel name="X" type="integer" min="-2.14748E9" max="2.14748E9" units="cm"/>
+          <inkml:channel name="Y" type="integer" min="-2.14748E9" max="2.14748E9" units="cm"/>
+          <inkml:channel name="F" type="integer" max="32767" units="dev"/>
+        </inkml:traceFormat>
+        <inkml:channelProperties>
+          <inkml:channelProperty channel="X" name="resolution" value="1000" units="1/cm"/>
+          <inkml:channelProperty channel="Y" name="resolution" value="1000" units="1/cm"/>
+          <inkml:channelProperty channel="F" name="resolution" value="0" units="1/dev"/>
+        </inkml:channelProperties>
+      </inkml:inkSource>
+      <inkml:timestamp xml:id="ts0" timeString="2022-09-11T15:14:31.871"/>
+    </inkml:context>
+    <inkml:brush xml:id="br0">
+      <inkml:brushProperty name="width" value="0.3" units="cm"/>
+      <inkml:brushProperty name="height" value="0.6" units="cm"/>
+      <inkml:brushProperty name="color" value="#EF0C4D"/>
+      <inkml:brushProperty name="tip" value="rectangle"/>
+      <inkml:brushProperty name="rasterOp" value="maskPen"/>
+    </inkml:brush>
+  </inkml:definitions>
+  <inkml:trace contextRef="#ctx0" brushRef="#br0">608 0 16383,'11'41'0,"3"-8"0,1-22 0,1-4 0,3 1 0,5-4 0,-7 3 0,15-6 0,-10 5 0,7-5 0,-5 6 0,-4-2 0,-2-1 0,-3 2 0,0-1 0,-1 5 0,0 0 0,0 1 0,-1-2 0,1-5 0,7-1 0,-5-3 0,6 4 0,-5-4 0,-1 7 0,0-6 0,-2 5 0,3 1 0,-4 0 0,1 2 0,1-2 0,-4-1 0,4 1 0,1-4 0,-2 0 0,5-3 0,-5 0 0,3 0 0,-2 0 0,-1 0 0,5 0 0,-5 0 0,2 0 0,0 0 0,-2 0 0,4 0 0,-4 0 0,4 0 0,-5-3 0,5 2 0,-3-1 0,1 2 0,2 0 0,-5 0 0,-33 28 0,15-18 0,-28 21 0,23-21 0,5-2 0,-10 8 0,7-1 0,-10 7 0,7-4 0,-4 1 0,7-4 0,-2-1 0,3-2 0,-1 4 0,1-4 0,-3 5 0,3-3 0,-3-1 0,4 0 0,2 3 0,1-2 0,3 9 0,-3-11 0,2 7 0,-2-1 0,0-5 0,3 7 0,-6-7 0,5 3 0,-2 3 0,3-5 0,0 3 0,0-1 0,-3-2 0,-1 5 0,1-5 0,0 2 0,0 0 0,-1-2 0,1 3 0,-3-1 0,5-1 0,-5 1 0,3-1 0,-12-7 0,0 0 0,-5-8 0,6 0 0,-2 0 0,1 0 0,-3 0 0,-2 0 0,5 0 0,-3 0 0,0 0 0,6 0 0,-10-3 0,13-1 0,-10-2 0,5-1 0,-1 0 0,-5 0 0,4 2 0,-1 2 0,2 3 0,0-3 0,-2 2 0,1-5 0,-1 5 0,-1-6 0,3 6 0,-3-5 0,0 5 0,3-5 0,-7 5 0,7-2 0,-4 3 0,4-4 0,0 3 0,-10-5 0,8 5 0,-9-6 0,12 6 0,-1-5 0,-4 5 0,3-6 0,-2 6 0,3-5 0,0 5 0,1-5 0,-5 5 0,7-5 0,-6 5 0,0-5 0,5 5 0,-7-6 0,10 4 0,-5-5 0,-2 1 0,5 0 0,-5 3 0,3-2 0,-1 6 0,-6-3 0,6-1 0,1 4 0,-3-7 0,6 7 0,-7-3 0,0 0 0,3-1 0,-2 0 0,2-2 0,2 5 0,-6-5 0,5 5 0,-4-1 0,2 2 0,2 0 0,39-26 0,-15 14 0,34-18 0,-25 15 0,-3 7 0,2-3 0,-7 4 0,0-4 0,2 0 0,-4 0 0,4-2 0,-6 2 0,4-4 0,0 0 0,5-3 0,-1-2 0,0 0 0,1-3 0,-4 7 0,2-3 0,-5 4 0,1 4 0,-3-2 0,3-1 0,-2-2 0,2-1 0,1 2 0,-3 0 0,7-4 0,-7 4 0,6-4 0,-6 8 0,2 0 0,3-1 0,4 25 0,2-10 0,5 24 0,-7-8 0,6-2 0,-2 2 0,8-2 0,-4-1 0,9 2 0,-9-6 0,4 4 0,-9-7 0,3 2 0,-11-4 0,12 4 0,-15-4 0,10 3 0,-12 2 0,5-4 0,5 0 0,-2-5 0,7 1 0,-8-4 0,0 7 0,3-7 0,0 3 0</inkml:trace>
+</inkml:ink>
+</file>
+
+<file path=ppt/ink/ink125.xml><?xml version="1.0" encoding="utf-8"?>
+<inkml:ink xmlns:inkml="http://www.w3.org/2003/InkML">
+  <inkml:definitions>
+    <inkml:context xml:id="ctx0">
+      <inkml:inkSource xml:id="inkSrc0">
+        <inkml:traceFormat>
+          <inkml:channel name="X" type="integer" min="-2.14748E9" max="2.14748E9" units="cm"/>
+          <inkml:channel name="Y" type="integer" min="-2.14748E9" max="2.14748E9" units="cm"/>
+          <inkml:channel name="F" type="integer" max="32767" units="dev"/>
+        </inkml:traceFormat>
+        <inkml:channelProperties>
+          <inkml:channelProperty channel="X" name="resolution" value="1000" units="1/cm"/>
+          <inkml:channelProperty channel="Y" name="resolution" value="1000" units="1/cm"/>
+          <inkml:channelProperty channel="F" name="resolution" value="0" units="1/dev"/>
+        </inkml:channelProperties>
+      </inkml:inkSource>
+      <inkml:timestamp xml:id="ts0" timeString="2022-09-11T15:15:08.039"/>
+    </inkml:context>
+    <inkml:brush xml:id="br0">
+      <inkml:brushProperty name="width" value="0.3" units="cm"/>
+      <inkml:brushProperty name="height" value="0.6" units="cm"/>
+      <inkml:brushProperty name="color" value="#EF0C4D"/>
+      <inkml:brushProperty name="tip" value="rectangle"/>
+      <inkml:brushProperty name="rasterOp" value="maskPen"/>
+    </inkml:brush>
+  </inkml:definitions>
+  <inkml:trace contextRef="#ctx0" brushRef="#br0">46 0 16383,'56'0'0,"6"0"0,-29 0 0,9 0 0,24 0 0,-24 0 0,17 0 0,-34 0 0,7 0 0,-10 0 0,15 0 0,-16 0 0,22 0 0,-28 0 0,32 4 0,-27-3 0,33 5 0,-29-1 0,25 8 0,-32-1 0,3 1 0,-11-4 0,-40 5 0,15-1 0,-30 2 0,22 0 0,0-6 0,0 6 0,4-3 0,-3 1 0,7 1 0,-3-6 0,8 2 0,-3 1 0,0 0 0,2 3 0,-5 1 0,6-1 0,-4 1 0,4 4 0,-3-4 0,1 9 0,-2-5 0,-1 1 0,4-1 0,2-4 0,2 0 0,1-1 0,-3 3 0,3-6 0,-3 5 0,-3-5 0,5-1 0,-9 3 0,10-3 0,-2 3 0,-6 0 0,2-3 0,-6 0 0,4-3 0,1 1 0,0 2 0,-1-2 0,5 1 0,-7 2 0,5-4 0,-6 4 0,7-1 0,-3-2 0,3 6 0,-4-6 0,4 6 0,-2-3 0,5 0 0,1-42 0,4 14 0,3-33 0,4 26 0,-3-1 0,2 1 0,-3 0 0,0 4 0,0-3 0,0 7 0,0-2 0,0 3 0,0 1 0,-6 60 0,4-23 0,-9 51 0,6-33 0,-4-5 0,0 5 0,4-6 0,-2-5 0,6-1 0,-2-5 0,3-4 0,0-1 0,0-4 0,0-1 0,0 7 0,-3-8 0,2 7 0,-2-6 0,3 2 0,0 4 0,-3-8 0,2 7 0,18-10 0,-5 4 0,16-6 0,-9-3 0,-4 2 0,4-5 0,-4 6 0,0-6 0,3 2 0,-2 0 0,3-2 0,-4 2 0,-1-3 0,3 0 0,-2 0 0,1 0 0,9 0 0,-9 0 0,14 0 0,-14 0 0,2-6 0,-3 1 0,-1-2 0,1-2 0,-2 4 0,-2-12 0,0 1 0,0-9 0,3-9 0,4-9 0,11-8 0,-7 3 0,11-6 0,-13 11 0,3-5 0,-5 12 0,-2 7 0,-3 5 0,-2 4 0,-3 1 0,-1 5 0,7-14 0,-1 6 0,12-24 0,-11 23 0,9-12 0,-17 27 0,3-1 0</inkml:trace>
+</inkml:ink>
+</file>
+
+<file path=ppt/ink/ink126.xml><?xml version="1.0" encoding="utf-8"?>
+<inkml:ink xmlns:inkml="http://www.w3.org/2003/InkML">
+  <inkml:definitions>
+    <inkml:context xml:id="ctx0">
+      <inkml:inkSource xml:id="inkSrc0">
+        <inkml:traceFormat>
+          <inkml:channel name="X" type="integer" min="-2.14748E9" max="2.14748E9" units="cm"/>
+          <inkml:channel name="Y" type="integer" min="-2.14748E9" max="2.14748E9" units="cm"/>
+          <inkml:channel name="F" type="integer" max="32767" units="dev"/>
+        </inkml:traceFormat>
+        <inkml:channelProperties>
+          <inkml:channelProperty channel="X" name="resolution" value="1000" units="1/cm"/>
+          <inkml:channelProperty channel="Y" name="resolution" value="1000" units="1/cm"/>
+          <inkml:channelProperty channel="F" name="resolution" value="0" units="1/dev"/>
+        </inkml:channelProperties>
+      </inkml:inkSource>
+      <inkml:timestamp xml:id="ts0" timeString="2022-09-11T15:15:12.631"/>
+    </inkml:context>
+    <inkml:brush xml:id="br0">
+      <inkml:brushProperty name="width" value="0.3" units="cm"/>
+      <inkml:brushProperty name="height" value="0.6" units="cm"/>
+      <inkml:brushProperty name="color" value="#EF0C4D"/>
+      <inkml:brushProperty name="tip" value="rectangle"/>
+      <inkml:brushProperty name="rasterOp" value="maskPen"/>
+    </inkml:brush>
+  </inkml:definitions>
+  <inkml:trace contextRef="#ctx0" brushRef="#br0">550 1 16383,'54'51'0,"-5"-4"0,-3-19 0,-2-3 0,16 4 0,-2 2 0,11-2 0,3 18 0,-16-7 0,-1 1 0,18 24 0,-12-8 0,-6-3 0,-22-15 0,24 15 0,-42-41 0,8 0 0,-14-10 0,-17-37 0,11 19 0,-16-28 0,13 29 0,0 3 0,0-9 0,0 9 0,9-8 0,-1 6 0,5 6 0,3-2 0,-45 40 0,29-24 0,-37 26 0,30-27 0,-4-2 0,-9 12 0,-2 7 0,-11 15 0,-8 9 0,-8 11 0,-5-3 0,11-3 0,-4 6 0,13-17 0,-2 9 0,8-18 0,7-2 0,6-7 0,3-7 0,2 0 0,4-6 0,-6 0 0,-6-1 0,3-2 0,-9-3 0,12 2 0,-3-3 0,-2 4 0,5-3 0,-6-1 0,0-3 0,2 0 0,-3 0 0,0 0 0,3 0 0,-7 0 0,8 0 0,-4 0 0,4-3 0,0-1 0,-3-18 0,2 8 0,-3-15 0,4 13 0,-1-7 0,1 7 0,-1-7 0,-3 7 0,3-3 0,-3 3 0,5 2 0,-1 2 0,4 2 0,-3 0 0,4 2 0,-5-2 0,1-4 0,0 9 0,0-8 0,-3 6 0,1-1 0,-1-2 0,2 6 0,0-3 0,-2 6 0,1-2 0,-1 0 0,-1 2 0,6-2 0,-7 3 0,5 0 0,-1 0 0,-3 0 0,6 0 0,-6 0 0,1 0 0,4 0 0,-5 0 0,34-30 0,-7 11 0,22-25 0,-7 23 0,-10 2 0,4 4 0,-7 0 0,0 0 0,0 1 0,-3-5 0,-1 3 0,1-7 0,3 7 0,-3-7 0,3 3 0,-2-9 0,-1 4 0,0-4 0,0 5 0,0 0 0,0 4 0,0-3 0,0 3 0,0-9 0,0 3 0,1-3 0,2 9 0,-3 1 0,3 5 0,-4-1 0,0 1 0,13 41 0,-14-13 0,14 40 0,-15-24 0,0 0 0,2-1 0,-6-5 0,3 0 0,-1-4 0,-2-1 0,5-4 0,-5-1 0,5 4 0,1-3 0,4-1 0,7-4 0,2-6 0,9 4 0,1-7 0,23 7 0,-13-6 0,19 2 0,-11 1 0,1-4 0,-1 8 0,-8-5 0,-5 1 0,0 3 0,-5-7 0,-1 3 0,-5 0 0,-4-4 0,4 4 0,-5-4 0,1 0 0,3 0 0,-7 0 0,3 0 0,-4 0 0,-1-3 0,1-1 0,0-4 0,-1 1 0,1 0 0,-4-4 0,6 0 0,-8 0 0,7 1 0,-6 1 0,4-5 0,-4 2 0,0-1 0,2 1 0,-3 4 0,6-7 0,-5 4 0,0 1 0,5 1 0,-2 5 0,3 1 0,0-3 0,-3 1 0,3-2 0,0 4 0</inkml:trace>
+</inkml:ink>
+</file>
+
+<file path=ppt/ink/ink127.xml><?xml version="1.0" encoding="utf-8"?>
+<inkml:ink xmlns:inkml="http://www.w3.org/2003/InkML">
+  <inkml:definitions>
+    <inkml:context xml:id="ctx0">
+      <inkml:inkSource xml:id="inkSrc0">
+        <inkml:traceFormat>
+          <inkml:channel name="X" type="integer" min="-2.14748E9" max="2.14748E9" units="cm"/>
+          <inkml:channel name="Y" type="integer" min="-2.14748E9" max="2.14748E9" units="cm"/>
+          <inkml:channel name="F" type="integer" max="32767" units="dev"/>
+        </inkml:traceFormat>
+        <inkml:channelProperties>
+          <inkml:channelProperty channel="X" name="resolution" value="1000" units="1/cm"/>
+          <inkml:channelProperty channel="Y" name="resolution" value="1000" units="1/cm"/>
+          <inkml:channelProperty channel="F" name="resolution" value="0" units="1/dev"/>
+        </inkml:channelProperties>
+      </inkml:inkSource>
       <inkml:timestamp xml:id="ts0" timeString="2022-09-11T15:15:17.923"/>
     </inkml:context>
     <inkml:brush xml:id="br0">
@@ -826,7 +1016,7 @@
 </inkml:ink>
 </file>
 
-<file path=ppt/ink/ink121.xml><?xml version="1.0" encoding="utf-8"?>
+<file path=ppt/ink/ink128.xml><?xml version="1.0" encoding="utf-8"?>
 <inkml:ink xmlns:inkml="http://www.w3.org/2003/InkML">
   <inkml:definitions>
     <inkml:context xml:id="ctx0">
@@ -856,7 +1046,7 @@
 </inkml:ink>
 </file>
 
-<file path=ppt/ink/ink122.xml><?xml version="1.0" encoding="utf-8"?>
+<file path=ppt/ink/ink129.xml><?xml version="1.0" encoding="utf-8"?>
 <inkml:ink xmlns:inkml="http://www.w3.org/2003/InkML">
   <inkml:definitions>
     <inkml:context xml:id="ctx0">
@@ -883,208 +1073,6 @@
     </inkml:brush>
   </inkml:definitions>
   <inkml:trace contextRef="#ctx0" brushRef="#br0">37 55 16383,'57'0'0,"-7"0"0,-4 0 0,-9 0 0,9 0 0,-10 0 0,21 0 0,-23 0 0,35 0 0,-47 0 0,40 0 0,-40 0 0,11 0 0,-17 0 0,4 0 0,-7 0 0,42-11 0,-29 5 0,31-10 0,-36 9 0,10-1 0,-16 4 0,4 1 0,-6 3 0,4 0 0,-1 0 0,-2 6 0,2 5 0,-12 4 0,6 7 0,-9-6 0,3 7 0,-4 1 0,0 2 0,0 3 0,0-5 0,0 0 0,-4-4 0,0-1 0,0-5 0,1 1 0,3 3 0,0-3 0,0 3 0,0 1 0,0-4 0,0 8 0,0-3 0,0 5 0,0-6 0,0 5 0,0-9 0,0 4 0,0-4 0,0-1 0,3 8 0,1-6 0,4 9 0,-1-9 0,1 7 0,0-3 0,0 4 0,-3-4 0,2-1 0,-7 0 0,7-7 0,-7 8 0,3-9 0,-6 8 0,-3-6 0,-8 0 0,-1-3 0,-2-3 0,-1 0 0,3 1 0,1-4 0,-3 2 0,5-5 0,-5 1 0,-4-2 0,0 4 0,-1-3 0,-1 3 0,3-4 0,-9 0 0,3 0 0,-3 0 0,0 0 0,4 3 0,-9-2 0,9 3 0,-4-4 0,5 0 0,4 0 0,-5 0 0,12 0 0,-10 0 0,6 0 0,-1 3 0,1-3 0,2 6 0,1-2 0,-11 0 0,6-1 0,-7 1 0,6-3 0,-9 2 0,4-3 0,-4 0 0,5 0 0,0 0 0,4 0 0,1 0 0,4 0 0,1 0 0,4-22 0,3 6 0,8-24 0,4 10 0,8-5 0,-3 0 0,2 0 0,-3-5 0,0 3 0,0-3 0,0 10 0,-5-4 0,0 9 0,-4-4 0,0 4 0,0 1 0,0 4 0,0 2 0,0 3 0,0 0 0,0-2 0,-12 5 0,-1 2 0,-4 7 0,-3 3 0,9 0 0,-10 0 0,7 0 0,-2 6 0,-1-2 0,57 6 0,-30-3 0,42-3 0,-38 3 0,-6-4 0,15 8 0,-10-6 0,11 4 0,-5-8 0,6 2 0,5-3 0,5 4 0,0-3 0,6 3 0,-5-4 0,5 0 0,-6 0 0,-9 0 0,2 0 0,-16 0 0,6 0 0,-5 0 0,2 0 0,4 0 0,-6 3 0,3-2 0,0 1 0,-2-2 0,2-3 0,5-1 0,-5 0 0,2 1 0,-5-1 0,1 3 0,-61-2 0,15 3 0,-57 5 0,34 0 0,-5 1 0,11-2 0,-11-4 0,17 0 0,-4 0 0,12 0 0,9 0 0,3 0 0,8 0 0,0 0 0</inkml:trace>
-</inkml:ink>
-</file>
-
-<file path=ppt/ink/ink123.xml><?xml version="1.0" encoding="utf-8"?>
-<inkml:ink xmlns:inkml="http://www.w3.org/2003/InkML">
-  <inkml:definitions>
-    <inkml:context xml:id="ctx0">
-      <inkml:inkSource xml:id="inkSrc0">
-        <inkml:traceFormat>
-          <inkml:channel name="X" type="integer" min="-2.14748E9" max="2.14748E9" units="cm"/>
-          <inkml:channel name="Y" type="integer" min="-2.14748E9" max="2.14748E9" units="cm"/>
-          <inkml:channel name="F" type="integer" max="32767" units="dev"/>
-        </inkml:traceFormat>
-        <inkml:channelProperties>
-          <inkml:channelProperty channel="X" name="resolution" value="1000" units="1/cm"/>
-          <inkml:channelProperty channel="Y" name="resolution" value="1000" units="1/cm"/>
-          <inkml:channelProperty channel="F" name="resolution" value="0" units="1/dev"/>
-        </inkml:channelProperties>
-      </inkml:inkSource>
-      <inkml:timestamp xml:id="ts0" timeString="2022-09-11T15:15:53.233"/>
-    </inkml:context>
-    <inkml:brush xml:id="br0">
-      <inkml:brushProperty name="width" value="0.3" units="cm"/>
-      <inkml:brushProperty name="height" value="0.6" units="cm"/>
-      <inkml:brushProperty name="color" value="#EF0C4D"/>
-      <inkml:brushProperty name="tip" value="rectangle"/>
-      <inkml:brushProperty name="rasterOp" value="maskPen"/>
-    </inkml:brush>
-  </inkml:definitions>
-  <inkml:trace contextRef="#ctx0" brushRef="#br0">43 0 16383,'55'0'0,"-6"0"0,-29 0 0,3 0 0,13 0 0,-2 4 0,14 4 0,-13 0 0,8 3 0,-11-4 0,14 5 0,-11-4 0,1 3 0,-14-4 0,-3-3 0,-11-1 0,13-3 0,-5 6 0,0-1 0,0 5 0,-3-4 0,1 1 0,2 0 0,-2-1 0,2-2 0,-2 2 0,2-3 0,-3 4 0,0-1 0,7 1 0,-8 0 0,6 0 0,-7-1 0,1 1 0,5-3 0,-3-1 0,3-3 0,-13 21 0,-3-9 0,-8 14 0,0-8 0,3-6 0,-3 12 0,3-9 0,-5 13 0,2-7 0,-6 13 0,0-4 0,-5 5 0,1 0 0,-1 0 0,5-4 0,-3-2 0,7-9 0,-2-2 0,4-7 0,3 3 0,-6 2 0,5-1 0,-6 4 0,3 0 0,0 1 0,0 9 0,4-8 0,0 7 0,0-12 0,4 3 0,-4-5 0,4 0 0,0 3 0,-3-1 0,3 1 0,-3-2 0,-28-45 0,7 14 0,-23-36 0,11 24 0,3 1 0,-5-2 0,2 6 0,-1 4 0,7 3 0,1 7 0,5 1 0,4 1 0,1 6 0,8-2 0,-5 3 0,2 0 0,-3 0 0,-3 0 0,8 0 0,-7 0 0,6 0 0,-8 0 0,0 0 0,2 0 0,0 0 0,5 0 0,-1 3 0,-2-2 0,42-32 0,-23 16 0,36-28 0,-31 29 0,-3-1 0,2-2 0,-2 5 0,-1-6 0,4-3 0,-6 2 0,6-9 0,-3 13 0,1-8 0,-2 10 0,0-4 0,6 6 0,10 3 0,13 2 0,-3 6 0,16 5 0,-13-1 0,8 6 0,-5-2 0,-5 1 0,-5-1 0,-9-1 0,-3 0 0,-2 0 0,3 0 0</inkml:trace>
-</inkml:ink>
-</file>
-
-<file path=ppt/ink/ink124.xml><?xml version="1.0" encoding="utf-8"?>
-<inkml:ink xmlns:inkml="http://www.w3.org/2003/InkML">
-  <inkml:definitions>
-    <inkml:context xml:id="ctx0">
-      <inkml:inkSource xml:id="inkSrc0">
-        <inkml:traceFormat>
-          <inkml:channel name="X" type="integer" min="-2.14748E9" max="2.14748E9" units="cm"/>
-          <inkml:channel name="Y" type="integer" min="-2.14748E9" max="2.14748E9" units="cm"/>
-          <inkml:channel name="F" type="integer" max="32767" units="dev"/>
-        </inkml:traceFormat>
-        <inkml:channelProperties>
-          <inkml:channelProperty channel="X" name="resolution" value="1000" units="1/cm"/>
-          <inkml:channelProperty channel="Y" name="resolution" value="1000" units="1/cm"/>
-          <inkml:channelProperty channel="F" name="resolution" value="0" units="1/dev"/>
-        </inkml:channelProperties>
-      </inkml:inkSource>
-      <inkml:timestamp xml:id="ts0" timeString="2022-09-11T15:15:58.096"/>
-    </inkml:context>
-    <inkml:brush xml:id="br0">
-      <inkml:brushProperty name="width" value="0.3" units="cm"/>
-      <inkml:brushProperty name="height" value="0.6" units="cm"/>
-      <inkml:brushProperty name="color" value="#EF0C4D"/>
-      <inkml:brushProperty name="tip" value="rectangle"/>
-      <inkml:brushProperty name="rasterOp" value="maskPen"/>
-    </inkml:brush>
-  </inkml:definitions>
-  <inkml:trace contextRef="#ctx0" brushRef="#br0">761 0 16383,'-41'38'0,"3"-2"0,6-9 0,4 9 0,1-12 0,1 10 0,10-13 0,-1-4 0,6-3 0,1-7 0,-4 9 0,5 2 0,-7 7 0,10-1 0,-9 1 0,3-5 0,0 3 0,1-8 0,0 8 0,3-10 0,0 5 0,2-8 0,-1 4 0,-7-1 0,3-2 0,-2-1 0,1 2 0,4-4 0,-14 7 0,10-7 0,-9 2 0,10-3 0,-3 4 0,4-1 0,-1 1 0,-1 2 0,2-6 0,-4 5 0,1-4 0,0 1 0,38 8 0,-7-7 0,28 11 0,-12-7 0,-9-2 0,5 9 0,-5-8 0,-4 7 0,3 1 0,-8-5 0,3 3 0,-7-4 0,2 0 0,-6-1 0,2-2 0,0 1 0,0-3 0,3 0 0,28 6 0,-17-8 0,34 10 0,-21-3 0,5 3 0,4 1 0,-15-2 0,-1-4 0,-11-2 0,-4-3 0,-4-4 0,8-9 0,-5-12 0,13-12 0,2-13 0,6-3 0,0 0 0,21-29 0,-23 34 0,29-33 0,-26 33 0,10-7 0,-12 3 0,-2 12 0,-5 0 0,-5 7 0,2 3 0,5-12 0,-3 14 0,13-19 0,-17 22 0,10-12 0,-20 16 0,7-3 0,-58 13 0,2 4 0,-36 4 0,-26 0 0,36-1 0,-33-4 0,57-3 0,-19-12 0,37 2 0,-35-12 0,41 13 0,-26-12 0,28 12 0,-15-29 0,19 21 0,-1-23 0,10 29 0,0-5 0,-20 75 0,6-7 0,-12 31 0,10-4 0,10-45 0,-8 33 0,9-37 0,-13 27 0,8-29 0,-14 21 0,15-29 0,-11 7 0,12-16 0,-33-2 0,19-6 0,-52 0 0,43 0 0,-26 0 0,35 0 0,-27 0 0,24-3 0,-27-5 0,33 0 0,-10-2 0,20 6 0,-6 1 0,-8 3 0,7 0 0,-7 0 0,10 0 0,2 3 0,-11 1 0,10 3 0,-5-3 0,2 2 0,4-5 0,-11 5 0,7-5 0,-2 2 0,-4 0 0,9-2 0,52 2 0,-14-3 0,46 0 0,-42 0 0,-1 0 0,-5 0 0,0 0 0,-4 0 0,-1 3 0,-5 5 0,1 3 0,-3 4 0,2 4 0,-6-4 0,4 4 0,-2-4 0,-2-1 0,2-3 0,-2 3 0,1-3 0,2 3 0,-1-1 0,0 1 0,0-1 0,-3-2 0,6 2 0,-2-6 0,3 6 0,1-4 0,-4 1 0,2-3 0,2 3 0,0-2 0,-1 2 0,0-3 0,-3 4 0,8 1 0,-4-1 0,13 5 0,-7-4 0,8 1 0,0 3 0,-3-3 0,-1 0 0,-2 2 0,-8-7 0,1 3 0,-3-1 0,-3-3 0,3 3 0</inkml:trace>
-</inkml:ink>
-</file>
-
-<file path=ppt/ink/ink125.xml><?xml version="1.0" encoding="utf-8"?>
-<inkml:ink xmlns:inkml="http://www.w3.org/2003/InkML">
-  <inkml:definitions>
-    <inkml:context xml:id="ctx0">
-      <inkml:inkSource xml:id="inkSrc0">
-        <inkml:traceFormat>
-          <inkml:channel name="X" type="integer" min="-2.14748E9" max="2.14748E9" units="cm"/>
-          <inkml:channel name="Y" type="integer" min="-2.14748E9" max="2.14748E9" units="cm"/>
-          <inkml:channel name="F" type="integer" max="32767" units="dev"/>
-        </inkml:traceFormat>
-        <inkml:channelProperties>
-          <inkml:channelProperty channel="X" name="resolution" value="1000" units="1/cm"/>
-          <inkml:channelProperty channel="Y" name="resolution" value="1000" units="1/cm"/>
-          <inkml:channelProperty channel="F" name="resolution" value="0" units="1/dev"/>
-        </inkml:channelProperties>
-      </inkml:inkSource>
-      <inkml:timestamp xml:id="ts0" timeString="2022-09-11T15:16:24.406"/>
-    </inkml:context>
-    <inkml:brush xml:id="br0">
-      <inkml:brushProperty name="width" value="0.1" units="cm"/>
-      <inkml:brushProperty name="height" value="0.1" units="cm"/>
-    </inkml:brush>
-  </inkml:definitions>
-  <inkml:trace contextRef="#ctx0" brushRef="#br0">88 0 24575,'0'39'0,"0"4"0,0-1 0,0-5 0,0 41 0,0-2 0,0-24 0,0 0 0,0 25 0,0-26 0,-4-17 0,3-13 0,-3 12 0,0-7 0,3 4 0,-7 4 0,-1-4 0,4 1 0,-10-2 0,13-5 0,-5 0 0,3-4 0,4-1 0,-4-8 0,4-1 0,0-3 0,-3-1 0,3 1 0,-3-1 0,3 1 0,-3-1 0,2 1 0,-2-1 0,3 1 0,0 0 0,-3-1 0,2 1 0,-1-1 0,2 1 0,0-1 0,0 1 0,0-1 0,0 1 0,0-1 0,0 1 0</inkml:trace>
-</inkml:ink>
-</file>
-
-<file path=ppt/ink/ink126.xml><?xml version="1.0" encoding="utf-8"?>
-<inkml:ink xmlns:inkml="http://www.w3.org/2003/InkML">
-  <inkml:definitions>
-    <inkml:context xml:id="ctx0">
-      <inkml:inkSource xml:id="inkSrc0">
-        <inkml:traceFormat>
-          <inkml:channel name="X" type="integer" min="-2.14748E9" max="2.14748E9" units="cm"/>
-          <inkml:channel name="Y" type="integer" min="-2.14748E9" max="2.14748E9" units="cm"/>
-          <inkml:channel name="F" type="integer" max="32767" units="dev"/>
-        </inkml:traceFormat>
-        <inkml:channelProperties>
-          <inkml:channelProperty channel="X" name="resolution" value="1000" units="1/cm"/>
-          <inkml:channelProperty channel="Y" name="resolution" value="1000" units="1/cm"/>
-          <inkml:channelProperty channel="F" name="resolution" value="0" units="1/dev"/>
-        </inkml:channelProperties>
-      </inkml:inkSource>
-      <inkml:timestamp xml:id="ts0" timeString="2022-09-11T15:16:29.469"/>
-    </inkml:context>
-    <inkml:brush xml:id="br0">
-      <inkml:brushProperty name="width" value="0.1" units="cm"/>
-      <inkml:brushProperty name="height" value="0.1" units="cm"/>
-    </inkml:brush>
-  </inkml:definitions>
-  <inkml:trace contextRef="#ctx0" brushRef="#br0">1 1 24575,'0'10'0,"0"6"0,0 1 0,0 7 0,0 5 0,0 6 0,0 2 0,0 55 0,0-43 0,0 2 0,0 0 0,0 4 0,0-5 0,0-6 0,7-4 0,-1-12 0,13 44 0,-9-40 0,11 37 0,-11-46 0,7 16 0,-9-23 0,5 8 0,-8-12 0,4 0 0,-9-5 0,3-1 0,-3 4 0,0 5 0,0 1 0,0 7 0,4-3 0,0 0 0,1 3 0,-2-11 0,0 6 0,-2-10 0,5 2 0,-2-7 0,-1 0 0,0-3 0</inkml:trace>
-</inkml:ink>
-</file>
-
-<file path=ppt/ink/ink127.xml><?xml version="1.0" encoding="utf-8"?>
-<inkml:ink xmlns:inkml="http://www.w3.org/2003/InkML">
-  <inkml:definitions>
-    <inkml:context xml:id="ctx0">
-      <inkml:inkSource xml:id="inkSrc0">
-        <inkml:traceFormat>
-          <inkml:channel name="X" type="integer" min="-2.14748E9" max="2.14748E9" units="cm"/>
-          <inkml:channel name="Y" type="integer" min="-2.14748E9" max="2.14748E9" units="cm"/>
-          <inkml:channel name="F" type="integer" max="32767" units="dev"/>
-        </inkml:traceFormat>
-        <inkml:channelProperties>
-          <inkml:channelProperty channel="X" name="resolution" value="1000" units="1/cm"/>
-          <inkml:channelProperty channel="Y" name="resolution" value="1000" units="1/cm"/>
-          <inkml:channelProperty channel="F" name="resolution" value="0" units="1/dev"/>
-        </inkml:channelProperties>
-      </inkml:inkSource>
-      <inkml:timestamp xml:id="ts0" timeString="2022-09-11T15:16:41.298"/>
-    </inkml:context>
-    <inkml:brush xml:id="br0">
-      <inkml:brushProperty name="width" value="0.3" units="cm"/>
-      <inkml:brushProperty name="height" value="0.6" units="cm"/>
-      <inkml:brushProperty name="color" value="#00B44B"/>
-      <inkml:brushProperty name="tip" value="rectangle"/>
-      <inkml:brushProperty name="rasterOp" value="maskPen"/>
-    </inkml:brush>
-  </inkml:definitions>
-  <inkml:trace contextRef="#ctx0" brushRef="#br0">146 1 16383,'40'26'0,"1"-3"0,-15-15 0,7 1 0,29-2 0,5 0 0,-8-1 0,22-1 0,-1-1 0,-28-4 0,1 2 0,1 0 0,20-1 0,8 3 0,-34-4 0,-2 0 0,-22 0 0,23 0 0,-29 0 0,23 0 0,-23-4 0,19 4 0,-20-4 0,31 4 0,-27 0 0,24-3 0,-29 2 0,14-5 0,-13 5 0,24-5 0,-23 5 0,15-2 0,-21 3 0,3-3 0,1 2 0,-2-2 0,8 6 0,-11 17 0,-1-6 0,-3 14 0,-3-14 0,0 1 0,2-1 0,-5 3 0,2-2 0,0 1 0,-2 2 0,5-3 0,-5 8 0,6-7 0,-7 3 0,4-2 0,0 8 0,0-5 0,1 7 0,1-11 0,-5 3 0,2-4 0,-3-1 0,3 3 0,-2 1 0,2 0 0,0-4 0,4 2 0,0-5 0,0 6 0,2-4 0,-2-3 0,12-4 0,-4-3 0,1-3 0,-56 0 0,20 0 0,-46 0 0,41 0 0,-9 0 0,4 0 0,-5-4 0,0-1 0,0-3 0,0-1 0,0-4 0,5 4 0,1 0 0,5 2 0,4 3 0,-3-1 0,7-1 0,-3 5 0,0-2 0,3 3 0,-2 0 0,0 0 0,-2 0 0,2 0 0,-1 0 0,4 0 0,0 0 0,-3 0 0,2 0 0,-3 0 0,0 0 0,3-4 0,-7 0 0,8-3 0,-8-1 0,3 0 0,-4 0 0,4-3 0,-3 2 0,3-5 0,-5 5 0,1-3 0,4 4 0,-3 0 0,3 4 0,-4-3 0,-5 6 0,4-2 0,-9 3 0,4 0 0,0-4 0,-4 3 0,9-2 0,-4 3 0,4-4 0,1 3 0,0-6 0,4 6 0,-3-6 0,7 6 0,-7-3 0,8 4 0,-8 0 0,7 0 0,-3 0 0,4 0 0,1 0 0,-2 0 0,2 0 0,-5 0 0,1 7 0,3-6 0,-5 12 0,12-9 0,-9 6 0,4 0 0,1-5 0,0 12 0,5-9 0,1 11 0,2-3 0,-2-5 0,6 7 0,17-7 0,-2-1 0,14-4 0,-6-6 0,-7 0 0,3 3 0,-4-2 0,-1 5 0,1-2 0,3 4 0,-3-4 0,3 2 0,-4-5 0,0 5 0,7-5 0,-9 2 0,7-3 0,-6 3 0,2-2 0,8 5 0,-7-5 0,10 2 0,-11-3 0,4 3 0,-4-2 0,0 2 0,4-3 0,-4 3 0,4 2 0,-4 2 0,-1 0 0,5 1 0,-3-1 0,3-2 0,0 1 0,1-1 0,0 3 0,3-4 0,-3 3 0,4-6 0,-4 6 0,3-3 0,-3 4 0,4 0 0,5 0 0,-4 0 0,9 1 0,-9-1 0,9 1 0,-8-1 0,9 3 0,-9-2 0,4 3 0,-10-5 0,3-2 0,-7 1 0,7-5 0,-7 6 0,3-7 0,-4 4 0,-1-4 0,5 0 0,-3 0 0,3 0 0,-1 0 0,-2 0 0,7 0 0,-7 0 0,2 0 0,-3 0 0,0 0 0,6 0 0,-5 0 0,5 0 0,-6 0 0,0 0 0,6 0 0,-5 0 0,2 0 0,-2 0 0,-5 0 0,11 0 0,-2 0 0,5 0 0,-1-7 0,-4 5 0,-1-9 0,-5 11 0,1-4 0,2 1 0,1 0 0</inkml:trace>
-</inkml:ink>
-</file>
-
-<file path=ppt/ink/ink128.xml><?xml version="1.0" encoding="utf-8"?>
-<inkml:ink xmlns:inkml="http://www.w3.org/2003/InkML">
-  <inkml:definitions>
-    <inkml:context xml:id="ctx0">
-      <inkml:inkSource xml:id="inkSrc0">
-        <inkml:traceFormat>
-          <inkml:channel name="X" type="integer" min="-2.14748E9" max="2.14748E9" units="cm"/>
-          <inkml:channel name="Y" type="integer" min="-2.14748E9" max="2.14748E9" units="cm"/>
-          <inkml:channel name="F" type="integer" max="32767" units="dev"/>
-        </inkml:traceFormat>
-        <inkml:channelProperties>
-          <inkml:channelProperty channel="X" name="resolution" value="1000" units="1/cm"/>
-          <inkml:channelProperty channel="Y" name="resolution" value="1000" units="1/cm"/>
-          <inkml:channelProperty channel="F" name="resolution" value="0" units="1/dev"/>
-        </inkml:channelProperties>
-      </inkml:inkSource>
-      <inkml:timestamp xml:id="ts0" timeString="2022-09-11T15:16:56.493"/>
-    </inkml:context>
-    <inkml:brush xml:id="br0">
-      <inkml:brushProperty name="width" value="0.3" units="cm"/>
-      <inkml:brushProperty name="height" value="0.6" units="cm"/>
-      <inkml:brushProperty name="tip" value="rectangle"/>
-      <inkml:brushProperty name="rasterOp" value="maskPen"/>
-    </inkml:brush>
-  </inkml:definitions>
-  <inkml:trace contextRef="#ctx0" brushRef="#br0">1 299 16383,'47'0'0,"-9"0"0,-10 0 0,-2 0 0,4 0 0,4 0 0,2 0 0,43 0 0,-23 0 0,24 0 0,-34 0 0,37 0 0,-36 0 0,49 0 0,-62-8 0,8 0 0,-4-12 0,-4 3 0,-1-2 0,16-6 0,-25 7 0,28-17 0,-28 21 0,25-18 0,-34 23 0,19-12 0,-26 17 0,7-8 0,-2 2 0,-2 2 0,4-6 0,-4 9 0,4-2 0,2 5 0,0 2 0,-1 0 0,0 0 0,-2 0 0,5 0 0,-6 0 0,3-6 0,0 1 0,-77 10 0,26-1 0,-56 12 0,32-6 0,10 0 0,-12 0 0,0 0 0,6-4 0,7-2 0,2-4 0,14 0 0,-7 0 0,18 0 0,-7 0 0,12 0 0,-3 0 0,2 0 0,5 0 0,-8 4 0,5 0 0,-3 3 0,4 0 0,1 0 0,3 3 0,-4-3 0,-7 10 0,4-5 0,-4 7 0,5 0 0,1 0 0,-1 6 0,0-1 0,0 0 0,3-4 0,-2 3 0,7-3 0,-4 0 0,4 8 0,-3-7 0,-3 13 0,-3 1 0,-1 2 0,-5 9 0,4-10 0,-4 10 0,9-10 0,-2 0 0,7-11 0,-2-10 0,7-1 0,1-1 0,9 5 0,1-2 0,4-6 0,4-1 0,-1-5 0,3 0 0,3 5 0,-9-5 0,6 3 0,-3 2 0,-2-7 0,7 7 0,-5-2 0,4 1 0,4 2 0,-7 1 0,4 1 0,-4 2 0,0 1 0,-4-4 0,-1-1 0,0 3 0,-6 2 0,3 4 0,-7-2 0,0-2 0,0-1 0,0 5 0,0-3 0,0 7 0,0-7 0,0 3 0,-4-5 0,3 1 0,-5 2 0,6-2 0,-6 0 0,2 2 0,0-3 0,-2 3 0,2-4 0,-5 0 0,2 2 0,0-1 0,29-2 0,-13-5 0,19-4 0,-15-3 0,-1 0 0,12 0 0,-4 0 0,7 0 0,-3 0 0,0-8 0,0 3 0,0-10 0,1 2 0,-1 1 0,0-3 0,0 2 0,0 1 0,0-3 0,-4 6 0,3-6 0,-3 6 0,0-2 0,-1 3 0,-8 1 0,6 0 0,-6 0 0,6 1 0,-2 2 0,-2-5 0,8 4 0,-9-2 0,9 1 0,-10 2 0,6-3 0,-1 0 0,1 0 0,-2-1 0,0 1 0,-1-4 0,5 3 0,-3-3 0,3 3 0,-8 1 0,3 0 0,0 1 0,1 2 0,1-2 0,-2 5 0,3-5 0,2 5 0,-5-2 0,3-1 0,-4 4 0,2-7 0,4 7 0,-5-6 0,2 5 0,1-8 0,-1 7 0,-2-7 0,2 8 0,-5-4 0,0-12 0,-5 3 0,-6-10 0,3 9 0,-2 1 0,2-3 0,-3 3 0,0-7 0,0-3 0,0-1 0,0-4 0,0 5 0,0-5 0,0-1 0,0 0 0,-3-10 0,2 17 0,-3-3 0,4 16 0,-14 3 0,-2 10 0,-4-2 0,1 10 0,11-5 0,-6 2 0,0 5 0,-1-4 0,-3 5 0,3-7 0,-4 5 0,-1-4 0,-4 7 0,-5-2 0,-1 0 0,-5 4 0,0-7 0,0 6 0,5-6 0,1 2 0,9-4 0,1-1 0,8-3 0,-5 3 0,2-1 0,-2 1 0,0 2 0,-1-2 0,6-1 0,-8 1 0,8 0 0,-6-1 0,0 4 0,3-3 0,-4 4 0,4-1 0,3-2 0,-3 3 0,3-2 0,0 2 0,-4-4 0,-3-1 0,6-6 0,-1 0 0</inkml:trace>
-</inkml:ink>
-</file>
-
-<file path=ppt/ink/ink129.xml><?xml version="1.0" encoding="utf-8"?>
-<inkml:ink xmlns:inkml="http://www.w3.org/2003/InkML">
-  <inkml:definitions>
-    <inkml:context xml:id="ctx0">
-      <inkml:inkSource xml:id="inkSrc0">
-        <inkml:traceFormat>
-          <inkml:channel name="X" type="integer" min="-2.14748E9" max="2.14748E9" units="cm"/>
-          <inkml:channel name="Y" type="integer" min="-2.14748E9" max="2.14748E9" units="cm"/>
-          <inkml:channel name="F" type="integer" max="32767" units="dev"/>
-        </inkml:traceFormat>
-        <inkml:channelProperties>
-          <inkml:channelProperty channel="X" name="resolution" value="1000" units="1/cm"/>
-          <inkml:channelProperty channel="Y" name="resolution" value="1000" units="1/cm"/>
-          <inkml:channelProperty channel="F" name="resolution" value="0" units="1/dev"/>
-        </inkml:channelProperties>
-      </inkml:inkSource>
-      <inkml:timestamp xml:id="ts0" timeString="2022-09-11T15:17:03.604"/>
-    </inkml:context>
-    <inkml:brush xml:id="br0">
-      <inkml:brushProperty name="width" value="0.3" units="cm"/>
-      <inkml:brushProperty name="height" value="0.6" units="cm"/>
-      <inkml:brushProperty name="tip" value="rectangle"/>
-      <inkml:brushProperty name="rasterOp" value="maskPen"/>
-    </inkml:brush>
-  </inkml:definitions>
-  <inkml:trace contextRef="#ctx0" brushRef="#br0">996 1 16383,'-20'53'0,"4"-6"0,-5-22 0,-6 11 0,5-13 0,-7 17 0,5-17 0,2 3 0,2-6 0,0-1 0,1-3 0,-3 9 0,2-5 0,-5 7 0,-4 9 0,1-7 0,-17 25 0,20-24 0,-19 24 0,16-20 0,-11 9 0,1-5 0,4 0 0,2-5 0,6-6 0,5-3 0,2-8 0,3 3 0,2-4 0,2-4 0,2 3 0,0-6 0,2 8 0,-2-5 0,1 2 0,1 2 0,-4-5 0,2 3 0,-3-4 0,0-2 0,37 9 0,-15-3 0,35 9 0,-28-3 0,8-2 0,-8 2 0,8 1 0,-8-4 0,4 4 0,-6-5 0,1-1 0,0-2 0,-1 2 0,-3-6 0,7 2 0,-5 1 0,10-2 0,-3 2 0,0 0 0,3 1 0,-8-1 0,8 5 0,-7-5 0,3 4 0,-8-3 0,-1-2 0,3 2 0,-5-1 0,7 2 0,-5-4 0,2 1 0,-1 1 0,2 6 0,-5-2 0,2-1 0,-3 0 0,3-4 0,-2 8 0,-2-4 0,0 2 0,6-5 0,0-2 0,7-3 0,-6 1 0,0 2 0,7-4 0,-5 1 0,5-6 0,-1 0 0,-7 0 0,6 0 0,-4 0 0,0 0 0,5-10 0,-8 1 0,3-13 0,1 6 0,-2-7 0,7-3 0,-3 1 0,4-5 0,-4 6 0,4-1 0,-9 5 0,2 1 0,-6 8 0,2 1 0,3-6 0,-5 7 0,5-11 0,-6 9 0,1-8 0,3-1 0,1 0 0,4-3 0,0 3 0,-4 0 0,-1 1 0,0 5 0,-3-1 0,2 0 0,1 1 0,-3 3 0,6-3 0,-3 3 0,0 0 0,2-2 0,-3 2 0,4 4 0,2-8 0,-5 9 0,2-11 0,-2 10 0,3-10 0,-2 8 0,4-4 0,-22-6 0,3 9 0,-11-12 0,0 11 0,2-1 0,-2-2 0,-1 3 0,4-4 0,-4-4 0,7 4 0,-3-4 0,3 0 0,1 3 0,-1-3 0,0 1 0,1 2 0,-1-3 0,4 0 0,-2 3 0,2-2 0,0 3 0,-3-4 0,3 3 0,-1-3 0,-4 2 0,4 1 0,-2 2 0,-5-2 0,7 8 0,-8-7 0,-2 10 0,4-1 0,-9 6 0,3 0 0,2 7 0,-7 2 0,0 16 0,-4 3 0,-3 14 0,1 1 0,-7 13 0,10-13 0,-10 17 0,11-17 0,-5 10 0,1-10 0,8-7 0,0-6 0,11-10 0,1-4 0,2-3 0,40-20 0,-25 10 0,29-14 0,-94 7 0,28-5 0,-57-5 0,49-4 0,-6-5 0,7 4 0,3-2 0,3 4 0,5 4 0,8 2 0,-2 4 0,10 0 0,-10 3 0,4 1 0,-3 3 0,-1 0 0,7 0 0,-8 0 0,1 0 0,4 3 0,-5-2 0,7 5 0,-4-2 0,-1 5 0,3-1 0,0 1 0,1-1 0,-1-1 0,-1 3 0,-2-3 0,7 3 0,-5-4 0,2 0 0,-4-2 0,-1-1 0,4-3 0,-2 0 0,0 3 0,2-3 0,-5 3 0,5 0 0,-1-2 0,2 2 0</inkml:trace>
 </inkml:ink>
 </file>
 
@@ -1131,6 +1119,208 @@
           <inkml:channelProperty channel="F" name="resolution" value="0" units="1/dev"/>
         </inkml:channelProperties>
       </inkml:inkSource>
+      <inkml:timestamp xml:id="ts0" timeString="2022-09-11T15:15:53.233"/>
+    </inkml:context>
+    <inkml:brush xml:id="br0">
+      <inkml:brushProperty name="width" value="0.3" units="cm"/>
+      <inkml:brushProperty name="height" value="0.6" units="cm"/>
+      <inkml:brushProperty name="color" value="#EF0C4D"/>
+      <inkml:brushProperty name="tip" value="rectangle"/>
+      <inkml:brushProperty name="rasterOp" value="maskPen"/>
+    </inkml:brush>
+  </inkml:definitions>
+  <inkml:trace contextRef="#ctx0" brushRef="#br0">43 0 16383,'55'0'0,"-6"0"0,-29 0 0,3 0 0,13 0 0,-2 4 0,14 4 0,-13 0 0,8 3 0,-11-4 0,14 5 0,-11-4 0,1 3 0,-14-4 0,-3-3 0,-11-1 0,13-3 0,-5 6 0,0-1 0,0 5 0,-3-4 0,1 1 0,2 0 0,-2-1 0,2-2 0,-2 2 0,2-3 0,-3 4 0,0-1 0,7 1 0,-8 0 0,6 0 0,-7-1 0,1 1 0,5-3 0,-3-1 0,3-3 0,-13 21 0,-3-9 0,-8 14 0,0-8 0,3-6 0,-3 12 0,3-9 0,-5 13 0,2-7 0,-6 13 0,0-4 0,-5 5 0,1 0 0,-1 0 0,5-4 0,-3-2 0,7-9 0,-2-2 0,4-7 0,3 3 0,-6 2 0,5-1 0,-6 4 0,3 0 0,0 1 0,0 9 0,4-8 0,0 7 0,0-12 0,4 3 0,-4-5 0,4 0 0,0 3 0,-3-1 0,3 1 0,-3-2 0,-28-45 0,7 14 0,-23-36 0,11 24 0,3 1 0,-5-2 0,2 6 0,-1 4 0,7 3 0,1 7 0,5 1 0,4 1 0,1 6 0,8-2 0,-5 3 0,2 0 0,-3 0 0,-3 0 0,8 0 0,-7 0 0,6 0 0,-8 0 0,0 0 0,2 0 0,0 0 0,5 0 0,-1 3 0,-2-2 0,42-32 0,-23 16 0,36-28 0,-31 29 0,-3-1 0,2-2 0,-2 5 0,-1-6 0,4-3 0,-6 2 0,6-9 0,-3 13 0,1-8 0,-2 10 0,0-4 0,6 6 0,10 3 0,13 2 0,-3 6 0,16 5 0,-13-1 0,8 6 0,-5-2 0,-5 1 0,-5-1 0,-9-1 0,-3 0 0,-2 0 0,3 0 0</inkml:trace>
+</inkml:ink>
+</file>
+
+<file path=ppt/ink/ink131.xml><?xml version="1.0" encoding="utf-8"?>
+<inkml:ink xmlns:inkml="http://www.w3.org/2003/InkML">
+  <inkml:definitions>
+    <inkml:context xml:id="ctx0">
+      <inkml:inkSource xml:id="inkSrc0">
+        <inkml:traceFormat>
+          <inkml:channel name="X" type="integer" min="-2.14748E9" max="2.14748E9" units="cm"/>
+          <inkml:channel name="Y" type="integer" min="-2.14748E9" max="2.14748E9" units="cm"/>
+          <inkml:channel name="F" type="integer" max="32767" units="dev"/>
+        </inkml:traceFormat>
+        <inkml:channelProperties>
+          <inkml:channelProperty channel="X" name="resolution" value="1000" units="1/cm"/>
+          <inkml:channelProperty channel="Y" name="resolution" value="1000" units="1/cm"/>
+          <inkml:channelProperty channel="F" name="resolution" value="0" units="1/dev"/>
+        </inkml:channelProperties>
+      </inkml:inkSource>
+      <inkml:timestamp xml:id="ts0" timeString="2022-09-11T15:15:58.096"/>
+    </inkml:context>
+    <inkml:brush xml:id="br0">
+      <inkml:brushProperty name="width" value="0.3" units="cm"/>
+      <inkml:brushProperty name="height" value="0.6" units="cm"/>
+      <inkml:brushProperty name="color" value="#EF0C4D"/>
+      <inkml:brushProperty name="tip" value="rectangle"/>
+      <inkml:brushProperty name="rasterOp" value="maskPen"/>
+    </inkml:brush>
+  </inkml:definitions>
+  <inkml:trace contextRef="#ctx0" brushRef="#br0">761 0 16383,'-41'38'0,"3"-2"0,6-9 0,4 9 0,1-12 0,1 10 0,10-13 0,-1-4 0,6-3 0,1-7 0,-4 9 0,5 2 0,-7 7 0,10-1 0,-9 1 0,3-5 0,0 3 0,1-8 0,0 8 0,3-10 0,0 5 0,2-8 0,-1 4 0,-7-1 0,3-2 0,-2-1 0,1 2 0,4-4 0,-14 7 0,10-7 0,-9 2 0,10-3 0,-3 4 0,4-1 0,-1 1 0,-1 2 0,2-6 0,-4 5 0,1-4 0,0 1 0,38 8 0,-7-7 0,28 11 0,-12-7 0,-9-2 0,5 9 0,-5-8 0,-4 7 0,3 1 0,-8-5 0,3 3 0,-7-4 0,2 0 0,-6-1 0,2-2 0,0 1 0,0-3 0,3 0 0,28 6 0,-17-8 0,34 10 0,-21-3 0,5 3 0,4 1 0,-15-2 0,-1-4 0,-11-2 0,-4-3 0,-4-4 0,8-9 0,-5-12 0,13-12 0,2-13 0,6-3 0,0 0 0,21-29 0,-23 34 0,29-33 0,-26 33 0,10-7 0,-12 3 0,-2 12 0,-5 0 0,-5 7 0,2 3 0,5-12 0,-3 14 0,13-19 0,-17 22 0,10-12 0,-20 16 0,7-3 0,-58 13 0,2 4 0,-36 4 0,-26 0 0,36-1 0,-33-4 0,57-3 0,-19-12 0,37 2 0,-35-12 0,41 13 0,-26-12 0,28 12 0,-15-29 0,19 21 0,-1-23 0,10 29 0,0-5 0,-20 75 0,6-7 0,-12 31 0,10-4 0,10-45 0,-8 33 0,9-37 0,-13 27 0,8-29 0,-14 21 0,15-29 0,-11 7 0,12-16 0,-33-2 0,19-6 0,-52 0 0,43 0 0,-26 0 0,35 0 0,-27 0 0,24-3 0,-27-5 0,33 0 0,-10-2 0,20 6 0,-6 1 0,-8 3 0,7 0 0,-7 0 0,10 0 0,2 3 0,-11 1 0,10 3 0,-5-3 0,2 2 0,4-5 0,-11 5 0,7-5 0,-2 2 0,-4 0 0,9-2 0,52 2 0,-14-3 0,46 0 0,-42 0 0,-1 0 0,-5 0 0,0 0 0,-4 0 0,-1 3 0,-5 5 0,1 3 0,-3 4 0,2 4 0,-6-4 0,4 4 0,-2-4 0,-2-1 0,2-3 0,-2 3 0,1-3 0,2 3 0,-1-1 0,0 1 0,0-1 0,-3-2 0,6 2 0,-2-6 0,3 6 0,1-4 0,-4 1 0,2-3 0,2 3 0,0-2 0,-1 2 0,0-3 0,-3 4 0,8 1 0,-4-1 0,13 5 0,-7-4 0,8 1 0,0 3 0,-3-3 0,-1 0 0,-2 2 0,-8-7 0,1 3 0,-3-1 0,-3-3 0,3 3 0</inkml:trace>
+</inkml:ink>
+</file>
+
+<file path=ppt/ink/ink132.xml><?xml version="1.0" encoding="utf-8"?>
+<inkml:ink xmlns:inkml="http://www.w3.org/2003/InkML">
+  <inkml:definitions>
+    <inkml:context xml:id="ctx0">
+      <inkml:inkSource xml:id="inkSrc0">
+        <inkml:traceFormat>
+          <inkml:channel name="X" type="integer" min="-2.14748E9" max="2.14748E9" units="cm"/>
+          <inkml:channel name="Y" type="integer" min="-2.14748E9" max="2.14748E9" units="cm"/>
+          <inkml:channel name="F" type="integer" max="32767" units="dev"/>
+        </inkml:traceFormat>
+        <inkml:channelProperties>
+          <inkml:channelProperty channel="X" name="resolution" value="1000" units="1/cm"/>
+          <inkml:channelProperty channel="Y" name="resolution" value="1000" units="1/cm"/>
+          <inkml:channelProperty channel="F" name="resolution" value="0" units="1/dev"/>
+        </inkml:channelProperties>
+      </inkml:inkSource>
+      <inkml:timestamp xml:id="ts0" timeString="2022-09-11T15:16:24.406"/>
+    </inkml:context>
+    <inkml:brush xml:id="br0">
+      <inkml:brushProperty name="width" value="0.1" units="cm"/>
+      <inkml:brushProperty name="height" value="0.1" units="cm"/>
+    </inkml:brush>
+  </inkml:definitions>
+  <inkml:trace contextRef="#ctx0" brushRef="#br0">88 0 24575,'0'39'0,"0"4"0,0-1 0,0-5 0,0 41 0,0-2 0,0-24 0,0 0 0,0 25 0,0-26 0,-4-17 0,3-13 0,-3 12 0,0-7 0,3 4 0,-7 4 0,-1-4 0,4 1 0,-10-2 0,13-5 0,-5 0 0,3-4 0,4-1 0,-4-8 0,4-1 0,0-3 0,-3-1 0,3 1 0,-3-1 0,3 1 0,-3-1 0,2 1 0,-2-1 0,3 1 0,0 0 0,-3-1 0,2 1 0,-1-1 0,2 1 0,0-1 0,0 1 0,0-1 0,0 1 0,0-1 0,0 1 0</inkml:trace>
+</inkml:ink>
+</file>
+
+<file path=ppt/ink/ink133.xml><?xml version="1.0" encoding="utf-8"?>
+<inkml:ink xmlns:inkml="http://www.w3.org/2003/InkML">
+  <inkml:definitions>
+    <inkml:context xml:id="ctx0">
+      <inkml:inkSource xml:id="inkSrc0">
+        <inkml:traceFormat>
+          <inkml:channel name="X" type="integer" min="-2.14748E9" max="2.14748E9" units="cm"/>
+          <inkml:channel name="Y" type="integer" min="-2.14748E9" max="2.14748E9" units="cm"/>
+          <inkml:channel name="F" type="integer" max="32767" units="dev"/>
+        </inkml:traceFormat>
+        <inkml:channelProperties>
+          <inkml:channelProperty channel="X" name="resolution" value="1000" units="1/cm"/>
+          <inkml:channelProperty channel="Y" name="resolution" value="1000" units="1/cm"/>
+          <inkml:channelProperty channel="F" name="resolution" value="0" units="1/dev"/>
+        </inkml:channelProperties>
+      </inkml:inkSource>
+      <inkml:timestamp xml:id="ts0" timeString="2022-09-11T15:16:29.469"/>
+    </inkml:context>
+    <inkml:brush xml:id="br0">
+      <inkml:brushProperty name="width" value="0.1" units="cm"/>
+      <inkml:brushProperty name="height" value="0.1" units="cm"/>
+    </inkml:brush>
+  </inkml:definitions>
+  <inkml:trace contextRef="#ctx0" brushRef="#br0">1 1 24575,'0'10'0,"0"6"0,0 1 0,0 7 0,0 5 0,0 6 0,0 2 0,0 55 0,0-43 0,0 2 0,0 0 0,0 4 0,0-5 0,0-6 0,7-4 0,-1-12 0,13 44 0,-9-40 0,11 37 0,-11-46 0,7 16 0,-9-23 0,5 8 0,-8-12 0,4 0 0,-9-5 0,3-1 0,-3 4 0,0 5 0,0 1 0,0 7 0,4-3 0,0 0 0,1 3 0,-2-11 0,0 6 0,-2-10 0,5 2 0,-2-7 0,-1 0 0,0-3 0</inkml:trace>
+</inkml:ink>
+</file>
+
+<file path=ppt/ink/ink134.xml><?xml version="1.0" encoding="utf-8"?>
+<inkml:ink xmlns:inkml="http://www.w3.org/2003/InkML">
+  <inkml:definitions>
+    <inkml:context xml:id="ctx0">
+      <inkml:inkSource xml:id="inkSrc0">
+        <inkml:traceFormat>
+          <inkml:channel name="X" type="integer" min="-2.14748E9" max="2.14748E9" units="cm"/>
+          <inkml:channel name="Y" type="integer" min="-2.14748E9" max="2.14748E9" units="cm"/>
+          <inkml:channel name="F" type="integer" max="32767" units="dev"/>
+        </inkml:traceFormat>
+        <inkml:channelProperties>
+          <inkml:channelProperty channel="X" name="resolution" value="1000" units="1/cm"/>
+          <inkml:channelProperty channel="Y" name="resolution" value="1000" units="1/cm"/>
+          <inkml:channelProperty channel="F" name="resolution" value="0" units="1/dev"/>
+        </inkml:channelProperties>
+      </inkml:inkSource>
+      <inkml:timestamp xml:id="ts0" timeString="2022-09-11T15:16:41.298"/>
+    </inkml:context>
+    <inkml:brush xml:id="br0">
+      <inkml:brushProperty name="width" value="0.3" units="cm"/>
+      <inkml:brushProperty name="height" value="0.6" units="cm"/>
+      <inkml:brushProperty name="color" value="#00B44B"/>
+      <inkml:brushProperty name="tip" value="rectangle"/>
+      <inkml:brushProperty name="rasterOp" value="maskPen"/>
+    </inkml:brush>
+  </inkml:definitions>
+  <inkml:trace contextRef="#ctx0" brushRef="#br0">146 1 16383,'40'26'0,"1"-3"0,-15-15 0,7 1 0,29-2 0,5 0 0,-8-1 0,22-1 0,-1-1 0,-28-4 0,1 2 0,1 0 0,20-1 0,8 3 0,-34-4 0,-2 0 0,-22 0 0,23 0 0,-29 0 0,23 0 0,-23-4 0,19 4 0,-20-4 0,31 4 0,-27 0 0,24-3 0,-29 2 0,14-5 0,-13 5 0,24-5 0,-23 5 0,15-2 0,-21 3 0,3-3 0,1 2 0,-2-2 0,8 6 0,-11 17 0,-1-6 0,-3 14 0,-3-14 0,0 1 0,2-1 0,-5 3 0,2-2 0,0 1 0,-2 2 0,5-3 0,-5 8 0,6-7 0,-7 3 0,4-2 0,0 8 0,0-5 0,1 7 0,1-11 0,-5 3 0,2-4 0,-3-1 0,3 3 0,-2 1 0,2 0 0,0-4 0,4 2 0,0-5 0,0 6 0,2-4 0,-2-3 0,12-4 0,-4-3 0,1-3 0,-56 0 0,20 0 0,-46 0 0,41 0 0,-9 0 0,4 0 0,-5-4 0,0-1 0,0-3 0,0-1 0,0-4 0,5 4 0,1 0 0,5 2 0,4 3 0,-3-1 0,7-1 0,-3 5 0,0-2 0,3 3 0,-2 0 0,0 0 0,-2 0 0,2 0 0,-1 0 0,4 0 0,0 0 0,-3 0 0,2 0 0,-3 0 0,0 0 0,3-4 0,-7 0 0,8-3 0,-8-1 0,3 0 0,-4 0 0,4-3 0,-3 2 0,3-5 0,-5 5 0,1-3 0,4 4 0,-3 0 0,3 4 0,-4-3 0,-5 6 0,4-2 0,-9 3 0,4 0 0,0-4 0,-4 3 0,9-2 0,-4 3 0,4-4 0,1 3 0,0-6 0,4 6 0,-3-6 0,7 6 0,-7-3 0,8 4 0,-8 0 0,7 0 0,-3 0 0,4 0 0,1 0 0,-2 0 0,2 0 0,-5 0 0,1 7 0,3-6 0,-5 12 0,12-9 0,-9 6 0,4 0 0,1-5 0,0 12 0,5-9 0,1 11 0,2-3 0,-2-5 0,6 7 0,17-7 0,-2-1 0,14-4 0,-6-6 0,-7 0 0,3 3 0,-4-2 0,-1 5 0,1-2 0,3 4 0,-3-4 0,3 2 0,-4-5 0,0 5 0,7-5 0,-9 2 0,7-3 0,-6 3 0,2-2 0,8 5 0,-7-5 0,10 2 0,-11-3 0,4 3 0,-4-2 0,0 2 0,4-3 0,-4 3 0,4 2 0,-4 2 0,-1 0 0,5 1 0,-3-1 0,3-2 0,0 1 0,1-1 0,0 3 0,3-4 0,-3 3 0,4-6 0,-4 6 0,3-3 0,-3 4 0,4 0 0,5 0 0,-4 0 0,9 1 0,-9-1 0,9 1 0,-8-1 0,9 3 0,-9-2 0,4 3 0,-10-5 0,3-2 0,-7 1 0,7-5 0,-7 6 0,3-7 0,-4 4 0,-1-4 0,5 0 0,-3 0 0,3 0 0,-1 0 0,-2 0 0,7 0 0,-7 0 0,2 0 0,-3 0 0,0 0 0,6 0 0,-5 0 0,5 0 0,-6 0 0,0 0 0,6 0 0,-5 0 0,2 0 0,-2 0 0,-5 0 0,11 0 0,-2 0 0,5 0 0,-1-7 0,-4 5 0,-1-9 0,-5 11 0,1-4 0,2 1 0,1 0 0</inkml:trace>
+</inkml:ink>
+</file>
+
+<file path=ppt/ink/ink135.xml><?xml version="1.0" encoding="utf-8"?>
+<inkml:ink xmlns:inkml="http://www.w3.org/2003/InkML">
+  <inkml:definitions>
+    <inkml:context xml:id="ctx0">
+      <inkml:inkSource xml:id="inkSrc0">
+        <inkml:traceFormat>
+          <inkml:channel name="X" type="integer" min="-2.14748E9" max="2.14748E9" units="cm"/>
+          <inkml:channel name="Y" type="integer" min="-2.14748E9" max="2.14748E9" units="cm"/>
+          <inkml:channel name="F" type="integer" max="32767" units="dev"/>
+        </inkml:traceFormat>
+        <inkml:channelProperties>
+          <inkml:channelProperty channel="X" name="resolution" value="1000" units="1/cm"/>
+          <inkml:channelProperty channel="Y" name="resolution" value="1000" units="1/cm"/>
+          <inkml:channelProperty channel="F" name="resolution" value="0" units="1/dev"/>
+        </inkml:channelProperties>
+      </inkml:inkSource>
+      <inkml:timestamp xml:id="ts0" timeString="2022-09-11T15:16:56.493"/>
+    </inkml:context>
+    <inkml:brush xml:id="br0">
+      <inkml:brushProperty name="width" value="0.3" units="cm"/>
+      <inkml:brushProperty name="height" value="0.6" units="cm"/>
+      <inkml:brushProperty name="tip" value="rectangle"/>
+      <inkml:brushProperty name="rasterOp" value="maskPen"/>
+    </inkml:brush>
+  </inkml:definitions>
+  <inkml:trace contextRef="#ctx0" brushRef="#br0">1 299 16383,'47'0'0,"-9"0"0,-10 0 0,-2 0 0,4 0 0,4 0 0,2 0 0,43 0 0,-23 0 0,24 0 0,-34 0 0,37 0 0,-36 0 0,49 0 0,-62-8 0,8 0 0,-4-12 0,-4 3 0,-1-2 0,16-6 0,-25 7 0,28-17 0,-28 21 0,25-18 0,-34 23 0,19-12 0,-26 17 0,7-8 0,-2 2 0,-2 2 0,4-6 0,-4 9 0,4-2 0,2 5 0,0 2 0,-1 0 0,0 0 0,-2 0 0,5 0 0,-6 0 0,3-6 0,0 1 0,-77 10 0,26-1 0,-56 12 0,32-6 0,10 0 0,-12 0 0,0 0 0,6-4 0,7-2 0,2-4 0,14 0 0,-7 0 0,18 0 0,-7 0 0,12 0 0,-3 0 0,2 0 0,5 0 0,-8 4 0,5 0 0,-3 3 0,4 0 0,1 0 0,3 3 0,-4-3 0,-7 10 0,4-5 0,-4 7 0,5 0 0,1 0 0,-1 6 0,0-1 0,0 0 0,3-4 0,-2 3 0,7-3 0,-4 0 0,4 8 0,-3-7 0,-3 13 0,-3 1 0,-1 2 0,-5 9 0,4-10 0,-4 10 0,9-10 0,-2 0 0,7-11 0,-2-10 0,7-1 0,1-1 0,9 5 0,1-2 0,4-6 0,4-1 0,-1-5 0,3 0 0,3 5 0,-9-5 0,6 3 0,-3 2 0,-2-7 0,7 7 0,-5-2 0,4 1 0,4 2 0,-7 1 0,4 1 0,-4 2 0,0 1 0,-4-4 0,-1-1 0,0 3 0,-6 2 0,3 4 0,-7-2 0,0-2 0,0-1 0,0 5 0,0-3 0,0 7 0,0-7 0,0 3 0,-4-5 0,3 1 0,-5 2 0,6-2 0,-6 0 0,2 2 0,0-3 0,-2 3 0,2-4 0,-5 0 0,2 2 0,0-1 0,29-2 0,-13-5 0,19-4 0,-15-3 0,-1 0 0,12 0 0,-4 0 0,7 0 0,-3 0 0,0-8 0,0 3 0,0-10 0,1 2 0,-1 1 0,0-3 0,0 2 0,0 1 0,0-3 0,-4 6 0,3-6 0,-3 6 0,0-2 0,-1 3 0,-8 1 0,6 0 0,-6 0 0,6 1 0,-2 2 0,-2-5 0,8 4 0,-9-2 0,9 1 0,-10 2 0,6-3 0,-1 0 0,1 0 0,-2-1 0,0 1 0,-1-4 0,5 3 0,-3-3 0,3 3 0,-8 1 0,3 0 0,0 1 0,1 2 0,1-2 0,-2 5 0,3-5 0,2 5 0,-5-2 0,3-1 0,-4 4 0,2-7 0,4 7 0,-5-6 0,2 5 0,1-8 0,-1 7 0,-2-7 0,2 8 0,-5-4 0,0-12 0,-5 3 0,-6-10 0,3 9 0,-2 1 0,2-3 0,-3 3 0,0-7 0,0-3 0,0-1 0,0-4 0,0 5 0,0-5 0,0-1 0,0 0 0,-3-10 0,2 17 0,-3-3 0,4 16 0,-14 3 0,-2 10 0,-4-2 0,1 10 0,11-5 0,-6 2 0,0 5 0,-1-4 0,-3 5 0,3-7 0,-4 5 0,-1-4 0,-4 7 0,-5-2 0,-1 0 0,-5 4 0,0-7 0,0 6 0,5-6 0,1 2 0,9-4 0,1-1 0,8-3 0,-5 3 0,2-1 0,-2 1 0,0 2 0,-1-2 0,6-1 0,-8 1 0,8 0 0,-6-1 0,0 4 0,3-3 0,-4 4 0,4-1 0,3-2 0,-3 3 0,3-2 0,0 2 0,-4-4 0,-3-1 0,6-6 0,-1 0 0</inkml:trace>
+</inkml:ink>
+</file>
+
+<file path=ppt/ink/ink136.xml><?xml version="1.0" encoding="utf-8"?>
+<inkml:ink xmlns:inkml="http://www.w3.org/2003/InkML">
+  <inkml:definitions>
+    <inkml:context xml:id="ctx0">
+      <inkml:inkSource xml:id="inkSrc0">
+        <inkml:traceFormat>
+          <inkml:channel name="X" type="integer" min="-2.14748E9" max="2.14748E9" units="cm"/>
+          <inkml:channel name="Y" type="integer" min="-2.14748E9" max="2.14748E9" units="cm"/>
+          <inkml:channel name="F" type="integer" max="32767" units="dev"/>
+        </inkml:traceFormat>
+        <inkml:channelProperties>
+          <inkml:channelProperty channel="X" name="resolution" value="1000" units="1/cm"/>
+          <inkml:channelProperty channel="Y" name="resolution" value="1000" units="1/cm"/>
+          <inkml:channelProperty channel="F" name="resolution" value="0" units="1/dev"/>
+        </inkml:channelProperties>
+      </inkml:inkSource>
+      <inkml:timestamp xml:id="ts0" timeString="2022-09-11T15:17:03.604"/>
+    </inkml:context>
+    <inkml:brush xml:id="br0">
+      <inkml:brushProperty name="width" value="0.3" units="cm"/>
+      <inkml:brushProperty name="height" value="0.6" units="cm"/>
+      <inkml:brushProperty name="tip" value="rectangle"/>
+      <inkml:brushProperty name="rasterOp" value="maskPen"/>
+    </inkml:brush>
+  </inkml:definitions>
+  <inkml:trace contextRef="#ctx0" brushRef="#br0">996 1 16383,'-20'53'0,"4"-6"0,-5-22 0,-6 11 0,5-13 0,-7 17 0,5-17 0,2 3 0,2-6 0,0-1 0,1-3 0,-3 9 0,2-5 0,-5 7 0,-4 9 0,1-7 0,-17 25 0,20-24 0,-19 24 0,16-20 0,-11 9 0,1-5 0,4 0 0,2-5 0,6-6 0,5-3 0,2-8 0,3 3 0,2-4 0,2-4 0,2 3 0,0-6 0,2 8 0,-2-5 0,1 2 0,1 2 0,-4-5 0,2 3 0,-3-4 0,0-2 0,37 9 0,-15-3 0,35 9 0,-28-3 0,8-2 0,-8 2 0,8 1 0,-8-4 0,4 4 0,-6-5 0,1-1 0,0-2 0,-1 2 0,-3-6 0,7 2 0,-5 1 0,10-2 0,-3 2 0,0 0 0,3 1 0,-8-1 0,8 5 0,-7-5 0,3 4 0,-8-3 0,-1-2 0,3 2 0,-5-1 0,7 2 0,-5-4 0,2 1 0,-1 1 0,2 6 0,-5-2 0,2-1 0,-3 0 0,3-4 0,-2 8 0,-2-4 0,0 2 0,6-5 0,0-2 0,7-3 0,-6 1 0,0 2 0,7-4 0,-5 1 0,5-6 0,-1 0 0,-7 0 0,6 0 0,-4 0 0,0 0 0,5-10 0,-8 1 0,3-13 0,1 6 0,-2-7 0,7-3 0,-3 1 0,4-5 0,-4 6 0,4-1 0,-9 5 0,2 1 0,-6 8 0,2 1 0,3-6 0,-5 7 0,5-11 0,-6 9 0,1-8 0,3-1 0,1 0 0,4-3 0,0 3 0,-4 0 0,-1 1 0,0 5 0,-3-1 0,2 0 0,1 1 0,-3 3 0,6-3 0,-3 3 0,0 0 0,2-2 0,-3 2 0,4 4 0,2-8 0,-5 9 0,2-11 0,-2 10 0,3-10 0,-2 8 0,4-4 0,-22-6 0,3 9 0,-11-12 0,0 11 0,2-1 0,-2-2 0,-1 3 0,4-4 0,-4-4 0,7 4 0,-3-4 0,3 0 0,1 3 0,-1-3 0,0 1 0,1 2 0,-1-3 0,4 0 0,-2 3 0,2-2 0,0 3 0,-3-4 0,3 3 0,-1-3 0,-4 2 0,4 1 0,-2 2 0,-5-2 0,7 8 0,-8-7 0,-2 10 0,4-1 0,-9 6 0,3 0 0,2 7 0,-7 2 0,0 16 0,-4 3 0,-3 14 0,1 1 0,-7 13 0,10-13 0,-10 17 0,11-17 0,-5 10 0,1-10 0,8-7 0,0-6 0,11-10 0,1-4 0,2-3 0,40-20 0,-25 10 0,29-14 0,-94 7 0,28-5 0,-57-5 0,49-4 0,-6-5 0,7 4 0,3-2 0,3 4 0,5 4 0,8 2 0,-2 4 0,10 0 0,-10 3 0,4 1 0,-3 3 0,-1 0 0,7 0 0,-8 0 0,1 0 0,4 3 0,-5-2 0,7 5 0,-4-2 0,-1 5 0,3-1 0,0 1 0,1-1 0,-1-1 0,-1 3 0,-2-3 0,7 3 0,-5-4 0,2 0 0,-4-2 0,-1-1 0,4-3 0,-2 0 0,0 3 0,2-3 0,-5 3 0,5 0 0,-1-2 0,2 2 0</inkml:trace>
+</inkml:ink>
+</file>
+
+<file path=ppt/ink/ink137.xml><?xml version="1.0" encoding="utf-8"?>
+<inkml:ink xmlns:inkml="http://www.w3.org/2003/InkML">
+  <inkml:definitions>
+    <inkml:context xml:id="ctx0">
+      <inkml:inkSource xml:id="inkSrc0">
+        <inkml:traceFormat>
+          <inkml:channel name="X" type="integer" min="-2.14748E9" max="2.14748E9" units="cm"/>
+          <inkml:channel name="Y" type="integer" min="-2.14748E9" max="2.14748E9" units="cm"/>
+          <inkml:channel name="F" type="integer" max="32767" units="dev"/>
+        </inkml:traceFormat>
+        <inkml:channelProperties>
+          <inkml:channelProperty channel="X" name="resolution" value="1000" units="1/cm"/>
+          <inkml:channelProperty channel="Y" name="resolution" value="1000" units="1/cm"/>
+          <inkml:channelProperty channel="F" name="resolution" value="0" units="1/dev"/>
+        </inkml:channelProperties>
+      </inkml:inkSource>
       <inkml:timestamp xml:id="ts0" timeString="2022-09-11T15:17:09.676"/>
     </inkml:context>
     <inkml:brush xml:id="br0">
@@ -1144,7 +1334,7 @@
 </inkml:ink>
 </file>
 
-<file path=ppt/ink/ink131.xml><?xml version="1.0" encoding="utf-8"?>
+<file path=ppt/ink/ink138.xml><?xml version="1.0" encoding="utf-8"?>
 <inkml:ink xmlns:inkml="http://www.w3.org/2003/InkML">
   <inkml:definitions>
     <inkml:context xml:id="ctx0">
@@ -1173,7 +1363,7 @@
 </inkml:ink>
 </file>
 
-<file path=ppt/ink/ink132.xml><?xml version="1.0" encoding="utf-8"?>
+<file path=ppt/ink/ink139.xml><?xml version="1.0" encoding="utf-8"?>
 <inkml:ink xmlns:inkml="http://www.w3.org/2003/InkML">
   <inkml:definitions>
     <inkml:context xml:id="ctx0">
@@ -1199,209 +1389,6 @@
     </inkml:brush>
   </inkml:definitions>
   <inkml:trace contextRef="#ctx0" brushRef="#br0">62 45 16383,'64'0'0,"-14"0"0,-5 0 0,-13 0 0,8 0 0,-5 0 0,-5 0 0,-1 0 0,-5 0 0,-7 0 0,1 0 0,-3 0 0,5 0 0,15 0 0,-3 0 0,5 0 0,-3 0 0,-4 0 0,20 0 0,-16 0 0,11 0 0,-10 0 0,-13-6 0,23 4 0,-22-4 0,38-2 0,-31 7 0,38-7 0,-44 8 0,13-3 0,-23 2 0,10-2 0,-2 3 0,3 0 0,-6 0 0,5 0 0,-11 0 0,16 0 0,-21 0 0,10-3 0,-2 3 0,-4-3 0,9 11 0,-10 1 0,2 3 0,0 1 0,-9-3 0,5 6 0,-8 1 0,2-3 0,-3 5 0,0-1 0,0 1 0,0 12 0,0-10 0,0 13 0,0-9 0,0 4 0,0 0 0,0-4 0,0 0 0,0-2 0,0-3 0,0 4 0,0 0 0,0 5 0,0-3 0,0 3 0,0-5 0,0 0 0,0 0 0,0-4 0,0-5 0,0-1 0,0 2 0,3 3 0,-2-2 0,5 0 0,-2-3 0,0 0 0,3 3 0,-36-16 0,14 0 0,-33-8 0,23 0 0,-9 6 0,4-6 0,-5 6 0,0-3 0,0 4 0,5-4 0,1 3 0,0-2 0,3-1 0,-3 3 0,0-2 0,-1 3 0,0-4 0,-4 3 0,4-2 0,-5 3 0,0 0 0,5 0 0,1 0 0,5 0 0,0 0 0,-1 0 0,6 0 0,-4 0 0,7 0 0,-3 0 0,0 0 0,-1 0 0,-10 0 0,4 0 0,-1 0 0,9 0 0,-3 3 0,8 0 0,-5 1 0,5 2 0,-1-2 0,-6-1 0,3 0 0,2 0 0,-2-2 0,3 2 0,-1-3 0,-6 3 0,9-2 0,-10 1 0,6-2 0,-5 0 0,3 0 0,4 0 0,-4 0 0,3 0 0,-6 0 0,9 0 0,-7 0 0,5-2 0,0-2 0,-1-8 0,8 1 0,0-9 0,4 3 0,3-2 0,0 2 0,0 2 0,0 0 0,0-6 0,0 5 0,0-5 0,0 6 0,0 0 0,0-6 0,0 1 0,0-2 0,0 3 0,0 4 0,4-4 0,0 4 0,3-1 0,1 2 0,-2 4 0,7-1 0,2 5 0,2 0 0,10 5 0,-1-6 0,9 6 0,5-7 0,2 7 0,6-8 0,-1 8 0,-5-3 0,4 4 0,-10 0 0,0 0 0,-2 0 0,-4 0 0,0 0 0,4 0 0,-9 0 0,9 0 0,-9 0 0,4 0 0,-5 0 0,-4 0 0,-1 0 0,0 0 0,-3 0 0,3-3 0,0 2 0,0-2 0,6 3 0,4-4 0,12-1 0,-9 0 0,8-3 0,-16 8 0,-4-4 0,-5 4 0,-1 0 0,2 0 0,-1 0 0,4 0 0,-6 0 0,0 0 0</inkml:trace>
-</inkml:ink>
-</file>
-
-<file path=ppt/ink/ink133.xml><?xml version="1.0" encoding="utf-8"?>
-<inkml:ink xmlns:inkml="http://www.w3.org/2003/InkML">
-  <inkml:definitions>
-    <inkml:context xml:id="ctx0">
-      <inkml:inkSource xml:id="inkSrc0">
-        <inkml:traceFormat>
-          <inkml:channel name="X" type="integer" min="-2.14748E9" max="2.14748E9" units="cm"/>
-          <inkml:channel name="Y" type="integer" min="-2.14748E9" max="2.14748E9" units="cm"/>
-          <inkml:channel name="F" type="integer" max="32767" units="dev"/>
-        </inkml:traceFormat>
-        <inkml:channelProperties>
-          <inkml:channelProperty channel="X" name="resolution" value="1000" units="1/cm"/>
-          <inkml:channelProperty channel="Y" name="resolution" value="1000" units="1/cm"/>
-          <inkml:channelProperty channel="F" name="resolution" value="0" units="1/dev"/>
-        </inkml:channelProperties>
-      </inkml:inkSource>
-      <inkml:timestamp xml:id="ts0" timeString="2022-09-11T15:17:24.311"/>
-    </inkml:context>
-    <inkml:brush xml:id="br0">
-      <inkml:brushProperty name="width" value="0.3" units="cm"/>
-      <inkml:brushProperty name="height" value="0.6" units="cm"/>
-      <inkml:brushProperty name="tip" value="rectangle"/>
-      <inkml:brushProperty name="rasterOp" value="maskPen"/>
-    </inkml:brush>
-  </inkml:definitions>
-  <inkml:trace contextRef="#ctx0" brushRef="#br0">0 412 16383,'61'0'0,"-4"0"0,-3 0 0,-16 0 0,33-6 0,-34-3 0,42-12 0,-21-5 0,5-1 0,-7-2 0,4 3 0,-20 2 0,19-1 0,-17 7 0,12-7 0,-5 5 0,-1 1 0,-13 6 0,-1 0 0,-9 0 0,0 1 0,-2 0 0,-11 5 0,6-1 0,-4 2 0,-2-1 0,8 0 0,-9 1 0,6 2 0,-2-5 0,-1 8 0,2-8 0,0 9 0,-1-3 0,1 3 0,0-3 0,-3 2 0,6-1 0,-6 2 0,7 0 0,-2 0 0,-4 2 0,3 2 0,-3 6 0,-2-2 0,4 9 0,-8-9 0,2 9 0,0-3 0,1 1 0,0 3 0,0-4 0,-4 1 0,4 0 0,-3-1 0,6 1 0,-6 4 0,6-4 0,-5 4 0,1-4 0,-2 4 0,-1-3 0,1 2 0,-1-6 0,0 1 0,3-2 0,-3 5 0,3-2 0,-3 6 0,0-5 0,-3-1 0,2 2 0,-2-4 0,3 4 0,2-3 0,2 1 0,-1-4 0,6 6 0,-8-8 0,6 9 0,-4-6 0,-3 0 0,9 4 0,-8-7 0,5 5 0,0-3 0,-5-3 0,11 6 0,-47 1 0,18-2 0,-32 6 0,19-6 0,3 4 0,-4 0 0,0 0 0,0 0 0,0 0 0,0 0 0,0 0 0,4 0 0,-3 0 0,7-5 0,-3 0 0,8-4 0,-5 3 0,7-2 0,-7 2 0,2 0 0,2-2 0,-5 2 0,3 0 0,2-2 0,-4 2 0,2 0 0,2-2 0,-5 2 0,7-1 0,-1-1 0,-5 7 0,8-6 0,-8 3 0,5-1 0,-4 0 0,0 8 0,0-3 0,0 3 0,0-1 0,3-5 0,1 1 0,2-4 0,2 3 0,-3 0 0,3 7 0,4-9 0,-4 5 0,4-3 0,-9-2 0,-2-1 0,-2-7 0,0-1 0,0-1 0,2 2 0,-10-3 0,7 0 0,-4 0 0,2 0 0,-1 0 0,-4-7 0,-5-3 0,4-6 0,-9-1 0,7-4 0,-2 3 0,3-7 0,2 8 0,-2-8 0,1 8 0,4-8 0,2 9 0,-1-3 0,8 4 0,-6 3 0,10-2 0,-3 6 0,-2-5 0,5 2 0,-5 1 0,6-6 0,-2 8 0,-2-8 0,-6 3 0,2-2 0,-7-8 0,6 7 0,-8-4 0,3 0 0,1 3 0,0-3 0,5 6 0,1 2 0,3 2 0,-3 0 0,65 3 0,-15 0 0,52 4 0,-20 8 0,8 2 0,2 4 0,-29-3 0,1 1 0,38 4 0,-13 3 0,4-5 0,-28-2 0,11 2 0,-19-2 0,-9-1 0,-14-3 0,-1-2 0,-8-3 0,5 0 0,-1-13 0,4-6 0,5-20 0,-10 8 0,12-14 0,-11 14 0,8-15 0,-10 14 0,4-2 0,-9 14 0,3 5 0,-4 4 0,-54 9 0,16 8 0,-53 7 0,29 7 0,5-5 0,-8 4 0,15-5 0,-16 6 0,16-5 0,-4-1 0,12-5 0,9-1 0,2 0 0,13-4 0,-2 2 0,-3-5 0,-2 2 0,2-3 0,-4 0 0,8 0 0,-5 0 0,-1 0 0,6 0 0,-7 0 0,6 0 0,-7-7 0,6 3 0,-2-6 0,5 0 0,-3 2 0,3-15 0,5 16 0,2-9 0</inkml:trace>
-</inkml:ink>
-</file>
-
-<file path=ppt/ink/ink134.xml><?xml version="1.0" encoding="utf-8"?>
-<inkml:ink xmlns:inkml="http://www.w3.org/2003/InkML">
-  <inkml:definitions>
-    <inkml:context xml:id="ctx0">
-      <inkml:inkSource xml:id="inkSrc0">
-        <inkml:traceFormat>
-          <inkml:channel name="X" type="integer" min="-2.14748E9" max="2.14748E9" units="cm"/>
-          <inkml:channel name="Y" type="integer" min="-2.14748E9" max="2.14748E9" units="cm"/>
-          <inkml:channel name="F" type="integer" max="32767" units="dev"/>
-        </inkml:traceFormat>
-        <inkml:channelProperties>
-          <inkml:channelProperty channel="X" name="resolution" value="1000" units="1/cm"/>
-          <inkml:channelProperty channel="Y" name="resolution" value="1000" units="1/cm"/>
-          <inkml:channelProperty channel="F" name="resolution" value="0" units="1/dev"/>
-        </inkml:channelProperties>
-      </inkml:inkSource>
-      <inkml:timestamp xml:id="ts0" timeString="2022-09-11T15:17:29.455"/>
-    </inkml:context>
-    <inkml:brush xml:id="br0">
-      <inkml:brushProperty name="width" value="0.3" units="cm"/>
-      <inkml:brushProperty name="height" value="0.6" units="cm"/>
-      <inkml:brushProperty name="tip" value="rectangle"/>
-      <inkml:brushProperty name="rasterOp" value="maskPen"/>
-    </inkml:brush>
-  </inkml:definitions>
-  <inkml:trace contextRef="#ctx0" brushRef="#br0">1 632 16383,'45'0'0,"-2"0"0,-23 0 0,0 0 0,-4 0 0,2-4 0,-6-3 0,7-2 0,-8-5 0,3 3 0,4-7 0,-2 3 0,2-8 0,1 3 0,-5-5 0,35-29 0,-26 26 0,31-30 0,-40 41 0,12-9 0,-18 14 0,11-14 0,-10 13 0,10-17 0,-10 14 0,10-17 0,-13 19 0,10-23 0,-11 26 0,9-22 0,-7 26 0,3-8 0,5 3 0,-7 7 0,8-14 0,-7 9 0,-2 0 0,22 27 0,-14-4 0,21 24 0,-18-8 0,7-1 0,-6 6 0,7-2 0,15 22 0,-9-17 0,29 21 0,-35-35 0,30 16 0,-36-25 0,17 7 0,-26-18 0,11 0 0,-9-3 0,4 0 0,0 0 0,-6 0 0,12 0 0,-12 0 0,18 0 0,-16 0 0,11 0 0,8 0 0,-13 0 0,10 0 0,-16 0 0,4 0 0,-1 0 0,3 0 0,-14 21 0,0-10 0,-11 17 0,1-14 0,-2 5 0,-4 0 0,-6 16 0,1-8 0,-1 8 0,2-11 0,7-4 0,-4-1 0,2-5 0,2 1 0,-3 0 0,4-4 0,-3 6 0,2-6 0,-5 7 0,4-3 0,-1-1 0,3 1 0,-4-4 0,3 3 0,-3-2 0,1 2 0,1 1 0,-1 0 0,3-4 0,-3 5 0,2-4 0,-2 4 0,1-2 0,-2-1 0,0 1 0,1 0 0,3-3 0,-3 2 0,0-2 0,-3 2 0,2-3 0,-1-1 0,-2 1 0,3 1 0,-5-4 0,6 5 0,0-5 0,-2 6 0,-8-18 0,8 1 0,-11-16 0,8 4 0,-2-3 0,-6 2 0,2-7 0,-9 6 0,4-3 0,-3 5 0,5 0 0,0 0 0,4 0 0,-3 0 0,7 1 0,-3 0 0,4 0 0,1 1 0,-1-1 0,4 4 0,-3 0 0,4 2 0,-5 4 0,-4-1 0,6 4 0,-6 1 0,5-5 0,0 2 0,-6-5 0,9 4 0,-5 0 0,-6 1 0,5 0 0,-9-3 0,12-1 0,-1 1 0,4-4 0,-3 3 0,3-5 0,0 2 0,1-3 0,3 1 0,4-4 0,0 2 0,3-3 0,0-1 0,0 0 0</inkml:trace>
-</inkml:ink>
-</file>
-
-<file path=ppt/ink/ink135.xml><?xml version="1.0" encoding="utf-8"?>
-<inkml:ink xmlns:inkml="http://www.w3.org/2003/InkML">
-  <inkml:definitions>
-    <inkml:context xml:id="ctx0">
-      <inkml:inkSource xml:id="inkSrc0">
-        <inkml:traceFormat>
-          <inkml:channel name="X" type="integer" min="-2.14748E9" max="2.14748E9" units="cm"/>
-          <inkml:channel name="Y" type="integer" min="-2.14748E9" max="2.14748E9" units="cm"/>
-          <inkml:channel name="F" type="integer" max="32767" units="dev"/>
-        </inkml:traceFormat>
-        <inkml:channelProperties>
-          <inkml:channelProperty channel="X" name="resolution" value="1000" units="1/cm"/>
-          <inkml:channelProperty channel="Y" name="resolution" value="1000" units="1/cm"/>
-          <inkml:channelProperty channel="F" name="resolution" value="0" units="1/dev"/>
-        </inkml:channelProperties>
-      </inkml:inkSource>
-      <inkml:timestamp xml:id="ts0" timeString="2022-09-11T15:17:36.598"/>
-    </inkml:context>
-    <inkml:brush xml:id="br0">
-      <inkml:brushProperty name="width" value="0.3" units="cm"/>
-      <inkml:brushProperty name="height" value="0.6" units="cm"/>
-      <inkml:brushProperty name="tip" value="rectangle"/>
-      <inkml:brushProperty name="rasterOp" value="maskPen"/>
-    </inkml:brush>
-  </inkml:definitions>
-  <inkml:trace contextRef="#ctx0" brushRef="#br0">424 1 16383,'74'0'0,"0"4"0,-12 7 0,1 5 0,-12 0 0,13-1 0,-24 2 0,20-5 0,-12 10 0,-11-12 0,2 7 0,-14-8 0,0 7 0,-2-8 0,-7 0 0,3-1 0,-5-3 0,1 3 0,0 0 0,2 0 0,-1-3 0,1 2 0,-2-5 0,0 6 0,4-3 0,-4 0 0,4 3 0,0-6 0,-3 6 0,-1-7 0,2 7 0,-6-4 0,9 1 0,-6 2 0,4-5 0,-4 5 0,5-5 0,-4 2 0,9-3 0,-5 0 0,1 0 0,4 0 0,-9 0 0,4 0 0,-4 0 0,-1 0 0,4 0 0,-3 0 0,3 3 0,-3-2 0,-1 2 0,4-3 0,-3 0 0,2 0 0,-2 3 0,-1-2 0,2 7 0,-3 0 0,-3 8 0,-4-2 0,1 3 0,-7 0 0,7-2 0,-3 3 0,0-4 0,3 1 0,-3 0 0,0 3 0,3 2 0,-7 4 0,4 1 0,-4-1 0,0 5 0,0-4 0,0 4 0,0-5 0,0 0 0,0 0 0,0-4 0,0-1 0,0-4 0,0 2 0,0-2 0,0 3 0,-3-2 0,-1-1 0,-2 1 0,-1-3 0,1 3 0,-1-2 0,-2 2 0,-1-3 0,-1 1 0,1-4 0,0 4 0,-2-7 0,-5 0 0,0-8 0,0-3 0,-2-4 0,4-2 0,-4-2 0,0 0 0,3 2 0,-3-1 0,5-1 0,-1-2 0,0 2 0,1-2 0,2 7 0,-1-7 0,-1 3 0,2 0 0,-5 1 0,3 0 0,2 2 0,-4-2 0,2 3 0,2 0 0,-8 0 0,5 0 0,1 3 0,-6 0 0,8 1 0,-10 2 0,7-2 0,-13 3 0,6 0 0,-11 0 0,2 0 0,-4 0 0,0 0 0,0 0 0,0 0 0,1 0 0,-1 0 0,5 0 0,-4 4 0,9-3 0,-9 7 0,4-7 0,0 6 0,-4-6 0,4 3 0,-5 0 0,0-4 0,0 8 0,0-3 0,0 0 0,-5 3 0,4-7 0,-4 7 0,5-3 0,-5 0 0,3 2 0,-3-6 0,-1 7 0,10-7 0,-8 4 0,13-2 0,-3-2 0,5 3 0,4-4 0,2 0 0,3 0 0,0 0 0,-2 0 0,2 0 0,-2 0 0,1 0 0,27-28 0,-8 18 0,24-22 0,-13 22 0,1-2 0,0-2 0,4-6 0,-3 4 0,9-9 0,-3 4 0,4-6 0,-4 2 0,-2 4 0,-5-2 0,-3 8 0,2-4 0,-5 0 0,2-1 0,-3-4 0,4 0 0,-3-5 0,6 3 0,-1-7 0,-2 7 0,3 1 0,-6 2 0,2 8 0,-4-1 0,3 3 0,-3 3 0,3-3 0,0-3 0,-6 4 0,2-6 0,-15 4 0,7 0 0,-9-4 0,10 7 0,-4-5 0,-13 9 0,9 2 0,-15 5 0,11-3 0,1 2 0,0 20 0,8-7 0,1 15 0,3-10 0,0-9 0,13 12 0,-3-8 0,11 2 0,-6-3 0,0-4 0,-1 1 0,5-1 0,-3 1 0,3-1 0,-5 1 0,1-1 0,0-3 0,2 2 0,-1-2 0,-2 3 0,3-3 0,-6 2 0,6-2 0,-2-1 0,-1 0 0,1-3 0</inkml:trace>
-</inkml:ink>
-</file>
-
-<file path=ppt/ink/ink136.xml><?xml version="1.0" encoding="utf-8"?>
-<inkml:ink xmlns:inkml="http://www.w3.org/2003/InkML">
-  <inkml:definitions>
-    <inkml:context xml:id="ctx0">
-      <inkml:inkSource xml:id="inkSrc0">
-        <inkml:traceFormat>
-          <inkml:channel name="X" type="integer" min="-2.14748E9" max="2.14748E9" units="cm"/>
-          <inkml:channel name="Y" type="integer" min="-2.14748E9" max="2.14748E9" units="cm"/>
-          <inkml:channel name="F" type="integer" max="32767" units="dev"/>
-        </inkml:traceFormat>
-        <inkml:channelProperties>
-          <inkml:channelProperty channel="X" name="resolution" value="1000" units="1/cm"/>
-          <inkml:channelProperty channel="Y" name="resolution" value="1000" units="1/cm"/>
-          <inkml:channelProperty channel="F" name="resolution" value="0" units="1/dev"/>
-        </inkml:channelProperties>
-      </inkml:inkSource>
-      <inkml:timestamp xml:id="ts0" timeString="2022-09-11T15:17:42.014"/>
-    </inkml:context>
-    <inkml:brush xml:id="br0">
-      <inkml:brushProperty name="width" value="0.3" units="cm"/>
-      <inkml:brushProperty name="height" value="0.6" units="cm"/>
-      <inkml:brushProperty name="tip" value="rectangle"/>
-      <inkml:brushProperty name="rasterOp" value="maskPen"/>
-    </inkml:brush>
-  </inkml:definitions>
-  <inkml:trace contextRef="#ctx0" brushRef="#br0">0 285 16383,'63'-4'0,"4"1"0,-40 3 0,19 0 0,-9-4 0,-1 4 0,3-4 0,-12 0 0,7 3 0,-10-6 0,5 2 0,-4-3 0,9 0 0,-4-5 0,0 4 0,9-4 0,-16 5 0,15-5 0,-17 5 0,4-1 0,-6 2 0,-8 3 0,2-3 0,5-3 0,-2 5 0,6-2 0,-11 4 0,12-4 0,-10 0 0,11-4 0,-9 4 0,9-4 0,-10 4 0,11-4 0,-17 5 0,8-1 0,-3-2 0,1 1 0,0-2 0,2 3 0,-5 1 0,7 2 0,-4 1 0,3 3 0,3 0 0,-4 0 0,6 0 0,-8 0 0,1 0 0,2 0 0,-3 0 0,2 0 0,0 6 0,-4 2 0,4 6 0,-8 5 0,3-3 0,0 3 0,-3-1 0,3 2 0,0 0 0,-2 3 0,2-7 0,-4 3 0,1-4 0,-1-4 0,3 2 0,-6 2 0,2 5 0,-6 4 0,3 0 0,3 11 0,2-4 0,5 10 0,-3-6 0,6-5 0,-7-1 0,6-9 0,-7 3 0,3-7 0,-3 3 0,-1-8 0,0 2 0,3-2 0,-3 6 0,3-6 0,2 1 0,-1-5 0,4-1 0,1-2 0,-3-1 0,6-3 0,-6 3 0,3-2 0,0 4 0,-2-1 0,2 3 0,-2-1 0,-1 1 0,2-3 0,-57-6 0,17-3 0,-51-9 0,22 4 0,5-4 0,1 4 0,2 1 0,10 0 0,-4 4 0,5 1 0,0 4 0,4 0 0,-2 0 0,2 0 0,1 0 0,1 0 0,0 0 0,4 0 0,-4 4 0,5 0 0,0 4 0,-1 0 0,6 3 0,0-2 0,4 1 0,0-2 0,1-1 0,-1 0 0,-4 1 0,3-1 0,-2 1 0,-1 0 0,3-1 0,-3 1 0,0-1 0,4-3 0,-4 3 0,4-6 0,0 6 0,-6-3 0,1 0 0,-7-1 0,-2 1 0,-1-3 0,0 6 0,-4-6 0,4 7 0,-5-7 0,5 6 0,1-6 0,9 6 0,1-6 0,4 2 0,1-3 0,-2 0 0,-1 0 0,1 0 0,1 0 0,-1 0 0,3 0 0,-6 0 0,6 0 0,-3-3 0,3-10 0,3 4 0,-1-11 0,4 6 0,3-1 0,-2-2 0,0 3 0,1 55 0,-1-28 0,6 44 0,0-42 0,0-4 0,0 9 0,0-9 0,0 9 0,6-4 0,4-9 0,11 2 0,-3-9 0,7 0 0,-9 0 0,7 0 0,-7 0 0,7 0 0,-8 0 0,4 0 0,0 0 0,-3 0 0,7 0 0,-3 0 0,9 0 0,-4 0 0,9 0 0,-4 0 0,0 0 0,4 0 0,-9 0 0,0 0 0,-2-4 0,-7 3 0,3-2 0,-5 3 0,1 0 0,6-3 0,-5 2 0,10-2 0,-6 3 0,0-4 0,3 3 0,-7-2 0,2 3 0,-3 0 0,0-3 0,2 2 0,-1-2 0,1 3 0,-2 0 0,4 0 0,1 0 0,4-4 0,0 3 0,0-2 0,-4 3 0,3 0 0,-7 0 0,-1 0 0,2 0 0,-5 0 0,8 0 0,-1 0 0,3 0 0,-3 0 0,4 0 0,-7 0 0,2 0 0,0 0 0,-6 0 0,10 0 0,-10-3 0,9 2 0,-7-2 0,0 3 0,3-3 0,-3 3 0,3-3 0,-1 0 0,-2 2 0,2-2 0</inkml:trace>
-</inkml:ink>
-</file>
-
-<file path=ppt/ink/ink137.xml><?xml version="1.0" encoding="utf-8"?>
-<inkml:ink xmlns:inkml="http://www.w3.org/2003/InkML">
-  <inkml:definitions>
-    <inkml:context xml:id="ctx0">
-      <inkml:inkSource xml:id="inkSrc0">
-        <inkml:traceFormat>
-          <inkml:channel name="X" type="integer" min="-2.14748E9" max="2.14748E9" units="cm"/>
-          <inkml:channel name="Y" type="integer" min="-2.14748E9" max="2.14748E9" units="cm"/>
-          <inkml:channel name="F" type="integer" max="32767" units="dev"/>
-        </inkml:traceFormat>
-        <inkml:channelProperties>
-          <inkml:channelProperty channel="X" name="resolution" value="1000" units="1/cm"/>
-          <inkml:channelProperty channel="Y" name="resolution" value="1000" units="1/cm"/>
-          <inkml:channelProperty channel="F" name="resolution" value="0" units="1/dev"/>
-        </inkml:channelProperties>
-      </inkml:inkSource>
-      <inkml:timestamp xml:id="ts0" timeString="2022-09-11T15:17:52.905"/>
-    </inkml:context>
-    <inkml:brush xml:id="br0">
-      <inkml:brushProperty name="width" value="0.3" units="cm"/>
-      <inkml:brushProperty name="height" value="0.6" units="cm"/>
-      <inkml:brushProperty name="tip" value="rectangle"/>
-      <inkml:brushProperty name="rasterOp" value="maskPen"/>
-    </inkml:brush>
-  </inkml:definitions>
-  <inkml:trace contextRef="#ctx0" brushRef="#br0">1 691 16383,'19'-35'0,"-4"-3"0,-4 26 0,0-11 0,6 2 0,0-3 0,4-2 0,-6 7 0,1-5 0,-4 9 0,3-8 0,-7 7 0,3-3 0,1 0 0,-1 4 0,2-8 0,6 2 0,-6-4 0,8 0 0,-5 1 0,-1 5 0,0 0 0,-3 4 0,-2 4 0,0-2 0,0 3 0,0-3 0,0 0 0,-4 0 0,1-3 0,3 6 0,-3-6 0,6 6 0,-6-3 0,5 0 0,-1 2 0,2 2 0,-1-1 0,4 6 0,0-2 0,0 6 0,0 0 0,3 0 0,-4 0 0,9 4 0,-9 3 0,8 6 0,-7 1 0,4 6 0,-6-4 0,-2 2 0,3 1 0,-7-7 0,3 6 0,-1-7 0,-3 0 0,9 4 0,-5-10 0,5 7 0,1-11 0,-2 5 0,5-2 0,-4 0 0,1 0 0,1-1 0,-6 0 0,7 4 0,-8-1 0,5-2 0,0 2 0,-1-2 0,1 0 0,2-1 0,-2-3 0,1 0 0,-2 0 0,-1 0 0,8 0 0,-6 0 0,5 0 0,-6 0 0,-1 0 0,3 0 0,-4 0 0,-14 30 0,1-20 0,-16 31 0,9-29 0,-2 16 0,-2-7 0,2 8 0,-7 0 0,3-3 0,0 2 0,-2-3 0,6-1 0,-6 0 0,6-4 0,-2-1 0,4-5 0,-1 1 0,-2 0 0,1 3 0,-1-2 0,-1 3 0,2-4 0,-4-1 0,4 1 0,-4 0 0,5-1 0,-3 1 0,4-4 0,0 6 0,0-6 0,0 6 0,0-4 0,1 0 0,-1 3 0,4-2 0,0 2 0,0 0 0,-12-8 0,3 1 0,-10-9 0,5 0 0,2-4 0,-3 0 0,4-6 0,-1 1 0,0-1 0,-3-1 0,2 2 0,-7-2 0,7 3 0,-3 1 0,4-1 0,-3 1 0,2 3 0,-3-3 0,4 6 0,-2-5 0,-1 2 0,3 0 0,-5-1 0,9 4 0,-9-2 0,6 3 0,-3 0 0,1-8 0,6 3 0,-5-7 0,5 2 0,-4 0 0,1 0 0,0-3 0,0 6 0,5-9 0,3 3 0,5-4 0,2-1 0,5 4 0,0 1 0,6 0 0,-2 3 0,-1-1 0,8 1 0,-2 2 0,8 0 0,5 0 0,-4 0 0,4 3 0,-5 1 0,-4 4 0,-1 0 0,-5 0 0,2 0 0,-2 0 0,5 6 0,-5-2 0,-1 9 0,-4 0 0,-2-2 0,2 7 0,-1-7 0,1 2 0,-2 11 0,-3-10 0,3 16 0,-6-15 0,2 8 0,0-7 0,-2 7 0,6-7 0,-6 3 0,5-5 0,-5 1 0,5 0 0,-2 5 0,0-7 0,2 6 0,-5-6 0,2 1 0,2 5 0,-4-6 0,8 3 0,-9-1 0,3-1 0,-3 2 0</inkml:trace>
-</inkml:ink>
-</file>
-
-<file path=ppt/ink/ink138.xml><?xml version="1.0" encoding="utf-8"?>
-<inkml:ink xmlns:inkml="http://www.w3.org/2003/InkML">
-  <inkml:definitions>
-    <inkml:context xml:id="ctx0">
-      <inkml:inkSource xml:id="inkSrc0">
-        <inkml:traceFormat>
-          <inkml:channel name="X" type="integer" min="-2.14748E9" max="2.14748E9" units="cm"/>
-          <inkml:channel name="Y" type="integer" min="-2.14748E9" max="2.14748E9" units="cm"/>
-          <inkml:channel name="F" type="integer" max="32767" units="dev"/>
-        </inkml:traceFormat>
-        <inkml:channelProperties>
-          <inkml:channelProperty channel="X" name="resolution" value="1000" units="1/cm"/>
-          <inkml:channelProperty channel="Y" name="resolution" value="1000" units="1/cm"/>
-          <inkml:channelProperty channel="F" name="resolution" value="0" units="1/dev"/>
-        </inkml:channelProperties>
-      </inkml:inkSource>
-      <inkml:timestamp xml:id="ts0" timeString="2022-09-11T15:18:05.645"/>
-    </inkml:context>
-    <inkml:brush xml:id="br0">
-      <inkml:brushProperty name="width" value="0.3" units="cm"/>
-      <inkml:brushProperty name="height" value="0.6" units="cm"/>
-      <inkml:brushProperty name="tip" value="rectangle"/>
-      <inkml:brushProperty name="rasterOp" value="maskPen"/>
-    </inkml:brush>
-  </inkml:definitions>
-  <inkml:trace contextRef="#ctx0" brushRef="#br0">1 887 16383,'30'-34'0,"-3"0"0,-20 19 0,1-9 0,0 5 0,0-6 0,3 2 0,-6 3 0,6-7 0,-7 10 0,0-10 0,3 7 0,-6-4 0,6 7 0,-7-10 0,6 14 0,-1-15 0,2 12 0,-2-7 0,-2 3 0,0 1 0,1 0 0,0 4 0,3 1 0,-4-3 0,1 3 0,-1-2 0,-3 1 0,0 1 0,0-5 0,0 4 0,3-3 0,1 4 0,0-1 0,2-3 0,-2 4 0,0-3 0,-1 1 0,-3 2 0,3-5 0,0 6 0,4-3 0,-1 3 0,4 0 0,0 1 0,2 2 0,-2-5 0,1 7 0,2-1 0,3 7 0,1 2 0,3 0 0,-6 0 0,4 0 0,-3 0 0,-1 3 0,5 1 0,-3 4 0,3-1 0,-5 1 0,1-1 0,4 1 0,-7-1 0,6 0 0,-7 0 0,4 1 0,-1-1 0,1 0 0,0 1 0,-1-1 0,1-3 0,0 2 0,2-2 0,-5 3 0,4 0 0,-3-1 0,1 1 0,3-3 0,-4 2 0,3-3 0,-2 1 0,5-1 0,-5-3 0,6 0 0,-5 0 0,2 0 0,0 0 0,-3 0 0,3 0 0,3 0 0,-7 0 0,6 3 0,-6-2 0,0 1 0,6 4 0,-9 3 0,5-1 0,-2 3 0,0-10 0,6 4 0,-5-1 0,2 3 0,-3-1 0,-5 9 0,-3-1 0,-5 6 0,0-4 0,-2-3 0,-12 3 0,5-4 0,-7 0 0,0 2 0,3-2 0,-8 6 0,6-4 0,0 1 0,1 0 0,-1-1 0,-4 2 0,4-2 0,-4 2 0,4-2 0,-5 6 0,4-4 0,-4 8 0,1-8 0,3 3 0,0-4 0,2 0 0,3 0 0,0-1 0,0 1 0,0-4 0,3 3 0,-2-2 0,-1 2 0,3 1 0,-6 0 0,6-1 0,-6 1 0,3 0 0,-1-1 0,-1 1 0,5-4 0,-3 3 0,2-4 0,1 4 0,-2 0 0,3-1 0,0 2 0,0-1 0,0 1 0,-4-4 0,3 9 0,-2-10 0,3 7 0,0-4 0,0-2 0,3 8 0,1-5 0,3 1 0,-30-30 0,16 11 0,-24-18 0,23 15 0,4 6 0,-8-2 0,7 3 0,-8 0 0,4 0 0,2 0 0,-5 0 0,5 0 0,4-18 0,4 6 0,6-19 0,4 7 0,1-2 0,6-3 0,-2 5 0,7 0 0,-7 0 0,2 4 0,0-3 0,-2 7 0,2-3 0,-4 5 0,0 3 0,3-6 0,-2 9 0,-1-11 0,-4 5 0,-3-3 0,3 1 0,0 3 0,4 0 0</inkml:trace>
-</inkml:ink>
-</file>
-
-<file path=ppt/ink/ink139.xml><?xml version="1.0" encoding="utf-8"?>
-<inkml:ink xmlns:inkml="http://www.w3.org/2003/InkML">
-  <inkml:definitions>
-    <inkml:context xml:id="ctx0">
-      <inkml:inkSource xml:id="inkSrc0">
-        <inkml:traceFormat>
-          <inkml:channel name="X" type="integer" min="-2.14748E9" max="2.14748E9" units="cm"/>
-          <inkml:channel name="Y" type="integer" min="-2.14748E9" max="2.14748E9" units="cm"/>
-          <inkml:channel name="F" type="integer" max="32767" units="dev"/>
-        </inkml:traceFormat>
-        <inkml:channelProperties>
-          <inkml:channelProperty channel="X" name="resolution" value="1000" units="1/cm"/>
-          <inkml:channelProperty channel="Y" name="resolution" value="1000" units="1/cm"/>
-          <inkml:channelProperty channel="F" name="resolution" value="0" units="1/dev"/>
-        </inkml:channelProperties>
-      </inkml:inkSource>
-      <inkml:timestamp xml:id="ts0" timeString="2022-09-11T15:18:17.554"/>
-    </inkml:context>
-    <inkml:brush xml:id="br0">
-      <inkml:brushProperty name="width" value="0.3" units="cm"/>
-      <inkml:brushProperty name="height" value="0.6" units="cm"/>
-      <inkml:brushProperty name="tip" value="rectangle"/>
-      <inkml:brushProperty name="rasterOp" value="maskPen"/>
-    </inkml:brush>
-  </inkml:definitions>
-  <inkml:trace contextRef="#ctx0" brushRef="#br0">1629 628 16383,'-46'0'0,"4"0"0,22 0 0,-8 0 0,11 0 0,-7 0 0,5 0 0,7-3 0,-9 2 0,9-5 0,-8 5 0,4-5 0,2 5 0,-6-9 0,7 5 0,-8-2 0,4-3 0,5 9 0,-8-9 0,9 3 0,-6-1 0,3-4 0,3 0 0,1 2 0,0-3 0,0 0 0,3 1 0,1-6 0,3 4 0,-1-3 0,-3-1 0,3 4 0,-2-1 0,2 0 0,0-4 0,-3 4 0,6-8 0,-2 7 0,0-3 0,-1 1 0,0 7 0,-3-8 0,-2 8 0,4-3 0,-13 2 0,10 2 0,-5 0 0,-2 0 0,4 1 0,-4 2 0,-2-6 0,6 9 0,-5-8 0,3 5 0,2-1 0,-8-6 0,8 8 0,-2-6 0,-3 5 0,8 0 0,-12-3 0,8 2 0,-2-2 0,1 1 0,6-2 0,-11 4 0,4 13 0,-3 2 0,5 8 0,6-3 0,-4-3 0,-1 10 0,1-8 0,0 8 0,0-9 0,1 8 0,-5-4 0,2 8 0,-4-3 0,4 4 0,-3 1 0,3-5 0,-4-2 0,5-3 0,1 0 0,3-5 0,0 7 0,6-4 0,16 5 0,-1-1 0,15-1 0,-13-2 0,7 2 0,-7 3 0,3-2 0,-3 2 0,-1-1 0,-3-2 0,2 3 0,-2-4 0,2-1 0,-2 1 0,1 0 0,-4-1 0,4 1 0,-4 0 0,1-1 0,-2 1 0,-1 0 0,0-1 0,3 3 0,-2-6 0,4 5 0,-1-8 0,6 5 0,-5-5 0,5 5 0,-10-5 0,7 6 0,-6-3 0,6 3 0,-6-3 0,5 3 0,1 0 0,-2-2 0,5 1 0,-6-6 0,7 4 0,-7-3 0,6 1 0,-4-5 0,0-1 0,6-3 0,-6-3 0,2-6 0,2-2 0,-3-2 0,4 3 0,-7 3 0,2-3 0,0 5 0,-60 21 0,31-4 0,-52 19 0,44-19 0,4 3 0,-3-6 0,7 1 0,1-2 0,1-1 0,4 3 0,-5-2 0,2 4 0,2-4 0,-5 5 0,8-6 0,-6 6 0,5 0 0,5 0 0,-2 6 0,-3-6 0,4 0 0,-11-1 0,5-4 0,-3 2 0,0-3 0,1 0 0,-1 2 0,1-2 0,0 6 0,-3-9 0,3 4 0,-3-4 0,3 2 0,-3-11 0,2 0 0,-3-12 0,2 6 0,0-3 0,-3 5 0,2-5 0,-3 3 0,4-4 0,1 0 0,-1 1 0,0-1 0,1 0 0,-1 1 0,4-1 0,-3 0 0,2 1 0,-2 2 0,2-2 0,-2 6 0,3-2 0,-7-1 0,7 4 0,-6 0 0,3-2 0,2 4 0,-8-5 0,9 3 0,-3 1 0,-3-7 0,9 5 0,-7-8 0,5 9 0,-3-2 0,-3 2 0,-1 3 0,3-2 0,-6 6 0,5-6 0,1 5 0,-5-5 0,8 3 0,-5-1 0,-3 1 0,8 3 0,-9 0 0,7 0 0,-3 0 0,44-38 0,-14 21 0,42-31 0,-30 28 0,3 5 0,-4-1 0,-1 8 0,-4 0 0,-1 1 0,-8 3 0,6 1 0,-3 0 0,4 2 0,-3-5 0,-2 0 0,0-1 0,-1-5 0,-2 2 0,3-4 0,0-2 0,-1 4 0,4-4 0,-8 8 0,6-2 0,-1 3 0,5 0 0</inkml:trace>
 </inkml:ink>
 </file>
 
@@ -1448,6 +1435,209 @@
           <inkml:channelProperty channel="F" name="resolution" value="0" units="1/dev"/>
         </inkml:channelProperties>
       </inkml:inkSource>
+      <inkml:timestamp xml:id="ts0" timeString="2022-09-11T15:17:24.311"/>
+    </inkml:context>
+    <inkml:brush xml:id="br0">
+      <inkml:brushProperty name="width" value="0.3" units="cm"/>
+      <inkml:brushProperty name="height" value="0.6" units="cm"/>
+      <inkml:brushProperty name="tip" value="rectangle"/>
+      <inkml:brushProperty name="rasterOp" value="maskPen"/>
+    </inkml:brush>
+  </inkml:definitions>
+  <inkml:trace contextRef="#ctx0" brushRef="#br0">0 412 16383,'61'0'0,"-4"0"0,-3 0 0,-16 0 0,33-6 0,-34-3 0,42-12 0,-21-5 0,5-1 0,-7-2 0,4 3 0,-20 2 0,19-1 0,-17 7 0,12-7 0,-5 5 0,-1 1 0,-13 6 0,-1 0 0,-9 0 0,0 1 0,-2 0 0,-11 5 0,6-1 0,-4 2 0,-2-1 0,8 0 0,-9 1 0,6 2 0,-2-5 0,-1 8 0,2-8 0,0 9 0,-1-3 0,1 3 0,0-3 0,-3 2 0,6-1 0,-6 2 0,7 0 0,-2 0 0,-4 2 0,3 2 0,-3 6 0,-2-2 0,4 9 0,-8-9 0,2 9 0,0-3 0,1 1 0,0 3 0,0-4 0,-4 1 0,4 0 0,-3-1 0,6 1 0,-6 4 0,6-4 0,-5 4 0,1-4 0,-2 4 0,-1-3 0,1 2 0,-1-6 0,0 1 0,3-2 0,-3 5 0,3-2 0,-3 6 0,0-5 0,-3-1 0,2 2 0,-2-4 0,3 4 0,2-3 0,2 1 0,-1-4 0,6 6 0,-8-8 0,6 9 0,-4-6 0,-3 0 0,9 4 0,-8-7 0,5 5 0,0-3 0,-5-3 0,11 6 0,-47 1 0,18-2 0,-32 6 0,19-6 0,3 4 0,-4 0 0,0 0 0,0 0 0,0 0 0,0 0 0,0 0 0,4 0 0,-3 0 0,7-5 0,-3 0 0,8-4 0,-5 3 0,7-2 0,-7 2 0,2 0 0,2-2 0,-5 2 0,3 0 0,2-2 0,-4 2 0,2 0 0,2-2 0,-5 2 0,7-1 0,-1-1 0,-5 7 0,8-6 0,-8 3 0,5-1 0,-4 0 0,0 8 0,0-3 0,0 3 0,0-1 0,3-5 0,1 1 0,2-4 0,2 3 0,-3 0 0,3 7 0,4-9 0,-4 5 0,4-3 0,-9-2 0,-2-1 0,-2-7 0,0-1 0,0-1 0,2 2 0,-10-3 0,7 0 0,-4 0 0,2 0 0,-1 0 0,-4-7 0,-5-3 0,4-6 0,-9-1 0,7-4 0,-2 3 0,3-7 0,2 8 0,-2-8 0,1 8 0,4-8 0,2 9 0,-1-3 0,8 4 0,-6 3 0,10-2 0,-3 6 0,-2-5 0,5 2 0,-5 1 0,6-6 0,-2 8 0,-2-8 0,-6 3 0,2-2 0,-7-8 0,6 7 0,-8-4 0,3 0 0,1 3 0,0-3 0,5 6 0,1 2 0,3 2 0,-3 0 0,65 3 0,-15 0 0,52 4 0,-20 8 0,8 2 0,2 4 0,-29-3 0,1 1 0,38 4 0,-13 3 0,4-5 0,-28-2 0,11 2 0,-19-2 0,-9-1 0,-14-3 0,-1-2 0,-8-3 0,5 0 0,-1-13 0,4-6 0,5-20 0,-10 8 0,12-14 0,-11 14 0,8-15 0,-10 14 0,4-2 0,-9 14 0,3 5 0,-4 4 0,-54 9 0,16 8 0,-53 7 0,29 7 0,5-5 0,-8 4 0,15-5 0,-16 6 0,16-5 0,-4-1 0,12-5 0,9-1 0,2 0 0,13-4 0,-2 2 0,-3-5 0,-2 2 0,2-3 0,-4 0 0,8 0 0,-5 0 0,-1 0 0,6 0 0,-7 0 0,6 0 0,-7-7 0,6 3 0,-2-6 0,5 0 0,-3 2 0,3-15 0,5 16 0,2-9 0</inkml:trace>
+</inkml:ink>
+</file>
+
+<file path=ppt/ink/ink141.xml><?xml version="1.0" encoding="utf-8"?>
+<inkml:ink xmlns:inkml="http://www.w3.org/2003/InkML">
+  <inkml:definitions>
+    <inkml:context xml:id="ctx0">
+      <inkml:inkSource xml:id="inkSrc0">
+        <inkml:traceFormat>
+          <inkml:channel name="X" type="integer" min="-2.14748E9" max="2.14748E9" units="cm"/>
+          <inkml:channel name="Y" type="integer" min="-2.14748E9" max="2.14748E9" units="cm"/>
+          <inkml:channel name="F" type="integer" max="32767" units="dev"/>
+        </inkml:traceFormat>
+        <inkml:channelProperties>
+          <inkml:channelProperty channel="X" name="resolution" value="1000" units="1/cm"/>
+          <inkml:channelProperty channel="Y" name="resolution" value="1000" units="1/cm"/>
+          <inkml:channelProperty channel="F" name="resolution" value="0" units="1/dev"/>
+        </inkml:channelProperties>
+      </inkml:inkSource>
+      <inkml:timestamp xml:id="ts0" timeString="2022-09-11T15:17:29.455"/>
+    </inkml:context>
+    <inkml:brush xml:id="br0">
+      <inkml:brushProperty name="width" value="0.3" units="cm"/>
+      <inkml:brushProperty name="height" value="0.6" units="cm"/>
+      <inkml:brushProperty name="tip" value="rectangle"/>
+      <inkml:brushProperty name="rasterOp" value="maskPen"/>
+    </inkml:brush>
+  </inkml:definitions>
+  <inkml:trace contextRef="#ctx0" brushRef="#br0">1 632 16383,'45'0'0,"-2"0"0,-23 0 0,0 0 0,-4 0 0,2-4 0,-6-3 0,7-2 0,-8-5 0,3 3 0,4-7 0,-2 3 0,2-8 0,1 3 0,-5-5 0,35-29 0,-26 26 0,31-30 0,-40 41 0,12-9 0,-18 14 0,11-14 0,-10 13 0,10-17 0,-10 14 0,10-17 0,-13 19 0,10-23 0,-11 26 0,9-22 0,-7 26 0,3-8 0,5 3 0,-7 7 0,8-14 0,-7 9 0,-2 0 0,22 27 0,-14-4 0,21 24 0,-18-8 0,7-1 0,-6 6 0,7-2 0,15 22 0,-9-17 0,29 21 0,-35-35 0,30 16 0,-36-25 0,17 7 0,-26-18 0,11 0 0,-9-3 0,4 0 0,0 0 0,-6 0 0,12 0 0,-12 0 0,18 0 0,-16 0 0,11 0 0,8 0 0,-13 0 0,10 0 0,-16 0 0,4 0 0,-1 0 0,3 0 0,-14 21 0,0-10 0,-11 17 0,1-14 0,-2 5 0,-4 0 0,-6 16 0,1-8 0,-1 8 0,2-11 0,7-4 0,-4-1 0,2-5 0,2 1 0,-3 0 0,4-4 0,-3 6 0,2-6 0,-5 7 0,4-3 0,-1-1 0,3 1 0,-4-4 0,3 3 0,-3-2 0,1 2 0,1 1 0,-1 0 0,3-4 0,-3 5 0,2-4 0,-2 4 0,1-2 0,-2-1 0,0 1 0,1 0 0,3-3 0,-3 2 0,0-2 0,-3 2 0,2-3 0,-1-1 0,-2 1 0,3 1 0,-5-4 0,6 5 0,0-5 0,-2 6 0,-8-18 0,8 1 0,-11-16 0,8 4 0,-2-3 0,-6 2 0,2-7 0,-9 6 0,4-3 0,-3 5 0,5 0 0,0 0 0,4 0 0,-3 0 0,7 1 0,-3 0 0,4 0 0,1 1 0,-1-1 0,4 4 0,-3 0 0,4 2 0,-5 4 0,-4-1 0,6 4 0,-6 1 0,5-5 0,0 2 0,-6-5 0,9 4 0,-5 0 0,-6 1 0,5 0 0,-9-3 0,12-1 0,-1 1 0,4-4 0,-3 3 0,3-5 0,0 2 0,1-3 0,3 1 0,4-4 0,0 2 0,3-3 0,0-1 0,0 0 0</inkml:trace>
+</inkml:ink>
+</file>
+
+<file path=ppt/ink/ink142.xml><?xml version="1.0" encoding="utf-8"?>
+<inkml:ink xmlns:inkml="http://www.w3.org/2003/InkML">
+  <inkml:definitions>
+    <inkml:context xml:id="ctx0">
+      <inkml:inkSource xml:id="inkSrc0">
+        <inkml:traceFormat>
+          <inkml:channel name="X" type="integer" min="-2.14748E9" max="2.14748E9" units="cm"/>
+          <inkml:channel name="Y" type="integer" min="-2.14748E9" max="2.14748E9" units="cm"/>
+          <inkml:channel name="F" type="integer" max="32767" units="dev"/>
+        </inkml:traceFormat>
+        <inkml:channelProperties>
+          <inkml:channelProperty channel="X" name="resolution" value="1000" units="1/cm"/>
+          <inkml:channelProperty channel="Y" name="resolution" value="1000" units="1/cm"/>
+          <inkml:channelProperty channel="F" name="resolution" value="0" units="1/dev"/>
+        </inkml:channelProperties>
+      </inkml:inkSource>
+      <inkml:timestamp xml:id="ts0" timeString="2022-09-11T15:17:36.598"/>
+    </inkml:context>
+    <inkml:brush xml:id="br0">
+      <inkml:brushProperty name="width" value="0.3" units="cm"/>
+      <inkml:brushProperty name="height" value="0.6" units="cm"/>
+      <inkml:brushProperty name="tip" value="rectangle"/>
+      <inkml:brushProperty name="rasterOp" value="maskPen"/>
+    </inkml:brush>
+  </inkml:definitions>
+  <inkml:trace contextRef="#ctx0" brushRef="#br0">424 1 16383,'74'0'0,"0"4"0,-12 7 0,1 5 0,-12 0 0,13-1 0,-24 2 0,20-5 0,-12 10 0,-11-12 0,2 7 0,-14-8 0,0 7 0,-2-8 0,-7 0 0,3-1 0,-5-3 0,1 3 0,0 0 0,2 0 0,-1-3 0,1 2 0,-2-5 0,0 6 0,4-3 0,-4 0 0,4 3 0,0-6 0,-3 6 0,-1-7 0,2 7 0,-6-4 0,9 1 0,-6 2 0,4-5 0,-4 5 0,5-5 0,-4 2 0,9-3 0,-5 0 0,1 0 0,4 0 0,-9 0 0,4 0 0,-4 0 0,-1 0 0,4 0 0,-3 0 0,3 3 0,-3-2 0,-1 2 0,4-3 0,-3 0 0,2 0 0,-2 3 0,-1-2 0,2 7 0,-3 0 0,-3 8 0,-4-2 0,1 3 0,-7 0 0,7-2 0,-3 3 0,0-4 0,3 1 0,-3 0 0,0 3 0,3 2 0,-7 4 0,4 1 0,-4-1 0,0 5 0,0-4 0,0 4 0,0-5 0,0 0 0,0 0 0,0-4 0,0-1 0,0-4 0,0 2 0,0-2 0,0 3 0,-3-2 0,-1-1 0,-2 1 0,-1-3 0,1 3 0,-1-2 0,-2 2 0,-1-3 0,-1 1 0,1-4 0,0 4 0,-2-7 0,-5 0 0,0-8 0,0-3 0,-2-4 0,4-2 0,-4-2 0,0 0 0,3 2 0,-3-1 0,5-1 0,-1-2 0,0 2 0,1-2 0,2 7 0,-1-7 0,-1 3 0,2 0 0,-5 1 0,3 0 0,2 2 0,-4-2 0,2 3 0,2 0 0,-8 0 0,5 0 0,1 3 0,-6 0 0,8 1 0,-10 2 0,7-2 0,-13 3 0,6 0 0,-11 0 0,2 0 0,-4 0 0,0 0 0,0 0 0,0 0 0,1 0 0,-1 0 0,5 0 0,-4 4 0,9-3 0,-9 7 0,4-7 0,0 6 0,-4-6 0,4 3 0,-5 0 0,0-4 0,0 8 0,0-3 0,0 0 0,-5 3 0,4-7 0,-4 7 0,5-3 0,-5 0 0,3 2 0,-3-6 0,-1 7 0,10-7 0,-8 4 0,13-2 0,-3-2 0,5 3 0,4-4 0,2 0 0,3 0 0,0 0 0,-2 0 0,2 0 0,-2 0 0,1 0 0,27-28 0,-8 18 0,24-22 0,-13 22 0,1-2 0,0-2 0,4-6 0,-3 4 0,9-9 0,-3 4 0,4-6 0,-4 2 0,-2 4 0,-5-2 0,-3 8 0,2-4 0,-5 0 0,2-1 0,-3-4 0,4 0 0,-3-5 0,6 3 0,-1-7 0,-2 7 0,3 1 0,-6 2 0,2 8 0,-4-1 0,3 3 0,-3 3 0,3-3 0,0-3 0,-6 4 0,2-6 0,-15 4 0,7 0 0,-9-4 0,10 7 0,-4-5 0,-13 9 0,9 2 0,-15 5 0,11-3 0,1 2 0,0 20 0,8-7 0,1 15 0,3-10 0,0-9 0,13 12 0,-3-8 0,11 2 0,-6-3 0,0-4 0,-1 1 0,5-1 0,-3 1 0,3-1 0,-5 1 0,1-1 0,0-3 0,2 2 0,-1-2 0,-2 3 0,3-3 0,-6 2 0,6-2 0,-2-1 0,-1 0 0,1-3 0</inkml:trace>
+</inkml:ink>
+</file>
+
+<file path=ppt/ink/ink143.xml><?xml version="1.0" encoding="utf-8"?>
+<inkml:ink xmlns:inkml="http://www.w3.org/2003/InkML">
+  <inkml:definitions>
+    <inkml:context xml:id="ctx0">
+      <inkml:inkSource xml:id="inkSrc0">
+        <inkml:traceFormat>
+          <inkml:channel name="X" type="integer" min="-2.14748E9" max="2.14748E9" units="cm"/>
+          <inkml:channel name="Y" type="integer" min="-2.14748E9" max="2.14748E9" units="cm"/>
+          <inkml:channel name="F" type="integer" max="32767" units="dev"/>
+        </inkml:traceFormat>
+        <inkml:channelProperties>
+          <inkml:channelProperty channel="X" name="resolution" value="1000" units="1/cm"/>
+          <inkml:channelProperty channel="Y" name="resolution" value="1000" units="1/cm"/>
+          <inkml:channelProperty channel="F" name="resolution" value="0" units="1/dev"/>
+        </inkml:channelProperties>
+      </inkml:inkSource>
+      <inkml:timestamp xml:id="ts0" timeString="2022-09-11T15:17:42.014"/>
+    </inkml:context>
+    <inkml:brush xml:id="br0">
+      <inkml:brushProperty name="width" value="0.3" units="cm"/>
+      <inkml:brushProperty name="height" value="0.6" units="cm"/>
+      <inkml:brushProperty name="tip" value="rectangle"/>
+      <inkml:brushProperty name="rasterOp" value="maskPen"/>
+    </inkml:brush>
+  </inkml:definitions>
+  <inkml:trace contextRef="#ctx0" brushRef="#br0">0 285 16383,'63'-4'0,"4"1"0,-40 3 0,19 0 0,-9-4 0,-1 4 0,3-4 0,-12 0 0,7 3 0,-10-6 0,5 2 0,-4-3 0,9 0 0,-4-5 0,0 4 0,9-4 0,-16 5 0,15-5 0,-17 5 0,4-1 0,-6 2 0,-8 3 0,2-3 0,5-3 0,-2 5 0,6-2 0,-11 4 0,12-4 0,-10 0 0,11-4 0,-9 4 0,9-4 0,-10 4 0,11-4 0,-17 5 0,8-1 0,-3-2 0,1 1 0,0-2 0,2 3 0,-5 1 0,7 2 0,-4 1 0,3 3 0,3 0 0,-4 0 0,6 0 0,-8 0 0,1 0 0,2 0 0,-3 0 0,2 0 0,0 6 0,-4 2 0,4 6 0,-8 5 0,3-3 0,0 3 0,-3-1 0,3 2 0,0 0 0,-2 3 0,2-7 0,-4 3 0,1-4 0,-1-4 0,3 2 0,-6 2 0,2 5 0,-6 4 0,3 0 0,3 11 0,2-4 0,5 10 0,-3-6 0,6-5 0,-7-1 0,6-9 0,-7 3 0,3-7 0,-3 3 0,-1-8 0,0 2 0,3-2 0,-3 6 0,3-6 0,2 1 0,-1-5 0,4-1 0,1-2 0,-3-1 0,6-3 0,-6 3 0,3-2 0,0 4 0,-2-1 0,2 3 0,-2-1 0,-1 1 0,2-3 0,-57-6 0,17-3 0,-51-9 0,22 4 0,5-4 0,1 4 0,2 1 0,10 0 0,-4 4 0,5 1 0,0 4 0,4 0 0,-2 0 0,2 0 0,1 0 0,1 0 0,0 0 0,4 0 0,-4 4 0,5 0 0,0 4 0,-1 0 0,6 3 0,0-2 0,4 1 0,0-2 0,1-1 0,-1 0 0,-4 1 0,3-1 0,-2 1 0,-1 0 0,3-1 0,-3 1 0,0-1 0,4-3 0,-4 3 0,4-6 0,0 6 0,-6-3 0,1 0 0,-7-1 0,-2 1 0,-1-3 0,0 6 0,-4-6 0,4 7 0,-5-7 0,5 6 0,1-6 0,9 6 0,1-6 0,4 2 0,1-3 0,-2 0 0,-1 0 0,1 0 0,1 0 0,-1 0 0,3 0 0,-6 0 0,6 0 0,-3-3 0,3-10 0,3 4 0,-1-11 0,4 6 0,3-1 0,-2-2 0,0 3 0,1 55 0,-1-28 0,6 44 0,0-42 0,0-4 0,0 9 0,0-9 0,0 9 0,6-4 0,4-9 0,11 2 0,-3-9 0,7 0 0,-9 0 0,7 0 0,-7 0 0,7 0 0,-8 0 0,4 0 0,0 0 0,-3 0 0,7 0 0,-3 0 0,9 0 0,-4 0 0,9 0 0,-4 0 0,0 0 0,4 0 0,-9 0 0,0 0 0,-2-4 0,-7 3 0,3-2 0,-5 3 0,1 0 0,6-3 0,-5 2 0,10-2 0,-6 3 0,0-4 0,3 3 0,-7-2 0,2 3 0,-3 0 0,0-3 0,2 2 0,-1-2 0,1 3 0,-2 0 0,4 0 0,1 0 0,4-4 0,0 3 0,0-2 0,-4 3 0,3 0 0,-7 0 0,-1 0 0,2 0 0,-5 0 0,8 0 0,-1 0 0,3 0 0,-3 0 0,4 0 0,-7 0 0,2 0 0,0 0 0,-6 0 0,10 0 0,-10-3 0,9 2 0,-7-2 0,0 3 0,3-3 0,-3 3 0,3-3 0,-1 0 0,-2 2 0,2-2 0</inkml:trace>
+</inkml:ink>
+</file>
+
+<file path=ppt/ink/ink144.xml><?xml version="1.0" encoding="utf-8"?>
+<inkml:ink xmlns:inkml="http://www.w3.org/2003/InkML">
+  <inkml:definitions>
+    <inkml:context xml:id="ctx0">
+      <inkml:inkSource xml:id="inkSrc0">
+        <inkml:traceFormat>
+          <inkml:channel name="X" type="integer" min="-2.14748E9" max="2.14748E9" units="cm"/>
+          <inkml:channel name="Y" type="integer" min="-2.14748E9" max="2.14748E9" units="cm"/>
+          <inkml:channel name="F" type="integer" max="32767" units="dev"/>
+        </inkml:traceFormat>
+        <inkml:channelProperties>
+          <inkml:channelProperty channel="X" name="resolution" value="1000" units="1/cm"/>
+          <inkml:channelProperty channel="Y" name="resolution" value="1000" units="1/cm"/>
+          <inkml:channelProperty channel="F" name="resolution" value="0" units="1/dev"/>
+        </inkml:channelProperties>
+      </inkml:inkSource>
+      <inkml:timestamp xml:id="ts0" timeString="2022-09-11T15:17:52.905"/>
+    </inkml:context>
+    <inkml:brush xml:id="br0">
+      <inkml:brushProperty name="width" value="0.3" units="cm"/>
+      <inkml:brushProperty name="height" value="0.6" units="cm"/>
+      <inkml:brushProperty name="tip" value="rectangle"/>
+      <inkml:brushProperty name="rasterOp" value="maskPen"/>
+    </inkml:brush>
+  </inkml:definitions>
+  <inkml:trace contextRef="#ctx0" brushRef="#br0">1 691 16383,'19'-35'0,"-4"-3"0,-4 26 0,0-11 0,6 2 0,0-3 0,4-2 0,-6 7 0,1-5 0,-4 9 0,3-8 0,-7 7 0,3-3 0,1 0 0,-1 4 0,2-8 0,6 2 0,-6-4 0,8 0 0,-5 1 0,-1 5 0,0 0 0,-3 4 0,-2 4 0,0-2 0,0 3 0,0-3 0,0 0 0,-4 0 0,1-3 0,3 6 0,-3-6 0,6 6 0,-6-3 0,5 0 0,-1 2 0,2 2 0,-1-1 0,4 6 0,0-2 0,0 6 0,0 0 0,3 0 0,-4 0 0,9 4 0,-9 3 0,8 6 0,-7 1 0,4 6 0,-6-4 0,-2 2 0,3 1 0,-7-7 0,3 6 0,-1-7 0,-3 0 0,9 4 0,-5-10 0,5 7 0,1-11 0,-2 5 0,5-2 0,-4 0 0,1 0 0,1-1 0,-6 0 0,7 4 0,-8-1 0,5-2 0,0 2 0,-1-2 0,1 0 0,2-1 0,-2-3 0,1 0 0,-2 0 0,-1 0 0,8 0 0,-6 0 0,5 0 0,-6 0 0,-1 0 0,3 0 0,-4 0 0,-14 30 0,1-20 0,-16 31 0,9-29 0,-2 16 0,-2-7 0,2 8 0,-7 0 0,3-3 0,0 2 0,-2-3 0,6-1 0,-6 0 0,6-4 0,-2-1 0,4-5 0,-1 1 0,-2 0 0,1 3 0,-1-2 0,-1 3 0,2-4 0,-4-1 0,4 1 0,-4 0 0,5-1 0,-3 1 0,4-4 0,0 6 0,0-6 0,0 6 0,0-4 0,1 0 0,-1 3 0,4-2 0,0 2 0,0 0 0,-12-8 0,3 1 0,-10-9 0,5 0 0,2-4 0,-3 0 0,4-6 0,-1 1 0,0-1 0,-3-1 0,2 2 0,-7-2 0,7 3 0,-3 1 0,4-1 0,-3 1 0,2 3 0,-3-3 0,4 6 0,-2-5 0,-1 2 0,3 0 0,-5-1 0,9 4 0,-9-2 0,6 3 0,-3 0 0,1-8 0,6 3 0,-5-7 0,5 2 0,-4 0 0,1 0 0,0-3 0,0 6 0,5-9 0,3 3 0,5-4 0,2-1 0,5 4 0,0 1 0,6 0 0,-2 3 0,-1-1 0,8 1 0,-2 2 0,8 0 0,5 0 0,-4 0 0,4 3 0,-5 1 0,-4 4 0,-1 0 0,-5 0 0,2 0 0,-2 0 0,5 6 0,-5-2 0,-1 9 0,-4 0 0,-2-2 0,2 7 0,-1-7 0,1 2 0,-2 11 0,-3-10 0,3 16 0,-6-15 0,2 8 0,0-7 0,-2 7 0,6-7 0,-6 3 0,5-5 0,-5 1 0,5 0 0,-2 5 0,0-7 0,2 6 0,-5-6 0,2 1 0,2 5 0,-4-6 0,8 3 0,-9-1 0,3-1 0,-3 2 0</inkml:trace>
+</inkml:ink>
+</file>
+
+<file path=ppt/ink/ink145.xml><?xml version="1.0" encoding="utf-8"?>
+<inkml:ink xmlns:inkml="http://www.w3.org/2003/InkML">
+  <inkml:definitions>
+    <inkml:context xml:id="ctx0">
+      <inkml:inkSource xml:id="inkSrc0">
+        <inkml:traceFormat>
+          <inkml:channel name="X" type="integer" min="-2.14748E9" max="2.14748E9" units="cm"/>
+          <inkml:channel name="Y" type="integer" min="-2.14748E9" max="2.14748E9" units="cm"/>
+          <inkml:channel name="F" type="integer" max="32767" units="dev"/>
+        </inkml:traceFormat>
+        <inkml:channelProperties>
+          <inkml:channelProperty channel="X" name="resolution" value="1000" units="1/cm"/>
+          <inkml:channelProperty channel="Y" name="resolution" value="1000" units="1/cm"/>
+          <inkml:channelProperty channel="F" name="resolution" value="0" units="1/dev"/>
+        </inkml:channelProperties>
+      </inkml:inkSource>
+      <inkml:timestamp xml:id="ts0" timeString="2022-09-11T15:18:05.645"/>
+    </inkml:context>
+    <inkml:brush xml:id="br0">
+      <inkml:brushProperty name="width" value="0.3" units="cm"/>
+      <inkml:brushProperty name="height" value="0.6" units="cm"/>
+      <inkml:brushProperty name="tip" value="rectangle"/>
+      <inkml:brushProperty name="rasterOp" value="maskPen"/>
+    </inkml:brush>
+  </inkml:definitions>
+  <inkml:trace contextRef="#ctx0" brushRef="#br0">1 887 16383,'30'-34'0,"-3"0"0,-20 19 0,1-9 0,0 5 0,0-6 0,3 2 0,-6 3 0,6-7 0,-7 10 0,0-10 0,3 7 0,-6-4 0,6 7 0,-7-10 0,6 14 0,-1-15 0,2 12 0,-2-7 0,-2 3 0,0 1 0,1 0 0,0 4 0,3 1 0,-4-3 0,1 3 0,-1-2 0,-3 1 0,0 1 0,0-5 0,0 4 0,3-3 0,1 4 0,0-1 0,2-3 0,-2 4 0,0-3 0,-1 1 0,-3 2 0,3-5 0,0 6 0,4-3 0,-1 3 0,4 0 0,0 1 0,2 2 0,-2-5 0,1 7 0,2-1 0,3 7 0,1 2 0,3 0 0,-6 0 0,4 0 0,-3 0 0,-1 3 0,5 1 0,-3 4 0,3-1 0,-5 1 0,1-1 0,4 1 0,-7-1 0,6 0 0,-7 0 0,4 1 0,-1-1 0,1 0 0,0 1 0,-1-1 0,1-3 0,0 2 0,2-2 0,-5 3 0,4 0 0,-3-1 0,1 1 0,3-3 0,-4 2 0,3-3 0,-2 1 0,5-1 0,-5-3 0,6 0 0,-5 0 0,2 0 0,0 0 0,-3 0 0,3 0 0,3 0 0,-7 0 0,6 3 0,-6-2 0,0 1 0,6 4 0,-9 3 0,5-1 0,-2 3 0,0-10 0,6 4 0,-5-1 0,2 3 0,-3-1 0,-5 9 0,-3-1 0,-5 6 0,0-4 0,-2-3 0,-12 3 0,5-4 0,-7 0 0,0 2 0,3-2 0,-8 6 0,6-4 0,0 1 0,1 0 0,-1-1 0,-4 2 0,4-2 0,-4 2 0,4-2 0,-5 6 0,4-4 0,-4 8 0,1-8 0,3 3 0,0-4 0,2 0 0,3 0 0,0-1 0,0 1 0,0-4 0,3 3 0,-2-2 0,-1 2 0,3 1 0,-6 0 0,6-1 0,-6 1 0,3 0 0,-1-1 0,-1 1 0,5-4 0,-3 3 0,2-4 0,1 4 0,-2 0 0,3-1 0,0 2 0,0-1 0,0 1 0,-4-4 0,3 9 0,-2-10 0,3 7 0,0-4 0,0-2 0,3 8 0,1-5 0,3 1 0,-30-30 0,16 11 0,-24-18 0,23 15 0,4 6 0,-8-2 0,7 3 0,-8 0 0,4 0 0,2 0 0,-5 0 0,5 0 0,4-18 0,4 6 0,6-19 0,4 7 0,1-2 0,6-3 0,-2 5 0,7 0 0,-7 0 0,2 4 0,0-3 0,-2 7 0,2-3 0,-4 5 0,0 3 0,3-6 0,-2 9 0,-1-11 0,-4 5 0,-3-3 0,3 1 0,0 3 0,4 0 0</inkml:trace>
+</inkml:ink>
+</file>
+
+<file path=ppt/ink/ink146.xml><?xml version="1.0" encoding="utf-8"?>
+<inkml:ink xmlns:inkml="http://www.w3.org/2003/InkML">
+  <inkml:definitions>
+    <inkml:context xml:id="ctx0">
+      <inkml:inkSource xml:id="inkSrc0">
+        <inkml:traceFormat>
+          <inkml:channel name="X" type="integer" min="-2.14748E9" max="2.14748E9" units="cm"/>
+          <inkml:channel name="Y" type="integer" min="-2.14748E9" max="2.14748E9" units="cm"/>
+          <inkml:channel name="F" type="integer" max="32767" units="dev"/>
+        </inkml:traceFormat>
+        <inkml:channelProperties>
+          <inkml:channelProperty channel="X" name="resolution" value="1000" units="1/cm"/>
+          <inkml:channelProperty channel="Y" name="resolution" value="1000" units="1/cm"/>
+          <inkml:channelProperty channel="F" name="resolution" value="0" units="1/dev"/>
+        </inkml:channelProperties>
+      </inkml:inkSource>
+      <inkml:timestamp xml:id="ts0" timeString="2022-09-11T15:18:17.554"/>
+    </inkml:context>
+    <inkml:brush xml:id="br0">
+      <inkml:brushProperty name="width" value="0.3" units="cm"/>
+      <inkml:brushProperty name="height" value="0.6" units="cm"/>
+      <inkml:brushProperty name="tip" value="rectangle"/>
+      <inkml:brushProperty name="rasterOp" value="maskPen"/>
+    </inkml:brush>
+  </inkml:definitions>
+  <inkml:trace contextRef="#ctx0" brushRef="#br0">1629 628 16383,'-46'0'0,"4"0"0,22 0 0,-8 0 0,11 0 0,-7 0 0,5 0 0,7-3 0,-9 2 0,9-5 0,-8 5 0,4-5 0,2 5 0,-6-9 0,7 5 0,-8-2 0,4-3 0,5 9 0,-8-9 0,9 3 0,-6-1 0,3-4 0,3 0 0,1 2 0,0-3 0,0 0 0,3 1 0,1-6 0,3 4 0,-1-3 0,-3-1 0,3 4 0,-2-1 0,2 0 0,0-4 0,-3 4 0,6-8 0,-2 7 0,0-3 0,-1 1 0,0 7 0,-3-8 0,-2 8 0,4-3 0,-13 2 0,10 2 0,-5 0 0,-2 0 0,4 1 0,-4 2 0,-2-6 0,6 9 0,-5-8 0,3 5 0,2-1 0,-8-6 0,8 8 0,-2-6 0,-3 5 0,8 0 0,-12-3 0,8 2 0,-2-2 0,1 1 0,6-2 0,-11 4 0,4 13 0,-3 2 0,5 8 0,6-3 0,-4-3 0,-1 10 0,1-8 0,0 8 0,0-9 0,1 8 0,-5-4 0,2 8 0,-4-3 0,4 4 0,-3 1 0,3-5 0,-4-2 0,5-3 0,1 0 0,3-5 0,0 7 0,6-4 0,16 5 0,-1-1 0,15-1 0,-13-2 0,7 2 0,-7 3 0,3-2 0,-3 2 0,-1-1 0,-3-2 0,2 3 0,-2-4 0,2-1 0,-2 1 0,1 0 0,-4-1 0,4 1 0,-4 0 0,1-1 0,-2 1 0,-1 0 0,0-1 0,3 3 0,-2-6 0,4 5 0,-1-8 0,6 5 0,-5-5 0,5 5 0,-10-5 0,7 6 0,-6-3 0,6 3 0,-6-3 0,5 3 0,1 0 0,-2-2 0,5 1 0,-6-6 0,7 4 0,-7-3 0,6 1 0,-4-5 0,0-1 0,6-3 0,-6-3 0,2-6 0,2-2 0,-3-2 0,4 3 0,-7 3 0,2-3 0,0 5 0,-60 21 0,31-4 0,-52 19 0,44-19 0,4 3 0,-3-6 0,7 1 0,1-2 0,1-1 0,4 3 0,-5-2 0,2 4 0,2-4 0,-5 5 0,8-6 0,-6 6 0,5 0 0,5 0 0,-2 6 0,-3-6 0,4 0 0,-11-1 0,5-4 0,-3 2 0,0-3 0,1 0 0,-1 2 0,1-2 0,0 6 0,-3-9 0,3 4 0,-3-4 0,3 2 0,-3-11 0,2 0 0,-3-12 0,2 6 0,0-3 0,-3 5 0,2-5 0,-3 3 0,4-4 0,1 0 0,-1 1 0,0-1 0,1 0 0,-1 1 0,4-1 0,-3 0 0,2 1 0,-2 2 0,2-2 0,-2 6 0,3-2 0,-7-1 0,7 4 0,-6 0 0,3-2 0,2 4 0,-8-5 0,9 3 0,-3 1 0,-3-7 0,9 5 0,-7-8 0,5 9 0,-3-2 0,-3 2 0,-1 3 0,3-2 0,-6 6 0,5-6 0,1 5 0,-5-5 0,8 3 0,-5-1 0,-3 1 0,8 3 0,-9 0 0,7 0 0,-3 0 0,44-38 0,-14 21 0,42-31 0,-30 28 0,3 5 0,-4-1 0,-1 8 0,-4 0 0,-1 1 0,-8 3 0,6 1 0,-3 0 0,4 2 0,-3-5 0,-2 0 0,0-1 0,-1-5 0,-2 2 0,3-4 0,0-2 0,-1 4 0,4-4 0,-8 8 0,6-2 0,-1 3 0,5 0 0</inkml:trace>
+</inkml:ink>
+</file>
+
+<file path=ppt/ink/ink147.xml><?xml version="1.0" encoding="utf-8"?>
+<inkml:ink xmlns:inkml="http://www.w3.org/2003/InkML">
+  <inkml:definitions>
+    <inkml:context xml:id="ctx0">
+      <inkml:inkSource xml:id="inkSrc0">
+        <inkml:traceFormat>
+          <inkml:channel name="X" type="integer" min="-2.14748E9" max="2.14748E9" units="cm"/>
+          <inkml:channel name="Y" type="integer" min="-2.14748E9" max="2.14748E9" units="cm"/>
+          <inkml:channel name="F" type="integer" max="32767" units="dev"/>
+        </inkml:traceFormat>
+        <inkml:channelProperties>
+          <inkml:channelProperty channel="X" name="resolution" value="1000" units="1/cm"/>
+          <inkml:channelProperty channel="Y" name="resolution" value="1000" units="1/cm"/>
+          <inkml:channelProperty channel="F" name="resolution" value="0" units="1/dev"/>
+        </inkml:channelProperties>
+      </inkml:inkSource>
       <inkml:timestamp xml:id="ts0" timeString="2022-09-11T15:18:22.730"/>
     </inkml:context>
     <inkml:brush xml:id="br0">
@@ -1461,7 +1651,7 @@
 </inkml:ink>
 </file>
 
-<file path=ppt/ink/ink141.xml><?xml version="1.0" encoding="utf-8"?>
+<file path=ppt/ink/ink148.xml><?xml version="1.0" encoding="utf-8"?>
 <inkml:ink xmlns:inkml="http://www.w3.org/2003/InkML">
   <inkml:definitions>
     <inkml:context xml:id="ctx0">
@@ -1490,7 +1680,7 @@
 </inkml:ink>
 </file>
 
-<file path=ppt/ink/ink142.xml><?xml version="1.0" encoding="utf-8"?>
+<file path=ppt/ink/ink149.xml><?xml version="1.0" encoding="utf-8"?>
 <inkml:ink xmlns:inkml="http://www.w3.org/2003/InkML">
   <inkml:definitions>
     <inkml:context xml:id="ctx0">
@@ -1519,7 +1709,34 @@
 </inkml:ink>
 </file>
 
-<file path=ppt/ink/ink143.xml><?xml version="1.0" encoding="utf-8"?>
+<file path=ppt/ink/ink15.xml><?xml version="1.0" encoding="utf-8"?>
+<inkml:ink xmlns:inkml="http://www.w3.org/2003/InkML">
+  <inkml:definitions>
+    <inkml:context xml:id="ctx0">
+      <inkml:inkSource xml:id="inkSrc0">
+        <inkml:traceFormat>
+          <inkml:channel name="X" type="integer" min="-2.14748E9" max="2.14748E9" units="cm"/>
+          <inkml:channel name="Y" type="integer" min="-2.14748E9" max="2.14748E9" units="cm"/>
+          <inkml:channel name="F" type="integer" max="32767" units="dev"/>
+        </inkml:traceFormat>
+        <inkml:channelProperties>
+          <inkml:channelProperty channel="X" name="resolution" value="1000" units="1/cm"/>
+          <inkml:channelProperty channel="Y" name="resolution" value="1000" units="1/cm"/>
+          <inkml:channelProperty channel="F" name="resolution" value="0" units="1/dev"/>
+        </inkml:channelProperties>
+      </inkml:inkSource>
+      <inkml:timestamp xml:id="ts0" timeString="2022-09-11T14:48:18.057"/>
+    </inkml:context>
+    <inkml:brush xml:id="br0">
+      <inkml:brushProperty name="width" value="0.1" units="cm"/>
+      <inkml:brushProperty name="height" value="0.1" units="cm"/>
+    </inkml:brush>
+  </inkml:definitions>
+  <inkml:trace contextRef="#ctx0" brushRef="#br0">0 0 24575,'12'0'0,"0"0"0,-2 0 0,6 0 0,-5 0 0,3 0 0,8 0 0,0 0 0,3 0 0,-4 0 0,-11 0 0,-1 0 0,-4 0 0,-1 0 0,-2 0 0</inkml:trace>
+</inkml:ink>
+</file>
+
+<file path=ppt/ink/ink150.xml><?xml version="1.0" encoding="utf-8"?>
 <inkml:ink xmlns:inkml="http://www.w3.org/2003/InkML">
   <inkml:definitions>
     <inkml:context xml:id="ctx0">
@@ -1548,7 +1765,7 @@
 </inkml:ink>
 </file>
 
-<file path=ppt/ink/ink144.xml><?xml version="1.0" encoding="utf-8"?>
+<file path=ppt/ink/ink151.xml><?xml version="1.0" encoding="utf-8"?>
 <inkml:ink xmlns:inkml="http://www.w3.org/2003/InkML">
   <inkml:definitions>
     <inkml:context xml:id="ctx0">
@@ -1578,7 +1795,7 @@
 </inkml:ink>
 </file>
 
-<file path=ppt/ink/ink145.xml><?xml version="1.0" encoding="utf-8"?>
+<file path=ppt/ink/ink152.xml><?xml version="1.0" encoding="utf-8"?>
 <inkml:ink xmlns:inkml="http://www.w3.org/2003/InkML">
   <inkml:definitions>
     <inkml:context xml:id="ctx0">
@@ -1605,7 +1822,7 @@
 </inkml:ink>
 </file>
 
-<file path=ppt/ink/ink146.xml><?xml version="1.0" encoding="utf-8"?>
+<file path=ppt/ink/ink153.xml><?xml version="1.0" encoding="utf-8"?>
 <inkml:ink xmlns:inkml="http://www.w3.org/2003/InkML">
   <inkml:definitions>
     <inkml:context xml:id="ctx0">
@@ -1632,7 +1849,7 @@
 </inkml:ink>
 </file>
 
-<file path=ppt/ink/ink147.xml><?xml version="1.0" encoding="utf-8"?>
+<file path=ppt/ink/ink154.xml><?xml version="1.0" encoding="utf-8"?>
 <inkml:ink xmlns:inkml="http://www.w3.org/2003/InkML">
   <inkml:definitions>
     <inkml:context xml:id="ctx0">
@@ -1659,7 +1876,7 @@
 </inkml:ink>
 </file>
 
-<file path=ppt/ink/ink148.xml><?xml version="1.0" encoding="utf-8"?>
+<file path=ppt/ink/ink155.xml><?xml version="1.0" encoding="utf-8"?>
 <inkml:ink xmlns:inkml="http://www.w3.org/2003/InkML">
   <inkml:definitions>
     <inkml:context xml:id="ctx0">
@@ -1686,7 +1903,7 @@
 </inkml:ink>
 </file>
 
-<file path=ppt/ink/ink149.xml><?xml version="1.0" encoding="utf-8"?>
+<file path=ppt/ink/ink156.xml><?xml version="1.0" encoding="utf-8"?>
 <inkml:ink xmlns:inkml="http://www.w3.org/2003/InkML">
   <inkml:definitions>
     <inkml:context xml:id="ctx0">
@@ -1710,33 +1927,6 @@
     </inkml:brush>
   </inkml:definitions>
   <inkml:trace contextRef="#ctx0" brushRef="#br0">1 315 24575,'0'-17'0,"0"-6"0,0 11 0,0-7 0,0 12 0,2-2 0,-1 3 0,5 2 0,-6-1 0,6-2 0,-5-1 0,6-10 0,-3 6 0,4-6 0,-1 3 0,0 0 0,-3 4 0,3 1 0,-7 3 0,3 1 0,-3-3 0,0 2 0,0-2 0,0 3 0,0 0 0,0-1 0,3 1 0,1 0 0,2-1 0,-2 1 0,1-1 0,-1 1 0,2 3 0,-3 3 0,0 3 0,-3 3 0,0 0 0,0 0 0,0 1 0,0-1 0,0 0 0,0 1 0,0-1 0,0 0 0,0 1 0,0-1 0,0 0 0,0 1 0,0-1 0,0 1 0,0 3 0,0-2 0,3 2 0,1-4 0,-1 1 0,0 0 0,0-1 0,-2 1 0,2-1 0,-3 1 0,2-4 0,-1 3 0,2-3 0,0 4 0,-3-1 0,3 1 0,-3 0 0,3-1 0,-2 1 0,5-3 0,-6 1 0,6-4 0,-3 2 0,4-3 0,-1 3 0,1 0 0,-1 1 0,-2 2 0,2-5 0,-3 4 0,4-4 0,-4 4 0,3-4 0,-5 5 0,4-3 0,-1 4 0,0-1 0,1-2 0,-4 1 0,5-1 0,-2 2 0,2 1 0,1-1 0,-4 1 0,3 0 0,-2 3 0,0-3 0,2 3 0,-5-3 0,5 0 0,-6-1 0,6 1 0,-5-1 0,2 0 0,0 1 0,-3-1 0,3 1 0,0-1 0,-2 1 0,2-1 0,-3 1 0,3-1 0,-3 0 0,6 4 0,-5-2 0,6 10 0,-6-6 0,5 3 0,-5-1 0,5-7 0,-5 3 0,1-3 0,-2 0 0,0-4 0,0 0 0</inkml:trace>
-</inkml:ink>
-</file>
-
-<file path=ppt/ink/ink15.xml><?xml version="1.0" encoding="utf-8"?>
-<inkml:ink xmlns:inkml="http://www.w3.org/2003/InkML">
-  <inkml:definitions>
-    <inkml:context xml:id="ctx0">
-      <inkml:inkSource xml:id="inkSrc0">
-        <inkml:traceFormat>
-          <inkml:channel name="X" type="integer" min="-2.14748E9" max="2.14748E9" units="cm"/>
-          <inkml:channel name="Y" type="integer" min="-2.14748E9" max="2.14748E9" units="cm"/>
-          <inkml:channel name="F" type="integer" max="32767" units="dev"/>
-        </inkml:traceFormat>
-        <inkml:channelProperties>
-          <inkml:channelProperty channel="X" name="resolution" value="1000" units="1/cm"/>
-          <inkml:channelProperty channel="Y" name="resolution" value="1000" units="1/cm"/>
-          <inkml:channelProperty channel="F" name="resolution" value="0" units="1/dev"/>
-        </inkml:channelProperties>
-      </inkml:inkSource>
-      <inkml:timestamp xml:id="ts0" timeString="2022-09-11T14:48:18.057"/>
-    </inkml:context>
-    <inkml:brush xml:id="br0">
-      <inkml:brushProperty name="width" value="0.1" units="cm"/>
-      <inkml:brushProperty name="height" value="0.1" units="cm"/>
-    </inkml:brush>
-  </inkml:definitions>
-  <inkml:trace contextRef="#ctx0" brushRef="#br0">0 0 24575,'12'0'0,"0"0"0,-2 0 0,6 0 0,-5 0 0,3 0 0,8 0 0,0 0 0,3 0 0,-4 0 0,-11 0 0,-1 0 0,-4 0 0,-1 0 0,-2 0 0</inkml:trace>
 </inkml:ink>
 </file>
 
@@ -3576,14 +3766,14 @@
           <inkml:channelProperty channel="F" name="resolution" value="0" units="1/dev"/>
         </inkml:channelProperties>
       </inkml:inkSource>
-      <inkml:timestamp xml:id="ts0" timeString="2022-09-11T15:10:59.946"/>
+      <inkml:timestamp xml:id="ts0" timeString="2023-12-19T19:21:32.706"/>
     </inkml:context>
     <inkml:brush xml:id="br0">
-      <inkml:brushProperty name="width" value="0.1" units="cm"/>
-      <inkml:brushProperty name="height" value="0.1" units="cm"/>
+      <inkml:brushProperty name="width" value="0.05" units="cm"/>
+      <inkml:brushProperty name="height" value="0.05" units="cm"/>
     </inkml:brush>
   </inkml:definitions>
-  <inkml:trace contextRef="#ctx0" brushRef="#br0">7373 0 24575,'-16'0'0,"-1"0"0,-2 0 0,-1 0 0,-5 0 0,1 0 0,-1 0 0,-6 0 0,5 0 0,-11 0 0,16 0 0,-8 0 0,9 0 0,-5 0 0,1 0 0,-1 0 0,1 0 0,3 0 0,2 0 0,4 0 0,0 0 0,0 0 0,0 0 0,-3 3 0,2-2 0,2 2 0,0-3 0,3 0 0,-4 0 0,3 0 0,-6 0 0,6 0 0,-8 0 0,6 0 0,-1 0 0,0 0 0,3 0 0,-2 0 0,3 0 0,0 0 0,-3 0 0,2 0 0,-3 0 0,0 0 0,0 0 0,-3 0 0,3 0 0,-3 0 0,3 0 0,4 0 0,-3 0 0,2 0 0,-3 0 0,4 0 0,-3 0 0,6 0 0,-6 0 0,3 0 0,0 0 0,-3 0 0,2 0 0,-2 0 0,-1 0 0,0 0 0,0 0 0,0 0 0,0 0 0,0 0 0,4 0 0,-3 0 0,2 0 0,-9 0 0,4 0 0,-9 0 0,10 0 0,-7 0 0,7 0 0,-8 0 0,4 0 0,-4 0 0,3 0 0,-2 0 0,2 0 0,1 3 0,-3-2 0,7 2 0,-8-3 0,8 0 0,-7 4 0,2-3 0,1 2 0,-4-3 0,4 0 0,0 0 0,-4 0 0,2 4 0,-3 0 0,2 4 0,4-4 0,4 3 0,0-3 0,0 4 0,3-1 0,2 0 0,0 0 0,2 0 0,-2 0 0,3-1 0,-3 1 0,2 0 0,-6 0 0,6 4 0,-6-3 0,2 6 0,-3-5 0,4 1 0,-3-2 0,6-2 0,-2 1 0,3 0 0,1-3 0,-6-1 0,0-3 0,-13 0 0,3 0 0,-12 4 0,8 1 0,-9 0 0,4 2 0,-10-2 0,9 0 0,-8 4 0,14-5 0,1 1 0,6 2 0,4-6 0,4 5 0,-8-5 0,7 5 0,-12-1 0,8 2 0,-7 2 0,2-2 0,-3 2 0,-1-1 0,1 0 0,-1 0 0,5 0 0,1 0 0,4-1 0,3 0 0,-2 1 0,3-1 0,0 0 0,-3 1 0,2-1 0,-3 4 0,-4-3 0,3 3 0,-7 1 0,6-4 0,-6 4 0,7-1 0,-8-2 0,8 2 0,-3-3 0,0 3 0,3-2 0,-8 6 0,4-6 0,0 2 0,-4 1 0,4-3 0,-5 3 0,1 0 0,-6-3 0,4 7 0,-3-7 0,4 3 0,-4 0 0,3-3 0,-3 4 0,4-1 0,1-3 0,3 2 0,-2 1 0,2-3 0,-3 6 0,-1-6 0,-15 15 0,6-9 0,-13 7 0,17-6 0,0-3 0,6 0 0,-1 2 0,5-6 0,0 2 0,9-4 0,1 0 0,3 0 0,-3 0 0,-1 0 0,-3 0 0,-1 1 0,0-1 0,0 4 0,0-3 0,0 6 0,0-5 0,0 5 0,0-2 0,0 2 0,0 1 0,-1 5 0,-4 1 0,3 4 0,-9 1 0,4 0 0,0 0 0,1-5 0,9-1 0,-2-9 0,9 0 0,-5-4 0,7-3 0,-17 6 0,-4 10 0,-8 4 0,0 8 0,0-4 0,4-1 0,1-5 0,-4 9 0,3-7 0,-5 8 0,-3-8 0,13 1 0,-6-7 0,8 2 0,-16 7 0,10-7 0,-17 13 0,12-10 0,-7 6 0,6-1 0,2-5 0,4 3 0,7-12 0,3 1 0,7-8 0,6 0 0,-2 0 0,5 0 0,-2-1 0,0 1 0,0-1 0,-4 1 0,0 0 0,0 3 0,0 1 0,-1 4 0,1 0 0,-5 4 0,4-2 0,-4 2 0,5-4 0,-4 0 0,3 0 0,-3 0 0,4 0 0,-1-4 0,1 3 0,0 2 0,-1 0 0,0 7 0,-4-3 0,-1 10 0,-4-4 0,0 3 0,0 1 0,1-4 0,-1-1 0,-3-1 0,7-7 0,-7 7 0,8-11 0,-4 5 0,1-6 0,0 3 0,0 0 0,-5 5 0,4-4 0,-4 5 0,5-7 0,0 1 0,3-3 0,2-2 0,3-3 0,0 0 0,4-1 0,-3 1 0,2 0 0,-3 3 0,-4 2 0,0 3 0,-4 0 0,-1 4 0,1-3 0,-1 7 0,4-7 0,-3 0 0,7-5 0,1 0 0,1-4 0,5 4 0,-5-8 0,5 3 0,-5-2 0,2 3 0,-2 0 0,-5 3 0,3 1 0,-6 4 0,6 0 0,-3-3 0,4-2 0,-2 0 0,4-3 0,-1 3 0,3-6 0,3 4 0,-10 4 0,-5 14 0,-9 11 0,-5 7 0,0 4 0,0-4 0,0 3 0,1-7 0,-1 3 0,0-5 0,5-6 0,3-5 0,9-8 0,-2-4 0,6-3 0,0-2 0,2 0 0,-2 2 0,0 3 0,-3 0 0,0 4 0,-2 1 0,1 5 0,-3-5 0,6 3 0,-2-6 0,3 2 0,1-4 0,-1 0 0,4-1 0,-2 1 0,-2 0 0,-1 5 0,-5 0 0,-3 20 0,-5-10 0,0 11 0,1-11 0,-1-3 0,4 3 0,-3-5 0,0 1 0,4-1 0,-5 1 0,6-2 0,0-3 0,1-2 0,3-8 0,-2 3 0,7-6 0,-4 2 0,4 1 0,0 0 0,0 4 0,-1 0 0,-3 0 0,3 0 0,-7 4 0,3-3 0,-4 8 0,-6 3 0,4-5 0,-1 4 0,5-7 0,1 1 0,0 5 0,-2-1 0,6 1 0,-7 5 0,2 0 0,0 1 0,-2 4 0,2-5 0,-4 6 0,1-5 0,3 3 0,-1-8 0,5 4 0,-1-6 0,6 1 0,-2-1 0,2 6 0,-3-5 0,-1 10 0,0-9 0,1 8 0,-1-3 0,0 5 0,0 15 0,1-16 0,3 15 0,1-28 0,4 2 0,0-9 0,0-4 0,0-1 0,-4 10 0,-5 8 0,-5 9 0,-5 4 0,5-5 0,-2-5 0,6 15 0,-3-7 0,3 16 0,0-1 0,4-4 0,-3 11 0,8-5 0,-8 13 0,3-5 0,-4-7 0,-1 10 0,2-21 0,3 21 0,-3-17 0,8 5 0,-3-12 0,4-2 0,0-10 0,0-2 0,-4 1 0,3-4 0,-7 3 0,7-4 0,-6 0 0,2-1 0,-3 1 0,3 4 0,-2-3 0,-1 20 0,-2-18 0,2 18 0,1-20 0,2 3 0,0-4 0,-2-1 0,6 1 0,-2 0 0,-1-1 0,3 1 0,-6 0 0,6-1 0,-6 1 0,6-1 0,-7 1 0,7 0 0,-6-1 0,6 1 0,-2-5 0,3 4 0,0-4 0,0 5 0,-4-5 0,3 8 0,-6-6 0,-1 23 0,-1-16 0,0 16 0,2-19 0,2 4 0,1-10 0,0 4 0,4-4 0,0 0 0,0 4 0,0-8 0,0 3 0,0 1 0,0-4 0,0 3 0,0-4 0,0-1 0,0 1 0,0 0 0,0-3 0,0 8 0,3-10 0,1 7 0,3-11 0,-4 6 0,0 15 0,-3 14 0,-5 22 0,4 8 0,-9 7 0,4 7 0,-5-5-673,4-21 0,1 2 673,2-7 0,1 2 0,0 15 0,0 1 0,3-8 0,0-4-827,0 40 827,0-36 0,0-2 0,0 4-117,0-11 0,0-1 117,0 11 0,0 6 0,4-8 1271,2-9-1271,3-6 874,1 1-874,-5-1 262,4-5-262,-8 4 0,3-4 0,-4 11 0,4-4 0,-3-1 0,8-2 0,-4-10 0,4 4 0,0-5 0,0 0 0,-1-5 0,1-2 0,0 1 0,-1-4 0,0 3 0,4-4 0,-3 0 0,3-1 0,-4 1 0,1 0 0,-1-5 0,-4-1 0,3-4 0,-7-4 0,4 0 0,-1-7 0,-2 7 0,2 2 0,4 13 0,3 5 0,8 5 0,13 21 0,-10-16 0,16 27 0,-12-23 0,10 11 0,9 8 0,-8-24 0,12 21 0,-20-30 0,12 19 0,-9-10 0,2 0 0,-4-3 0,-6-10 0,-1 9 0,-5-10 0,0 3 0,-1-4 0,-3 0 0,3-1 0,-4-4 0,4 4 0,0-4 0,0 5 0,1 5 0,0-5 0,0 5 0,-1-5 0,0-5 0,-3 4 0,-3-8 0,2 7 0,-3-7 0,2 3 0,0-4 0,-3 0 0,7 5 0,1-4 0,2 8 0,5-7 0,4 9 0,5-8 0,6 10 0,-1-4 0,2 10 0,-2-9 0,-4 6 0,-2-8 0,-4 3 0,-5-4 0,-2-2 0,-9-8 0,0-2 0,-5-3 0,1-3 0,0-1 0,0-3 0,4 0 0,5 0 0,11 3 0,4 6 0,0 5 0,3 3 0,3 1 0,5 5 0,7-2 0,-1 7 0,0-4 0,7 2 0,-5 2 0,5-7 0,-12 7 0,5-4 0,-9 5 0,3-5 0,-9 3 0,-3-9 0,-9 2 0,3 1 0,-7-4 0,3 3 0,-8-5 0,2 4 0,-2-3 0,0 3 0,-1-4 0,-3 0 0,2 0 0,-2-3 0,3 2 0,0-3 0,-3 0 0,12 7 0,-2-6 0,4 7 0,2-7 0,-8 3 0,7-6 0,-7 5 0,4-6 0,-5 3 0,-4 0 0,3-3 0,-6 3 0,6 0 0,-2 0 0,-1 0 0,3 3 0,-3-2 0,4 2 0,0 1 0,0 0 0,5 1 0,-4-1 0,7 1 0,-2 0 0,3 1 0,6 0 0,16 8 0,-6-5 0,17 2 0,-14-5 0,5-6 0,21 14 0,-9-7 0,16 9 0,1-5 0,-4 0 0,20 2 0,-14-2 0,-12-1 0,6 1 0,-21 2 0,17-2 0,-13 3 0,-1-5 0,-12-1 0,-2-5 0,-5 3 0,-5-7 0,5 6 0,-10-11 0,-2 2 0,-2-7 0,-13 0 0,7-16 0,1 12 0,12-11 0,11 15 0,9 0 0,-1 0 0,-5 0 0,4 0 0,9 4 0,1 7 0,20 1 0,-6 8 0,6-2 0,1 4 0,-19-6 0,14 5 0,-21-10 0,11 9 0,-8-5 0,-12 0 0,-2 2 0,-10-7 0,-6 2 0,-6-4 0,-4-1 0,0 1 0,0-4 0,4 3 0,-3-6 0,7 2 0,3 1 0,0-3 0,3 7 0,-4-7 0,-1 6 0,6-6 0,-4 3 0,-1-1 0,-2-2 0,-2 2 0,3 1 0,-3-3 0,2 2 0,-2 1 0,3-3 0,-3 6 0,2-6 0,-2 6 0,-1-6 0,3 6 0,-2-3 0,3 1 0,17 3 0,-12-7 0,16 7 0,-14-7 0,10 2 0,2 2 0,5-4 0,14 8 0,-21-4 0,38 1 0,-41 1 0,35-6 0,-22 8 0,11-3 0,-6 4 0,-2-5 0,-6 4 0,-5-4 0,4 0 0,-4 4 0,11-4 0,-10 1 0,9 2 0,-10-6 0,32 2 0,-13-4 0,15 0 0,-22 0 0,-7 0 0,0 0 0,1 0 0,-1 0 0,-5 0 0,10 0 0,-9 0 0,11 0 0,-7 0 0,7 0 0,-6-5 0,6 4 0,-7-3 0,1 4 0,-1-4 0,0 3 0,-5-4 0,4 1 0,-10 3 0,4-7 0,1 7 0,-5-7 0,4 3 0,1-4 0,-5 0 0,10-5 0,-10 4 0,10-4 0,2-1 0,1 5 0,4-9 0,1 8 0,-6-8 0,12 8 0,-11-3 0,5 0 0,-1-2 0,-4 1 0,10-5 0,-10 5 0,5-5 0,-7 1 0,7-1 0,-5 0 0,4 0 0,-6 1 0,-5 4 0,4-3 0,-4 3 0,0 1 0,-2 0 0,0 1 0,-4 3 0,5-4 0,-11 5 0,3 1 0,-3-5 0,0 3 0,-2-2 0,-4 4 0,-1-1 0,-3 2 0,-2 2 0,-4-2 0,0 7 0,0-7 0,0 6 0,0-2 0,4-1 0,-3 3 0,10-6 0,-9 3 0,4-3 0,-6 3 0,-3-6 0,-1-3 0,-3-18 0,3 15 0,1-6 0,2 22 0,0 0 0,1 0 0,-3 0 0,2 0 0,-3 0 0,0 0 0,0 0 0,-1-3 0,-2 2 0,6-2 0,-3 3 0,4-4 0,0 0 0,0 0 0,0-3 0,0 3 0,0-3 0,0-1 0,0 1 0,4-1 0,-3 1 0,3-1 0,0-3 0,1-2 0,5 0 0,0-2 0,-1 2 0,-4-3 0,11-6 0,-14 8 0,9-7 0,-11 12 0,-4-1 0,3-1 0,-2 0 0,3-1 0,-4-2 0,8 2 0,-6-8 0,7 4 0,1-9 0,-5 9 0,9-10 0,-4 9 0,1-7 0,-3 7 0,-3 1 0,-1 2 0,-4 6 0,3-3 0,-3 1 0,0 2 0,3-2 0,-2-1 0,8-6 0,0 0 0,11-4 0,-4-1 0,8 4 0,-2-9 0,-2 8 0,1-7 0,-12 9 0,5-4 0,-9 6 0,3-1 0,-8 5 0,3-3 0,-6 3 0,6-4 0,-2 0 0,3 0 0,1-5 0,-1 4 0,1-7 0,12-9 0,-8-1 0,8-5 0,-11 13 0,-1 1 0,0 4 0,-1 0 0,-2 0 0,1 6 0,-2-6 0,3 4 0,1-3 0,-1 0 0,6-3 0,1-3 0,5-2 0,1-5 0,4 3 0,-3-4 0,4 0 0,-6 5 0,1-4 0,-6 6 0,-1 5 0,7-15 0,-10 17 0,10-16 0,-12 15 0,4-1 0,-3-3 0,3 3 0,0 0 0,-3-3 0,3 8 0,-4-8 0,-1 8 0,1-3 0,-1 4 0,0 0 0,0 0 0,0 0 0,0 0 0,0 0 0,-4 4 0,3 0 0,-6 4 0,2 0 0,-3 0 0,-1 1 0,-2-1 0,2 1 0,-2-5 0,6 0 0,3-8 0,2-1 0,2-5 0,-1 1 0,5-2 0,-3 1 0,3-1 0,-9 6 0,0 1 0,-5 8 0,0 0 0,0 4 0,0 1 0,0-9 0,0 3 0,4-8 0,2 1 0,2 0 0,1-6 0,0 1 0,0 4 0,-1 1 0,-3-1 0,-1 4 0,0-3 0,-2 4 0,1 0 0,1 0 0,-2-9 0,6 2 0,-1-12 0,4-2 0,-4-1 0,4-10 0,-4 10 0,5-10 0,-5 10 0,4-5 0,-9 11 0,8 2 0,-5-2 0,1 5 0,1-1 0,-5 8 0,6-1 0,-7 0 0,8-5 0,-3-4 0,4 3 0,1-14 0,0 21 0,9-16 0,-1 12 0,6-6 0,-4-3 0,11-8 0,-9 10 0,17-21 0,-18 12 0,6-7 0,-7 4 0,-3-1 0,-2 5 0,-9-4 0,-1 11 0,-4 2 0,-1 4 0,0 1 0,-4 4 0,0 0 0,-4 5 0,0-4 0,0 7 0,0-11 0,0 11 0,0-12 0,0 4 0,0-5 0,0 1 0,0-6 0,4-1 0,-3 0 0,7-3 0,-3 3 0,4 1 0,-5 0 0,4 5 0,-7 1 0,2 3 0,-3-2 0,0 3 0,0-10 0,0 4 0,0-8 0,0 3 0,0 0 0,0-3 0,0 8 0,0-8 0,0 12 0,0-6 0,0 8 0,0-5 0,0 1 0,4-1 0,-3 0 0,2 1 0,1-1 0,-3-15 0,3 11 0,-4-11 0,0 15 0,0 6 0,0-14 0,4-4 0,6-13 0,1-9 0,8 3 0,-1-29 0,4 3-598,-11 23 1,-2-2 597,0 7 0,0 1 0,-2-7 0,-1-2 0,0 1 0,0 0 0,-2 4 0,-1 0 0,1-5 0,-2 2-399,-2-31 399,0-8 0,6 18 0,-5 1 0,4 3 0,-5 15 0,0 11 0,0 4 0,0 11 1170,0 5-1170,0-3 424,-3 8-424,-2-9 0,-4 5 0,0-6 0,4 0 0,-3 0 0,7 1 0,-3-1 0,4-16 0,0 17 0,0-15 0,0 24 0,0-4 0,0 6 0,0-1 0,0 9 0,0-7 0,0 2 0,0-10 0,0-23 0,0 14 0,0-40 0,-4 37 0,-6-31 0,-1 24 0,-8-6 0,3-5 0,1 11 0,0-5 0,1 7 0,8 0 0,-7 5 0,8 2 0,-4 5 0,1 5 0,3-3 0,-2 8 0,2-4 0,1 6 0,-4-1 0,4 5 0,0-4 0,-3 4 0,6-1 0,-7-2 0,7 3 0,-2-1 0,-1-2 0,3 7 0,-2-8 0,3 8 0,-4-7 0,3 7 0,-3-8 0,4 8 0,0-8 0,-4-1 0,3-1 0,-2-8 0,-1 3 0,3 0 0,-7-3 0,3 8 0,-4-4 0,5 6 0,-3-1 0,6 5 0,-7-4 0,4 8 0,0-7 0,-3 7 0,6-8 0,-5 8 0,1-14 0,-2 12 0,-2-12 0,5 14 0,-2 1 0,1 0 0,2 4 0,-4 0 0,4 1 0,-1 3 0,-2 3 0,5-2 0,-2 0 0,3-14 0,-4-11 0,-6-18 0,-7-14 0,-5-16 0,0 0 0,1 13 0,0 0 0,7 10 0,-5-2 0,3-3 0,1 18 0,-2 2 0,3 5 0,0 5 0,-2-3 0,3 8 0,-4-4 0,4 6 0,-3-1 0,7 0 0,-6 1 0,6-1 0,-3 1 0,7 3 0,-2-2 0,2 2 0,-3 1 0,0-3 0,1 7 0,-1-8 0,0 8 0,0-7 0,-3 7 0,2-8 0,-6 4 0,-2-6 0,0 5 0,-9-4 0,5 3 0,-5 0 0,5 2 0,-4-1 0,9 5 0,-8-5 0,8 9 0,-3-2 0,7 2 0,-6-4 0,5 1 0,-12-6 0,9 5 0,-9-9 0,4 8 0,-4-4 0,-1 0 0,6 4 0,-8-7 0,11 12 0,-2 1 0,12 4 0,4 3 0,3-2 0,0-14 0,-8 3 0,-6-23 0,-16-6 0,-9-19 0,6 10 0,-8-9 0,15 26 0,-8-7 0,5 6 0,1 6 0,4 2 0,0 9 0,7 2 0,-2 5 0,4 0 0,0 3 0,0-2 0,0 6 0,4-3 0,0 4 0,1 0 0,2 3 0,-2-2 0,3 5 0,1-2 0,2 0 0,-2 3 0,3-3 0,-3 3 0,-1-3 0,-3 2 0,-1-6 0,-4 3 0,0-3 0,0-1 0,0-2 0,-5 1 0,4-2 0,-3 0 0,0 2 0,3-5 0,-3 5 0,-1-5 0,4 2 0,-3-4 0,0 1 0,-2-1 0,1 0 0,-4-5 0,3 4 0,0-3 0,-3 4 0,8 0 0,-3 1 0,0-1 0,3 1 0,-4 3 0,5-2 0,0 5 0,0-1 0,0-1 0,0 2 0,1-1 0,-1-1 0,-4-4 0,3 2 0,2 0 0,0 5 0,6 1 0,-2 0 0,3-3 0,0 2 0,0-2 0,-4 3 0,4 0 0,-7-1 0,2 1 0,1 0 0,-3 0 0,6 0 0,-6 0 0,3-1 0,-1 1 0,-2-4 0,3 3 0,-4-2 0,0 2 0,4-3 0,-10 0 0,8-4 0,-13 3 0,10 1 0,-3 0 0,-1 2 0,4-2 0,-7 0 0,3-2 0,-5 1 0,0-4 0,1 7 0,-6-7 0,4 7 0,-3-8 0,-1 8 0,4-3 0,-8-1 0,8 4 0,-8-4 0,8 5 0,-8-1 0,8-3 0,-3 3 0,4-6 0,-4 5 0,3-5 0,-4 5 0,6-5 0,-1 2 0,1 0 0,-1-2 0,1 6 0,-1-7 0,1 7 0,-6-3 0,4 4 0,-3-1 0,-1 1 0,5 0 0,-10-1 0,9 0 0,-8-3 0,3 2 0,0-3 0,-3 5 0,8-4 0,-4 2 0,6-2 0,0 1 0,-1 2 0,0-7 0,1 7 0,-12-10 0,9 5 0,-4-2 0,7 1 0,4 6 0,-1-6 0,-2 6 0,3-6 0,-1 6 0,-2-6 0,2 6 0,1-2 0,-3 3 0,6 0 0,-2 0 0,0 0 0,3 1 0,-3-1 0,4 1 0,0 2 0,0-1 0,0 2 0,0-1 0,0-1 0,0 2 0,0-1 0,0-1 0,0 5 0,0-6 0,0 7 0,4-7 0,-3 6 0,3-5 0,-4 5 0,3-2 0,-2 0 0,3 2 0,-4-2 0,0-1 0,0 3 0,0-2 0,0 0 0,4 2 0,-3-2 0,3-1 0,-4 3 0,0-2 0,0 0 0,0 2 0,-7-6 0,5 6 0,-4-5 0,6 5 0,0-6 0,0 3 0,0 0 0,0-3 0,0 6 0,0-5 0,0 5 0,0-6 0,-4 7 0,3-4 0,-3 4 0,4 0 0,0 0 0,-5 0 0,4 0 0,-3 0 0,4 0 0,0 0 0,-4 0 0,3 0 0,-3 0 0,4 0 0,0 0 0,0 0 0,0 0 0,-4 0 0,3 0 0,-4 0 0,5 0 0,0 0 0,0 0 0,0 0 0,0 0 0,0 0 0,1 0 0,-6 0 0,4 0 0,-3 0 0,4 0 0,0 0 0,-4 0 0,6 0 0,-5 0 0,7 0 0,-4 0 0,4 0 0,-4 0 0,8 0 0,-7 0 0,6 0 0,-2 0 0,3 0 0,-3 0 0,2 0 0,-5 0 0,5 0 0,-2 0 0,3 0 0,-4-3 0,4 2 0,-4-2 0,1 3 0,2 0 0,-2 0 0,3 0 0,0-3 0,-3 2 0,2-2 0,-2 3 0,3 0 0,1 0 0,-1 0 0,0 0 0,0 0 0,1 0 0,-1 0 0,-3 0 0,3 0 0,-3 0 0,3 0 0,0 0 0,-3 0 0,2 0 0,-2 0 0,0 0 0,2 0 0,-2 0 0,-1 0 0,4 0 0,-7 0 0,6 0 0,-2 0 0,-1 0 0,3 0 0,-2 0 0,3 0 0,1 0 0,-1 0 0,0 0 0,0 0 0,1 0 0,-1-3 0,1 2 0,-1-1 0,1-1 0,-1 2 0,0-2 0,1 3 0,-1-3 0,-3 2 0,2-5 0,-3 5 0,1-5 0,2 5 0,-2-2 0,3 0 0,0 2 0,1-5 0,-1 5 0,0-2 0,3 0 0,-2 3 0,3-6 0,-4 5 0,0-2 0,0 3 0,4-3 0,-3 2 0,2-2 0,-3 3 0,1 0 0,-1-3 0,1 3 0,-1-3 0,1 3 0,-1 0 0,1 0 0,-1 0 0,0 0 0,1 0 0,-1 0 0,0 0 0,1 0 0,-1 0 0,0 0 0,0 0 0,-3 0 0,2 0 0,-2 0 0,3 0 0,0 0 0,1 0 0,-1 0 0,0 0 0,0 0 0,1 0 0,-1 0 0,1 0 0,0 0 0,-1 0 0,1 0 0,-1 0 0,0 0 0,1 0 0,-1 0 0,0 0 0,1 0 0,-1 0 0,1 0 0,-1 0 0,1 0 0,-1 0 0,0 0 0,1 0 0,-1 0 0,3 0 0,1 0 0</inkml:trace>
+  <inkml:trace contextRef="#ctx0" brushRef="#br0">31 119 24575,'0'27'0,"0"2"0,0 8 0,0-5 0,0 10 0,0-8 0,-5 14 0,4-9 0,-5 4 0,6-6 0,0-5 0,0 4 0,0-4 0,0 5 0,0-5 0,0 4 0,0-9 0,0 4 0,0-6 0,0-7 0,0 5 0,0-10 0,0 3 0,0 3 0,0-10 0,0 10 0,0-7 0,0 0 0,0-1 0,0-4 0,0 0 0,0 0 0,0 0 0,0 0 0,0 0 0,0-1 0,0 1 0,0 0 0,0 4 0,0-3 0,0 3 0,0-1 0,0-2 0,0 3 0,0-4 0,0 0 0,0 4 0,0-3 0,0 7 0,0-7 0,0 2 0,-8 1 0,6-3 0,-7 3 0,9-4 0,0 0 0,8-3 0,2-2 0,8-2 0,6 0 0,2 0 0,11 0 0,-5 0 0,12 0 0,-12 0 0,12 0 0,-12 0 0,11 0 0,-4 0 0,6 0 0,0 0 0,0 0 0,0 0 0,0 0 0,0 0 0,7 0 0,-5 0 0,5 0 0,-14 0 0,6 0 0,-12 0 0,12 0 0,-12 0 0,5 0 0,0 0 0,-4 0 0,4 0 0,0 0 0,-5 0 0,12 0 0,-12 0 0,6 0 0,-8 0 0,1 0 0,7 0 0,-6 4 0,11-3 0,3 3 0,1-4 0,5 4 0,0-3 0,-5 3 0,12-4 0,-13 4 0,13-3 0,-12 3 0,12 1 0,-5-4 0,0 3 0,-2-4 0,-7 0 0,0 0 0,-7 0 0,-1 0 0,-6 0 0,0 0 0,-5 0 0,3 0 0,-3 0 0,5 0 0,6 0 0,-4 0 0,4 0 0,0 0 0,-10-3 0,9 2 0,-16-2 0,10 3 0,-10 0 0,-1 0 0,-1 0 0,-4 0 0,5 0 0,5 0 0,-4 0 0,10 0 0,-10 0 0,10 0 0,-10 0 0,9 0 0,-8 0 0,3 0 0,-5 0 0,-1 0 0,7 0 0,-5 0 0,9 0 0,-3 0 0,5 0 0,0 0 0,0 0 0,-6 0 0,-1 0 0,-5 0 0,-5 0 0,0 0 0,-6 0 0,1 0 0,-1 0 0,0 0 0,0 0 0,-4-7 0,-1-13 0,-3-2 0,0-11 0,0 3 0,0 3 0,0 0 0,0 3 0,0 7 0,0 1 0,0 5 0,0 4 0,0 0 0,0 0 0,0-4 0,0 0 0,0-5 0,0 0 0,0 1 0,0-5 0,0-2 0,0 1 0,0 1 0,0 0 0,4 3 0,-3-3 0,4 5 0,-5-1 0,4-4 0,-3 3 0,8-8 0,-7 4 0,2-4 0,-4-1 0,5 0 0,-4 5 0,3-4 0,1 9 0,-4-4 0,3 8 0,-4 1 0,0 4 0,0 0 0,0-1 0,0 1 0,0 0 0,0 0 0,0 0 0,0 0 0,0 0 0,0 0 0,0 0 0,0-4 0,0 3 0,0-3 0,0 0 0,0 0 0,0-5 0,0 0 0,0 1 0,0-1 0,0 0 0,0 1 0,0 3 0,0-3 0,0 7 0,0-3 0,0 4 0,-4 4 0,0-6 0,0 4 0,-8-5 0,6 3 0,-6 0 0,3 3 0,1-2 0,-5 1 0,3 1 0,-3-3 0,-1 7 0,5-7 0,-9 7 0,3-4 0,-4 1 0,0 2 0,5-6 0,-4 7 0,4-4 0,0 4 0,-4 0 0,8 0 0,-8-3 0,9 2 0,-9-3 0,3 4 0,-4 0 0,5 0 0,-4 0 0,4 0 0,-5 0 0,0 0 0,0 0 0,0 0 0,0 0 0,0 0 0,1 0 0,-1 0 0,0 0 0,-6 0 0,5 0 0,-10 0 0,5 0 0,-6 0 0,0 0 0,5 0 0,-4 0 0,10 0 0,-4-3 0,-1 2 0,5-2 0,-4 3 0,5 0 0,0-4 0,-6 3 0,5-2 0,-4-1 0,5 3 0,0-2 0,0-1 0,0 3 0,0-2 0,0 3 0,0 0 0,0 0 0,0 0 0,5 0 0,-4 0 0,4 0 0,-5 0 0,-5 0 0,3 0 0,-3 0 0,0 0 0,3 0 0,-3 0 0,0 0 0,3 0 0,-3 0 0,0 0 0,3 0 0,-3 0 0,0 0 0,3 0 0,-8 0 0,8 0 0,-8 0 0,9 0 0,-10 0 0,10 0 0,-5 0 0,6 0 0,0 0 0,0 0 0,5 0 0,-4 0 0,4 0 0,-5 0 0,5 0 0,-4 0 0,4 0 0,-1 0 0,-3 0 0,9 0 0,-9 0 0,8 0 0,-3 0 0,0 0 0,-2 0 0,-4 0 0,0 0 0,1 0 0,-1 0 0,0 0 0,-6 0 0,5 0 0,-4 0 0,5 0 0,-6 0 0,5 0 0,-4 0 0,5 0 0,0 0 0,0 0 0,0 0 0,0 0 0,0 0 0,-5 0 0,4 0 0,-10 0 0,10-4 0,-10 4 0,10-4 0,-10 0 0,4 3 0,0-3 0,-3 4 0,9-3 0,-10 2 0,10-2 0,-5 3 0,6 0 0,0 0 0,0 0 0,0 0 0,0 0 0,5 0 0,1 0 0,4 0 0,1 0 0,-1 0 0,-4 0 0,3 0 0,-8 0 0,4 0 0,-1 0 0,-2 0 0,2 0 0,1 0 0,-4 0 0,8 0 0,-3 0 0,5 0 0,-1 0 0,0 0 0,1 0 0,-1 0 0,1 0 0,0 0 0,-1 0 0,-4 0 0,3 0 0,-3 0 0,4 0 0,1 0 0,-5 0 0,3 0 0,-3 0 0,-1 0 0,5 0 0,-5 0 0,6 0 0,-1 0 0,0 0 0,1 0 0,-1 0 0,1 0 0,-1 0 0,1 0 0,-1 0 0,1 0 0,-1 0 0,1 3 0,-1-3 0,1 4 0,-1-4 0,5 3 0,0 0 0,4 4 0,0 0 0,0-1 0,-4-2 0,4 2 0,-8-5 0,7 5 0,-7-5 0,4 2 0,-4-3 0,4 0 0,0 0 0</inkml:trace>
 </inkml:ink>
 </file>
 
@@ -3603,14 +3793,14 @@
           <inkml:channelProperty channel="F" name="resolution" value="0" units="1/dev"/>
         </inkml:channelProperties>
       </inkml:inkSource>
-      <inkml:timestamp xml:id="ts0" timeString="2022-09-11T15:10:59.947"/>
+      <inkml:timestamp xml:id="ts0" timeString="2023-12-19T19:22:17.811"/>
     </inkml:context>
     <inkml:brush xml:id="br0">
-      <inkml:brushProperty name="width" value="0.1" units="cm"/>
-      <inkml:brushProperty name="height" value="0.1" units="cm"/>
+      <inkml:brushProperty name="width" value="0.05" units="cm"/>
+      <inkml:brushProperty name="height" value="0.05" units="cm"/>
     </inkml:brush>
   </inkml:definitions>
-  <inkml:trace contextRef="#ctx0" brushRef="#br0">9116 211 24575,'-28'0'0,"1"0"0,3-3 0,-1 2 0,0-7 0,1 7 0,-1-10 0,1 10 0,-1-7 0,5 8 0,-4-3 0,4 2 0,-5-3 0,-5 4 0,5 0 0,-5 0 0,6-4 0,-12 4 0,13-4 0,-11 4 0,18 0 0,-3 0 0,0 0 0,3 0 0,-8 0 0,4-4 0,-5 3 0,1-2 0,-1 3 0,-5-4 0,5 3 0,-10-7 0,10 7 0,-5-7 0,0 3 0,5-3 0,-10 3 0,4-3 0,0 7 0,-3-2 0,3 3 0,-20 0 0,11 0 0,-11 0 0,16 0 0,-1 0 0,1 0 0,-1 0 0,6 0 0,0 0 0,6 0 0,-1 3 0,5-2 0,4 6 0,2-7 0,7 3 0,-12-3 0,-2 0 0,-5 0 0,-3 0 0,-1 4 0,-6-3 0,-1 3 0,-5-4 0,7 0 0,-1 0 0,5 0 0,2 0 0,4 0 0,5 0 0,-4 0 0,8 0 0,-3 0 0,4 0 0,4 0 0,-3 0 0,2 0 0,-3 0 0,-4 0 0,3 0 0,-7 0 0,7 0 0,-4 0 0,5 0 0,-4 4 0,3 0 0,-3 1 0,4 1 0,0-1 0,0 2 0,0 1 0,0-4 0,0 2 0,4-2 0,-3 0 0,2 3 0,-3-7 0,1 7 0,-1-3 0,-5 4 0,4-4 0,-7 4 0,2-4 0,-3 4 0,-1 1 0,5-5 0,-4 3 0,8-2 0,-3-1 0,0 3 0,3-6 0,-19 6 0,17-3 0,-17 1 0,15 2 0,-5-3 0,1 5 0,3-5 0,-2 3 0,2-6 0,1 6 0,-3-2 0,6 2 0,-6-2 0,3 2 0,-5-3 0,1 5 0,-1-1 0,0-4 0,5 3 0,-4-2 0,8-1 0,-3 3 0,4-3 0,0 0 0,0 3 0,0-6 0,0 5 0,0-5 0,0 6 0,1-3 0,-12 7 0,4-6 0,-5 5 0,3-5 0,8 3 0,-3-1 0,0-2 0,3 1 0,-4-2 0,5 4 0,0-4 0,0 3 0,-4-3 0,-1 4 0,-5 0 0,1 0 0,-6 1 0,-1 3 0,-10 3 0,4 3 0,-10 1 0,10-1 0,-10 1 0,10-1 0,1-4 0,1 3 0,9-4 0,-8 1 0,8 1 0,-3-1 0,4-2 0,-5 5 0,4-5 0,-3 6 0,4-2 0,1 0 0,-2 5 0,1-3 0,4 2 0,-3 1 0,8-5 0,-10 9 0,5-3 0,-6 5 0,0-1 0,-17 18 0,8-7 0,-9 8 0,8-8 0,4-8 0,-6 8 0,6-8 0,-4 8 0,9-9 0,-9 9 0,9-9 0,0 3 0,3-4 0,8-7 0,-3 0 0,5-5 0,3 0 0,1 0 0,4-3 0,0 2 0,0-7 0,3 4 0,-2-8 0,-3 0 0,-18 6 0,-9 12 0,-9 5 0,-3 8 0,13-6 0,-5-4 0,1 9 0,0-8 0,-5 9 0,16-11 0,-2-1 0,18-11 0,-3 0 0,8-4 0,0 0 0,-8 8 0,2-2 0,-16 9 0,6-2 0,-13 4 0,3 4 0,-6 1 0,6-1 0,1 0 0,6-10 0,8 2 0,3-12 0,8 2 0,0-3 0,3 0 0,1 0 0,0-4 0,3 3 0,-3-2 0,-4 3 0,-1 4 0,-8 5 0,1 0 0,-2 12 0,-3-5 0,1 6 0,-1-8 0,4 3 0,1-8 0,-1 3 0,5-4 0,0 0 0,3 0 0,-2 0 0,1 0 0,-2 0 0,0 4 0,-1 2 0,-5 8 0,-1 2 0,-5 6 0,-1 0 0,-5 2 0,0 4 0,0-3 0,0 3 0,0 0 0,-4-4 0,3 4 0,-2-9 0,8 2 0,-3-3 0,4-1 0,0-2 0,-3 2 0,8-6 0,-4 5 0,6-7 0,-1 1 0,1 0 0,0-1 0,3-3 0,-2-2 0,7-4 0,-3 0 0,3 4 0,1-3 0,-1 3 0,-3 1 0,2 0 0,-3 4 0,0 1 0,3 4 0,-7 2 0,2 0 0,1 3 0,-3-3 0,-7 26 0,3-16 0,-6 16 0,9-26 0,-1 3 0,1-8 0,4 4 0,-3-6 0,4 1 0,-4-5 0,4 3 0,-2-7 0,5 3 0,-6 0 0,6 1 0,-6 5 0,-6 20 0,-3-9 0,-8 17 0,8-16 0,-3-4 0,8 2 0,-1-13 0,3 7 0,2-13 0,-1 3 0,1-4 0,4 0 0,-4-4 0,7 4 0,-6-7 0,6 2 0,-2-3 0,6 0 0,1 2 0,-4 7 0,-15 21 0,-15 11 0,-15 26 0,1-5 0,7-3 0,2-8 0,11-3 0,-4-8 0,11-4 0,2-12 0,9-11 0,2-4 0,4-2 0,0-3 0,-5 8 0,0 2 0,-5 8 0,-7 14 0,5-4 0,-10 14 0,10-16 0,-8 9 0,8-9 0,-4 4 0,10-10 0,0-1 0,6-14 0,-1 3 0,4-12 0,-2 4 0,5-5 0,-2 5 0,3 0 0,-3 4 0,2 4 0,-7 7 0,4 5 0,-9 4 0,3 1 0,-3 0 0,4-6 0,-7 16 0,6-22 0,-5 11 0,7-16 0,1-3 0,-1 4 0,4-5 0,-3 4 0,-2 1 0,0 10 0,-9 12 0,8-3 0,-9 14 0,9-10 0,-4 5 0,0 0 0,3 0 0,-7 1 0,8-7 0,-4-1 0,5 6 0,1-14 0,-1 8 0,1-21 0,4-1 0,1-4 0,0-4 0,2 0 0,-2-4 0,3-1 0,0 9 0,-9 12 0,-1 5 0,-9 15 0,1-10 0,-6 17 0,4-16 0,-9 15 0,10-10 0,-5 6 0,5-7 0,5 0 0,1-12 0,0 5 0,4-4 0,-9 10 0,4 2 0,-5 0 0,0 4 0,0-5 0,-5 7 0,5-7 0,-4 0 0,5-7 0,5-9 0,1 2 0,5-16 0,3 6 0,-2-10 0,5 2 0,-2-3 0,3 8 0,-4 1 0,3 14 0,-6 1 0,2 4 0,0 1 0,-3-5 0,3 3 0,0-8 0,-2 0 0,6-4 0,-5-10 0,5 1 0,-2-6 0,3 3 0,0 5 0,-3 5 0,2 9 0,-3 2 0,0 5 0,3 5 0,-7 1 0,7 1 0,-4-2 0,1-6 0,4-4 0,-8-1 0,7-10 0,-6 4 0,6-8 0,-6-1 0,3-4 0,-2-5 0,2 6 0,1 4 0,3 11 0,0 4 0,-9 17 0,2 2 0,-8 6 0,5 5 0,0-5 0,-1 6 0,-4 0 0,9 0 0,-8-6 0,9-2 0,-5-5 0,0-1 0,5 0 0,1-5 0,4-2 0,-4-5 0,3-5 0,-3 4 0,4-10 0,0 10 0,0-9 0,0 8 0,0-3 0,-4 5 0,3 0 0,-7-1 0,3 1 0,0 0 0,1-5 0,0 3 0,3-8 0,-3 4 0,4-6 0,-4 1 0,4 5 0,-4-5 0,4 5 0,0 0 0,0 0 0,0 1 0,0-1 0,0-1 0,0-3 0,0 8 0,0-8 0,0 3 0,0 1 0,0-4 0,0 8 0,0-3 0,4 5 0,1 5 0,4-4 0,1 10 0,-1-5 0,-4 1 0,4 4 0,-4-5 0,1 1 0,2 4 0,-3-10 0,5 5 0,-6-7 0,4 1 0,-3 0 0,4-5 0,0-2 0,-1 0 0,-3-7 0,-2 6 0,-3-12 0,0-1 0,0 1 0,0 5 0,0 7 0,0 7 0,0 1 0,0-5 0,0-6 0,0-1 0,4-4 0,1 15 0,4 3 0,1 23 0,1-3 0,-1-1 0,0 3 0,-1-16 0,2 17 0,-1-5 0,0 0 0,-1-7 0,1-2 0,-1-10 0,1 10 0,3-10 0,-3 4 0,3-5 0,-4 0 0,0 5 0,0-4 0,0 4 0,0-5 0,0-5 0,-1 3 0,1-8 0,-1 3 0,0-4 0,0-1 0,4 1 0,-3-1 0,3 1 0,1 4 0,-4-3 0,4 9 0,-1-5 0,-2 6 0,3-1 0,0 1 0,1 0 0,4 0 0,0 0 0,0 5 0,5-3 0,-3 10 0,8-9 0,5 24 0,-8-26 0,11 24 0,-12-23 0,5 10 0,-1 0 0,7 2 0,-5-5 0,26 30 0,-9-9 0,6 3 0,-11-8 0,-14-22 0,1 5 0,-6-7 0,-1-6 0,-10-15 0,-1-1 0,-1-11 0,10-1 0,11 5 0,11 3 0,2 13 0,-2-5 0,-4 9 0,-6-9 0,15 9 0,-6 1 0,14 3 0,-5 2 0,-6 0 0,-1-4 0,0 3 0,1-4 0,0 4 0,3-7 0,-3 6 0,0-7 0,4 4 0,-9 0 0,3-5 0,-9 3 0,3-3 0,-9-2 0,5 5 0,-6-5 0,0 0 0,0 4 0,4-8 0,-2 8 0,7-7 0,-2 7 0,8-2 0,-2 0 0,8 0 0,-9-1 0,4-3 0,-10 2 0,2-5 0,-7 5 0,-2-5 0,0 0 0,-9-3 0,3-2 0,-4 3 0,0 0 0,4 1 0,-2 3 0,7-1 0,-3 2 0,-1-8 0,-1 3 0,-4-7 0,0 3 0,-3-4 0,-2-3 0,-3-1 0,-1-3 0,6 0 0,15 0 0,14 5 0,15 1 0,0 4 0,-1 4 0,-7 1 0,21 12 0,0 6 0,-2-4 0,-16-5 0,-2-1 0,-8-2 0,49 18 0,-51-15 0,22 7 0,-11-2 0,0 1 0,-3-5 0,-7 3 0,2-9 0,-4 9 0,-7-9 0,1 7 0,-7-8 0,1 3 0,-1 0 0,-4 0 0,4 1 0,-8-3 0,6-2 0,-2-2 0,3 2 0,1-1 0,-1-3 0,1-1 0,5 0 0,-5-2 0,5 2 0,-10-4 0,4 4 0,-4-3 0,1 6 0,2-7 0,-3 7 0,5-6 0,0 3 0,-1 0 0,6-3 0,0 8 0,6-8 0,-1 8 0,7-7 0,0 8 0,7-7 0,12 3 0,-3 1 0,11-3 0,-18 2 0,8-3 0,-8-2 0,32 11 0,-15-8 0,9 7 0,-23-9 0,-5 0 0,-1-1 0,-5 1 0,4-1 0,-5 1 0,1-1 0,-1 0 0,-1-4 0,2 3 0,5-7 0,0 8 0,0-8 0,-5 3 0,3 1 0,-3 0 0,-1 0 0,0 4 0,-6-8 0,21 7 0,-16-3 0,22 0 0,-20-1 0,5-4 0,0 0 0,-5 0 0,4 0 0,-10 0 0,10 0 0,-10 0 0,4 0 0,-10 0 0,3 0 0,-8 0 0,9 0 0,-10 0 0,5 0 0,-5 0 0,-1 0 0,-3 0 0,2 0 0,4 0 0,-1 0 0,6 0 0,-8 0 0,-4 0 0,4 0 0,-4 0 0,5 0 0,0 0 0,-1 0 0,-3 0 0,-2 4 0,-4-4 0,-4 4 0,3-4 0,-6 0 0,2 0 0,-3 0 0,0 0 0,-3-7 0,9 5 0,6-4 0,7 6 0,8 0 0,-8 0 0,14 0 0,-2 4 0,10 1 0,-5 5 0,4-1 0,-4 1 0,-1-1 0,5 1 0,-4-1 0,0-4 0,4 4 0,-5-4 0,1 1 0,4 2 0,-10-7 0,4 8 0,-5-5 0,0 1 0,-5 3 0,3-3 0,-3 0 0,5 3 0,-1-4 0,1 1 0,0 3 0,0-3 0,15 4 0,-16-4 0,11 3 0,-22-4 0,1 1 0,-1 2 0,1-6 0,4 7 0,2-7 0,5 7 0,0-7 0,-1 7 0,7-7 0,1 7 0,-1-7 0,0 7 0,-7-7 0,1 7 0,0-7 0,-1 3 0,-4 0 0,4-3 0,-10 2 0,10-3 0,-4 0 0,-1 0 0,5 0 0,-4 0 0,4 0 0,7 0 0,-5 0 0,4 0 0,-5 0 0,-1 0 0,7 0 0,-5 0 0,10 0 0,-4 0 0,-1 0 0,5 0 0,-4 0 0,5-4 0,1 3 0,-7-7 0,5 2 0,-9 1 0,3-3 0,-5 7 0,-1-3 0,-4 0 0,-1 4 0,10-8 0,-6 3 0,8 0 0,-8-3 0,-3 3 0,5 0 0,-1-3 0,7 3 0,-10-4 0,8 4 0,-14-2 0,8 6 0,-8-6 0,4 2 0,-6 0 0,1-2 0,5 6 0,0-6 0,6 6 0,0-7 0,-1 3 0,7 0 0,16-4 0,-11 8 0,10-3 0,-21 0 0,0 3 0,-1-3 0,0 0 0,-4 3 0,-2-6 0,1 6 0,-4-3 0,3 4 0,-8 0 0,-2 0 0,0 0 0,-3-3 0,3 2 0,-4-3 0,-3 4 0,2 0 0,-7 0 0,8-3 0,-8 2 0,7-2 0,-6 3 0,2-3 0,-3 2 0,0-2 0,0 3 0,-1 0 0,1-3 0,-3-8 0,4 5 0,10-5 0,2 11 0,20-9 0,-2 3 0,10-12 0,6 7 0,-4-8 0,5 8 0,-7-7 0,0 3 0,-5 0 0,4-3 0,-10 4 0,-1-4 0,-2 5 0,-3-4 0,0 4 0,3-4 0,3-1 0,1-5 0,9 2 0,-7-7 0,7 4 0,-3-5 0,0 0 0,-2 5 0,-4-4 0,-2 9 0,-3-8 0,2 8 0,-7-6 0,2 6 0,-9-1 0,2 4 0,-2 0 0,4-5 0,0 3 0,7-8 0,-1 7 0,2-7 0,2 7 0,-2-8 0,4 3 0,2-5 0,0 0 0,-7 5 0,5-3 0,-10 4 0,4 0 0,-5 2 0,-1 0 0,0 4 0,-3-8 0,2 8 0,-8-2 0,3 3 0,1 0 0,-4 1 0,4-5 0,-5 8 0,0-7 0,0 8 0,0-4 0,0 0 0,5-1 0,-4 1 0,7-1 0,-2 0 0,4-5 0,1-1 0,0 0 0,5-5 0,-4 5 0,4-1 0,-4-3 0,-2 9 0,1-9 0,-1 9 0,-4-4 0,4 0 0,-5 4 0,7-8 0,-1 3 0,-5 0 0,5-3 0,-10 8 0,4-3 0,-4 1 0,-1 3 0,6-9 0,-4 5 0,4-6 0,-1 5 0,2-4 0,4 3 0,1-5 0,-1 1 0,1-1 0,-1 5 0,-1 1 0,0 4 0,0 1 0,-5 0 0,3 0 0,-7 4 0,10-6 0,-9 6 0,4-3 0,-6 1 0,4 1 0,-6 2 0,5-4 0,-7 4 0,1 0 0,-2 0 0,-3 4 0,0 1 0,3-5 0,1 3 0,1-6 0,2 6 0,-6-3 0,3 1 0,5-7 0,-7 5 0,11-12 0,-8 7 0,0-3 0,4-3 0,-4 2 0,5-3 0,0-6 0,-1 4 0,1-3 0,0 4 0,-1 5 0,-4 0 0,3 1 0,-7 7 0,3-3 0,-4 8 0,-1 0 0,1 1 0,-3-1 0,2-4 0,7-5 0,0-5 0,8 0 0,-9 2 0,2 4 0,-5 0 0,1 3 0,-3 2 0,0 3 0,0 1 0,4-9 0,10-19 0,2 5 0,4-13 0,-6 16 0,-9 6 0,0 1 0,-5 7 0,0 2 0,0 3 0,0 3 0,-4-2 0,3 6 0,-1-19 0,7-1 0,2-16 0,3 5 0,0 2 0,-1 4 0,-3 1 0,-2 3 0,-3 6 0,-1 4 0,0 4 0,-4 1 0,3 2 0,-2-6 0,5-19 0,3-1 0,3-17 0,9-8 0,-8 9 0,9-15 0,-10 7 0,5 4 0,-5 1 0,3 8 0,-9 14 0,3 3 0,-5 9 0,-2 4 0,-2 0 0,-3 5 0,3 2 0,1-5 0,3-8 0,5-9 0,2-10 0,10-12 0,-6 15 0,7-19 0,-7 14 0,5-10 0,-6-1 0,4 7 0,-10 0 0,2 6 0,-5 6 0,1 0 0,-1 5 0,0 5 0,0 1 0,-1 4 0,1 0 0,-1 0 0,0 4 0,-3 0 0,-1 5 0,0 2 0,-2-2 0,2-6 0,-3 0 0,4-16 0,1-4 0,4-5 0,10-16 0,-7 14 0,11-14 0,-8 11 0,4-7 0,-4 7 0,2 0 0,-7 1 0,3 9 0,-4-8 0,0 14 0,-1-4 0,0 6 0,1-1 0,-1 0 0,0 1 0,0 3 0,-4 2 0,0 4 0,-1 4 0,-3 1 0,3-1 0,-3 0 0,3 0 0,-2-3 0,2 2 0,1-7 0,0-4 0,1-2 0,1-2 0,-5 7 0,7-4 0,-4 8 0,0-3 0,3 4 0,-3 0 0,0 0 0,3 0 0,-6 0 0,5 0 0,-1 0 0,-1 0 0,2 0 0,-1-4 0,3-1 0,0-5 0,0 1 0,0-1 0,0 5 0,0-4 0,-3 8 0,2-8 0,-6 4 0,6-11 0,-2 0 0,3-1 0,-3 2 0,2 6 0,-2-6 0,3 4 0,1-3 0,-1 4 0,1-4 0,-1 3 0,1-4 0,-2 10 0,5-4 0,-3 4 0,3-5 0,-4 1 0,0-1 0,0 1 0,1-6 0,-4 4 0,2-8 0,-6 8 0,7-8 0,-3 8 0,4-9 0,-1 4 0,1-4 0,0-1 0,0 0 0,0 1 0,0-1 0,0-6 0,1 0 0,-1-6 0,5 0 0,-3 0 0,2 5 0,-3-3 0,-1 9 0,-4-5 0,3 7 0,-7-1 0,7 5 0,-7 1 0,2 1 0,-3 11 0,0-9 0,0 10 0,0-12 0,0 3 0,0-9 0,0-7 0,0-15 0,0 5 0,0-21 0,0 33 0,0-27 0,0 17 0,0-6 0,0-5 0,0 11 0,0-5 0,0 13 0,0 1 0,0 5 0,0 5 0,0-3 0,0 8 0,0-4 0,0 6 0,0-6 0,0 4 0,0-3 0,0 4 0,0 0 0,-3 5 0,2-3 0,-2 2 0,-1-8 0,-1 3 0,0-4 0,-2 1 0,6 3 0,-7-9 0,7 5 0,-3-6 0,0 5 0,3-3 0,-6 3 0,6-5 0,-7 5 0,7-3 0,-6 3 0,2 0 0,-4-3 0,1 8 0,-1-4 0,1 5 0,0 1 0,0-1 0,0 5 0,3-4 0,-2 4 0,3 0 0,0-4 0,-8-17 0,10 11 0,-10-26 0,7 24 0,-4-4 0,0 1 0,1 4 0,-1-4 0,0 4 0,4 1 0,-2 6 0,6-1 0,-6 0 0,6 1 0,-3 3 0,0-7 0,3 6 0,-6-7 0,6 4 0,-3 1 0,1 3 0,2 2 0,-2 0 0,-1 3 0,3-3 0,-2-1 0,0-7 0,2 5 0,-2-8 0,3 10 0,0-5 0,0 1 0,0 8 0,0-23 0,0 1 0,0-7 0,-5-14 0,4 14 0,-4-11 0,5-4 0,-4 10 0,-2-11 0,-3 12 0,-1 0 0,0 2 0,-3 10 0,3-10 0,-4 4 0,5 1 0,0-5 0,0 10 0,-1-10 0,5 10 0,-3-10 0,6 10 0,-5 1 0,6 2 0,-6 13 0,2-8 0,-3 9 0,1 0 0,2 1 0,-2 0 0,3 3 0,-4-4 0,0 1 0,4-1 0,-3 0 0,3-4 0,-5-1 0,-2-1 0,1-8 0,-6 8 0,7-9 0,-7 10 0,6-10 0,-5 9 0,5-3 0,-1 9 0,-1-4 0,3 4 0,-2 0 0,3-4 0,0 4 0,0-5 0,3 1 0,-6-6 0,5 5 0,-6-5 0,3 6 0,1-1 0,0-4 0,0 3 0,-1-3 0,0-1 0,1 4 0,-1-8 0,1 3 0,-1-5 0,0 0 0,0 0 0,0-5 0,-4 4 0,3-4 0,-3 6 0,4-1 0,0 5 0,4-3 0,-2 9 0,6-4 0,-6 8 0,6-2 0,-5 7 0,2-10 0,-1 9 0,2-5 0,3 11 0,-4-12 0,-1 1 0,-7-9 0,-2-3 0,-3-3 0,-6-5 0,-2-2 0,-4-4 0,0 4 0,0 0 0,-4 2 0,4 8 0,-3 2 0,4 0 0,2 9 0,-2-8 0,3 9 0,3 0 0,1-2 0,5 3 0,1 1 0,-2-4 0,2 4 0,2 0 0,-2-3 0,3 6 0,-3-2 0,-1 0 0,-3 2 0,2-2 0,-2 3 0,4 1 0,0 1 0,0 2 0,0-2 0,0 2 0,0 1 0,4-3 0,-4 2 0,4-3 0,-1 0 0,-2 0 0,6-4 0,-7 3 0,6-8 0,-5 4 0,1-4 0,-3-1 0,-1-4 0,0 3 0,-1-8 0,2 8 0,-6-5 0,5 7 0,-9-3 0,9 2 0,-9-1 0,5 5 0,-1-4 0,-1 8 0,6-3 0,-6 4 0,7 1 0,-8-1 0,8 1 0,-3-1 0,7 1 0,-2 0 0,6 4 0,-6-3 0,6 3 0,-2-1 0,2-2 0,2 7 0,-2-7 0,1 2 0,0 1 0,-1-3 0,5 3 0,-4-9 0,3 11 0,-7-2 0,-1 0 0,-3 2 0,-11-17 0,-2 4 0,-11-7 0,1 0 0,-1 0 0,-4 0 0,4 0 0,1 1 0,1-1 0,9 2 0,-4-1 0,6 6 0,5 2 0,-3 4 0,8 1 0,-3 2 0,0-1 0,6 6 0,-5-4 0,7 5 0,-4 0 0,0-1 0,4 1 0,-3 0 0,2-1 0,-2 1 0,-1-4 0,-11-1 0,4 0 0,-5 1 0,3 3 0,9 0 0,-5 1 0,5-4 0,4 3 0,-3-3 0,6 1 0,-6-2 0,-2 0 0,0-2 0,-3 2 0,0-3 0,-1 3 0,-5-4 0,5 4 0,-4-4 0,8 4 0,-7-3 0,7 3 0,-4 0 0,5-3 0,4 7 0,-7-6 0,-1-1 0,-2 2 0,-5-5 0,10 9 0,-3-6 0,-1 3 0,4 0 0,-3-2 0,0 5 0,-1-6 0,0 7 0,-3-4 0,7 2 0,-8 1 0,8-2 0,-7 3 0,7 0 0,-4 3 0,5-1 0,0 2 0,0-4 0,0 4 0,0-3 0,0 3 0,1-3 0,-1-1 0,0 4 0,-5-3 0,-2 3 0,1-4 0,-1 1 0,7 2 0,0-1 0,4 5 0,-3-6 0,3 7 0,-4-7 0,3 3 0,-2 0 0,3 1 0,0 0 0,-3 2 0,2-5 0,1 5 0,1-2 0,3 3 0,0-3 0,0 2 0,4-5 0,0-1 0,0 2 0,-13-1 0,-2 2 0,-11-4 0,4-5 0,0-3 0,1-1 0,-6 0 0,-6-5 0,-2-2 0,-5-4 0,0-1 0,0 4 0,0 2 0,-4 0 0,10 4 0,-10-5 0,10 7 0,-4 2 0,10-1 0,-3 2 0,8 1 0,1 1 0,1 0 0,8 4 0,-7-4 0,7 1 0,-3 3 0,-1-3 0,4 0 0,-7 2 0,3-2 0,-5 2 0,1 1 0,-1 0 0,0-4 0,5 7 0,-3-6 0,7 6 0,-8-3 0,8 1 0,-8 2 0,8-1 0,-7 5 0,7-6 0,-3 3 0,0-4 0,3 4 0,-10-3 0,9 3 0,-5-4 0,7 4 0,0-2 0,0 5 0,1-6 0,-1 3 0,0 0 0,0 0 0,-5 1 0,4 2 0,-3-6 0,4 3 0,-4 0 0,3-3 0,-3 6 0,-1-6 0,0 6 0,-5-6 0,5 6 0,-4-6 0,-3 2 0,1-3 0,-1 1 0,4 2 0,2-2 0,1 6 0,-3-6 0,7 3 0,-4-1 0,1-2 0,3 3 0,-8 0 0,8-3 0,-3 3 0,0 0 0,3-3 0,-3 3 0,4 0 0,-5-3 0,4 3 0,-7-1 0,2-2 0,1 6 0,-4-6 0,4 2 0,0-3 0,-15 0 0,17 1 0,-17 2 0,16-1 0,-6 1 0,1-3 0,0 0 0,-1 0 0,0 3 0,1-2 0,-1 2 0,0 1 0,5-3 0,-3 6 0,2-6 0,-3 6 0,-1-6 0,5 6 0,-4-3 0,4 1 0,0 2 0,-4-3 0,5 4 0,-2 0 0,-2 0 0,-1 0 0,-1 0 0,-9 0 0,9 0 0,-10 0 0,10 0 0,-9 0 0,5 0 0,-1 0 0,-4 0 0,9 0 0,-5 0 0,6 0 0,-1 0 0,1 0 0,0 0 0,0 0 0,-1 0 0,2 0 0,-2 0 0,6 0 0,-5 0 0,8 0 0,-6 0 0,6 0 0,-6 0 0,6 3 0,-7-2 0,7 3 0,-3-1 0,5 1 0,-1 0 0,0 2 0,1-2 0,-1 1 0,1 1 0,-1-2 0,4 0 0,-3 3 0,7-6 0,-4 5 0,1-5 0,3 2 0,-3 0 0,3-3 0,0 3 0,1 0 0,-1 1 0,1 0 0,2 1 0,-2-4 0,3 5 0,-7-5 0,2 4 0,-5-4 0,1 5 0,-2-5 0,-1 6 0,0-6 0,4 5 0,-2-5 0,6 5 0,-3-6 0,3 3 0,-3-3 0,3 0 0,-10 0 0,4 0 0,-5 0 0,7 0 0,-3 0 0,3 0 0,-4 0 0,4 0 0,1 0 0,0 0 0,2 0 0,-2 0 0,4 0 0,-1 0 0,0 0 0,4 0 0,0 0 0</inkml:trace>
+  <inkml:trace contextRef="#ctx0" brushRef="#br0">199 0 24575,'0'14'0,"0"0"0,0 5 0,0-3 0,0 8 0,0-4 0,0 1 0,0-2 0,0 1 0,0-4 0,0 3 0,0-4 0,0-5 0,0 4 0,0-3 0,0 0 0,0 3 0,0-3 0,0 4 0,0-3 0,0 2 0,0-7 0,0 4 0,0-4 0,0 0 0,0-1 0,0 1 0,0-1 0,0 0 0,0 1 0,0 0 0,0-1 0,0 1 0,0 0 0,0 0 0,0 0 0,0-1 0,0 1 0,0 0 0,0-1 0,0 1 0,0-1 0,0 1 0,0 3 0,0-3 0,0 3 0,0-3 0,0 0 0,0-1 0,0 1 0,0-1 0,-3-3 0,-9 0 0,-5-3 0,-7 0 0,-1-4 0,0 0 0,4-4 0,2 0 0,3 3 0,5-1 0,0 5 0,4-2 0,1 3 0,5 0 0,4 0 0,4 0 0,3 0 0,-4 0 0,1 0 0,0 0 0,0 0 0,-1 0 0,1 0 0,0 0 0,0 3 0,0-2 0,-1 5 0,1-2 0,0 3 0,0-4 0,0 3 0,-1-2 0,1 3 0,0-4 0,-4 3 0,3-5 0,-3 2 0,4-3 0,-1-3 0,11-11 0,-4 1 0,9-9 0,-2 6 0,-8 4 0,7-3 0,-12 7 0,4-2 0,-4 6 0,-1-2 0,1 5 0,0-2 0,-1 3 0,1 0 0,-4-3 0,3 2 0,-6-2 0,3 3 0</inkml:trace>
 </inkml:ink>
 </file>
 
@@ -3630,14 +3820,14 @@
           <inkml:channelProperty channel="F" name="resolution" value="0" units="1/dev"/>
         </inkml:channelProperties>
       </inkml:inkSource>
-      <inkml:timestamp xml:id="ts0" timeString="2022-09-11T15:12:13.026"/>
+      <inkml:timestamp xml:id="ts0" timeString="2023-12-19T19:22:56.832"/>
     </inkml:context>
     <inkml:brush xml:id="br0">
-      <inkml:brushProperty name="width" value="0.1" units="cm"/>
-      <inkml:brushProperty name="height" value="0.1" units="cm"/>
+      <inkml:brushProperty name="width" value="0.05" units="cm"/>
+      <inkml:brushProperty name="height" value="0.05" units="cm"/>
     </inkml:brush>
   </inkml:definitions>
-  <inkml:trace contextRef="#ctx0" brushRef="#br0">1 0 24575,'0'28'0,"0"9"0,0 17 0,0-3 0,0 14 0,5 31 0,-4-30 0,5 5 0,1-1 0,0 1 0,10 15 0,-6-34 0,14 26 0,-13-27 0,14 42 0,-21-59 0,7 37 0,-11-45 0,6 29 0,-7-41 0,4 5 0,-1-12 0,-3-1 0,3 1 0,-3-1 0,0 4 0,3 7 0,-2 0 0,3 24 0,-4-25 0,0 17 0,2-25 0,-1 11 0,5-7 0,-5 9 0,5-7 0,-5 10 0,2-10 0,0 11 0,-2-17 0,2 2 0,-3-8 0</inkml:trace>
+  <inkml:trace contextRef="#ctx0" brushRef="#br0">75 167 24575,'0'17'0,"0"9"0,0 7 0,0 10 0,0 6 0,0-1 0,0 7 0,0 9 0,0-6 0,0 10 0,0-23 0,0 15 0,0-16 0,0 11 0,0-12 0,0-1 0,0-11 0,0-1 0,0-10 0,0-4 0,0-2 0,0-6 0,0 3 0,0-5 0,0 1 0,0-1 0,3 1 0,-2-1 0,5 1 0,-2 0 0,-1 0 0,4 3 0,-3 2 0,0-1 0,3 3 0,-3-2 0,0 3 0,3-4 0,-7 0 0,6-4 0,-5-1 0,2 1 0,0 0 0,1-3 0,2-1 0,1-3 0,-1 0 0,1 0 0,0 0 0,0 0 0,3 0 0,2 0 0,7 0 0,1 0 0,5 0 0,5 0 0,1 0 0,5 0 0,0 0 0,6 0 0,-5 0 0,11 0 0,-11 0 0,10 0 0,-3 0 0,-1 0 0,4 0 0,-10 0 0,11 0 0,-11 0 0,11 0 0,-11 0 0,11 0 0,-11 0 0,10 0 0,-9 0 0,9 0 0,-9 0 0,3 0 0,-5 0 0,0 0 0,0 0 0,0 0 0,1 0 0,-1 0 0,5 0 0,2 0 0,19 0 0,-15 0 0,27 5 0,-14-4 0,18 4 0,-12-1 0,25-3 0,-22 9 0,26-4 0,-9 0-636,-6-1 636,-29-5 0,0 0 0,39 0 0,-37 0 0,-2 0 0,24 0 0,16 0 0,-24 0 0,19 0 0,-14 0 0,21 0 0,-37 0 0,-2 0 0,-2 0 0,-7 0 0,38 0 0,-32 0 0,12 0 636,0 0-636,0 0 0,0 0 0,-1 0 0,-5 0 0,4 0 0,-4 0 0,0 0 0,-2 0 0,-6 0 0,-1 0 0,-4 0 0,-3 0 0,-5 0 0,-5 0 0,4 0 0,-9 0 0,4 0 0,-5 0 0,-5 0 0,0 0 0,-5 0 0,0 0 0,-4 0 0,3 0 0,-2 0 0,7 0 0,2 0 0,9-4 0,-4 3 0,3-3 0,-4 4 0,0 0 0,0 0 0,-8-3 0,1 2 0,-10-2 0,2 3 0,-3 0 0,0 0 0,0 0 0,0 0 0,-1 0 0,1 0 0,0 0 0,0 0 0,0-3 0,3 2 0,-2-1 0,6 2 0,-3 0 0,9 0 0,-4 0 0,3 0 0,1 0 0,-4 0 0,7 0 0,-6 0 0,2 0 0,-4 0 0,-3 0 0,-2 0 0,-3 0 0,0 0 0,-4-6 0,0 2 0,-3-14 0,0-15 0,0-1 0,0-13 0,-4 11 0,3-6 0,-7 5 0,7 0 0,-3 7 0,4 5 0,0 0 0,0 5 0,0 4 0,0 5 0,0 4 0,0 0 0,0-6 0,0 1 0,0-6 0,0-2 0,0 4 0,0-8 0,0 4 0,0-1 0,0-3 0,0 8 0,0 0 0,0 5 0,0 4 0,0 1 0,0-1 0,0-4 0,0 0 0,0-9 0,0 0 0,0-5 0,0-5 0,0 4 0,0-4 0,0 5 0,0 0 0,0 4 0,0 2 0,0 7 0,0 2 0,0 3 0,0 0 0,0 1 0,0-1 0,0 1 0,0-1 0,0 0 0,0 0 0,0 0 0,0 0 0,0 0 0,-5 4 0,0-1 0,-7 4 0,4 0 0,-2 0 0,3 0 0,0-3 0,0 3 0,1-3 0,-1 3 0,0 0 0,-4 0 0,3-4 0,-6 4 0,3-7 0,-5 6 0,1-5 0,0 5 0,0-6 0,0 3 0,3-1 0,-2-1 0,6 5 0,-3-3 0,1 1 0,2 2 0,-3-2 0,1-1 0,2 3 0,-6-2 0,6 0 0,-7 2 0,8-2 0,-8 3 0,7 0 0,-6-3 0,3 2 0,-4-3 0,-1 4 0,1 0 0,-4-3 0,2 2 0,-6-7 0,6 7 0,-7-6 0,4 6 0,-5-6 0,0 6 0,-5-3 0,4 0 0,-4 3 0,5-2 0,0-1 0,0 3 0,0-3 0,1 1 0,-1 2 0,0-7 0,0 7 0,0-3 0,-5 0 0,4 3 0,-4-6 0,0 6 0,4-7 0,-9 7 0,4-2 0,0 3 0,-4 0 0,9-4 0,-9 3 0,3-3 0,1 4 0,-4 0 0,4 0 0,-5 0 0,5 0 0,-4 0 0,4 0 0,0 0 0,-4 0 0,4-4 0,-6 3 0,1-3 0,0 4 0,5-4 0,-4 4 0,4-4 0,-5 4 0,-1-4 0,1 3 0,5-3 0,-4 4 0,9-4 0,-9 3 0,4-3 0,0 4 0,-4 0 0,9 0 0,-4 0 0,0 0 0,4 0 0,-9 0 0,9 0 0,-9 0 0,-2 0 0,-1 0 0,-9 0 0,4 0 0,-13 0 0,0 0 0,-7 0 0,11 0 0,-8 0 0,9 0 0,-5 0 0,-6 5 0,12-4 0,-6 8 0,8-8 0,-1 8 0,5-4 0,-3 0 0,4 4 0,-6-8 0,6 3 0,-5 0 0,5-3 0,0 4 0,-5-5 0,11 0 0,-11 0 0,11 0 0,-5 0 0,11 0 0,-4 0 0,4 0 0,-6 0 0,6 0 0,-4 0 0,9 0 0,-9 0 0,4 0 0,-5 0 0,0-4 0,5 3 0,-4-3 0,8 4 0,-7 0 0,7-4 0,-3 3 0,6-3 0,-6 0 0,3 3 0,-7-7 0,2 7 0,1-3 0,1 4 0,5-4 0,0 3 0,5-2 0,-4 3 0,11 0 0,-5 0 0,6 0 0,-3 0 0,4 0 0,-4-4 0,8 3 0,-8-2 0,8 3 0,-8 0 0,7-3 0,-2 2 0,-1-2 0,3 3 0,-2 0 0,-1 0 0,3 0 0,-2 0 0,3 0 0,0 0 0,-4 0 0,0 0 0,-1 0 0,-2 0 0,6 0 0,-6 0 0,2 0 0,-3 0 0,4 0 0,-4 0 0,4 0 0,-4 0 0,3 0 0,-2 0 0,2 0 0,-3 0 0,4 0 0,-4 0 0,8 0 0,-4 0 0,4 0 0,0 0 0,1 0 0,-1 0 0,1 0 0,-1 0 0,6 0 0,5 0 0,3 0 0,3 0 0,-4 0 0,-2 3 0,2 1 0,-5 3 0,2 0 0,0-4 0,-2 3 0,2-2 0,0 3 0,-3-1 0,3 1 0,-3-1 0,0 1 0,0-1 0,0 0 0,0 1 0,0-1 0,0 1 0,0 0 0,0-1 0,0 1 0,0 0 0,0 0 0,0 0 0,3 0 0,-2-1 0,5-2 0,-3-1 0,1-3 0,-1 0 0</inkml:trace>
 </inkml:ink>
 </file>
 
@@ -3684,6 +3874,195 @@
           <inkml:channelProperty channel="F" name="resolution" value="0" units="1/dev"/>
         </inkml:channelProperties>
       </inkml:inkSource>
+      <inkml:timestamp xml:id="ts0" timeString="2023-12-19T19:28:44.735"/>
+    </inkml:context>
+    <inkml:brush xml:id="br0">
+      <inkml:brushProperty name="width" value="0.05" units="cm"/>
+      <inkml:brushProperty name="height" value="0.05" units="cm"/>
+    </inkml:brush>
+  </inkml:definitions>
+  <inkml:trace contextRef="#ctx0" brushRef="#br0">4 180 24575,'0'18'0,"0"18"0,0 4 0,0 10 0,0-8 0,0-6 0,0-5 0,0-1 0,0-6 0,0-3 0,0-5 0,0-2 0,0-3 0,0 4 0,0 0 0,0 5 0,0-4 0,0 8 0,0-8 0,0 13 0,0-16 0,0 15 0,0-15 0,0 6 0,0-8 0,0 0 0,0-4 0,0-1 0,0 1 0,0 0 0,0 0 0,0-1 0,0 0 0,0 1 0,0-1 0,0 1 0,0-1 0,0 1 0,0 4 0,0-3 0,0 2 0,0-3 0,0 0 0,0-1 0,0 1 0,0 0 0,0 0 0,0 0 0,0 0 0,0-1 0,0 1 0,0 0 0,0-1 0,0 1 0,0-1 0,0 1 0,0-1 0,0 1 0,0 0 0,0 0 0,0-1 0,0 1 0,0 0 0,0 0 0,0-1 0,0 0 0,0 1 0,-3-4 0,8 0 0,11-3 0,6 0 0,29 0 0,-19 4 0,8 0 0,-14 0 0,-8 3 0,3-6 0,-4 2 0,-1-3 0,1 0 0,-1 4 0,6-4 0,-5 4 0,10 0 0,-10-4 0,9 8 0,-8-4 0,8 1 0,-8 1 0,3-2 0,-4 4 0,0-4 0,-5 3 0,4-3 0,-4 3 0,1-3 0,2 3 0,-6-6 0,7 5 0,-8-5 0,8 6 0,-8-6 0,4 5 0,-1-5 0,2 2 0,-1 0 0,9-2 0,-8 2 0,9-3 0,5 0 0,-3 0 0,14 0 0,-4 0 0,6 0 0,6 0 0,-5 0 0,5 0 0,-7 0 0,1 0 0,0 0 0,-6 0 0,4 0 0,-4 0 0,1 0 0,3 0 0,-10 0 0,5 0 0,0 0 0,-4 0 0,4 0 0,-1 0 0,3 0 0,4 0 0,1 0 0,6 0 0,1 0 0,1 0 0,4 0 0,-11 0 0,11 0 0,-11 0 0,5 0 0,-6 0 0,-1 0 0,1 0 0,6 0 0,1 0 0,14 0 0,-12 0 0,10 0 0,-11 0 0,12 0 0,-11 0 0,10 0 0,4 0 0,-12 0 0,30 0 0,-15 0 0,12 0 0,15 0 0,-12-5 0,23 3-601,-7-8 601,8 9 0,0-4 0,-22 5 0,8 0 0,-19 0 0,7 0 0,23 0 0,-40 0 0,29 0 0,-35 0 0,14 0 0,-8 0 0,-2 0 0,-6 0 601,0 0-601,-12 0 0,2 0 0,-20 0 0,8 0 0,-19 3 0,8-3 0,-13 3 0,8 1 0,-8-3 0,13 2 0,-7-3 0,12 0 0,-9 0 0,10 4 0,-10-4 0,9 4 0,-3-4 0,-1 0 0,0 0 0,-6 0 0,6 0 0,0 0 0,5 0 0,1 0 0,-1 0 0,6 0 0,-5 0 0,11 0 0,-5 0 0,0 0 0,-1 0 0,-6 0 0,0-4 0,1 3 0,-1-6 0,0 6 0,1-6 0,4 6 0,-3-7 0,9 7 0,-9-2 0,9 3 0,-9 0 0,9 0 0,-9 0 0,4 0 0,-11 0 0,4 0 0,-12 0 0,6 0 0,-11 0 0,2 0 0,-3 0 0,-1 0 0,1 0 0,-1 0 0,5 0 0,1 0 0,3 0 0,1 0 0,-1 0 0,-3 0 0,-2 0 0,-3 0 0,-1 0 0,1 0 0,-1 0 0,1 0 0,4 0 0,-4 0 0,12 0 0,-6 0 0,12 0 0,-8 0 0,3 0 0,1 0 0,-5 0 0,5 0 0,-10 0 0,0 0 0,-1 0 0,-2 0 0,7 0 0,-4 0 0,1 0 0,-2 0 0,-3 0 0,-1 0 0,1 0 0,8 0 0,-2 0 0,12 0 0,-8 0 0,8 0 0,-4 0 0,1 0 0,3 0 0,-4 0 0,1 0 0,-2 0 0,-8 0 0,-2 0 0,-3 0 0,-1 0 0,1 0 0,-1 0 0,1 0 0,-1 0 0,0 0 0,5 0 0,1 0 0,-1 0 0,0 0 0,-5 3 0,1-3 0,-4 7 0,2-7 0,-5-2 0,3-3 0,-4-4 0,0-1 0,0 2 0,0-2 0,0 4 0,0-1 0,0 0 0,0-8 0,-4 2 0,-2-15 0,-6 6 0,1-13 0,-7 4 0,7-5 0,-3 9 0,8-2 0,-1 16 0,6-5 0,-2 10 0,3-2 0,0 3 0,0 0 0,0-4 0,0 0 0,0-1 0,0 2 0,0 3 0,0-4 0,0-4 0,0-2 0,0-2 0,0 7 0,0-2 0,0-7 0,0 4 0,0-8 0,0 10 0,0-10 0,0 8 0,0-12 0,0 13 0,0-4 0,4 5 0,-3 4 0,2 0 0,-3-4 0,0 6 0,0-9 0,4 10 0,-3-6 0,2 6 0,-3-3 0,0 4 0,0-2 0,0 2 0,0-6 0,0-6 0,0 6 0,0-4 0,3 10 0,-2 0 0,2 0 0,-3 0 0,0-3 0,0 2 0,0-5 0,4 5 0,-3-2 0,2 3 0,1-3 0,-4 2 0,4-6 0,-4 6 0,0-3 0,0 5 0,0-1 0,3 0 0,-5 3 0,1 1 0,-18 3 0,0 0 0,-11 0 0,7 0 0,2 0 0,4 0 0,4 3 0,-2-2 0,6 2 0,-2-3 0,7 3 0,-6-2 0,1 2 0,-3-3 0,-4 0 0,7 0 0,-6 3 0,6-2 0,-2 2 0,3-3 0,1 0 0,-5 0 0,0 0 0,-1 0 0,-7 0 0,6 0 0,-7 0 0,4 0 0,0 0 0,4 0 0,-2 0 0,6 0 0,-10 0 0,10 0 0,-10 0 0,2 0 0,-1 0 0,-9 0 0,5 0 0,-1 0 0,-3 0 0,3 0 0,1 0 0,0 0 0,1 0 0,3 0 0,-8 0 0,8 0 0,-14 0 0,8 0 0,-9 0 0,6 0 0,4 0 0,-3 0 0,3 0 0,-4 0 0,4 0 0,-3 0 0,3 0 0,1 0 0,-5 0 0,9 0 0,-8 0 0,8 0 0,-3 0 0,4 0 0,5 0 0,0 0 0,4 0 0,1 0 0,-1 0 0,-4 0 0,0 0 0,-10 0 0,4 0 0,-3-3 0,-1 2 0,4-2 0,-3-1 0,0 3 0,3-2 0,-4 3 0,5 0 0,1-3 0,-1 2 0,-4-3 0,3 4 0,-4 0 0,6 0 0,-6 0 0,4-3 0,-3 2 0,4-2 0,0 3 0,1 0 0,-1 0 0,0 0 0,0 0 0,-4-4 0,3 3 0,-3-3 0,4 4 0,-5 0 0,5 0 0,-5 0 0,1 0 0,3 0 0,-4 0 0,1 0 0,3 0 0,-4 0 0,1 0 0,3 0 0,-3 0 0,4 0 0,-5 0 0,5 0 0,-10 0 0,9 0 0,-3 0 0,-1 0 0,5 0 0,-10 0 0,9-3 0,-8 2 0,8-2 0,-3 3 0,4 0 0,-4 0 0,3-4 0,-4 4 0,6-4 0,3 4 0,-3 0 0,4 0 0,-5-3 0,4 2 0,-2-3 0,2 4 0,-4 0 0,4 0 0,-2 0 0,2 0 0,0 0 0,-2 0 0,6 0 0,-7 0 0,4 0 0,-5 0 0,4 0 0,-2 0 0,6 0 0,-3 0 0,1 0 0,2 0 0,-3 0 0,1 0 0,-2 0 0,-4 0 0,1 0 0,3 0 0,-3 0 0,4 0 0,-1 0 0,1 0 0,5 0 0,-1 0 0,0 0 0,1 0 0,-1 0 0,-3 0 0,2 0 0,-7 0 0,4 0 0,-1 0 0,-3 0 0,4 0 0,-1 0 0,-3 0 0,3 0 0,-3 0 0,-1 0 0,0 0 0,-4 0 0,-2 0 0,-4 0 0,-1 0 0,1 0 0,0 0 0,-1 0 0,1 0 0,-1 0 0,1 0 0,0 0 0,-1 0 0,-5 0 0,5-3 0,-5 2 0,0-7 0,-2 3 0,1 0 0,-4-3 0,9 3 0,-4 0 0,6-2 0,-6 6 0,9-3 0,-8 0 0,9 3 0,1-2 0,-4 3 0,3 0 0,0-4 0,2 3 0,-1-2 0,4 3 0,-3-3 0,4 2 0,1-3 0,-1 1 0,-5 2 0,4-2 0,-3 3 0,4 0 0,-4 0 0,3 0 0,-4 0 0,1 0 0,3 0 0,-8 0 0,8 0 0,-3 0 0,4 0 0,-5 0 0,5 0 0,-5 0 0,5 0 0,-4 0 0,3 0 0,-3 0 0,4 0 0,-5 0 0,4 0 0,-3 0 0,4 0 0,1 0 0,-1 0 0,0 0 0,1 0 0,-1 0 0,0 0 0,1 0 0,-1 0 0,0 0 0,5 0 0,-4 0 0,3 0 0,-4 0 0,5 0 0,-4 0 0,3 0 0,-3 0 0,-1 0 0,0 0 0,1 0 0,-1 0 0,0 0 0,0 0 0,-4 0 0,3 0 0,-8 0 0,8 0 0,-14 0 0,13 0 0,-13 0 0,10 3 0,-6-2 0,1 7 0,4-7 0,-3 6 0,8-6 0,-3 6 0,-1-6 0,4 5 0,-3-5 0,-1 6 0,4-6 0,-3 3 0,4-4 0,1 0 0,-1 0 0,0 3 0,4-2 0,-2 2 0,6-3 0,-7 0 0,8 0 0,-8 0 0,7 4 0,-6-4 0,6 3 0,-3 0 0,1-2 0,2 2 0,-2-3 0,-1 0 0,3 0 0,-2 3 0,-1-2 0,3 2 0,-2-3 0,-1 0 0,3 0 0,-2 0 0,-1 0 0,3 0 0,-2 0 0,3 0 0,-4 0 0,4 0 0,-4 0 0,5 0 0,-1 0 0,1 0 0,-1 0 0,1 0 0,-1 0 0,-3 0 0,2 0 0,-7 3 0,8-2 0,-8 2 0,7 1 0,-2-4 0,-1 3 0,3-3 0,-6 0 0,2 0 0,0 0 0,-2 0 0,6 0 0,-7 4 0,8-4 0,-8 4 0,7-1 0,-6-2 0,6 2 0,-7-3 0,8 0 0,-4 0 0,0 0 0,4 0 0,-8 0 0,8 0 0,-8 0 0,7 0 0,-7 0 0,8 0 0,-8-4 0,8 0 0,-4 0 0,0-2 0,4 5 0,-4-6 0,4 7 0,1-3 0,-1-1 0,1 4 0,-1-3 0,0 0 0,1 2 0,-1-2 0,0 3 0,1 0 0,-1 0 0,1 0 0,2-3 0,-1 2 0,2-2 0,-4 3 0,1 0 0,0 0 0,-1 0 0,1 0 0,0 0 0,-1 0 0,1 0 0,0 0 0,-1 0 0,1 0 0,-5 0 0,4 0 0,-4 0 0,4 0 0,1 0 0,-1 0 0,0 0 0,1 3 0,-1-2 0,1 2 0,-1 0 0,1-2 0,-1 1 0,1-2 0,0 0 0,3 3 0,1 1 0,3 2 0,0 1 0,0-1 0,0 0 0,0 1 0,0 0 0,0-1 0,0 1 0,0-1 0,0 0 0,0 0 0,6 0 0,3-2 0,2 2 0,15-6 0,-18 3 0,9-3 0</inkml:trace>
+</inkml:ink>
+</file>
+
+<file path=ppt/ink/ink81.xml><?xml version="1.0" encoding="utf-8"?>
+<inkml:ink xmlns:inkml="http://www.w3.org/2003/InkML">
+  <inkml:definitions>
+    <inkml:context xml:id="ctx0">
+      <inkml:inkSource xml:id="inkSrc0">
+        <inkml:traceFormat>
+          <inkml:channel name="X" type="integer" min="-2.14748E9" max="2.14748E9" units="cm"/>
+          <inkml:channel name="Y" type="integer" min="-2.14748E9" max="2.14748E9" units="cm"/>
+          <inkml:channel name="F" type="integer" max="32767" units="dev"/>
+        </inkml:traceFormat>
+        <inkml:channelProperties>
+          <inkml:channelProperty channel="X" name="resolution" value="1000" units="1/cm"/>
+          <inkml:channelProperty channel="Y" name="resolution" value="1000" units="1/cm"/>
+          <inkml:channelProperty channel="F" name="resolution" value="0" units="1/dev"/>
+        </inkml:channelProperties>
+      </inkml:inkSource>
+      <inkml:timestamp xml:id="ts0" timeString="2023-12-19T19:29:01.736"/>
+    </inkml:context>
+    <inkml:brush xml:id="br0">
+      <inkml:brushProperty name="width" value="0.05" units="cm"/>
+      <inkml:brushProperty name="height" value="0.05" units="cm"/>
+    </inkml:brush>
+  </inkml:definitions>
+  <inkml:trace contextRef="#ctx0" brushRef="#br0">0 46 24575,'0'6'0,"0"5"0,0-4 0,0 8 0,0 0 0,0 6 0,0 4 0,0-5 0,0 4 0,0-4 0,0 10 0,0-8 0,0 7 0,0-4 0,0-3 0,0 6 0,0-11 0,0 2 0,0-4 0,0 0 0,0-3 0,0-2 0,0-3 0,0 0 0,0 0 0,0-1 0,0 1 0,0 0 0,0 4 0,0-4 0,0 7 0,0-6 0,0 3 0,0-1 0,0-2 0,0 2 0,0-3 0,0 0 0,0 0 0,0 0 0,0-1 0,0 5 0,0-3 0,0 2 0,0-3 0,0 0 0,0 3 0,0-2 0,0 2 0,0 1 0,0-3 0,0 2 0,0-3 0,0 0 0,0-1 0,0 1 0,0-1 0,0 1 0,0 0 0,0 0 0,0 0 0,0 3 0,0-2 0,0 2 0,0-3 0,0 0 0,0 0 0,0 0 0,0-1 0,0 1 0,0-1 0,0 0 0,0 1 0,0 0 0,0-1 0,0 1 0,0 0 0,3-4 0,4 0 0,4-3 0,11 0 0,-5 0 0,9 0 0,-5 0 0,3 0 0,1 0 0,-4 0 0,2-4 0,-7 3 0,8-2 0,-3 3 0,4 0 0,-1 0 0,-3 0 0,3 0 0,-4 0 0,10 0 0,-4 0 0,4 0 0,-6 0 0,1 0 0,0 0 0,-4 0 0,-2 0 0,-4 0 0,0 0 0,0 0 0,0 0 0,-3 0 0,2 0 0,-6 0 0,6 0 0,-3 0 0,4 0 0,-3 0 0,-2 0 0,-3 0 0,4 0 0,-4 0 0,8-4 0,-4 3 0,4-5 0,4 5 0,-2-3 0,6 4 0,-7 0 0,8 0 0,-11-3 0,5 2 0,-10-2 0,2 3 0,-3 0 0,0 0 0,0 0 0,3 0 0,2 0 0,3 0 0,0 0 0,0 0 0,4 0 0,-6 0 0,5 0 0,-6 0 0,-1 0 0,0 0 0,-5 0 0,1 0 0,4 0 0,0 0 0,4 0 0,5 0 0,-4 0 0,8 0 0,-4 0 0,1 0 0,-2 0 0,0 0 0,-2 0 0,2 0 0,-4 0 0,0 0 0,0 0 0,5 0 0,-4 0 0,8 0 0,-8 0 0,3 0 0,-4 4 0,0-3 0,0 2 0,0-3 0,-3 0 0,2 0 0,-3 0 0,5 0 0,-1 0 0,4 0 0,2 0 0,-1 3 0,4-2 0,-4 2 0,1-3 0,2 0 0,-6 0 0,2 0 0,-4 0 0,5 4 0,-8-3 0,7 3 0,-8-4 0,4 3 0,0-2 0,0 2 0,0-3 0,0 4 0,-3-4 0,-2 4 0,-3-4 0,0 0 0,0 0 0,-1 0 0,1 0 0,-1 0 0,1 0 0,0 0 0,0 0 0,3 0 0,-2 0 0,6 0 0,-3 0 0,5 0 0,-5 0 0,-1 0 0,-3 0 0,0 0 0,0 0 0,0 0 0,-1 0 0,1 0 0,-1 0 0,1 0 0,-1 0 0,1 0 0,0 0 0,-1 0 0,0 0 0,1 0 0,0 0 0,0 0 0,-1 0 0,1 0 0,0-3 0,-1 2 0,1-2 0,0 3 0,0 0 0,-1 0 0,1 0 0,-3-3 0,1 2 0,2-1 0,0 2 0,3-3 0,-3 2 0,-1-2 0,-2 0 0,-1-1 0,-1-2 0,-1-1 0,2 1 0,-3-1 0,0 0 0,0 0 0,0 1 0,0-1 0,0 0 0,0 0 0,0 0 0,0 1 0,0-5 0,0 3 0,0-2 0,0 3 0,0 0 0,0 0 0,0 0 0,0-2 0,0 1 0,0-5 0,0-3 0,0-5 0,-4-4 0,3-5 0,-6 4 0,6-4 0,-6 5 0,6 1 0,-3 3 0,4 5 0,0 6 0,-3 3 0,2 0 0,-2-4 0,3 0 0,0-4 0,0 0 0,0-1 0,0-3 0,0 3 0,0-4 0,0 9 0,0 0 0,-3 4 0,2 0 0,-2 0 0,3-2 0,0-2 0,0-3 0,-4-12 0,3 3 0,-2-8 0,3 6 0,0 4 0,0 2 0,-4 3 0,3 5 0,-2 0 0,3 5 0,0-1 0,0 0 0,0 0 0,0 0 0,0 1 0,-5 2 0,0 1 0,-4 3 0,-4 0 0,4 0 0,-8 0 0,5 0 0,-3 0 0,0 0 0,3 0 0,-2 0 0,6 0 0,-2 0 0,3 0 0,0 0 0,0 0 0,0 0 0,0 0 0,0 0 0,0 0 0,-3 0 0,2 0 0,-6 0 0,6 0 0,-3 0 0,4 0 0,-3 0 0,2 0 0,-2 0 0,3 0 0,0 0 0,-4 0 0,3 0 0,-2 0 0,-1 0 0,4 0 0,-8 0 0,7 3 0,-6-2 0,3 2 0,-1-3 0,2 0 0,3 0 0,0 0 0,0 0 0,0 0 0,0 0 0,0 0 0,-4 0 0,0 0 0,-4 0 0,3 0 0,-2 0 0,-2 0 0,0 0 0,-4 3 0,5-2 0,4 2 0,0-3 0,4 0 0,-4 0 0,0 0 0,-1 0 0,-2 0 0,3 0 0,-1 0 0,-2 0 0,6 0 0,-3 0 0,5 0 0,-5 0 0,0 0 0,-4 0 0,-5 0 0,0 0 0,-1 0 0,1 0 0,5 0 0,4 0 0,0 3 0,4-2 0,0 2 0,-3-3 0,2 0 0,-3 0 0,1 0 0,-2 0 0,1 0 0,-4 0 0,7 0 0,-6 0 0,3 0 0,-5 0 0,5 0 0,0 0 0,4 0 0,1 0 0,-1 0 0,0 0 0,0 0 0,0 0 0,0 0 0,-4 0 0,4 0 0,-8 0 0,7 0 0,-6 0 0,3 0 0,-5 0 0,1 0 0,4 0 0,0 0 0,4 0 0,-3 0 0,2 0 0,-7 0 0,8 0 0,-4 0 0,4 0 0,0 0 0,1 0 0,-1 0 0,-4 0 0,0 0 0,-5 0 0,1 0 0,0 0 0,4 0 0,0 0 0,4 0 0,-4 0 0,0 0 0,-1 0 0,2 0 0,3 0 0,-4 0 0,3 0 0,-6 0 0,-2 0 0,4 0 0,-11 0 0,10 0 0,-3 0 0,2 0 0,3 0 0,-5 0 0,1 0 0,4 0 0,0 0 0,4 0 0,0 0 0,-3 0 0,2 0 0,-3 0 0,4 0 0,0 0 0,1 0 0,-1 0 0,0 0 0,1 0 0,-5 0 0,3 0 0,-2 0 0,3 0 0,0 0 0,-4 0 0,3 0 0,-2 0 0,3 0 0,0 0 0,0 0 0,-2 0 0,2 0 0,-3 0 0,3 0 0,0 0 0,1 0 0,-1 0 0,0 0 0,0 0 0,0-3 0,0 2 0,1-2 0,-1 3 0,0 0 0,-4-3 0,4 2 0,-4-3 0,4 4 0,0 0 0,-4 0 0,4 0 0,-4-3 0,4 3 0,0-3 0,-3 3 0,-2-4 0,-3 3 0,0-2 0,3 0 0,-2 2 0,6-2 0,-6 3 0,6 0 0,-2 0 0,3 0 0,1 0 0,-1 0 0,1 0 0,-1 0 0,0 0 0,1 0 0,-1 0 0,0 0 0,1 0 0,-8 0 0,5 0 0,-4 0 0,6 0 0,0 0 0,0 0 0,-2 0 0,2 0 0,-2 0 0,3 0 0,3 0 0,0 0 0</inkml:trace>
+</inkml:ink>
+</file>
+
+<file path=ppt/ink/ink82.xml><?xml version="1.0" encoding="utf-8"?>
+<inkml:ink xmlns:inkml="http://www.w3.org/2003/InkML">
+  <inkml:definitions>
+    <inkml:context xml:id="ctx0">
+      <inkml:inkSource xml:id="inkSrc0">
+        <inkml:traceFormat>
+          <inkml:channel name="X" type="integer" min="-2.14748E9" max="2.14748E9" units="cm"/>
+          <inkml:channel name="Y" type="integer" min="-2.14748E9" max="2.14748E9" units="cm"/>
+          <inkml:channel name="F" type="integer" max="32767" units="dev"/>
+        </inkml:traceFormat>
+        <inkml:channelProperties>
+          <inkml:channelProperty channel="X" name="resolution" value="1000" units="1/cm"/>
+          <inkml:channelProperty channel="Y" name="resolution" value="1000" units="1/cm"/>
+          <inkml:channelProperty channel="F" name="resolution" value="0" units="1/dev"/>
+        </inkml:channelProperties>
+      </inkml:inkSource>
+      <inkml:timestamp xml:id="ts0" timeString="2023-12-19T19:29:06.796"/>
+    </inkml:context>
+    <inkml:brush xml:id="br0">
+      <inkml:brushProperty name="width" value="0.05" units="cm"/>
+      <inkml:brushProperty name="height" value="0.05" units="cm"/>
+    </inkml:brush>
+  </inkml:definitions>
+  <inkml:trace contextRef="#ctx0" brushRef="#br0">194 1 24575,'0'6'0,"0"0"0,0 4 0,0 2 0,0-1 0,0 3 0,0 2 0,0 5 0,0 4 0,0-1 0,0 6 0,0 1 0,0 5 0,0 6 0,0-5 0,0 0 0,0 4 0,0-14 0,0 14 0,0-20 0,0 13 0,0-17 0,0 17 0,0-7 0,0 4 0,0 4 0,0-4 0,0 5 0,0-5 0,0-1 0,0-5 0,0-5 0,0-1 0,0-7 0,0-2 0,0-3 0,0 0 0,-6-3 0,-1-2 0,0-5 0,-1-4 0,0-1 0,0-7 0,-6 7 0,2-7 0,0 4 0,-2-1 0,2-3 0,0 7 0,2-2 0,3 3 0,0 0 0,0 3 0,0-2 0,0 5 0,1-2 0,-1 3 0,1 0 0,2-3 0,-2 2 0,8-2 0,-1 3 0,12 3 0,-4 1 0,4 0 0,-2 3 0,-3-3 0,2 3 0,-3 0 0,0-4 0,0 3 0,-1-2 0,1 0 0,-3 2 0,2-5 0,-5 5 0,5-5 0,-2 5 0,2-3 0,1 4 0,-1-4 0,-2 3 0,2-5 0,-2 5 0,0-2 0,2 0 0,-5 2 0,4-3 0,-4 4 0,5-4 0,-5 3 0,5-5 0,-6 5 0,6-5 0,-3 1 0,4-2 0,0-3 0,0-1 0,-1-3 0,5 0 0,-3 0 0,2 0 0,1 0 0,-4 0 0,7-1 0,-5-3 0,5 3 0,-2-6 0,7 5 0,-3-6 0,4 7 0,-5-3 0,0 3 0,-4 1 0,0-1 0,-5 5 0,1-1 0,-3 1 0,2 3 0,-5-3 0,2 3 0</inkml:trace>
+</inkml:ink>
+</file>
+
+<file path=ppt/ink/ink83.xml><?xml version="1.0" encoding="utf-8"?>
+<inkml:ink xmlns:inkml="http://www.w3.org/2003/InkML">
+  <inkml:definitions>
+    <inkml:context xml:id="ctx0">
+      <inkml:inkSource xml:id="inkSrc0">
+        <inkml:traceFormat>
+          <inkml:channel name="X" type="integer" min="-2.14748E9" max="2.14748E9" units="cm"/>
+          <inkml:channel name="Y" type="integer" min="-2.14748E9" max="2.14748E9" units="cm"/>
+          <inkml:channel name="F" type="integer" max="32767" units="dev"/>
+        </inkml:traceFormat>
+        <inkml:channelProperties>
+          <inkml:channelProperty channel="X" name="resolution" value="1000" units="1/cm"/>
+          <inkml:channelProperty channel="Y" name="resolution" value="1000" units="1/cm"/>
+          <inkml:channelProperty channel="F" name="resolution" value="0" units="1/dev"/>
+        </inkml:channelProperties>
+      </inkml:inkSource>
+      <inkml:timestamp xml:id="ts0" timeString="2023-12-19T19:29:10.643"/>
+    </inkml:context>
+    <inkml:brush xml:id="br0">
+      <inkml:brushProperty name="width" value="0.05" units="cm"/>
+      <inkml:brushProperty name="height" value="0.05" units="cm"/>
+    </inkml:brush>
+  </inkml:definitions>
+  <inkml:trace contextRef="#ctx0" brushRef="#br0">166 0 24575,'0'6'0,"0"4"0,0 6 0,0-1 0,0 5 0,0-1 0,0-3 0,0 13 0,0-12 0,0 12 0,0-9 0,0 1 0,0-2 0,0-4 0,0 0 0,0 1 0,0-5 0,0 3 0,0-6 0,0 2 0,0-3 0,0 0 0,0 0 0,0 0 0,0-1 0,0 1 0,0-1 0,0 4 0,0-3 0,0 3 0,0-3 0,0 0 0,0-1 0,0 1 0,0 0 0,0 0 0,0 0 0,0 3 0,0-2 0,0 6 0,0-6 0,0 2 0,0-3 0,0 0 0,0 0 0,3 0 0,-2-1 0,1 1 0,-2-1 0,0 1 0,0 0 0,0 0 0,0-1 0,0 0 0,0 1 0,3-4 0,-2 3 0,2-3 0,-3 4 0,0-1 0,3-3 0,-2 3 0,1-3 0,-4 1 0,-2-4 0,-6-4 0,2-3 0,-2 0 0,-1 3 0,3-2 0,-2 2 0,-1-4 0,3 1 0,-2 0 0,3 3 0,0 1 0,3 0 0,-2 2 0,2-2 0,-3 3 0,1-3 0,-1 3 0,0-7 0,0 7 0,0-7 0,0 7 0,3-6 0,-2 5 0,6-5 0,-6 5 0,8-2 0,-2 3 0,14 0 0,-2 0 0,2 3 0,0 1 0,-6 3 0,6 0 0,-6-3 0,3 3 0,-5-7 0,1 6 0,0-2 0,0 3 0,0-3 0,-1 2 0,1-6 0,0 6 0,-3-2 0,1-1 0,-1 3 0,-1-2 0,0 2 0,0-3 0,0 0 0,4-3 0,-1 0 0,8 0 0,2-4 0,4 0 0,-1-4 0,-4 0 0,4 0 0,-2 1 0,2-1 0,-4 0 0,0 0 0,-3 1 0,-2 3 0,-3-2 0,0 5 0,-1-2 0,1 3 0,-1-3 0,1 2 0,-3-5 0,2 5 0,-6-2 0,3 3 0</inkml:trace>
+</inkml:ink>
+</file>
+
+<file path=ppt/ink/ink84.xml><?xml version="1.0" encoding="utf-8"?>
+<inkml:ink xmlns:inkml="http://www.w3.org/2003/InkML">
+  <inkml:definitions>
+    <inkml:context xml:id="ctx0">
+      <inkml:inkSource xml:id="inkSrc0">
+        <inkml:traceFormat>
+          <inkml:channel name="X" type="integer" min="-2.14748E9" max="2.14748E9" units="cm"/>
+          <inkml:channel name="Y" type="integer" min="-2.14748E9" max="2.14748E9" units="cm"/>
+          <inkml:channel name="F" type="integer" max="32767" units="dev"/>
+        </inkml:traceFormat>
+        <inkml:channelProperties>
+          <inkml:channelProperty channel="X" name="resolution" value="1000" units="1/cm"/>
+          <inkml:channelProperty channel="Y" name="resolution" value="1000" units="1/cm"/>
+          <inkml:channelProperty channel="F" name="resolution" value="0" units="1/dev"/>
+        </inkml:channelProperties>
+      </inkml:inkSource>
+      <inkml:timestamp xml:id="ts0" timeString="2022-09-11T15:10:59.946"/>
+    </inkml:context>
+    <inkml:brush xml:id="br0">
+      <inkml:brushProperty name="width" value="0.1" units="cm"/>
+      <inkml:brushProperty name="height" value="0.1" units="cm"/>
+    </inkml:brush>
+  </inkml:definitions>
+  <inkml:trace contextRef="#ctx0" brushRef="#br0">7373 0 24575,'-16'0'0,"-1"0"0,-2 0 0,-1 0 0,-5 0 0,1 0 0,-1 0 0,-6 0 0,5 0 0,-11 0 0,16 0 0,-8 0 0,9 0 0,-5 0 0,1 0 0,-1 0 0,1 0 0,3 0 0,2 0 0,4 0 0,0 0 0,0 0 0,0 0 0,-3 3 0,2-2 0,2 2 0,0-3 0,3 0 0,-4 0 0,3 0 0,-6 0 0,6 0 0,-8 0 0,6 0 0,-1 0 0,0 0 0,3 0 0,-2 0 0,3 0 0,0 0 0,-3 0 0,2 0 0,-3 0 0,0 0 0,0 0 0,-3 0 0,3 0 0,-3 0 0,3 0 0,4 0 0,-3 0 0,2 0 0,-3 0 0,4 0 0,-3 0 0,6 0 0,-6 0 0,3 0 0,0 0 0,-3 0 0,2 0 0,-2 0 0,-1 0 0,0 0 0,0 0 0,0 0 0,0 0 0,0 0 0,4 0 0,-3 0 0,2 0 0,-9 0 0,4 0 0,-9 0 0,10 0 0,-7 0 0,7 0 0,-8 0 0,4 0 0,-4 0 0,3 0 0,-2 0 0,2 0 0,1 3 0,-3-2 0,7 2 0,-8-3 0,8 0 0,-7 4 0,2-3 0,1 2 0,-4-3 0,4 0 0,0 0 0,-4 0 0,2 4 0,-3 0 0,2 4 0,4-4 0,4 3 0,0-3 0,0 4 0,3-1 0,2 0 0,0 0 0,2 0 0,-2 0 0,3-1 0,-3 1 0,2 0 0,-6 0 0,6 4 0,-6-3 0,2 6 0,-3-5 0,4 1 0,-3-2 0,6-2 0,-2 1 0,3 0 0,1-3 0,-6-1 0,0-3 0,-13 0 0,3 0 0,-12 4 0,8 1 0,-9 0 0,4 2 0,-10-2 0,9 0 0,-8 4 0,14-5 0,1 1 0,6 2 0,4-6 0,4 5 0,-8-5 0,7 5 0,-12-1 0,8 2 0,-7 2 0,2-2 0,-3 2 0,-1-1 0,1 0 0,-1 0 0,5 0 0,1 0 0,4-1 0,3 0 0,-2 1 0,3-1 0,0 0 0,-3 1 0,2-1 0,-3 4 0,-4-3 0,3 3 0,-7 1 0,6-4 0,-6 4 0,7-1 0,-8-2 0,8 2 0,-3-3 0,0 3 0,3-2 0,-8 6 0,4-6 0,0 2 0,-4 1 0,4-3 0,-5 3 0,1 0 0,-6-3 0,4 7 0,-3-7 0,4 3 0,-4 0 0,3-3 0,-3 4 0,4-1 0,1-3 0,3 2 0,-2 1 0,2-3 0,-3 6 0,-1-6 0,-15 15 0,6-9 0,-13 7 0,17-6 0,0-3 0,6 0 0,-1 2 0,5-6 0,0 2 0,9-4 0,1 0 0,3 0 0,-3 0 0,-1 0 0,-3 0 0,-1 1 0,0-1 0,0 4 0,0-3 0,0 6 0,0-5 0,0 5 0,0-2 0,0 2 0,0 1 0,-1 5 0,-4 1 0,3 4 0,-9 1 0,4 0 0,0 0 0,1-5 0,9-1 0,-2-9 0,9 0 0,-5-4 0,7-3 0,-17 6 0,-4 10 0,-8 4 0,0 8 0,0-4 0,4-1 0,1-5 0,-4 9 0,3-7 0,-5 8 0,-3-8 0,13 1 0,-6-7 0,8 2 0,-16 7 0,10-7 0,-17 13 0,12-10 0,-7 6 0,6-1 0,2-5 0,4 3 0,7-12 0,3 1 0,7-8 0,6 0 0,-2 0 0,5 0 0,-2-1 0,0 1 0,0-1 0,-4 1 0,0 0 0,0 3 0,0 1 0,-1 4 0,1 0 0,-5 4 0,4-2 0,-4 2 0,5-4 0,-4 0 0,3 0 0,-3 0 0,4 0 0,-1-4 0,1 3 0,0 2 0,-1 0 0,0 7 0,-4-3 0,-1 10 0,-4-4 0,0 3 0,0 1 0,1-4 0,-1-1 0,-3-1 0,7-7 0,-7 7 0,8-11 0,-4 5 0,1-6 0,0 3 0,0 0 0,-5 5 0,4-4 0,-4 5 0,5-7 0,0 1 0,3-3 0,2-2 0,3-3 0,0 0 0,4-1 0,-3 1 0,2 0 0,-3 3 0,-4 2 0,0 3 0,-4 0 0,-1 4 0,1-3 0,-1 7 0,4-7 0,-3 0 0,7-5 0,1 0 0,1-4 0,5 4 0,-5-8 0,5 3 0,-5-2 0,2 3 0,-2 0 0,-5 3 0,3 1 0,-6 4 0,6 0 0,-3-3 0,4-2 0,-2 0 0,4-3 0,-1 3 0,3-6 0,3 4 0,-10 4 0,-5 14 0,-9 11 0,-5 7 0,0 4 0,0-4 0,0 3 0,1-7 0,-1 3 0,0-5 0,5-6 0,3-5 0,9-8 0,-2-4 0,6-3 0,0-2 0,2 0 0,-2 2 0,0 3 0,-3 0 0,0 4 0,-2 1 0,1 5 0,-3-5 0,6 3 0,-2-6 0,3 2 0,1-4 0,-1 0 0,4-1 0,-2 1 0,-2 0 0,-1 5 0,-5 0 0,-3 20 0,-5-10 0,0 11 0,1-11 0,-1-3 0,4 3 0,-3-5 0,0 1 0,4-1 0,-5 1 0,6-2 0,0-3 0,1-2 0,3-8 0,-2 3 0,7-6 0,-4 2 0,4 1 0,0 0 0,0 4 0,-1 0 0,-3 0 0,3 0 0,-7 4 0,3-3 0,-4 8 0,-6 3 0,4-5 0,-1 4 0,5-7 0,1 1 0,0 5 0,-2-1 0,6 1 0,-7 5 0,2 0 0,0 1 0,-2 4 0,2-5 0,-4 6 0,1-5 0,3 3 0,-1-8 0,5 4 0,-1-6 0,6 1 0,-2-1 0,2 6 0,-3-5 0,-1 10 0,0-9 0,1 8 0,-1-3 0,0 5 0,0 15 0,1-16 0,3 15 0,1-28 0,4 2 0,0-9 0,0-4 0,0-1 0,-4 10 0,-5 8 0,-5 9 0,-5 4 0,5-5 0,-2-5 0,6 15 0,-3-7 0,3 16 0,0-1 0,4-4 0,-3 11 0,8-5 0,-8 13 0,3-5 0,-4-7 0,-1 10 0,2-21 0,3 21 0,-3-17 0,8 5 0,-3-12 0,4-2 0,0-10 0,0-2 0,-4 1 0,3-4 0,-7 3 0,7-4 0,-6 0 0,2-1 0,-3 1 0,3 4 0,-2-3 0,-1 20 0,-2-18 0,2 18 0,1-20 0,2 3 0,0-4 0,-2-1 0,6 1 0,-2 0 0,-1-1 0,3 1 0,-6 0 0,6-1 0,-6 1 0,6-1 0,-7 1 0,7 0 0,-6-1 0,6 1 0,-2-5 0,3 4 0,0-4 0,0 5 0,-4-5 0,3 8 0,-6-6 0,-1 23 0,-1-16 0,0 16 0,2-19 0,2 4 0,1-10 0,0 4 0,4-4 0,0 0 0,0 4 0,0-8 0,0 3 0,0 1 0,0-4 0,0 3 0,0-4 0,0-1 0,0 1 0,0 0 0,0-3 0,0 8 0,3-10 0,1 7 0,3-11 0,-4 6 0,0 15 0,-3 14 0,-5 22 0,4 8 0,-9 7 0,4 7 0,-5-5-673,4-21 0,1 2 673,2-7 0,1 2 0,0 15 0,0 1 0,3-8 0,0-4-827,0 40 827,0-36 0,0-2 0,0 4-117,0-11 0,0-1 117,0 11 0,0 6 0,4-8 1271,2-9-1271,3-6 874,1 1-874,-5-1 262,4-5-262,-8 4 0,3-4 0,-4 11 0,4-4 0,-3-1 0,8-2 0,-4-10 0,4 4 0,0-5 0,0 0 0,-1-5 0,1-2 0,0 1 0,-1-4 0,0 3 0,4-4 0,-3 0 0,3-1 0,-4 1 0,1 0 0,-1-5 0,-4-1 0,3-4 0,-7-4 0,4 0 0,-1-7 0,-2 7 0,2 2 0,4 13 0,3 5 0,8 5 0,13 21 0,-10-16 0,16 27 0,-12-23 0,10 11 0,9 8 0,-8-24 0,12 21 0,-20-30 0,12 19 0,-9-10 0,2 0 0,-4-3 0,-6-10 0,-1 9 0,-5-10 0,0 3 0,-1-4 0,-3 0 0,3-1 0,-4-4 0,4 4 0,0-4 0,0 5 0,1 5 0,0-5 0,0 5 0,-1-5 0,0-5 0,-3 4 0,-3-8 0,2 7 0,-3-7 0,2 3 0,0-4 0,-3 0 0,7 5 0,1-4 0,2 8 0,5-7 0,4 9 0,5-8 0,6 10 0,-1-4 0,2 10 0,-2-9 0,-4 6 0,-2-8 0,-4 3 0,-5-4 0,-2-2 0,-9-8 0,0-2 0,-5-3 0,1-3 0,0-1 0,0-3 0,4 0 0,5 0 0,11 3 0,4 6 0,0 5 0,3 3 0,3 1 0,5 5 0,7-2 0,-1 7 0,0-4 0,7 2 0,-5 2 0,5-7 0,-12 7 0,5-4 0,-9 5 0,3-5 0,-9 3 0,-3-9 0,-9 2 0,3 1 0,-7-4 0,3 3 0,-8-5 0,2 4 0,-2-3 0,0 3 0,-1-4 0,-3 0 0,2 0 0,-2-3 0,3 2 0,0-3 0,-3 0 0,12 7 0,-2-6 0,4 7 0,2-7 0,-8 3 0,7-6 0,-7 5 0,4-6 0,-5 3 0,-4 0 0,3-3 0,-6 3 0,6 0 0,-2 0 0,-1 0 0,3 3 0,-3-2 0,4 2 0,0 1 0,0 0 0,5 1 0,-4-1 0,7 1 0,-2 0 0,3 1 0,6 0 0,16 8 0,-6-5 0,17 2 0,-14-5 0,5-6 0,21 14 0,-9-7 0,16 9 0,1-5 0,-4 0 0,20 2 0,-14-2 0,-12-1 0,6 1 0,-21 2 0,17-2 0,-13 3 0,-1-5 0,-12-1 0,-2-5 0,-5 3 0,-5-7 0,5 6 0,-10-11 0,-2 2 0,-2-7 0,-13 0 0,7-16 0,1 12 0,12-11 0,11 15 0,9 0 0,-1 0 0,-5 0 0,4 0 0,9 4 0,1 7 0,20 1 0,-6 8 0,6-2 0,1 4 0,-19-6 0,14 5 0,-21-10 0,11 9 0,-8-5 0,-12 0 0,-2 2 0,-10-7 0,-6 2 0,-6-4 0,-4-1 0,0 1 0,0-4 0,4 3 0,-3-6 0,7 2 0,3 1 0,0-3 0,3 7 0,-4-7 0,-1 6 0,6-6 0,-4 3 0,-1-1 0,-2-2 0,-2 2 0,3 1 0,-3-3 0,2 2 0,-2 1 0,3-3 0,-3 6 0,2-6 0,-2 6 0,-1-6 0,3 6 0,-2-3 0,3 1 0,17 3 0,-12-7 0,16 7 0,-14-7 0,10 2 0,2 2 0,5-4 0,14 8 0,-21-4 0,38 1 0,-41 1 0,35-6 0,-22 8 0,11-3 0,-6 4 0,-2-5 0,-6 4 0,-5-4 0,4 0 0,-4 4 0,11-4 0,-10 1 0,9 2 0,-10-6 0,32 2 0,-13-4 0,15 0 0,-22 0 0,-7 0 0,0 0 0,1 0 0,-1 0 0,-5 0 0,10 0 0,-9 0 0,11 0 0,-7 0 0,7 0 0,-6-5 0,6 4 0,-7-3 0,1 4 0,-1-4 0,0 3 0,-5-4 0,4 1 0,-10 3 0,4-7 0,1 7 0,-5-7 0,4 3 0,1-4 0,-5 0 0,10-5 0,-10 4 0,10-4 0,2-1 0,1 5 0,4-9 0,1 8 0,-6-8 0,12 8 0,-11-3 0,5 0 0,-1-2 0,-4 1 0,10-5 0,-10 5 0,5-5 0,-7 1 0,7-1 0,-5 0 0,4 0 0,-6 1 0,-5 4 0,4-3 0,-4 3 0,0 1 0,-2 0 0,0 1 0,-4 3 0,5-4 0,-11 5 0,3 1 0,-3-5 0,0 3 0,-2-2 0,-4 4 0,-1-1 0,-3 2 0,-2 2 0,-4-2 0,0 7 0,0-7 0,0 6 0,0-2 0,4-1 0,-3 3 0,10-6 0,-9 3 0,4-3 0,-6 3 0,-3-6 0,-1-3 0,-3-18 0,3 15 0,1-6 0,2 22 0,0 0 0,1 0 0,-3 0 0,2 0 0,-3 0 0,0 0 0,0 0 0,-1-3 0,-2 2 0,6-2 0,-3 3 0,4-4 0,0 0 0,0 0 0,0-3 0,0 3 0,0-3 0,0-1 0,0 1 0,4-1 0,-3 1 0,3-1 0,0-3 0,1-2 0,5 0 0,0-2 0,-1 2 0,-4-3 0,11-6 0,-14 8 0,9-7 0,-11 12 0,-4-1 0,3-1 0,-2 0 0,3-1 0,-4-2 0,8 2 0,-6-8 0,7 4 0,1-9 0,-5 9 0,9-10 0,-4 9 0,1-7 0,-3 7 0,-3 1 0,-1 2 0,-4 6 0,3-3 0,-3 1 0,0 2 0,3-2 0,-2-1 0,8-6 0,0 0 0,11-4 0,-4-1 0,8 4 0,-2-9 0,-2 8 0,1-7 0,-12 9 0,5-4 0,-9 6 0,3-1 0,-8 5 0,3-3 0,-6 3 0,6-4 0,-2 0 0,3 0 0,1-5 0,-1 4 0,1-7 0,12-9 0,-8-1 0,8-5 0,-11 13 0,-1 1 0,0 4 0,-1 0 0,-2 0 0,1 6 0,-2-6 0,3 4 0,1-3 0,-1 0 0,6-3 0,1-3 0,5-2 0,1-5 0,4 3 0,-3-4 0,4 0 0,-6 5 0,1-4 0,-6 6 0,-1 5 0,7-15 0,-10 17 0,10-16 0,-12 15 0,4-1 0,-3-3 0,3 3 0,0 0 0,-3-3 0,3 8 0,-4-8 0,-1 8 0,1-3 0,-1 4 0,0 0 0,0 0 0,0 0 0,0 0 0,0 0 0,-4 4 0,3 0 0,-6 4 0,2 0 0,-3 0 0,-1 1 0,-2-1 0,2 1 0,-2-5 0,6 0 0,3-8 0,2-1 0,2-5 0,-1 1 0,5-2 0,-3 1 0,3-1 0,-9 6 0,0 1 0,-5 8 0,0 0 0,0 4 0,0 1 0,0-9 0,0 3 0,4-8 0,2 1 0,2 0 0,1-6 0,0 1 0,0 4 0,-1 1 0,-3-1 0,-1 4 0,0-3 0,-2 4 0,1 0 0,1 0 0,-2-9 0,6 2 0,-1-12 0,4-2 0,-4-1 0,4-10 0,-4 10 0,5-10 0,-5 10 0,4-5 0,-9 11 0,8 2 0,-5-2 0,1 5 0,1-1 0,-5 8 0,6-1 0,-7 0 0,8-5 0,-3-4 0,4 3 0,1-14 0,0 21 0,9-16 0,-1 12 0,6-6 0,-4-3 0,11-8 0,-9 10 0,17-21 0,-18 12 0,6-7 0,-7 4 0,-3-1 0,-2 5 0,-9-4 0,-1 11 0,-4 2 0,-1 4 0,0 1 0,-4 4 0,0 0 0,-4 5 0,0-4 0,0 7 0,0-11 0,0 11 0,0-12 0,0 4 0,0-5 0,0 1 0,0-6 0,4-1 0,-3 0 0,7-3 0,-3 3 0,4 1 0,-5 0 0,4 5 0,-7 1 0,2 3 0,-3-2 0,0 3 0,0-10 0,0 4 0,0-8 0,0 3 0,0 0 0,0-3 0,0 8 0,0-8 0,0 12 0,0-6 0,0 8 0,0-5 0,0 1 0,4-1 0,-3 0 0,2 1 0,1-1 0,-3-15 0,3 11 0,-4-11 0,0 15 0,0 6 0,0-14 0,4-4 0,6-13 0,1-9 0,8 3 0,-1-29 0,4 3-598,-11 23 1,-2-2 597,0 7 0,0 1 0,-2-7 0,-1-2 0,0 1 0,0 0 0,-2 4 0,-1 0 0,1-5 0,-2 2-399,-2-31 399,0-8 0,6 18 0,-5 1 0,4 3 0,-5 15 0,0 11 0,0 4 0,0 11 1170,0 5-1170,0-3 424,-3 8-424,-2-9 0,-4 5 0,0-6 0,4 0 0,-3 0 0,7 1 0,-3-1 0,4-16 0,0 17 0,0-15 0,0 24 0,0-4 0,0 6 0,0-1 0,0 9 0,0-7 0,0 2 0,0-10 0,0-23 0,0 14 0,0-40 0,-4 37 0,-6-31 0,-1 24 0,-8-6 0,3-5 0,1 11 0,0-5 0,1 7 0,8 0 0,-7 5 0,8 2 0,-4 5 0,1 5 0,3-3 0,-2 8 0,2-4 0,1 6 0,-4-1 0,4 5 0,0-4 0,-3 4 0,6-1 0,-7-2 0,7 3 0,-2-1 0,-1-2 0,3 7 0,-2-8 0,3 8 0,-4-7 0,3 7 0,-3-8 0,4 8 0,0-8 0,-4-1 0,3-1 0,-2-8 0,-1 3 0,3 0 0,-7-3 0,3 8 0,-4-4 0,5 6 0,-3-1 0,6 5 0,-7-4 0,4 8 0,0-7 0,-3 7 0,6-8 0,-5 8 0,1-14 0,-2 12 0,-2-12 0,5 14 0,-2 1 0,1 0 0,2 4 0,-4 0 0,4 1 0,-1 3 0,-2 3 0,5-2 0,-2 0 0,3-14 0,-4-11 0,-6-18 0,-7-14 0,-5-16 0,0 0 0,1 13 0,0 0 0,7 10 0,-5-2 0,3-3 0,1 18 0,-2 2 0,3 5 0,0 5 0,-2-3 0,3 8 0,-4-4 0,4 6 0,-3-1 0,7 0 0,-6 1 0,6-1 0,-3 1 0,7 3 0,-2-2 0,2 2 0,-3 1 0,0-3 0,1 7 0,-1-8 0,0 8 0,0-7 0,-3 7 0,2-8 0,-6 4 0,-2-6 0,0 5 0,-9-4 0,5 3 0,-5 0 0,5 2 0,-4-1 0,9 5 0,-8-5 0,8 9 0,-3-2 0,7 2 0,-6-4 0,5 1 0,-12-6 0,9 5 0,-9-9 0,4 8 0,-4-4 0,-1 0 0,6 4 0,-8-7 0,11 12 0,-2 1 0,12 4 0,4 3 0,3-2 0,0-14 0,-8 3 0,-6-23 0,-16-6 0,-9-19 0,6 10 0,-8-9 0,15 26 0,-8-7 0,5 6 0,1 6 0,4 2 0,0 9 0,7 2 0,-2 5 0,4 0 0,0 3 0,0-2 0,0 6 0,4-3 0,0 4 0,1 0 0,2 3 0,-2-2 0,3 5 0,1-2 0,2 0 0,-2 3 0,3-3 0,-3 3 0,-1-3 0,-3 2 0,-1-6 0,-4 3 0,0-3 0,0-1 0,0-2 0,-5 1 0,4-2 0,-3 0 0,0 2 0,3-5 0,-3 5 0,-1-5 0,4 2 0,-3-4 0,0 1 0,-2-1 0,1 0 0,-4-5 0,3 4 0,0-3 0,-3 4 0,8 0 0,-3 1 0,0-1 0,3 1 0,-4 3 0,5-2 0,0 5 0,0-1 0,0-1 0,0 2 0,1-1 0,-1-1 0,-4-4 0,3 2 0,2 0 0,0 5 0,6 1 0,-2 0 0,3-3 0,0 2 0,0-2 0,-4 3 0,4 0 0,-7-1 0,2 1 0,1 0 0,-3 0 0,6 0 0,-6 0 0,3-1 0,-1 1 0,-2-4 0,3 3 0,-4-2 0,0 2 0,4-3 0,-10 0 0,8-4 0,-13 3 0,10 1 0,-3 0 0,-1 2 0,4-2 0,-7 0 0,3-2 0,-5 1 0,0-4 0,1 7 0,-6-7 0,4 7 0,-3-8 0,-1 8 0,4-3 0,-8-1 0,8 4 0,-8-4 0,8 5 0,-8-1 0,8-3 0,-3 3 0,4-6 0,-4 5 0,3-5 0,-4 5 0,6-5 0,-1 2 0,1 0 0,-1-2 0,1 6 0,-1-7 0,1 7 0,-6-3 0,4 4 0,-3-1 0,-1 1 0,5 0 0,-10-1 0,9 0 0,-8-3 0,3 2 0,0-3 0,-3 5 0,8-4 0,-4 2 0,6-2 0,0 1 0,-1 2 0,0-7 0,1 7 0,-12-10 0,9 5 0,-4-2 0,7 1 0,4 6 0,-1-6 0,-2 6 0,3-6 0,-1 6 0,-2-6 0,2 6 0,1-2 0,-3 3 0,6 0 0,-2 0 0,0 0 0,3 1 0,-3-1 0,4 1 0,0 2 0,0-1 0,0 2 0,0-1 0,0-1 0,0 2 0,0-1 0,0-1 0,0 5 0,0-6 0,0 7 0,4-7 0,-3 6 0,3-5 0,-4 5 0,3-2 0,-2 0 0,3 2 0,-4-2 0,0-1 0,0 3 0,0-2 0,0 0 0,4 2 0,-3-2 0,3-1 0,-4 3 0,0-2 0,0 0 0,0 2 0,-7-6 0,5 6 0,-4-5 0,6 5 0,0-6 0,0 3 0,0 0 0,0-3 0,0 6 0,0-5 0,0 5 0,0-6 0,-4 7 0,3-4 0,-3 4 0,4 0 0,0 0 0,-5 0 0,4 0 0,-3 0 0,4 0 0,0 0 0,-4 0 0,3 0 0,-3 0 0,4 0 0,0 0 0,0 0 0,0 0 0,-4 0 0,3 0 0,-4 0 0,5 0 0,0 0 0,0 0 0,0 0 0,0 0 0,0 0 0,1 0 0,-6 0 0,4 0 0,-3 0 0,4 0 0,0 0 0,-4 0 0,6 0 0,-5 0 0,7 0 0,-4 0 0,4 0 0,-4 0 0,8 0 0,-7 0 0,6 0 0,-2 0 0,3 0 0,-3 0 0,2 0 0,-5 0 0,5 0 0,-2 0 0,3 0 0,-4-3 0,4 2 0,-4-2 0,1 3 0,2 0 0,-2 0 0,3 0 0,0-3 0,-3 2 0,2-2 0,-2 3 0,3 0 0,1 0 0,-1 0 0,0 0 0,0 0 0,1 0 0,-1 0 0,-3 0 0,3 0 0,-3 0 0,3 0 0,0 0 0,-3 0 0,2 0 0,-2 0 0,0 0 0,2 0 0,-2 0 0,-1 0 0,4 0 0,-7 0 0,6 0 0,-2 0 0,-1 0 0,3 0 0,-2 0 0,3 0 0,1 0 0,-1 0 0,0 0 0,0 0 0,1 0 0,-1-3 0,1 2 0,-1-1 0,1-1 0,-1 2 0,0-2 0,1 3 0,-1-3 0,-3 2 0,2-5 0,-3 5 0,1-5 0,2 5 0,-2-2 0,3 0 0,0 2 0,1-5 0,-1 5 0,0-2 0,3 0 0,-2 3 0,3-6 0,-4 5 0,0-2 0,0 3 0,4-3 0,-3 2 0,2-2 0,-3 3 0,1 0 0,-1-3 0,1 3 0,-1-3 0,1 3 0,-1 0 0,1 0 0,-1 0 0,0 0 0,1 0 0,-1 0 0,0 0 0,1 0 0,-1 0 0,0 0 0,0 0 0,-3 0 0,2 0 0,-2 0 0,3 0 0,0 0 0,1 0 0,-1 0 0,0 0 0,0 0 0,1 0 0,-1 0 0,1 0 0,0 0 0,-1 0 0,1 0 0,-1 0 0,0 0 0,1 0 0,-1 0 0,0 0 0,1 0 0,-1 0 0,1 0 0,-1 0 0,1 0 0,-1 0 0,0 0 0,1 0 0,-1 0 0,3 0 0,1 0 0</inkml:trace>
+</inkml:ink>
+</file>
+
+<file path=ppt/ink/ink85.xml><?xml version="1.0" encoding="utf-8"?>
+<inkml:ink xmlns:inkml="http://www.w3.org/2003/InkML">
+  <inkml:definitions>
+    <inkml:context xml:id="ctx0">
+      <inkml:inkSource xml:id="inkSrc0">
+        <inkml:traceFormat>
+          <inkml:channel name="X" type="integer" min="-2.14748E9" max="2.14748E9" units="cm"/>
+          <inkml:channel name="Y" type="integer" min="-2.14748E9" max="2.14748E9" units="cm"/>
+          <inkml:channel name="F" type="integer" max="32767" units="dev"/>
+        </inkml:traceFormat>
+        <inkml:channelProperties>
+          <inkml:channelProperty channel="X" name="resolution" value="1000" units="1/cm"/>
+          <inkml:channelProperty channel="Y" name="resolution" value="1000" units="1/cm"/>
+          <inkml:channelProperty channel="F" name="resolution" value="0" units="1/dev"/>
+        </inkml:channelProperties>
+      </inkml:inkSource>
+      <inkml:timestamp xml:id="ts0" timeString="2022-09-11T15:10:59.947"/>
+    </inkml:context>
+    <inkml:brush xml:id="br0">
+      <inkml:brushProperty name="width" value="0.1" units="cm"/>
+      <inkml:brushProperty name="height" value="0.1" units="cm"/>
+    </inkml:brush>
+  </inkml:definitions>
+  <inkml:trace contextRef="#ctx0" brushRef="#br0">9116 211 24575,'-28'0'0,"1"0"0,3-3 0,-1 2 0,0-7 0,1 7 0,-1-10 0,1 10 0,-1-7 0,5 8 0,-4-3 0,4 2 0,-5-3 0,-5 4 0,5 0 0,-5 0 0,6-4 0,-12 4 0,13-4 0,-11 4 0,18 0 0,-3 0 0,0 0 0,3 0 0,-8 0 0,4-4 0,-5 3 0,1-2 0,-1 3 0,-5-4 0,5 3 0,-10-7 0,10 7 0,-5-7 0,0 3 0,5-3 0,-10 3 0,4-3 0,0 7 0,-3-2 0,3 3 0,-20 0 0,11 0 0,-11 0 0,16 0 0,-1 0 0,1 0 0,-1 0 0,6 0 0,0 0 0,6 0 0,-1 3 0,5-2 0,4 6 0,2-7 0,7 3 0,-12-3 0,-2 0 0,-5 0 0,-3 0 0,-1 4 0,-6-3 0,-1 3 0,-5-4 0,7 0 0,-1 0 0,5 0 0,2 0 0,4 0 0,5 0 0,-4 0 0,8 0 0,-3 0 0,4 0 0,4 0 0,-3 0 0,2 0 0,-3 0 0,-4 0 0,3 0 0,-7 0 0,7 0 0,-4 0 0,5 0 0,-4 4 0,3 0 0,-3 1 0,4 1 0,0-1 0,0 2 0,0 1 0,0-4 0,0 2 0,4-2 0,-3 0 0,2 3 0,-3-7 0,1 7 0,-1-3 0,-5 4 0,4-4 0,-7 4 0,2-4 0,-3 4 0,-1 1 0,5-5 0,-4 3 0,8-2 0,-3-1 0,0 3 0,3-6 0,-19 6 0,17-3 0,-17 1 0,15 2 0,-5-3 0,1 5 0,3-5 0,-2 3 0,2-6 0,1 6 0,-3-2 0,6 2 0,-6-2 0,3 2 0,-5-3 0,1 5 0,-1-1 0,0-4 0,5 3 0,-4-2 0,8-1 0,-3 3 0,4-3 0,0 0 0,0 3 0,0-6 0,0 5 0,0-5 0,0 6 0,1-3 0,-12 7 0,4-6 0,-5 5 0,3-5 0,8 3 0,-3-1 0,0-2 0,3 1 0,-4-2 0,5 4 0,0-4 0,0 3 0,-4-3 0,-1 4 0,-5 0 0,1 0 0,-6 1 0,-1 3 0,-10 3 0,4 3 0,-10 1 0,10-1 0,-10 1 0,10-1 0,1-4 0,1 3 0,9-4 0,-8 1 0,8 1 0,-3-1 0,4-2 0,-5 5 0,4-5 0,-3 6 0,4-2 0,1 0 0,-2 5 0,1-3 0,4 2 0,-3 1 0,8-5 0,-10 9 0,5-3 0,-6 5 0,0-1 0,-17 18 0,8-7 0,-9 8 0,8-8 0,4-8 0,-6 8 0,6-8 0,-4 8 0,9-9 0,-9 9 0,9-9 0,0 3 0,3-4 0,8-7 0,-3 0 0,5-5 0,3 0 0,1 0 0,4-3 0,0 2 0,0-7 0,3 4 0,-2-8 0,-3 0 0,-18 6 0,-9 12 0,-9 5 0,-3 8 0,13-6 0,-5-4 0,1 9 0,0-8 0,-5 9 0,16-11 0,-2-1 0,18-11 0,-3 0 0,8-4 0,0 0 0,-8 8 0,2-2 0,-16 9 0,6-2 0,-13 4 0,3 4 0,-6 1 0,6-1 0,1 0 0,6-10 0,8 2 0,3-12 0,8 2 0,0-3 0,3 0 0,1 0 0,0-4 0,3 3 0,-3-2 0,-4 3 0,-1 4 0,-8 5 0,1 0 0,-2 12 0,-3-5 0,1 6 0,-1-8 0,4 3 0,1-8 0,-1 3 0,5-4 0,0 0 0,3 0 0,-2 0 0,1 0 0,-2 0 0,0 4 0,-1 2 0,-5 8 0,-1 2 0,-5 6 0,-1 0 0,-5 2 0,0 4 0,0-3 0,0 3 0,0 0 0,-4-4 0,3 4 0,-2-9 0,8 2 0,-3-3 0,4-1 0,0-2 0,-3 2 0,8-6 0,-4 5 0,6-7 0,-1 1 0,1 0 0,0-1 0,3-3 0,-2-2 0,7-4 0,-3 0 0,3 4 0,1-3 0,-1 3 0,-3 1 0,2 0 0,-3 4 0,0 1 0,3 4 0,-7 2 0,2 0 0,1 3 0,-3-3 0,-7 26 0,3-16 0,-6 16 0,9-26 0,-1 3 0,1-8 0,4 4 0,-3-6 0,4 1 0,-4-5 0,4 3 0,-2-7 0,5 3 0,-6 0 0,6 1 0,-6 5 0,-6 20 0,-3-9 0,-8 17 0,8-16 0,-3-4 0,8 2 0,-1-13 0,3 7 0,2-13 0,-1 3 0,1-4 0,4 0 0,-4-4 0,7 4 0,-6-7 0,6 2 0,-2-3 0,6 0 0,1 2 0,-4 7 0,-15 21 0,-15 11 0,-15 26 0,1-5 0,7-3 0,2-8 0,11-3 0,-4-8 0,11-4 0,2-12 0,9-11 0,2-4 0,4-2 0,0-3 0,-5 8 0,0 2 0,-5 8 0,-7 14 0,5-4 0,-10 14 0,10-16 0,-8 9 0,8-9 0,-4 4 0,10-10 0,0-1 0,6-14 0,-1 3 0,4-12 0,-2 4 0,5-5 0,-2 5 0,3 0 0,-3 4 0,2 4 0,-7 7 0,4 5 0,-9 4 0,3 1 0,-3 0 0,4-6 0,-7 16 0,6-22 0,-5 11 0,7-16 0,1-3 0,-1 4 0,4-5 0,-3 4 0,-2 1 0,0 10 0,-9 12 0,8-3 0,-9 14 0,9-10 0,-4 5 0,0 0 0,3 0 0,-7 1 0,8-7 0,-4-1 0,5 6 0,1-14 0,-1 8 0,1-21 0,4-1 0,1-4 0,0-4 0,2 0 0,-2-4 0,3-1 0,0 9 0,-9 12 0,-1 5 0,-9 15 0,1-10 0,-6 17 0,4-16 0,-9 15 0,10-10 0,-5 6 0,5-7 0,5 0 0,1-12 0,0 5 0,4-4 0,-9 10 0,4 2 0,-5 0 0,0 4 0,0-5 0,-5 7 0,5-7 0,-4 0 0,5-7 0,5-9 0,1 2 0,5-16 0,3 6 0,-2-10 0,5 2 0,-2-3 0,3 8 0,-4 1 0,3 14 0,-6 1 0,2 4 0,0 1 0,-3-5 0,3 3 0,0-8 0,-2 0 0,6-4 0,-5-10 0,5 1 0,-2-6 0,3 3 0,0 5 0,-3 5 0,2 9 0,-3 2 0,0 5 0,3 5 0,-7 1 0,7 1 0,-4-2 0,1-6 0,4-4 0,-8-1 0,7-10 0,-6 4 0,6-8 0,-6-1 0,3-4 0,-2-5 0,2 6 0,1 4 0,3 11 0,0 4 0,-9 17 0,2 2 0,-8 6 0,5 5 0,0-5 0,-1 6 0,-4 0 0,9 0 0,-8-6 0,9-2 0,-5-5 0,0-1 0,5 0 0,1-5 0,4-2 0,-4-5 0,3-5 0,-3 4 0,4-10 0,0 10 0,0-9 0,0 8 0,0-3 0,-4 5 0,3 0 0,-7-1 0,3 1 0,0 0 0,1-5 0,0 3 0,3-8 0,-3 4 0,4-6 0,-4 1 0,4 5 0,-4-5 0,4 5 0,0 0 0,0 0 0,0 1 0,0-1 0,0-1 0,0-3 0,0 8 0,0-8 0,0 3 0,0 1 0,0-4 0,0 8 0,0-3 0,4 5 0,1 5 0,4-4 0,1 10 0,-1-5 0,-4 1 0,4 4 0,-4-5 0,1 1 0,2 4 0,-3-10 0,5 5 0,-6-7 0,4 1 0,-3 0 0,4-5 0,0-2 0,-1 0 0,-3-7 0,-2 6 0,-3-12 0,0-1 0,0 1 0,0 5 0,0 7 0,0 7 0,0 1 0,0-5 0,0-6 0,0-1 0,4-4 0,1 15 0,4 3 0,1 23 0,1-3 0,-1-1 0,0 3 0,-1-16 0,2 17 0,-1-5 0,0 0 0,-1-7 0,1-2 0,-1-10 0,1 10 0,3-10 0,-3 4 0,3-5 0,-4 0 0,0 5 0,0-4 0,0 4 0,0-5 0,0-5 0,-1 3 0,1-8 0,-1 3 0,0-4 0,0-1 0,4 1 0,-3-1 0,3 1 0,1 4 0,-4-3 0,4 9 0,-1-5 0,-2 6 0,3-1 0,0 1 0,1 0 0,4 0 0,0 0 0,0 5 0,5-3 0,-3 10 0,8-9 0,5 24 0,-8-26 0,11 24 0,-12-23 0,5 10 0,-1 0 0,7 2 0,-5-5 0,26 30 0,-9-9 0,6 3 0,-11-8 0,-14-22 0,1 5 0,-6-7 0,-1-6 0,-10-15 0,-1-1 0,-1-11 0,10-1 0,11 5 0,11 3 0,2 13 0,-2-5 0,-4 9 0,-6-9 0,15 9 0,-6 1 0,14 3 0,-5 2 0,-6 0 0,-1-4 0,0 3 0,1-4 0,0 4 0,3-7 0,-3 6 0,0-7 0,4 4 0,-9 0 0,3-5 0,-9 3 0,3-3 0,-9-2 0,5 5 0,-6-5 0,0 0 0,0 4 0,4-8 0,-2 8 0,7-7 0,-2 7 0,8-2 0,-2 0 0,8 0 0,-9-1 0,4-3 0,-10 2 0,2-5 0,-7 5 0,-2-5 0,0 0 0,-9-3 0,3-2 0,-4 3 0,0 0 0,4 1 0,-2 3 0,7-1 0,-3 2 0,-1-8 0,-1 3 0,-4-7 0,0 3 0,-3-4 0,-2-3 0,-3-1 0,-1-3 0,6 0 0,15 0 0,14 5 0,15 1 0,0 4 0,-1 4 0,-7 1 0,21 12 0,0 6 0,-2-4 0,-16-5 0,-2-1 0,-8-2 0,49 18 0,-51-15 0,22 7 0,-11-2 0,0 1 0,-3-5 0,-7 3 0,2-9 0,-4 9 0,-7-9 0,1 7 0,-7-8 0,1 3 0,-1 0 0,-4 0 0,4 1 0,-8-3 0,6-2 0,-2-2 0,3 2 0,1-1 0,-1-3 0,1-1 0,5 0 0,-5-2 0,5 2 0,-10-4 0,4 4 0,-4-3 0,1 6 0,2-7 0,-3 7 0,5-6 0,0 3 0,-1 0 0,6-3 0,0 8 0,6-8 0,-1 8 0,7-7 0,0 8 0,7-7 0,12 3 0,-3 1 0,11-3 0,-18 2 0,8-3 0,-8-2 0,32 11 0,-15-8 0,9 7 0,-23-9 0,-5 0 0,-1-1 0,-5 1 0,4-1 0,-5 1 0,1-1 0,-1 0 0,-1-4 0,2 3 0,5-7 0,0 8 0,0-8 0,-5 3 0,3 1 0,-3 0 0,-1 0 0,0 4 0,-6-8 0,21 7 0,-16-3 0,22 0 0,-20-1 0,5-4 0,0 0 0,-5 0 0,4 0 0,-10 0 0,10 0 0,-10 0 0,4 0 0,-10 0 0,3 0 0,-8 0 0,9 0 0,-10 0 0,5 0 0,-5 0 0,-1 0 0,-3 0 0,2 0 0,4 0 0,-1 0 0,6 0 0,-8 0 0,-4 0 0,4 0 0,-4 0 0,5 0 0,0 0 0,-1 0 0,-3 0 0,-2 4 0,-4-4 0,-4 4 0,3-4 0,-6 0 0,2 0 0,-3 0 0,0 0 0,-3-7 0,9 5 0,6-4 0,7 6 0,8 0 0,-8 0 0,14 0 0,-2 4 0,10 1 0,-5 5 0,4-1 0,-4 1 0,-1-1 0,5 1 0,-4-1 0,0-4 0,4 4 0,-5-4 0,1 1 0,4 2 0,-10-7 0,4 8 0,-5-5 0,0 1 0,-5 3 0,3-3 0,-3 0 0,5 3 0,-1-4 0,1 1 0,0 3 0,0-3 0,15 4 0,-16-4 0,11 3 0,-22-4 0,1 1 0,-1 2 0,1-6 0,4 7 0,2-7 0,5 7 0,0-7 0,-1 7 0,7-7 0,1 7 0,-1-7 0,0 7 0,-7-7 0,1 7 0,0-7 0,-1 3 0,-4 0 0,4-3 0,-10 2 0,10-3 0,-4 0 0,-1 0 0,5 0 0,-4 0 0,4 0 0,7 0 0,-5 0 0,4 0 0,-5 0 0,-1 0 0,7 0 0,-5 0 0,10 0 0,-4 0 0,-1 0 0,5 0 0,-4 0 0,5-4 0,1 3 0,-7-7 0,5 2 0,-9 1 0,3-3 0,-5 7 0,-1-3 0,-4 0 0,-1 4 0,10-8 0,-6 3 0,8 0 0,-8-3 0,-3 3 0,5 0 0,-1-3 0,7 3 0,-10-4 0,8 4 0,-14-2 0,8 6 0,-8-6 0,4 2 0,-6 0 0,1-2 0,5 6 0,0-6 0,6 6 0,0-7 0,-1 3 0,7 0 0,16-4 0,-11 8 0,10-3 0,-21 0 0,0 3 0,-1-3 0,0 0 0,-4 3 0,-2-6 0,1 6 0,-4-3 0,3 4 0,-8 0 0,-2 0 0,0 0 0,-3-3 0,3 2 0,-4-3 0,-3 4 0,2 0 0,-7 0 0,8-3 0,-8 2 0,7-2 0,-6 3 0,2-3 0,-3 2 0,0-2 0,0 3 0,-1 0 0,1-3 0,-3-8 0,4 5 0,10-5 0,2 11 0,20-9 0,-2 3 0,10-12 0,6 7 0,-4-8 0,5 8 0,-7-7 0,0 3 0,-5 0 0,4-3 0,-10 4 0,-1-4 0,-2 5 0,-3-4 0,0 4 0,3-4 0,3-1 0,1-5 0,9 2 0,-7-7 0,7 4 0,-3-5 0,0 0 0,-2 5 0,-4-4 0,-2 9 0,-3-8 0,2 8 0,-7-6 0,2 6 0,-9-1 0,2 4 0,-2 0 0,4-5 0,0 3 0,7-8 0,-1 7 0,2-7 0,2 7 0,-2-8 0,4 3 0,2-5 0,0 0 0,-7 5 0,5-3 0,-10 4 0,4 0 0,-5 2 0,-1 0 0,0 4 0,-3-8 0,2 8 0,-8-2 0,3 3 0,1 0 0,-4 1 0,4-5 0,-5 8 0,0-7 0,0 8 0,0-4 0,0 0 0,5-1 0,-4 1 0,7-1 0,-2 0 0,4-5 0,1-1 0,0 0 0,5-5 0,-4 5 0,4-1 0,-4-3 0,-2 9 0,1-9 0,-1 9 0,-4-4 0,4 0 0,-5 4 0,7-8 0,-1 3 0,-5 0 0,5-3 0,-10 8 0,4-3 0,-4 1 0,-1 3 0,6-9 0,-4 5 0,4-6 0,-1 5 0,2-4 0,4 3 0,1-5 0,-1 1 0,1-1 0,-1 5 0,-1 1 0,0 4 0,0 1 0,-5 0 0,3 0 0,-7 4 0,10-6 0,-9 6 0,4-3 0,-6 1 0,4 1 0,-6 2 0,5-4 0,-7 4 0,1 0 0,-2 0 0,-3 4 0,0 1 0,3-5 0,1 3 0,1-6 0,2 6 0,-6-3 0,3 1 0,5-7 0,-7 5 0,11-12 0,-8 7 0,0-3 0,4-3 0,-4 2 0,5-3 0,0-6 0,-1 4 0,1-3 0,0 4 0,-1 5 0,-4 0 0,3 1 0,-7 7 0,3-3 0,-4 8 0,-1 0 0,1 1 0,-3-1 0,2-4 0,7-5 0,0-5 0,8 0 0,-9 2 0,2 4 0,-5 0 0,1 3 0,-3 2 0,0 3 0,0 1 0,4-9 0,10-19 0,2 5 0,4-13 0,-6 16 0,-9 6 0,0 1 0,-5 7 0,0 2 0,0 3 0,0 3 0,-4-2 0,3 6 0,-1-19 0,7-1 0,2-16 0,3 5 0,0 2 0,-1 4 0,-3 1 0,-2 3 0,-3 6 0,-1 4 0,0 4 0,-4 1 0,3 2 0,-2-6 0,5-19 0,3-1 0,3-17 0,9-8 0,-8 9 0,9-15 0,-10 7 0,5 4 0,-5 1 0,3 8 0,-9 14 0,3 3 0,-5 9 0,-2 4 0,-2 0 0,-3 5 0,3 2 0,1-5 0,3-8 0,5-9 0,2-10 0,10-12 0,-6 15 0,7-19 0,-7 14 0,5-10 0,-6-1 0,4 7 0,-10 0 0,2 6 0,-5 6 0,1 0 0,-1 5 0,0 5 0,0 1 0,-1 4 0,1 0 0,-1 0 0,0 4 0,-3 0 0,-1 5 0,0 2 0,-2-2 0,2-6 0,-3 0 0,4-16 0,1-4 0,4-5 0,10-16 0,-7 14 0,11-14 0,-8 11 0,4-7 0,-4 7 0,2 0 0,-7 1 0,3 9 0,-4-8 0,0 14 0,-1-4 0,0 6 0,1-1 0,-1 0 0,0 1 0,0 3 0,-4 2 0,0 4 0,-1 4 0,-3 1 0,3-1 0,-3 0 0,3 0 0,-2-3 0,2 2 0,1-7 0,0-4 0,1-2 0,1-2 0,-5 7 0,7-4 0,-4 8 0,0-3 0,3 4 0,-3 0 0,0 0 0,3 0 0,-6 0 0,5 0 0,-1 0 0,-1 0 0,2 0 0,-1-4 0,3-1 0,0-5 0,0 1 0,0-1 0,0 5 0,0-4 0,-3 8 0,2-8 0,-6 4 0,6-11 0,-2 0 0,3-1 0,-3 2 0,2 6 0,-2-6 0,3 4 0,1-3 0,-1 4 0,1-4 0,-1 3 0,1-4 0,-2 10 0,5-4 0,-3 4 0,3-5 0,-4 1 0,0-1 0,0 1 0,1-6 0,-4 4 0,2-8 0,-6 8 0,7-8 0,-3 8 0,4-9 0,-1 4 0,1-4 0,0-1 0,0 0 0,0 1 0,0-1 0,0-6 0,1 0 0,-1-6 0,5 0 0,-3 0 0,2 5 0,-3-3 0,-1 9 0,-4-5 0,3 7 0,-7-1 0,7 5 0,-7 1 0,2 1 0,-3 11 0,0-9 0,0 10 0,0-12 0,0 3 0,0-9 0,0-7 0,0-15 0,0 5 0,0-21 0,0 33 0,0-27 0,0 17 0,0-6 0,0-5 0,0 11 0,0-5 0,0 13 0,0 1 0,0 5 0,0 5 0,0-3 0,0 8 0,0-4 0,0 6 0,0-6 0,0 4 0,0-3 0,0 4 0,0 0 0,-3 5 0,2-3 0,-2 2 0,-1-8 0,-1 3 0,0-4 0,-2 1 0,6 3 0,-7-9 0,7 5 0,-3-6 0,0 5 0,3-3 0,-6 3 0,6-5 0,-7 5 0,7-3 0,-6 3 0,2 0 0,-4-3 0,1 8 0,-1-4 0,1 5 0,0 1 0,0-1 0,0 5 0,3-4 0,-2 4 0,3 0 0,0-4 0,-8-17 0,10 11 0,-10-26 0,7 24 0,-4-4 0,0 1 0,1 4 0,-1-4 0,0 4 0,4 1 0,-2 6 0,6-1 0,-6 0 0,6 1 0,-3 3 0,0-7 0,3 6 0,-6-7 0,6 4 0,-3 1 0,1 3 0,2 2 0,-2 0 0,-1 3 0,3-3 0,-2-1 0,0-7 0,2 5 0,-2-8 0,3 10 0,0-5 0,0 1 0,0 8 0,0-23 0,0 1 0,0-7 0,-5-14 0,4 14 0,-4-11 0,5-4 0,-4 10 0,-2-11 0,-3 12 0,-1 0 0,0 2 0,-3 10 0,3-10 0,-4 4 0,5 1 0,0-5 0,0 10 0,-1-10 0,5 10 0,-3-10 0,6 10 0,-5 1 0,6 2 0,-6 13 0,2-8 0,-3 9 0,1 0 0,2 1 0,-2 0 0,3 3 0,-4-4 0,0 1 0,4-1 0,-3 0 0,3-4 0,-5-1 0,-2-1 0,1-8 0,-6 8 0,7-9 0,-7 10 0,6-10 0,-5 9 0,5-3 0,-1 9 0,-1-4 0,3 4 0,-2 0 0,3-4 0,0 4 0,0-5 0,3 1 0,-6-6 0,5 5 0,-6-5 0,3 6 0,1-1 0,0-4 0,0 3 0,-1-3 0,0-1 0,1 4 0,-1-8 0,1 3 0,-1-5 0,0 0 0,0 0 0,0-5 0,-4 4 0,3-4 0,-3 6 0,4-1 0,0 5 0,4-3 0,-2 9 0,6-4 0,-6 8 0,6-2 0,-5 7 0,2-10 0,-1 9 0,2-5 0,3 11 0,-4-12 0,-1 1 0,-7-9 0,-2-3 0,-3-3 0,-6-5 0,-2-2 0,-4-4 0,0 4 0,0 0 0,-4 2 0,4 8 0,-3 2 0,4 0 0,2 9 0,-2-8 0,3 9 0,3 0 0,1-2 0,5 3 0,1 1 0,-2-4 0,2 4 0,2 0 0,-2-3 0,3 6 0,-3-2 0,-1 0 0,-3 2 0,2-2 0,-2 3 0,4 1 0,0 1 0,0 2 0,0-2 0,0 2 0,0 1 0,4-3 0,-4 2 0,4-3 0,-1 0 0,-2 0 0,6-4 0,-7 3 0,6-8 0,-5 4 0,1-4 0,-3-1 0,-1-4 0,0 3 0,-1-8 0,2 8 0,-6-5 0,5 7 0,-9-3 0,9 2 0,-9-1 0,5 5 0,-1-4 0,-1 8 0,6-3 0,-6 4 0,7 1 0,-8-1 0,8 1 0,-3-1 0,7 1 0,-2 0 0,6 4 0,-6-3 0,6 3 0,-2-1 0,2-2 0,2 7 0,-2-7 0,1 2 0,0 1 0,-1-3 0,5 3 0,-4-9 0,3 11 0,-7-2 0,-1 0 0,-3 2 0,-11-17 0,-2 4 0,-11-7 0,1 0 0,-1 0 0,-4 0 0,4 0 0,1 1 0,1-1 0,9 2 0,-4-1 0,6 6 0,5 2 0,-3 4 0,8 1 0,-3 2 0,0-1 0,6 6 0,-5-4 0,7 5 0,-4 0 0,0-1 0,4 1 0,-3 0 0,2-1 0,-2 1 0,-1-4 0,-11-1 0,4 0 0,-5 1 0,3 3 0,9 0 0,-5 1 0,5-4 0,4 3 0,-3-3 0,6 1 0,-6-2 0,-2 0 0,0-2 0,-3 2 0,0-3 0,-1 3 0,-5-4 0,5 4 0,-4-4 0,8 4 0,-7-3 0,7 3 0,-4 0 0,5-3 0,4 7 0,-7-6 0,-1-1 0,-2 2 0,-5-5 0,10 9 0,-3-6 0,-1 3 0,4 0 0,-3-2 0,0 5 0,-1-6 0,0 7 0,-3-4 0,7 2 0,-8 1 0,8-2 0,-7 3 0,7 0 0,-4 3 0,5-1 0,0 2 0,0-4 0,0 4 0,0-3 0,0 3 0,1-3 0,-1-1 0,0 4 0,-5-3 0,-2 3 0,1-4 0,-1 1 0,7 2 0,0-1 0,4 5 0,-3-6 0,3 7 0,-4-7 0,3 3 0,-2 0 0,3 1 0,0 0 0,-3 2 0,2-5 0,1 5 0,1-2 0,3 3 0,0-3 0,0 2 0,4-5 0,0-1 0,0 2 0,-13-1 0,-2 2 0,-11-4 0,4-5 0,0-3 0,1-1 0,-6 0 0,-6-5 0,-2-2 0,-5-4 0,0-1 0,0 4 0,0 2 0,-4 0 0,10 4 0,-10-5 0,10 7 0,-4 2 0,10-1 0,-3 2 0,8 1 0,1 1 0,1 0 0,8 4 0,-7-4 0,7 1 0,-3 3 0,-1-3 0,4 0 0,-7 2 0,3-2 0,-5 2 0,1 1 0,-1 0 0,0-4 0,5 7 0,-3-6 0,7 6 0,-8-3 0,8 1 0,-8 2 0,8-1 0,-7 5 0,7-6 0,-3 3 0,0-4 0,3 4 0,-10-3 0,9 3 0,-5-4 0,7 4 0,0-2 0,0 5 0,1-6 0,-1 3 0,0 0 0,0 0 0,-5 1 0,4 2 0,-3-6 0,4 3 0,-4 0 0,3-3 0,-3 6 0,-1-6 0,0 6 0,-5-6 0,5 6 0,-4-6 0,-3 2 0,1-3 0,-1 1 0,4 2 0,2-2 0,1 6 0,-3-6 0,7 3 0,-4-1 0,1-2 0,3 3 0,-8 0 0,8-3 0,-3 3 0,0 0 0,3-3 0,-3 3 0,4 0 0,-5-3 0,4 3 0,-7-1 0,2-2 0,1 6 0,-4-6 0,4 2 0,0-3 0,-15 0 0,17 1 0,-17 2 0,16-1 0,-6 1 0,1-3 0,0 0 0,-1 0 0,0 3 0,1-2 0,-1 2 0,0 1 0,5-3 0,-3 6 0,2-6 0,-3 6 0,-1-6 0,5 6 0,-4-3 0,4 1 0,0 2 0,-4-3 0,5 4 0,-2 0 0,-2 0 0,-1 0 0,-1 0 0,-9 0 0,9 0 0,-10 0 0,10 0 0,-9 0 0,5 0 0,-1 0 0,-4 0 0,9 0 0,-5 0 0,6 0 0,-1 0 0,1 0 0,0 0 0,0 0 0,-1 0 0,2 0 0,-2 0 0,6 0 0,-5 0 0,8 0 0,-6 0 0,6 0 0,-6 0 0,6 3 0,-7-2 0,7 3 0,-3-1 0,5 1 0,-1 0 0,0 2 0,1-2 0,-1 1 0,1 1 0,-1-2 0,4 0 0,-3 3 0,7-6 0,-4 5 0,1-5 0,3 2 0,-3 0 0,3-3 0,0 3 0,1 0 0,-1 1 0,1 0 0,2 1 0,-2-4 0,3 5 0,-7-5 0,2 4 0,-5-4 0,1 5 0,-2-5 0,-1 6 0,0-6 0,4 5 0,-2-5 0,6 5 0,-3-6 0,3 3 0,-3-3 0,3 0 0,-10 0 0,4 0 0,-5 0 0,7 0 0,-3 0 0,3 0 0,-4 0 0,4 0 0,1 0 0,0 0 0,2 0 0,-2 0 0,4 0 0,-1 0 0,0 0 0,4 0 0,0 0 0</inkml:trace>
+</inkml:ink>
+</file>
+
+<file path=ppt/ink/ink86.xml><?xml version="1.0" encoding="utf-8"?>
+<inkml:ink xmlns:inkml="http://www.w3.org/2003/InkML">
+  <inkml:definitions>
+    <inkml:context xml:id="ctx0">
+      <inkml:inkSource xml:id="inkSrc0">
+        <inkml:traceFormat>
+          <inkml:channel name="X" type="integer" min="-2.14748E9" max="2.14748E9" units="cm"/>
+          <inkml:channel name="Y" type="integer" min="-2.14748E9" max="2.14748E9" units="cm"/>
+          <inkml:channel name="F" type="integer" max="32767" units="dev"/>
+        </inkml:traceFormat>
+        <inkml:channelProperties>
+          <inkml:channelProperty channel="X" name="resolution" value="1000" units="1/cm"/>
+          <inkml:channelProperty channel="Y" name="resolution" value="1000" units="1/cm"/>
+          <inkml:channelProperty channel="F" name="resolution" value="0" units="1/dev"/>
+        </inkml:channelProperties>
+      </inkml:inkSource>
+      <inkml:timestamp xml:id="ts0" timeString="2022-09-11T15:12:13.026"/>
+    </inkml:context>
+    <inkml:brush xml:id="br0">
+      <inkml:brushProperty name="width" value="0.1" units="cm"/>
+      <inkml:brushProperty name="height" value="0.1" units="cm"/>
+    </inkml:brush>
+  </inkml:definitions>
+  <inkml:trace contextRef="#ctx0" brushRef="#br0">1 0 24575,'0'28'0,"0"9"0,0 17 0,0-3 0,0 14 0,5 31 0,-4-30 0,5 5 0,1-1 0,0 1 0,10 15 0,-6-34 0,14 26 0,-13-27 0,14 42 0,-21-59 0,7 37 0,-11-45 0,6 29 0,-7-41 0,4 5 0,-1-12 0,-3-1 0,3 1 0,-3-1 0,0 4 0,3 7 0,-2 0 0,3 24 0,-4-25 0,0 17 0,2-25 0,-1 11 0,5-7 0,-5 9 0,5-7 0,-5 10 0,2-10 0,0 11 0,-2-17 0,2 2 0,-3-8 0</inkml:trace>
+</inkml:ink>
+</file>
+
+<file path=ppt/ink/ink87.xml><?xml version="1.0" encoding="utf-8"?>
+<inkml:ink xmlns:inkml="http://www.w3.org/2003/InkML">
+  <inkml:definitions>
+    <inkml:context xml:id="ctx0">
+      <inkml:inkSource xml:id="inkSrc0">
+        <inkml:traceFormat>
+          <inkml:channel name="X" type="integer" min="-2.14748E9" max="2.14748E9" units="cm"/>
+          <inkml:channel name="Y" type="integer" min="-2.14748E9" max="2.14748E9" units="cm"/>
+          <inkml:channel name="F" type="integer" max="32767" units="dev"/>
+        </inkml:traceFormat>
+        <inkml:channelProperties>
+          <inkml:channelProperty channel="X" name="resolution" value="1000" units="1/cm"/>
+          <inkml:channelProperty channel="Y" name="resolution" value="1000" units="1/cm"/>
+          <inkml:channelProperty channel="F" name="resolution" value="0" units="1/dev"/>
+        </inkml:channelProperties>
+      </inkml:inkSource>
       <inkml:timestamp xml:id="ts0" timeString="2022-09-11T15:12:14.537"/>
     </inkml:context>
     <inkml:brush xml:id="br0">
@@ -3695,7 +4074,7 @@
 </inkml:ink>
 </file>
 
-<file path=ppt/ink/ink81.xml><?xml version="1.0" encoding="utf-8"?>
+<file path=ppt/ink/ink88.xml><?xml version="1.0" encoding="utf-8"?>
 <inkml:ink xmlns:inkml="http://www.w3.org/2003/InkML">
   <inkml:definitions>
     <inkml:context xml:id="ctx0">
@@ -3722,7 +4101,7 @@
 </inkml:ink>
 </file>
 
-<file path=ppt/ink/ink82.xml><?xml version="1.0" encoding="utf-8"?>
+<file path=ppt/ink/ink89.xml><?xml version="1.0" encoding="utf-8"?>
 <inkml:ink xmlns:inkml="http://www.w3.org/2003/InkML">
   <inkml:definitions>
     <inkml:context xml:id="ctx0">
@@ -3746,195 +4125,6 @@
     </inkml:brush>
   </inkml:definitions>
   <inkml:trace contextRef="#ctx0" brushRef="#br0">1 1 24575,'26'0'0,"-4"7"0,18 7 0,-9 4 0,1 0 0,6 3 0,-10-2 0,24 26 0,3 3 0,-12-9 0,23 25 0,1 5 0,-11-8 0,-21-23 0,1 1 0,16 26 0,-26-41 0,2 15 0,-11-21 0,7 8 0,-12-8 0,3-6 0,-2 4 0,-9-8 0,5 1 0,-5-5 0,8 2 0,-4-6 0,8 6 0,-6-2 0,0 0 0,-1 2 0,12 4 0,-3 3 0,19 9 0,-15-6 0,6 2 0,-16-7 0,4 2 0,-8-6 0,-2 0 0,-3-4 0</inkml:trace>
-</inkml:ink>
-</file>
-
-<file path=ppt/ink/ink83.xml><?xml version="1.0" encoding="utf-8"?>
-<inkml:ink xmlns:inkml="http://www.w3.org/2003/InkML">
-  <inkml:definitions>
-    <inkml:context xml:id="ctx0">
-      <inkml:inkSource xml:id="inkSrc0">
-        <inkml:traceFormat>
-          <inkml:channel name="X" type="integer" min="-2.14748E9" max="2.14748E9" units="cm"/>
-          <inkml:channel name="Y" type="integer" min="-2.14748E9" max="2.14748E9" units="cm"/>
-          <inkml:channel name="F" type="integer" max="32767" units="dev"/>
-        </inkml:traceFormat>
-        <inkml:channelProperties>
-          <inkml:channelProperty channel="X" name="resolution" value="1000" units="1/cm"/>
-          <inkml:channelProperty channel="Y" name="resolution" value="1000" units="1/cm"/>
-          <inkml:channelProperty channel="F" name="resolution" value="0" units="1/dev"/>
-        </inkml:channelProperties>
-      </inkml:inkSource>
-      <inkml:timestamp xml:id="ts0" timeString="2022-09-11T15:12:25.189"/>
-    </inkml:context>
-    <inkml:brush xml:id="br0">
-      <inkml:brushProperty name="width" value="0.1" units="cm"/>
-      <inkml:brushProperty name="height" value="0.1" units="cm"/>
-    </inkml:brush>
-  </inkml:definitions>
-  <inkml:trace contextRef="#ctx0" brushRef="#br0">0 0 24575,'38'0'0,"1"0"0,15 0 0,-5 0 0,4 9 0,-10 5 0,4 8 0,1 3 0,9 14 0,7 1 0,-3 1 0,-18-1 0,20 11 0,-35-20 0,-10-13 0,4 5 0,-9-7 0,-5-11 0,4 7 0,-5-11 0,-1 4 0,1-1 0,7 3 0,-2 0 0,7 1 0,0 0 0,-3-1 0,3 1 0,-5 2 0,1-2 0,-4 3 0,-1-4 0,-3-1 0,0 1 0,-1-1 0,1-2 0,-1 2 0,1-5 0,0 5 0,-1-3 0,1 1 0,3 2 0,-2-2 0,2 0 0,-4 2 0,1-5 0,0 4 0,-1-4 0,1 2 0,0-3 0,-1 0 0,1 3 0,-1-2 0,-2 5 0,1-6 0,-1 3 0,-1 0 0,3-2 0,-3 2 0,4-3 0,-1 0 0,1 0 0,-1 0 0,0 0 0,-2 0 0,-1 0 0</inkml:trace>
-</inkml:ink>
-</file>
-
-<file path=ppt/ink/ink84.xml><?xml version="1.0" encoding="utf-8"?>
-<inkml:ink xmlns:inkml="http://www.w3.org/2003/InkML">
-  <inkml:definitions>
-    <inkml:context xml:id="ctx0">
-      <inkml:inkSource xml:id="inkSrc0">
-        <inkml:traceFormat>
-          <inkml:channel name="X" type="integer" min="-2.14748E9" max="2.14748E9" units="cm"/>
-          <inkml:channel name="Y" type="integer" min="-2.14748E9" max="2.14748E9" units="cm"/>
-          <inkml:channel name="F" type="integer" max="32767" units="dev"/>
-        </inkml:traceFormat>
-        <inkml:channelProperties>
-          <inkml:channelProperty channel="X" name="resolution" value="1000" units="1/cm"/>
-          <inkml:channelProperty channel="Y" name="resolution" value="1000" units="1/cm"/>
-          <inkml:channelProperty channel="F" name="resolution" value="0" units="1/dev"/>
-        </inkml:channelProperties>
-      </inkml:inkSource>
-      <inkml:timestamp xml:id="ts0" timeString="2022-09-11T15:12:26.812"/>
-    </inkml:context>
-    <inkml:brush xml:id="br0">
-      <inkml:brushProperty name="width" value="0.1" units="cm"/>
-      <inkml:brushProperty name="height" value="0.1" units="cm"/>
-    </inkml:brush>
-  </inkml:definitions>
-  <inkml:trace contextRef="#ctx0" brushRef="#br0">1 0 24575,'28'0'0,"8"0"0,19 10 0,8 2 0,7 5 0,-2 2 0,-2 8 0,-9-4 0,3 17 0,-21-15 0,3 8 0,-19-7 0,7 1 0,-8-2 0,4 2 0,-4-10 0,3 8 0,-5-12 0,1 4 0,-3-3 0,-3-6 0,0 3 0,-4-1 0,3-1 0,-6 1 0,6 0 0,-7-2 0,7 2 0,-3-3 0,0 4 0,3-3 0,3 8 0,-5-10 0,4 3 0,-13-7 0,3-1 0,-2 2 0,8 0 0,-4 0 0,18 4 0,-13 0 0,27 1 0,-21-4 0,25-1 0,-22-3 0,24 0 0,-23 0 0,12 0 0,-26 0 0,0 0 0</inkml:trace>
-</inkml:ink>
-</file>
-
-<file path=ppt/ink/ink85.xml><?xml version="1.0" encoding="utf-8"?>
-<inkml:ink xmlns:inkml="http://www.w3.org/2003/InkML">
-  <inkml:definitions>
-    <inkml:context xml:id="ctx0">
-      <inkml:inkSource xml:id="inkSrc0">
-        <inkml:traceFormat>
-          <inkml:channel name="X" type="integer" min="-2.14748E9" max="2.14748E9" units="cm"/>
-          <inkml:channel name="Y" type="integer" min="-2.14748E9" max="2.14748E9" units="cm"/>
-          <inkml:channel name="F" type="integer" max="32767" units="dev"/>
-        </inkml:traceFormat>
-        <inkml:channelProperties>
-          <inkml:channelProperty channel="X" name="resolution" value="1000" units="1/cm"/>
-          <inkml:channelProperty channel="Y" name="resolution" value="1000" units="1/cm"/>
-          <inkml:channelProperty channel="F" name="resolution" value="0" units="1/dev"/>
-        </inkml:channelProperties>
-      </inkml:inkSource>
-      <inkml:timestamp xml:id="ts0" timeString="2022-09-11T15:12:28.529"/>
-    </inkml:context>
-    <inkml:brush xml:id="br0">
-      <inkml:brushProperty name="width" value="0.1" units="cm"/>
-      <inkml:brushProperty name="height" value="0.1" units="cm"/>
-    </inkml:brush>
-  </inkml:definitions>
-  <inkml:trace contextRef="#ctx0" brushRef="#br0">0 6 24575,'29'-3'0,"8"0"0,6 3 0,-4 0 0,6 0 0,-3 0 0,2 0 0,10 5 0,2 1 0,5 1 0,14 2 0,-1 2 0,-16 0 0,12 0 0,-1 0 0,-16-4 0,36 5 0,-67-12 0,-2 0 0,-10 3 0,1 1 0,3 4 0,1-4 0,-4 2 0,3-5 0,-7 2 0,4-3 0,-5 0 0,1 3 0,-1-3 0,1 3 0,-1 0 0,1 1 0,3-1 0,1 4 0,0-6 0,3 5 0,-7-5 0,4 5 0,-5-5 0,1 2 0,0-3 0,-1 0 0,1 0 0,-1 3 0,1-3 0,-1 6 0,1-5 0,0 2 0,-1-3 0,1 0 0,-1 0 0,0 0 0,0 0 0,-2 0 0,-1 0 0</inkml:trace>
-</inkml:ink>
-</file>
-
-<file path=ppt/ink/ink86.xml><?xml version="1.0" encoding="utf-8"?>
-<inkml:ink xmlns:inkml="http://www.w3.org/2003/InkML">
-  <inkml:definitions>
-    <inkml:context xml:id="ctx0">
-      <inkml:inkSource xml:id="inkSrc0">
-        <inkml:traceFormat>
-          <inkml:channel name="X" type="integer" min="-2.14748E9" max="2.14748E9" units="cm"/>
-          <inkml:channel name="Y" type="integer" min="-2.14748E9" max="2.14748E9" units="cm"/>
-          <inkml:channel name="F" type="integer" max="32767" units="dev"/>
-        </inkml:traceFormat>
-        <inkml:channelProperties>
-          <inkml:channelProperty channel="X" name="resolution" value="1000" units="1/cm"/>
-          <inkml:channelProperty channel="Y" name="resolution" value="1000" units="1/cm"/>
-          <inkml:channelProperty channel="F" name="resolution" value="0" units="1/dev"/>
-        </inkml:channelProperties>
-      </inkml:inkSource>
-      <inkml:timestamp xml:id="ts0" timeString="2022-09-11T15:12:30.464"/>
-    </inkml:context>
-    <inkml:brush xml:id="br0">
-      <inkml:brushProperty name="width" value="0.1" units="cm"/>
-      <inkml:brushProperty name="height" value="0.1" units="cm"/>
-    </inkml:brush>
-  </inkml:definitions>
-  <inkml:trace contextRef="#ctx0" brushRef="#br0">1 1 24575,'25'0'0,"8"0"0,9 0 0,0 0 0,4 0 0,9 0 0,-5 0 0,42 0 0,-43 4 0,6-3 0,-1 2 0,-15 6 0,37 4 0,-18 1 0,-5 1 0,5-2 0,-3 0 0,-26-4 0,15 3 0,-24-4 0,6 0 0,-6-1 0,20 1 0,-17-4 0,22 3 0,-27-6 0,20 5 0,-24-5 0,29 9 0,-27-8 0,32 8 0,-30-10 0,12 4 0,-18-4 0,0 0 0,-8 2 0,1-1 0,-1 2 0,2 0 0,1-2 0,0 1 0,-1 1 0,1-2 0,-1 2 0,1-3 0,-1 0 0,-2 3 0,1-2 0,-1 2 0,3 0 0,-1-3 0,1 6 0,-1-5 0,0 2 0,1-3 0,-1 0 0,1 0 0,3 0 0,-3 0 0,4 0 0,-5 0 0,1 0 0,-1 0 0,1 0 0,-1 0 0,-2 0 0,-1 0 0</inkml:trace>
-</inkml:ink>
-</file>
-
-<file path=ppt/ink/ink87.xml><?xml version="1.0" encoding="utf-8"?>
-<inkml:ink xmlns:inkml="http://www.w3.org/2003/InkML">
-  <inkml:definitions>
-    <inkml:context xml:id="ctx0">
-      <inkml:inkSource xml:id="inkSrc0">
-        <inkml:traceFormat>
-          <inkml:channel name="X" type="integer" min="-2.14748E9" max="2.14748E9" units="cm"/>
-          <inkml:channel name="Y" type="integer" min="-2.14748E9" max="2.14748E9" units="cm"/>
-          <inkml:channel name="F" type="integer" max="32767" units="dev"/>
-        </inkml:traceFormat>
-        <inkml:channelProperties>
-          <inkml:channelProperty channel="X" name="resolution" value="1000" units="1/cm"/>
-          <inkml:channelProperty channel="Y" name="resolution" value="1000" units="1/cm"/>
-          <inkml:channelProperty channel="F" name="resolution" value="0" units="1/dev"/>
-        </inkml:channelProperties>
-      </inkml:inkSource>
-      <inkml:timestamp xml:id="ts0" timeString="2022-09-11T15:12:32.239"/>
-    </inkml:context>
-    <inkml:brush xml:id="br0">
-      <inkml:brushProperty name="width" value="0.1" units="cm"/>
-      <inkml:brushProperty name="height" value="0.1" units="cm"/>
-    </inkml:brush>
-  </inkml:definitions>
-  <inkml:trace contextRef="#ctx0" brushRef="#br0">1 0 24575,'25'0'0,"-2"0"0,29 0 0,-12 0 0,27 0 0,-12 0 0,0 0 0,40 0 0,-37 0 0,3 0 0,-2 0 0,-9 0 0,22 0 0,-36 0 0,0 0 0,-9 0 0,12 0 0,-20 0 0,14 0 0,-13 0 0,15 0 0,-8 0 0,44 0 0,-33 0 0,23 0 0,-32 0 0,8 0 0,-17 0 0,20 0 0,-27 0 0,18 0 0,-15 0 0,15 0 0,-17 0 0,8 0 0,-14 0 0,4 3 0,-5-2 0,16 8 0,-13-7 0,9 4 0,-12-6 0,6 0 0,-8 0 0,4 0 0</inkml:trace>
-</inkml:ink>
-</file>
-
-<file path=ppt/ink/ink88.xml><?xml version="1.0" encoding="utf-8"?>
-<inkml:ink xmlns:inkml="http://www.w3.org/2003/InkML">
-  <inkml:definitions>
-    <inkml:context xml:id="ctx0">
-      <inkml:inkSource xml:id="inkSrc0">
-        <inkml:traceFormat>
-          <inkml:channel name="X" type="integer" min="-2.14748E9" max="2.14748E9" units="cm"/>
-          <inkml:channel name="Y" type="integer" min="-2.14748E9" max="2.14748E9" units="cm"/>
-          <inkml:channel name="F" type="integer" max="32767" units="dev"/>
-        </inkml:traceFormat>
-        <inkml:channelProperties>
-          <inkml:channelProperty channel="X" name="resolution" value="1000" units="1/cm"/>
-          <inkml:channelProperty channel="Y" name="resolution" value="1000" units="1/cm"/>
-          <inkml:channelProperty channel="F" name="resolution" value="0" units="1/dev"/>
-        </inkml:channelProperties>
-      </inkml:inkSource>
-      <inkml:timestamp xml:id="ts0" timeString="2022-09-11T15:12:34.352"/>
-    </inkml:context>
-    <inkml:brush xml:id="br0">
-      <inkml:brushProperty name="width" value="0.1" units="cm"/>
-      <inkml:brushProperty name="height" value="0.1" units="cm"/>
-    </inkml:brush>
-  </inkml:definitions>
-  <inkml:trace contextRef="#ctx0" brushRef="#br0">0 2 24575,'28'4'0,"3"-1"0,17-3 0,5 0 0,-4 0 0,10 0 0,17 0 0,12 0 0,-7 0 0,-25 0 0,-1 0 0,17 0 0,10 0 0,-20 0 0,-26 0 0,4 0 0,1 0 0,-4 0 0,9-4 0,-9 3 0,-1-3 0,-7 4 0,17 0 0,-21 0 0,19 0 0,-28 0 0,16 0 0,-18 0 0,13 0 0,-13 0 0,2 0 0,1 0 0,1 0 0,-3 0 0,-1 0 0,0 0 0,-3 0 0,-1 0 0,6 0 0,-8 0 0,5 0 0,-7 0 0,7 0 0,-5 0 0,4 0 0,-8 0 0,-1 0 0</inkml:trace>
-</inkml:ink>
-</file>
-
-<file path=ppt/ink/ink89.xml><?xml version="1.0" encoding="utf-8"?>
-<inkml:ink xmlns:inkml="http://www.w3.org/2003/InkML">
-  <inkml:definitions>
-    <inkml:context xml:id="ctx0">
-      <inkml:inkSource xml:id="inkSrc0">
-        <inkml:traceFormat>
-          <inkml:channel name="X" type="integer" min="-2.14748E9" max="2.14748E9" units="cm"/>
-          <inkml:channel name="Y" type="integer" min="-2.14748E9" max="2.14748E9" units="cm"/>
-          <inkml:channel name="F" type="integer" max="32767" units="dev"/>
-        </inkml:traceFormat>
-        <inkml:channelProperties>
-          <inkml:channelProperty channel="X" name="resolution" value="1000" units="1/cm"/>
-          <inkml:channelProperty channel="Y" name="resolution" value="1000" units="1/cm"/>
-          <inkml:channelProperty channel="F" name="resolution" value="0" units="1/dev"/>
-        </inkml:channelProperties>
-      </inkml:inkSource>
-      <inkml:timestamp xml:id="ts0" timeString="2022-09-11T15:12:36.101"/>
-    </inkml:context>
-    <inkml:brush xml:id="br0">
-      <inkml:brushProperty name="width" value="0.1" units="cm"/>
-      <inkml:brushProperty name="height" value="0.1" units="cm"/>
-    </inkml:brush>
-  </inkml:definitions>
-  <inkml:trace contextRef="#ctx0" brushRef="#br0">0 528 24575,'33'-8'0,"-1"-1"0,9-10 0,1 1 0,11-6 0,-4 4 0,41-16 0,-39 15 0,3-1 0,1 2 0,-6 0 0,14-8 0,-28 15 0,0-2 0,-8 2 0,27-9 0,-29 8 0,26-6 0,-33 15 0,10-5 0,-14 9 0,11-9 0,-8 5 0,3-2 0,-10 1 0,10 2 0,-4-3 0,13 3 0,-6-3 0,12-1 0,-8 3 0,19-10 0,-20 10 0,22-10 0,-24 10 0,4-4 0,-18 8 0,3-5 0,-6 5 0,3-4 0,-5 4 0,-1-2 0,-1 0 0,3 3 0,-2-6 0,2 5 0,1-2 0,-3 0 0,1 2 0,-4-4 0,2-3 0,-3 4 0,0-3 0</inkml:trace>
 </inkml:ink>
 </file>
 
@@ -3981,6 +4171,195 @@
           <inkml:channelProperty channel="F" name="resolution" value="0" units="1/dev"/>
         </inkml:channelProperties>
       </inkml:inkSource>
+      <inkml:timestamp xml:id="ts0" timeString="2022-09-11T15:12:25.189"/>
+    </inkml:context>
+    <inkml:brush xml:id="br0">
+      <inkml:brushProperty name="width" value="0.1" units="cm"/>
+      <inkml:brushProperty name="height" value="0.1" units="cm"/>
+    </inkml:brush>
+  </inkml:definitions>
+  <inkml:trace contextRef="#ctx0" brushRef="#br0">0 0 24575,'38'0'0,"1"0"0,15 0 0,-5 0 0,4 9 0,-10 5 0,4 8 0,1 3 0,9 14 0,7 1 0,-3 1 0,-18-1 0,20 11 0,-35-20 0,-10-13 0,4 5 0,-9-7 0,-5-11 0,4 7 0,-5-11 0,-1 4 0,1-1 0,7 3 0,-2 0 0,7 1 0,0 0 0,-3-1 0,3 1 0,-5 2 0,1-2 0,-4 3 0,-1-4 0,-3-1 0,0 1 0,-1-1 0,1-2 0,-1 2 0,1-5 0,0 5 0,-1-3 0,1 1 0,3 2 0,-2-2 0,2 0 0,-4 2 0,1-5 0,0 4 0,-1-4 0,1 2 0,0-3 0,-1 0 0,1 3 0,-1-2 0,-2 5 0,1-6 0,-1 3 0,-1 0 0,3-2 0,-3 2 0,4-3 0,-1 0 0,1 0 0,-1 0 0,0 0 0,-2 0 0,-1 0 0</inkml:trace>
+</inkml:ink>
+</file>
+
+<file path=ppt/ink/ink91.xml><?xml version="1.0" encoding="utf-8"?>
+<inkml:ink xmlns:inkml="http://www.w3.org/2003/InkML">
+  <inkml:definitions>
+    <inkml:context xml:id="ctx0">
+      <inkml:inkSource xml:id="inkSrc0">
+        <inkml:traceFormat>
+          <inkml:channel name="X" type="integer" min="-2.14748E9" max="2.14748E9" units="cm"/>
+          <inkml:channel name="Y" type="integer" min="-2.14748E9" max="2.14748E9" units="cm"/>
+          <inkml:channel name="F" type="integer" max="32767" units="dev"/>
+        </inkml:traceFormat>
+        <inkml:channelProperties>
+          <inkml:channelProperty channel="X" name="resolution" value="1000" units="1/cm"/>
+          <inkml:channelProperty channel="Y" name="resolution" value="1000" units="1/cm"/>
+          <inkml:channelProperty channel="F" name="resolution" value="0" units="1/dev"/>
+        </inkml:channelProperties>
+      </inkml:inkSource>
+      <inkml:timestamp xml:id="ts0" timeString="2022-09-11T15:12:26.812"/>
+    </inkml:context>
+    <inkml:brush xml:id="br0">
+      <inkml:brushProperty name="width" value="0.1" units="cm"/>
+      <inkml:brushProperty name="height" value="0.1" units="cm"/>
+    </inkml:brush>
+  </inkml:definitions>
+  <inkml:trace contextRef="#ctx0" brushRef="#br0">1 0 24575,'28'0'0,"8"0"0,19 10 0,8 2 0,7 5 0,-2 2 0,-2 8 0,-9-4 0,3 17 0,-21-15 0,3 8 0,-19-7 0,7 1 0,-8-2 0,4 2 0,-4-10 0,3 8 0,-5-12 0,1 4 0,-3-3 0,-3-6 0,0 3 0,-4-1 0,3-1 0,-6 1 0,6 0 0,-7-2 0,7 2 0,-3-3 0,0 4 0,3-3 0,3 8 0,-5-10 0,4 3 0,-13-7 0,3-1 0,-2 2 0,8 0 0,-4 0 0,18 4 0,-13 0 0,27 1 0,-21-4 0,25-1 0,-22-3 0,24 0 0,-23 0 0,12 0 0,-26 0 0,0 0 0</inkml:trace>
+</inkml:ink>
+</file>
+
+<file path=ppt/ink/ink92.xml><?xml version="1.0" encoding="utf-8"?>
+<inkml:ink xmlns:inkml="http://www.w3.org/2003/InkML">
+  <inkml:definitions>
+    <inkml:context xml:id="ctx0">
+      <inkml:inkSource xml:id="inkSrc0">
+        <inkml:traceFormat>
+          <inkml:channel name="X" type="integer" min="-2.14748E9" max="2.14748E9" units="cm"/>
+          <inkml:channel name="Y" type="integer" min="-2.14748E9" max="2.14748E9" units="cm"/>
+          <inkml:channel name="F" type="integer" max="32767" units="dev"/>
+        </inkml:traceFormat>
+        <inkml:channelProperties>
+          <inkml:channelProperty channel="X" name="resolution" value="1000" units="1/cm"/>
+          <inkml:channelProperty channel="Y" name="resolution" value="1000" units="1/cm"/>
+          <inkml:channelProperty channel="F" name="resolution" value="0" units="1/dev"/>
+        </inkml:channelProperties>
+      </inkml:inkSource>
+      <inkml:timestamp xml:id="ts0" timeString="2022-09-11T15:12:28.529"/>
+    </inkml:context>
+    <inkml:brush xml:id="br0">
+      <inkml:brushProperty name="width" value="0.1" units="cm"/>
+      <inkml:brushProperty name="height" value="0.1" units="cm"/>
+    </inkml:brush>
+  </inkml:definitions>
+  <inkml:trace contextRef="#ctx0" brushRef="#br0">0 6 24575,'29'-3'0,"8"0"0,6 3 0,-4 0 0,6 0 0,-3 0 0,2 0 0,10 5 0,2 1 0,5 1 0,14 2 0,-1 2 0,-16 0 0,12 0 0,-1 0 0,-16-4 0,36 5 0,-67-12 0,-2 0 0,-10 3 0,1 1 0,3 4 0,1-4 0,-4 2 0,3-5 0,-7 2 0,4-3 0,-5 0 0,1 3 0,-1-3 0,1 3 0,-1 0 0,1 1 0,3-1 0,1 4 0,0-6 0,3 5 0,-7-5 0,4 5 0,-5-5 0,1 2 0,0-3 0,-1 0 0,1 0 0,-1 3 0,1-3 0,-1 6 0,1-5 0,0 2 0,-1-3 0,1 0 0,-1 0 0,0 0 0,0 0 0,-2 0 0,-1 0 0</inkml:trace>
+</inkml:ink>
+</file>
+
+<file path=ppt/ink/ink93.xml><?xml version="1.0" encoding="utf-8"?>
+<inkml:ink xmlns:inkml="http://www.w3.org/2003/InkML">
+  <inkml:definitions>
+    <inkml:context xml:id="ctx0">
+      <inkml:inkSource xml:id="inkSrc0">
+        <inkml:traceFormat>
+          <inkml:channel name="X" type="integer" min="-2.14748E9" max="2.14748E9" units="cm"/>
+          <inkml:channel name="Y" type="integer" min="-2.14748E9" max="2.14748E9" units="cm"/>
+          <inkml:channel name="F" type="integer" max="32767" units="dev"/>
+        </inkml:traceFormat>
+        <inkml:channelProperties>
+          <inkml:channelProperty channel="X" name="resolution" value="1000" units="1/cm"/>
+          <inkml:channelProperty channel="Y" name="resolution" value="1000" units="1/cm"/>
+          <inkml:channelProperty channel="F" name="resolution" value="0" units="1/dev"/>
+        </inkml:channelProperties>
+      </inkml:inkSource>
+      <inkml:timestamp xml:id="ts0" timeString="2022-09-11T15:12:30.464"/>
+    </inkml:context>
+    <inkml:brush xml:id="br0">
+      <inkml:brushProperty name="width" value="0.1" units="cm"/>
+      <inkml:brushProperty name="height" value="0.1" units="cm"/>
+    </inkml:brush>
+  </inkml:definitions>
+  <inkml:trace contextRef="#ctx0" brushRef="#br0">1 1 24575,'25'0'0,"8"0"0,9 0 0,0 0 0,4 0 0,9 0 0,-5 0 0,42 0 0,-43 4 0,6-3 0,-1 2 0,-15 6 0,37 4 0,-18 1 0,-5 1 0,5-2 0,-3 0 0,-26-4 0,15 3 0,-24-4 0,6 0 0,-6-1 0,20 1 0,-17-4 0,22 3 0,-27-6 0,20 5 0,-24-5 0,29 9 0,-27-8 0,32 8 0,-30-10 0,12 4 0,-18-4 0,0 0 0,-8 2 0,1-1 0,-1 2 0,2 0 0,1-2 0,0 1 0,-1 1 0,1-2 0,-1 2 0,1-3 0,-1 0 0,-2 3 0,1-2 0,-1 2 0,3 0 0,-1-3 0,1 6 0,-1-5 0,0 2 0,1-3 0,-1 0 0,1 0 0,3 0 0,-3 0 0,4 0 0,-5 0 0,1 0 0,-1 0 0,1 0 0,-1 0 0,-2 0 0,-1 0 0</inkml:trace>
+</inkml:ink>
+</file>
+
+<file path=ppt/ink/ink94.xml><?xml version="1.0" encoding="utf-8"?>
+<inkml:ink xmlns:inkml="http://www.w3.org/2003/InkML">
+  <inkml:definitions>
+    <inkml:context xml:id="ctx0">
+      <inkml:inkSource xml:id="inkSrc0">
+        <inkml:traceFormat>
+          <inkml:channel name="X" type="integer" min="-2.14748E9" max="2.14748E9" units="cm"/>
+          <inkml:channel name="Y" type="integer" min="-2.14748E9" max="2.14748E9" units="cm"/>
+          <inkml:channel name="F" type="integer" max="32767" units="dev"/>
+        </inkml:traceFormat>
+        <inkml:channelProperties>
+          <inkml:channelProperty channel="X" name="resolution" value="1000" units="1/cm"/>
+          <inkml:channelProperty channel="Y" name="resolution" value="1000" units="1/cm"/>
+          <inkml:channelProperty channel="F" name="resolution" value="0" units="1/dev"/>
+        </inkml:channelProperties>
+      </inkml:inkSource>
+      <inkml:timestamp xml:id="ts0" timeString="2022-09-11T15:12:32.239"/>
+    </inkml:context>
+    <inkml:brush xml:id="br0">
+      <inkml:brushProperty name="width" value="0.1" units="cm"/>
+      <inkml:brushProperty name="height" value="0.1" units="cm"/>
+    </inkml:brush>
+  </inkml:definitions>
+  <inkml:trace contextRef="#ctx0" brushRef="#br0">1 0 24575,'25'0'0,"-2"0"0,29 0 0,-12 0 0,27 0 0,-12 0 0,0 0 0,40 0 0,-37 0 0,3 0 0,-2 0 0,-9 0 0,22 0 0,-36 0 0,0 0 0,-9 0 0,12 0 0,-20 0 0,14 0 0,-13 0 0,15 0 0,-8 0 0,44 0 0,-33 0 0,23 0 0,-32 0 0,8 0 0,-17 0 0,20 0 0,-27 0 0,18 0 0,-15 0 0,15 0 0,-17 0 0,8 0 0,-14 0 0,4 3 0,-5-2 0,16 8 0,-13-7 0,9 4 0,-12-6 0,6 0 0,-8 0 0,4 0 0</inkml:trace>
+</inkml:ink>
+</file>
+
+<file path=ppt/ink/ink95.xml><?xml version="1.0" encoding="utf-8"?>
+<inkml:ink xmlns:inkml="http://www.w3.org/2003/InkML">
+  <inkml:definitions>
+    <inkml:context xml:id="ctx0">
+      <inkml:inkSource xml:id="inkSrc0">
+        <inkml:traceFormat>
+          <inkml:channel name="X" type="integer" min="-2.14748E9" max="2.14748E9" units="cm"/>
+          <inkml:channel name="Y" type="integer" min="-2.14748E9" max="2.14748E9" units="cm"/>
+          <inkml:channel name="F" type="integer" max="32767" units="dev"/>
+        </inkml:traceFormat>
+        <inkml:channelProperties>
+          <inkml:channelProperty channel="X" name="resolution" value="1000" units="1/cm"/>
+          <inkml:channelProperty channel="Y" name="resolution" value="1000" units="1/cm"/>
+          <inkml:channelProperty channel="F" name="resolution" value="0" units="1/dev"/>
+        </inkml:channelProperties>
+      </inkml:inkSource>
+      <inkml:timestamp xml:id="ts0" timeString="2022-09-11T15:12:34.352"/>
+    </inkml:context>
+    <inkml:brush xml:id="br0">
+      <inkml:brushProperty name="width" value="0.1" units="cm"/>
+      <inkml:brushProperty name="height" value="0.1" units="cm"/>
+    </inkml:brush>
+  </inkml:definitions>
+  <inkml:trace contextRef="#ctx0" brushRef="#br0">0 2 24575,'28'4'0,"3"-1"0,17-3 0,5 0 0,-4 0 0,10 0 0,17 0 0,12 0 0,-7 0 0,-25 0 0,-1 0 0,17 0 0,10 0 0,-20 0 0,-26 0 0,4 0 0,1 0 0,-4 0 0,9-4 0,-9 3 0,-1-3 0,-7 4 0,17 0 0,-21 0 0,19 0 0,-28 0 0,16 0 0,-18 0 0,13 0 0,-13 0 0,2 0 0,1 0 0,1 0 0,-3 0 0,-1 0 0,0 0 0,-3 0 0,-1 0 0,6 0 0,-8 0 0,5 0 0,-7 0 0,7 0 0,-5 0 0,4 0 0,-8 0 0,-1 0 0</inkml:trace>
+</inkml:ink>
+</file>
+
+<file path=ppt/ink/ink96.xml><?xml version="1.0" encoding="utf-8"?>
+<inkml:ink xmlns:inkml="http://www.w3.org/2003/InkML">
+  <inkml:definitions>
+    <inkml:context xml:id="ctx0">
+      <inkml:inkSource xml:id="inkSrc0">
+        <inkml:traceFormat>
+          <inkml:channel name="X" type="integer" min="-2.14748E9" max="2.14748E9" units="cm"/>
+          <inkml:channel name="Y" type="integer" min="-2.14748E9" max="2.14748E9" units="cm"/>
+          <inkml:channel name="F" type="integer" max="32767" units="dev"/>
+        </inkml:traceFormat>
+        <inkml:channelProperties>
+          <inkml:channelProperty channel="X" name="resolution" value="1000" units="1/cm"/>
+          <inkml:channelProperty channel="Y" name="resolution" value="1000" units="1/cm"/>
+          <inkml:channelProperty channel="F" name="resolution" value="0" units="1/dev"/>
+        </inkml:channelProperties>
+      </inkml:inkSource>
+      <inkml:timestamp xml:id="ts0" timeString="2022-09-11T15:12:36.101"/>
+    </inkml:context>
+    <inkml:brush xml:id="br0">
+      <inkml:brushProperty name="width" value="0.1" units="cm"/>
+      <inkml:brushProperty name="height" value="0.1" units="cm"/>
+    </inkml:brush>
+  </inkml:definitions>
+  <inkml:trace contextRef="#ctx0" brushRef="#br0">0 528 24575,'33'-8'0,"-1"-1"0,9-10 0,1 1 0,11-6 0,-4 4 0,41-16 0,-39 15 0,3-1 0,1 2 0,-6 0 0,14-8 0,-28 15 0,0-2 0,-8 2 0,27-9 0,-29 8 0,26-6 0,-33 15 0,10-5 0,-14 9 0,11-9 0,-8 5 0,3-2 0,-10 1 0,10 2 0,-4-3 0,13 3 0,-6-3 0,12-1 0,-8 3 0,19-10 0,-20 10 0,22-10 0,-24 10 0,4-4 0,-18 8 0,3-5 0,-6 5 0,3-4 0,-5 4 0,-1-2 0,-1 0 0,3 3 0,-2-6 0,2 5 0,1-2 0,-3 0 0,1 2 0,-4-4 0,2-3 0,-3 4 0,0-3 0</inkml:trace>
+</inkml:ink>
+</file>
+
+<file path=ppt/ink/ink97.xml><?xml version="1.0" encoding="utf-8"?>
+<inkml:ink xmlns:inkml="http://www.w3.org/2003/InkML">
+  <inkml:definitions>
+    <inkml:context xml:id="ctx0">
+      <inkml:inkSource xml:id="inkSrc0">
+        <inkml:traceFormat>
+          <inkml:channel name="X" type="integer" min="-2.14748E9" max="2.14748E9" units="cm"/>
+          <inkml:channel name="Y" type="integer" min="-2.14748E9" max="2.14748E9" units="cm"/>
+          <inkml:channel name="F" type="integer" max="32767" units="dev"/>
+        </inkml:traceFormat>
+        <inkml:channelProperties>
+          <inkml:channelProperty channel="X" name="resolution" value="1000" units="1/cm"/>
+          <inkml:channelProperty channel="Y" name="resolution" value="1000" units="1/cm"/>
+          <inkml:channelProperty channel="F" name="resolution" value="0" units="1/dev"/>
+        </inkml:channelProperties>
+      </inkml:inkSource>
       <inkml:timestamp xml:id="ts0" timeString="2022-09-11T15:12:38.061"/>
     </inkml:context>
     <inkml:brush xml:id="br0">
@@ -3992,7 +4371,7 @@
 </inkml:ink>
 </file>
 
-<file path=ppt/ink/ink91.xml><?xml version="1.0" encoding="utf-8"?>
+<file path=ppt/ink/ink98.xml><?xml version="1.0" encoding="utf-8"?>
 <inkml:ink xmlns:inkml="http://www.w3.org/2003/InkML">
   <inkml:definitions>
     <inkml:context xml:id="ctx0">
@@ -4019,7 +4398,7 @@
 </inkml:ink>
 </file>
 
-<file path=ppt/ink/ink92.xml><?xml version="1.0" encoding="utf-8"?>
+<file path=ppt/ink/ink99.xml><?xml version="1.0" encoding="utf-8"?>
 <inkml:ink xmlns:inkml="http://www.w3.org/2003/InkML">
   <inkml:definitions>
     <inkml:context xml:id="ctx0">
@@ -4043,195 +4422,6 @@
     </inkml:brush>
   </inkml:definitions>
   <inkml:trace contextRef="#ctx0" brushRef="#br0">1 1110 24575,'0'-20'0,"12"-12"0,19-39 0,1 15 0,-7 11 0,-1 1 0,1 5 0,4-6 0,1-1 0,-6 5 0,11-10 0,-2 0 0,-15 15 0,18-17 0,-19 28 0,15-32 0,-9 28 0,9-32 0,-20 47 0,5-18 0,-10 18 0,10-27 0,-8 22 0,6-13 0,-8 21 0,3-2 0,-6 5 0,8-7 0,-8 4 0,6-2 0,-3-1 0,0 3 0,0 0 0,0 0 0,-3 5 0,-1-3 0,-3 2 0,2 1 0,-1 1 0,2 4 0,-3-2 0</inkml:trace>
-</inkml:ink>
-</file>
-
-<file path=ppt/ink/ink93.xml><?xml version="1.0" encoding="utf-8"?>
-<inkml:ink xmlns:inkml="http://www.w3.org/2003/InkML">
-  <inkml:definitions>
-    <inkml:context xml:id="ctx0">
-      <inkml:inkSource xml:id="inkSrc0">
-        <inkml:traceFormat>
-          <inkml:channel name="X" type="integer" min="-2.14748E9" max="2.14748E9" units="cm"/>
-          <inkml:channel name="Y" type="integer" min="-2.14748E9" max="2.14748E9" units="cm"/>
-          <inkml:channel name="F" type="integer" max="32767" units="dev"/>
-        </inkml:traceFormat>
-        <inkml:channelProperties>
-          <inkml:channelProperty channel="X" name="resolution" value="1000" units="1/cm"/>
-          <inkml:channelProperty channel="Y" name="resolution" value="1000" units="1/cm"/>
-          <inkml:channelProperty channel="F" name="resolution" value="0" units="1/dev"/>
-        </inkml:channelProperties>
-      </inkml:inkSource>
-      <inkml:timestamp xml:id="ts0" timeString="2022-09-11T15:12:44.180"/>
-    </inkml:context>
-    <inkml:brush xml:id="br0">
-      <inkml:brushProperty name="width" value="0.1" units="cm"/>
-      <inkml:brushProperty name="height" value="0.1" units="cm"/>
-    </inkml:brush>
-  </inkml:definitions>
-  <inkml:trace contextRef="#ctx0" brushRef="#br0">0 1223 24575,'0'-13'0,"0"-7"0,0-1 0,0-9 0,0 4 0,0-2 0,0 2 0,0 0 0,0 0 0,0 7 0,4-5 0,-3 3 0,26-40 0,-13 18 0,12-12 0,1-1 0,-4 4 0,16-36 0,-25 56 0,2-3 0,-5 15 0,1-9 0,-1 7 0,0-4 0,-3 7 0,3-9 0,-3 14 0,-1-13 0,-1 19 0,-2-11 0,3 0 0,0-4 0,0 2 0,7 1 0,-9 7 0,7-6 0,-8 12 0,2-2 0,1-1 0,6-14 0,-8 6 0,8-8 0,-12 15 0,4 5 0,-1 3 0,-1 0 0,0-1 0,0 1 0,-3-3 0,3 2 0,0-3 0,-2 1 0,2-1 0,0 1 0,-2-1 0,2 0 0,0 4 0,-3-3 0,3 2 0,-3 1 0,0 0 0</inkml:trace>
-</inkml:ink>
-</file>
-
-<file path=ppt/ink/ink94.xml><?xml version="1.0" encoding="utf-8"?>
-<inkml:ink xmlns:inkml="http://www.w3.org/2003/InkML">
-  <inkml:definitions>
-    <inkml:context xml:id="ctx0">
-      <inkml:inkSource xml:id="inkSrc0">
-        <inkml:traceFormat>
-          <inkml:channel name="X" type="integer" min="-2.14748E9" max="2.14748E9" units="cm"/>
-          <inkml:channel name="Y" type="integer" min="-2.14748E9" max="2.14748E9" units="cm"/>
-          <inkml:channel name="F" type="integer" max="32767" units="dev"/>
-        </inkml:traceFormat>
-        <inkml:channelProperties>
-          <inkml:channelProperty channel="X" name="resolution" value="1000" units="1/cm"/>
-          <inkml:channelProperty channel="Y" name="resolution" value="1000" units="1/cm"/>
-          <inkml:channelProperty channel="F" name="resolution" value="0" units="1/dev"/>
-        </inkml:channelProperties>
-      </inkml:inkSource>
-      <inkml:timestamp xml:id="ts0" timeString="2022-09-11T15:12:55.167"/>
-    </inkml:context>
-    <inkml:brush xml:id="br0">
-      <inkml:brushProperty name="width" value="0.1" units="cm"/>
-      <inkml:brushProperty name="height" value="0.1" units="cm"/>
-    </inkml:brush>
-  </inkml:definitions>
-  <inkml:trace contextRef="#ctx0" brushRef="#br0">0 1 24575,'7'13'0,"0"1"0,4 1 0,-3-1 0,6 1 0,-6 0 0,10 14 0,-6-10 0,4 14 0,-5-13 0,4 16 0,-5-13 0,22 49 0,-16-43 0,25 55 0,-22-55 0,15 44 0,-16-42 0,2 19 0,-8-26 0,-4 0 0,3-4 0,-3-1 0,6-4 0,4 13 0,-2-4 0,2 2 0,-7-6 0,-1-2 0,-2-2 0,3 5 0,-4-10 0,0 10 0,0-12 0,3 18 0,-5-18 0,8 17 0,-9-16 0,7 10 0,-8-13 0,4 13 0,-3-11 0,0 7 0,1-6 0,-1-3 0,2 2 0,1 8 0,0-8 0,-3 11 0,2-13 0,-5 6 0,2-6 0,-3 2 0,0-3 0,0 0 0,0 0 0,0 1 0,0-1 0,0 0 0,0 0 0,0 0 0,0 0 0,0 0 0,0 0 0,0 1 0,0-1 0,0-3 0,0 0 0</inkml:trace>
-</inkml:ink>
-</file>
-
-<file path=ppt/ink/ink95.xml><?xml version="1.0" encoding="utf-8"?>
-<inkml:ink xmlns:inkml="http://www.w3.org/2003/InkML">
-  <inkml:definitions>
-    <inkml:context xml:id="ctx0">
-      <inkml:inkSource xml:id="inkSrc0">
-        <inkml:traceFormat>
-          <inkml:channel name="X" type="integer" min="-2.14748E9" max="2.14748E9" units="cm"/>
-          <inkml:channel name="Y" type="integer" min="-2.14748E9" max="2.14748E9" units="cm"/>
-          <inkml:channel name="F" type="integer" max="32767" units="dev"/>
-        </inkml:traceFormat>
-        <inkml:channelProperties>
-          <inkml:channelProperty channel="X" name="resolution" value="1000" units="1/cm"/>
-          <inkml:channelProperty channel="Y" name="resolution" value="1000" units="1/cm"/>
-          <inkml:channelProperty channel="F" name="resolution" value="0" units="1/dev"/>
-        </inkml:channelProperties>
-      </inkml:inkSource>
-      <inkml:timestamp xml:id="ts0" timeString="2022-09-11T15:12:57.092"/>
-    </inkml:context>
-    <inkml:brush xml:id="br0">
-      <inkml:brushProperty name="width" value="0.1" units="cm"/>
-      <inkml:brushProperty name="height" value="0.1" units="cm"/>
-    </inkml:brush>
-  </inkml:definitions>
-  <inkml:trace contextRef="#ctx0" brushRef="#br0">1 0 24575,'13'0'0,"8"17"0,-1-5 0,4 17 0,-1-12 0,-6 7 0,11-7 0,18 31 0,-5-19 0,10 20 0,-19-16 0,5 1 0,-1 6 0,-2-10 0,-11 0 0,-3-8 0,-6-1 0,18 7 0,-15-7 0,26 15 0,-27-17 0,28 18 0,-33-27 0,26 20 0,-27-21 0,15 8 0,-19-10 0,5-4 0,-10 3 0,4-5 0,-1 5 0,9 0 0,-5-1 0,10 7 0,-10-8 0,4 2 0,-6-3 0,-2 0 0,1-2 0,-4 4 0,5-4 0,-5 5 0,4-6 0,-1 6 0,2-5 0,1 2 0,-4 0 0,3-3 0,-2 6 0,2-5 0,-2 5 0,2-5 0,-3 2 0,4-1 0,-1-1 0,1 5 0,-1-5 0,1 4 0,-3-4 0,-1 2 0</inkml:trace>
-</inkml:ink>
-</file>
-
-<file path=ppt/ink/ink96.xml><?xml version="1.0" encoding="utf-8"?>
-<inkml:ink xmlns:inkml="http://www.w3.org/2003/InkML">
-  <inkml:definitions>
-    <inkml:context xml:id="ctx0">
-      <inkml:inkSource xml:id="inkSrc0">
-        <inkml:traceFormat>
-          <inkml:channel name="X" type="integer" min="-2.14748E9" max="2.14748E9" units="cm"/>
-          <inkml:channel name="Y" type="integer" min="-2.14748E9" max="2.14748E9" units="cm"/>
-          <inkml:channel name="F" type="integer" max="32767" units="dev"/>
-        </inkml:traceFormat>
-        <inkml:channelProperties>
-          <inkml:channelProperty channel="X" name="resolution" value="1000" units="1/cm"/>
-          <inkml:channelProperty channel="Y" name="resolution" value="1000" units="1/cm"/>
-          <inkml:channelProperty channel="F" name="resolution" value="0" units="1/dev"/>
-        </inkml:channelProperties>
-      </inkml:inkSource>
-      <inkml:timestamp xml:id="ts0" timeString="2022-09-11T15:12:59.102"/>
-    </inkml:context>
-    <inkml:brush xml:id="br0">
-      <inkml:brushProperty name="width" value="0.1" units="cm"/>
-      <inkml:brushProperty name="height" value="0.1" units="cm"/>
-    </inkml:brush>
-  </inkml:definitions>
-  <inkml:trace contextRef="#ctx0" brushRef="#br0">0 0 24575,'15'4'0,"5"4"0,3 11 0,3-2 0,5 11 0,0-6 0,3 11 0,-7-9 0,5 7 0,-16-12 0,3 2 0,0-3 0,15 12 0,-7-7 0,6 7 0,-10-10 0,-8-9 0,4 4 0,-8-8 0,3 4 0,4 3 0,-2-6 0,16 10 0,-15-10 0,22 13 0,-25-12 0,13 8 0,-20-10 0,9 3 0,-8-6 0,5 5 0,-7-5 0,4 2 0,-3 1 0,6 3 0,-2-3 0,2 6 0,2-8 0,4 10 0,-2-10 0,3 8 0,-9-6 0,12 7 0,-9-6 0,6 6 0,-6-7 0,3 3 0,-1-2 0,7 2 0,-11-6 0,3 2 0,-7-6 0,4 6 0,-5-5 0,3 5 0,-1-3 0,-2 4 0,2-1 0,-2 0 0,-1 1 0,-2-4 0,-2 0 0</inkml:trace>
-</inkml:ink>
-</file>
-
-<file path=ppt/ink/ink97.xml><?xml version="1.0" encoding="utf-8"?>
-<inkml:ink xmlns:inkml="http://www.w3.org/2003/InkML">
-  <inkml:definitions>
-    <inkml:context xml:id="ctx0">
-      <inkml:inkSource xml:id="inkSrc0">
-        <inkml:traceFormat>
-          <inkml:channel name="X" type="integer" min="-2.14748E9" max="2.14748E9" units="cm"/>
-          <inkml:channel name="Y" type="integer" min="-2.14748E9" max="2.14748E9" units="cm"/>
-          <inkml:channel name="F" type="integer" max="32767" units="dev"/>
-        </inkml:traceFormat>
-        <inkml:channelProperties>
-          <inkml:channelProperty channel="X" name="resolution" value="1000" units="1/cm"/>
-          <inkml:channelProperty channel="Y" name="resolution" value="1000" units="1/cm"/>
-          <inkml:channelProperty channel="F" name="resolution" value="0" units="1/dev"/>
-        </inkml:channelProperties>
-      </inkml:inkSource>
-      <inkml:timestamp xml:id="ts0" timeString="2022-09-11T15:13:01.490"/>
-    </inkml:context>
-    <inkml:brush xml:id="br0">
-      <inkml:brushProperty name="width" value="0.1" units="cm"/>
-      <inkml:brushProperty name="height" value="0.1" units="cm"/>
-    </inkml:brush>
-  </inkml:definitions>
-  <inkml:trace contextRef="#ctx0" brushRef="#br0">0 1 24575,'28'0'0,"-7"0"0,43 9 0,-36-3 0,35 13 0,-36-6 0,46 23 0,-38-15 0,32 10 0,-43-17 0,3-2 0,-2-4 0,-6 5 0,0-8 0,-1 2 0,-4-1 0,0 1 0,-6 1 0,7 1 0,-10-2 0,8-4 0,-7 3 0,7-2 0,-5 3 0,10-1 0,-10-2 0,21 5 0,-15-7 0,26 10 0,-26-10 0,16 8 0,-22-7 0,12 4 0,-12-3 0,5 2 0,-6-5 0,6 7 0,-5-3 0,14 4 0,-13-2 0,13 0 0,-11-1 0,2 1 0,-4-3 0,1 1 0,-3-4 0,-1 5 0,0-6 0,-2 3 0,2-3 0,-2 3 0,1-2 0,-1 2 0,0 0 0,1-3 0,-1 3 0,2 0 0,0-2 0,-2 4 0,1-4 0,-1 2 0,2-3 0,1 3 0,0-3 0,-1 6 0,0-5 0,-2 1 0,-1-2 0</inkml:trace>
-</inkml:ink>
-</file>
-
-<file path=ppt/ink/ink98.xml><?xml version="1.0" encoding="utf-8"?>
-<inkml:ink xmlns:inkml="http://www.w3.org/2003/InkML">
-  <inkml:definitions>
-    <inkml:context xml:id="ctx0">
-      <inkml:inkSource xml:id="inkSrc0">
-        <inkml:traceFormat>
-          <inkml:channel name="X" type="integer" min="-2.14748E9" max="2.14748E9" units="cm"/>
-          <inkml:channel name="Y" type="integer" min="-2.14748E9" max="2.14748E9" units="cm"/>
-          <inkml:channel name="F" type="integer" max="32767" units="dev"/>
-        </inkml:traceFormat>
-        <inkml:channelProperties>
-          <inkml:channelProperty channel="X" name="resolution" value="1000" units="1/cm"/>
-          <inkml:channelProperty channel="Y" name="resolution" value="1000" units="1/cm"/>
-          <inkml:channelProperty channel="F" name="resolution" value="0" units="1/dev"/>
-        </inkml:channelProperties>
-      </inkml:inkSource>
-      <inkml:timestamp xml:id="ts0" timeString="2022-09-11T15:13:03.714"/>
-    </inkml:context>
-    <inkml:brush xml:id="br0">
-      <inkml:brushProperty name="width" value="0.1" units="cm"/>
-      <inkml:brushProperty name="height" value="0.1" units="cm"/>
-    </inkml:brush>
-  </inkml:definitions>
-  <inkml:trace contextRef="#ctx0" brushRef="#br0">1 0 24575,'18'0'0,"-1"0"0,2 0 0,-3 4 0,3-3 0,0 5 0,13 5 0,-4-5 0,22 11 0,-20-12 0,3 6 0,-12-7 0,4 3 0,-8-3 0,13 3 0,-18 0 0,14-1 0,-17-2 0,19 2 0,-18-5 0,9 5 0,-15-3 0,4 1 0,-3 2 0,4-6 0,-2 3 0,-1 0 0,1-2 0,-1 5 0,5-2 0,0 3 0,3 0 0,1-3 0,0 3 0,-1-3 0,1 0 0,0 2 0,-1-2 0,1 4 0,-4-4 0,3 2 0,-7-5 0,4 5 0,-5-5 0,1 2 0,-1 0 0,0-3 0,1 3 0,-1-3 0,1 3 0,0 1 0,-1 0 0,1 1 0,-1-4 0,1 2 0,0 0 0,-1-2 0,0 1 0,1-2 0,-1 0 0,4 4 0,-2-1 0,2 4 0,-3-3 0,-1-1 0,-2 0 0,-1-3 0,-3 3 0</inkml:trace>
-</inkml:ink>
-</file>
-
-<file path=ppt/ink/ink99.xml><?xml version="1.0" encoding="utf-8"?>
-<inkml:ink xmlns:inkml="http://www.w3.org/2003/InkML">
-  <inkml:definitions>
-    <inkml:context xml:id="ctx0">
-      <inkml:inkSource xml:id="inkSrc0">
-        <inkml:traceFormat>
-          <inkml:channel name="X" type="integer" min="-2.14748E9" max="2.14748E9" units="cm"/>
-          <inkml:channel name="Y" type="integer" min="-2.14748E9" max="2.14748E9" units="cm"/>
-          <inkml:channel name="F" type="integer" max="32767" units="dev"/>
-        </inkml:traceFormat>
-        <inkml:channelProperties>
-          <inkml:channelProperty channel="X" name="resolution" value="1000" units="1/cm"/>
-          <inkml:channelProperty channel="Y" name="resolution" value="1000" units="1/cm"/>
-          <inkml:channelProperty channel="F" name="resolution" value="0" units="1/dev"/>
-        </inkml:channelProperties>
-      </inkml:inkSource>
-      <inkml:timestamp xml:id="ts0" timeString="2022-09-11T15:13:05.681"/>
-    </inkml:context>
-    <inkml:brush xml:id="br0">
-      <inkml:brushProperty name="width" value="0.1" units="cm"/>
-      <inkml:brushProperty name="height" value="0.1" units="cm"/>
-    </inkml:brush>
-  </inkml:definitions>
-  <inkml:trace contextRef="#ctx0" brushRef="#br0">1 0 24575,'9'0'0,"13"0"0,-2 0 0,5 0 0,-4 0 0,-2 0 0,18 11 0,-13-5 0,23 12 0,-25-6 0,11 4 0,-2-1 0,-11-4 0,5 0 0,-10-7 0,1 3 0,2-3 0,-3 0 0,0 2 0,4-5 0,-4 6 0,4-3 0,-4 0 0,-1 2 0,1-5 0,-4 5 0,3-5 0,-3 2 0,0-3 0,3 0 0,-3 0 0,4 0 0,-1 0 0,1 0 0,4 3 0,-3-2 0,7 3 0,-8-4 0,15 0 0,-13 0 0,9 0 0,-15 0 0,-1 0 0,-3 0 0,-1 0 0,1 0 0,-1 0 0,1 0 0,-1 0 0,1 0 0,-1 0 0,1 0 0,3 0 0,-3 0 0,4 0 0,-5 0 0,1 3 0,0-2 0,-1 2 0,0-3 0,1 0 0,-1 0 0,1 0 0,-1 0 0,1 2 0,3-1 0,-2 2 0,2-3 0,-4 3 0,1-2 0,0 2 0,-1-3 0,1 0 0,-1 3 0,1-3 0,0 3 0,-1-3 0,1 3 0,0-2 0,-1 2 0,-2-3 0,-2 0 0</inkml:trace>
 </inkml:ink>
 </file>
 
@@ -11628,8 +11818,8 @@
           </p:pic>
         </mc:Fallback>
       </mc:AlternateContent>
-      <mc:AlternateContent xmlns:mc="http://schemas.openxmlformats.org/markup-compatibility/2006">
-        <mc:Choice xmlns:p14="http://schemas.microsoft.com/office/powerpoint/2010/main" Requires="p14">
+      <mc:AlternateContent xmlns:mc="http://schemas.openxmlformats.org/markup-compatibility/2006" xmlns:p14="http://schemas.microsoft.com/office/powerpoint/2010/main">
+        <mc:Choice Requires="p14">
           <p:contentPart p14:bwMode="auto" r:id="rId20">
             <p14:nvContentPartPr>
               <p14:cNvPr id="27" name="Ink 26">
@@ -11648,7 +11838,7 @@
             </p14:xfrm>
           </p:contentPart>
         </mc:Choice>
-        <mc:Fallback>
+        <mc:Fallback xmlns="">
           <p:pic>
             <p:nvPicPr>
               <p:cNvPr id="27" name="Ink 26">
@@ -12754,6 +12944,544 @@
 </file>
 
 <file path=ppt/slides/slide3.xml><?xml version="1.0" encoding="utf-8"?>
+<p:sld xmlns:a="http://schemas.openxmlformats.org/drawingml/2006/main" xmlns:r="http://schemas.openxmlformats.org/officeDocument/2006/relationships" xmlns:p="http://schemas.openxmlformats.org/presentationml/2006/main">
+  <p:cSld>
+    <p:spTree>
+      <p:nvGrpSpPr>
+        <p:cNvPr id="1" name=""/>
+        <p:cNvGrpSpPr/>
+        <p:nvPr/>
+      </p:nvGrpSpPr>
+      <p:grpSpPr>
+        <a:xfrm>
+          <a:off x="0" y="0"/>
+          <a:ext cx="0" cy="0"/>
+          <a:chOff x="0" y="0"/>
+          <a:chExt cx="0" cy="0"/>
+        </a:xfrm>
+      </p:grpSpPr>
+      <p:sp>
+        <p:nvSpPr>
+          <p:cNvPr id="4" name="TextBox 3">
+            <a:extLst>
+              <a:ext uri="{FF2B5EF4-FFF2-40B4-BE49-F238E27FC236}">
+                <a16:creationId xmlns:a16="http://schemas.microsoft.com/office/drawing/2014/main" id="{BA5245B3-C818-3CD5-CC61-1B25D41407B9}"/>
+              </a:ext>
+            </a:extLst>
+          </p:cNvPr>
+          <p:cNvSpPr txBox="1"/>
+          <p:nvPr/>
+        </p:nvSpPr>
+        <p:spPr>
+          <a:xfrm>
+            <a:off x="3978884" y="1249877"/>
+            <a:ext cx="1284326" cy="369332"/>
+          </a:xfrm>
+          <a:prstGeom prst="rect">
+            <a:avLst/>
+          </a:prstGeom>
+          <a:noFill/>
+        </p:spPr>
+        <p:txBody>
+          <a:bodyPr wrap="none" rtlCol="0">
+            <a:spAutoFit/>
+          </a:bodyPr>
+          <a:lstStyle/>
+          <a:p>
+            <a:r>
+              <a:rPr lang="en-US" dirty="0">
+                <a:latin typeface="Source Sans Pro" panose="020B0503030403020204" pitchFamily="34" charset="0"/>
+                <a:ea typeface="Source Sans Pro" panose="020B0503030403020204" pitchFamily="34" charset="0"/>
+              </a:rPr>
+              <a:t>Framework</a:t>
+            </a:r>
+          </a:p>
+        </p:txBody>
+      </p:sp>
+      <p:sp>
+        <p:nvSpPr>
+          <p:cNvPr id="5" name="TextBox 4">
+            <a:extLst>
+              <a:ext uri="{FF2B5EF4-FFF2-40B4-BE49-F238E27FC236}">
+                <a16:creationId xmlns:a16="http://schemas.microsoft.com/office/drawing/2014/main" id="{777A8E64-FB40-3A5A-A648-D5652B394358}"/>
+              </a:ext>
+            </a:extLst>
+          </p:cNvPr>
+          <p:cNvSpPr txBox="1"/>
+          <p:nvPr/>
+        </p:nvSpPr>
+        <p:spPr>
+          <a:xfrm>
+            <a:off x="4180285" y="2069212"/>
+            <a:ext cx="841449" cy="369332"/>
+          </a:xfrm>
+          <a:prstGeom prst="rect">
+            <a:avLst/>
+          </a:prstGeom>
+          <a:noFill/>
+        </p:spPr>
+        <p:txBody>
+          <a:bodyPr wrap="none" rtlCol="0">
+            <a:spAutoFit/>
+          </a:bodyPr>
+          <a:lstStyle/>
+          <a:p>
+            <a:pPr algn="ctr"/>
+            <a:r>
+              <a:rPr lang="en-US" dirty="0"/>
+              <a:t>Theory</a:t>
+            </a:r>
+          </a:p>
+        </p:txBody>
+      </p:sp>
+      <p:sp>
+        <p:nvSpPr>
+          <p:cNvPr id="8" name="TextBox 7">
+            <a:extLst>
+              <a:ext uri="{FF2B5EF4-FFF2-40B4-BE49-F238E27FC236}">
+                <a16:creationId xmlns:a16="http://schemas.microsoft.com/office/drawing/2014/main" id="{B4AA8CED-3206-AED6-D855-96422829A9CF}"/>
+              </a:ext>
+            </a:extLst>
+          </p:cNvPr>
+          <p:cNvSpPr txBox="1"/>
+          <p:nvPr/>
+        </p:nvSpPr>
+        <p:spPr>
+          <a:xfrm>
+            <a:off x="3487628" y="2888547"/>
+            <a:ext cx="2307042" cy="369332"/>
+          </a:xfrm>
+          <a:prstGeom prst="rect">
+            <a:avLst/>
+          </a:prstGeom>
+          <a:noFill/>
+        </p:spPr>
+        <p:txBody>
+          <a:bodyPr wrap="none" rtlCol="0">
+            <a:spAutoFit/>
+          </a:bodyPr>
+          <a:lstStyle/>
+          <a:p>
+            <a:r>
+              <a:rPr lang="en-US" dirty="0">
+                <a:latin typeface="Source Sans Pro" panose="020B0503030403020204" pitchFamily="34" charset="0"/>
+                <a:ea typeface="Source Sans Pro" panose="020B0503030403020204" pitchFamily="34" charset="0"/>
+              </a:rPr>
+              <a:t>Computational model</a:t>
+            </a:r>
+          </a:p>
+        </p:txBody>
+      </p:sp>
+      <mc:AlternateContent xmlns:mc="http://schemas.openxmlformats.org/markup-compatibility/2006">
+        <mc:Choice xmlns:p14="http://schemas.microsoft.com/office/powerpoint/2010/main" Requires="p14">
+          <p:contentPart p14:bwMode="auto" r:id="rId2">
+            <p14:nvContentPartPr>
+              <p14:cNvPr id="12" name="Ink 11">
+                <a:extLst>
+                  <a:ext uri="{FF2B5EF4-FFF2-40B4-BE49-F238E27FC236}">
+                    <a16:creationId xmlns:a16="http://schemas.microsoft.com/office/drawing/2014/main" id="{15287B7F-C07A-18D5-FF9B-6C1932B31B4D}"/>
+                  </a:ext>
+                </a:extLst>
+              </p14:cNvPr>
+              <p14:cNvContentPartPr/>
+              <p14:nvPr/>
+            </p14:nvContentPartPr>
+            <p14:xfrm>
+              <a:off x="3962992" y="1228633"/>
+              <a:ext cx="1261440" cy="432595"/>
+            </p14:xfrm>
+          </p:contentPart>
+        </mc:Choice>
+        <mc:Fallback>
+          <p:pic>
+            <p:nvPicPr>
+              <p:cNvPr id="12" name="Ink 11">
+                <a:extLst>
+                  <a:ext uri="{FF2B5EF4-FFF2-40B4-BE49-F238E27FC236}">
+                    <a16:creationId xmlns:a16="http://schemas.microsoft.com/office/drawing/2014/main" id="{15287B7F-C07A-18D5-FF9B-6C1932B31B4D}"/>
+                  </a:ext>
+                </a:extLst>
+              </p:cNvPr>
+              <p:cNvPicPr/>
+              <p:nvPr/>
+            </p:nvPicPr>
+            <p:blipFill>
+              <a:blip r:embed="rId3"/>
+              <a:stretch>
+                <a:fillRect/>
+              </a:stretch>
+            </p:blipFill>
+            <p:spPr>
+              <a:xfrm>
+                <a:off x="3953992" y="1219995"/>
+                <a:ext cx="1279080" cy="450230"/>
+              </a:xfrm>
+              <a:prstGeom prst="rect">
+                <a:avLst/>
+              </a:prstGeom>
+            </p:spPr>
+          </p:pic>
+        </mc:Fallback>
+      </mc:AlternateContent>
+      <mc:AlternateContent xmlns:mc="http://schemas.openxmlformats.org/markup-compatibility/2006">
+        <mc:Choice xmlns:p14="http://schemas.microsoft.com/office/powerpoint/2010/main" Requires="p14">
+          <p:contentPart p14:bwMode="auto" r:id="rId4">
+            <p14:nvContentPartPr>
+              <p14:cNvPr id="19" name="Ink 18">
+                <a:extLst>
+                  <a:ext uri="{FF2B5EF4-FFF2-40B4-BE49-F238E27FC236}">
+                    <a16:creationId xmlns:a16="http://schemas.microsoft.com/office/drawing/2014/main" id="{B9E8E0D5-53ED-A366-FFB0-F3BB261D6124}"/>
+                  </a:ext>
+                </a:extLst>
+              </p14:cNvPr>
+              <p14:cNvContentPartPr/>
+              <p14:nvPr/>
+            </p14:nvContentPartPr>
+            <p14:xfrm>
+              <a:off x="4501785" y="1785570"/>
+              <a:ext cx="120600" cy="202320"/>
+            </p14:xfrm>
+          </p:contentPart>
+        </mc:Choice>
+        <mc:Fallback>
+          <p:pic>
+            <p:nvPicPr>
+              <p:cNvPr id="19" name="Ink 18">
+                <a:extLst>
+                  <a:ext uri="{FF2B5EF4-FFF2-40B4-BE49-F238E27FC236}">
+                    <a16:creationId xmlns:a16="http://schemas.microsoft.com/office/drawing/2014/main" id="{B9E8E0D5-53ED-A366-FFB0-F3BB261D6124}"/>
+                  </a:ext>
+                </a:extLst>
+              </p:cNvPr>
+              <p:cNvPicPr/>
+              <p:nvPr/>
+            </p:nvPicPr>
+            <p:blipFill>
+              <a:blip r:embed="rId5"/>
+              <a:stretch>
+                <a:fillRect/>
+              </a:stretch>
+            </p:blipFill>
+            <p:spPr>
+              <a:xfrm>
+                <a:off x="4493145" y="1776570"/>
+                <a:ext cx="138240" cy="219960"/>
+              </a:xfrm>
+              <a:prstGeom prst="rect">
+                <a:avLst/>
+              </a:prstGeom>
+            </p:spPr>
+          </p:pic>
+        </mc:Fallback>
+      </mc:AlternateContent>
+      <p:sp>
+        <p:nvSpPr>
+          <p:cNvPr id="7" name="TextBox 6">
+            <a:extLst>
+              <a:ext uri="{FF2B5EF4-FFF2-40B4-BE49-F238E27FC236}">
+                <a16:creationId xmlns:a16="http://schemas.microsoft.com/office/drawing/2014/main" id="{AECC7D96-C1FE-F93D-542E-03D34EE7009A}"/>
+              </a:ext>
+            </a:extLst>
+          </p:cNvPr>
+          <p:cNvSpPr txBox="1"/>
+          <p:nvPr/>
+        </p:nvSpPr>
+        <p:spPr>
+          <a:xfrm>
+            <a:off x="3693549" y="3707883"/>
+            <a:ext cx="1814920" cy="369332"/>
+          </a:xfrm>
+          <a:prstGeom prst="rect">
+            <a:avLst/>
+          </a:prstGeom>
+          <a:noFill/>
+        </p:spPr>
+        <p:txBody>
+          <a:bodyPr wrap="none" rtlCol="0">
+            <a:spAutoFit/>
+          </a:bodyPr>
+          <a:lstStyle/>
+          <a:p>
+            <a:pPr algn="ctr"/>
+            <a:r>
+              <a:rPr lang="en-US" dirty="0">
+                <a:latin typeface="Source Sans Pro" panose="020B0503030403020204" pitchFamily="34" charset="0"/>
+                <a:ea typeface="Source Sans Pro" panose="020B0503030403020204" pitchFamily="34" charset="0"/>
+              </a:rPr>
+              <a:t>Statistical model</a:t>
+            </a:r>
+          </a:p>
+        </p:txBody>
+      </p:sp>
+      <mc:AlternateContent xmlns:mc="http://schemas.openxmlformats.org/markup-compatibility/2006">
+        <mc:Choice xmlns:p14="http://schemas.microsoft.com/office/powerpoint/2010/main" Requires="p14">
+          <p:contentPart p14:bwMode="auto" r:id="rId6">
+            <p14:nvContentPartPr>
+              <p14:cNvPr id="24" name="Ink 23">
+                <a:extLst>
+                  <a:ext uri="{FF2B5EF4-FFF2-40B4-BE49-F238E27FC236}">
+                    <a16:creationId xmlns:a16="http://schemas.microsoft.com/office/drawing/2014/main" id="{C7B6535E-94B0-FCA3-6387-095492481D75}"/>
+                  </a:ext>
+                </a:extLst>
+              </p14:cNvPr>
+              <p14:cNvContentPartPr/>
+              <p14:nvPr/>
+            </p14:nvContentPartPr>
+            <p14:xfrm>
+              <a:off x="3679050" y="3658468"/>
+              <a:ext cx="1843920" cy="458640"/>
+            </p14:xfrm>
+          </p:contentPart>
+        </mc:Choice>
+        <mc:Fallback>
+          <p:pic>
+            <p:nvPicPr>
+              <p:cNvPr id="24" name="Ink 23">
+                <a:extLst>
+                  <a:ext uri="{FF2B5EF4-FFF2-40B4-BE49-F238E27FC236}">
+                    <a16:creationId xmlns:a16="http://schemas.microsoft.com/office/drawing/2014/main" id="{C7B6535E-94B0-FCA3-6387-095492481D75}"/>
+                  </a:ext>
+                </a:extLst>
+              </p:cNvPr>
+              <p:cNvPicPr/>
+              <p:nvPr/>
+            </p:nvPicPr>
+            <p:blipFill>
+              <a:blip r:embed="rId7"/>
+              <a:stretch>
+                <a:fillRect/>
+              </a:stretch>
+            </p:blipFill>
+            <p:spPr>
+              <a:xfrm>
+                <a:off x="3670050" y="3649468"/>
+                <a:ext cx="1861560" cy="476280"/>
+              </a:xfrm>
+              <a:prstGeom prst="rect">
+                <a:avLst/>
+              </a:prstGeom>
+            </p:spPr>
+          </p:pic>
+        </mc:Fallback>
+      </mc:AlternateContent>
+      <mc:AlternateContent xmlns:mc="http://schemas.openxmlformats.org/markup-compatibility/2006">
+        <mc:Choice xmlns:p14="http://schemas.microsoft.com/office/powerpoint/2010/main" Requires="p14">
+          <p:contentPart p14:bwMode="auto" r:id="rId8">
+            <p14:nvContentPartPr>
+              <p14:cNvPr id="35" name="Ink 34">
+                <a:extLst>
+                  <a:ext uri="{FF2B5EF4-FFF2-40B4-BE49-F238E27FC236}">
+                    <a16:creationId xmlns:a16="http://schemas.microsoft.com/office/drawing/2014/main" id="{D561C3E3-1C6E-39A4-714B-DDBA6AD89195}"/>
+                  </a:ext>
+                </a:extLst>
+              </p14:cNvPr>
+              <p14:cNvContentPartPr/>
+              <p14:nvPr/>
+            </p14:nvContentPartPr>
+            <p14:xfrm>
+              <a:off x="3447954" y="2859570"/>
+              <a:ext cx="2398572" cy="433080"/>
+            </p14:xfrm>
+          </p:contentPart>
+        </mc:Choice>
+        <mc:Fallback>
+          <p:pic>
+            <p:nvPicPr>
+              <p:cNvPr id="35" name="Ink 34">
+                <a:extLst>
+                  <a:ext uri="{FF2B5EF4-FFF2-40B4-BE49-F238E27FC236}">
+                    <a16:creationId xmlns:a16="http://schemas.microsoft.com/office/drawing/2014/main" id="{D561C3E3-1C6E-39A4-714B-DDBA6AD89195}"/>
+                  </a:ext>
+                </a:extLst>
+              </p:cNvPr>
+              <p:cNvPicPr/>
+              <p:nvPr/>
+            </p:nvPicPr>
+            <p:blipFill>
+              <a:blip r:embed="rId9"/>
+              <a:stretch>
+                <a:fillRect/>
+              </a:stretch>
+            </p:blipFill>
+            <p:spPr>
+              <a:xfrm>
+                <a:off x="3439314" y="2850930"/>
+                <a:ext cx="2416211" cy="450720"/>
+              </a:xfrm>
+              <a:prstGeom prst="rect">
+                <a:avLst/>
+              </a:prstGeom>
+            </p:spPr>
+          </p:pic>
+        </mc:Fallback>
+      </mc:AlternateContent>
+      <mc:AlternateContent xmlns:mc="http://schemas.openxmlformats.org/markup-compatibility/2006">
+        <mc:Choice xmlns:p14="http://schemas.microsoft.com/office/powerpoint/2010/main" Requires="p14">
+          <p:contentPart p14:bwMode="auto" r:id="rId10">
+            <p14:nvContentPartPr>
+              <p14:cNvPr id="37" name="Ink 36">
+                <a:extLst>
+                  <a:ext uri="{FF2B5EF4-FFF2-40B4-BE49-F238E27FC236}">
+                    <a16:creationId xmlns:a16="http://schemas.microsoft.com/office/drawing/2014/main" id="{B901FC40-DFCE-52EE-A5E5-0242BB5FCC69}"/>
+                  </a:ext>
+                </a:extLst>
+              </p14:cNvPr>
+              <p14:cNvContentPartPr/>
+              <p14:nvPr/>
+            </p14:nvContentPartPr>
+            <p14:xfrm>
+              <a:off x="4175355" y="2087010"/>
+              <a:ext cx="840960" cy="323280"/>
+            </p14:xfrm>
+          </p:contentPart>
+        </mc:Choice>
+        <mc:Fallback>
+          <p:pic>
+            <p:nvPicPr>
+              <p:cNvPr id="37" name="Ink 36">
+                <a:extLst>
+                  <a:ext uri="{FF2B5EF4-FFF2-40B4-BE49-F238E27FC236}">
+                    <a16:creationId xmlns:a16="http://schemas.microsoft.com/office/drawing/2014/main" id="{B901FC40-DFCE-52EE-A5E5-0242BB5FCC69}"/>
+                  </a:ext>
+                </a:extLst>
+              </p:cNvPr>
+              <p:cNvPicPr/>
+              <p:nvPr/>
+            </p:nvPicPr>
+            <p:blipFill>
+              <a:blip r:embed="rId11"/>
+              <a:stretch>
+                <a:fillRect/>
+              </a:stretch>
+            </p:blipFill>
+            <p:spPr>
+              <a:xfrm>
+                <a:off x="4166355" y="2078370"/>
+                <a:ext cx="858600" cy="340920"/>
+              </a:xfrm>
+              <a:prstGeom prst="rect">
+                <a:avLst/>
+              </a:prstGeom>
+            </p:spPr>
+          </p:pic>
+        </mc:Fallback>
+      </mc:AlternateContent>
+      <mc:AlternateContent xmlns:mc="http://schemas.openxmlformats.org/markup-compatibility/2006">
+        <mc:Choice xmlns:p14="http://schemas.microsoft.com/office/powerpoint/2010/main" Requires="p14">
+          <p:contentPart p14:bwMode="auto" r:id="rId12">
+            <p14:nvContentPartPr>
+              <p14:cNvPr id="38" name="Ink 37">
+                <a:extLst>
+                  <a:ext uri="{FF2B5EF4-FFF2-40B4-BE49-F238E27FC236}">
+                    <a16:creationId xmlns:a16="http://schemas.microsoft.com/office/drawing/2014/main" id="{B83B6385-DEF9-13AE-A6B4-F57E9E433BB9}"/>
+                  </a:ext>
+                </a:extLst>
+              </p14:cNvPr>
+              <p14:cNvContentPartPr/>
+              <p14:nvPr/>
+            </p14:nvContentPartPr>
+            <p14:xfrm>
+              <a:off x="4495035" y="2473650"/>
+              <a:ext cx="162720" cy="324720"/>
+            </p14:xfrm>
+          </p:contentPart>
+        </mc:Choice>
+        <mc:Fallback>
+          <p:pic>
+            <p:nvPicPr>
+              <p:cNvPr id="38" name="Ink 37">
+                <a:extLst>
+                  <a:ext uri="{FF2B5EF4-FFF2-40B4-BE49-F238E27FC236}">
+                    <a16:creationId xmlns:a16="http://schemas.microsoft.com/office/drawing/2014/main" id="{B83B6385-DEF9-13AE-A6B4-F57E9E433BB9}"/>
+                  </a:ext>
+                </a:extLst>
+              </p:cNvPr>
+              <p:cNvPicPr/>
+              <p:nvPr/>
+            </p:nvPicPr>
+            <p:blipFill>
+              <a:blip r:embed="rId13"/>
+              <a:stretch>
+                <a:fillRect/>
+              </a:stretch>
+            </p:blipFill>
+            <p:spPr>
+              <a:xfrm>
+                <a:off x="4486035" y="2465010"/>
+                <a:ext cx="180360" cy="342360"/>
+              </a:xfrm>
+              <a:prstGeom prst="rect">
+                <a:avLst/>
+              </a:prstGeom>
+            </p:spPr>
+          </p:pic>
+        </mc:Fallback>
+      </mc:AlternateContent>
+      <mc:AlternateContent xmlns:mc="http://schemas.openxmlformats.org/markup-compatibility/2006">
+        <mc:Choice xmlns:p14="http://schemas.microsoft.com/office/powerpoint/2010/main" Requires="p14">
+          <p:contentPart p14:bwMode="auto" r:id="rId14">
+            <p14:nvContentPartPr>
+              <p14:cNvPr id="39" name="Ink 38">
+                <a:extLst>
+                  <a:ext uri="{FF2B5EF4-FFF2-40B4-BE49-F238E27FC236}">
+                    <a16:creationId xmlns:a16="http://schemas.microsoft.com/office/drawing/2014/main" id="{C0FE6BCC-42E3-8C87-B85B-5EE6F45643BA}"/>
+                  </a:ext>
+                </a:extLst>
+              </p14:cNvPr>
+              <p14:cNvContentPartPr/>
+              <p14:nvPr/>
+            </p14:nvContentPartPr>
+            <p14:xfrm>
+              <a:off x="4495755" y="3351330"/>
+              <a:ext cx="156600" cy="225720"/>
+            </p14:xfrm>
+          </p:contentPart>
+        </mc:Choice>
+        <mc:Fallback>
+          <p:pic>
+            <p:nvPicPr>
+              <p:cNvPr id="39" name="Ink 38">
+                <a:extLst>
+                  <a:ext uri="{FF2B5EF4-FFF2-40B4-BE49-F238E27FC236}">
+                    <a16:creationId xmlns:a16="http://schemas.microsoft.com/office/drawing/2014/main" id="{C0FE6BCC-42E3-8C87-B85B-5EE6F45643BA}"/>
+                  </a:ext>
+                </a:extLst>
+              </p:cNvPr>
+              <p:cNvPicPr/>
+              <p:nvPr/>
+            </p:nvPicPr>
+            <p:blipFill>
+              <a:blip r:embed="rId15"/>
+              <a:stretch>
+                <a:fillRect/>
+              </a:stretch>
+            </p:blipFill>
+            <p:spPr>
+              <a:xfrm>
+                <a:off x="4487115" y="3342330"/>
+                <a:ext cx="174240" cy="243360"/>
+              </a:xfrm>
+              <a:prstGeom prst="rect">
+                <a:avLst/>
+              </a:prstGeom>
+            </p:spPr>
+          </p:pic>
+        </mc:Fallback>
+      </mc:AlternateContent>
+    </p:spTree>
+    <p:extLst>
+      <p:ext uri="{BB962C8B-B14F-4D97-AF65-F5344CB8AC3E}">
+        <p14:creationId xmlns:p14="http://schemas.microsoft.com/office/powerpoint/2010/main" val="291828360"/>
+      </p:ext>
+    </p:extLst>
+  </p:cSld>
+  <p:clrMapOvr>
+    <a:masterClrMapping/>
+  </p:clrMapOvr>
+</p:sld>
+</file>
+
+<file path=ppt/slides/slide4.xml><?xml version="1.0" encoding="utf-8"?>
 <p:sld xmlns:a="http://schemas.openxmlformats.org/drawingml/2006/main" xmlns:r="http://schemas.openxmlformats.org/officeDocument/2006/relationships" xmlns:p="http://schemas.openxmlformats.org/presentationml/2006/main">
   <p:cSld>
     <p:spTree>

</xml_diff>

<commit_message>
lots of tweaks from main pass
</commit_message>
<xml_diff>
--- a/images/theory/src/illustrations.pptx
+++ b/images/theory/src/illustrations.pptx
@@ -186,114 +186,6 @@
           <inkml:channelProperty channel="F" name="resolution" value="0" units="1/dev"/>
         </inkml:channelProperties>
       </inkml:inkSource>
-      <inkml:timestamp xml:id="ts0" timeString="2022-09-11T15:12:44.180"/>
-    </inkml:context>
-    <inkml:brush xml:id="br0">
-      <inkml:brushProperty name="width" value="0.1" units="cm"/>
-      <inkml:brushProperty name="height" value="0.1" units="cm"/>
-    </inkml:brush>
-  </inkml:definitions>
-  <inkml:trace contextRef="#ctx0" brushRef="#br0">0 1223 24575,'0'-13'0,"0"-7"0,0-1 0,0-9 0,0 4 0,0-2 0,0 2 0,0 0 0,0 0 0,0 7 0,4-5 0,-3 3 0,26-40 0,-13 18 0,12-12 0,1-1 0,-4 4 0,16-36 0,-25 56 0,2-3 0,-5 15 0,1-9 0,-1 7 0,0-4 0,-3 7 0,3-9 0,-3 14 0,-1-13 0,-1 19 0,-2-11 0,3 0 0,0-4 0,0 2 0,7 1 0,-9 7 0,7-6 0,-8 12 0,2-2 0,1-1 0,6-14 0,-8 6 0,8-8 0,-12 15 0,4 5 0,-1 3 0,-1 0 0,0-1 0,0 1 0,-3-3 0,3 2 0,0-3 0,-2 1 0,2-1 0,0 1 0,-2-1 0,2 0 0,0 4 0,-3-3 0,3 2 0,-3 1 0,0 0 0</inkml:trace>
-</inkml:ink>
-</file>
-
-<file path=ppt/ink/ink101.xml><?xml version="1.0" encoding="utf-8"?>
-<inkml:ink xmlns:inkml="http://www.w3.org/2003/InkML">
-  <inkml:definitions>
-    <inkml:context xml:id="ctx0">
-      <inkml:inkSource xml:id="inkSrc0">
-        <inkml:traceFormat>
-          <inkml:channel name="X" type="integer" min="-2.14748E9" max="2.14748E9" units="cm"/>
-          <inkml:channel name="Y" type="integer" min="-2.14748E9" max="2.14748E9" units="cm"/>
-          <inkml:channel name="F" type="integer" max="32767" units="dev"/>
-        </inkml:traceFormat>
-        <inkml:channelProperties>
-          <inkml:channelProperty channel="X" name="resolution" value="1000" units="1/cm"/>
-          <inkml:channelProperty channel="Y" name="resolution" value="1000" units="1/cm"/>
-          <inkml:channelProperty channel="F" name="resolution" value="0" units="1/dev"/>
-        </inkml:channelProperties>
-      </inkml:inkSource>
-      <inkml:timestamp xml:id="ts0" timeString="2022-09-11T15:12:55.167"/>
-    </inkml:context>
-    <inkml:brush xml:id="br0">
-      <inkml:brushProperty name="width" value="0.1" units="cm"/>
-      <inkml:brushProperty name="height" value="0.1" units="cm"/>
-    </inkml:brush>
-  </inkml:definitions>
-  <inkml:trace contextRef="#ctx0" brushRef="#br0">0 1 24575,'7'13'0,"0"1"0,4 1 0,-3-1 0,6 1 0,-6 0 0,10 14 0,-6-10 0,4 14 0,-5-13 0,4 16 0,-5-13 0,22 49 0,-16-43 0,25 55 0,-22-55 0,15 44 0,-16-42 0,2 19 0,-8-26 0,-4 0 0,3-4 0,-3-1 0,6-4 0,4 13 0,-2-4 0,2 2 0,-7-6 0,-1-2 0,-2-2 0,3 5 0,-4-10 0,0 10 0,0-12 0,3 18 0,-5-18 0,8 17 0,-9-16 0,7 10 0,-8-13 0,4 13 0,-3-11 0,0 7 0,1-6 0,-1-3 0,2 2 0,1 8 0,0-8 0,-3 11 0,2-13 0,-5 6 0,2-6 0,-3 2 0,0-3 0,0 0 0,0 0 0,0 1 0,0-1 0,0 0 0,0 0 0,0 0 0,0 0 0,0 0 0,0 0 0,0 1 0,0-1 0,0-3 0,0 0 0</inkml:trace>
-</inkml:ink>
-</file>
-
-<file path=ppt/ink/ink102.xml><?xml version="1.0" encoding="utf-8"?>
-<inkml:ink xmlns:inkml="http://www.w3.org/2003/InkML">
-  <inkml:definitions>
-    <inkml:context xml:id="ctx0">
-      <inkml:inkSource xml:id="inkSrc0">
-        <inkml:traceFormat>
-          <inkml:channel name="X" type="integer" min="-2.14748E9" max="2.14748E9" units="cm"/>
-          <inkml:channel name="Y" type="integer" min="-2.14748E9" max="2.14748E9" units="cm"/>
-          <inkml:channel name="F" type="integer" max="32767" units="dev"/>
-        </inkml:traceFormat>
-        <inkml:channelProperties>
-          <inkml:channelProperty channel="X" name="resolution" value="1000" units="1/cm"/>
-          <inkml:channelProperty channel="Y" name="resolution" value="1000" units="1/cm"/>
-          <inkml:channelProperty channel="F" name="resolution" value="0" units="1/dev"/>
-        </inkml:channelProperties>
-      </inkml:inkSource>
-      <inkml:timestamp xml:id="ts0" timeString="2022-09-11T15:12:57.092"/>
-    </inkml:context>
-    <inkml:brush xml:id="br0">
-      <inkml:brushProperty name="width" value="0.1" units="cm"/>
-      <inkml:brushProperty name="height" value="0.1" units="cm"/>
-    </inkml:brush>
-  </inkml:definitions>
-  <inkml:trace contextRef="#ctx0" brushRef="#br0">1 0 24575,'13'0'0,"8"17"0,-1-5 0,4 17 0,-1-12 0,-6 7 0,11-7 0,18 31 0,-5-19 0,10 20 0,-19-16 0,5 1 0,-1 6 0,-2-10 0,-11 0 0,-3-8 0,-6-1 0,18 7 0,-15-7 0,26 15 0,-27-17 0,28 18 0,-33-27 0,26 20 0,-27-21 0,15 8 0,-19-10 0,5-4 0,-10 3 0,4-5 0,-1 5 0,9 0 0,-5-1 0,10 7 0,-10-8 0,4 2 0,-6-3 0,-2 0 0,1-2 0,-4 4 0,5-4 0,-5 5 0,4-6 0,-1 6 0,2-5 0,1 2 0,-4 0 0,3-3 0,-2 6 0,2-5 0,-2 5 0,2-5 0,-3 2 0,4-1 0,-1-1 0,1 5 0,-1-5 0,1 4 0,-3-4 0,-1 2 0</inkml:trace>
-</inkml:ink>
-</file>
-
-<file path=ppt/ink/ink103.xml><?xml version="1.0" encoding="utf-8"?>
-<inkml:ink xmlns:inkml="http://www.w3.org/2003/InkML">
-  <inkml:definitions>
-    <inkml:context xml:id="ctx0">
-      <inkml:inkSource xml:id="inkSrc0">
-        <inkml:traceFormat>
-          <inkml:channel name="X" type="integer" min="-2.14748E9" max="2.14748E9" units="cm"/>
-          <inkml:channel name="Y" type="integer" min="-2.14748E9" max="2.14748E9" units="cm"/>
-          <inkml:channel name="F" type="integer" max="32767" units="dev"/>
-        </inkml:traceFormat>
-        <inkml:channelProperties>
-          <inkml:channelProperty channel="X" name="resolution" value="1000" units="1/cm"/>
-          <inkml:channelProperty channel="Y" name="resolution" value="1000" units="1/cm"/>
-          <inkml:channelProperty channel="F" name="resolution" value="0" units="1/dev"/>
-        </inkml:channelProperties>
-      </inkml:inkSource>
-      <inkml:timestamp xml:id="ts0" timeString="2022-09-11T15:12:59.102"/>
-    </inkml:context>
-    <inkml:brush xml:id="br0">
-      <inkml:brushProperty name="width" value="0.1" units="cm"/>
-      <inkml:brushProperty name="height" value="0.1" units="cm"/>
-    </inkml:brush>
-  </inkml:definitions>
-  <inkml:trace contextRef="#ctx0" brushRef="#br0">0 0 24575,'15'4'0,"5"4"0,3 11 0,3-2 0,5 11 0,0-6 0,3 11 0,-7-9 0,5 7 0,-16-12 0,3 2 0,0-3 0,15 12 0,-7-7 0,6 7 0,-10-10 0,-8-9 0,4 4 0,-8-8 0,3 4 0,4 3 0,-2-6 0,16 10 0,-15-10 0,22 13 0,-25-12 0,13 8 0,-20-10 0,9 3 0,-8-6 0,5 5 0,-7-5 0,4 2 0,-3 1 0,6 3 0,-2-3 0,2 6 0,2-8 0,4 10 0,-2-10 0,3 8 0,-9-6 0,12 7 0,-9-6 0,6 6 0,-6-7 0,3 3 0,-1-2 0,7 2 0,-11-6 0,3 2 0,-7-6 0,4 6 0,-5-5 0,3 5 0,-1-3 0,-2 4 0,2-1 0,-2 0 0,-1 1 0,-2-4 0,-2 0 0</inkml:trace>
-</inkml:ink>
-</file>
-
-<file path=ppt/ink/ink104.xml><?xml version="1.0" encoding="utf-8"?>
-<inkml:ink xmlns:inkml="http://www.w3.org/2003/InkML">
-  <inkml:definitions>
-    <inkml:context xml:id="ctx0">
-      <inkml:inkSource xml:id="inkSrc0">
-        <inkml:traceFormat>
-          <inkml:channel name="X" type="integer" min="-2.14748E9" max="2.14748E9" units="cm"/>
-          <inkml:channel name="Y" type="integer" min="-2.14748E9" max="2.14748E9" units="cm"/>
-          <inkml:channel name="F" type="integer" max="32767" units="dev"/>
-        </inkml:traceFormat>
-        <inkml:channelProperties>
-          <inkml:channelProperty channel="X" name="resolution" value="1000" units="1/cm"/>
-          <inkml:channelProperty channel="Y" name="resolution" value="1000" units="1/cm"/>
-          <inkml:channelProperty channel="F" name="resolution" value="0" units="1/dev"/>
-        </inkml:channelProperties>
-      </inkml:inkSource>
       <inkml:timestamp xml:id="ts0" timeString="2022-09-11T15:13:01.490"/>
     </inkml:context>
     <inkml:brush xml:id="br0">
@@ -305,7 +197,7 @@
 </inkml:ink>
 </file>
 
-<file path=ppt/ink/ink105.xml><?xml version="1.0" encoding="utf-8"?>
+<file path=ppt/ink/ink101.xml><?xml version="1.0" encoding="utf-8"?>
 <inkml:ink xmlns:inkml="http://www.w3.org/2003/InkML">
   <inkml:definitions>
     <inkml:context xml:id="ctx0">
@@ -332,7 +224,7 @@
 </inkml:ink>
 </file>
 
-<file path=ppt/ink/ink106.xml><?xml version="1.0" encoding="utf-8"?>
+<file path=ppt/ink/ink102.xml><?xml version="1.0" encoding="utf-8"?>
 <inkml:ink xmlns:inkml="http://www.w3.org/2003/InkML">
   <inkml:definitions>
     <inkml:context xml:id="ctx0">
@@ -359,7 +251,7 @@
 </inkml:ink>
 </file>
 
-<file path=ppt/ink/ink107.xml><?xml version="1.0" encoding="utf-8"?>
+<file path=ppt/ink/ink103.xml><?xml version="1.0" encoding="utf-8"?>
 <inkml:ink xmlns:inkml="http://www.w3.org/2003/InkML">
   <inkml:definitions>
     <inkml:context xml:id="ctx0">
@@ -386,7 +278,7 @@
 </inkml:ink>
 </file>
 
-<file path=ppt/ink/ink108.xml><?xml version="1.0" encoding="utf-8"?>
+<file path=ppt/ink/ink104.xml><?xml version="1.0" encoding="utf-8"?>
 <inkml:ink xmlns:inkml="http://www.w3.org/2003/InkML">
   <inkml:definitions>
     <inkml:context xml:id="ctx0">
@@ -413,7 +305,7 @@
 </inkml:ink>
 </file>
 
-<file path=ppt/ink/ink109.xml><?xml version="1.0" encoding="utf-8"?>
+<file path=ppt/ink/ink105.xml><?xml version="1.0" encoding="utf-8"?>
 <inkml:ink xmlns:inkml="http://www.w3.org/2003/InkML">
   <inkml:definitions>
     <inkml:context xml:id="ctx0">
@@ -437,6 +329,114 @@
     </inkml:brush>
   </inkml:definitions>
   <inkml:trace contextRef="#ctx0" brushRef="#br0">0 167 24575,'25'0'0,"4"0"0,-4 0 0,9 0 0,-4 0 0,0 0 0,19 0 0,17 0 0,-3 0 0,23-9 0,-46 6 0,39-15 0,-47 9 0,60-9 0,-54 1 0,26 7 0,-38-5 0,-1 14 0,-9-6 0,9 4 0,-13 2 0,4-1 0,-9 2 0,2-3 0,-2 2 0,3-2 0,-1 0 0,2 2 0,0-5 0,9 2 0,-7 1 0,7-4 0,-9 7 0,-1-3 0,-4 3 0,0 0 0,1 0 0,12-3 0,-9-1 0,16 0 0,-17 1 0,7 3 0,-9 0 0,2-2 0,-5 1 0,-2-2 0</inkml:trace>
+</inkml:ink>
+</file>
+
+<file path=ppt/ink/ink106.xml><?xml version="1.0" encoding="utf-8"?>
+<inkml:ink xmlns:inkml="http://www.w3.org/2003/InkML">
+  <inkml:definitions>
+    <inkml:context xml:id="ctx0">
+      <inkml:inkSource xml:id="inkSrc0">
+        <inkml:traceFormat>
+          <inkml:channel name="X" type="integer" min="-2.14748E9" max="2.14748E9" units="cm"/>
+          <inkml:channel name="Y" type="integer" min="-2.14748E9" max="2.14748E9" units="cm"/>
+          <inkml:channel name="F" type="integer" max="32767" units="dev"/>
+        </inkml:traceFormat>
+        <inkml:channelProperties>
+          <inkml:channelProperty channel="X" name="resolution" value="1000" units="1/cm"/>
+          <inkml:channelProperty channel="Y" name="resolution" value="1000" units="1/cm"/>
+          <inkml:channelProperty channel="F" name="resolution" value="0" units="1/dev"/>
+        </inkml:channelProperties>
+      </inkml:inkSource>
+      <inkml:timestamp xml:id="ts0" timeString="2022-09-11T15:13:13.661"/>
+    </inkml:context>
+    <inkml:brush xml:id="br0">
+      <inkml:brushProperty name="width" value="0.1" units="cm"/>
+      <inkml:brushProperty name="height" value="0.1" units="cm"/>
+    </inkml:brush>
+  </inkml:definitions>
+  <inkml:trace contextRef="#ctx0" brushRef="#br0">0 384 24575,'39'-13'0,"-17"1"0,28-3 0,-21-5 0,17 8 0,-8-9 0,2 11 0,12-14 0,-17 17 0,13-11 0,-27 11 0,0 2 0,-7-2 0,13 4 0,-12 2 0,24-9 0,-25 5 0,18-6 0,-16 4 0,9-4 0,-13 7 0,4-3 0,-9 7 0,2-2 0,2-2 0,-1 0 0,0-2 0,-1 0 0,-1 1 0,4-4 0,-5 9 0,6-6 0,-6 5 0,12-8 0,-7 5 0,12-7 0,-8 4 0,24-8 0,-20 6 0,13-2 0,-19 4 0,-1 3 0,-1 0 0,10-4 0,-10 3 0,8-2 0,-9 1 0,4 5 0,-7-2 0,5 3 0,-7 0 0,0 0 0,1 0 0,-4 0 0,0 0 0</inkml:trace>
+</inkml:ink>
+</file>
+
+<file path=ppt/ink/ink107.xml><?xml version="1.0" encoding="utf-8"?>
+<inkml:ink xmlns:inkml="http://www.w3.org/2003/InkML">
+  <inkml:definitions>
+    <inkml:context xml:id="ctx0">
+      <inkml:inkSource xml:id="inkSrc0">
+        <inkml:traceFormat>
+          <inkml:channel name="X" type="integer" min="-2.14748E9" max="2.14748E9" units="cm"/>
+          <inkml:channel name="Y" type="integer" min="-2.14748E9" max="2.14748E9" units="cm"/>
+          <inkml:channel name="F" type="integer" max="32767" units="dev"/>
+        </inkml:traceFormat>
+        <inkml:channelProperties>
+          <inkml:channelProperty channel="X" name="resolution" value="1000" units="1/cm"/>
+          <inkml:channelProperty channel="Y" name="resolution" value="1000" units="1/cm"/>
+          <inkml:channelProperty channel="F" name="resolution" value="0" units="1/dev"/>
+        </inkml:channelProperties>
+      </inkml:inkSource>
+      <inkml:timestamp xml:id="ts0" timeString="2022-09-11T15:13:15.582"/>
+    </inkml:context>
+    <inkml:brush xml:id="br0">
+      <inkml:brushProperty name="width" value="0.1" units="cm"/>
+      <inkml:brushProperty name="height" value="0.1" units="cm"/>
+    </inkml:brush>
+  </inkml:definitions>
+  <inkml:trace contextRef="#ctx0" brushRef="#br0">0 605 24575,'22'-8'0,"-6"3"0,17-12 0,-6-5 0,20 1 0,13-18 0,-2 16 0,11-8 0,16-5 0,-22 12 0,3-1 0,-2-1 0,-15 9 0,4-4 0,-3 2 0,-25 9 0,29-16 0,-36 17 0,23-8 0,-23 9 0,23-6 0,-23 6 0,15-5 0,-20 8 0,3-4 0,-9 8 0,-1-5 0,1 3 0,6-4 0,-2 0 0,13-3 0,-11 2 0,14-2 0,-18 3 0,35-7 0,-27 5 0,22-5 0,-25 7 0,1-1 0,-4 4 0,9-5 0,-11 4 0,7-2 0,-10 4 0,0 3 0,-2-3 0,2 3 0,-3-6 0,4 5 0,-4-2 0,0 3 0</inkml:trace>
+</inkml:ink>
+</file>
+
+<file path=ppt/ink/ink108.xml><?xml version="1.0" encoding="utf-8"?>
+<inkml:ink xmlns:inkml="http://www.w3.org/2003/InkML">
+  <inkml:definitions>
+    <inkml:context xml:id="ctx0">
+      <inkml:inkSource xml:id="inkSrc0">
+        <inkml:traceFormat>
+          <inkml:channel name="X" type="integer" min="-2.14748E9" max="2.14748E9" units="cm"/>
+          <inkml:channel name="Y" type="integer" min="-2.14748E9" max="2.14748E9" units="cm"/>
+          <inkml:channel name="F" type="integer" max="32767" units="dev"/>
+        </inkml:traceFormat>
+        <inkml:channelProperties>
+          <inkml:channelProperty channel="X" name="resolution" value="1000" units="1/cm"/>
+          <inkml:channelProperty channel="Y" name="resolution" value="1000" units="1/cm"/>
+          <inkml:channelProperty channel="F" name="resolution" value="0" units="1/dev"/>
+        </inkml:channelProperties>
+      </inkml:inkSource>
+      <inkml:timestamp xml:id="ts0" timeString="2022-09-11T15:13:18.246"/>
+    </inkml:context>
+    <inkml:brush xml:id="br0">
+      <inkml:brushProperty name="width" value="0.1" units="cm"/>
+      <inkml:brushProperty name="height" value="0.1" units="cm"/>
+    </inkml:brush>
+  </inkml:definitions>
+  <inkml:trace contextRef="#ctx0" brushRef="#br0">1 995 24575,'14'-21'0,"-1"4"0,3-2 0,3-1 0,2-1 0,12-12 0,-10 7 0,19-14 0,-17 13 0,12-6 0,-6 5 0,-3 2 0,8-2 0,-8 1 0,-1 1 0,-3 5 0,-8 1 0,3 5 0,-8 4 0,-1 1 0,1 3 0,-4 0 0,7 0 0,-3-3 0,3-2 0,1 1 0,0-3 0,-1 3 0,-2-4 0,2 4 0,-3 0 0,1 1 0,1 1 0,-5-1 0,2 3 0,1 0 0,-4-3 0,7-1 0,2-5 0,0 1 0,7 0 0,-2-5 0,9-4 0,-7 5 0,2-2 0,-14 17 0,0-6 0,-5 6 0,1 1 0,-1-3 0,1 2 0,-1-2 0,5-4 0,-4 2 0,3-2 0,0 3 0,-2 0 0,2 0 0,-3 4 0,-4-3 0,3 5 0,-5-4 0,5 4 0,-2-5 0,2 2 0,1-2 0,-1-1 0,1 1 0,0-1 0,-1 3 0,-3-1 0,3 4 0,-5-5 0,5 6 0,-3-3 0,1 0 0,1 2 0,-1-4 0,2 1 0,1-2 0,-1-1 0,1 3 0,-1-2 0,1 6 0,-4-6 0,3 5 0,-3-2 0,4 1 0,-1 1 0,1-5 0,-4 5 0,0-1 0</inkml:trace>
+</inkml:ink>
+</file>
+
+<file path=ppt/ink/ink109.xml><?xml version="1.0" encoding="utf-8"?>
+<inkml:ink xmlns:inkml="http://www.w3.org/2003/InkML">
+  <inkml:definitions>
+    <inkml:context xml:id="ctx0">
+      <inkml:inkSource xml:id="inkSrc0">
+        <inkml:traceFormat>
+          <inkml:channel name="X" type="integer" min="-2.14748E9" max="2.14748E9" units="cm"/>
+          <inkml:channel name="Y" type="integer" min="-2.14748E9" max="2.14748E9" units="cm"/>
+          <inkml:channel name="F" type="integer" max="32767" units="dev"/>
+        </inkml:traceFormat>
+        <inkml:channelProperties>
+          <inkml:channelProperty channel="X" name="resolution" value="1000" units="1/cm"/>
+          <inkml:channelProperty channel="Y" name="resolution" value="1000" units="1/cm"/>
+          <inkml:channelProperty channel="F" name="resolution" value="0" units="1/dev"/>
+        </inkml:channelProperties>
+      </inkml:inkSource>
+      <inkml:timestamp xml:id="ts0" timeString="2022-09-11T15:13:20.333"/>
+    </inkml:context>
+    <inkml:brush xml:id="br0">
+      <inkml:brushProperty name="width" value="0.1" units="cm"/>
+      <inkml:brushProperty name="height" value="0.1" units="cm"/>
+    </inkml:brush>
+  </inkml:definitions>
+  <inkml:trace contextRef="#ctx0" brushRef="#br0">1 1158 24575,'18'0'0,"-1"-4"0,2-4 0,1-4 0,0-3 0,3-1 0,-7-3 0,31-41 0,-19 20 0,2-4 0,-1 2 0,-5 10 0,19-23 0,-24 37 0,22-26 0,-26 25 0,17-17 0,-19 16 0,26-23 0,-19 14 0,14-9 0,-22 15 0,13-10 0,-14 10 0,31-37 0,-26 34 0,23-31 0,-26 39 0,10-15 0,-15 24 0,12-24 0,-11 19 0,25-42 0,-21 34 0,21-30 0,-25 35 0,4-6 0,-9 12 0,2 2 0,-5 2 0,2 1 0,-1 3 0,-1-3 0,2 2 0,0 1 0,-3-3 0,6 3 0,-5-1 0,1 1 0</inkml:trace>
 </inkml:ink>
 </file>
 
@@ -483,114 +483,6 @@
           <inkml:channelProperty channel="F" name="resolution" value="0" units="1/dev"/>
         </inkml:channelProperties>
       </inkml:inkSource>
-      <inkml:timestamp xml:id="ts0" timeString="2022-09-11T15:13:13.661"/>
-    </inkml:context>
-    <inkml:brush xml:id="br0">
-      <inkml:brushProperty name="width" value="0.1" units="cm"/>
-      <inkml:brushProperty name="height" value="0.1" units="cm"/>
-    </inkml:brush>
-  </inkml:definitions>
-  <inkml:trace contextRef="#ctx0" brushRef="#br0">0 384 24575,'39'-13'0,"-17"1"0,28-3 0,-21-5 0,17 8 0,-8-9 0,2 11 0,12-14 0,-17 17 0,13-11 0,-27 11 0,0 2 0,-7-2 0,13 4 0,-12 2 0,24-9 0,-25 5 0,18-6 0,-16 4 0,9-4 0,-13 7 0,4-3 0,-9 7 0,2-2 0,2-2 0,-1 0 0,0-2 0,-1 0 0,-1 1 0,4-4 0,-5 9 0,6-6 0,-6 5 0,12-8 0,-7 5 0,12-7 0,-8 4 0,24-8 0,-20 6 0,13-2 0,-19 4 0,-1 3 0,-1 0 0,10-4 0,-10 3 0,8-2 0,-9 1 0,4 5 0,-7-2 0,5 3 0,-7 0 0,0 0 0,1 0 0,-4 0 0,0 0 0</inkml:trace>
-</inkml:ink>
-</file>
-
-<file path=ppt/ink/ink111.xml><?xml version="1.0" encoding="utf-8"?>
-<inkml:ink xmlns:inkml="http://www.w3.org/2003/InkML">
-  <inkml:definitions>
-    <inkml:context xml:id="ctx0">
-      <inkml:inkSource xml:id="inkSrc0">
-        <inkml:traceFormat>
-          <inkml:channel name="X" type="integer" min="-2.14748E9" max="2.14748E9" units="cm"/>
-          <inkml:channel name="Y" type="integer" min="-2.14748E9" max="2.14748E9" units="cm"/>
-          <inkml:channel name="F" type="integer" max="32767" units="dev"/>
-        </inkml:traceFormat>
-        <inkml:channelProperties>
-          <inkml:channelProperty channel="X" name="resolution" value="1000" units="1/cm"/>
-          <inkml:channelProperty channel="Y" name="resolution" value="1000" units="1/cm"/>
-          <inkml:channelProperty channel="F" name="resolution" value="0" units="1/dev"/>
-        </inkml:channelProperties>
-      </inkml:inkSource>
-      <inkml:timestamp xml:id="ts0" timeString="2022-09-11T15:13:15.582"/>
-    </inkml:context>
-    <inkml:brush xml:id="br0">
-      <inkml:brushProperty name="width" value="0.1" units="cm"/>
-      <inkml:brushProperty name="height" value="0.1" units="cm"/>
-    </inkml:brush>
-  </inkml:definitions>
-  <inkml:trace contextRef="#ctx0" brushRef="#br0">0 605 24575,'22'-8'0,"-6"3"0,17-12 0,-6-5 0,20 1 0,13-18 0,-2 16 0,11-8 0,16-5 0,-22 12 0,3-1 0,-2-1 0,-15 9 0,4-4 0,-3 2 0,-25 9 0,29-16 0,-36 17 0,23-8 0,-23 9 0,23-6 0,-23 6 0,15-5 0,-20 8 0,3-4 0,-9 8 0,-1-5 0,1 3 0,6-4 0,-2 0 0,13-3 0,-11 2 0,14-2 0,-18 3 0,35-7 0,-27 5 0,22-5 0,-25 7 0,1-1 0,-4 4 0,9-5 0,-11 4 0,7-2 0,-10 4 0,0 3 0,-2-3 0,2 3 0,-3-6 0,4 5 0,-4-2 0,0 3 0</inkml:trace>
-</inkml:ink>
-</file>
-
-<file path=ppt/ink/ink112.xml><?xml version="1.0" encoding="utf-8"?>
-<inkml:ink xmlns:inkml="http://www.w3.org/2003/InkML">
-  <inkml:definitions>
-    <inkml:context xml:id="ctx0">
-      <inkml:inkSource xml:id="inkSrc0">
-        <inkml:traceFormat>
-          <inkml:channel name="X" type="integer" min="-2.14748E9" max="2.14748E9" units="cm"/>
-          <inkml:channel name="Y" type="integer" min="-2.14748E9" max="2.14748E9" units="cm"/>
-          <inkml:channel name="F" type="integer" max="32767" units="dev"/>
-        </inkml:traceFormat>
-        <inkml:channelProperties>
-          <inkml:channelProperty channel="X" name="resolution" value="1000" units="1/cm"/>
-          <inkml:channelProperty channel="Y" name="resolution" value="1000" units="1/cm"/>
-          <inkml:channelProperty channel="F" name="resolution" value="0" units="1/dev"/>
-        </inkml:channelProperties>
-      </inkml:inkSource>
-      <inkml:timestamp xml:id="ts0" timeString="2022-09-11T15:13:18.246"/>
-    </inkml:context>
-    <inkml:brush xml:id="br0">
-      <inkml:brushProperty name="width" value="0.1" units="cm"/>
-      <inkml:brushProperty name="height" value="0.1" units="cm"/>
-    </inkml:brush>
-  </inkml:definitions>
-  <inkml:trace contextRef="#ctx0" brushRef="#br0">1 995 24575,'14'-21'0,"-1"4"0,3-2 0,3-1 0,2-1 0,12-12 0,-10 7 0,19-14 0,-17 13 0,12-6 0,-6 5 0,-3 2 0,8-2 0,-8 1 0,-1 1 0,-3 5 0,-8 1 0,3 5 0,-8 4 0,-1 1 0,1 3 0,-4 0 0,7 0 0,-3-3 0,3-2 0,1 1 0,0-3 0,-1 3 0,-2-4 0,2 4 0,-3 0 0,1 1 0,1 1 0,-5-1 0,2 3 0,1 0 0,-4-3 0,7-1 0,2-5 0,0 1 0,7 0 0,-2-5 0,9-4 0,-7 5 0,2-2 0,-14 17 0,0-6 0,-5 6 0,1 1 0,-1-3 0,1 2 0,-1-2 0,5-4 0,-4 2 0,3-2 0,0 3 0,-2 0 0,2 0 0,-3 4 0,-4-3 0,3 5 0,-5-4 0,5 4 0,-2-5 0,2 2 0,1-2 0,-1-1 0,1 1 0,0-1 0,-1 3 0,-3-1 0,3 4 0,-5-5 0,5 6 0,-3-3 0,1 0 0,1 2 0,-1-4 0,2 1 0,1-2 0,-1-1 0,1 3 0,-1-2 0,1 6 0,-4-6 0,3 5 0,-3-2 0,4 1 0,-1 1 0,1-5 0,-4 5 0,0-1 0</inkml:trace>
-</inkml:ink>
-</file>
-
-<file path=ppt/ink/ink113.xml><?xml version="1.0" encoding="utf-8"?>
-<inkml:ink xmlns:inkml="http://www.w3.org/2003/InkML">
-  <inkml:definitions>
-    <inkml:context xml:id="ctx0">
-      <inkml:inkSource xml:id="inkSrc0">
-        <inkml:traceFormat>
-          <inkml:channel name="X" type="integer" min="-2.14748E9" max="2.14748E9" units="cm"/>
-          <inkml:channel name="Y" type="integer" min="-2.14748E9" max="2.14748E9" units="cm"/>
-          <inkml:channel name="F" type="integer" max="32767" units="dev"/>
-        </inkml:traceFormat>
-        <inkml:channelProperties>
-          <inkml:channelProperty channel="X" name="resolution" value="1000" units="1/cm"/>
-          <inkml:channelProperty channel="Y" name="resolution" value="1000" units="1/cm"/>
-          <inkml:channelProperty channel="F" name="resolution" value="0" units="1/dev"/>
-        </inkml:channelProperties>
-      </inkml:inkSource>
-      <inkml:timestamp xml:id="ts0" timeString="2022-09-11T15:13:20.333"/>
-    </inkml:context>
-    <inkml:brush xml:id="br0">
-      <inkml:brushProperty name="width" value="0.1" units="cm"/>
-      <inkml:brushProperty name="height" value="0.1" units="cm"/>
-    </inkml:brush>
-  </inkml:definitions>
-  <inkml:trace contextRef="#ctx0" brushRef="#br0">1 1158 24575,'18'0'0,"-1"-4"0,2-4 0,1-4 0,0-3 0,3-1 0,-7-3 0,31-41 0,-19 20 0,2-4 0,-1 2 0,-5 10 0,19-23 0,-24 37 0,22-26 0,-26 25 0,17-17 0,-19 16 0,26-23 0,-19 14 0,14-9 0,-22 15 0,13-10 0,-14 10 0,31-37 0,-26 34 0,23-31 0,-26 39 0,10-15 0,-15 24 0,12-24 0,-11 19 0,25-42 0,-21 34 0,21-30 0,-25 35 0,4-6 0,-9 12 0,2 2 0,-5 2 0,2 1 0,-1 3 0,-1-3 0,2 2 0,0 1 0,-3-3 0,6 3 0,-5-1 0,1 1 0</inkml:trace>
-</inkml:ink>
-</file>
-
-<file path=ppt/ink/ink114.xml><?xml version="1.0" encoding="utf-8"?>
-<inkml:ink xmlns:inkml="http://www.w3.org/2003/InkML">
-  <inkml:definitions>
-    <inkml:context xml:id="ctx0">
-      <inkml:inkSource xml:id="inkSrc0">
-        <inkml:traceFormat>
-          <inkml:channel name="X" type="integer" min="-2.14748E9" max="2.14748E9" units="cm"/>
-          <inkml:channel name="Y" type="integer" min="-2.14748E9" max="2.14748E9" units="cm"/>
-          <inkml:channel name="F" type="integer" max="32767" units="dev"/>
-        </inkml:traceFormat>
-        <inkml:channelProperties>
-          <inkml:channelProperty channel="X" name="resolution" value="1000" units="1/cm"/>
-          <inkml:channelProperty channel="Y" name="resolution" value="1000" units="1/cm"/>
-          <inkml:channelProperty channel="F" name="resolution" value="0" units="1/dev"/>
-        </inkml:channelProperties>
-      </inkml:inkSource>
       <inkml:timestamp xml:id="ts0" timeString="2022-09-11T15:13:22.363"/>
     </inkml:context>
     <inkml:brush xml:id="br0">
@@ -602,7 +494,7 @@
 </inkml:ink>
 </file>
 
-<file path=ppt/ink/ink115.xml><?xml version="1.0" encoding="utf-8"?>
+<file path=ppt/ink/ink111.xml><?xml version="1.0" encoding="utf-8"?>
 <inkml:ink xmlns:inkml="http://www.w3.org/2003/InkML">
   <inkml:definitions>
     <inkml:context xml:id="ctx0">
@@ -629,7 +521,7 @@
 </inkml:ink>
 </file>
 
-<file path=ppt/ink/ink116.xml><?xml version="1.0" encoding="utf-8"?>
+<file path=ppt/ink/ink112.xml><?xml version="1.0" encoding="utf-8"?>
 <inkml:ink xmlns:inkml="http://www.w3.org/2003/InkML">
   <inkml:definitions>
     <inkml:context xml:id="ctx0">
@@ -659,7 +551,7 @@
 </inkml:ink>
 </file>
 
-<file path=ppt/ink/ink117.xml><?xml version="1.0" encoding="utf-8"?>
+<file path=ppt/ink/ink113.xml><?xml version="1.0" encoding="utf-8"?>
 <inkml:ink xmlns:inkml="http://www.w3.org/2003/InkML">
   <inkml:definitions>
     <inkml:context xml:id="ctx0">
@@ -689,7 +581,7 @@
 </inkml:ink>
 </file>
 
-<file path=ppt/ink/ink118.xml><?xml version="1.0" encoding="utf-8"?>
+<file path=ppt/ink/ink114.xml><?xml version="1.0" encoding="utf-8"?>
 <inkml:ink xmlns:inkml="http://www.w3.org/2003/InkML">
   <inkml:definitions>
     <inkml:context xml:id="ctx0">
@@ -719,7 +611,7 @@
 </inkml:ink>
 </file>
 
-<file path=ppt/ink/ink119.xml><?xml version="1.0" encoding="utf-8"?>
+<file path=ppt/ink/ink115.xml><?xml version="1.0" encoding="utf-8"?>
 <inkml:ink xmlns:inkml="http://www.w3.org/2003/InkML">
   <inkml:definitions>
     <inkml:context xml:id="ctx0">
@@ -746,6 +638,126 @@
     </inkml:brush>
   </inkml:definitions>
   <inkml:trace contextRef="#ctx0" brushRef="#br0">259 1 16383,'40'7'0,"-3"-2"0,-26 9 0,0-6 0,3 5 0,-3-8 0,4 8 0,0-8 0,-1 9 0,-2-3 0,2 4 0,-3-1 0,0-3 0,0 3 0,-1-3 0,-2 0 0,9 10 0,-9-12 0,6 11 0,-4-6 0,1 2 0,0-2 0,-1-1 0,1-1 0,-3-1 0,5 5 0,-6-7 0,10 10 0,-9-11 0,5 6 0,0-1 0,-4-5 0,7 9 0,-8-10 0,6 7 0,-3-3 0,0 0 0,-1 3 0,0-6 0,1 5 0,4-5 0,-2 4 0,-2-4 0,1 4 0,2-4 0,0 2 0,0-4 0,6 2 0,-11-2 0,11 2 0,-6 2 0,-2-3 0,4 6 0,-5-8 0,2 3 0,2-1 0,-1 0 0,1 0 0,1-5 0,-3-2 0,6 0 0,-5 0 0,2 0 0,0 0 0,-2 0 0,5 6 0,-5-1 0,3 1 0,0 0 0,-5-2 0,4 3 0,-8 8 0,-2-4 0,-3 8 0,-16-2 0,3-2 0,-11-1 0,7-4 0,-1-2 0,1 2 0,3-3 0,-4 6 0,3-9 0,-8 8 0,8-7 0,-4 5 0,2-4 0,0 1 0,-2 0 0,3 2 0,3 1 0,-2 6 0,5-5 0,-3 4 0,1-5 0,-2 4 0,-2-1 0,3 0 0,0-3 0,4 6 0,-4-5 0,3 5 0,-6-6 0,6 3 0,-12-9 0,7-2 0,-8-6 0,1-4 0,3 4 0,-3-3 0,5 3 0,-1-3 0,-3-3 0,7 5 0,-6-4 0,3-2 0,2 3 0,-5-9 0,6 9 0,0-6 0,-3 6 0,3-6 0,-1 3 0,-2-1 0,6-1 0,-6 4 0,3-7 0,0 7 0,-2-4 0,-1-1 0,2 6 0,-5-9 0,10 10 0,-7-7 0,6 3 0,-6-1 0,6-2 0,-6 6 0,6-6 0,-5 4 0,2-2 0,-3 3 0,0 2 0,-3 0 0,6 1 0,-5-1 0,2 3 0,0-2 0,-3 0 0,4-4 0,0-1 0,0 5 0,-4 3 0,3 0 0,-3 2 0,1-2 0,3 3 0,-5 0 0,4 0 0,-2 3 0,0 1 0,3-1 0,-6 0 0,6-3 0,-3 0 0,1 0 0,-1 0 0</inkml:trace>
+</inkml:ink>
+</file>
+
+<file path=ppt/ink/ink116.xml><?xml version="1.0" encoding="utf-8"?>
+<inkml:ink xmlns:inkml="http://www.w3.org/2003/InkML">
+  <inkml:definitions>
+    <inkml:context xml:id="ctx0">
+      <inkml:inkSource xml:id="inkSrc0">
+        <inkml:traceFormat>
+          <inkml:channel name="X" type="integer" min="-2.14748E9" max="2.14748E9" units="cm"/>
+          <inkml:channel name="Y" type="integer" min="-2.14748E9" max="2.14748E9" units="cm"/>
+          <inkml:channel name="F" type="integer" max="32767" units="dev"/>
+        </inkml:traceFormat>
+        <inkml:channelProperties>
+          <inkml:channelProperty channel="X" name="resolution" value="1000" units="1/cm"/>
+          <inkml:channelProperty channel="Y" name="resolution" value="1000" units="1/cm"/>
+          <inkml:channelProperty channel="F" name="resolution" value="0" units="1/dev"/>
+        </inkml:channelProperties>
+      </inkml:inkSource>
+      <inkml:timestamp xml:id="ts0" timeString="2022-09-11T15:14:05.695"/>
+    </inkml:context>
+    <inkml:brush xml:id="br0">
+      <inkml:brushProperty name="width" value="0.3" units="cm"/>
+      <inkml:brushProperty name="height" value="0.6" units="cm"/>
+      <inkml:brushProperty name="color" value="#EF0C4D"/>
+      <inkml:brushProperty name="tip" value="rectangle"/>
+      <inkml:brushProperty name="rasterOp" value="maskPen"/>
+    </inkml:brush>
+  </inkml:definitions>
+  <inkml:trace contextRef="#ctx0" brushRef="#br0">366 0 16383,'-9'68'0,"-9"2"0,7-33 0,-12 17 0,9-11 0,3 9 0,-4-20 0,13 2 0,-9-10 0,7 0 0,0 0 0,-4 1 0,4-6 0,-4 9 0,-4-2 0,2 9 0,-7 6 0,3-5 0,-5 10 0,2-14 0,3 7 0,0-18 0,5 3 0,2-13 0,0 3 0,3-1 0,-6 1 0,0-1 0,-3 0 0,3-6 0,-3 5 0,0-4 0,2 1 0,20-42 0,-1 26 0,15-30 0,-9 34 0,-3 2 0,10-2 0,-5 3 0,5 0 0,-2 0 0,-3 0 0,7 0 0,-3 0 0,0 0 0,3 0 0,-3 0 0,0 0 0,3 0 0,-7 0 0,3 0 0,-5 0 0,5 0 0,-3 0 0,7 0 0,-7 0 0,2 0 0,1 0 0,-7 0 0,6 0 0,0 3 0,-2-2 0,6 2 0,-8-3 0,1 0 0,3 0 0,-3 0 0,3 0 0,-4 0 0,0 0 0,3 3 0,1-2 0,1 2 0,-5-3 0,6 0 0,-11 0 0,14 0 0,-9 0 0,-1 0 0,8 0 0,-12 14 0,3-5 0,-9 13 0,-3-6 0,0-5 0,26-5 0,-16-4 0,20-5 0,-17 3 0,-5 0 0,15-9 0,-13 4 0,7-7 0,-7-5 0,2 4 0,2-8 0,-2 2 0,3-1 0,-4 0 0,2-3 0,-2 3 0,-3 0 0,-1 1 0,1 1 0,-1 2 0,1-3 0,-1 4 0,1 1 0,-1-5 0,-3 3 0,3-3 0,-3 4 0,0 1 0,3-1 0,-3-2 0,3 5 0,-3-5 0,5-1 0,-4 2 0,6-5 0,-4 6 0,0 4 0,3-5 0,-2 7 0,-32-4 0,9 6 0,-29 0 0,15 2 0,3-2 0,-8 2 0,4-7 0,0 2 0,-4-2 0,4-1 0,0 0 0,1-3 0,5 0 0,0 3 0,0-2 0,4 6 0,-3-2 0,7 3 0,-7 0 0,7-2 0,-3 1 0,5-1 0,-1 2 0,-7-2 0,9 2 0,-8-3 0,10 1 0,-3 5 0,-4-7 0,6 10 0,-5-7 0,4 5 0,-1 0 0,1-10 0,13 51 0,3-32 0,7 39 0,-2-30 0,-1-3 0,0 3 0,0 1 0,1 0 0,-1 2 0,-3-1 0,-1 1 0,0-3 0,-2 3 0,2-3 0,-3 2 0,0 1 0,0-3 0,3 2 0,1 1 0,0-2 0,2 1 0,-6-2 0,3-1 0</inkml:trace>
+</inkml:ink>
+</file>
+
+<file path=ppt/ink/ink117.xml><?xml version="1.0" encoding="utf-8"?>
+<inkml:ink xmlns:inkml="http://www.w3.org/2003/InkML">
+  <inkml:definitions>
+    <inkml:context xml:id="ctx0">
+      <inkml:inkSource xml:id="inkSrc0">
+        <inkml:traceFormat>
+          <inkml:channel name="X" type="integer" min="-2.14748E9" max="2.14748E9" units="cm"/>
+          <inkml:channel name="Y" type="integer" min="-2.14748E9" max="2.14748E9" units="cm"/>
+          <inkml:channel name="F" type="integer" max="32767" units="dev"/>
+        </inkml:traceFormat>
+        <inkml:channelProperties>
+          <inkml:channelProperty channel="X" name="resolution" value="1000" units="1/cm"/>
+          <inkml:channelProperty channel="Y" name="resolution" value="1000" units="1/cm"/>
+          <inkml:channelProperty channel="F" name="resolution" value="0" units="1/dev"/>
+        </inkml:channelProperties>
+      </inkml:inkSource>
+      <inkml:timestamp xml:id="ts0" timeString="2022-09-11T15:14:10.773"/>
+    </inkml:context>
+    <inkml:brush xml:id="br0">
+      <inkml:brushProperty name="width" value="0.3" units="cm"/>
+      <inkml:brushProperty name="height" value="0.6" units="cm"/>
+      <inkml:brushProperty name="color" value="#EF0C4D"/>
+      <inkml:brushProperty name="tip" value="rectangle"/>
+      <inkml:brushProperty name="rasterOp" value="maskPen"/>
+    </inkml:brush>
+  </inkml:definitions>
+  <inkml:trace contextRef="#ctx0" brushRef="#br0">355 9 16383,'70'0'0,"8"0"0,-38 0 0,31 0 0,-25 0 0,16 0 0,-9 0 0,-5 0 0,-1 0 0,-5 0 0,-2 0 0,1 0 0,-5 0 0,5 0 0,-1 0 0,2 0 0,6 0 0,-6-4 0,-2 4 0,-10-4 0,-1 4 0,-9 0 0,-5 0 0,2 0 0,-4 0 0,4 0 0,2 0 0,-6 8 0,0-3 0,0 14 0,-9-5 0,2 4 0,-6-1 0,0 2 0,0-3 0,0 7 0,0-3 0,0-1 0,0 4 0,0 2 0,0 1 0,0 7 0,0-2 0,0-1 0,0 4 0,0-4 0,-4 0 0,3-1 0,-6-5 0,6-4 0,-5-5 0,5 1 0,-4-5 0,1 8 0,0-5 0,2 1 0,-2 5 0,3-8 0,-2 9 0,0-8 0,39-50 0,-23 24 0,32-42 0,-29 32 0,-5 7 0,4-3 0,-7 1 0,3 2 0,-3-7 0,-4 3 0,0-4 0,-1 0 0,-2-1 0,3 6 0,-4-5 0,0 9 0,0-1 0,0 0 0,0 5 0,0-9 0,0 6 0,0-3 0,0 1 0,-22 50 0,13-11 0,-22 41 0,21-18 0,-3-4 0,4 5 0,-1-5 0,5 4 0,-2-9 0,2 19 0,0-22 0,-3 30 0,7-42 0,-2 18 0,3-32 0,0 4 0,-9 9 0,4-14 0,-13 14 0,6-20 0,-6 2 0,-1-3 0,4 0 0,-8 0 0,7 0 0,-7 0 0,7 0 0,-7 0 0,7 0 0,-7 0 0,3 0 0,-4 0 0,0 0 0,-5 0 0,-1 0 0,-5 0 0,0 0 0,-6 0 0,5 0 0,-10 0 0,9 0 0,-3 0 0,5 0 0,0 0 0,0 0 0,5 0 0,-4 0 0,-18 0 0,12 0 0,-44 0 0,47 0 0,-36 0 0,44 0 0,-21 3 0,28-2 0,-15 2 0,20-3 0,-21 0 0,16 0 0,-24 0 0,23 0 0,-18 0 0,24 0 0,-13 0 0,17-3 0,0-3 0,13-16 0,7 3 0,4-7 0,4 11 0,9-12 0,3 3 0,-3-6 0,-1-15 0,-15 21 0,3-58 0,-6 37 0,-2-10 0,1 0 0,1 10 0,3-38 0,-4 62 0,-1-23 0,-3 35 0,0-10 0,18 10 0,0 1 0,9 2 0,5 2 0,-15 4 0,20 0 0,-19 0 0,22 10 0,-22-4 0,28 25 0,-27-16 0,31 24 0,-31-25 0,49 14 0,-35-22 0,56 5 0,-48-11 0,22 0 0,-37 0 0,12 0 0,-20 0 0,15 3 0,-20-2 0,12 2 0,-16-3 0,20 0 0,-15 0 0,23 0 0,-19 0 0,22 0 0,-22 0 0,26 0 0,-21 0 0,31 0 0,-29 0 0,24 4 0,-30-3 0,11 5 0,-18-5 0,0 2 0</inkml:trace>
+</inkml:ink>
+</file>
+
+<file path=ppt/ink/ink118.xml><?xml version="1.0" encoding="utf-8"?>
+<inkml:ink xmlns:inkml="http://www.w3.org/2003/InkML">
+  <inkml:definitions>
+    <inkml:context xml:id="ctx0">
+      <inkml:inkSource xml:id="inkSrc0">
+        <inkml:traceFormat>
+          <inkml:channel name="X" type="integer" min="-2.14748E9" max="2.14748E9" units="cm"/>
+          <inkml:channel name="Y" type="integer" min="-2.14748E9" max="2.14748E9" units="cm"/>
+          <inkml:channel name="F" type="integer" max="32767" units="dev"/>
+        </inkml:traceFormat>
+        <inkml:channelProperties>
+          <inkml:channelProperty channel="X" name="resolution" value="1000" units="1/cm"/>
+          <inkml:channelProperty channel="Y" name="resolution" value="1000" units="1/cm"/>
+          <inkml:channelProperty channel="F" name="resolution" value="0" units="1/dev"/>
+        </inkml:channelProperties>
+      </inkml:inkSource>
+      <inkml:timestamp xml:id="ts0" timeString="2022-09-11T15:14:16.851"/>
+    </inkml:context>
+    <inkml:brush xml:id="br0">
+      <inkml:brushProperty name="width" value="0.3" units="cm"/>
+      <inkml:brushProperty name="height" value="0.6" units="cm"/>
+      <inkml:brushProperty name="color" value="#EF0C4D"/>
+      <inkml:brushProperty name="tip" value="rectangle"/>
+      <inkml:brushProperty name="rasterOp" value="maskPen"/>
+    </inkml:brush>
+  </inkml:definitions>
+  <inkml:trace contextRef="#ctx0" brushRef="#br0">133 169 16383,'88'-24'0,"-3"-8"0,-27 20 0,13-18 0,-19 14 0,15-6 0,-12 8 0,-7 4 0,-12 5 0,-7 1 0,-9 4 0,-1 0 0,9 0 0,-6 0 0,15 0 0,-11 0 0,29 0 0,-24 0 0,24 0 0,-37 0 0,10 0 0,-19 0 0,9 0 0,-1 0 0,-6 0 0,11 6 0,-8 1 0,3 4 0,12 3 0,-15-6 0,16 12 0,-21-11 0,14 20 0,-15-20 0,8 24 0,-8-24 0,2 15 0,-3-10 0,0 8 0,0-7 0,3 11 0,-2-13 0,4 10 0,-4-11 0,11 16 0,-10-17 0,10 24 0,-11-25 0,8 23 0,-11-20 0,11 24 0,-10-14 0,4 18 0,-2-19 0,2 16 0,-5-25 0,4 16 0,-8-21 0,2 8 0,0 1 0,-2-8 0,-16 9 0,4-15 0,-16 0 0,13-3 0,-5 0 0,-1 0 0,-9 0 0,4 0 0,-9 0 0,-2 0 0,0 0 0,-5 0 0,1 5 0,3 0 0,-9 4 0,5 0 0,-7 1 0,1-1 0,5 0 0,-4 1 0,10-2 0,0 1 0,2 0 0,9-1 0,0 3 0,2-2 0,7 2 0,-6-3 0,6-1 0,-7 5 0,3 0 0,-15 7 0,8-2 0,-4 2 0,13-7 0,3-1 0,4-4 0,-2 3 0,0 0 0,-1 0 0,-2-3 0,3 1 0,0 0 0,0 5 0,3-3 0,-3-1 0,3 1 0,-3 0 0,3 3 0,-4-49 0,1 16 0,0-43 0,-3 28 0,6-6 0,-3 5 0,-1-10 0,4 10 0,-3-5 0,4 6 0,1 5 0,0 1 0,0 5 0,0 4 0,0-3 0,0 7 0,1-3 0,-1 4 0,1-3 0,-1 2 0,1-3 0,-1 0 0,0-1 0,1 0 0,-1 2 0,1 3 0,3 0 0,-2 1 0,2-3 0,0 1 0,-2 2 0,2-5 0,1 7 0,-4-8 0,3 2 0,1 3 0,-1-2 0,1 3 0,2-1 0,-2-9 0,3 7 0,0-3 0,0 6 0,0 1 0,0 64 0,5-14 0,0 49 0,10-19 0,-1-22 0,7 20 0,-2-16 0,-3 6 0,2-2 0,-4-11 0,0-6 0,-2-11 0,-4-6 0,-1-8 0,0 2 0,-1 0 0,-2 2 0,2 2 0,-2-3 0,0 1 0,3 4 0,-3-3 0,4 7 0,0-8 0,0 8 0,-1-7 0,0-1 0,4-1 0,-3-3 0,2 4 0,-2 0 0,-1-1 0,4 1 0,-3 0 0,2-1 0,2 5 0,-4 1 0,7 4 0,-2 0 0,-1-4 0,3 3 0,-3-7 0,0 3 0,2-4 0,-6-4 0,5 2 0,-1-9 0,0-41 0,-3 11 0,-5-36 0,0 27 0,-3 0 0,3-6 0,0 5 0,1-5 0,4 6 0,-5 5 0,4 1 0,-7 5 0,6 4 0,-7 5 0,7 2 0,-4 0 0,4-5 0,0-2 0,0 1 0,0 2 0,-3 6 0,6-10 0,-5 9 0,6-9 0,0 2 0,1-1 0,3 0 0,2-8 0,3 6 0,3-8 0,-2 9 0,4-4 0,-9 9 0,0-1 0,-2 4 0,-7 8 0,9-4 0,-2 8 0,4-2 0,-1 3 0,0 0 0,-2 0 0,2 0 0,-1 6 0,1 2 0,5 3 0,-3-4 0,4 0 0,-7-3 0,7 0 0,-3 3 0,4-2 0,-4 2 0,3 1 0,-8 0 0,9 0 0,-9-1 0,4 1 0,-8-1 0,6 0 0,-6-1 0,0 9 0,-5-2 0,-6 6 0,0-4 0,0 0 0,-7 10 0,2-8 0,-6 9 0,0-7 0,-1 1 0,-4 4 0,-5 1 0,-1 5 0,-5-2 0,0 3 0,1-5 0,4-5 0,-3 4 0,5-8 0,-1 0 0,-2-2 0,3-3 0,-4 1 0,4-2 0,-3 0 0,8-2 0,-4 2 0,4-4 0,4-3 0,42-28 0,-9 10 0,31-23 0,-19 20 0,-4 4 0,11-7 0,-4 6 0,9-6 0,-14 7 0,22-8 0,-32 14 0,15-10 0,-29 16 0,2-2 0,2-20 0,-6 2 0,2-6 0,-8 12 0</inkml:trace>
+</inkml:ink>
+</file>
+
+<file path=ppt/ink/ink119.xml><?xml version="1.0" encoding="utf-8"?>
+<inkml:ink xmlns:inkml="http://www.w3.org/2003/InkML">
+  <inkml:definitions>
+    <inkml:context xml:id="ctx0">
+      <inkml:inkSource xml:id="inkSrc0">
+        <inkml:traceFormat>
+          <inkml:channel name="X" type="integer" min="-2.14748E9" max="2.14748E9" units="cm"/>
+          <inkml:channel name="Y" type="integer" min="-2.14748E9" max="2.14748E9" units="cm"/>
+          <inkml:channel name="F" type="integer" max="32767" units="dev"/>
+        </inkml:traceFormat>
+        <inkml:channelProperties>
+          <inkml:channelProperty channel="X" name="resolution" value="1000" units="1/cm"/>
+          <inkml:channelProperty channel="Y" name="resolution" value="1000" units="1/cm"/>
+          <inkml:channelProperty channel="F" name="resolution" value="0" units="1/dev"/>
+        </inkml:channelProperties>
+      </inkml:inkSource>
+      <inkml:timestamp xml:id="ts0" timeString="2022-09-11T15:14:24.128"/>
+    </inkml:context>
+    <inkml:brush xml:id="br0">
+      <inkml:brushProperty name="width" value="0.3" units="cm"/>
+      <inkml:brushProperty name="height" value="0.6" units="cm"/>
+      <inkml:brushProperty name="color" value="#EF0C4D"/>
+      <inkml:brushProperty name="tip" value="rectangle"/>
+      <inkml:brushProperty name="rasterOp" value="maskPen"/>
+    </inkml:brush>
+  </inkml:definitions>
+  <inkml:trace contextRef="#ctx0" brushRef="#br0">33 693 16383,'45'-33'0,"0"6"0,-19 6 0,4 0 0,4 2 0,-6-2 0,13-2 0,-15 1 0,10 3 0,-14-4 0,11 8 0,-15-1 0,10 1 0,-12 3 0,7-4 0,-11 1 0,6 0 0,-6 0 0,2 1 0,1-1 0,0 0 0,-1 1 0,-2-1 0,-2 4 0,0-3 0,1 4 0,0-1 0,1-5 0,-4 4 0,2-2 0,0-2 0,-3 9 0,6-9 0,-3 3 0,0 3 0,2-9 0,-4 7 0,2-5 0,0 2 0,-1 1 0,4-1 0,-5 4 0,3-3 0,5 12 0,-3 0 0,7 9 0,-6 0 0,1 4 0,0-3 0,-4 6 0,3-3 0,-6 0 0,6 3 0,-7-3 0,7 1 0,-6 1 0,6-4 0,-2 4 0,2-4 0,1 4 0,4-4 0,-3 2 0,2-1 0,-3-1 0,0 1 0,-1 1 0,1-3 0,-4 2 0,2 4 0,-5-6 0,5 11 0,-2-7 0,0 2 0,-1 0 0,-3-3 0,4 1 0,-3 1 0,5-2 0,-2 3 0,-1-4 0,6 3 0,-8-5 0,9 5 0,-3-2 0,2 0 0,1 0 0,-6-4 0,3 0 0,0 3 0,-2-3 0,5 4 0,-7-2 0,5-1 0,-2 5 0,-2-5 0,4 4 0,-4-5 0,5 0 0,0-4 0,1-3 0,1 0 0,0 0 0,-4 0 0,4 3 0,-3-2 0,1 2 0,0-3 0,-2 0 0,5-3 0,-51 36 0,28-21 0,-42 31 0,38-32 0,-2-1 0,0 2 0,0-1 0,-1 3 0,-5 1 0,8-6 0,-5 3 0,3 1 0,0-5 0,-3 4 0,-4-2 0,6-2 0,-6 2 0,6-3 0,-7 3 0,3-2 0,1 2 0,-3 1 0,9-4 0,-8 6 0,6-3 0,-1 0 0,-1 3 0,4-3 0,-4 3 0,2-3 0,-3 2 0,0-1 0,2-1 0,2 5 0,-1-4 0,0 2 0,-7 0 0,6-2 0,-2 0 0,2-1 0,1 0 0,-1 0 0,-2 4 0,3-1 0,0-3 0,-3 0 0,2-1 0,-3 2 0,2-1 0,-1 3 0,0-6 0,-4 5 0,6-4 0,-5 2 0,6-1 0,-3-2 0,-2 2 0,1-2 0,-2-3 0,0-2 0,2-2 0,-3 0 0,3 0 0,-1 0 0,-3 0 0,0 0 0,3 0 0,-4-3 0,7-4 0,-5-1 0,0-4 0,5 7 0,-5-5 0,7 4 0,-5-2 0,-1-5 0,3 1 0,-3 1 0,8 1 0,-6 3 0,-4-4 0,-2-1 0,-2 1 0,3-4 0,0 7 0,3-6 0,-3 2 0,1-3 0,2 0 0,-3 0 0,4 0 0,1 1 0,-1-1 0,0 0 0,1 4 0,3 1 0,-3-1 0,3 3 0,-4-2 0,-3 3 0,3-1 0,-3 1 0,4 0 0,3 0 0,-10-4 0,9 0 0,-10 0 0,11 1 0,-2 2 0,-5-2 0,5 2 0,-7 1 0,9-2 0,-3 8 0,-2-8 0,2 5 0,-2-5 0,3 2 0,4-5 0,2-3 0,5 1 0,29-2 0,-4 6 0,35 5 0,-8-4 0,5 8 0,4-8 0,-4 8 0,6-3 0,0 4 0,-6 0 0,-7 0 0,-12 0 0,-7 0 0,-5 0 0,-4 0 0,-1 3 0,-8-2 0,6 5 0,-3-2 0,0 0 0,5 2 0,-8-5 0,9 2 0,-4-3 0,1 0 0,-2 0 0,4 0 0,1 0 0,0 0 0,-1 0 0,-5 0 0,0-3 0,3-1 0,-3 0 0,3-2 0,0 2 0,-5-3 0,4 1 0,-2-1 0,0 0 0,4-4 0,-3 3 0,-1-6 0,5 2 0,1-3 0,4-1 0,7-6 0,-6 5 0,6-10 0,-6 10 0,-4-3 0,-2 8 0,-5-2 0,1 6 0,0-2 0,-1 2 0,0 1 0,0 0 0,2 4 0,-2-3 0,2 5 0,1-1 0,-3 2 0,3 0 0,-4 0 0</inkml:trace>
 </inkml:ink>
 </file>
 
@@ -792,126 +804,6 @@
           <inkml:channelProperty channel="F" name="resolution" value="0" units="1/dev"/>
         </inkml:channelProperties>
       </inkml:inkSource>
-      <inkml:timestamp xml:id="ts0" timeString="2022-09-11T15:14:05.695"/>
-    </inkml:context>
-    <inkml:brush xml:id="br0">
-      <inkml:brushProperty name="width" value="0.3" units="cm"/>
-      <inkml:brushProperty name="height" value="0.6" units="cm"/>
-      <inkml:brushProperty name="color" value="#EF0C4D"/>
-      <inkml:brushProperty name="tip" value="rectangle"/>
-      <inkml:brushProperty name="rasterOp" value="maskPen"/>
-    </inkml:brush>
-  </inkml:definitions>
-  <inkml:trace contextRef="#ctx0" brushRef="#br0">366 0 16383,'-9'68'0,"-9"2"0,7-33 0,-12 17 0,9-11 0,3 9 0,-4-20 0,13 2 0,-9-10 0,7 0 0,0 0 0,-4 1 0,4-6 0,-4 9 0,-4-2 0,2 9 0,-7 6 0,3-5 0,-5 10 0,2-14 0,3 7 0,0-18 0,5 3 0,2-13 0,0 3 0,3-1 0,-6 1 0,0-1 0,-3 0 0,3-6 0,-3 5 0,0-4 0,2 1 0,20-42 0,-1 26 0,15-30 0,-9 34 0,-3 2 0,10-2 0,-5 3 0,5 0 0,-2 0 0,-3 0 0,7 0 0,-3 0 0,0 0 0,3 0 0,-3 0 0,0 0 0,3 0 0,-7 0 0,3 0 0,-5 0 0,5 0 0,-3 0 0,7 0 0,-7 0 0,2 0 0,1 0 0,-7 0 0,6 0 0,0 3 0,-2-2 0,6 2 0,-8-3 0,1 0 0,3 0 0,-3 0 0,3 0 0,-4 0 0,0 0 0,3 3 0,1-2 0,1 2 0,-5-3 0,6 0 0,-11 0 0,14 0 0,-9 0 0,-1 0 0,8 0 0,-12 14 0,3-5 0,-9 13 0,-3-6 0,0-5 0,26-5 0,-16-4 0,20-5 0,-17 3 0,-5 0 0,15-9 0,-13 4 0,7-7 0,-7-5 0,2 4 0,2-8 0,-2 2 0,3-1 0,-4 0 0,2-3 0,-2 3 0,-3 0 0,-1 1 0,1 1 0,-1 2 0,1-3 0,-1 4 0,1 1 0,-1-5 0,-3 3 0,3-3 0,-3 4 0,0 1 0,3-1 0,-3-2 0,3 5 0,-3-5 0,5-1 0,-4 2 0,6-5 0,-4 6 0,0 4 0,3-5 0,-2 7 0,-32-4 0,9 6 0,-29 0 0,15 2 0,3-2 0,-8 2 0,4-7 0,0 2 0,-4-2 0,4-1 0,0 0 0,1-3 0,5 0 0,0 3 0,0-2 0,4 6 0,-3-2 0,7 3 0,-7 0 0,7-2 0,-3 1 0,5-1 0,-1 2 0,-7-2 0,9 2 0,-8-3 0,10 1 0,-3 5 0,-4-7 0,6 10 0,-5-7 0,4 5 0,-1 0 0,1-10 0,13 51 0,3-32 0,7 39 0,-2-30 0,-1-3 0,0 3 0,0 1 0,1 0 0,-1 2 0,-3-1 0,-1 1 0,0-3 0,-2 3 0,2-3 0,-3 2 0,0 1 0,0-3 0,3 2 0,1 1 0,0-2 0,2 1 0,-6-2 0,3-1 0</inkml:trace>
-</inkml:ink>
-</file>
-
-<file path=ppt/ink/ink121.xml><?xml version="1.0" encoding="utf-8"?>
-<inkml:ink xmlns:inkml="http://www.w3.org/2003/InkML">
-  <inkml:definitions>
-    <inkml:context xml:id="ctx0">
-      <inkml:inkSource xml:id="inkSrc0">
-        <inkml:traceFormat>
-          <inkml:channel name="X" type="integer" min="-2.14748E9" max="2.14748E9" units="cm"/>
-          <inkml:channel name="Y" type="integer" min="-2.14748E9" max="2.14748E9" units="cm"/>
-          <inkml:channel name="F" type="integer" max="32767" units="dev"/>
-        </inkml:traceFormat>
-        <inkml:channelProperties>
-          <inkml:channelProperty channel="X" name="resolution" value="1000" units="1/cm"/>
-          <inkml:channelProperty channel="Y" name="resolution" value="1000" units="1/cm"/>
-          <inkml:channelProperty channel="F" name="resolution" value="0" units="1/dev"/>
-        </inkml:channelProperties>
-      </inkml:inkSource>
-      <inkml:timestamp xml:id="ts0" timeString="2022-09-11T15:14:10.773"/>
-    </inkml:context>
-    <inkml:brush xml:id="br0">
-      <inkml:brushProperty name="width" value="0.3" units="cm"/>
-      <inkml:brushProperty name="height" value="0.6" units="cm"/>
-      <inkml:brushProperty name="color" value="#EF0C4D"/>
-      <inkml:brushProperty name="tip" value="rectangle"/>
-      <inkml:brushProperty name="rasterOp" value="maskPen"/>
-    </inkml:brush>
-  </inkml:definitions>
-  <inkml:trace contextRef="#ctx0" brushRef="#br0">355 9 16383,'70'0'0,"8"0"0,-38 0 0,31 0 0,-25 0 0,16 0 0,-9 0 0,-5 0 0,-1 0 0,-5 0 0,-2 0 0,1 0 0,-5 0 0,5 0 0,-1 0 0,2 0 0,6 0 0,-6-4 0,-2 4 0,-10-4 0,-1 4 0,-9 0 0,-5 0 0,2 0 0,-4 0 0,4 0 0,2 0 0,-6 8 0,0-3 0,0 14 0,-9-5 0,2 4 0,-6-1 0,0 2 0,0-3 0,0 7 0,0-3 0,0-1 0,0 4 0,0 2 0,0 1 0,0 7 0,0-2 0,0-1 0,0 4 0,0-4 0,-4 0 0,3-1 0,-6-5 0,6-4 0,-5-5 0,5 1 0,-4-5 0,1 8 0,0-5 0,2 1 0,-2 5 0,3-8 0,-2 9 0,0-8 0,39-50 0,-23 24 0,32-42 0,-29 32 0,-5 7 0,4-3 0,-7 1 0,3 2 0,-3-7 0,-4 3 0,0-4 0,-1 0 0,-2-1 0,3 6 0,-4-5 0,0 9 0,0-1 0,0 0 0,0 5 0,0-9 0,0 6 0,0-3 0,0 1 0,-22 50 0,13-11 0,-22 41 0,21-18 0,-3-4 0,4 5 0,-1-5 0,5 4 0,-2-9 0,2 19 0,0-22 0,-3 30 0,7-42 0,-2 18 0,3-32 0,0 4 0,-9 9 0,4-14 0,-13 14 0,6-20 0,-6 2 0,-1-3 0,4 0 0,-8 0 0,7 0 0,-7 0 0,7 0 0,-7 0 0,7 0 0,-7 0 0,3 0 0,-4 0 0,0 0 0,-5 0 0,-1 0 0,-5 0 0,0 0 0,-6 0 0,5 0 0,-10 0 0,9 0 0,-3 0 0,5 0 0,0 0 0,0 0 0,5 0 0,-4 0 0,-18 0 0,12 0 0,-44 0 0,47 0 0,-36 0 0,44 0 0,-21 3 0,28-2 0,-15 2 0,20-3 0,-21 0 0,16 0 0,-24 0 0,23 0 0,-18 0 0,24 0 0,-13 0 0,17-3 0,0-3 0,13-16 0,7 3 0,4-7 0,4 11 0,9-12 0,3 3 0,-3-6 0,-1-15 0,-15 21 0,3-58 0,-6 37 0,-2-10 0,1 0 0,1 10 0,3-38 0,-4 62 0,-1-23 0,-3 35 0,0-10 0,18 10 0,0 1 0,9 2 0,5 2 0,-15 4 0,20 0 0,-19 0 0,22 10 0,-22-4 0,28 25 0,-27-16 0,31 24 0,-31-25 0,49 14 0,-35-22 0,56 5 0,-48-11 0,22 0 0,-37 0 0,12 0 0,-20 0 0,15 3 0,-20-2 0,12 2 0,-16-3 0,20 0 0,-15 0 0,23 0 0,-19 0 0,22 0 0,-22 0 0,26 0 0,-21 0 0,31 0 0,-29 0 0,24 4 0,-30-3 0,11 5 0,-18-5 0,0 2 0</inkml:trace>
-</inkml:ink>
-</file>
-
-<file path=ppt/ink/ink122.xml><?xml version="1.0" encoding="utf-8"?>
-<inkml:ink xmlns:inkml="http://www.w3.org/2003/InkML">
-  <inkml:definitions>
-    <inkml:context xml:id="ctx0">
-      <inkml:inkSource xml:id="inkSrc0">
-        <inkml:traceFormat>
-          <inkml:channel name="X" type="integer" min="-2.14748E9" max="2.14748E9" units="cm"/>
-          <inkml:channel name="Y" type="integer" min="-2.14748E9" max="2.14748E9" units="cm"/>
-          <inkml:channel name="F" type="integer" max="32767" units="dev"/>
-        </inkml:traceFormat>
-        <inkml:channelProperties>
-          <inkml:channelProperty channel="X" name="resolution" value="1000" units="1/cm"/>
-          <inkml:channelProperty channel="Y" name="resolution" value="1000" units="1/cm"/>
-          <inkml:channelProperty channel="F" name="resolution" value="0" units="1/dev"/>
-        </inkml:channelProperties>
-      </inkml:inkSource>
-      <inkml:timestamp xml:id="ts0" timeString="2022-09-11T15:14:16.851"/>
-    </inkml:context>
-    <inkml:brush xml:id="br0">
-      <inkml:brushProperty name="width" value="0.3" units="cm"/>
-      <inkml:brushProperty name="height" value="0.6" units="cm"/>
-      <inkml:brushProperty name="color" value="#EF0C4D"/>
-      <inkml:brushProperty name="tip" value="rectangle"/>
-      <inkml:brushProperty name="rasterOp" value="maskPen"/>
-    </inkml:brush>
-  </inkml:definitions>
-  <inkml:trace contextRef="#ctx0" brushRef="#br0">133 169 16383,'88'-24'0,"-3"-8"0,-27 20 0,13-18 0,-19 14 0,15-6 0,-12 8 0,-7 4 0,-12 5 0,-7 1 0,-9 4 0,-1 0 0,9 0 0,-6 0 0,15 0 0,-11 0 0,29 0 0,-24 0 0,24 0 0,-37 0 0,10 0 0,-19 0 0,9 0 0,-1 0 0,-6 0 0,11 6 0,-8 1 0,3 4 0,12 3 0,-15-6 0,16 12 0,-21-11 0,14 20 0,-15-20 0,8 24 0,-8-24 0,2 15 0,-3-10 0,0 8 0,0-7 0,3 11 0,-2-13 0,4 10 0,-4-11 0,11 16 0,-10-17 0,10 24 0,-11-25 0,8 23 0,-11-20 0,11 24 0,-10-14 0,4 18 0,-2-19 0,2 16 0,-5-25 0,4 16 0,-8-21 0,2 8 0,0 1 0,-2-8 0,-16 9 0,4-15 0,-16 0 0,13-3 0,-5 0 0,-1 0 0,-9 0 0,4 0 0,-9 0 0,-2 0 0,0 0 0,-5 0 0,1 5 0,3 0 0,-9 4 0,5 0 0,-7 1 0,1-1 0,5 0 0,-4 1 0,10-2 0,0 1 0,2 0 0,9-1 0,0 3 0,2-2 0,7 2 0,-6-3 0,6-1 0,-7 5 0,3 0 0,-15 7 0,8-2 0,-4 2 0,13-7 0,3-1 0,4-4 0,-2 3 0,0 0 0,-1 0 0,-2-3 0,3 1 0,0 0 0,0 5 0,3-3 0,-3-1 0,3 1 0,-3 0 0,3 3 0,-4-49 0,1 16 0,0-43 0,-3 28 0,6-6 0,-3 5 0,-1-10 0,4 10 0,-3-5 0,4 6 0,1 5 0,0 1 0,0 5 0,0 4 0,0-3 0,0 7 0,1-3 0,-1 4 0,1-3 0,-1 2 0,1-3 0,-1 0 0,0-1 0,1 0 0,-1 2 0,1 3 0,3 0 0,-2 1 0,2-3 0,0 1 0,-2 2 0,2-5 0,1 7 0,-4-8 0,3 2 0,1 3 0,-1-2 0,1 3 0,2-1 0,-2-9 0,3 7 0,0-3 0,0 6 0,0 1 0,0 64 0,5-14 0,0 49 0,10-19 0,-1-22 0,7 20 0,-2-16 0,-3 6 0,2-2 0,-4-11 0,0-6 0,-2-11 0,-4-6 0,-1-8 0,0 2 0,-1 0 0,-2 2 0,2 2 0,-2-3 0,0 1 0,3 4 0,-3-3 0,4 7 0,0-8 0,0 8 0,-1-7 0,0-1 0,4-1 0,-3-3 0,2 4 0,-2 0 0,-1-1 0,4 1 0,-3 0 0,2-1 0,2 5 0,-4 1 0,7 4 0,-2 0 0,-1-4 0,3 3 0,-3-7 0,0 3 0,2-4 0,-6-4 0,5 2 0,-1-9 0,0-41 0,-3 11 0,-5-36 0,0 27 0,-3 0 0,3-6 0,0 5 0,1-5 0,4 6 0,-5 5 0,4 1 0,-7 5 0,6 4 0,-7 5 0,7 2 0,-4 0 0,4-5 0,0-2 0,0 1 0,0 2 0,-3 6 0,6-10 0,-5 9 0,6-9 0,0 2 0,1-1 0,3 0 0,2-8 0,3 6 0,3-8 0,-2 9 0,4-4 0,-9 9 0,0-1 0,-2 4 0,-7 8 0,9-4 0,-2 8 0,4-2 0,-1 3 0,0 0 0,-2 0 0,2 0 0,-1 6 0,1 2 0,5 3 0,-3-4 0,4 0 0,-7-3 0,7 0 0,-3 3 0,4-2 0,-4 2 0,3 1 0,-8 0 0,9 0 0,-9-1 0,4 1 0,-8-1 0,6 0 0,-6-1 0,0 9 0,-5-2 0,-6 6 0,0-4 0,0 0 0,-7 10 0,2-8 0,-6 9 0,0-7 0,-1 1 0,-4 4 0,-5 1 0,-1 5 0,-5-2 0,0 3 0,1-5 0,4-5 0,-3 4 0,5-8 0,-1 0 0,-2-2 0,3-3 0,-4 1 0,4-2 0,-3 0 0,8-2 0,-4 2 0,4-4 0,4-3 0,42-28 0,-9 10 0,31-23 0,-19 20 0,-4 4 0,11-7 0,-4 6 0,9-6 0,-14 7 0,22-8 0,-32 14 0,15-10 0,-29 16 0,2-2 0,2-20 0,-6 2 0,2-6 0,-8 12 0</inkml:trace>
-</inkml:ink>
-</file>
-
-<file path=ppt/ink/ink123.xml><?xml version="1.0" encoding="utf-8"?>
-<inkml:ink xmlns:inkml="http://www.w3.org/2003/InkML">
-  <inkml:definitions>
-    <inkml:context xml:id="ctx0">
-      <inkml:inkSource xml:id="inkSrc0">
-        <inkml:traceFormat>
-          <inkml:channel name="X" type="integer" min="-2.14748E9" max="2.14748E9" units="cm"/>
-          <inkml:channel name="Y" type="integer" min="-2.14748E9" max="2.14748E9" units="cm"/>
-          <inkml:channel name="F" type="integer" max="32767" units="dev"/>
-        </inkml:traceFormat>
-        <inkml:channelProperties>
-          <inkml:channelProperty channel="X" name="resolution" value="1000" units="1/cm"/>
-          <inkml:channelProperty channel="Y" name="resolution" value="1000" units="1/cm"/>
-          <inkml:channelProperty channel="F" name="resolution" value="0" units="1/dev"/>
-        </inkml:channelProperties>
-      </inkml:inkSource>
-      <inkml:timestamp xml:id="ts0" timeString="2022-09-11T15:14:24.128"/>
-    </inkml:context>
-    <inkml:brush xml:id="br0">
-      <inkml:brushProperty name="width" value="0.3" units="cm"/>
-      <inkml:brushProperty name="height" value="0.6" units="cm"/>
-      <inkml:brushProperty name="color" value="#EF0C4D"/>
-      <inkml:brushProperty name="tip" value="rectangle"/>
-      <inkml:brushProperty name="rasterOp" value="maskPen"/>
-    </inkml:brush>
-  </inkml:definitions>
-  <inkml:trace contextRef="#ctx0" brushRef="#br0">33 693 16383,'45'-33'0,"0"6"0,-19 6 0,4 0 0,4 2 0,-6-2 0,13-2 0,-15 1 0,10 3 0,-14-4 0,11 8 0,-15-1 0,10 1 0,-12 3 0,7-4 0,-11 1 0,6 0 0,-6 0 0,2 1 0,1-1 0,0 0 0,-1 1 0,-2-1 0,-2 4 0,0-3 0,1 4 0,0-1 0,1-5 0,-4 4 0,2-2 0,0-2 0,-3 9 0,6-9 0,-3 3 0,0 3 0,2-9 0,-4 7 0,2-5 0,0 2 0,-1 1 0,4-1 0,-5 4 0,3-3 0,5 12 0,-3 0 0,7 9 0,-6 0 0,1 4 0,0-3 0,-4 6 0,3-3 0,-6 0 0,6 3 0,-7-3 0,7 1 0,-6 1 0,6-4 0,-2 4 0,2-4 0,1 4 0,4-4 0,-3 2 0,2-1 0,-3-1 0,0 1 0,-1 1 0,1-3 0,-4 2 0,2 4 0,-5-6 0,5 11 0,-2-7 0,0 2 0,-1 0 0,-3-3 0,4 1 0,-3 1 0,5-2 0,-2 3 0,-1-4 0,6 3 0,-8-5 0,9 5 0,-3-2 0,2 0 0,1 0 0,-6-4 0,3 0 0,0 3 0,-2-3 0,5 4 0,-7-2 0,5-1 0,-2 5 0,-2-5 0,4 4 0,-4-5 0,5 0 0,0-4 0,1-3 0,1 0 0,0 0 0,-4 0 0,4 3 0,-3-2 0,1 2 0,0-3 0,-2 0 0,5-3 0,-51 36 0,28-21 0,-42 31 0,38-32 0,-2-1 0,0 2 0,0-1 0,-1 3 0,-5 1 0,8-6 0,-5 3 0,3 1 0,0-5 0,-3 4 0,-4-2 0,6-2 0,-6 2 0,6-3 0,-7 3 0,3-2 0,1 2 0,-3 1 0,9-4 0,-8 6 0,6-3 0,-1 0 0,-1 3 0,4-3 0,-4 3 0,2-3 0,-3 2 0,0-1 0,2-1 0,2 5 0,-1-4 0,0 2 0,-7 0 0,6-2 0,-2 0 0,2-1 0,1 0 0,-1 0 0,-2 4 0,3-1 0,0-3 0,-3 0 0,2-1 0,-3 2 0,2-1 0,-1 3 0,0-6 0,-4 5 0,6-4 0,-5 2 0,6-1 0,-3-2 0,-2 2 0,1-2 0,-2-3 0,0-2 0,2-2 0,-3 0 0,3 0 0,-1 0 0,-3 0 0,0 0 0,3 0 0,-4-3 0,7-4 0,-5-1 0,0-4 0,5 7 0,-5-5 0,7 4 0,-5-2 0,-1-5 0,3 1 0,-3 1 0,8 1 0,-6 3 0,-4-4 0,-2-1 0,-2 1 0,3-4 0,0 7 0,3-6 0,-3 2 0,1-3 0,2 0 0,-3 0 0,4 0 0,1 1 0,-1-1 0,0 0 0,1 4 0,3 1 0,-3-1 0,3 3 0,-4-2 0,-3 3 0,3-1 0,-3 1 0,4 0 0,3 0 0,-10-4 0,9 0 0,-10 0 0,11 1 0,-2 2 0,-5-2 0,5 2 0,-7 1 0,9-2 0,-3 8 0,-2-8 0,2 5 0,-2-5 0,3 2 0,4-5 0,2-3 0,5 1 0,29-2 0,-4 6 0,35 5 0,-8-4 0,5 8 0,4-8 0,-4 8 0,6-3 0,0 4 0,-6 0 0,-7 0 0,-12 0 0,-7 0 0,-5 0 0,-4 0 0,-1 3 0,-8-2 0,6 5 0,-3-2 0,0 0 0,5 2 0,-8-5 0,9 2 0,-4-3 0,1 0 0,-2 0 0,4 0 0,1 0 0,0 0 0,-1 0 0,-5 0 0,0-3 0,3-1 0,-3 0 0,3-2 0,0 2 0,-5-3 0,4 1 0,-2-1 0,0 0 0,4-4 0,-3 3 0,-1-6 0,5 2 0,1-3 0,4-1 0,7-6 0,-6 5 0,6-10 0,-6 10 0,-4-3 0,-2 8 0,-5-2 0,1 6 0,0-2 0,-1 2 0,0 1 0,0 0 0,2 4 0,-2-3 0,2 5 0,1-1 0,-3 2 0,3 0 0,-4 0 0</inkml:trace>
-</inkml:ink>
-</file>
-
-<file path=ppt/ink/ink124.xml><?xml version="1.0" encoding="utf-8"?>
-<inkml:ink xmlns:inkml="http://www.w3.org/2003/InkML">
-  <inkml:definitions>
-    <inkml:context xml:id="ctx0">
-      <inkml:inkSource xml:id="inkSrc0">
-        <inkml:traceFormat>
-          <inkml:channel name="X" type="integer" min="-2.14748E9" max="2.14748E9" units="cm"/>
-          <inkml:channel name="Y" type="integer" min="-2.14748E9" max="2.14748E9" units="cm"/>
-          <inkml:channel name="F" type="integer" max="32767" units="dev"/>
-        </inkml:traceFormat>
-        <inkml:channelProperties>
-          <inkml:channelProperty channel="X" name="resolution" value="1000" units="1/cm"/>
-          <inkml:channelProperty channel="Y" name="resolution" value="1000" units="1/cm"/>
-          <inkml:channelProperty channel="F" name="resolution" value="0" units="1/dev"/>
-        </inkml:channelProperties>
-      </inkml:inkSource>
       <inkml:timestamp xml:id="ts0" timeString="2022-09-11T15:14:31.871"/>
     </inkml:context>
     <inkml:brush xml:id="br0">
@@ -926,7 +818,7 @@
 </inkml:ink>
 </file>
 
-<file path=ppt/ink/ink125.xml><?xml version="1.0" encoding="utf-8"?>
+<file path=ppt/ink/ink121.xml><?xml version="1.0" encoding="utf-8"?>
 <inkml:ink xmlns:inkml="http://www.w3.org/2003/InkML">
   <inkml:definitions>
     <inkml:context xml:id="ctx0">
@@ -956,7 +848,7 @@
 </inkml:ink>
 </file>
 
-<file path=ppt/ink/ink126.xml><?xml version="1.0" encoding="utf-8"?>
+<file path=ppt/ink/ink122.xml><?xml version="1.0" encoding="utf-8"?>
 <inkml:ink xmlns:inkml="http://www.w3.org/2003/InkML">
   <inkml:definitions>
     <inkml:context xml:id="ctx0">
@@ -986,7 +878,7 @@
 </inkml:ink>
 </file>
 
-<file path=ppt/ink/ink127.xml><?xml version="1.0" encoding="utf-8"?>
+<file path=ppt/ink/ink123.xml><?xml version="1.0" encoding="utf-8"?>
 <inkml:ink xmlns:inkml="http://www.w3.org/2003/InkML">
   <inkml:definitions>
     <inkml:context xml:id="ctx0">
@@ -1016,7 +908,7 @@
 </inkml:ink>
 </file>
 
-<file path=ppt/ink/ink128.xml><?xml version="1.0" encoding="utf-8"?>
+<file path=ppt/ink/ink124.xml><?xml version="1.0" encoding="utf-8"?>
 <inkml:ink xmlns:inkml="http://www.w3.org/2003/InkML">
   <inkml:definitions>
     <inkml:context xml:id="ctx0">
@@ -1046,7 +938,7 @@
 </inkml:ink>
 </file>
 
-<file path=ppt/ink/ink129.xml><?xml version="1.0" encoding="utf-8"?>
+<file path=ppt/ink/ink125.xml><?xml version="1.0" encoding="utf-8"?>
 <inkml:ink xmlns:inkml="http://www.w3.org/2003/InkML">
   <inkml:definitions>
     <inkml:context xml:id="ctx0">
@@ -1073,6 +965,120 @@
     </inkml:brush>
   </inkml:definitions>
   <inkml:trace contextRef="#ctx0" brushRef="#br0">37 55 16383,'57'0'0,"-7"0"0,-4 0 0,-9 0 0,9 0 0,-10 0 0,21 0 0,-23 0 0,35 0 0,-47 0 0,40 0 0,-40 0 0,11 0 0,-17 0 0,4 0 0,-7 0 0,42-11 0,-29 5 0,31-10 0,-36 9 0,10-1 0,-16 4 0,4 1 0,-6 3 0,4 0 0,-1 0 0,-2 6 0,2 5 0,-12 4 0,6 7 0,-9-6 0,3 7 0,-4 1 0,0 2 0,0 3 0,0-5 0,0 0 0,-4-4 0,0-1 0,0-5 0,1 1 0,3 3 0,0-3 0,0 3 0,0 1 0,0-4 0,0 8 0,0-3 0,0 5 0,0-6 0,0 5 0,0-9 0,0 4 0,0-4 0,0-1 0,3 8 0,1-6 0,4 9 0,-1-9 0,1 7 0,0-3 0,0 4 0,-3-4 0,2-1 0,-7 0 0,7-7 0,-7 8 0,3-9 0,-6 8 0,-3-6 0,-8 0 0,-1-3 0,-2-3 0,-1 0 0,3 1 0,1-4 0,-3 2 0,5-5 0,-5 1 0,-4-2 0,0 4 0,-1-3 0,-1 3 0,3-4 0,-9 0 0,3 0 0,-3 0 0,0 0 0,4 3 0,-9-2 0,9 3 0,-4-4 0,5 0 0,4 0 0,-5 0 0,12 0 0,-10 0 0,6 0 0,-1 3 0,1-3 0,2 6 0,1-2 0,-11 0 0,6-1 0,-7 1 0,6-3 0,-9 2 0,4-3 0,-4 0 0,5 0 0,0 0 0,4 0 0,1 0 0,4 0 0,1 0 0,4-22 0,3 6 0,8-24 0,4 10 0,8-5 0,-3 0 0,2 0 0,-3-5 0,0 3 0,0-3 0,0 10 0,-5-4 0,0 9 0,-4-4 0,0 4 0,0 1 0,0 4 0,0 2 0,0 3 0,0 0 0,0-2 0,-12 5 0,-1 2 0,-4 7 0,-3 3 0,9 0 0,-10 0 0,7 0 0,-2 6 0,-1-2 0,57 6 0,-30-3 0,42-3 0,-38 3 0,-6-4 0,15 8 0,-10-6 0,11 4 0,-5-8 0,6 2 0,5-3 0,5 4 0,0-3 0,6 3 0,-5-4 0,5 0 0,-6 0 0,-9 0 0,2 0 0,-16 0 0,6 0 0,-5 0 0,2 0 0,4 0 0,-6 3 0,3-2 0,0 1 0,-2-2 0,2-3 0,5-1 0,-5 0 0,2 1 0,-5-1 0,1 3 0,-61-2 0,15 3 0,-57 5 0,34 0 0,-5 1 0,11-2 0,-11-4 0,17 0 0,-4 0 0,12 0 0,9 0 0,3 0 0,8 0 0,0 0 0</inkml:trace>
+</inkml:ink>
+</file>
+
+<file path=ppt/ink/ink126.xml><?xml version="1.0" encoding="utf-8"?>
+<inkml:ink xmlns:inkml="http://www.w3.org/2003/InkML">
+  <inkml:definitions>
+    <inkml:context xml:id="ctx0">
+      <inkml:inkSource xml:id="inkSrc0">
+        <inkml:traceFormat>
+          <inkml:channel name="X" type="integer" min="-2.14748E9" max="2.14748E9" units="cm"/>
+          <inkml:channel name="Y" type="integer" min="-2.14748E9" max="2.14748E9" units="cm"/>
+          <inkml:channel name="F" type="integer" max="32767" units="dev"/>
+        </inkml:traceFormat>
+        <inkml:channelProperties>
+          <inkml:channelProperty channel="X" name="resolution" value="1000" units="1/cm"/>
+          <inkml:channelProperty channel="Y" name="resolution" value="1000" units="1/cm"/>
+          <inkml:channelProperty channel="F" name="resolution" value="0" units="1/dev"/>
+        </inkml:channelProperties>
+      </inkml:inkSource>
+      <inkml:timestamp xml:id="ts0" timeString="2022-09-11T15:15:53.233"/>
+    </inkml:context>
+    <inkml:brush xml:id="br0">
+      <inkml:brushProperty name="width" value="0.3" units="cm"/>
+      <inkml:brushProperty name="height" value="0.6" units="cm"/>
+      <inkml:brushProperty name="color" value="#EF0C4D"/>
+      <inkml:brushProperty name="tip" value="rectangle"/>
+      <inkml:brushProperty name="rasterOp" value="maskPen"/>
+    </inkml:brush>
+  </inkml:definitions>
+  <inkml:trace contextRef="#ctx0" brushRef="#br0">43 0 16383,'55'0'0,"-6"0"0,-29 0 0,3 0 0,13 0 0,-2 4 0,14 4 0,-13 0 0,8 3 0,-11-4 0,14 5 0,-11-4 0,1 3 0,-14-4 0,-3-3 0,-11-1 0,13-3 0,-5 6 0,0-1 0,0 5 0,-3-4 0,1 1 0,2 0 0,-2-1 0,2-2 0,-2 2 0,2-3 0,-3 4 0,0-1 0,7 1 0,-8 0 0,6 0 0,-7-1 0,1 1 0,5-3 0,-3-1 0,3-3 0,-13 21 0,-3-9 0,-8 14 0,0-8 0,3-6 0,-3 12 0,3-9 0,-5 13 0,2-7 0,-6 13 0,0-4 0,-5 5 0,1 0 0,-1 0 0,5-4 0,-3-2 0,7-9 0,-2-2 0,4-7 0,3 3 0,-6 2 0,5-1 0,-6 4 0,3 0 0,0 1 0,0 9 0,4-8 0,0 7 0,0-12 0,4 3 0,-4-5 0,4 0 0,0 3 0,-3-1 0,3 1 0,-3-2 0,-28-45 0,7 14 0,-23-36 0,11 24 0,3 1 0,-5-2 0,2 6 0,-1 4 0,7 3 0,1 7 0,5 1 0,4 1 0,1 6 0,8-2 0,-5 3 0,2 0 0,-3 0 0,-3 0 0,8 0 0,-7 0 0,6 0 0,-8 0 0,0 0 0,2 0 0,0 0 0,5 0 0,-1 3 0,-2-2 0,42-32 0,-23 16 0,36-28 0,-31 29 0,-3-1 0,2-2 0,-2 5 0,-1-6 0,4-3 0,-6 2 0,6-9 0,-3 13 0,1-8 0,-2 10 0,0-4 0,6 6 0,10 3 0,13 2 0,-3 6 0,16 5 0,-13-1 0,8 6 0,-5-2 0,-5 1 0,-5-1 0,-9-1 0,-3 0 0,-2 0 0,3 0 0</inkml:trace>
+</inkml:ink>
+</file>
+
+<file path=ppt/ink/ink127.xml><?xml version="1.0" encoding="utf-8"?>
+<inkml:ink xmlns:inkml="http://www.w3.org/2003/InkML">
+  <inkml:definitions>
+    <inkml:context xml:id="ctx0">
+      <inkml:inkSource xml:id="inkSrc0">
+        <inkml:traceFormat>
+          <inkml:channel name="X" type="integer" min="-2.14748E9" max="2.14748E9" units="cm"/>
+          <inkml:channel name="Y" type="integer" min="-2.14748E9" max="2.14748E9" units="cm"/>
+          <inkml:channel name="F" type="integer" max="32767" units="dev"/>
+        </inkml:traceFormat>
+        <inkml:channelProperties>
+          <inkml:channelProperty channel="X" name="resolution" value="1000" units="1/cm"/>
+          <inkml:channelProperty channel="Y" name="resolution" value="1000" units="1/cm"/>
+          <inkml:channelProperty channel="F" name="resolution" value="0" units="1/dev"/>
+        </inkml:channelProperties>
+      </inkml:inkSource>
+      <inkml:timestamp xml:id="ts0" timeString="2022-09-11T15:15:58.096"/>
+    </inkml:context>
+    <inkml:brush xml:id="br0">
+      <inkml:brushProperty name="width" value="0.3" units="cm"/>
+      <inkml:brushProperty name="height" value="0.6" units="cm"/>
+      <inkml:brushProperty name="color" value="#EF0C4D"/>
+      <inkml:brushProperty name="tip" value="rectangle"/>
+      <inkml:brushProperty name="rasterOp" value="maskPen"/>
+    </inkml:brush>
+  </inkml:definitions>
+  <inkml:trace contextRef="#ctx0" brushRef="#br0">761 0 16383,'-41'38'0,"3"-2"0,6-9 0,4 9 0,1-12 0,1 10 0,10-13 0,-1-4 0,6-3 0,1-7 0,-4 9 0,5 2 0,-7 7 0,10-1 0,-9 1 0,3-5 0,0 3 0,1-8 0,0 8 0,3-10 0,0 5 0,2-8 0,-1 4 0,-7-1 0,3-2 0,-2-1 0,1 2 0,4-4 0,-14 7 0,10-7 0,-9 2 0,10-3 0,-3 4 0,4-1 0,-1 1 0,-1 2 0,2-6 0,-4 5 0,1-4 0,0 1 0,38 8 0,-7-7 0,28 11 0,-12-7 0,-9-2 0,5 9 0,-5-8 0,-4 7 0,3 1 0,-8-5 0,3 3 0,-7-4 0,2 0 0,-6-1 0,2-2 0,0 1 0,0-3 0,3 0 0,28 6 0,-17-8 0,34 10 0,-21-3 0,5 3 0,4 1 0,-15-2 0,-1-4 0,-11-2 0,-4-3 0,-4-4 0,8-9 0,-5-12 0,13-12 0,2-13 0,6-3 0,0 0 0,21-29 0,-23 34 0,29-33 0,-26 33 0,10-7 0,-12 3 0,-2 12 0,-5 0 0,-5 7 0,2 3 0,5-12 0,-3 14 0,13-19 0,-17 22 0,10-12 0,-20 16 0,7-3 0,-58 13 0,2 4 0,-36 4 0,-26 0 0,36-1 0,-33-4 0,57-3 0,-19-12 0,37 2 0,-35-12 0,41 13 0,-26-12 0,28 12 0,-15-29 0,19 21 0,-1-23 0,10 29 0,0-5 0,-20 75 0,6-7 0,-12 31 0,10-4 0,10-45 0,-8 33 0,9-37 0,-13 27 0,8-29 0,-14 21 0,15-29 0,-11 7 0,12-16 0,-33-2 0,19-6 0,-52 0 0,43 0 0,-26 0 0,35 0 0,-27 0 0,24-3 0,-27-5 0,33 0 0,-10-2 0,20 6 0,-6 1 0,-8 3 0,7 0 0,-7 0 0,10 0 0,2 3 0,-11 1 0,10 3 0,-5-3 0,2 2 0,4-5 0,-11 5 0,7-5 0,-2 2 0,-4 0 0,9-2 0,52 2 0,-14-3 0,46 0 0,-42 0 0,-1 0 0,-5 0 0,0 0 0,-4 0 0,-1 3 0,-5 5 0,1 3 0,-3 4 0,2 4 0,-6-4 0,4 4 0,-2-4 0,-2-1 0,2-3 0,-2 3 0,1-3 0,2 3 0,-1-1 0,0 1 0,0-1 0,-3-2 0,6 2 0,-2-6 0,3 6 0,1-4 0,-4 1 0,2-3 0,2 3 0,0-2 0,-1 2 0,0-3 0,-3 4 0,8 1 0,-4-1 0,13 5 0,-7-4 0,8 1 0,0 3 0,-3-3 0,-1 0 0,-2 2 0,-8-7 0,1 3 0,-3-1 0,-3-3 0,3 3 0</inkml:trace>
+</inkml:ink>
+</file>
+
+<file path=ppt/ink/ink128.xml><?xml version="1.0" encoding="utf-8"?>
+<inkml:ink xmlns:inkml="http://www.w3.org/2003/InkML">
+  <inkml:definitions>
+    <inkml:context xml:id="ctx0">
+      <inkml:inkSource xml:id="inkSrc0">
+        <inkml:traceFormat>
+          <inkml:channel name="X" type="integer" min="-2.14748E9" max="2.14748E9" units="cm"/>
+          <inkml:channel name="Y" type="integer" min="-2.14748E9" max="2.14748E9" units="cm"/>
+          <inkml:channel name="F" type="integer" max="32767" units="dev"/>
+        </inkml:traceFormat>
+        <inkml:channelProperties>
+          <inkml:channelProperty channel="X" name="resolution" value="1000" units="1/cm"/>
+          <inkml:channelProperty channel="Y" name="resolution" value="1000" units="1/cm"/>
+          <inkml:channelProperty channel="F" name="resolution" value="0" units="1/dev"/>
+        </inkml:channelProperties>
+      </inkml:inkSource>
+      <inkml:timestamp xml:id="ts0" timeString="2022-09-11T15:16:24.406"/>
+    </inkml:context>
+    <inkml:brush xml:id="br0">
+      <inkml:brushProperty name="width" value="0.1" units="cm"/>
+      <inkml:brushProperty name="height" value="0.1" units="cm"/>
+    </inkml:brush>
+  </inkml:definitions>
+  <inkml:trace contextRef="#ctx0" brushRef="#br0">88 0 24575,'0'39'0,"0"4"0,0-1 0,0-5 0,0 41 0,0-2 0,0-24 0,0 0 0,0 25 0,0-26 0,-4-17 0,3-13 0,-3 12 0,0-7 0,3 4 0,-7 4 0,-1-4 0,4 1 0,-10-2 0,13-5 0,-5 0 0,3-4 0,4-1 0,-4-8 0,4-1 0,0-3 0,-3-1 0,3 1 0,-3-1 0,3 1 0,-3-1 0,2 1 0,-2-1 0,3 1 0,0 0 0,-3-1 0,2 1 0,-1-1 0,2 1 0,0-1 0,0 1 0,0-1 0,0 1 0,0-1 0,0 1 0</inkml:trace>
+</inkml:ink>
+</file>
+
+<file path=ppt/ink/ink129.xml><?xml version="1.0" encoding="utf-8"?>
+<inkml:ink xmlns:inkml="http://www.w3.org/2003/InkML">
+  <inkml:definitions>
+    <inkml:context xml:id="ctx0">
+      <inkml:inkSource xml:id="inkSrc0">
+        <inkml:traceFormat>
+          <inkml:channel name="X" type="integer" min="-2.14748E9" max="2.14748E9" units="cm"/>
+          <inkml:channel name="Y" type="integer" min="-2.14748E9" max="2.14748E9" units="cm"/>
+          <inkml:channel name="F" type="integer" max="32767" units="dev"/>
+        </inkml:traceFormat>
+        <inkml:channelProperties>
+          <inkml:channelProperty channel="X" name="resolution" value="1000" units="1/cm"/>
+          <inkml:channelProperty channel="Y" name="resolution" value="1000" units="1/cm"/>
+          <inkml:channelProperty channel="F" name="resolution" value="0" units="1/dev"/>
+        </inkml:channelProperties>
+      </inkml:inkSource>
+      <inkml:timestamp xml:id="ts0" timeString="2022-09-11T15:16:29.469"/>
+    </inkml:context>
+    <inkml:brush xml:id="br0">
+      <inkml:brushProperty name="width" value="0.1" units="cm"/>
+      <inkml:brushProperty name="height" value="0.1" units="cm"/>
+    </inkml:brush>
+  </inkml:definitions>
+  <inkml:trace contextRef="#ctx0" brushRef="#br0">1 1 24575,'0'10'0,"0"6"0,0 1 0,0 7 0,0 5 0,0 6 0,0 2 0,0 55 0,0-43 0,0 2 0,0 0 0,0 4 0,0-5 0,0-6 0,7-4 0,-1-12 0,13 44 0,-9-40 0,11 37 0,-11-46 0,7 16 0,-9-23 0,5 8 0,-8-12 0,4 0 0,-9-5 0,3-1 0,-3 4 0,0 5 0,0 1 0,0 7 0,4-3 0,0 0 0,1 3 0,-2-11 0,0 6 0,-2-10 0,5 2 0,-2-7 0,-1 0 0,0-3 0</inkml:trace>
 </inkml:ink>
 </file>
 
@@ -1119,120 +1125,6 @@
           <inkml:channelProperty channel="F" name="resolution" value="0" units="1/dev"/>
         </inkml:channelProperties>
       </inkml:inkSource>
-      <inkml:timestamp xml:id="ts0" timeString="2022-09-11T15:15:53.233"/>
-    </inkml:context>
-    <inkml:brush xml:id="br0">
-      <inkml:brushProperty name="width" value="0.3" units="cm"/>
-      <inkml:brushProperty name="height" value="0.6" units="cm"/>
-      <inkml:brushProperty name="color" value="#EF0C4D"/>
-      <inkml:brushProperty name="tip" value="rectangle"/>
-      <inkml:brushProperty name="rasterOp" value="maskPen"/>
-    </inkml:brush>
-  </inkml:definitions>
-  <inkml:trace contextRef="#ctx0" brushRef="#br0">43 0 16383,'55'0'0,"-6"0"0,-29 0 0,3 0 0,13 0 0,-2 4 0,14 4 0,-13 0 0,8 3 0,-11-4 0,14 5 0,-11-4 0,1 3 0,-14-4 0,-3-3 0,-11-1 0,13-3 0,-5 6 0,0-1 0,0 5 0,-3-4 0,1 1 0,2 0 0,-2-1 0,2-2 0,-2 2 0,2-3 0,-3 4 0,0-1 0,7 1 0,-8 0 0,6 0 0,-7-1 0,1 1 0,5-3 0,-3-1 0,3-3 0,-13 21 0,-3-9 0,-8 14 0,0-8 0,3-6 0,-3 12 0,3-9 0,-5 13 0,2-7 0,-6 13 0,0-4 0,-5 5 0,1 0 0,-1 0 0,5-4 0,-3-2 0,7-9 0,-2-2 0,4-7 0,3 3 0,-6 2 0,5-1 0,-6 4 0,3 0 0,0 1 0,0 9 0,4-8 0,0 7 0,0-12 0,4 3 0,-4-5 0,4 0 0,0 3 0,-3-1 0,3 1 0,-3-2 0,-28-45 0,7 14 0,-23-36 0,11 24 0,3 1 0,-5-2 0,2 6 0,-1 4 0,7 3 0,1 7 0,5 1 0,4 1 0,1 6 0,8-2 0,-5 3 0,2 0 0,-3 0 0,-3 0 0,8 0 0,-7 0 0,6 0 0,-8 0 0,0 0 0,2 0 0,0 0 0,5 0 0,-1 3 0,-2-2 0,42-32 0,-23 16 0,36-28 0,-31 29 0,-3-1 0,2-2 0,-2 5 0,-1-6 0,4-3 0,-6 2 0,6-9 0,-3 13 0,1-8 0,-2 10 0,0-4 0,6 6 0,10 3 0,13 2 0,-3 6 0,16 5 0,-13-1 0,8 6 0,-5-2 0,-5 1 0,-5-1 0,-9-1 0,-3 0 0,-2 0 0,3 0 0</inkml:trace>
-</inkml:ink>
-</file>
-
-<file path=ppt/ink/ink131.xml><?xml version="1.0" encoding="utf-8"?>
-<inkml:ink xmlns:inkml="http://www.w3.org/2003/InkML">
-  <inkml:definitions>
-    <inkml:context xml:id="ctx0">
-      <inkml:inkSource xml:id="inkSrc0">
-        <inkml:traceFormat>
-          <inkml:channel name="X" type="integer" min="-2.14748E9" max="2.14748E9" units="cm"/>
-          <inkml:channel name="Y" type="integer" min="-2.14748E9" max="2.14748E9" units="cm"/>
-          <inkml:channel name="F" type="integer" max="32767" units="dev"/>
-        </inkml:traceFormat>
-        <inkml:channelProperties>
-          <inkml:channelProperty channel="X" name="resolution" value="1000" units="1/cm"/>
-          <inkml:channelProperty channel="Y" name="resolution" value="1000" units="1/cm"/>
-          <inkml:channelProperty channel="F" name="resolution" value="0" units="1/dev"/>
-        </inkml:channelProperties>
-      </inkml:inkSource>
-      <inkml:timestamp xml:id="ts0" timeString="2022-09-11T15:15:58.096"/>
-    </inkml:context>
-    <inkml:brush xml:id="br0">
-      <inkml:brushProperty name="width" value="0.3" units="cm"/>
-      <inkml:brushProperty name="height" value="0.6" units="cm"/>
-      <inkml:brushProperty name="color" value="#EF0C4D"/>
-      <inkml:brushProperty name="tip" value="rectangle"/>
-      <inkml:brushProperty name="rasterOp" value="maskPen"/>
-    </inkml:brush>
-  </inkml:definitions>
-  <inkml:trace contextRef="#ctx0" brushRef="#br0">761 0 16383,'-41'38'0,"3"-2"0,6-9 0,4 9 0,1-12 0,1 10 0,10-13 0,-1-4 0,6-3 0,1-7 0,-4 9 0,5 2 0,-7 7 0,10-1 0,-9 1 0,3-5 0,0 3 0,1-8 0,0 8 0,3-10 0,0 5 0,2-8 0,-1 4 0,-7-1 0,3-2 0,-2-1 0,1 2 0,4-4 0,-14 7 0,10-7 0,-9 2 0,10-3 0,-3 4 0,4-1 0,-1 1 0,-1 2 0,2-6 0,-4 5 0,1-4 0,0 1 0,38 8 0,-7-7 0,28 11 0,-12-7 0,-9-2 0,5 9 0,-5-8 0,-4 7 0,3 1 0,-8-5 0,3 3 0,-7-4 0,2 0 0,-6-1 0,2-2 0,0 1 0,0-3 0,3 0 0,28 6 0,-17-8 0,34 10 0,-21-3 0,5 3 0,4 1 0,-15-2 0,-1-4 0,-11-2 0,-4-3 0,-4-4 0,8-9 0,-5-12 0,13-12 0,2-13 0,6-3 0,0 0 0,21-29 0,-23 34 0,29-33 0,-26 33 0,10-7 0,-12 3 0,-2 12 0,-5 0 0,-5 7 0,2 3 0,5-12 0,-3 14 0,13-19 0,-17 22 0,10-12 0,-20 16 0,7-3 0,-58 13 0,2 4 0,-36 4 0,-26 0 0,36-1 0,-33-4 0,57-3 0,-19-12 0,37 2 0,-35-12 0,41 13 0,-26-12 0,28 12 0,-15-29 0,19 21 0,-1-23 0,10 29 0,0-5 0,-20 75 0,6-7 0,-12 31 0,10-4 0,10-45 0,-8 33 0,9-37 0,-13 27 0,8-29 0,-14 21 0,15-29 0,-11 7 0,12-16 0,-33-2 0,19-6 0,-52 0 0,43 0 0,-26 0 0,35 0 0,-27 0 0,24-3 0,-27-5 0,33 0 0,-10-2 0,20 6 0,-6 1 0,-8 3 0,7 0 0,-7 0 0,10 0 0,2 3 0,-11 1 0,10 3 0,-5-3 0,2 2 0,4-5 0,-11 5 0,7-5 0,-2 2 0,-4 0 0,9-2 0,52 2 0,-14-3 0,46 0 0,-42 0 0,-1 0 0,-5 0 0,0 0 0,-4 0 0,-1 3 0,-5 5 0,1 3 0,-3 4 0,2 4 0,-6-4 0,4 4 0,-2-4 0,-2-1 0,2-3 0,-2 3 0,1-3 0,2 3 0,-1-1 0,0 1 0,0-1 0,-3-2 0,6 2 0,-2-6 0,3 6 0,1-4 0,-4 1 0,2-3 0,2 3 0,0-2 0,-1 2 0,0-3 0,-3 4 0,8 1 0,-4-1 0,13 5 0,-7-4 0,8 1 0,0 3 0,-3-3 0,-1 0 0,-2 2 0,-8-7 0,1 3 0,-3-1 0,-3-3 0,3 3 0</inkml:trace>
-</inkml:ink>
-</file>
-
-<file path=ppt/ink/ink132.xml><?xml version="1.0" encoding="utf-8"?>
-<inkml:ink xmlns:inkml="http://www.w3.org/2003/InkML">
-  <inkml:definitions>
-    <inkml:context xml:id="ctx0">
-      <inkml:inkSource xml:id="inkSrc0">
-        <inkml:traceFormat>
-          <inkml:channel name="X" type="integer" min="-2.14748E9" max="2.14748E9" units="cm"/>
-          <inkml:channel name="Y" type="integer" min="-2.14748E9" max="2.14748E9" units="cm"/>
-          <inkml:channel name="F" type="integer" max="32767" units="dev"/>
-        </inkml:traceFormat>
-        <inkml:channelProperties>
-          <inkml:channelProperty channel="X" name="resolution" value="1000" units="1/cm"/>
-          <inkml:channelProperty channel="Y" name="resolution" value="1000" units="1/cm"/>
-          <inkml:channelProperty channel="F" name="resolution" value="0" units="1/dev"/>
-        </inkml:channelProperties>
-      </inkml:inkSource>
-      <inkml:timestamp xml:id="ts0" timeString="2022-09-11T15:16:24.406"/>
-    </inkml:context>
-    <inkml:brush xml:id="br0">
-      <inkml:brushProperty name="width" value="0.1" units="cm"/>
-      <inkml:brushProperty name="height" value="0.1" units="cm"/>
-    </inkml:brush>
-  </inkml:definitions>
-  <inkml:trace contextRef="#ctx0" brushRef="#br0">88 0 24575,'0'39'0,"0"4"0,0-1 0,0-5 0,0 41 0,0-2 0,0-24 0,0 0 0,0 25 0,0-26 0,-4-17 0,3-13 0,-3 12 0,0-7 0,3 4 0,-7 4 0,-1-4 0,4 1 0,-10-2 0,13-5 0,-5 0 0,3-4 0,4-1 0,-4-8 0,4-1 0,0-3 0,-3-1 0,3 1 0,-3-1 0,3 1 0,-3-1 0,2 1 0,-2-1 0,3 1 0,0 0 0,-3-1 0,2 1 0,-1-1 0,2 1 0,0-1 0,0 1 0,0-1 0,0 1 0,0-1 0,0 1 0</inkml:trace>
-</inkml:ink>
-</file>
-
-<file path=ppt/ink/ink133.xml><?xml version="1.0" encoding="utf-8"?>
-<inkml:ink xmlns:inkml="http://www.w3.org/2003/InkML">
-  <inkml:definitions>
-    <inkml:context xml:id="ctx0">
-      <inkml:inkSource xml:id="inkSrc0">
-        <inkml:traceFormat>
-          <inkml:channel name="X" type="integer" min="-2.14748E9" max="2.14748E9" units="cm"/>
-          <inkml:channel name="Y" type="integer" min="-2.14748E9" max="2.14748E9" units="cm"/>
-          <inkml:channel name="F" type="integer" max="32767" units="dev"/>
-        </inkml:traceFormat>
-        <inkml:channelProperties>
-          <inkml:channelProperty channel="X" name="resolution" value="1000" units="1/cm"/>
-          <inkml:channelProperty channel="Y" name="resolution" value="1000" units="1/cm"/>
-          <inkml:channelProperty channel="F" name="resolution" value="0" units="1/dev"/>
-        </inkml:channelProperties>
-      </inkml:inkSource>
-      <inkml:timestamp xml:id="ts0" timeString="2022-09-11T15:16:29.469"/>
-    </inkml:context>
-    <inkml:brush xml:id="br0">
-      <inkml:brushProperty name="width" value="0.1" units="cm"/>
-      <inkml:brushProperty name="height" value="0.1" units="cm"/>
-    </inkml:brush>
-  </inkml:definitions>
-  <inkml:trace contextRef="#ctx0" brushRef="#br0">1 1 24575,'0'10'0,"0"6"0,0 1 0,0 7 0,0 5 0,0 6 0,0 2 0,0 55 0,0-43 0,0 2 0,0 0 0,0 4 0,0-5 0,0-6 0,7-4 0,-1-12 0,13 44 0,-9-40 0,11 37 0,-11-46 0,7 16 0,-9-23 0,5 8 0,-8-12 0,4 0 0,-9-5 0,3-1 0,-3 4 0,0 5 0,0 1 0,0 7 0,4-3 0,0 0 0,1 3 0,-2-11 0,0 6 0,-2-10 0,5 2 0,-2-7 0,-1 0 0,0-3 0</inkml:trace>
-</inkml:ink>
-</file>
-
-<file path=ppt/ink/ink134.xml><?xml version="1.0" encoding="utf-8"?>
-<inkml:ink xmlns:inkml="http://www.w3.org/2003/InkML">
-  <inkml:definitions>
-    <inkml:context xml:id="ctx0">
-      <inkml:inkSource xml:id="inkSrc0">
-        <inkml:traceFormat>
-          <inkml:channel name="X" type="integer" min="-2.14748E9" max="2.14748E9" units="cm"/>
-          <inkml:channel name="Y" type="integer" min="-2.14748E9" max="2.14748E9" units="cm"/>
-          <inkml:channel name="F" type="integer" max="32767" units="dev"/>
-        </inkml:traceFormat>
-        <inkml:channelProperties>
-          <inkml:channelProperty channel="X" name="resolution" value="1000" units="1/cm"/>
-          <inkml:channelProperty channel="Y" name="resolution" value="1000" units="1/cm"/>
-          <inkml:channelProperty channel="F" name="resolution" value="0" units="1/dev"/>
-        </inkml:channelProperties>
-      </inkml:inkSource>
       <inkml:timestamp xml:id="ts0" timeString="2022-09-11T15:16:41.298"/>
     </inkml:context>
     <inkml:brush xml:id="br0">
@@ -1247,7 +1139,7 @@
 </inkml:ink>
 </file>
 
-<file path=ppt/ink/ink135.xml><?xml version="1.0" encoding="utf-8"?>
+<file path=ppt/ink/ink131.xml><?xml version="1.0" encoding="utf-8"?>
 <inkml:ink xmlns:inkml="http://www.w3.org/2003/InkML">
   <inkml:definitions>
     <inkml:context xml:id="ctx0">
@@ -1276,7 +1168,7 @@
 </inkml:ink>
 </file>
 
-<file path=ppt/ink/ink136.xml><?xml version="1.0" encoding="utf-8"?>
+<file path=ppt/ink/ink132.xml><?xml version="1.0" encoding="utf-8"?>
 <inkml:ink xmlns:inkml="http://www.w3.org/2003/InkML">
   <inkml:definitions>
     <inkml:context xml:id="ctx0">
@@ -1305,7 +1197,7 @@
 </inkml:ink>
 </file>
 
-<file path=ppt/ink/ink137.xml><?xml version="1.0" encoding="utf-8"?>
+<file path=ppt/ink/ink133.xml><?xml version="1.0" encoding="utf-8"?>
 <inkml:ink xmlns:inkml="http://www.w3.org/2003/InkML">
   <inkml:definitions>
     <inkml:context xml:id="ctx0">
@@ -1334,7 +1226,7 @@
 </inkml:ink>
 </file>
 
-<file path=ppt/ink/ink138.xml><?xml version="1.0" encoding="utf-8"?>
+<file path=ppt/ink/ink134.xml><?xml version="1.0" encoding="utf-8"?>
 <inkml:ink xmlns:inkml="http://www.w3.org/2003/InkML">
   <inkml:definitions>
     <inkml:context xml:id="ctx0">
@@ -1363,7 +1255,7 @@
 </inkml:ink>
 </file>
 
-<file path=ppt/ink/ink139.xml><?xml version="1.0" encoding="utf-8"?>
+<file path=ppt/ink/ink135.xml><?xml version="1.0" encoding="utf-8"?>
 <inkml:ink xmlns:inkml="http://www.w3.org/2003/InkML">
   <inkml:definitions>
     <inkml:context xml:id="ctx0">
@@ -1389,6 +1281,122 @@
     </inkml:brush>
   </inkml:definitions>
   <inkml:trace contextRef="#ctx0" brushRef="#br0">62 45 16383,'64'0'0,"-14"0"0,-5 0 0,-13 0 0,8 0 0,-5 0 0,-5 0 0,-1 0 0,-5 0 0,-7 0 0,1 0 0,-3 0 0,5 0 0,15 0 0,-3 0 0,5 0 0,-3 0 0,-4 0 0,20 0 0,-16 0 0,11 0 0,-10 0 0,-13-6 0,23 4 0,-22-4 0,38-2 0,-31 7 0,38-7 0,-44 8 0,13-3 0,-23 2 0,10-2 0,-2 3 0,3 0 0,-6 0 0,5 0 0,-11 0 0,16 0 0,-21 0 0,10-3 0,-2 3 0,-4-3 0,9 11 0,-10 1 0,2 3 0,0 1 0,-9-3 0,5 6 0,-8 1 0,2-3 0,-3 5 0,0-1 0,0 1 0,0 12 0,0-10 0,0 13 0,0-9 0,0 4 0,0 0 0,0-4 0,0 0 0,0-2 0,0-3 0,0 4 0,0 0 0,0 5 0,0-3 0,0 3 0,0-5 0,0 0 0,0 0 0,0-4 0,0-5 0,0-1 0,0 2 0,3 3 0,-2-2 0,5 0 0,-2-3 0,0 0 0,3 3 0,-36-16 0,14 0 0,-33-8 0,23 0 0,-9 6 0,4-6 0,-5 6 0,0-3 0,0 4 0,5-4 0,1 3 0,0-2 0,3-1 0,-3 3 0,0-2 0,-1 3 0,0-4 0,-4 3 0,4-2 0,-5 3 0,0 0 0,5 0 0,1 0 0,5 0 0,0 0 0,-1 0 0,6 0 0,-4 0 0,7 0 0,-3 0 0,0 0 0,-1 0 0,-10 0 0,4 0 0,-1 0 0,9 0 0,-3 3 0,8 0 0,-5 1 0,5 2 0,-1-2 0,-6-1 0,3 0 0,2 0 0,-2-2 0,3 2 0,-1-3 0,-6 3 0,9-2 0,-10 1 0,6-2 0,-5 0 0,3 0 0,4 0 0,-4 0 0,3 0 0,-6 0 0,9 0 0,-7 0 0,5-2 0,0-2 0,-1-8 0,8 1 0,0-9 0,4 3 0,3-2 0,0 2 0,0 2 0,0 0 0,0-6 0,0 5 0,0-5 0,0 6 0,0 0 0,0-6 0,0 1 0,0-2 0,0 3 0,0 4 0,4-4 0,0 4 0,3-1 0,1 2 0,-2 4 0,7-1 0,2 5 0,2 0 0,10 5 0,-1-6 0,9 6 0,5-7 0,2 7 0,6-8 0,-1 8 0,-5-3 0,4 4 0,-10 0 0,0 0 0,-2 0 0,-4 0 0,0 0 0,4 0 0,-9 0 0,9 0 0,-9 0 0,4 0 0,-5 0 0,-4 0 0,-1 0 0,0 0 0,-3 0 0,3-3 0,0 2 0,0-2 0,6 3 0,4-4 0,12-1 0,-9 0 0,8-3 0,-16 8 0,-4-4 0,-5 4 0,-1 0 0,2 0 0,-1 0 0,4 0 0,-6 0 0,0 0 0</inkml:trace>
+</inkml:ink>
+</file>
+
+<file path=ppt/ink/ink136.xml><?xml version="1.0" encoding="utf-8"?>
+<inkml:ink xmlns:inkml="http://www.w3.org/2003/InkML">
+  <inkml:definitions>
+    <inkml:context xml:id="ctx0">
+      <inkml:inkSource xml:id="inkSrc0">
+        <inkml:traceFormat>
+          <inkml:channel name="X" type="integer" min="-2.14748E9" max="2.14748E9" units="cm"/>
+          <inkml:channel name="Y" type="integer" min="-2.14748E9" max="2.14748E9" units="cm"/>
+          <inkml:channel name="F" type="integer" max="32767" units="dev"/>
+        </inkml:traceFormat>
+        <inkml:channelProperties>
+          <inkml:channelProperty channel="X" name="resolution" value="1000" units="1/cm"/>
+          <inkml:channelProperty channel="Y" name="resolution" value="1000" units="1/cm"/>
+          <inkml:channelProperty channel="F" name="resolution" value="0" units="1/dev"/>
+        </inkml:channelProperties>
+      </inkml:inkSource>
+      <inkml:timestamp xml:id="ts0" timeString="2022-09-11T15:17:24.311"/>
+    </inkml:context>
+    <inkml:brush xml:id="br0">
+      <inkml:brushProperty name="width" value="0.3" units="cm"/>
+      <inkml:brushProperty name="height" value="0.6" units="cm"/>
+      <inkml:brushProperty name="tip" value="rectangle"/>
+      <inkml:brushProperty name="rasterOp" value="maskPen"/>
+    </inkml:brush>
+  </inkml:definitions>
+  <inkml:trace contextRef="#ctx0" brushRef="#br0">0 412 16383,'61'0'0,"-4"0"0,-3 0 0,-16 0 0,33-6 0,-34-3 0,42-12 0,-21-5 0,5-1 0,-7-2 0,4 3 0,-20 2 0,19-1 0,-17 7 0,12-7 0,-5 5 0,-1 1 0,-13 6 0,-1 0 0,-9 0 0,0 1 0,-2 0 0,-11 5 0,6-1 0,-4 2 0,-2-1 0,8 0 0,-9 1 0,6 2 0,-2-5 0,-1 8 0,2-8 0,0 9 0,-1-3 0,1 3 0,0-3 0,-3 2 0,6-1 0,-6 2 0,7 0 0,-2 0 0,-4 2 0,3 2 0,-3 6 0,-2-2 0,4 9 0,-8-9 0,2 9 0,0-3 0,1 1 0,0 3 0,0-4 0,-4 1 0,4 0 0,-3-1 0,6 1 0,-6 4 0,6-4 0,-5 4 0,1-4 0,-2 4 0,-1-3 0,1 2 0,-1-6 0,0 1 0,3-2 0,-3 5 0,3-2 0,-3 6 0,0-5 0,-3-1 0,2 2 0,-2-4 0,3 4 0,2-3 0,2 1 0,-1-4 0,6 6 0,-8-8 0,6 9 0,-4-6 0,-3 0 0,9 4 0,-8-7 0,5 5 0,0-3 0,-5-3 0,11 6 0,-47 1 0,18-2 0,-32 6 0,19-6 0,3 4 0,-4 0 0,0 0 0,0 0 0,0 0 0,0 0 0,0 0 0,4 0 0,-3 0 0,7-5 0,-3 0 0,8-4 0,-5 3 0,7-2 0,-7 2 0,2 0 0,2-2 0,-5 2 0,3 0 0,2-2 0,-4 2 0,2 0 0,2-2 0,-5 2 0,7-1 0,-1-1 0,-5 7 0,8-6 0,-8 3 0,5-1 0,-4 0 0,0 8 0,0-3 0,0 3 0,0-1 0,3-5 0,1 1 0,2-4 0,2 3 0,-3 0 0,3 7 0,4-9 0,-4 5 0,4-3 0,-9-2 0,-2-1 0,-2-7 0,0-1 0,0-1 0,2 2 0,-10-3 0,7 0 0,-4 0 0,2 0 0,-1 0 0,-4-7 0,-5-3 0,4-6 0,-9-1 0,7-4 0,-2 3 0,3-7 0,2 8 0,-2-8 0,1 8 0,4-8 0,2 9 0,-1-3 0,8 4 0,-6 3 0,10-2 0,-3 6 0,-2-5 0,5 2 0,-5 1 0,6-6 0,-2 8 0,-2-8 0,-6 3 0,2-2 0,-7-8 0,6 7 0,-8-4 0,3 0 0,1 3 0,0-3 0,5 6 0,1 2 0,3 2 0,-3 0 0,65 3 0,-15 0 0,52 4 0,-20 8 0,8 2 0,2 4 0,-29-3 0,1 1 0,38 4 0,-13 3 0,4-5 0,-28-2 0,11 2 0,-19-2 0,-9-1 0,-14-3 0,-1-2 0,-8-3 0,5 0 0,-1-13 0,4-6 0,5-20 0,-10 8 0,12-14 0,-11 14 0,8-15 0,-10 14 0,4-2 0,-9 14 0,3 5 0,-4 4 0,-54 9 0,16 8 0,-53 7 0,29 7 0,5-5 0,-8 4 0,15-5 0,-16 6 0,16-5 0,-4-1 0,12-5 0,9-1 0,2 0 0,13-4 0,-2 2 0,-3-5 0,-2 2 0,2-3 0,-4 0 0,8 0 0,-5 0 0,-1 0 0,6 0 0,-7 0 0,6 0 0,-7-7 0,6 3 0,-2-6 0,5 0 0,-3 2 0,3-15 0,5 16 0,2-9 0</inkml:trace>
+</inkml:ink>
+</file>
+
+<file path=ppt/ink/ink137.xml><?xml version="1.0" encoding="utf-8"?>
+<inkml:ink xmlns:inkml="http://www.w3.org/2003/InkML">
+  <inkml:definitions>
+    <inkml:context xml:id="ctx0">
+      <inkml:inkSource xml:id="inkSrc0">
+        <inkml:traceFormat>
+          <inkml:channel name="X" type="integer" min="-2.14748E9" max="2.14748E9" units="cm"/>
+          <inkml:channel name="Y" type="integer" min="-2.14748E9" max="2.14748E9" units="cm"/>
+          <inkml:channel name="F" type="integer" max="32767" units="dev"/>
+        </inkml:traceFormat>
+        <inkml:channelProperties>
+          <inkml:channelProperty channel="X" name="resolution" value="1000" units="1/cm"/>
+          <inkml:channelProperty channel="Y" name="resolution" value="1000" units="1/cm"/>
+          <inkml:channelProperty channel="F" name="resolution" value="0" units="1/dev"/>
+        </inkml:channelProperties>
+      </inkml:inkSource>
+      <inkml:timestamp xml:id="ts0" timeString="2022-09-11T15:17:29.455"/>
+    </inkml:context>
+    <inkml:brush xml:id="br0">
+      <inkml:brushProperty name="width" value="0.3" units="cm"/>
+      <inkml:brushProperty name="height" value="0.6" units="cm"/>
+      <inkml:brushProperty name="tip" value="rectangle"/>
+      <inkml:brushProperty name="rasterOp" value="maskPen"/>
+    </inkml:brush>
+  </inkml:definitions>
+  <inkml:trace contextRef="#ctx0" brushRef="#br0">1 632 16383,'45'0'0,"-2"0"0,-23 0 0,0 0 0,-4 0 0,2-4 0,-6-3 0,7-2 0,-8-5 0,3 3 0,4-7 0,-2 3 0,2-8 0,1 3 0,-5-5 0,35-29 0,-26 26 0,31-30 0,-40 41 0,12-9 0,-18 14 0,11-14 0,-10 13 0,10-17 0,-10 14 0,10-17 0,-13 19 0,10-23 0,-11 26 0,9-22 0,-7 26 0,3-8 0,5 3 0,-7 7 0,8-14 0,-7 9 0,-2 0 0,22 27 0,-14-4 0,21 24 0,-18-8 0,7-1 0,-6 6 0,7-2 0,15 22 0,-9-17 0,29 21 0,-35-35 0,30 16 0,-36-25 0,17 7 0,-26-18 0,11 0 0,-9-3 0,4 0 0,0 0 0,-6 0 0,12 0 0,-12 0 0,18 0 0,-16 0 0,11 0 0,8 0 0,-13 0 0,10 0 0,-16 0 0,4 0 0,-1 0 0,3 0 0,-14 21 0,0-10 0,-11 17 0,1-14 0,-2 5 0,-4 0 0,-6 16 0,1-8 0,-1 8 0,2-11 0,7-4 0,-4-1 0,2-5 0,2 1 0,-3 0 0,4-4 0,-3 6 0,2-6 0,-5 7 0,4-3 0,-1-1 0,3 1 0,-4-4 0,3 3 0,-3-2 0,1 2 0,1 1 0,-1 0 0,3-4 0,-3 5 0,2-4 0,-2 4 0,1-2 0,-2-1 0,0 1 0,1 0 0,3-3 0,-3 2 0,0-2 0,-3 2 0,2-3 0,-1-1 0,-2 1 0,3 1 0,-5-4 0,6 5 0,0-5 0,-2 6 0,-8-18 0,8 1 0,-11-16 0,8 4 0,-2-3 0,-6 2 0,2-7 0,-9 6 0,4-3 0,-3 5 0,5 0 0,0 0 0,4 0 0,-3 0 0,7 1 0,-3 0 0,4 0 0,1 1 0,-1-1 0,4 4 0,-3 0 0,4 2 0,-5 4 0,-4-1 0,6 4 0,-6 1 0,5-5 0,0 2 0,-6-5 0,9 4 0,-5 0 0,-6 1 0,5 0 0,-9-3 0,12-1 0,-1 1 0,4-4 0,-3 3 0,3-5 0,0 2 0,1-3 0,3 1 0,4-4 0,0 2 0,3-3 0,0-1 0,0 0 0</inkml:trace>
+</inkml:ink>
+</file>
+
+<file path=ppt/ink/ink138.xml><?xml version="1.0" encoding="utf-8"?>
+<inkml:ink xmlns:inkml="http://www.w3.org/2003/InkML">
+  <inkml:definitions>
+    <inkml:context xml:id="ctx0">
+      <inkml:inkSource xml:id="inkSrc0">
+        <inkml:traceFormat>
+          <inkml:channel name="X" type="integer" min="-2.14748E9" max="2.14748E9" units="cm"/>
+          <inkml:channel name="Y" type="integer" min="-2.14748E9" max="2.14748E9" units="cm"/>
+          <inkml:channel name="F" type="integer" max="32767" units="dev"/>
+        </inkml:traceFormat>
+        <inkml:channelProperties>
+          <inkml:channelProperty channel="X" name="resolution" value="1000" units="1/cm"/>
+          <inkml:channelProperty channel="Y" name="resolution" value="1000" units="1/cm"/>
+          <inkml:channelProperty channel="F" name="resolution" value="0" units="1/dev"/>
+        </inkml:channelProperties>
+      </inkml:inkSource>
+      <inkml:timestamp xml:id="ts0" timeString="2022-09-11T15:17:36.598"/>
+    </inkml:context>
+    <inkml:brush xml:id="br0">
+      <inkml:brushProperty name="width" value="0.3" units="cm"/>
+      <inkml:brushProperty name="height" value="0.6" units="cm"/>
+      <inkml:brushProperty name="tip" value="rectangle"/>
+      <inkml:brushProperty name="rasterOp" value="maskPen"/>
+    </inkml:brush>
+  </inkml:definitions>
+  <inkml:trace contextRef="#ctx0" brushRef="#br0">424 1 16383,'74'0'0,"0"4"0,-12 7 0,1 5 0,-12 0 0,13-1 0,-24 2 0,20-5 0,-12 10 0,-11-12 0,2 7 0,-14-8 0,0 7 0,-2-8 0,-7 0 0,3-1 0,-5-3 0,1 3 0,0 0 0,2 0 0,-1-3 0,1 2 0,-2-5 0,0 6 0,4-3 0,-4 0 0,4 3 0,0-6 0,-3 6 0,-1-7 0,2 7 0,-6-4 0,9 1 0,-6 2 0,4-5 0,-4 5 0,5-5 0,-4 2 0,9-3 0,-5 0 0,1 0 0,4 0 0,-9 0 0,4 0 0,-4 0 0,-1 0 0,4 0 0,-3 0 0,3 3 0,-3-2 0,-1 2 0,4-3 0,-3 0 0,2 0 0,-2 3 0,-1-2 0,2 7 0,-3 0 0,-3 8 0,-4-2 0,1 3 0,-7 0 0,7-2 0,-3 3 0,0-4 0,3 1 0,-3 0 0,0 3 0,3 2 0,-7 4 0,4 1 0,-4-1 0,0 5 0,0-4 0,0 4 0,0-5 0,0 0 0,0 0 0,0-4 0,0-1 0,0-4 0,0 2 0,0-2 0,0 3 0,-3-2 0,-1-1 0,-2 1 0,-1-3 0,1 3 0,-1-2 0,-2 2 0,-1-3 0,-1 1 0,1-4 0,0 4 0,-2-7 0,-5 0 0,0-8 0,0-3 0,-2-4 0,4-2 0,-4-2 0,0 0 0,3 2 0,-3-1 0,5-1 0,-1-2 0,0 2 0,1-2 0,2 7 0,-1-7 0,-1 3 0,2 0 0,-5 1 0,3 0 0,2 2 0,-4-2 0,2 3 0,2 0 0,-8 0 0,5 0 0,1 3 0,-6 0 0,8 1 0,-10 2 0,7-2 0,-13 3 0,6 0 0,-11 0 0,2 0 0,-4 0 0,0 0 0,0 0 0,0 0 0,1 0 0,-1 0 0,5 0 0,-4 4 0,9-3 0,-9 7 0,4-7 0,0 6 0,-4-6 0,4 3 0,-5 0 0,0-4 0,0 8 0,0-3 0,0 0 0,-5 3 0,4-7 0,-4 7 0,5-3 0,-5 0 0,3 2 0,-3-6 0,-1 7 0,10-7 0,-8 4 0,13-2 0,-3-2 0,5 3 0,4-4 0,2 0 0,3 0 0,0 0 0,-2 0 0,2 0 0,-2 0 0,1 0 0,27-28 0,-8 18 0,24-22 0,-13 22 0,1-2 0,0-2 0,4-6 0,-3 4 0,9-9 0,-3 4 0,4-6 0,-4 2 0,-2 4 0,-5-2 0,-3 8 0,2-4 0,-5 0 0,2-1 0,-3-4 0,4 0 0,-3-5 0,6 3 0,-1-7 0,-2 7 0,3 1 0,-6 2 0,2 8 0,-4-1 0,3 3 0,-3 3 0,3-3 0,0-3 0,-6 4 0,2-6 0,-15 4 0,7 0 0,-9-4 0,10 7 0,-4-5 0,-13 9 0,9 2 0,-15 5 0,11-3 0,1 2 0,0 20 0,8-7 0,1 15 0,3-10 0,0-9 0,13 12 0,-3-8 0,11 2 0,-6-3 0,0-4 0,-1 1 0,5-1 0,-3 1 0,3-1 0,-5 1 0,1-1 0,0-3 0,2 2 0,-1-2 0,-2 3 0,3-3 0,-6 2 0,6-2 0,-2-1 0,-1 0 0,1-3 0</inkml:trace>
+</inkml:ink>
+</file>
+
+<file path=ppt/ink/ink139.xml><?xml version="1.0" encoding="utf-8"?>
+<inkml:ink xmlns:inkml="http://www.w3.org/2003/InkML">
+  <inkml:definitions>
+    <inkml:context xml:id="ctx0">
+      <inkml:inkSource xml:id="inkSrc0">
+        <inkml:traceFormat>
+          <inkml:channel name="X" type="integer" min="-2.14748E9" max="2.14748E9" units="cm"/>
+          <inkml:channel name="Y" type="integer" min="-2.14748E9" max="2.14748E9" units="cm"/>
+          <inkml:channel name="F" type="integer" max="32767" units="dev"/>
+        </inkml:traceFormat>
+        <inkml:channelProperties>
+          <inkml:channelProperty channel="X" name="resolution" value="1000" units="1/cm"/>
+          <inkml:channelProperty channel="Y" name="resolution" value="1000" units="1/cm"/>
+          <inkml:channelProperty channel="F" name="resolution" value="0" units="1/dev"/>
+        </inkml:channelProperties>
+      </inkml:inkSource>
+      <inkml:timestamp xml:id="ts0" timeString="2022-09-11T15:17:42.014"/>
+    </inkml:context>
+    <inkml:brush xml:id="br0">
+      <inkml:brushProperty name="width" value="0.3" units="cm"/>
+      <inkml:brushProperty name="height" value="0.6" units="cm"/>
+      <inkml:brushProperty name="tip" value="rectangle"/>
+      <inkml:brushProperty name="rasterOp" value="maskPen"/>
+    </inkml:brush>
+  </inkml:definitions>
+  <inkml:trace contextRef="#ctx0" brushRef="#br0">0 285 16383,'63'-4'0,"4"1"0,-40 3 0,19 0 0,-9-4 0,-1 4 0,3-4 0,-12 0 0,7 3 0,-10-6 0,5 2 0,-4-3 0,9 0 0,-4-5 0,0 4 0,9-4 0,-16 5 0,15-5 0,-17 5 0,4-1 0,-6 2 0,-8 3 0,2-3 0,5-3 0,-2 5 0,6-2 0,-11 4 0,12-4 0,-10 0 0,11-4 0,-9 4 0,9-4 0,-10 4 0,11-4 0,-17 5 0,8-1 0,-3-2 0,1 1 0,0-2 0,2 3 0,-5 1 0,7 2 0,-4 1 0,3 3 0,3 0 0,-4 0 0,6 0 0,-8 0 0,1 0 0,2 0 0,-3 0 0,2 0 0,0 6 0,-4 2 0,4 6 0,-8 5 0,3-3 0,0 3 0,-3-1 0,3 2 0,0 0 0,-2 3 0,2-7 0,-4 3 0,1-4 0,-1-4 0,3 2 0,-6 2 0,2 5 0,-6 4 0,3 0 0,3 11 0,2-4 0,5 10 0,-3-6 0,6-5 0,-7-1 0,6-9 0,-7 3 0,3-7 0,-3 3 0,-1-8 0,0 2 0,3-2 0,-3 6 0,3-6 0,2 1 0,-1-5 0,4-1 0,1-2 0,-3-1 0,6-3 0,-6 3 0,3-2 0,0 4 0,-2-1 0,2 3 0,-2-1 0,-1 1 0,2-3 0,-57-6 0,17-3 0,-51-9 0,22 4 0,5-4 0,1 4 0,2 1 0,10 0 0,-4 4 0,5 1 0,0 4 0,4 0 0,-2 0 0,2 0 0,1 0 0,1 0 0,0 0 0,4 0 0,-4 4 0,5 0 0,0 4 0,-1 0 0,6 3 0,0-2 0,4 1 0,0-2 0,1-1 0,-1 0 0,-4 1 0,3-1 0,-2 1 0,-1 0 0,3-1 0,-3 1 0,0-1 0,4-3 0,-4 3 0,4-6 0,0 6 0,-6-3 0,1 0 0,-7-1 0,-2 1 0,-1-3 0,0 6 0,-4-6 0,4 7 0,-5-7 0,5 6 0,1-6 0,9 6 0,1-6 0,4 2 0,1-3 0,-2 0 0,-1 0 0,1 0 0,1 0 0,-1 0 0,3 0 0,-6 0 0,6 0 0,-3-3 0,3-10 0,3 4 0,-1-11 0,4 6 0,3-1 0,-2-2 0,0 3 0,1 55 0,-1-28 0,6 44 0,0-42 0,0-4 0,0 9 0,0-9 0,0 9 0,6-4 0,4-9 0,11 2 0,-3-9 0,7 0 0,-9 0 0,7 0 0,-7 0 0,7 0 0,-8 0 0,4 0 0,0 0 0,-3 0 0,7 0 0,-3 0 0,9 0 0,-4 0 0,9 0 0,-4 0 0,0 0 0,4 0 0,-9 0 0,0 0 0,-2-4 0,-7 3 0,3-2 0,-5 3 0,1 0 0,6-3 0,-5 2 0,10-2 0,-6 3 0,0-4 0,3 3 0,-7-2 0,2 3 0,-3 0 0,0-3 0,2 2 0,-1-2 0,1 3 0,-2 0 0,4 0 0,1 0 0,4-4 0,0 3 0,0-2 0,-4 3 0,3 0 0,-7 0 0,-1 0 0,2 0 0,-5 0 0,8 0 0,-1 0 0,3 0 0,-3 0 0,4 0 0,-7 0 0,2 0 0,0 0 0,-6 0 0,10 0 0,-10-3 0,9 2 0,-7-2 0,0 3 0,3-3 0,-3 3 0,3-3 0,-1 0 0,-2 2 0,2-2 0</inkml:trace>
 </inkml:ink>
 </file>
 
@@ -1435,122 +1443,6 @@
           <inkml:channelProperty channel="F" name="resolution" value="0" units="1/dev"/>
         </inkml:channelProperties>
       </inkml:inkSource>
-      <inkml:timestamp xml:id="ts0" timeString="2022-09-11T15:17:24.311"/>
-    </inkml:context>
-    <inkml:brush xml:id="br0">
-      <inkml:brushProperty name="width" value="0.3" units="cm"/>
-      <inkml:brushProperty name="height" value="0.6" units="cm"/>
-      <inkml:brushProperty name="tip" value="rectangle"/>
-      <inkml:brushProperty name="rasterOp" value="maskPen"/>
-    </inkml:brush>
-  </inkml:definitions>
-  <inkml:trace contextRef="#ctx0" brushRef="#br0">0 412 16383,'61'0'0,"-4"0"0,-3 0 0,-16 0 0,33-6 0,-34-3 0,42-12 0,-21-5 0,5-1 0,-7-2 0,4 3 0,-20 2 0,19-1 0,-17 7 0,12-7 0,-5 5 0,-1 1 0,-13 6 0,-1 0 0,-9 0 0,0 1 0,-2 0 0,-11 5 0,6-1 0,-4 2 0,-2-1 0,8 0 0,-9 1 0,6 2 0,-2-5 0,-1 8 0,2-8 0,0 9 0,-1-3 0,1 3 0,0-3 0,-3 2 0,6-1 0,-6 2 0,7 0 0,-2 0 0,-4 2 0,3 2 0,-3 6 0,-2-2 0,4 9 0,-8-9 0,2 9 0,0-3 0,1 1 0,0 3 0,0-4 0,-4 1 0,4 0 0,-3-1 0,6 1 0,-6 4 0,6-4 0,-5 4 0,1-4 0,-2 4 0,-1-3 0,1 2 0,-1-6 0,0 1 0,3-2 0,-3 5 0,3-2 0,-3 6 0,0-5 0,-3-1 0,2 2 0,-2-4 0,3 4 0,2-3 0,2 1 0,-1-4 0,6 6 0,-8-8 0,6 9 0,-4-6 0,-3 0 0,9 4 0,-8-7 0,5 5 0,0-3 0,-5-3 0,11 6 0,-47 1 0,18-2 0,-32 6 0,19-6 0,3 4 0,-4 0 0,0 0 0,0 0 0,0 0 0,0 0 0,0 0 0,4 0 0,-3 0 0,7-5 0,-3 0 0,8-4 0,-5 3 0,7-2 0,-7 2 0,2 0 0,2-2 0,-5 2 0,3 0 0,2-2 0,-4 2 0,2 0 0,2-2 0,-5 2 0,7-1 0,-1-1 0,-5 7 0,8-6 0,-8 3 0,5-1 0,-4 0 0,0 8 0,0-3 0,0 3 0,0-1 0,3-5 0,1 1 0,2-4 0,2 3 0,-3 0 0,3 7 0,4-9 0,-4 5 0,4-3 0,-9-2 0,-2-1 0,-2-7 0,0-1 0,0-1 0,2 2 0,-10-3 0,7 0 0,-4 0 0,2 0 0,-1 0 0,-4-7 0,-5-3 0,4-6 0,-9-1 0,7-4 0,-2 3 0,3-7 0,2 8 0,-2-8 0,1 8 0,4-8 0,2 9 0,-1-3 0,8 4 0,-6 3 0,10-2 0,-3 6 0,-2-5 0,5 2 0,-5 1 0,6-6 0,-2 8 0,-2-8 0,-6 3 0,2-2 0,-7-8 0,6 7 0,-8-4 0,3 0 0,1 3 0,0-3 0,5 6 0,1 2 0,3 2 0,-3 0 0,65 3 0,-15 0 0,52 4 0,-20 8 0,8 2 0,2 4 0,-29-3 0,1 1 0,38 4 0,-13 3 0,4-5 0,-28-2 0,11 2 0,-19-2 0,-9-1 0,-14-3 0,-1-2 0,-8-3 0,5 0 0,-1-13 0,4-6 0,5-20 0,-10 8 0,12-14 0,-11 14 0,8-15 0,-10 14 0,4-2 0,-9 14 0,3 5 0,-4 4 0,-54 9 0,16 8 0,-53 7 0,29 7 0,5-5 0,-8 4 0,15-5 0,-16 6 0,16-5 0,-4-1 0,12-5 0,9-1 0,2 0 0,13-4 0,-2 2 0,-3-5 0,-2 2 0,2-3 0,-4 0 0,8 0 0,-5 0 0,-1 0 0,6 0 0,-7 0 0,6 0 0,-7-7 0,6 3 0,-2-6 0,5 0 0,-3 2 0,3-15 0,5 16 0,2-9 0</inkml:trace>
-</inkml:ink>
-</file>
-
-<file path=ppt/ink/ink141.xml><?xml version="1.0" encoding="utf-8"?>
-<inkml:ink xmlns:inkml="http://www.w3.org/2003/InkML">
-  <inkml:definitions>
-    <inkml:context xml:id="ctx0">
-      <inkml:inkSource xml:id="inkSrc0">
-        <inkml:traceFormat>
-          <inkml:channel name="X" type="integer" min="-2.14748E9" max="2.14748E9" units="cm"/>
-          <inkml:channel name="Y" type="integer" min="-2.14748E9" max="2.14748E9" units="cm"/>
-          <inkml:channel name="F" type="integer" max="32767" units="dev"/>
-        </inkml:traceFormat>
-        <inkml:channelProperties>
-          <inkml:channelProperty channel="X" name="resolution" value="1000" units="1/cm"/>
-          <inkml:channelProperty channel="Y" name="resolution" value="1000" units="1/cm"/>
-          <inkml:channelProperty channel="F" name="resolution" value="0" units="1/dev"/>
-        </inkml:channelProperties>
-      </inkml:inkSource>
-      <inkml:timestamp xml:id="ts0" timeString="2022-09-11T15:17:29.455"/>
-    </inkml:context>
-    <inkml:brush xml:id="br0">
-      <inkml:brushProperty name="width" value="0.3" units="cm"/>
-      <inkml:brushProperty name="height" value="0.6" units="cm"/>
-      <inkml:brushProperty name="tip" value="rectangle"/>
-      <inkml:brushProperty name="rasterOp" value="maskPen"/>
-    </inkml:brush>
-  </inkml:definitions>
-  <inkml:trace contextRef="#ctx0" brushRef="#br0">1 632 16383,'45'0'0,"-2"0"0,-23 0 0,0 0 0,-4 0 0,2-4 0,-6-3 0,7-2 0,-8-5 0,3 3 0,4-7 0,-2 3 0,2-8 0,1 3 0,-5-5 0,35-29 0,-26 26 0,31-30 0,-40 41 0,12-9 0,-18 14 0,11-14 0,-10 13 0,10-17 0,-10 14 0,10-17 0,-13 19 0,10-23 0,-11 26 0,9-22 0,-7 26 0,3-8 0,5 3 0,-7 7 0,8-14 0,-7 9 0,-2 0 0,22 27 0,-14-4 0,21 24 0,-18-8 0,7-1 0,-6 6 0,7-2 0,15 22 0,-9-17 0,29 21 0,-35-35 0,30 16 0,-36-25 0,17 7 0,-26-18 0,11 0 0,-9-3 0,4 0 0,0 0 0,-6 0 0,12 0 0,-12 0 0,18 0 0,-16 0 0,11 0 0,8 0 0,-13 0 0,10 0 0,-16 0 0,4 0 0,-1 0 0,3 0 0,-14 21 0,0-10 0,-11 17 0,1-14 0,-2 5 0,-4 0 0,-6 16 0,1-8 0,-1 8 0,2-11 0,7-4 0,-4-1 0,2-5 0,2 1 0,-3 0 0,4-4 0,-3 6 0,2-6 0,-5 7 0,4-3 0,-1-1 0,3 1 0,-4-4 0,3 3 0,-3-2 0,1 2 0,1 1 0,-1 0 0,3-4 0,-3 5 0,2-4 0,-2 4 0,1-2 0,-2-1 0,0 1 0,1 0 0,3-3 0,-3 2 0,0-2 0,-3 2 0,2-3 0,-1-1 0,-2 1 0,3 1 0,-5-4 0,6 5 0,0-5 0,-2 6 0,-8-18 0,8 1 0,-11-16 0,8 4 0,-2-3 0,-6 2 0,2-7 0,-9 6 0,4-3 0,-3 5 0,5 0 0,0 0 0,4 0 0,-3 0 0,7 1 0,-3 0 0,4 0 0,1 1 0,-1-1 0,4 4 0,-3 0 0,4 2 0,-5 4 0,-4-1 0,6 4 0,-6 1 0,5-5 0,0 2 0,-6-5 0,9 4 0,-5 0 0,-6 1 0,5 0 0,-9-3 0,12-1 0,-1 1 0,4-4 0,-3 3 0,3-5 0,0 2 0,1-3 0,3 1 0,4-4 0,0 2 0,3-3 0,0-1 0,0 0 0</inkml:trace>
-</inkml:ink>
-</file>
-
-<file path=ppt/ink/ink142.xml><?xml version="1.0" encoding="utf-8"?>
-<inkml:ink xmlns:inkml="http://www.w3.org/2003/InkML">
-  <inkml:definitions>
-    <inkml:context xml:id="ctx0">
-      <inkml:inkSource xml:id="inkSrc0">
-        <inkml:traceFormat>
-          <inkml:channel name="X" type="integer" min="-2.14748E9" max="2.14748E9" units="cm"/>
-          <inkml:channel name="Y" type="integer" min="-2.14748E9" max="2.14748E9" units="cm"/>
-          <inkml:channel name="F" type="integer" max="32767" units="dev"/>
-        </inkml:traceFormat>
-        <inkml:channelProperties>
-          <inkml:channelProperty channel="X" name="resolution" value="1000" units="1/cm"/>
-          <inkml:channelProperty channel="Y" name="resolution" value="1000" units="1/cm"/>
-          <inkml:channelProperty channel="F" name="resolution" value="0" units="1/dev"/>
-        </inkml:channelProperties>
-      </inkml:inkSource>
-      <inkml:timestamp xml:id="ts0" timeString="2022-09-11T15:17:36.598"/>
-    </inkml:context>
-    <inkml:brush xml:id="br0">
-      <inkml:brushProperty name="width" value="0.3" units="cm"/>
-      <inkml:brushProperty name="height" value="0.6" units="cm"/>
-      <inkml:brushProperty name="tip" value="rectangle"/>
-      <inkml:brushProperty name="rasterOp" value="maskPen"/>
-    </inkml:brush>
-  </inkml:definitions>
-  <inkml:trace contextRef="#ctx0" brushRef="#br0">424 1 16383,'74'0'0,"0"4"0,-12 7 0,1 5 0,-12 0 0,13-1 0,-24 2 0,20-5 0,-12 10 0,-11-12 0,2 7 0,-14-8 0,0 7 0,-2-8 0,-7 0 0,3-1 0,-5-3 0,1 3 0,0 0 0,2 0 0,-1-3 0,1 2 0,-2-5 0,0 6 0,4-3 0,-4 0 0,4 3 0,0-6 0,-3 6 0,-1-7 0,2 7 0,-6-4 0,9 1 0,-6 2 0,4-5 0,-4 5 0,5-5 0,-4 2 0,9-3 0,-5 0 0,1 0 0,4 0 0,-9 0 0,4 0 0,-4 0 0,-1 0 0,4 0 0,-3 0 0,3 3 0,-3-2 0,-1 2 0,4-3 0,-3 0 0,2 0 0,-2 3 0,-1-2 0,2 7 0,-3 0 0,-3 8 0,-4-2 0,1 3 0,-7 0 0,7-2 0,-3 3 0,0-4 0,3 1 0,-3 0 0,0 3 0,3 2 0,-7 4 0,4 1 0,-4-1 0,0 5 0,0-4 0,0 4 0,0-5 0,0 0 0,0 0 0,0-4 0,0-1 0,0-4 0,0 2 0,0-2 0,0 3 0,-3-2 0,-1-1 0,-2 1 0,-1-3 0,1 3 0,-1-2 0,-2 2 0,-1-3 0,-1 1 0,1-4 0,0 4 0,-2-7 0,-5 0 0,0-8 0,0-3 0,-2-4 0,4-2 0,-4-2 0,0 0 0,3 2 0,-3-1 0,5-1 0,-1-2 0,0 2 0,1-2 0,2 7 0,-1-7 0,-1 3 0,2 0 0,-5 1 0,3 0 0,2 2 0,-4-2 0,2 3 0,2 0 0,-8 0 0,5 0 0,1 3 0,-6 0 0,8 1 0,-10 2 0,7-2 0,-13 3 0,6 0 0,-11 0 0,2 0 0,-4 0 0,0 0 0,0 0 0,0 0 0,1 0 0,-1 0 0,5 0 0,-4 4 0,9-3 0,-9 7 0,4-7 0,0 6 0,-4-6 0,4 3 0,-5 0 0,0-4 0,0 8 0,0-3 0,0 0 0,-5 3 0,4-7 0,-4 7 0,5-3 0,-5 0 0,3 2 0,-3-6 0,-1 7 0,10-7 0,-8 4 0,13-2 0,-3-2 0,5 3 0,4-4 0,2 0 0,3 0 0,0 0 0,-2 0 0,2 0 0,-2 0 0,1 0 0,27-28 0,-8 18 0,24-22 0,-13 22 0,1-2 0,0-2 0,4-6 0,-3 4 0,9-9 0,-3 4 0,4-6 0,-4 2 0,-2 4 0,-5-2 0,-3 8 0,2-4 0,-5 0 0,2-1 0,-3-4 0,4 0 0,-3-5 0,6 3 0,-1-7 0,-2 7 0,3 1 0,-6 2 0,2 8 0,-4-1 0,3 3 0,-3 3 0,3-3 0,0-3 0,-6 4 0,2-6 0,-15 4 0,7 0 0,-9-4 0,10 7 0,-4-5 0,-13 9 0,9 2 0,-15 5 0,11-3 0,1 2 0,0 20 0,8-7 0,1 15 0,3-10 0,0-9 0,13 12 0,-3-8 0,11 2 0,-6-3 0,0-4 0,-1 1 0,5-1 0,-3 1 0,3-1 0,-5 1 0,1-1 0,0-3 0,2 2 0,-1-2 0,-2 3 0,3-3 0,-6 2 0,6-2 0,-2-1 0,-1 0 0,1-3 0</inkml:trace>
-</inkml:ink>
-</file>
-
-<file path=ppt/ink/ink143.xml><?xml version="1.0" encoding="utf-8"?>
-<inkml:ink xmlns:inkml="http://www.w3.org/2003/InkML">
-  <inkml:definitions>
-    <inkml:context xml:id="ctx0">
-      <inkml:inkSource xml:id="inkSrc0">
-        <inkml:traceFormat>
-          <inkml:channel name="X" type="integer" min="-2.14748E9" max="2.14748E9" units="cm"/>
-          <inkml:channel name="Y" type="integer" min="-2.14748E9" max="2.14748E9" units="cm"/>
-          <inkml:channel name="F" type="integer" max="32767" units="dev"/>
-        </inkml:traceFormat>
-        <inkml:channelProperties>
-          <inkml:channelProperty channel="X" name="resolution" value="1000" units="1/cm"/>
-          <inkml:channelProperty channel="Y" name="resolution" value="1000" units="1/cm"/>
-          <inkml:channelProperty channel="F" name="resolution" value="0" units="1/dev"/>
-        </inkml:channelProperties>
-      </inkml:inkSource>
-      <inkml:timestamp xml:id="ts0" timeString="2022-09-11T15:17:42.014"/>
-    </inkml:context>
-    <inkml:brush xml:id="br0">
-      <inkml:brushProperty name="width" value="0.3" units="cm"/>
-      <inkml:brushProperty name="height" value="0.6" units="cm"/>
-      <inkml:brushProperty name="tip" value="rectangle"/>
-      <inkml:brushProperty name="rasterOp" value="maskPen"/>
-    </inkml:brush>
-  </inkml:definitions>
-  <inkml:trace contextRef="#ctx0" brushRef="#br0">0 285 16383,'63'-4'0,"4"1"0,-40 3 0,19 0 0,-9-4 0,-1 4 0,3-4 0,-12 0 0,7 3 0,-10-6 0,5 2 0,-4-3 0,9 0 0,-4-5 0,0 4 0,9-4 0,-16 5 0,15-5 0,-17 5 0,4-1 0,-6 2 0,-8 3 0,2-3 0,5-3 0,-2 5 0,6-2 0,-11 4 0,12-4 0,-10 0 0,11-4 0,-9 4 0,9-4 0,-10 4 0,11-4 0,-17 5 0,8-1 0,-3-2 0,1 1 0,0-2 0,2 3 0,-5 1 0,7 2 0,-4 1 0,3 3 0,3 0 0,-4 0 0,6 0 0,-8 0 0,1 0 0,2 0 0,-3 0 0,2 0 0,0 6 0,-4 2 0,4 6 0,-8 5 0,3-3 0,0 3 0,-3-1 0,3 2 0,0 0 0,-2 3 0,2-7 0,-4 3 0,1-4 0,-1-4 0,3 2 0,-6 2 0,2 5 0,-6 4 0,3 0 0,3 11 0,2-4 0,5 10 0,-3-6 0,6-5 0,-7-1 0,6-9 0,-7 3 0,3-7 0,-3 3 0,-1-8 0,0 2 0,3-2 0,-3 6 0,3-6 0,2 1 0,-1-5 0,4-1 0,1-2 0,-3-1 0,6-3 0,-6 3 0,3-2 0,0 4 0,-2-1 0,2 3 0,-2-1 0,-1 1 0,2-3 0,-57-6 0,17-3 0,-51-9 0,22 4 0,5-4 0,1 4 0,2 1 0,10 0 0,-4 4 0,5 1 0,0 4 0,4 0 0,-2 0 0,2 0 0,1 0 0,1 0 0,0 0 0,4 0 0,-4 4 0,5 0 0,0 4 0,-1 0 0,6 3 0,0-2 0,4 1 0,0-2 0,1-1 0,-1 0 0,-4 1 0,3-1 0,-2 1 0,-1 0 0,3-1 0,-3 1 0,0-1 0,4-3 0,-4 3 0,4-6 0,0 6 0,-6-3 0,1 0 0,-7-1 0,-2 1 0,-1-3 0,0 6 0,-4-6 0,4 7 0,-5-7 0,5 6 0,1-6 0,9 6 0,1-6 0,4 2 0,1-3 0,-2 0 0,-1 0 0,1 0 0,1 0 0,-1 0 0,3 0 0,-6 0 0,6 0 0,-3-3 0,3-10 0,3 4 0,-1-11 0,4 6 0,3-1 0,-2-2 0,0 3 0,1 55 0,-1-28 0,6 44 0,0-42 0,0-4 0,0 9 0,0-9 0,0 9 0,6-4 0,4-9 0,11 2 0,-3-9 0,7 0 0,-9 0 0,7 0 0,-7 0 0,7 0 0,-8 0 0,4 0 0,0 0 0,-3 0 0,7 0 0,-3 0 0,9 0 0,-4 0 0,9 0 0,-4 0 0,0 0 0,4 0 0,-9 0 0,0 0 0,-2-4 0,-7 3 0,3-2 0,-5 3 0,1 0 0,6-3 0,-5 2 0,10-2 0,-6 3 0,0-4 0,3 3 0,-7-2 0,2 3 0,-3 0 0,0-3 0,2 2 0,-1-2 0,1 3 0,-2 0 0,4 0 0,1 0 0,4-4 0,0 3 0,0-2 0,-4 3 0,3 0 0,-7 0 0,-1 0 0,2 0 0,-5 0 0,8 0 0,-1 0 0,3 0 0,-3 0 0,4 0 0,-7 0 0,2 0 0,0 0 0,-6 0 0,10 0 0,-10-3 0,9 2 0,-7-2 0,0 3 0,3-3 0,-3 3 0,3-3 0,-1 0 0,-2 2 0,2-2 0</inkml:trace>
-</inkml:ink>
-</file>
-
-<file path=ppt/ink/ink144.xml><?xml version="1.0" encoding="utf-8"?>
-<inkml:ink xmlns:inkml="http://www.w3.org/2003/InkML">
-  <inkml:definitions>
-    <inkml:context xml:id="ctx0">
-      <inkml:inkSource xml:id="inkSrc0">
-        <inkml:traceFormat>
-          <inkml:channel name="X" type="integer" min="-2.14748E9" max="2.14748E9" units="cm"/>
-          <inkml:channel name="Y" type="integer" min="-2.14748E9" max="2.14748E9" units="cm"/>
-          <inkml:channel name="F" type="integer" max="32767" units="dev"/>
-        </inkml:traceFormat>
-        <inkml:channelProperties>
-          <inkml:channelProperty channel="X" name="resolution" value="1000" units="1/cm"/>
-          <inkml:channelProperty channel="Y" name="resolution" value="1000" units="1/cm"/>
-          <inkml:channelProperty channel="F" name="resolution" value="0" units="1/dev"/>
-        </inkml:channelProperties>
-      </inkml:inkSource>
       <inkml:timestamp xml:id="ts0" timeString="2022-09-11T15:17:52.905"/>
     </inkml:context>
     <inkml:brush xml:id="br0">
@@ -1564,7 +1456,7 @@
 </inkml:ink>
 </file>
 
-<file path=ppt/ink/ink145.xml><?xml version="1.0" encoding="utf-8"?>
+<file path=ppt/ink/ink141.xml><?xml version="1.0" encoding="utf-8"?>
 <inkml:ink xmlns:inkml="http://www.w3.org/2003/InkML">
   <inkml:definitions>
     <inkml:context xml:id="ctx0">
@@ -1593,7 +1485,7 @@
 </inkml:ink>
 </file>
 
-<file path=ppt/ink/ink146.xml><?xml version="1.0" encoding="utf-8"?>
+<file path=ppt/ink/ink142.xml><?xml version="1.0" encoding="utf-8"?>
 <inkml:ink xmlns:inkml="http://www.w3.org/2003/InkML">
   <inkml:definitions>
     <inkml:context xml:id="ctx0">
@@ -1622,7 +1514,7 @@
 </inkml:ink>
 </file>
 
-<file path=ppt/ink/ink147.xml><?xml version="1.0" encoding="utf-8"?>
+<file path=ppt/ink/ink143.xml><?xml version="1.0" encoding="utf-8"?>
 <inkml:ink xmlns:inkml="http://www.w3.org/2003/InkML">
   <inkml:definitions>
     <inkml:context xml:id="ctx0">
@@ -1651,7 +1543,7 @@
 </inkml:ink>
 </file>
 
-<file path=ppt/ink/ink148.xml><?xml version="1.0" encoding="utf-8"?>
+<file path=ppt/ink/ink144.xml><?xml version="1.0" encoding="utf-8"?>
 <inkml:ink xmlns:inkml="http://www.w3.org/2003/InkML">
   <inkml:definitions>
     <inkml:context xml:id="ctx0">
@@ -1680,7 +1572,7 @@
 </inkml:ink>
 </file>
 
-<file path=ppt/ink/ink149.xml><?xml version="1.0" encoding="utf-8"?>
+<file path=ppt/ink/ink145.xml><?xml version="1.0" encoding="utf-8"?>
 <inkml:ink xmlns:inkml="http://www.w3.org/2003/InkML">
   <inkml:definitions>
     <inkml:context xml:id="ctx0">
@@ -1706,6 +1598,119 @@
     </inkml:brush>
   </inkml:definitions>
   <inkml:trace contextRef="#ctx0" brushRef="#br0">126 46 16383,'65'0'0,"-6"0"0,-24 0 0,6 0 0,-5 0 0,5 0 0,-6 0 0,0 0 0,-1 0 0,-8 0 0,7 0 0,-16 0 0,7 0 0,-10 0 0,1 0 0,6 0 0,-8 0 0,7 0 0,-6 0 0,0 0 0,9 0 0,-8 0 0,2 0 0,0 0 0,-6 0 0,8 0 0,-1-3 0,4-1 0,-4 0 0,5 0 0,-7 1 0,3 2 0,-1-2 0,-7 3 0,8-3 0,-5-1 0,-1-2 0,10 2 0,-14-2 0,10 6 0,-31 35 0,8-19 0,-17 30 0,6-27 0,7-3 0,-4 7 0,1-3 0,2 0 0,-6 3 0,3-3 0,0 4 0,-4 0 0,4 0 0,0-4 0,0 3 0,5-11 0,-1 6 0,2-4 0,2 0 0,1 5 0,3-1 0,0-1 0,0 4 0,0-9 0,0 4 0,6-2 0,-2 0 0,14-3 0,-6-5 0,6-6 0,-25 26 0,6-16 0,-17 20 0,12-24 0,-4 0 0,-9 1 0,7-3 0,-13-2 0,11 2 0,-1-3 0,-9 2 0,15-3 0,-11 0 0,6 0 0,-4 0 0,3 0 0,-2 0 0,0 0 0,0 0 0,-4 0 0,6 0 0,1 0 0,-7-3 0,8 2 0,-7-5 0,7 5 0,-1-5 0,-9-1 0,8 3 0,-10-6 0,9 5 0,-7-3 0,7 1 0,-7-1 0,8 1 0,-4-1 0,4 4 0,0-3 0,1 7 0,0-10 0,-4 9 0,7-8 0,-9 5 0,9-3 0,-6 0 0,3 0 0,0 0 0,0 1 0,0-1 0,1 0 0,-3-3 0,5 3 0,-4-2 0,5-1 0,-3 3 0,-3-2 0,3 5 0,3-10 0,0 3 0,3-11 0</inkml:trace>
+</inkml:ink>
+</file>
+
+<file path=ppt/ink/ink146.xml><?xml version="1.0" encoding="utf-8"?>
+<inkml:ink xmlns:inkml="http://www.w3.org/2003/InkML">
+  <inkml:definitions>
+    <inkml:context xml:id="ctx0">
+      <inkml:inkSource xml:id="inkSrc0">
+        <inkml:traceFormat>
+          <inkml:channel name="X" type="integer" min="-2.14748E9" max="2.14748E9" units="cm"/>
+          <inkml:channel name="Y" type="integer" min="-2.14748E9" max="2.14748E9" units="cm"/>
+          <inkml:channel name="F" type="integer" max="32767" units="dev"/>
+        </inkml:traceFormat>
+        <inkml:channelProperties>
+          <inkml:channelProperty channel="X" name="resolution" value="1000" units="1/cm"/>
+          <inkml:channelProperty channel="Y" name="resolution" value="1000" units="1/cm"/>
+          <inkml:channelProperty channel="F" name="resolution" value="0" units="1/dev"/>
+        </inkml:channelProperties>
+      </inkml:inkSource>
+      <inkml:timestamp xml:id="ts0" timeString="2022-09-11T15:18:41.255"/>
+    </inkml:context>
+    <inkml:brush xml:id="br0">
+      <inkml:brushProperty name="width" value="0.3" units="cm"/>
+      <inkml:brushProperty name="height" value="0.6" units="cm"/>
+      <inkml:brushProperty name="tip" value="rectangle"/>
+      <inkml:brushProperty name="rasterOp" value="maskPen"/>
+    </inkml:brush>
+  </inkml:definitions>
+  <inkml:trace contextRef="#ctx0" brushRef="#br0">787 74 16383,'-41'30'0,"3"1"0,21-18 0,-7 11 0,15-15 0,-6 7 0,5-3 0,3-5 0,-6 8 0,6-6 0,-6 4 0,3-4 0,-3 0 0,3 2 0,-3-4 0,6 7 0,-6-5 0,3 3 0,0-2 0,-3-2 0,-1 1 0,2-2 0,-5 6 0,10-7 0,-7 6 0,4-2 0,0-1 0,-6 2 0,8-4 0,-7 4 0,4-4 0,-6 5 0,5-5 0,-1 2 0,0-1 0,5-1 0,-12 5 0,12-6 0,-9 4 0,3-1 0,-2-2 0,2 2 0,-2 0 0,7-3 0,-6 3 0,2-3 0,-1-1 0,-5-2 0,5 1 0,-1-4 0,-1 2 0,3-3 0,-5 0 0,4 0 0,-4 0 0,5 0 0,56-7 0,-29 6 0,48-6 0,-51 7 0,2 0 0,4 6 0,-4-1 0,3 8 0,-9-2 0,1 4 0,2 3 0,-2-3 0,2 3 0,-2-4 0,-1 1 0,0 3 0,0-3 0,0-1 0,0 3 0,-1-6 0,1 6 0,0-3 0,0 0 0,0-1 0,2 3 0,-2-5 0,3 4 0,-1-5 0,-2 3 0,6 0 0,-3-2 0,0 1 0,2-2 0,-2 0 0,6 2 0,-5-5 0,4 3 0,-5-1 0,3-1 0,0 4 0,1-4 0,-1 4 0,0-2 0,-3 1 0,3 1 0,-3-5 0,3 8 0,-3-7 0,2 7 0,-2-7 0,3 1 0,6-5 0,-5-1 0,5-3 0,-5-4 0,1 0 0,0-3 0,-1 0 0,1-1 0,0 1 0,-1 0 0,3-3 0,-6 5 0,5-7 0,-5 8 0,3-10 0,1 6 0,0-6 0,-1 3 0,1-1 0,0-1 0,-1 4 0,-2-4 0,5-2 0,-9 3 0,5-1 0,1 0 0,-2 1 0,5-6 0,-2 3 0,0 4 0,0-7 0,-4 9 0,4-9 0,-8 11 0,7-7 0,-4 6 0,4-5 0,-1 3 0,-2 0 0,1-3 0,-2 3 0,1 0 0,4-2 0,-4 1 0,4 1 0,-2-2 0,-2 5 0,1-6 0,1 3 0,-2 3 0,5-5 0,-2 4 0,0-3 0,4-2 0,1 4 0,-4-1 0,4-1 0,-4 3 0,-4-3 0,5 4 0,-5 1 0,8 2 0,-6-1 0,2 4 0,1-5 0,-2 3 0,2-1 0,-3-4 0,0 0 0,1-2 0,-1-2 0,1 4 0,-52 8 0,17-1 0,-43 8 0,29-3 0,-6-3 0,5 7 0,-5-7 0,6 3 0,5-4 0,1 0 0,5 0 0,4 0 0,1 0 0,5 0 0,0 0 0,-3 0 0,6-16 0,-1 10 0,8-17 0,-5 9 0,8 2 0,-12-11 0,11 10 0,-7-8 0,4 2 0,1 4 0,0-9 0,1 9 0,2-8 0,-2 7 0,0-7 0,2 7 0,-3-3 0,1 5 0,2-4 0,-2 3 0,3-2 0,-6 4 0,-1-4 0,-3 7 0,1-5 0,2 4 0,-3 0 0,-1-6 0,-1 5 0,-1-2 0,5 3 0,-9 1 0,6 3 0,-6-3 0,4 4 0,54 25 0,-29-13 0,40 20 0,-38-18 0,-3-1 0,4 0 0,-1 3 0,1-2 0,-2 1 0,1-2 0,-1 3 0,-3 0 0,3 0 0,-3 2 0,3-1 0,0-1 0,0-1 0,0 0 0,0-1 0,0 1 0,1-2 0,-1 2 0,0-1 0,-6 7 0,-1-2 0,-21 6 0,0-5 0,-20 7 0,4-6 0,-6 12 0,2-8 0,-2 3 0,2-4 0,5-1 0,1-4 0,5 2 0,4-6 0,-3 2 0,7-3 0,-3-1 0,5 1 0,-1-1 0,-3 3 0,7-2 0,-5 2 0,2-7 0,0 0 0,-4-3 0,5 6 0,-3 1 0</inkml:trace>
+</inkml:ink>
+</file>
+
+<file path=ppt/ink/ink147.xml><?xml version="1.0" encoding="utf-8"?>
+<inkml:ink xmlns:inkml="http://www.w3.org/2003/InkML">
+  <inkml:definitions>
+    <inkml:context xml:id="ctx0">
+      <inkml:inkSource xml:id="inkSrc0">
+        <inkml:traceFormat>
+          <inkml:channel name="X" type="integer" min="-2.14748E9" max="2.14748E9" units="cm"/>
+          <inkml:channel name="Y" type="integer" min="-2.14748E9" max="2.14748E9" units="cm"/>
+          <inkml:channel name="F" type="integer" max="32767" units="dev"/>
+        </inkml:traceFormat>
+        <inkml:channelProperties>
+          <inkml:channelProperty channel="X" name="resolution" value="1000" units="1/cm"/>
+          <inkml:channelProperty channel="Y" name="resolution" value="1000" units="1/cm"/>
+          <inkml:channelProperty channel="F" name="resolution" value="0" units="1/dev"/>
+        </inkml:channelProperties>
+      </inkml:inkSource>
+      <inkml:timestamp xml:id="ts0" timeString="2022-09-11T15:19:00.828"/>
+    </inkml:context>
+    <inkml:brush xml:id="br0">
+      <inkml:brushProperty name="width" value="0.3" units="cm"/>
+      <inkml:brushProperty name="height" value="0.6" units="cm"/>
+      <inkml:brushProperty name="color" value="#EF0C4D"/>
+      <inkml:brushProperty name="tip" value="rectangle"/>
+      <inkml:brushProperty name="rasterOp" value="maskPen"/>
+    </inkml:brush>
+  </inkml:definitions>
+  <inkml:trace contextRef="#ctx0" brushRef="#br0">1 325 16383,'49'0'0,"-5"0"0,-20 0 0,0 0 0,-8 0 0,-1 0 0,1 0 0,-4 0 0,8 0 0,-4 0 0,-1 0 0,7-7 0,8-9 0,-3-2 0,23-13 0,-26 17 0,15-6 0,-27 13 0,6 0 0,-5 3 0,2-2 0,1-1 0,-3 0 0,0-6 0,0 6 0,0-5 0,1 1 0,0 0 0,0 0 0,1 4 0,2-3 0,-5 2 0,1-2 0,1 3 0,0-3 0,1 2 0,2-2 0,-7 1 0,4 4 0,-1-7 0,3 11 0,-2-5 0,8 3 0,-10 0 0,7-1 0,-5 1 0,1 3 0,2 0 0,0 0 0,-1 0 0,1 0 0,2 0 0,-3 3 0,7 5 0,3 10 0,0-1 0,5 9 0,-7-8 0,2 7 0,5-2 0,-8 2 0,7 2 0,-13-7 0,3 0 0,-6-5 0,1-1 0,0 1 0,-4 0 0,3-4 0,-6 3 0,6 0 0,-7-2 0,6 4 0,-3-5 0,1-1 0,-2 5 0,1-4 0,-3 3 0,6-2 0,-3-5 0,3 6 0,1-6 0,-2 3 0,4-4 0,-2-2 0,2 1 0,3-4 0,-7 2 0,8-3 0,-7 0 0,2 0 0,4 3 0,-5-2 0,2 2 0,0-3 0,-3 0 0,-44 24 0,15-18 0,-39 22 0,31-28 0,0 8 0,4-4 0,-3 0 0,7 3 0,1-7 0,-1 7 0,5-1 0,-2 5 0,-2 2 0,7-3 0,-8 3 0,6-3 0,0 0 0,-7 3 0,9-5 0,-11 5 0,10-2 0,-8 0 0,9 3 0,-6-6 0,3 6 0,-1-3 0,-1 0 0,1 3 0,-3-2 0,1-1 0,-1 3 0,4-6 0,-3 2 0,3 1 0,-3-3 0,-1 6 0,4-7 0,-3 4 0,4-1 0,-4-3 0,0 3 0,-1-7 0,-3 3 0,4-2 0,-3 0 0,3 5 0,-1-4 0,1 4 0,-2-2 0,5 0 0,-5 0 0,-1-1 0,6 1 0,-5 0 0,6 2 0,-8-1 0,7 1 0,-5-2 0,3 0 0,-1 0 0,-8-4 0,10 0 0,-11-3 0,12 0 0,-5 0 0,-1 0 0,4-9 0,-4 1 0,7-9 0,0 3 0,2 0 0,4-1 0,-2-4 0,1 4 0,-2-4 0,-1 4 0,1 4 0,-3-6 0,3 9 0,-6-8 0,2 2 0,1 3 0,0-6 0,3 3 0,3 2 0,-5-7 0,4 8 0,-7-2 0,1 1 0,1 1 0,-2-2 0,2 3 0,-6 3 0,0 4 0,-1 3 0,2 0 0,-1 0 0,2 0 0,-5-5 0,5 0 0,1-7 0,6-4 0,4 2 0,3-5 0,0 5 0,7 1 0,5 2 0,8 4 0,4 0 0,5 6 0,1-7 0,5 7 0,0-3 0,0 4 0,-4 0 0,2 0 0,-7 0 0,8 0 0,-9 0 0,4 4 0,-5 0 0,0 1 0,0 2 0,-4-6 0,3 6 0,-7-6 0,-1 3 0,2-1 0,-6-2 0,9 2 0,-6-3 0,3 0 0,-1 0 0,-1 0 0,3 0 0,-4-6 0,-1-1 0,-4-7 0</inkml:trace>
+</inkml:ink>
+</file>
+
+<file path=ppt/ink/ink148.xml><?xml version="1.0" encoding="utf-8"?>
+<inkml:ink xmlns:inkml="http://www.w3.org/2003/InkML">
+  <inkml:definitions>
+    <inkml:context xml:id="ctx0">
+      <inkml:inkSource xml:id="inkSrc0">
+        <inkml:traceFormat>
+          <inkml:channel name="X" type="integer" min="-2.14748E9" max="2.14748E9" units="cm"/>
+          <inkml:channel name="Y" type="integer" min="-2.14748E9" max="2.14748E9" units="cm"/>
+          <inkml:channel name="F" type="integer" max="32767" units="dev"/>
+        </inkml:traceFormat>
+        <inkml:channelProperties>
+          <inkml:channelProperty channel="X" name="resolution" value="1000" units="1/cm"/>
+          <inkml:channelProperty channel="Y" name="resolution" value="1000" units="1/cm"/>
+          <inkml:channelProperty channel="F" name="resolution" value="0" units="1/dev"/>
+        </inkml:channelProperties>
+      </inkml:inkSource>
+      <inkml:timestamp xml:id="ts0" timeString="2022-09-11T15:20:38.220"/>
+    </inkml:context>
+    <inkml:brush xml:id="br0">
+      <inkml:brushProperty name="width" value="0.1" units="cm"/>
+      <inkml:brushProperty name="height" value="0.1" units="cm"/>
+    </inkml:brush>
+  </inkml:definitions>
+  <inkml:trace contextRef="#ctx0" brushRef="#br0">747 1 24575,'0'13'0,"0"1"0,0 0 0,-3-3 0,2 3 0,-2-3 0,-3 10 0,4-5 0,-4 2 0,6-8 0,0-4 0,-3 1 0,2 0 0,-2-1 0,3 1 0,-3-1 0,-1 7 0,-3-1 0,3 2 0,-2 0 0,5-7 0,-3 4 0,4-5 0,-2 1 0,1 2 0,-5 2 0,5 0 0,-6 3 0,3-3 0,0 3 0,-2 1 0,2 0 0,-4-1 0,4-3 0,1 3 0,0-6 0,2 2 0,-2-3 0,3-1 0,0 1 0,-3-1 0,-1 5 0,-3 4 0,-1 5 0,4 4 0,-7 0 0,6 0 0,-7 0 0,4 0 0,0 1 0,4-1 0,-7 0 0,9 0 0,-12 0 0,8 0 0,-5 0 0,-4 11 0,5-8 0,-2 4 0,5-8 0,3-8 0,-4 4 0,1 0 0,2-3 0,-2 7 0,3-3 0,-5 9 0,-2-4 0,1 9 0,-2-4 0,0 0 0,3-1 0,-3-5 0,4 1 0,4-6 0,-3 0 0,3 3 0,-4-6 0,1 9 0,-1-5 0,0 4 0,-4 0 0,3 5 0,-7 1 0,3 5 0,-1 0 0,-2-4 0,3 2 0,0-2 0,-3-1 0,7-2 0,-7 1 0,3-4 0,0 9 0,-3-4 0,2 5 0,-4 6 0,0-5 0,4 5 0,-2-11 0,7 4 0,-3-9 0,4 11 0,3-15 0,2 5 0,3-12 0,0 1 0,0 0 0,0-1 0,0 1 0,0 0 0,0 3 0,0-2 0,0 3 0,0 0 0,0 1 0,0 0 0,0 3 0,0-7 0,0 7 0,3 3 0,-2 0 0,5 0 0,-5-3 0,6-3 0,-6 0 0,6 3 0,-6-3 0,12 17 0,-7-14 0,8 9 0,-6-17 0,5 5 0,-5-7 0,5 6 0,-6-11 0,3 5 0,-3-6 0,11 7 0,-6-6 0,7 7 0,0-7 0,14 13 0,-10-11 0,8 7 0,-19-10 0,1 1 0,-2-1 0,4-3 0,15 3 0,-8-3 0,13 1 0,-6 2 0,1-6 0,5 3 0,0-4 0,-1 4 0,-4-3 0,4 3 0,-8-4 0,2 0 0,1 0 0,-3 0 0,3 0 0,-5 0 0,0 0 0,0 0 0,-4 0 0,3 0 0,-7 0 0,3 0 0,-5 0 0,1 0 0,0 0 0,-1 0 0,1 0 0,-4 0 0,3 0 0,-3-4 0,0 3 0,-1-2 0,-3 0 0,-1 2 0,1-1 0,-3-1 0,1-1 0,2 1 0,4-3 0,8-2 0,-3-1 0,7-2 0,-7 3 0,-1 1 0,-1 3 0,-7-2 0,3 3 0,-3-1 0,0 1 0,-1 0 0,1-4 0,0-1 0,3-6 0,6 3 0,-1-4 0,4 3 0,-8 2 0,0-1 0,-1 3 0,-2 1 0,2 1 0,-3-1 0,-1 0 0,1-6 0,0 2 0,0 0 0,0 1 0,-3 0 0,1 5 0,-4-4 0,2 5 0,-3-2 0,0-14 0,4-2 0,-3-24 0,3-11 0,-4 1 0,0-11 0,0 5 0,0 0 0,0-6 0,0 13 0,0 7 0,0 8 0,0 5 0,0 0 0,-4 0 0,3 0 0,-7-6 0,3 5 0,-4-10 0,4 4 0,-4-5 0,4 5 0,-4 2 0,0-1 0,0 5 0,-4-4 0,4 5 0,-4 0 0,4 0 0,0-5 0,1 3 0,2-3 0,-1 10 0,2-4 0,-3-12 0,-1 12 0,1-15 0,-1 23 0,5-3 0,-3 5 0,2 0 0,-3 0 0,0 0 0,0 0 0,0 4 0,0-3 0,1 7 0,-4-3 0,2 0 0,-1 4 0,2-4 0,1 0 0,-1 3 0,1-2 0,-1 3 0,1 0 0,0 1 0,-1-1 0,1 0 0,0 1 0,-1-1 0,1 0 0,3 4 0,-3-3 0,0-3 0,-1 4 0,1-7 0,1 9 0,2 0 0,-3-3 0,0 3 0,3-4 0,-3 4 0,3-3 0,-3 3 0,0-3 0,0-1 0,3 4 0,-3-3 0,4 7 0,-1-4 0,-3 1 0,4 3 0,-1-7 0,-2 6 0,2-2 0,0 0 0,-2 3 0,6-4 0,-6 8 0,5-3 0,-5 2 0,5-2 0,-4-1 0,4 0 0,-5 4 0,5-7 0,-5 6 0,6-7 0,-6 5 0,5-1 0,-5 1 0,5-1 0,-4 0 0,4 1 0,-2-1 0,0-3 0,2 2 0,-2-2 0,0 4 0,2-1 0,-2 0 0,3 1 0,-3 2 0,2-1 0,-2 1 0,0 1 0,3-5 0,-3 3 0,3-3 0,-6 4 0,5 4 0,-5 3 0,6 0 0,0 0 0</inkml:trace>
+</inkml:ink>
+</file>
+
+<file path=ppt/ink/ink149.xml><?xml version="1.0" encoding="utf-8"?>
+<inkml:ink xmlns:inkml="http://www.w3.org/2003/InkML">
+  <inkml:definitions>
+    <inkml:context xml:id="ctx0">
+      <inkml:inkSource xml:id="inkSrc0">
+        <inkml:traceFormat>
+          <inkml:channel name="X" type="integer" min="-2.14748E9" max="2.14748E9" units="cm"/>
+          <inkml:channel name="Y" type="integer" min="-2.14748E9" max="2.14748E9" units="cm"/>
+          <inkml:channel name="F" type="integer" max="32767" units="dev"/>
+        </inkml:traceFormat>
+        <inkml:channelProperties>
+          <inkml:channelProperty channel="X" name="resolution" value="1000" units="1/cm"/>
+          <inkml:channelProperty channel="Y" name="resolution" value="1000" units="1/cm"/>
+          <inkml:channelProperty channel="F" name="resolution" value="0" units="1/dev"/>
+        </inkml:channelProperties>
+      </inkml:inkSource>
+      <inkml:timestamp xml:id="ts0" timeString="2022-09-11T15:21:27.525"/>
+    </inkml:context>
+    <inkml:brush xml:id="br0">
+      <inkml:brushProperty name="width" value="0.35" units="cm"/>
+      <inkml:brushProperty name="height" value="0.35" units="cm"/>
+    </inkml:brush>
+  </inkml:definitions>
+  <inkml:trace contextRef="#ctx0" brushRef="#br0">230 2014 24575,'-11'-38'0,"1"5"0,2 14 0,0 0 0,-3-6 0,2 1 0,-12-12 0,14 17 0,-8-7 0,11 22 0,0-2 0,-9 6 0,7 0 0,-9 3 0,9 4 0,2-1 0,-2 4 0,5-1 0,1 1 0,4-1 0,2-3 0,1 1 0,0 3 0,-4-3 0,3 3 0,-2-1 0,2-2 0,1 3 0,-4-4 0,3 1 0,-2 2 0,0-2 0,-23-4 0,7-1 0,-18-9 0,15 3 0,4-3 0,-2 0 0,5 0 0,-2 0 0,6 1 0,-2-1 0,3-2 0,-1 1 0,1-4 0,3 5 0,0-5 0,0 5 0,0-6 0,0 5 0,0-2 0,0 0 0,0 2 0,0-5 0,0 2 0,0-1 0,0 2 0,0 0 0,0 3 0,0-6 0,0 5 0,0-1 0,0 0 0,0 2 0,6-9 0,-4 7 0,7-7 0,-8 8 0,2-2 0,0 1 0,1 2 0,2-3 0,-2 0 0,2 3 0,-3-3 0,4-1 0,0 0 0,0 0 0,-3 1 0,2 3 0,-5-2 0,8-2 0,-8 1 0,8 0 0,-8 0 0,5 2 0,-2-2 0,2 0 0,-2-1 0,2 4 0,-5-5 0,4 4 0,-1-2 0,0 1 0,2-1 0,-2 2 0,0-2 0,2 3 0,-6-2 0,6 2 0,-5-6 0,2 6 0,-3-4 0,3 3 0,-2-5 0,2 6 0,0-7 0,-2 7 0,5-7 0,-5 3 0,5 0 0,-5-3 0,5 6 0,-6-2 0,7 0 0,-6 3 0,5-4 0,-6 2 0,3 2 0,-21 9 0,14 1 0,-17 9 0,17-5 0,1-1 0,-3 4 0,2-3 0,0 2 0,-2 0 0,3-2 0,-1 2 0,-5-3 0,5 1 0,-5 2 0,5-2 0,-2 3 0,3-4 0,-4 1 0,0-1 0,0 5 0,1-4 0,2 3 0,-2-3 0,2 0 0,0 2 0,-1-2 0,1 5 0,1-5 0,15-25 0,4 3 0,9-24 0,-4 14 0,-5 1 0,0 0 0,-4 4 0,3-3 0,-6 3 0,6-4 0,-3 0 0,5 0 0,-1 0 0,-1 4 0,-3-3 0,-1 7 0,-4 1 0,1 1 0,-2 7 0,1-1 0,-3 0 0,2 0 0,-5-5 0,4 2 0,-4 1 0,2 3 0,3-6 0,-4 1 0,7-5 0,-5 6 0,0-3 0,2 6 0,-5-2 0,5 1 0,-6 2 0,3-6 0,-3 6 0,0-2 0,0 0 0,0-1 0,0 0 0,0 1 0,4-1 0,-4 2 0,7-6 0,-6 7 0,2-7 0,0 7 0,-2-4 0,2 2 0,0-2 0,-2 0 0,2-2 0,-3 5 0,3-6 0,1 3 0,0-3 0,3-1 0,-6 0 0,2 4 0,0-3 0,-2 7 0,2-3 0,-3-3 0,3 4 0,-2-4 0,2 7 0,-3-4 0,3 0 0,-2 0 0,1 0 0,1 1 0,-2 2 0,2-5 0,-3 5 0,3-3 0,0 1 0,1 1 0,-1-4 0,0 5 0,-2-2 0,2-1 0,0 3 0,0-5 0,1 5 0,2-3 0,-5 1 0,4 2 0,-1-5 0,-1 5 0,3-2 0,-2-1 0,-1 3 0,3-3 0,-5 1 0,5 1 0,-6-4 0,3 5 0,0-2 0,-2 0 0,2 2 0,0-6 0,-2 6 0,4-3 0,-4 1 0,2 2 0,0-5 0,-2 5 0,2-3 0,0-1 0,-3 3 0,3-4 0,-3 4 0,15 27 0,-11-16 0,10 24 0,-11-20 0,-2-1 0,5 4 0,-5-2 0,2 2 0,0 0 0,-2-3 0,5 3 0,-3-1 0,1-2 0,2 3 0,-5-1 0,2-1 0,0 4 0,-3-5 0,6 2 0,-2 1 0,-1-3 0,0 4 0,0-3 0,-2 1 0,2 0 0,-1-2 0,2 2 0,0 0 0,-1-1 0,-1 4 0,-1-5 0,5 2 0,-6 1 0,3-3 0,-3 6 0,0-5 0,0 2 0,3 0 0,-2-3 0,2 6 0,-3-6 0,0 2 0,3 1 0,-2-3 0,2 6 0,0-2 0,-2-1 0,2 4 0,-3-6 0,0 2 0,3-1 0,-2 2 0,2 0 0,0-1 0,-3 0 0,3 1 0,-3 0 0,3 3 0,-2-3 0,3 4 0,-4-4 0,0 3 0,0-3 0,0 0 0,0-1 0,0 0 0,0-3 0,0 5 0,0-4 0,2 1 0,-1 0 0,2-2 0,-3 6 0,0-6 0,3 3 0,-2-1 0,1-2 0,-2 5 0,0-4 0,0 1 0,0 1 0,0-3 0,0 6 0,0-6 0,0 6 0,0-5 0,0 2 0,0 0 0,0-2 0,3 5 0,-2-6 0,2 3 0,-3 0 0,0-3 0,3 3 0,-2 0 0,2-3 0,0 6 0,-3-2 0,3 3 0,-3-3 0,0 3 0,0-7 0,0 7 0,0-7 0,0 7 0,3-6 0,-2 2 0,2-1 0,0-1 0,-2 4 0,2-4 0,0 1 0,-3 1 0,3-2 0,0 5 0,-2-6 0,2 6 0,-3-5 0,3 2 0,-3 0 0,6-3 0,4-23 0,-5 10 0,3-21 0,-8 21 0,4-4 0,-3 2 0,2-6 0,0 7 0,-3-7 0,3 7 0,-3-7 0,3 6 0,-2-2 0,5 1 0,-5 1 0,2-4 0,-3 5 0,0-5 0,0 5 0,0-3 0,0 0 0,0 3 0,0-7 0,0 7 0,0-2 0,0-3 0,0 39 0,0-24 0,0 36 0,0-32 0,0 7 0,0-7 0,0 7 0,3-6 0,-3 2 0,3 0 0,-3-3 0,3 7 0,-2-4 0,2 1 0,-3-1 0,0-1 0,3-2 0,-3 6 0,6-6 0,-5 2 0,5 1 0,-6-3 0,3 6 0,-3-6 0,3 3 0,-2-1 0,2-2 0,-3 5 0,0-1 0,0-1 0,0 1 0,0-2 0,0-2 0,0 6 0,0-6 0,0 2 0,0 1 0,0-3 0,0 6 0,0-3 0,0 1 0,0 3 0,0-7 0,0 3 0,0 1 0,0-4 0,0 10 0,0-9 0,0 5 0,0 0 0,0-4 0,0 4 0,0-4 0,0-2 0,0 5 0,0-4 0,0 1 0,0 1 0,0-3 0,0 6 0,0-6 0,0 2 0,0 0 0,0 1 0,0 0 0,0 1 0,0-4 0,0 5 0,0-5 0,0 3 0,0-1 0,0-1 0,0 4 0,0-4 0,0 1 0,0 1 0,0-3 0,0 5 0,0-5 0,0 3 0,0-1 0,0 0 0,0 1 0,0 0 0,-3-1 0,2-2 0,-5 3 0,6-1 0,-6-1 0,0 1 0,2-3 0,-1 4 0,2-3 0,-1 3 0,-2-1 0,-1-2 0,1 1 0,0-1 0,3 2 0,-6-2 0,8 2 0,-8-3 0,6 1 0,-7 0 0,3-1 0,-3-2 0,2 1 0,-3-4 0,1 2 0,0 0 0,0-3 0,-1 3 0,-4-3 0,4 3 0,-3-2 0,3 2 0,0 0 0,1-2 0,0 1 0,2-2 0,-5 0 0,6 0 0,-2 0 0,-4 0 0,4 0 0,-7 0 0,8 0 0,-2 0 0,0 0 0,2 0 0,-5 0 0,6 0 0,-3 0 0,1 0 0,-1 0 0,0 0 0,-1 0 0,3-13 0,-2 4 0,3-13 0,3 8 0,-3-5 0,6-1 0,-2-4 0,-1 0 0,3-5 0,-2-1 0,3-5 0,0 1 0,0 3 0,0-2 0,0 3 0,0 0 0,3 1 0,2 5 0,2 4 0,1 1 0,-4 5 0,2-1 0,-1-4 0,-1-1 0,3-4 0,-2 0 0,2 4 0,1-3 0,0 3 0,0 0 0,-1 5 0,-3 4 0,2 5 0,-5-3 0,2-1 0,-3 0 0,0 1 0,0-1 0,0 3 0,0-6 0,0 6 0,11 0 0,-2 18 0,8 3 0,-6 12 0,-3-2 0,4 0 0,-4 0 0,4-4 0,-4 3 0,-1-7 0,1 3 0,-1-4 0,0-1 0,1 1 0,-4-4 0,2-1 0,-2 0 0,0-2 0,2 2 0,-5 0 0,5-2 0,-6 2 0,6 0 0,-5-3 0,5 2 0,-2 1 0,2-3 0,-2 7 0,2-7 0,-6 7 0,7-3 0,-7 0 0,7 3 0,-6-3 0,5 0 0,-5 3 0,5-7 0,-6 3 0,6 0 0,-2-3 0,0 3 0,7-4 0,-9 0 0,9 1 0,-7 2 0,2-2 0,-2 3 0,2-1 0,-6-2 0,3 5 0,3-5 0,-5 2 0,11-3 0,-8 1 0,2-1 0,3 1 0,-5-1 0,7-2 0,-4 1 0,2-4 0,0 2 0,-2-3 0,0-12 0,-7 3 0,-4-12 0,-4 3 0,1 2 0,-1-7 0,0 3 0,3 0 0,-2-3 0,3 7 0,-4-3 0,1 5 0,3-1 0,-3 0 0,3 1 0,0-1 0,-2 0 0,5 1 0,-5-1 0,5 0 0,-6 4 0,7-3 0,-3 3 0,3 0 0,-3-3 0,2 7 0,-2-6 0,-1 2 0,3 0 0,-5 1 0,6 0 0,-3 3 0,0-4 0,-1 1 0,0 3 0,-3-7 0,7 6 0,-7-2 0,7 0 0,-6 3 0,5-4 0,-5 2 0,3 2 0,-1-7 0,-2 7 0,5-3 0,-5 0 0,6 3 0,-3-6 0,3 6 0,0-2 0,0 0 0,0-1 0,0 0 0,0 1 0,0-4 0,0 5 0,0-9 0,0 6 0,0 0 0,0-3 0,0 3 0,0-4 0,0 4 0,0-3 0,0 3 0,0 0 0,0 1 0,0 0 0,0 3 0,0-6 0,0 6 0,0-2 0,0-1 0,3 3 0,0-5 0,1 5 0,2-2 0,-3 0 0,1 2 0,2-2 0,-3 2 0,1-3 0,2 2 0,-2-2 0,2 1 0,-2 1 0,2-1 0,-6 0 0,3 2 0,-3-5 0,-5 6 0,3 38 0,-3-10 0,5 31 0,4-19 0,0-4 0,1 0 0,3 4 0,-7-9 0,6 0 0,-6-2 0,2-7 0,1 3 0,-4-5 0,4-3 0,-4 3 0,0-6 0,3 2 0,-3-1 0,3-1 0,1 8 0,-4-8 0,4 5 0,-4-3 0,0-3 0,3 9 0,-2-7 0,2 7 0,-3-8 0,0 6 0,0-7 0,0 7 0,0-7 0,0 3 0,0 0 0,0-3 0,0 6 0,0-2 0,0-1 0,0 4 0,0-6 0,0 2 0,0 0 0,0-3 0,0 7 0,0-7 0,0 3 0,0-1 0,0-2 0,0 6 0,0-6 0,0 5 0,0-3 0,0 1 0,0 0 0,0-1 0,3-2 0,-2 6 0,2-6 0,-3 3 0,5-1 0,-4-2 0,8 2 0,-6-3 0,4 4 0,0-3 0,-4 3 0,5-1 0,-6-2 0,3 2 0,1 1 0,-2-6 0,6 8 0,-4-8 0,1 5 0,-1 1 0,-2-3 0,-1 3 0,0-1 0,-3-2 0,3 5 0,-3-3 0,0 1 0,0 1 0,0-4 0,0 4 0,0-1 0,0 0 0,-11-4 0,6-4 0,-10-5 0,8-4 0,-4-8 0,-1-9 0,-1-2 0,-4-12 0,4 6 0,-5-9 0,4 6 0,-2 0 0,6 5 0,-2 1 0,4 5 0,3 0 0,-2 4 0,7-3 0,-7 7 0,6-3 0,-5 8 0,5-2 0,-2 5 0,3-6 0,-2 7 0,1-3 0,-5 0 0,3 3 0,-4-2 0,4 0 0,-3 2 0,3-2 0,-1-2 0,-2 4 0,2-11 0,0 6 0,-3-11 0,6 3 0,-6-4 0,3 4 0,-1-8 0,-1 11 0,5-16 0,-6 16 0,7-11 0,-4 13 0,1-4 0,2 4 0,-2 0 0,0 4 0,2-2 0,-2 5 0,0-2 0,3 1 0,-6 2 0,3-5 0,-1 5 0,-1-2 0,-1 0 0,1 2 0,-3-2 0,1 2 0,3 1 0,-5-1 0,6 0 0,-4-2 0,3 1 0,-2-1 0,3 3 0</inkml:trace>
 </inkml:ink>
 </file>
 
@@ -1752,119 +1757,6 @@
           <inkml:channelProperty channel="F" name="resolution" value="0" units="1/dev"/>
         </inkml:channelProperties>
       </inkml:inkSource>
-      <inkml:timestamp xml:id="ts0" timeString="2022-09-11T15:18:41.255"/>
-    </inkml:context>
-    <inkml:brush xml:id="br0">
-      <inkml:brushProperty name="width" value="0.3" units="cm"/>
-      <inkml:brushProperty name="height" value="0.6" units="cm"/>
-      <inkml:brushProperty name="tip" value="rectangle"/>
-      <inkml:brushProperty name="rasterOp" value="maskPen"/>
-    </inkml:brush>
-  </inkml:definitions>
-  <inkml:trace contextRef="#ctx0" brushRef="#br0">787 74 16383,'-41'30'0,"3"1"0,21-18 0,-7 11 0,15-15 0,-6 7 0,5-3 0,3-5 0,-6 8 0,6-6 0,-6 4 0,3-4 0,-3 0 0,3 2 0,-3-4 0,6 7 0,-6-5 0,3 3 0,0-2 0,-3-2 0,-1 1 0,2-2 0,-5 6 0,10-7 0,-7 6 0,4-2 0,0-1 0,-6 2 0,8-4 0,-7 4 0,4-4 0,-6 5 0,5-5 0,-1 2 0,0-1 0,5-1 0,-12 5 0,12-6 0,-9 4 0,3-1 0,-2-2 0,2 2 0,-2 0 0,7-3 0,-6 3 0,2-3 0,-1-1 0,-5-2 0,5 1 0,-1-4 0,-1 2 0,3-3 0,-5 0 0,4 0 0,-4 0 0,5 0 0,56-7 0,-29 6 0,48-6 0,-51 7 0,2 0 0,4 6 0,-4-1 0,3 8 0,-9-2 0,1 4 0,2 3 0,-2-3 0,2 3 0,-2-4 0,-1 1 0,0 3 0,0-3 0,0-1 0,0 3 0,-1-6 0,1 6 0,0-3 0,0 0 0,0-1 0,2 3 0,-2-5 0,3 4 0,-1-5 0,-2 3 0,6 0 0,-3-2 0,0 1 0,2-2 0,-2 0 0,6 2 0,-5-5 0,4 3 0,-5-1 0,3-1 0,0 4 0,1-4 0,-1 4 0,0-2 0,-3 1 0,3 1 0,-3-5 0,3 8 0,-3-7 0,2 7 0,-2-7 0,3 1 0,6-5 0,-5-1 0,5-3 0,-5-4 0,1 0 0,0-3 0,-1 0 0,1-1 0,0 1 0,-1 0 0,3-3 0,-6 5 0,5-7 0,-5 8 0,3-10 0,1 6 0,0-6 0,-1 3 0,1-1 0,0-1 0,-1 4 0,-2-4 0,5-2 0,-9 3 0,5-1 0,1 0 0,-2 1 0,5-6 0,-2 3 0,0 4 0,0-7 0,-4 9 0,4-9 0,-8 11 0,7-7 0,-4 6 0,4-5 0,-1 3 0,-2 0 0,1-3 0,-2 3 0,1 0 0,4-2 0,-4 1 0,4 1 0,-2-2 0,-2 5 0,1-6 0,1 3 0,-2 3 0,5-5 0,-2 4 0,0-3 0,4-2 0,1 4 0,-4-1 0,4-1 0,-4 3 0,-4-3 0,5 4 0,-5 1 0,8 2 0,-6-1 0,2 4 0,1-5 0,-2 3 0,2-1 0,-3-4 0,0 0 0,1-2 0,-1-2 0,1 4 0,-52 8 0,17-1 0,-43 8 0,29-3 0,-6-3 0,5 7 0,-5-7 0,6 3 0,5-4 0,1 0 0,5 0 0,4 0 0,1 0 0,5 0 0,0 0 0,-3 0 0,6-16 0,-1 10 0,8-17 0,-5 9 0,8 2 0,-12-11 0,11 10 0,-7-8 0,4 2 0,1 4 0,0-9 0,1 9 0,2-8 0,-2 7 0,0-7 0,2 7 0,-3-3 0,1 5 0,2-4 0,-2 3 0,3-2 0,-6 4 0,-1-4 0,-3 7 0,1-5 0,2 4 0,-3 0 0,-1-6 0,-1 5 0,-1-2 0,5 3 0,-9 1 0,6 3 0,-6-3 0,4 4 0,54 25 0,-29-13 0,40 20 0,-38-18 0,-3-1 0,4 0 0,-1 3 0,1-2 0,-2 1 0,1-2 0,-1 3 0,-3 0 0,3 0 0,-3 2 0,3-1 0,0-1 0,0-1 0,0 0 0,0-1 0,0 1 0,1-2 0,-1 2 0,0-1 0,-6 7 0,-1-2 0,-21 6 0,0-5 0,-20 7 0,4-6 0,-6 12 0,2-8 0,-2 3 0,2-4 0,5-1 0,1-4 0,5 2 0,4-6 0,-3 2 0,7-3 0,-3-1 0,5 1 0,-1-1 0,-3 3 0,7-2 0,-5 2 0,2-7 0,0 0 0,-4-3 0,5 6 0,-3 1 0</inkml:trace>
-</inkml:ink>
-</file>
-
-<file path=ppt/ink/ink151.xml><?xml version="1.0" encoding="utf-8"?>
-<inkml:ink xmlns:inkml="http://www.w3.org/2003/InkML">
-  <inkml:definitions>
-    <inkml:context xml:id="ctx0">
-      <inkml:inkSource xml:id="inkSrc0">
-        <inkml:traceFormat>
-          <inkml:channel name="X" type="integer" min="-2.14748E9" max="2.14748E9" units="cm"/>
-          <inkml:channel name="Y" type="integer" min="-2.14748E9" max="2.14748E9" units="cm"/>
-          <inkml:channel name="F" type="integer" max="32767" units="dev"/>
-        </inkml:traceFormat>
-        <inkml:channelProperties>
-          <inkml:channelProperty channel="X" name="resolution" value="1000" units="1/cm"/>
-          <inkml:channelProperty channel="Y" name="resolution" value="1000" units="1/cm"/>
-          <inkml:channelProperty channel="F" name="resolution" value="0" units="1/dev"/>
-        </inkml:channelProperties>
-      </inkml:inkSource>
-      <inkml:timestamp xml:id="ts0" timeString="2022-09-11T15:19:00.828"/>
-    </inkml:context>
-    <inkml:brush xml:id="br0">
-      <inkml:brushProperty name="width" value="0.3" units="cm"/>
-      <inkml:brushProperty name="height" value="0.6" units="cm"/>
-      <inkml:brushProperty name="color" value="#EF0C4D"/>
-      <inkml:brushProperty name="tip" value="rectangle"/>
-      <inkml:brushProperty name="rasterOp" value="maskPen"/>
-    </inkml:brush>
-  </inkml:definitions>
-  <inkml:trace contextRef="#ctx0" brushRef="#br0">1 325 16383,'49'0'0,"-5"0"0,-20 0 0,0 0 0,-8 0 0,-1 0 0,1 0 0,-4 0 0,8 0 0,-4 0 0,-1 0 0,7-7 0,8-9 0,-3-2 0,23-13 0,-26 17 0,15-6 0,-27 13 0,6 0 0,-5 3 0,2-2 0,1-1 0,-3 0 0,0-6 0,0 6 0,0-5 0,1 1 0,0 0 0,0 0 0,1 4 0,2-3 0,-5 2 0,1-2 0,1 3 0,0-3 0,1 2 0,2-2 0,-7 1 0,4 4 0,-1-7 0,3 11 0,-2-5 0,8 3 0,-10 0 0,7-1 0,-5 1 0,1 3 0,2 0 0,0 0 0,-1 0 0,1 0 0,2 0 0,-3 3 0,7 5 0,3 10 0,0-1 0,5 9 0,-7-8 0,2 7 0,5-2 0,-8 2 0,7 2 0,-13-7 0,3 0 0,-6-5 0,1-1 0,0 1 0,-4 0 0,3-4 0,-6 3 0,6 0 0,-7-2 0,6 4 0,-3-5 0,1-1 0,-2 5 0,1-4 0,-3 3 0,6-2 0,-3-5 0,3 6 0,1-6 0,-2 3 0,4-4 0,-2-2 0,2 1 0,3-4 0,-7 2 0,8-3 0,-7 0 0,2 0 0,4 3 0,-5-2 0,2 2 0,0-3 0,-3 0 0,-44 24 0,15-18 0,-39 22 0,31-28 0,0 8 0,4-4 0,-3 0 0,7 3 0,1-7 0,-1 7 0,5-1 0,-2 5 0,-2 2 0,7-3 0,-8 3 0,6-3 0,0 0 0,-7 3 0,9-5 0,-11 5 0,10-2 0,-8 0 0,9 3 0,-6-6 0,3 6 0,-1-3 0,-1 0 0,1 3 0,-3-2 0,1-1 0,-1 3 0,4-6 0,-3 2 0,3 1 0,-3-3 0,-1 6 0,4-7 0,-3 4 0,4-1 0,-4-3 0,0 3 0,-1-7 0,-3 3 0,4-2 0,-3 0 0,3 5 0,-1-4 0,1 4 0,-2-2 0,5 0 0,-5 0 0,-1-1 0,6 1 0,-5 0 0,6 2 0,-8-1 0,7 1 0,-5-2 0,3 0 0,-1 0 0,-8-4 0,10 0 0,-11-3 0,12 0 0,-5 0 0,-1 0 0,4-9 0,-4 1 0,7-9 0,0 3 0,2 0 0,4-1 0,-2-4 0,1 4 0,-2-4 0,-1 4 0,1 4 0,-3-6 0,3 9 0,-6-8 0,2 2 0,1 3 0,0-6 0,3 3 0,3 2 0,-5-7 0,4 8 0,-7-2 0,1 1 0,1 1 0,-2-2 0,2 3 0,-6 3 0,0 4 0,-1 3 0,2 0 0,-1 0 0,2 0 0,-5-5 0,5 0 0,1-7 0,6-4 0,4 2 0,3-5 0,0 5 0,7 1 0,5 2 0,8 4 0,4 0 0,5 6 0,1-7 0,5 7 0,0-3 0,0 4 0,-4 0 0,2 0 0,-7 0 0,8 0 0,-9 0 0,4 4 0,-5 0 0,0 1 0,0 2 0,-4-6 0,3 6 0,-7-6 0,-1 3 0,2-1 0,-6-2 0,9 2 0,-6-3 0,3 0 0,-1 0 0,-1 0 0,3 0 0,-4-6 0,-1-1 0,-4-7 0</inkml:trace>
-</inkml:ink>
-</file>
-
-<file path=ppt/ink/ink152.xml><?xml version="1.0" encoding="utf-8"?>
-<inkml:ink xmlns:inkml="http://www.w3.org/2003/InkML">
-  <inkml:definitions>
-    <inkml:context xml:id="ctx0">
-      <inkml:inkSource xml:id="inkSrc0">
-        <inkml:traceFormat>
-          <inkml:channel name="X" type="integer" min="-2.14748E9" max="2.14748E9" units="cm"/>
-          <inkml:channel name="Y" type="integer" min="-2.14748E9" max="2.14748E9" units="cm"/>
-          <inkml:channel name="F" type="integer" max="32767" units="dev"/>
-        </inkml:traceFormat>
-        <inkml:channelProperties>
-          <inkml:channelProperty channel="X" name="resolution" value="1000" units="1/cm"/>
-          <inkml:channelProperty channel="Y" name="resolution" value="1000" units="1/cm"/>
-          <inkml:channelProperty channel="F" name="resolution" value="0" units="1/dev"/>
-        </inkml:channelProperties>
-      </inkml:inkSource>
-      <inkml:timestamp xml:id="ts0" timeString="2022-09-11T15:20:38.220"/>
-    </inkml:context>
-    <inkml:brush xml:id="br0">
-      <inkml:brushProperty name="width" value="0.1" units="cm"/>
-      <inkml:brushProperty name="height" value="0.1" units="cm"/>
-    </inkml:brush>
-  </inkml:definitions>
-  <inkml:trace contextRef="#ctx0" brushRef="#br0">747 1 24575,'0'13'0,"0"1"0,0 0 0,-3-3 0,2 3 0,-2-3 0,-3 10 0,4-5 0,-4 2 0,6-8 0,0-4 0,-3 1 0,2 0 0,-2-1 0,3 1 0,-3-1 0,-1 7 0,-3-1 0,3 2 0,-2 0 0,5-7 0,-3 4 0,4-5 0,-2 1 0,1 2 0,-5 2 0,5 0 0,-6 3 0,3-3 0,0 3 0,-2 1 0,2 0 0,-4-1 0,4-3 0,1 3 0,0-6 0,2 2 0,-2-3 0,3-1 0,0 1 0,-3-1 0,-1 5 0,-3 4 0,-1 5 0,4 4 0,-7 0 0,6 0 0,-7 0 0,4 0 0,0 1 0,4-1 0,-7 0 0,9 0 0,-12 0 0,8 0 0,-5 0 0,-4 11 0,5-8 0,-2 4 0,5-8 0,3-8 0,-4 4 0,1 0 0,2-3 0,-2 7 0,3-3 0,-5 9 0,-2-4 0,1 9 0,-2-4 0,0 0 0,3-1 0,-3-5 0,4 1 0,4-6 0,-3 0 0,3 3 0,-4-6 0,1 9 0,-1-5 0,0 4 0,-4 0 0,3 5 0,-7 1 0,3 5 0,-1 0 0,-2-4 0,3 2 0,0-2 0,-3-1 0,7-2 0,-7 1 0,3-4 0,0 9 0,-3-4 0,2 5 0,-4 6 0,0-5 0,4 5 0,-2-11 0,7 4 0,-3-9 0,4 11 0,3-15 0,2 5 0,3-12 0,0 1 0,0 0 0,0-1 0,0 1 0,0 0 0,0 3 0,0-2 0,0 3 0,0 0 0,0 1 0,0 0 0,0 3 0,0-7 0,0 7 0,3 3 0,-2 0 0,5 0 0,-5-3 0,6-3 0,-6 0 0,6 3 0,-6-3 0,12 17 0,-7-14 0,8 9 0,-6-17 0,5 5 0,-5-7 0,5 6 0,-6-11 0,3 5 0,-3-6 0,11 7 0,-6-6 0,7 7 0,0-7 0,14 13 0,-10-11 0,8 7 0,-19-10 0,1 1 0,-2-1 0,4-3 0,15 3 0,-8-3 0,13 1 0,-6 2 0,1-6 0,5 3 0,0-4 0,-1 4 0,-4-3 0,4 3 0,-8-4 0,2 0 0,1 0 0,-3 0 0,3 0 0,-5 0 0,0 0 0,0 0 0,-4 0 0,3 0 0,-7 0 0,3 0 0,-5 0 0,1 0 0,0 0 0,-1 0 0,1 0 0,-4 0 0,3 0 0,-3-4 0,0 3 0,-1-2 0,-3 0 0,-1 2 0,1-1 0,-3-1 0,1-1 0,2 1 0,4-3 0,8-2 0,-3-1 0,7-2 0,-7 3 0,-1 1 0,-1 3 0,-7-2 0,3 3 0,-3-1 0,0 1 0,-1 0 0,1-4 0,0-1 0,3-6 0,6 3 0,-1-4 0,4 3 0,-8 2 0,0-1 0,-1 3 0,-2 1 0,2 1 0,-3-1 0,-1 0 0,1-6 0,0 2 0,0 0 0,0 1 0,-3 0 0,1 5 0,-4-4 0,2 5 0,-3-2 0,0-14 0,4-2 0,-3-24 0,3-11 0,-4 1 0,0-11 0,0 5 0,0 0 0,0-6 0,0 13 0,0 7 0,0 8 0,0 5 0,0 0 0,-4 0 0,3 0 0,-7-6 0,3 5 0,-4-10 0,4 4 0,-4-5 0,4 5 0,-4 2 0,0-1 0,0 5 0,-4-4 0,4 5 0,-4 0 0,4 0 0,0-5 0,1 3 0,2-3 0,-1 10 0,2-4 0,-3-12 0,-1 12 0,1-15 0,-1 23 0,5-3 0,-3 5 0,2 0 0,-3 0 0,0 0 0,0 0 0,0 4 0,0-3 0,1 7 0,-4-3 0,2 0 0,-1 4 0,2-4 0,1 0 0,-1 3 0,1-2 0,-1 3 0,1 0 0,0 1 0,-1-1 0,1 0 0,0 1 0,-1-1 0,1 0 0,3 4 0,-3-3 0,0-3 0,-1 4 0,1-7 0,1 9 0,2 0 0,-3-3 0,0 3 0,3-4 0,-3 4 0,3-3 0,-3 3 0,0-3 0,0-1 0,3 4 0,-3-3 0,4 7 0,-1-4 0,-3 1 0,4 3 0,-1-7 0,-2 6 0,2-2 0,0 0 0,-2 3 0,6-4 0,-6 8 0,5-3 0,-5 2 0,5-2 0,-4-1 0,4 0 0,-5 4 0,5-7 0,-5 6 0,6-7 0,-6 5 0,5-1 0,-5 1 0,5-1 0,-4 0 0,4 1 0,-2-1 0,0-3 0,2 2 0,-2-2 0,0 4 0,2-1 0,-2 0 0,3 1 0,-3 2 0,2-1 0,-2 1 0,0 1 0,3-5 0,-3 3 0,3-3 0,-6 4 0,5 4 0,-5 3 0,6 0 0,0 0 0</inkml:trace>
-</inkml:ink>
-</file>
-
-<file path=ppt/ink/ink153.xml><?xml version="1.0" encoding="utf-8"?>
-<inkml:ink xmlns:inkml="http://www.w3.org/2003/InkML">
-  <inkml:definitions>
-    <inkml:context xml:id="ctx0">
-      <inkml:inkSource xml:id="inkSrc0">
-        <inkml:traceFormat>
-          <inkml:channel name="X" type="integer" min="-2.14748E9" max="2.14748E9" units="cm"/>
-          <inkml:channel name="Y" type="integer" min="-2.14748E9" max="2.14748E9" units="cm"/>
-          <inkml:channel name="F" type="integer" max="32767" units="dev"/>
-        </inkml:traceFormat>
-        <inkml:channelProperties>
-          <inkml:channelProperty channel="X" name="resolution" value="1000" units="1/cm"/>
-          <inkml:channelProperty channel="Y" name="resolution" value="1000" units="1/cm"/>
-          <inkml:channelProperty channel="F" name="resolution" value="0" units="1/dev"/>
-        </inkml:channelProperties>
-      </inkml:inkSource>
-      <inkml:timestamp xml:id="ts0" timeString="2022-09-11T15:21:27.525"/>
-    </inkml:context>
-    <inkml:brush xml:id="br0">
-      <inkml:brushProperty name="width" value="0.35" units="cm"/>
-      <inkml:brushProperty name="height" value="0.35" units="cm"/>
-    </inkml:brush>
-  </inkml:definitions>
-  <inkml:trace contextRef="#ctx0" brushRef="#br0">230 2014 24575,'-11'-38'0,"1"5"0,2 14 0,0 0 0,-3-6 0,2 1 0,-12-12 0,14 17 0,-8-7 0,11 22 0,0-2 0,-9 6 0,7 0 0,-9 3 0,9 4 0,2-1 0,-2 4 0,5-1 0,1 1 0,4-1 0,2-3 0,1 1 0,0 3 0,-4-3 0,3 3 0,-2-1 0,2-2 0,1 3 0,-4-4 0,3 1 0,-2 2 0,0-2 0,-23-4 0,7-1 0,-18-9 0,15 3 0,4-3 0,-2 0 0,5 0 0,-2 0 0,6 1 0,-2-1 0,3-2 0,-1 1 0,1-4 0,3 5 0,0-5 0,0 5 0,0-6 0,0 5 0,0-2 0,0 0 0,0 2 0,0-5 0,0 2 0,0-1 0,0 2 0,0 0 0,0 3 0,0-6 0,0 5 0,0-1 0,0 0 0,0 2 0,6-9 0,-4 7 0,7-7 0,-8 8 0,2-2 0,0 1 0,1 2 0,2-3 0,-2 0 0,2 3 0,-3-3 0,4-1 0,0 0 0,0 0 0,-3 1 0,2 3 0,-5-2 0,8-2 0,-8 1 0,8 0 0,-8 0 0,5 2 0,-2-2 0,2 0 0,-2-1 0,2 4 0,-5-5 0,4 4 0,-1-2 0,0 1 0,2-1 0,-2 2 0,0-2 0,2 3 0,-6-2 0,6 2 0,-5-6 0,2 6 0,-3-4 0,3 3 0,-2-5 0,2 6 0,0-7 0,-2 7 0,5-7 0,-5 3 0,5 0 0,-5-3 0,5 6 0,-6-2 0,7 0 0,-6 3 0,5-4 0,-6 2 0,3 2 0,-21 9 0,14 1 0,-17 9 0,17-5 0,1-1 0,-3 4 0,2-3 0,0 2 0,-2 0 0,3-2 0,-1 2 0,-5-3 0,5 1 0,-5 2 0,5-2 0,-2 3 0,3-4 0,-4 1 0,0-1 0,0 5 0,1-4 0,2 3 0,-2-3 0,2 0 0,0 2 0,-1-2 0,1 5 0,1-5 0,15-25 0,4 3 0,9-24 0,-4 14 0,-5 1 0,0 0 0,-4 4 0,3-3 0,-6 3 0,6-4 0,-3 0 0,5 0 0,-1 0 0,-1 4 0,-3-3 0,-1 7 0,-4 1 0,1 1 0,-2 7 0,1-1 0,-3 0 0,2 0 0,-5-5 0,4 2 0,-4 1 0,2 3 0,3-6 0,-4 1 0,7-5 0,-5 6 0,0-3 0,2 6 0,-5-2 0,5 1 0,-6 2 0,3-6 0,-3 6 0,0-2 0,0 0 0,0-1 0,0 0 0,0 1 0,4-1 0,-4 2 0,7-6 0,-6 7 0,2-7 0,0 7 0,-2-4 0,2 2 0,0-2 0,-2 0 0,2-2 0,-3 5 0,3-6 0,1 3 0,0-3 0,3-1 0,-6 0 0,2 4 0,0-3 0,-2 7 0,2-3 0,-3-3 0,3 4 0,-2-4 0,2 7 0,-3-4 0,3 0 0,-2 0 0,1 0 0,1 1 0,-2 2 0,2-5 0,-3 5 0,3-3 0,0 1 0,1 1 0,-1-4 0,0 5 0,-2-2 0,2-1 0,0 3 0,0-5 0,1 5 0,2-3 0,-5 1 0,4 2 0,-1-5 0,-1 5 0,3-2 0,-2-1 0,-1 3 0,3-3 0,-5 1 0,5 1 0,-6-4 0,3 5 0,0-2 0,-2 0 0,2 2 0,0-6 0,-2 6 0,4-3 0,-4 1 0,2 2 0,0-5 0,-2 5 0,2-3 0,0-1 0,-3 3 0,3-4 0,-3 4 0,15 27 0,-11-16 0,10 24 0,-11-20 0,-2-1 0,5 4 0,-5-2 0,2 2 0,0 0 0,-2-3 0,5 3 0,-3-1 0,1-2 0,2 3 0,-5-1 0,2-1 0,0 4 0,-3-5 0,6 2 0,-2 1 0,-1-3 0,0 4 0,0-3 0,-2 1 0,2 0 0,-1-2 0,2 2 0,0 0 0,-1-1 0,-1 4 0,-1-5 0,5 2 0,-6 1 0,3-3 0,-3 6 0,0-5 0,0 2 0,3 0 0,-2-3 0,2 6 0,-3-6 0,0 2 0,3 1 0,-2-3 0,2 6 0,0-2 0,-2-1 0,2 4 0,-3-6 0,0 2 0,3-1 0,-2 2 0,2 0 0,0-1 0,-3 0 0,3 1 0,-3 0 0,3 3 0,-2-3 0,3 4 0,-4-4 0,0 3 0,0-3 0,0 0 0,0-1 0,0 0 0,0-3 0,0 5 0,0-4 0,2 1 0,-1 0 0,2-2 0,-3 6 0,0-6 0,3 3 0,-2-1 0,1-2 0,-2 5 0,0-4 0,0 1 0,0 1 0,0-3 0,0 6 0,0-6 0,0 6 0,0-5 0,0 2 0,0 0 0,0-2 0,3 5 0,-2-6 0,2 3 0,-3 0 0,0-3 0,3 3 0,-2 0 0,2-3 0,0 6 0,-3-2 0,3 3 0,-3-3 0,0 3 0,0-7 0,0 7 0,0-7 0,0 7 0,3-6 0,-2 2 0,2-1 0,0-1 0,-2 4 0,2-4 0,0 1 0,-3 1 0,3-2 0,0 5 0,-2-6 0,2 6 0,-3-5 0,3 2 0,-3 0 0,6-3 0,4-23 0,-5 10 0,3-21 0,-8 21 0,4-4 0,-3 2 0,2-6 0,0 7 0,-3-7 0,3 7 0,-3-7 0,3 6 0,-2-2 0,5 1 0,-5 1 0,2-4 0,-3 5 0,0-5 0,0 5 0,0-3 0,0 0 0,0 3 0,0-7 0,0 7 0,0-2 0,0-3 0,0 39 0,0-24 0,0 36 0,0-32 0,0 7 0,0-7 0,0 7 0,3-6 0,-3 2 0,3 0 0,-3-3 0,3 7 0,-2-4 0,2 1 0,-3-1 0,0-1 0,3-2 0,-3 6 0,6-6 0,-5 2 0,5 1 0,-6-3 0,3 6 0,-3-6 0,3 3 0,-2-1 0,2-2 0,-3 5 0,0-1 0,0-1 0,0 1 0,0-2 0,0-2 0,0 6 0,0-6 0,0 2 0,0 1 0,0-3 0,0 6 0,0-3 0,0 1 0,0 3 0,0-7 0,0 3 0,0 1 0,0-4 0,0 10 0,0-9 0,0 5 0,0 0 0,0-4 0,0 4 0,0-4 0,0-2 0,0 5 0,0-4 0,0 1 0,0 1 0,0-3 0,0 6 0,0-6 0,0 2 0,0 0 0,0 1 0,0 0 0,0 1 0,0-4 0,0 5 0,0-5 0,0 3 0,0-1 0,0-1 0,0 4 0,0-4 0,0 1 0,0 1 0,0-3 0,0 5 0,0-5 0,0 3 0,0-1 0,0 0 0,0 1 0,0 0 0,-3-1 0,2-2 0,-5 3 0,6-1 0,-6-1 0,0 1 0,2-3 0,-1 4 0,2-3 0,-1 3 0,-2-1 0,-1-2 0,1 1 0,0-1 0,3 2 0,-6-2 0,8 2 0,-8-3 0,6 1 0,-7 0 0,3-1 0,-3-2 0,2 1 0,-3-4 0,1 2 0,0 0 0,0-3 0,-1 3 0,-4-3 0,4 3 0,-3-2 0,3 2 0,0 0 0,1-2 0,0 1 0,2-2 0,-5 0 0,6 0 0,-2 0 0,-4 0 0,4 0 0,-7 0 0,8 0 0,-2 0 0,0 0 0,2 0 0,-5 0 0,6 0 0,-3 0 0,1 0 0,-1 0 0,0 0 0,-1 0 0,3-13 0,-2 4 0,3-13 0,3 8 0,-3-5 0,6-1 0,-2-4 0,-1 0 0,3-5 0,-2-1 0,3-5 0,0 1 0,0 3 0,0-2 0,0 3 0,0 0 0,3 1 0,2 5 0,2 4 0,1 1 0,-4 5 0,2-1 0,-1-4 0,-1-1 0,3-4 0,-2 0 0,2 4 0,1-3 0,0 3 0,0 0 0,-1 5 0,-3 4 0,2 5 0,-5-3 0,2-1 0,-3 0 0,0 1 0,0-1 0,0 3 0,0-6 0,0 6 0,11 0 0,-2 18 0,8 3 0,-6 12 0,-3-2 0,4 0 0,-4 0 0,4-4 0,-4 3 0,-1-7 0,1 3 0,-1-4 0,0-1 0,1 1 0,-4-4 0,2-1 0,-2 0 0,0-2 0,2 2 0,-5 0 0,5-2 0,-6 2 0,6 0 0,-5-3 0,5 2 0,-2 1 0,2-3 0,-2 7 0,2-7 0,-6 7 0,7-3 0,-7 0 0,7 3 0,-6-3 0,5 0 0,-5 3 0,5-7 0,-6 3 0,6 0 0,-2-3 0,0 3 0,7-4 0,-9 0 0,9 1 0,-7 2 0,2-2 0,-2 3 0,2-1 0,-6-2 0,3 5 0,3-5 0,-5 2 0,11-3 0,-8 1 0,2-1 0,3 1 0,-5-1 0,7-2 0,-4 1 0,2-4 0,0 2 0,-2-3 0,0-12 0,-7 3 0,-4-12 0,-4 3 0,1 2 0,-1-7 0,0 3 0,3 0 0,-2-3 0,3 7 0,-4-3 0,1 5 0,3-1 0,-3 0 0,3 1 0,0-1 0,-2 0 0,5 1 0,-5-1 0,5 0 0,-6 4 0,7-3 0,-3 3 0,3 0 0,-3-3 0,2 7 0,-2-6 0,-1 2 0,3 0 0,-5 1 0,6 0 0,-3 3 0,0-4 0,-1 1 0,0 3 0,-3-7 0,7 6 0,-7-2 0,7 0 0,-6 3 0,5-4 0,-5 2 0,3 2 0,-1-7 0,-2 7 0,5-3 0,-5 0 0,6 3 0,-3-6 0,3 6 0,0-2 0,0 0 0,0-1 0,0 0 0,0 1 0,0-4 0,0 5 0,0-9 0,0 6 0,0 0 0,0-3 0,0 3 0,0-4 0,0 4 0,0-3 0,0 3 0,0 0 0,0 1 0,0 0 0,0 3 0,0-6 0,0 6 0,0-2 0,0-1 0,3 3 0,0-5 0,1 5 0,2-2 0,-3 0 0,1 2 0,2-2 0,-3 2 0,1-3 0,2 2 0,-2-2 0,2 1 0,-2 1 0,2-1 0,-6 0 0,3 2 0,-3-5 0,-5 6 0,3 38 0,-3-10 0,5 31 0,4-19 0,0-4 0,1 0 0,3 4 0,-7-9 0,6 0 0,-6-2 0,2-7 0,1 3 0,-4-5 0,4-3 0,-4 3 0,0-6 0,3 2 0,-3-1 0,3-1 0,1 8 0,-4-8 0,4 5 0,-4-3 0,0-3 0,3 9 0,-2-7 0,2 7 0,-3-8 0,0 6 0,0-7 0,0 7 0,0-7 0,0 3 0,0 0 0,0-3 0,0 6 0,0-2 0,0-1 0,0 4 0,0-6 0,0 2 0,0 0 0,0-3 0,0 7 0,0-7 0,0 3 0,0-1 0,0-2 0,0 6 0,0-6 0,0 5 0,0-3 0,0 1 0,0 0 0,0-1 0,3-2 0,-2 6 0,2-6 0,-3 3 0,5-1 0,-4-2 0,8 2 0,-6-3 0,4 4 0,0-3 0,-4 3 0,5-1 0,-6-2 0,3 2 0,1 1 0,-2-6 0,6 8 0,-4-8 0,1 5 0,-1 1 0,-2-3 0,-1 3 0,0-1 0,-3-2 0,3 5 0,-3-3 0,0 1 0,0 1 0,0-4 0,0 4 0,0-1 0,0 0 0,-11-4 0,6-4 0,-10-5 0,8-4 0,-4-8 0,-1-9 0,-1-2 0,-4-12 0,4 6 0,-5-9 0,4 6 0,-2 0 0,6 5 0,-2 1 0,4 5 0,3 0 0,-2 4 0,7-3 0,-7 7 0,6-3 0,-5 8 0,5-2 0,-2 5 0,3-6 0,-2 7 0,1-3 0,-5 0 0,3 3 0,-4-2 0,4 0 0,-3 2 0,3-2 0,-1-2 0,-2 4 0,2-11 0,0 6 0,-3-11 0,6 3 0,-6-4 0,3 4 0,-1-8 0,-1 11 0,5-16 0,-6 16 0,7-11 0,-4 13 0,1-4 0,2 4 0,-2 0 0,0 4 0,2-2 0,-2 5 0,0-2 0,3 1 0,-6 2 0,3-5 0,-1 5 0,-1-2 0,-1 0 0,1 2 0,-3-2 0,1 2 0,3 1 0,-5-1 0,6 0 0,-4-2 0,3 1 0,-2-1 0,3 3 0</inkml:trace>
-</inkml:ink>
-</file>
-
-<file path=ppt/ink/ink154.xml><?xml version="1.0" encoding="utf-8"?>
-<inkml:ink xmlns:inkml="http://www.w3.org/2003/InkML">
-  <inkml:definitions>
-    <inkml:context xml:id="ctx0">
-      <inkml:inkSource xml:id="inkSrc0">
-        <inkml:traceFormat>
-          <inkml:channel name="X" type="integer" min="-2.14748E9" max="2.14748E9" units="cm"/>
-          <inkml:channel name="Y" type="integer" min="-2.14748E9" max="2.14748E9" units="cm"/>
-          <inkml:channel name="F" type="integer" max="32767" units="dev"/>
-        </inkml:traceFormat>
-        <inkml:channelProperties>
-          <inkml:channelProperty channel="X" name="resolution" value="1000" units="1/cm"/>
-          <inkml:channelProperty channel="Y" name="resolution" value="1000" units="1/cm"/>
-          <inkml:channelProperty channel="F" name="resolution" value="0" units="1/dev"/>
-        </inkml:channelProperties>
-      </inkml:inkSource>
       <inkml:timestamp xml:id="ts0" timeString="2022-09-11T15:11:50.938"/>
     </inkml:context>
     <inkml:brush xml:id="br0">
@@ -1876,7 +1768,7 @@
 </inkml:ink>
 </file>
 
-<file path=ppt/ink/ink155.xml><?xml version="1.0" encoding="utf-8"?>
+<file path=ppt/ink/ink151.xml><?xml version="1.0" encoding="utf-8"?>
 <inkml:ink xmlns:inkml="http://www.w3.org/2003/InkML">
   <inkml:definitions>
     <inkml:context xml:id="ctx0">
@@ -1903,7 +1795,7 @@
 </inkml:ink>
 </file>
 
-<file path=ppt/ink/ink156.xml><?xml version="1.0" encoding="utf-8"?>
+<file path=ppt/ink/ink152.xml><?xml version="1.0" encoding="utf-8"?>
 <inkml:ink xmlns:inkml="http://www.w3.org/2003/InkML">
   <inkml:definitions>
     <inkml:context xml:id="ctx0">
@@ -3766,14 +3658,14 @@
           <inkml:channelProperty channel="F" name="resolution" value="0" units="1/dev"/>
         </inkml:channelProperties>
       </inkml:inkSource>
-      <inkml:timestamp xml:id="ts0" timeString="2023-12-19T19:21:32.706"/>
+      <inkml:timestamp xml:id="ts0" timeString="2023-12-19T19:22:17.811"/>
     </inkml:context>
     <inkml:brush xml:id="br0">
       <inkml:brushProperty name="width" value="0.05" units="cm"/>
       <inkml:brushProperty name="height" value="0.05" units="cm"/>
     </inkml:brush>
   </inkml:definitions>
-  <inkml:trace contextRef="#ctx0" brushRef="#br0">31 119 24575,'0'27'0,"0"2"0,0 8 0,0-5 0,0 10 0,0-8 0,-5 14 0,4-9 0,-5 4 0,6-6 0,0-5 0,0 4 0,0-4 0,0 5 0,0-5 0,0 4 0,0-9 0,0 4 0,0-6 0,0-7 0,0 5 0,0-10 0,0 3 0,0 3 0,0-10 0,0 10 0,0-7 0,0 0 0,0-1 0,0-4 0,0 0 0,0 0 0,0 0 0,0 0 0,0 0 0,0-1 0,0 1 0,0 0 0,0 4 0,0-3 0,0 3 0,0-1 0,0-2 0,0 3 0,0-4 0,0 0 0,0 4 0,0-3 0,0 7 0,0-7 0,0 2 0,-8 1 0,6-3 0,-7 3 0,9-4 0,0 0 0,8-3 0,2-2 0,8-2 0,6 0 0,2 0 0,11 0 0,-5 0 0,12 0 0,-12 0 0,12 0 0,-12 0 0,11 0 0,-4 0 0,6 0 0,0 0 0,0 0 0,0 0 0,0 0 0,0 0 0,7 0 0,-5 0 0,5 0 0,-14 0 0,6 0 0,-12 0 0,12 0 0,-12 0 0,5 0 0,0 0 0,-4 0 0,4 0 0,0 0 0,-5 0 0,12 0 0,-12 0 0,6 0 0,-8 0 0,1 0 0,7 0 0,-6 4 0,11-3 0,3 3 0,1-4 0,5 4 0,0-3 0,-5 3 0,12-4 0,-13 4 0,13-3 0,-12 3 0,12 1 0,-5-4 0,0 3 0,-2-4 0,-7 0 0,0 0 0,-7 0 0,-1 0 0,-6 0 0,0 0 0,-5 0 0,3 0 0,-3 0 0,5 0 0,6 0 0,-4 0 0,4 0 0,0 0 0,-10-3 0,9 2 0,-16-2 0,10 3 0,-10 0 0,-1 0 0,-1 0 0,-4 0 0,5 0 0,5 0 0,-4 0 0,10 0 0,-10 0 0,10 0 0,-10 0 0,9 0 0,-8 0 0,3 0 0,-5 0 0,-1 0 0,7 0 0,-5 0 0,9 0 0,-3 0 0,5 0 0,0 0 0,0 0 0,-6 0 0,-1 0 0,-5 0 0,-5 0 0,0 0 0,-6 0 0,1 0 0,-1 0 0,0 0 0,0 0 0,-4-7 0,-1-13 0,-3-2 0,0-11 0,0 3 0,0 3 0,0 0 0,0 3 0,0 7 0,0 1 0,0 5 0,0 4 0,0 0 0,0 0 0,0-4 0,0 0 0,0-5 0,0 0 0,0 1 0,0-5 0,0-2 0,0 1 0,0 1 0,0 0 0,4 3 0,-3-3 0,4 5 0,-5-1 0,4-4 0,-3 3 0,8-8 0,-7 4 0,2-4 0,-4-1 0,5 0 0,-4 5 0,3-4 0,1 9 0,-4-4 0,3 8 0,-4 1 0,0 4 0,0 0 0,0-1 0,0 1 0,0 0 0,0 0 0,0 0 0,0 0 0,0 0 0,0 0 0,0 0 0,0-4 0,0 3 0,0-3 0,0 0 0,0 0 0,0-5 0,0 0 0,0 1 0,0-1 0,0 0 0,0 1 0,0 3 0,0-3 0,0 7 0,0-3 0,0 4 0,-4 4 0,0-6 0,0 4 0,-8-5 0,6 3 0,-6 0 0,3 3 0,1-2 0,-5 1 0,3 1 0,-3-3 0,-1 7 0,5-7 0,-9 7 0,3-4 0,-4 1 0,0 2 0,5-6 0,-4 7 0,4-4 0,0 4 0,-4 0 0,8 0 0,-8-3 0,9 2 0,-9-3 0,3 4 0,-4 0 0,5 0 0,-4 0 0,4 0 0,-5 0 0,0 0 0,0 0 0,0 0 0,0 0 0,0 0 0,1 0 0,-1 0 0,0 0 0,-6 0 0,5 0 0,-10 0 0,5 0 0,-6 0 0,0 0 0,5 0 0,-4 0 0,10 0 0,-4-3 0,-1 2 0,5-2 0,-4 3 0,5 0 0,0-4 0,-6 3 0,5-2 0,-4-1 0,5 3 0,0-2 0,0-1 0,0 3 0,0-2 0,0 3 0,0 0 0,0 0 0,0 0 0,5 0 0,-4 0 0,4 0 0,-5 0 0,-5 0 0,3 0 0,-3 0 0,0 0 0,3 0 0,-3 0 0,0 0 0,3 0 0,-3 0 0,0 0 0,3 0 0,-3 0 0,0 0 0,3 0 0,-8 0 0,8 0 0,-8 0 0,9 0 0,-10 0 0,10 0 0,-5 0 0,6 0 0,0 0 0,0 0 0,5 0 0,-4 0 0,4 0 0,-5 0 0,5 0 0,-4 0 0,4 0 0,-1 0 0,-3 0 0,9 0 0,-9 0 0,8 0 0,-3 0 0,0 0 0,-2 0 0,-4 0 0,0 0 0,1 0 0,-1 0 0,0 0 0,-6 0 0,5 0 0,-4 0 0,5 0 0,-6 0 0,5 0 0,-4 0 0,5 0 0,0 0 0,0 0 0,0 0 0,0 0 0,0 0 0,-5 0 0,4 0 0,-10 0 0,10-4 0,-10 4 0,10-4 0,-10 0 0,4 3 0,0-3 0,-3 4 0,9-3 0,-10 2 0,10-2 0,-5 3 0,6 0 0,0 0 0,0 0 0,0 0 0,0 0 0,5 0 0,1 0 0,4 0 0,1 0 0,-1 0 0,-4 0 0,3 0 0,-8 0 0,4 0 0,-1 0 0,-2 0 0,2 0 0,1 0 0,-4 0 0,8 0 0,-3 0 0,5 0 0,-1 0 0,0 0 0,1 0 0,-1 0 0,1 0 0,0 0 0,-1 0 0,-4 0 0,3 0 0,-3 0 0,4 0 0,1 0 0,-5 0 0,3 0 0,-3 0 0,-1 0 0,5 0 0,-5 0 0,6 0 0,-1 0 0,0 0 0,1 0 0,-1 0 0,1 0 0,-1 0 0,1 0 0,-1 0 0,1 0 0,-1 0 0,1 3 0,-1-3 0,1 4 0,-1-4 0,5 3 0,0 0 0,4 4 0,0 0 0,0-1 0,-4-2 0,4 2 0,-8-5 0,7 5 0,-7-5 0,4 2 0,-4-3 0,4 0 0,0 0 0</inkml:trace>
+  <inkml:trace contextRef="#ctx0" brushRef="#br0">199 0 24575,'0'14'0,"0"0"0,0 5 0,0-3 0,0 8 0,0-4 0,0 1 0,0-2 0,0 1 0,0-4 0,0 3 0,0-4 0,0-5 0,0 4 0,0-3 0,0 0 0,0 3 0,0-3 0,0 4 0,0-3 0,0 2 0,0-7 0,0 4 0,0-4 0,0 0 0,0-1 0,0 1 0,0-1 0,0 0 0,0 1 0,0 0 0,0-1 0,0 1 0,0 0 0,0 0 0,0 0 0,0-1 0,0 1 0,0 0 0,0-1 0,0 1 0,0-1 0,0 1 0,0 3 0,0-3 0,0 3 0,0-3 0,0 0 0,0-1 0,0 1 0,0-1 0,-3-3 0,-9 0 0,-5-3 0,-7 0 0,-1-4 0,0 0 0,4-4 0,2 0 0,3 3 0,5-1 0,0 5 0,4-2 0,1 3 0,5 0 0,4 0 0,4 0 0,3 0 0,-4 0 0,1 0 0,0 0 0,0 0 0,-1 0 0,1 0 0,0 0 0,0 3 0,0-2 0,-1 5 0,1-2 0,0 3 0,0-4 0,0 3 0,-1-2 0,1 3 0,0-4 0,-4 3 0,3-5 0,-3 2 0,4-3 0,-1-3 0,11-11 0,-4 1 0,9-9 0,-2 6 0,-8 4 0,7-3 0,-12 7 0,4-2 0,-4 6 0,-1-2 0,1 5 0,0-2 0,-1 3 0,1 0 0,-4-3 0,3 2 0,-6-2 0,3 3 0</inkml:trace>
 </inkml:ink>
 </file>
 
@@ -3793,14 +3685,14 @@
           <inkml:channelProperty channel="F" name="resolution" value="0" units="1/dev"/>
         </inkml:channelProperties>
       </inkml:inkSource>
-      <inkml:timestamp xml:id="ts0" timeString="2023-12-19T19:22:17.811"/>
+      <inkml:timestamp xml:id="ts0" timeString="2023-12-19T19:29:06.796"/>
     </inkml:context>
     <inkml:brush xml:id="br0">
       <inkml:brushProperty name="width" value="0.05" units="cm"/>
       <inkml:brushProperty name="height" value="0.05" units="cm"/>
     </inkml:brush>
   </inkml:definitions>
-  <inkml:trace contextRef="#ctx0" brushRef="#br0">199 0 24575,'0'14'0,"0"0"0,0 5 0,0-3 0,0 8 0,0-4 0,0 1 0,0-2 0,0 1 0,0-4 0,0 3 0,0-4 0,0-5 0,0 4 0,0-3 0,0 0 0,0 3 0,0-3 0,0 4 0,0-3 0,0 2 0,0-7 0,0 4 0,0-4 0,0 0 0,0-1 0,0 1 0,0-1 0,0 0 0,0 1 0,0 0 0,0-1 0,0 1 0,0 0 0,0 0 0,0 0 0,0-1 0,0 1 0,0 0 0,0-1 0,0 1 0,0-1 0,0 1 0,0 3 0,0-3 0,0 3 0,0-3 0,0 0 0,0-1 0,0 1 0,0-1 0,-3-3 0,-9 0 0,-5-3 0,-7 0 0,-1-4 0,0 0 0,4-4 0,2 0 0,3 3 0,5-1 0,0 5 0,4-2 0,1 3 0,5 0 0,4 0 0,4 0 0,3 0 0,-4 0 0,1 0 0,0 0 0,0 0 0,-1 0 0,1 0 0,0 0 0,0 3 0,0-2 0,-1 5 0,1-2 0,0 3 0,0-4 0,0 3 0,-1-2 0,1 3 0,0-4 0,-4 3 0,3-5 0,-3 2 0,4-3 0,-1-3 0,11-11 0,-4 1 0,9-9 0,-2 6 0,-8 4 0,7-3 0,-12 7 0,4-2 0,-4 6 0,-1-2 0,1 5 0,0-2 0,-1 3 0,1 0 0,-4-3 0,3 2 0,-6-2 0,3 3 0</inkml:trace>
+  <inkml:trace contextRef="#ctx0" brushRef="#br0">194 1 24575,'0'6'0,"0"0"0,0 4 0,0 2 0,0-1 0,0 3 0,0 2 0,0 5 0,0 4 0,0-1 0,0 6 0,0 1 0,0 5 0,0 6 0,0-5 0,0 0 0,0 4 0,0-14 0,0 14 0,0-20 0,0 13 0,0-17 0,0 17 0,0-7 0,0 4 0,0 4 0,0-4 0,0 5 0,0-5 0,0-1 0,0-5 0,0-5 0,0-1 0,0-7 0,0-2 0,0-3 0,0 0 0,-6-3 0,-1-2 0,0-5 0,-1-4 0,0-1 0,0-7 0,-6 7 0,2-7 0,0 4 0,-2-1 0,2-3 0,0 7 0,2-2 0,3 3 0,0 0 0,0 3 0,0-2 0,0 5 0,1-2 0,-1 3 0,1 0 0,2-3 0,-2 2 0,8-2 0,-1 3 0,12 3 0,-4 1 0,4 0 0,-2 3 0,-3-3 0,2 3 0,-3 0 0,0-4 0,0 3 0,-1-2 0,1 0 0,-3 2 0,2-5 0,-5 5 0,5-5 0,-2 5 0,2-3 0,1 4 0,-1-4 0,-2 3 0,2-5 0,-2 5 0,0-2 0,2 0 0,-5 2 0,4-3 0,-4 4 0,5-4 0,-5 3 0,5-5 0,-6 5 0,6-5 0,-3 1 0,4-2 0,0-3 0,0-1 0,-1-3 0,5 0 0,-3 0 0,2 0 0,1 0 0,-4 0 0,7-1 0,-5-3 0,5 3 0,-2-6 0,7 5 0,-3-6 0,4 7 0,-5-3 0,0 3 0,-4 1 0,0-1 0,-5 5 0,1-1 0,-3 1 0,2 3 0,-5-3 0,2 3 0</inkml:trace>
 </inkml:ink>
 </file>
 
@@ -3820,14 +3712,14 @@
           <inkml:channelProperty channel="F" name="resolution" value="0" units="1/dev"/>
         </inkml:channelProperties>
       </inkml:inkSource>
-      <inkml:timestamp xml:id="ts0" timeString="2023-12-19T19:22:56.832"/>
+      <inkml:timestamp xml:id="ts0" timeString="2023-12-19T19:29:10.643"/>
     </inkml:context>
     <inkml:brush xml:id="br0">
       <inkml:brushProperty name="width" value="0.05" units="cm"/>
       <inkml:brushProperty name="height" value="0.05" units="cm"/>
     </inkml:brush>
   </inkml:definitions>
-  <inkml:trace contextRef="#ctx0" brushRef="#br0">75 167 24575,'0'17'0,"0"9"0,0 7 0,0 10 0,0 6 0,0-1 0,0 7 0,0 9 0,0-6 0,0 10 0,0-23 0,0 15 0,0-16 0,0 11 0,0-12 0,0-1 0,0-11 0,0-1 0,0-10 0,0-4 0,0-2 0,0-6 0,0 3 0,0-5 0,0 1 0,0-1 0,3 1 0,-2-1 0,5 1 0,-2 0 0,-1 0 0,4 3 0,-3 2 0,0-1 0,3 3 0,-3-2 0,0 3 0,3-4 0,-7 0 0,6-4 0,-5-1 0,2 1 0,0 0 0,1-3 0,2-1 0,1-3 0,-1 0 0,1 0 0,0 0 0,0 0 0,3 0 0,2 0 0,7 0 0,1 0 0,5 0 0,5 0 0,1 0 0,5 0 0,0 0 0,6 0 0,-5 0 0,11 0 0,-11 0 0,10 0 0,-3 0 0,-1 0 0,4 0 0,-10 0 0,11 0 0,-11 0 0,11 0 0,-11 0 0,11 0 0,-11 0 0,10 0 0,-9 0 0,9 0 0,-9 0 0,3 0 0,-5 0 0,0 0 0,0 0 0,0 0 0,1 0 0,-1 0 0,5 0 0,2 0 0,19 0 0,-15 0 0,27 5 0,-14-4 0,18 4 0,-12-1 0,25-3 0,-22 9 0,26-4 0,-9 0-636,-6-1 636,-29-5 0,0 0 0,39 0 0,-37 0 0,-2 0 0,24 0 0,16 0 0,-24 0 0,19 0 0,-14 0 0,21 0 0,-37 0 0,-2 0 0,-2 0 0,-7 0 0,38 0 0,-32 0 0,12 0 636,0 0-636,0 0 0,0 0 0,-1 0 0,-5 0 0,4 0 0,-4 0 0,0 0 0,-2 0 0,-6 0 0,-1 0 0,-4 0 0,-3 0 0,-5 0 0,-5 0 0,4 0 0,-9 0 0,4 0 0,-5 0 0,-5 0 0,0 0 0,-5 0 0,0 0 0,-4 0 0,3 0 0,-2 0 0,7 0 0,2 0 0,9-4 0,-4 3 0,3-3 0,-4 4 0,0 0 0,0 0 0,-8-3 0,1 2 0,-10-2 0,2 3 0,-3 0 0,0 0 0,0 0 0,0 0 0,-1 0 0,1 0 0,0 0 0,0 0 0,0-3 0,3 2 0,-2-1 0,6 2 0,-3 0 0,9 0 0,-4 0 0,3 0 0,1 0 0,-4 0 0,7 0 0,-6 0 0,2 0 0,-4 0 0,-3 0 0,-2 0 0,-3 0 0,0 0 0,-4-6 0,0 2 0,-3-14 0,0-15 0,0-1 0,0-13 0,-4 11 0,3-6 0,-7 5 0,7 0 0,-3 7 0,4 5 0,0 0 0,0 5 0,0 4 0,0 5 0,0 4 0,0 0 0,0-6 0,0 1 0,0-6 0,0-2 0,0 4 0,0-8 0,0 4 0,0-1 0,0-3 0,0 8 0,0 0 0,0 5 0,0 4 0,0 1 0,0-1 0,0-4 0,0 0 0,0-9 0,0 0 0,0-5 0,0-5 0,0 4 0,0-4 0,0 5 0,0 0 0,0 4 0,0 2 0,0 7 0,0 2 0,0 3 0,0 0 0,0 1 0,0-1 0,0 1 0,0-1 0,0 0 0,0 0 0,0 0 0,0 0 0,0 0 0,-5 4 0,0-1 0,-7 4 0,4 0 0,-2 0 0,3 0 0,0-3 0,0 3 0,1-3 0,-1 3 0,0 0 0,-4 0 0,3-4 0,-6 4 0,3-7 0,-5 6 0,1-5 0,0 5 0,0-6 0,0 3 0,3-1 0,-2-1 0,6 5 0,-3-3 0,1 1 0,2 2 0,-3-2 0,1-1 0,2 3 0,-6-2 0,6 0 0,-7 2 0,8-2 0,-8 3 0,7 0 0,-6-3 0,3 2 0,-4-3 0,-1 4 0,1 0 0,-4-3 0,2 2 0,-6-7 0,6 7 0,-7-6 0,4 6 0,-5-6 0,0 6 0,-5-3 0,4 0 0,-4 3 0,5-2 0,0-1 0,0 3 0,0-3 0,1 1 0,-1 2 0,0-7 0,0 7 0,0-3 0,-5 0 0,4 3 0,-4-6 0,0 6 0,4-7 0,-9 7 0,4-2 0,0 3 0,-4 0 0,9-4 0,-9 3 0,3-3 0,1 4 0,-4 0 0,4 0 0,-5 0 0,5 0 0,-4 0 0,4 0 0,0 0 0,-4 0 0,4-4 0,-6 3 0,1-3 0,0 4 0,5-4 0,-4 4 0,4-4 0,-5 4 0,-1-4 0,1 3 0,5-3 0,-4 4 0,9-4 0,-9 3 0,4-3 0,0 4 0,-4 0 0,9 0 0,-4 0 0,0 0 0,4 0 0,-9 0 0,9 0 0,-9 0 0,-2 0 0,-1 0 0,-9 0 0,4 0 0,-13 0 0,0 0 0,-7 0 0,11 0 0,-8 0 0,9 0 0,-5 0 0,-6 5 0,12-4 0,-6 8 0,8-8 0,-1 8 0,5-4 0,-3 0 0,4 4 0,-6-8 0,6 3 0,-5 0 0,5-3 0,0 4 0,-5-5 0,11 0 0,-11 0 0,11 0 0,-5 0 0,11 0 0,-4 0 0,4 0 0,-6 0 0,6 0 0,-4 0 0,9 0 0,-9 0 0,4 0 0,-5 0 0,0-4 0,5 3 0,-4-3 0,8 4 0,-7 0 0,7-4 0,-3 3 0,6-3 0,-6 0 0,3 3 0,-7-7 0,2 7 0,1-3 0,1 4 0,5-4 0,0 3 0,5-2 0,-4 3 0,11 0 0,-5 0 0,6 0 0,-3 0 0,4 0 0,-4-4 0,8 3 0,-8-2 0,8 3 0,-8 0 0,7-3 0,-2 2 0,-1-2 0,3 3 0,-2 0 0,-1 0 0,3 0 0,-2 0 0,3 0 0,0 0 0,-4 0 0,0 0 0,-1 0 0,-2 0 0,6 0 0,-6 0 0,2 0 0,-3 0 0,4 0 0,-4 0 0,4 0 0,-4 0 0,3 0 0,-2 0 0,2 0 0,-3 0 0,4 0 0,-4 0 0,8 0 0,-4 0 0,4 0 0,0 0 0,1 0 0,-1 0 0,1 0 0,-1 0 0,6 0 0,5 0 0,3 0 0,3 0 0,-4 0 0,-2 3 0,2 1 0,-5 3 0,2 0 0,0-4 0,-2 3 0,2-2 0,0 3 0,-3-1 0,3 1 0,-3-1 0,0 1 0,0-1 0,0 0 0,0 1 0,0-1 0,0 1 0,0 0 0,0-1 0,0 1 0,0 0 0,0 0 0,0 0 0,3 0 0,-2-1 0,5-2 0,-3-1 0,1-3 0,-1 0 0</inkml:trace>
+  <inkml:trace contextRef="#ctx0" brushRef="#br0">166 0 24575,'0'6'0,"0"4"0,0 6 0,0-1 0,0 5 0,0-1 0,0-3 0,0 13 0,0-12 0,0 12 0,0-9 0,0 1 0,0-2 0,0-4 0,0 0 0,0 1 0,0-5 0,0 3 0,0-6 0,0 2 0,0-3 0,0 0 0,0 0 0,0 0 0,0-1 0,0 1 0,0-1 0,0 4 0,0-3 0,0 3 0,0-3 0,0 0 0,0-1 0,0 1 0,0 0 0,0 0 0,0 0 0,0 3 0,0-2 0,0 6 0,0-6 0,0 2 0,0-3 0,0 0 0,0 0 0,3 0 0,-2-1 0,1 1 0,-2-1 0,0 1 0,0 0 0,0 0 0,0-1 0,0 0 0,0 1 0,3-4 0,-2 3 0,2-3 0,-3 4 0,0-1 0,3-3 0,-2 3 0,1-3 0,-4 1 0,-2-4 0,-6-4 0,2-3 0,-2 0 0,-1 3 0,3-2 0,-2 2 0,-1-4 0,3 1 0,-2 0 0,3 3 0,0 1 0,3 0 0,-2 2 0,2-2 0,-3 3 0,1-3 0,-1 3 0,0-7 0,0 7 0,0-7 0,0 7 0,3-6 0,-2 5 0,6-5 0,-6 5 0,8-2 0,-2 3 0,14 0 0,-2 0 0,2 3 0,0 1 0,-6 3 0,6 0 0,-6-3 0,3 3 0,-5-7 0,1 6 0,0-2 0,0 3 0,0-3 0,-1 2 0,1-6 0,0 6 0,-3-2 0,1-1 0,-1 3 0,-1-2 0,0 2 0,0-3 0,0 0 0,4-3 0,-1 0 0,8 0 0,2-4 0,4 0 0,-1-4 0,-4 0 0,4 0 0,-2 1 0,2-1 0,-4 0 0,0 0 0,-3 1 0,-2 3 0,-3-2 0,0 5 0,-1-2 0,1 3 0,-1-3 0,1 2 0,-3-5 0,2 5 0,-6-2 0,3 3 0</inkml:trace>
 </inkml:ink>
 </file>
 
@@ -3874,114 +3766,6 @@
           <inkml:channelProperty channel="F" name="resolution" value="0" units="1/dev"/>
         </inkml:channelProperties>
       </inkml:inkSource>
-      <inkml:timestamp xml:id="ts0" timeString="2023-12-19T19:28:44.735"/>
-    </inkml:context>
-    <inkml:brush xml:id="br0">
-      <inkml:brushProperty name="width" value="0.05" units="cm"/>
-      <inkml:brushProperty name="height" value="0.05" units="cm"/>
-    </inkml:brush>
-  </inkml:definitions>
-  <inkml:trace contextRef="#ctx0" brushRef="#br0">4 180 24575,'0'18'0,"0"18"0,0 4 0,0 10 0,0-8 0,0-6 0,0-5 0,0-1 0,0-6 0,0-3 0,0-5 0,0-2 0,0-3 0,0 4 0,0 0 0,0 5 0,0-4 0,0 8 0,0-8 0,0 13 0,0-16 0,0 15 0,0-15 0,0 6 0,0-8 0,0 0 0,0-4 0,0-1 0,0 1 0,0 0 0,0 0 0,0-1 0,0 0 0,0 1 0,0-1 0,0 1 0,0-1 0,0 1 0,0 4 0,0-3 0,0 2 0,0-3 0,0 0 0,0-1 0,0 1 0,0 0 0,0 0 0,0 0 0,0 0 0,0-1 0,0 1 0,0 0 0,0-1 0,0 1 0,0-1 0,0 1 0,0-1 0,0 1 0,0 0 0,0 0 0,0-1 0,0 1 0,0 0 0,0 0 0,0-1 0,0 0 0,0 1 0,-3-4 0,8 0 0,11-3 0,6 0 0,29 0 0,-19 4 0,8 0 0,-14 0 0,-8 3 0,3-6 0,-4 2 0,-1-3 0,1 0 0,-1 4 0,6-4 0,-5 4 0,10 0 0,-10-4 0,9 8 0,-8-4 0,8 1 0,-8 1 0,3-2 0,-4 4 0,0-4 0,-5 3 0,4-3 0,-4 3 0,1-3 0,2 3 0,-6-6 0,7 5 0,-8-5 0,8 6 0,-8-6 0,4 5 0,-1-5 0,2 2 0,-1 0 0,9-2 0,-8 2 0,9-3 0,5 0 0,-3 0 0,14 0 0,-4 0 0,6 0 0,6 0 0,-5 0 0,5 0 0,-7 0 0,1 0 0,0 0 0,-6 0 0,4 0 0,-4 0 0,1 0 0,3 0 0,-10 0 0,5 0 0,0 0 0,-4 0 0,4 0 0,-1 0 0,3 0 0,4 0 0,1 0 0,6 0 0,1 0 0,1 0 0,4 0 0,-11 0 0,11 0 0,-11 0 0,5 0 0,-6 0 0,-1 0 0,1 0 0,6 0 0,1 0 0,14 0 0,-12 0 0,10 0 0,-11 0 0,12 0 0,-11 0 0,10 0 0,4 0 0,-12 0 0,30 0 0,-15 0 0,12 0 0,15 0 0,-12-5 0,23 3-601,-7-8 601,8 9 0,0-4 0,-22 5 0,8 0 0,-19 0 0,7 0 0,23 0 0,-40 0 0,29 0 0,-35 0 0,14 0 0,-8 0 0,-2 0 0,-6 0 601,0 0-601,-12 0 0,2 0 0,-20 0 0,8 0 0,-19 3 0,8-3 0,-13 3 0,8 1 0,-8-3 0,13 2 0,-7-3 0,12 0 0,-9 0 0,10 4 0,-10-4 0,9 4 0,-3-4 0,-1 0 0,0 0 0,-6 0 0,6 0 0,0 0 0,5 0 0,1 0 0,-1 0 0,6 0 0,-5 0 0,11 0 0,-5 0 0,0 0 0,-1 0 0,-6 0 0,0-4 0,1 3 0,-1-6 0,0 6 0,1-6 0,4 6 0,-3-7 0,9 7 0,-9-2 0,9 3 0,-9 0 0,9 0 0,-9 0 0,4 0 0,-11 0 0,4 0 0,-12 0 0,6 0 0,-11 0 0,2 0 0,-3 0 0,-1 0 0,1 0 0,-1 0 0,5 0 0,1 0 0,3 0 0,1 0 0,-1 0 0,-3 0 0,-2 0 0,-3 0 0,-1 0 0,1 0 0,-1 0 0,1 0 0,4 0 0,-4 0 0,12 0 0,-6 0 0,12 0 0,-8 0 0,3 0 0,1 0 0,-5 0 0,5 0 0,-10 0 0,0 0 0,-1 0 0,-2 0 0,7 0 0,-4 0 0,1 0 0,-2 0 0,-3 0 0,-1 0 0,1 0 0,8 0 0,-2 0 0,12 0 0,-8 0 0,8 0 0,-4 0 0,1 0 0,3 0 0,-4 0 0,1 0 0,-2 0 0,-8 0 0,-2 0 0,-3 0 0,-1 0 0,1 0 0,-1 0 0,1 0 0,-1 0 0,0 0 0,5 0 0,1 0 0,-1 0 0,0 0 0,-5 3 0,1-3 0,-4 7 0,2-7 0,-5-2 0,3-3 0,-4-4 0,0-1 0,0 2 0,0-2 0,0 4 0,0-1 0,0 0 0,0-8 0,-4 2 0,-2-15 0,-6 6 0,1-13 0,-7 4 0,7-5 0,-3 9 0,8-2 0,-1 16 0,6-5 0,-2 10 0,3-2 0,0 3 0,0 0 0,0-4 0,0 0 0,0-1 0,0 2 0,0 3 0,0-4 0,0-4 0,0-2 0,0-2 0,0 7 0,0-2 0,0-7 0,0 4 0,0-8 0,0 10 0,0-10 0,0 8 0,0-12 0,0 13 0,0-4 0,4 5 0,-3 4 0,2 0 0,-3-4 0,0 6 0,0-9 0,4 10 0,-3-6 0,2 6 0,-3-3 0,0 4 0,0-2 0,0 2 0,0-6 0,0-6 0,0 6 0,0-4 0,3 10 0,-2 0 0,2 0 0,-3 0 0,0-3 0,0 2 0,0-5 0,4 5 0,-3-2 0,2 3 0,1-3 0,-4 2 0,4-6 0,-4 6 0,0-3 0,0 5 0,0-1 0,3 0 0,-5 3 0,1 1 0,-18 3 0,0 0 0,-11 0 0,7 0 0,2 0 0,4 0 0,4 3 0,-2-2 0,6 2 0,-2-3 0,7 3 0,-6-2 0,1 2 0,-3-3 0,-4 0 0,7 0 0,-6 3 0,6-2 0,-2 2 0,3-3 0,1 0 0,-5 0 0,0 0 0,-1 0 0,-7 0 0,6 0 0,-7 0 0,4 0 0,0 0 0,4 0 0,-2 0 0,6 0 0,-10 0 0,10 0 0,-10 0 0,2 0 0,-1 0 0,-9 0 0,5 0 0,-1 0 0,-3 0 0,3 0 0,1 0 0,0 0 0,1 0 0,3 0 0,-8 0 0,8 0 0,-14 0 0,8 0 0,-9 0 0,6 0 0,4 0 0,-3 0 0,3 0 0,-4 0 0,4 0 0,-3 0 0,3 0 0,1 0 0,-5 0 0,9 0 0,-8 0 0,8 0 0,-3 0 0,4 0 0,5 0 0,0 0 0,4 0 0,1 0 0,-1 0 0,-4 0 0,0 0 0,-10 0 0,4 0 0,-3-3 0,-1 2 0,4-2 0,-3-1 0,0 3 0,3-2 0,-4 3 0,5 0 0,1-3 0,-1 2 0,-4-3 0,3 4 0,-4 0 0,6 0 0,-6 0 0,4-3 0,-3 2 0,4-2 0,0 3 0,1 0 0,-1 0 0,0 0 0,0 0 0,-4-4 0,3 3 0,-3-3 0,4 4 0,-5 0 0,5 0 0,-5 0 0,1 0 0,3 0 0,-4 0 0,1 0 0,3 0 0,-4 0 0,1 0 0,3 0 0,-3 0 0,4 0 0,-5 0 0,5 0 0,-10 0 0,9 0 0,-3 0 0,-1 0 0,5 0 0,-10 0 0,9-3 0,-8 2 0,8-2 0,-3 3 0,4 0 0,-4 0 0,3-4 0,-4 4 0,6-4 0,3 4 0,-3 0 0,4 0 0,-5-3 0,4 2 0,-2-3 0,2 4 0,-4 0 0,4 0 0,-2 0 0,2 0 0,0 0 0,-2 0 0,6 0 0,-7 0 0,4 0 0,-5 0 0,4 0 0,-2 0 0,6 0 0,-3 0 0,1 0 0,2 0 0,-3 0 0,1 0 0,-2 0 0,-4 0 0,1 0 0,3 0 0,-3 0 0,4 0 0,-1 0 0,1 0 0,5 0 0,-1 0 0,0 0 0,1 0 0,-1 0 0,-3 0 0,2 0 0,-7 0 0,4 0 0,-1 0 0,-3 0 0,4 0 0,-1 0 0,-3 0 0,3 0 0,-3 0 0,-1 0 0,0 0 0,-4 0 0,-2 0 0,-4 0 0,-1 0 0,1 0 0,0 0 0,-1 0 0,1 0 0,-1 0 0,1 0 0,0 0 0,-1 0 0,-5 0 0,5-3 0,-5 2 0,0-7 0,-2 3 0,1 0 0,-4-3 0,9 3 0,-4 0 0,6-2 0,-6 6 0,9-3 0,-8 0 0,9 3 0,1-2 0,-4 3 0,3 0 0,0-4 0,2 3 0,-1-2 0,4 3 0,-3-3 0,4 2 0,1-3 0,-1 1 0,-5 2 0,4-2 0,-3 3 0,4 0 0,-4 0 0,3 0 0,-4 0 0,1 0 0,3 0 0,-8 0 0,8 0 0,-3 0 0,4 0 0,-5 0 0,5 0 0,-5 0 0,5 0 0,-4 0 0,3 0 0,-3 0 0,4 0 0,-5 0 0,4 0 0,-3 0 0,4 0 0,1 0 0,-1 0 0,0 0 0,1 0 0,-1 0 0,0 0 0,1 0 0,-1 0 0,0 0 0,5 0 0,-4 0 0,3 0 0,-4 0 0,5 0 0,-4 0 0,3 0 0,-3 0 0,-1 0 0,0 0 0,1 0 0,-1 0 0,0 0 0,0 0 0,-4 0 0,3 0 0,-8 0 0,8 0 0,-14 0 0,13 0 0,-13 0 0,10 3 0,-6-2 0,1 7 0,4-7 0,-3 6 0,8-6 0,-3 6 0,-1-6 0,4 5 0,-3-5 0,-1 6 0,4-6 0,-3 3 0,4-4 0,1 0 0,-1 0 0,0 3 0,4-2 0,-2 2 0,6-3 0,-7 0 0,8 0 0,-8 0 0,7 4 0,-6-4 0,6 3 0,-3 0 0,1-2 0,2 2 0,-2-3 0,-1 0 0,3 0 0,-2 3 0,-1-2 0,3 2 0,-2-3 0,-1 0 0,3 0 0,-2 0 0,-1 0 0,3 0 0,-2 0 0,3 0 0,-4 0 0,4 0 0,-4 0 0,5 0 0,-1 0 0,1 0 0,-1 0 0,1 0 0,-1 0 0,-3 0 0,2 0 0,-7 3 0,8-2 0,-8 2 0,7 1 0,-2-4 0,-1 3 0,3-3 0,-6 0 0,2 0 0,0 0 0,-2 0 0,6 0 0,-7 4 0,8-4 0,-8 4 0,7-1 0,-6-2 0,6 2 0,-7-3 0,8 0 0,-4 0 0,0 0 0,4 0 0,-8 0 0,8 0 0,-8 0 0,7 0 0,-7 0 0,8 0 0,-8-4 0,8 0 0,-4 0 0,0-2 0,4 5 0,-4-6 0,4 7 0,1-3 0,-1-1 0,1 4 0,-1-3 0,0 0 0,1 2 0,-1-2 0,0 3 0,1 0 0,-1 0 0,1 0 0,2-3 0,-1 2 0,2-2 0,-4 3 0,1 0 0,0 0 0,-1 0 0,1 0 0,0 0 0,-1 0 0,1 0 0,0 0 0,-1 0 0,1 0 0,-5 0 0,4 0 0,-4 0 0,4 0 0,1 0 0,-1 0 0,0 0 0,1 3 0,-1-2 0,1 2 0,-1 0 0,1-2 0,-1 1 0,1-2 0,0 0 0,3 3 0,1 1 0,3 2 0,0 1 0,0-1 0,0 0 0,0 1 0,0 0 0,0-1 0,0 1 0,0-1 0,0 0 0,0 0 0,6 0 0,3-2 0,2 2 0,15-6 0,-18 3 0,9-3 0</inkml:trace>
-</inkml:ink>
-</file>
-
-<file path=ppt/ink/ink81.xml><?xml version="1.0" encoding="utf-8"?>
-<inkml:ink xmlns:inkml="http://www.w3.org/2003/InkML">
-  <inkml:definitions>
-    <inkml:context xml:id="ctx0">
-      <inkml:inkSource xml:id="inkSrc0">
-        <inkml:traceFormat>
-          <inkml:channel name="X" type="integer" min="-2.14748E9" max="2.14748E9" units="cm"/>
-          <inkml:channel name="Y" type="integer" min="-2.14748E9" max="2.14748E9" units="cm"/>
-          <inkml:channel name="F" type="integer" max="32767" units="dev"/>
-        </inkml:traceFormat>
-        <inkml:channelProperties>
-          <inkml:channelProperty channel="X" name="resolution" value="1000" units="1/cm"/>
-          <inkml:channelProperty channel="Y" name="resolution" value="1000" units="1/cm"/>
-          <inkml:channelProperty channel="F" name="resolution" value="0" units="1/dev"/>
-        </inkml:channelProperties>
-      </inkml:inkSource>
-      <inkml:timestamp xml:id="ts0" timeString="2023-12-19T19:29:01.736"/>
-    </inkml:context>
-    <inkml:brush xml:id="br0">
-      <inkml:brushProperty name="width" value="0.05" units="cm"/>
-      <inkml:brushProperty name="height" value="0.05" units="cm"/>
-    </inkml:brush>
-  </inkml:definitions>
-  <inkml:trace contextRef="#ctx0" brushRef="#br0">0 46 24575,'0'6'0,"0"5"0,0-4 0,0 8 0,0 0 0,0 6 0,0 4 0,0-5 0,0 4 0,0-4 0,0 10 0,0-8 0,0 7 0,0-4 0,0-3 0,0 6 0,0-11 0,0 2 0,0-4 0,0 0 0,0-3 0,0-2 0,0-3 0,0 0 0,0 0 0,0-1 0,0 1 0,0 0 0,0 4 0,0-4 0,0 7 0,0-6 0,0 3 0,0-1 0,0-2 0,0 2 0,0-3 0,0 0 0,0 0 0,0 0 0,0-1 0,0 5 0,0-3 0,0 2 0,0-3 0,0 0 0,0 3 0,0-2 0,0 2 0,0 1 0,0-3 0,0 2 0,0-3 0,0 0 0,0-1 0,0 1 0,0-1 0,0 1 0,0 0 0,0 0 0,0 0 0,0 3 0,0-2 0,0 2 0,0-3 0,0 0 0,0 0 0,0 0 0,0-1 0,0 1 0,0-1 0,0 0 0,0 1 0,0 0 0,0-1 0,0 1 0,0 0 0,3-4 0,4 0 0,4-3 0,11 0 0,-5 0 0,9 0 0,-5 0 0,3 0 0,1 0 0,-4 0 0,2-4 0,-7 3 0,8-2 0,-3 3 0,4 0 0,-1 0 0,-3 0 0,3 0 0,-4 0 0,10 0 0,-4 0 0,4 0 0,-6 0 0,1 0 0,0 0 0,-4 0 0,-2 0 0,-4 0 0,0 0 0,0 0 0,0 0 0,-3 0 0,2 0 0,-6 0 0,6 0 0,-3 0 0,4 0 0,-3 0 0,-2 0 0,-3 0 0,4 0 0,-4 0 0,8-4 0,-4 3 0,4-5 0,4 5 0,-2-3 0,6 4 0,-7 0 0,8 0 0,-11-3 0,5 2 0,-10-2 0,2 3 0,-3 0 0,0 0 0,0 0 0,3 0 0,2 0 0,3 0 0,0 0 0,0 0 0,4 0 0,-6 0 0,5 0 0,-6 0 0,-1 0 0,0 0 0,-5 0 0,1 0 0,4 0 0,0 0 0,4 0 0,5 0 0,-4 0 0,8 0 0,-4 0 0,1 0 0,-2 0 0,0 0 0,-2 0 0,2 0 0,-4 0 0,0 0 0,0 0 0,5 0 0,-4 0 0,8 0 0,-8 0 0,3 0 0,-4 4 0,0-3 0,0 2 0,0-3 0,-3 0 0,2 0 0,-3 0 0,5 0 0,-1 0 0,4 0 0,2 0 0,-1 3 0,4-2 0,-4 2 0,1-3 0,2 0 0,-6 0 0,2 0 0,-4 0 0,5 4 0,-8-3 0,7 3 0,-8-4 0,4 3 0,0-2 0,0 2 0,0-3 0,0 4 0,-3-4 0,-2 4 0,-3-4 0,0 0 0,0 0 0,-1 0 0,1 0 0,-1 0 0,1 0 0,0 0 0,0 0 0,3 0 0,-2 0 0,6 0 0,-3 0 0,5 0 0,-5 0 0,-1 0 0,-3 0 0,0 0 0,0 0 0,0 0 0,-1 0 0,1 0 0,-1 0 0,1 0 0,-1 0 0,1 0 0,0 0 0,-1 0 0,0 0 0,1 0 0,0 0 0,0 0 0,-1 0 0,1 0 0,0-3 0,-1 2 0,1-2 0,0 3 0,0 0 0,-1 0 0,1 0 0,-3-3 0,1 2 0,2-1 0,0 2 0,3-3 0,-3 2 0,-1-2 0,-2 0 0,-1-1 0,-1-2 0,-1-1 0,2 1 0,-3-1 0,0 0 0,0 0 0,0 1 0,0-1 0,0 0 0,0 0 0,0 0 0,0 1 0,0-5 0,0 3 0,0-2 0,0 3 0,0 0 0,0 0 0,0 0 0,0-2 0,0 1 0,0-5 0,0-3 0,0-5 0,-4-4 0,3-5 0,-6 4 0,6-4 0,-6 5 0,6 1 0,-3 3 0,4 5 0,0 6 0,-3 3 0,2 0 0,-2-4 0,3 0 0,0-4 0,0 0 0,0-1 0,0-3 0,0 3 0,0-4 0,0 9 0,0 0 0,-3 4 0,2 0 0,-2 0 0,3-2 0,0-2 0,0-3 0,-4-12 0,3 3 0,-2-8 0,3 6 0,0 4 0,0 2 0,-4 3 0,3 5 0,-2 0 0,3 5 0,0-1 0,0 0 0,0 0 0,0 0 0,0 1 0,-5 2 0,0 1 0,-4 3 0,-4 0 0,4 0 0,-8 0 0,5 0 0,-3 0 0,0 0 0,3 0 0,-2 0 0,6 0 0,-2 0 0,3 0 0,0 0 0,0 0 0,0 0 0,0 0 0,0 0 0,0 0 0,-3 0 0,2 0 0,-6 0 0,6 0 0,-3 0 0,4 0 0,-3 0 0,2 0 0,-2 0 0,3 0 0,0 0 0,-4 0 0,3 0 0,-2 0 0,-1 0 0,4 0 0,-8 0 0,7 3 0,-6-2 0,3 2 0,-1-3 0,2 0 0,3 0 0,0 0 0,0 0 0,0 0 0,0 0 0,0 0 0,-4 0 0,0 0 0,-4 0 0,3 0 0,-2 0 0,-2 0 0,0 0 0,-4 3 0,5-2 0,4 2 0,0-3 0,4 0 0,-4 0 0,0 0 0,-1 0 0,-2 0 0,3 0 0,-1 0 0,-2 0 0,6 0 0,-3 0 0,5 0 0,-5 0 0,0 0 0,-4 0 0,-5 0 0,0 0 0,-1 0 0,1 0 0,5 0 0,4 0 0,0 3 0,4-2 0,0 2 0,-3-3 0,2 0 0,-3 0 0,1 0 0,-2 0 0,1 0 0,-4 0 0,7 0 0,-6 0 0,3 0 0,-5 0 0,5 0 0,0 0 0,4 0 0,1 0 0,-1 0 0,0 0 0,0 0 0,0 0 0,0 0 0,-4 0 0,4 0 0,-8 0 0,7 0 0,-6 0 0,3 0 0,-5 0 0,1 0 0,4 0 0,0 0 0,4 0 0,-3 0 0,2 0 0,-7 0 0,8 0 0,-4 0 0,4 0 0,0 0 0,1 0 0,-1 0 0,-4 0 0,0 0 0,-5 0 0,1 0 0,0 0 0,4 0 0,0 0 0,4 0 0,-4 0 0,0 0 0,-1 0 0,2 0 0,3 0 0,-4 0 0,3 0 0,-6 0 0,-2 0 0,4 0 0,-11 0 0,10 0 0,-3 0 0,2 0 0,3 0 0,-5 0 0,1 0 0,4 0 0,0 0 0,4 0 0,0 0 0,-3 0 0,2 0 0,-3 0 0,4 0 0,0 0 0,1 0 0,-1 0 0,0 0 0,1 0 0,-5 0 0,3 0 0,-2 0 0,3 0 0,0 0 0,-4 0 0,3 0 0,-2 0 0,3 0 0,0 0 0,0 0 0,-2 0 0,2 0 0,-3 0 0,3 0 0,0 0 0,1 0 0,-1 0 0,0 0 0,0 0 0,0-3 0,0 2 0,1-2 0,-1 3 0,0 0 0,-4-3 0,4 2 0,-4-3 0,4 4 0,0 0 0,-4 0 0,4 0 0,-4-3 0,4 3 0,0-3 0,-3 3 0,-2-4 0,-3 3 0,0-2 0,3 0 0,-2 2 0,6-2 0,-6 3 0,6 0 0,-2 0 0,3 0 0,1 0 0,-1 0 0,1 0 0,-1 0 0,0 0 0,1 0 0,-1 0 0,0 0 0,1 0 0,-8 0 0,5 0 0,-4 0 0,6 0 0,0 0 0,0 0 0,-2 0 0,2 0 0,-2 0 0,3 0 0,3 0 0,0 0 0</inkml:trace>
-</inkml:ink>
-</file>
-
-<file path=ppt/ink/ink82.xml><?xml version="1.0" encoding="utf-8"?>
-<inkml:ink xmlns:inkml="http://www.w3.org/2003/InkML">
-  <inkml:definitions>
-    <inkml:context xml:id="ctx0">
-      <inkml:inkSource xml:id="inkSrc0">
-        <inkml:traceFormat>
-          <inkml:channel name="X" type="integer" min="-2.14748E9" max="2.14748E9" units="cm"/>
-          <inkml:channel name="Y" type="integer" min="-2.14748E9" max="2.14748E9" units="cm"/>
-          <inkml:channel name="F" type="integer" max="32767" units="dev"/>
-        </inkml:traceFormat>
-        <inkml:channelProperties>
-          <inkml:channelProperty channel="X" name="resolution" value="1000" units="1/cm"/>
-          <inkml:channelProperty channel="Y" name="resolution" value="1000" units="1/cm"/>
-          <inkml:channelProperty channel="F" name="resolution" value="0" units="1/dev"/>
-        </inkml:channelProperties>
-      </inkml:inkSource>
-      <inkml:timestamp xml:id="ts0" timeString="2023-12-19T19:29:06.796"/>
-    </inkml:context>
-    <inkml:brush xml:id="br0">
-      <inkml:brushProperty name="width" value="0.05" units="cm"/>
-      <inkml:brushProperty name="height" value="0.05" units="cm"/>
-    </inkml:brush>
-  </inkml:definitions>
-  <inkml:trace contextRef="#ctx0" brushRef="#br0">194 1 24575,'0'6'0,"0"0"0,0 4 0,0 2 0,0-1 0,0 3 0,0 2 0,0 5 0,0 4 0,0-1 0,0 6 0,0 1 0,0 5 0,0 6 0,0-5 0,0 0 0,0 4 0,0-14 0,0 14 0,0-20 0,0 13 0,0-17 0,0 17 0,0-7 0,0 4 0,0 4 0,0-4 0,0 5 0,0-5 0,0-1 0,0-5 0,0-5 0,0-1 0,0-7 0,0-2 0,0-3 0,0 0 0,-6-3 0,-1-2 0,0-5 0,-1-4 0,0-1 0,0-7 0,-6 7 0,2-7 0,0 4 0,-2-1 0,2-3 0,0 7 0,2-2 0,3 3 0,0 0 0,0 3 0,0-2 0,0 5 0,1-2 0,-1 3 0,1 0 0,2-3 0,-2 2 0,8-2 0,-1 3 0,12 3 0,-4 1 0,4 0 0,-2 3 0,-3-3 0,2 3 0,-3 0 0,0-4 0,0 3 0,-1-2 0,1 0 0,-3 2 0,2-5 0,-5 5 0,5-5 0,-2 5 0,2-3 0,1 4 0,-1-4 0,-2 3 0,2-5 0,-2 5 0,0-2 0,2 0 0,-5 2 0,4-3 0,-4 4 0,5-4 0,-5 3 0,5-5 0,-6 5 0,6-5 0,-3 1 0,4-2 0,0-3 0,0-1 0,-1-3 0,5 0 0,-3 0 0,2 0 0,1 0 0,-4 0 0,7-1 0,-5-3 0,5 3 0,-2-6 0,7 5 0,-3-6 0,4 7 0,-5-3 0,0 3 0,-4 1 0,0-1 0,-5 5 0,1-1 0,-3 1 0,2 3 0,-5-3 0,2 3 0</inkml:trace>
-</inkml:ink>
-</file>
-
-<file path=ppt/ink/ink83.xml><?xml version="1.0" encoding="utf-8"?>
-<inkml:ink xmlns:inkml="http://www.w3.org/2003/InkML">
-  <inkml:definitions>
-    <inkml:context xml:id="ctx0">
-      <inkml:inkSource xml:id="inkSrc0">
-        <inkml:traceFormat>
-          <inkml:channel name="X" type="integer" min="-2.14748E9" max="2.14748E9" units="cm"/>
-          <inkml:channel name="Y" type="integer" min="-2.14748E9" max="2.14748E9" units="cm"/>
-          <inkml:channel name="F" type="integer" max="32767" units="dev"/>
-        </inkml:traceFormat>
-        <inkml:channelProperties>
-          <inkml:channelProperty channel="X" name="resolution" value="1000" units="1/cm"/>
-          <inkml:channelProperty channel="Y" name="resolution" value="1000" units="1/cm"/>
-          <inkml:channelProperty channel="F" name="resolution" value="0" units="1/dev"/>
-        </inkml:channelProperties>
-      </inkml:inkSource>
-      <inkml:timestamp xml:id="ts0" timeString="2023-12-19T19:29:10.643"/>
-    </inkml:context>
-    <inkml:brush xml:id="br0">
-      <inkml:brushProperty name="width" value="0.05" units="cm"/>
-      <inkml:brushProperty name="height" value="0.05" units="cm"/>
-    </inkml:brush>
-  </inkml:definitions>
-  <inkml:trace contextRef="#ctx0" brushRef="#br0">166 0 24575,'0'6'0,"0"4"0,0 6 0,0-1 0,0 5 0,0-1 0,0-3 0,0 13 0,0-12 0,0 12 0,0-9 0,0 1 0,0-2 0,0-4 0,0 0 0,0 1 0,0-5 0,0 3 0,0-6 0,0 2 0,0-3 0,0 0 0,0 0 0,0 0 0,0-1 0,0 1 0,0-1 0,0 4 0,0-3 0,0 3 0,0-3 0,0 0 0,0-1 0,0 1 0,0 0 0,0 0 0,0 0 0,0 3 0,0-2 0,0 6 0,0-6 0,0 2 0,0-3 0,0 0 0,0 0 0,3 0 0,-2-1 0,1 1 0,-2-1 0,0 1 0,0 0 0,0 0 0,0-1 0,0 0 0,0 1 0,3-4 0,-2 3 0,2-3 0,-3 4 0,0-1 0,3-3 0,-2 3 0,1-3 0,-4 1 0,-2-4 0,-6-4 0,2-3 0,-2 0 0,-1 3 0,3-2 0,-2 2 0,-1-4 0,3 1 0,-2 0 0,3 3 0,0 1 0,3 0 0,-2 2 0,2-2 0,-3 3 0,1-3 0,-1 3 0,0-7 0,0 7 0,0-7 0,0 7 0,3-6 0,-2 5 0,6-5 0,-6 5 0,8-2 0,-2 3 0,14 0 0,-2 0 0,2 3 0,0 1 0,-6 3 0,6 0 0,-6-3 0,3 3 0,-5-7 0,1 6 0,0-2 0,0 3 0,0-3 0,-1 2 0,1-6 0,0 6 0,-3-2 0,1-1 0,-1 3 0,-1-2 0,0 2 0,0-3 0,0 0 0,4-3 0,-1 0 0,8 0 0,2-4 0,4 0 0,-1-4 0,-4 0 0,4 0 0,-2 1 0,2-1 0,-4 0 0,0 0 0,-3 1 0,-2 3 0,-3-2 0,0 5 0,-1-2 0,1 3 0,-1-3 0,1 2 0,-3-5 0,2 5 0,-6-2 0,3 3 0</inkml:trace>
-</inkml:ink>
-</file>
-
-<file path=ppt/ink/ink84.xml><?xml version="1.0" encoding="utf-8"?>
-<inkml:ink xmlns:inkml="http://www.w3.org/2003/InkML">
-  <inkml:definitions>
-    <inkml:context xml:id="ctx0">
-      <inkml:inkSource xml:id="inkSrc0">
-        <inkml:traceFormat>
-          <inkml:channel name="X" type="integer" min="-2.14748E9" max="2.14748E9" units="cm"/>
-          <inkml:channel name="Y" type="integer" min="-2.14748E9" max="2.14748E9" units="cm"/>
-          <inkml:channel name="F" type="integer" max="32767" units="dev"/>
-        </inkml:traceFormat>
-        <inkml:channelProperties>
-          <inkml:channelProperty channel="X" name="resolution" value="1000" units="1/cm"/>
-          <inkml:channelProperty channel="Y" name="resolution" value="1000" units="1/cm"/>
-          <inkml:channelProperty channel="F" name="resolution" value="0" units="1/dev"/>
-        </inkml:channelProperties>
-      </inkml:inkSource>
       <inkml:timestamp xml:id="ts0" timeString="2022-09-11T15:10:59.946"/>
     </inkml:context>
     <inkml:brush xml:id="br0">
@@ -3993,7 +3777,7 @@
 </inkml:ink>
 </file>
 
-<file path=ppt/ink/ink85.xml><?xml version="1.0" encoding="utf-8"?>
+<file path=ppt/ink/ink81.xml><?xml version="1.0" encoding="utf-8"?>
 <inkml:ink xmlns:inkml="http://www.w3.org/2003/InkML">
   <inkml:definitions>
     <inkml:context xml:id="ctx0">
@@ -4020,7 +3804,7 @@
 </inkml:ink>
 </file>
 
-<file path=ppt/ink/ink86.xml><?xml version="1.0" encoding="utf-8"?>
+<file path=ppt/ink/ink82.xml><?xml version="1.0" encoding="utf-8"?>
 <inkml:ink xmlns:inkml="http://www.w3.org/2003/InkML">
   <inkml:definitions>
     <inkml:context xml:id="ctx0">
@@ -4047,7 +3831,7 @@
 </inkml:ink>
 </file>
 
-<file path=ppt/ink/ink87.xml><?xml version="1.0" encoding="utf-8"?>
+<file path=ppt/ink/ink83.xml><?xml version="1.0" encoding="utf-8"?>
 <inkml:ink xmlns:inkml="http://www.w3.org/2003/InkML">
   <inkml:definitions>
     <inkml:context xml:id="ctx0">
@@ -4074,7 +3858,7 @@
 </inkml:ink>
 </file>
 
-<file path=ppt/ink/ink88.xml><?xml version="1.0" encoding="utf-8"?>
+<file path=ppt/ink/ink84.xml><?xml version="1.0" encoding="utf-8"?>
 <inkml:ink xmlns:inkml="http://www.w3.org/2003/InkML">
   <inkml:definitions>
     <inkml:context xml:id="ctx0">
@@ -4101,7 +3885,7 @@
 </inkml:ink>
 </file>
 
-<file path=ppt/ink/ink89.xml><?xml version="1.0" encoding="utf-8"?>
+<file path=ppt/ink/ink85.xml><?xml version="1.0" encoding="utf-8"?>
 <inkml:ink xmlns:inkml="http://www.w3.org/2003/InkML">
   <inkml:definitions>
     <inkml:context xml:id="ctx0">
@@ -4125,6 +3909,114 @@
     </inkml:brush>
   </inkml:definitions>
   <inkml:trace contextRef="#ctx0" brushRef="#br0">1 1 24575,'26'0'0,"-4"7"0,18 7 0,-9 4 0,1 0 0,6 3 0,-10-2 0,24 26 0,3 3 0,-12-9 0,23 25 0,1 5 0,-11-8 0,-21-23 0,1 1 0,16 26 0,-26-41 0,2 15 0,-11-21 0,7 8 0,-12-8 0,3-6 0,-2 4 0,-9-8 0,5 1 0,-5-5 0,8 2 0,-4-6 0,8 6 0,-6-2 0,0 0 0,-1 2 0,12 4 0,-3 3 0,19 9 0,-15-6 0,6 2 0,-16-7 0,4 2 0,-8-6 0,-2 0 0,-3-4 0</inkml:trace>
+</inkml:ink>
+</file>
+
+<file path=ppt/ink/ink86.xml><?xml version="1.0" encoding="utf-8"?>
+<inkml:ink xmlns:inkml="http://www.w3.org/2003/InkML">
+  <inkml:definitions>
+    <inkml:context xml:id="ctx0">
+      <inkml:inkSource xml:id="inkSrc0">
+        <inkml:traceFormat>
+          <inkml:channel name="X" type="integer" min="-2.14748E9" max="2.14748E9" units="cm"/>
+          <inkml:channel name="Y" type="integer" min="-2.14748E9" max="2.14748E9" units="cm"/>
+          <inkml:channel name="F" type="integer" max="32767" units="dev"/>
+        </inkml:traceFormat>
+        <inkml:channelProperties>
+          <inkml:channelProperty channel="X" name="resolution" value="1000" units="1/cm"/>
+          <inkml:channelProperty channel="Y" name="resolution" value="1000" units="1/cm"/>
+          <inkml:channelProperty channel="F" name="resolution" value="0" units="1/dev"/>
+        </inkml:channelProperties>
+      </inkml:inkSource>
+      <inkml:timestamp xml:id="ts0" timeString="2022-09-11T15:12:25.189"/>
+    </inkml:context>
+    <inkml:brush xml:id="br0">
+      <inkml:brushProperty name="width" value="0.1" units="cm"/>
+      <inkml:brushProperty name="height" value="0.1" units="cm"/>
+    </inkml:brush>
+  </inkml:definitions>
+  <inkml:trace contextRef="#ctx0" brushRef="#br0">0 0 24575,'38'0'0,"1"0"0,15 0 0,-5 0 0,4 9 0,-10 5 0,4 8 0,1 3 0,9 14 0,7 1 0,-3 1 0,-18-1 0,20 11 0,-35-20 0,-10-13 0,4 5 0,-9-7 0,-5-11 0,4 7 0,-5-11 0,-1 4 0,1-1 0,7 3 0,-2 0 0,7 1 0,0 0 0,-3-1 0,3 1 0,-5 2 0,1-2 0,-4 3 0,-1-4 0,-3-1 0,0 1 0,-1-1 0,1-2 0,-1 2 0,1-5 0,0 5 0,-1-3 0,1 1 0,3 2 0,-2-2 0,2 0 0,-4 2 0,1-5 0,0 4 0,-1-4 0,1 2 0,0-3 0,-1 0 0,1 3 0,-1-2 0,-2 5 0,1-6 0,-1 3 0,-1 0 0,3-2 0,-3 2 0,4-3 0,-1 0 0,1 0 0,-1 0 0,0 0 0,-2 0 0,-1 0 0</inkml:trace>
+</inkml:ink>
+</file>
+
+<file path=ppt/ink/ink87.xml><?xml version="1.0" encoding="utf-8"?>
+<inkml:ink xmlns:inkml="http://www.w3.org/2003/InkML">
+  <inkml:definitions>
+    <inkml:context xml:id="ctx0">
+      <inkml:inkSource xml:id="inkSrc0">
+        <inkml:traceFormat>
+          <inkml:channel name="X" type="integer" min="-2.14748E9" max="2.14748E9" units="cm"/>
+          <inkml:channel name="Y" type="integer" min="-2.14748E9" max="2.14748E9" units="cm"/>
+          <inkml:channel name="F" type="integer" max="32767" units="dev"/>
+        </inkml:traceFormat>
+        <inkml:channelProperties>
+          <inkml:channelProperty channel="X" name="resolution" value="1000" units="1/cm"/>
+          <inkml:channelProperty channel="Y" name="resolution" value="1000" units="1/cm"/>
+          <inkml:channelProperty channel="F" name="resolution" value="0" units="1/dev"/>
+        </inkml:channelProperties>
+      </inkml:inkSource>
+      <inkml:timestamp xml:id="ts0" timeString="2022-09-11T15:12:26.812"/>
+    </inkml:context>
+    <inkml:brush xml:id="br0">
+      <inkml:brushProperty name="width" value="0.1" units="cm"/>
+      <inkml:brushProperty name="height" value="0.1" units="cm"/>
+    </inkml:brush>
+  </inkml:definitions>
+  <inkml:trace contextRef="#ctx0" brushRef="#br0">1 0 24575,'28'0'0,"8"0"0,19 10 0,8 2 0,7 5 0,-2 2 0,-2 8 0,-9-4 0,3 17 0,-21-15 0,3 8 0,-19-7 0,7 1 0,-8-2 0,4 2 0,-4-10 0,3 8 0,-5-12 0,1 4 0,-3-3 0,-3-6 0,0 3 0,-4-1 0,3-1 0,-6 1 0,6 0 0,-7-2 0,7 2 0,-3-3 0,0 4 0,3-3 0,3 8 0,-5-10 0,4 3 0,-13-7 0,3-1 0,-2 2 0,8 0 0,-4 0 0,18 4 0,-13 0 0,27 1 0,-21-4 0,25-1 0,-22-3 0,24 0 0,-23 0 0,12 0 0,-26 0 0,0 0 0</inkml:trace>
+</inkml:ink>
+</file>
+
+<file path=ppt/ink/ink88.xml><?xml version="1.0" encoding="utf-8"?>
+<inkml:ink xmlns:inkml="http://www.w3.org/2003/InkML">
+  <inkml:definitions>
+    <inkml:context xml:id="ctx0">
+      <inkml:inkSource xml:id="inkSrc0">
+        <inkml:traceFormat>
+          <inkml:channel name="X" type="integer" min="-2.14748E9" max="2.14748E9" units="cm"/>
+          <inkml:channel name="Y" type="integer" min="-2.14748E9" max="2.14748E9" units="cm"/>
+          <inkml:channel name="F" type="integer" max="32767" units="dev"/>
+        </inkml:traceFormat>
+        <inkml:channelProperties>
+          <inkml:channelProperty channel="X" name="resolution" value="1000" units="1/cm"/>
+          <inkml:channelProperty channel="Y" name="resolution" value="1000" units="1/cm"/>
+          <inkml:channelProperty channel="F" name="resolution" value="0" units="1/dev"/>
+        </inkml:channelProperties>
+      </inkml:inkSource>
+      <inkml:timestamp xml:id="ts0" timeString="2022-09-11T15:12:28.529"/>
+    </inkml:context>
+    <inkml:brush xml:id="br0">
+      <inkml:brushProperty name="width" value="0.1" units="cm"/>
+      <inkml:brushProperty name="height" value="0.1" units="cm"/>
+    </inkml:brush>
+  </inkml:definitions>
+  <inkml:trace contextRef="#ctx0" brushRef="#br0">0 6 24575,'29'-3'0,"8"0"0,6 3 0,-4 0 0,6 0 0,-3 0 0,2 0 0,10 5 0,2 1 0,5 1 0,14 2 0,-1 2 0,-16 0 0,12 0 0,-1 0 0,-16-4 0,36 5 0,-67-12 0,-2 0 0,-10 3 0,1 1 0,3 4 0,1-4 0,-4 2 0,3-5 0,-7 2 0,4-3 0,-5 0 0,1 3 0,-1-3 0,1 3 0,-1 0 0,1 1 0,3-1 0,1 4 0,0-6 0,3 5 0,-7-5 0,4 5 0,-5-5 0,1 2 0,0-3 0,-1 0 0,1 0 0,-1 3 0,1-3 0,-1 6 0,1-5 0,0 2 0,-1-3 0,1 0 0,-1 0 0,0 0 0,0 0 0,-2 0 0,-1 0 0</inkml:trace>
+</inkml:ink>
+</file>
+
+<file path=ppt/ink/ink89.xml><?xml version="1.0" encoding="utf-8"?>
+<inkml:ink xmlns:inkml="http://www.w3.org/2003/InkML">
+  <inkml:definitions>
+    <inkml:context xml:id="ctx0">
+      <inkml:inkSource xml:id="inkSrc0">
+        <inkml:traceFormat>
+          <inkml:channel name="X" type="integer" min="-2.14748E9" max="2.14748E9" units="cm"/>
+          <inkml:channel name="Y" type="integer" min="-2.14748E9" max="2.14748E9" units="cm"/>
+          <inkml:channel name="F" type="integer" max="32767" units="dev"/>
+        </inkml:traceFormat>
+        <inkml:channelProperties>
+          <inkml:channelProperty channel="X" name="resolution" value="1000" units="1/cm"/>
+          <inkml:channelProperty channel="Y" name="resolution" value="1000" units="1/cm"/>
+          <inkml:channelProperty channel="F" name="resolution" value="0" units="1/dev"/>
+        </inkml:channelProperties>
+      </inkml:inkSource>
+      <inkml:timestamp xml:id="ts0" timeString="2022-09-11T15:12:30.464"/>
+    </inkml:context>
+    <inkml:brush xml:id="br0">
+      <inkml:brushProperty name="width" value="0.1" units="cm"/>
+      <inkml:brushProperty name="height" value="0.1" units="cm"/>
+    </inkml:brush>
+  </inkml:definitions>
+  <inkml:trace contextRef="#ctx0" brushRef="#br0">1 1 24575,'25'0'0,"8"0"0,9 0 0,0 0 0,4 0 0,9 0 0,-5 0 0,42 0 0,-43 4 0,6-3 0,-1 2 0,-15 6 0,37 4 0,-18 1 0,-5 1 0,5-2 0,-3 0 0,-26-4 0,15 3 0,-24-4 0,6 0 0,-6-1 0,20 1 0,-17-4 0,22 3 0,-27-6 0,20 5 0,-24-5 0,29 9 0,-27-8 0,32 8 0,-30-10 0,12 4 0,-18-4 0,0 0 0,-8 2 0,1-1 0,-1 2 0,2 0 0,1-2 0,0 1 0,-1 1 0,1-2 0,-1 2 0,1-3 0,-1 0 0,-2 3 0,1-2 0,-1 2 0,3 0 0,-1-3 0,1 6 0,-1-5 0,0 2 0,1-3 0,-1 0 0,1 0 0,3 0 0,-3 0 0,4 0 0,-5 0 0,1 0 0,-1 0 0,1 0 0,-1 0 0,-2 0 0,-1 0 0</inkml:trace>
 </inkml:ink>
 </file>
 
@@ -4171,114 +4063,6 @@
           <inkml:channelProperty channel="F" name="resolution" value="0" units="1/dev"/>
         </inkml:channelProperties>
       </inkml:inkSource>
-      <inkml:timestamp xml:id="ts0" timeString="2022-09-11T15:12:25.189"/>
-    </inkml:context>
-    <inkml:brush xml:id="br0">
-      <inkml:brushProperty name="width" value="0.1" units="cm"/>
-      <inkml:brushProperty name="height" value="0.1" units="cm"/>
-    </inkml:brush>
-  </inkml:definitions>
-  <inkml:trace contextRef="#ctx0" brushRef="#br0">0 0 24575,'38'0'0,"1"0"0,15 0 0,-5 0 0,4 9 0,-10 5 0,4 8 0,1 3 0,9 14 0,7 1 0,-3 1 0,-18-1 0,20 11 0,-35-20 0,-10-13 0,4 5 0,-9-7 0,-5-11 0,4 7 0,-5-11 0,-1 4 0,1-1 0,7 3 0,-2 0 0,7 1 0,0 0 0,-3-1 0,3 1 0,-5 2 0,1-2 0,-4 3 0,-1-4 0,-3-1 0,0 1 0,-1-1 0,1-2 0,-1 2 0,1-5 0,0 5 0,-1-3 0,1 1 0,3 2 0,-2-2 0,2 0 0,-4 2 0,1-5 0,0 4 0,-1-4 0,1 2 0,0-3 0,-1 0 0,1 3 0,-1-2 0,-2 5 0,1-6 0,-1 3 0,-1 0 0,3-2 0,-3 2 0,4-3 0,-1 0 0,1 0 0,-1 0 0,0 0 0,-2 0 0,-1 0 0</inkml:trace>
-</inkml:ink>
-</file>
-
-<file path=ppt/ink/ink91.xml><?xml version="1.0" encoding="utf-8"?>
-<inkml:ink xmlns:inkml="http://www.w3.org/2003/InkML">
-  <inkml:definitions>
-    <inkml:context xml:id="ctx0">
-      <inkml:inkSource xml:id="inkSrc0">
-        <inkml:traceFormat>
-          <inkml:channel name="X" type="integer" min="-2.14748E9" max="2.14748E9" units="cm"/>
-          <inkml:channel name="Y" type="integer" min="-2.14748E9" max="2.14748E9" units="cm"/>
-          <inkml:channel name="F" type="integer" max="32767" units="dev"/>
-        </inkml:traceFormat>
-        <inkml:channelProperties>
-          <inkml:channelProperty channel="X" name="resolution" value="1000" units="1/cm"/>
-          <inkml:channelProperty channel="Y" name="resolution" value="1000" units="1/cm"/>
-          <inkml:channelProperty channel="F" name="resolution" value="0" units="1/dev"/>
-        </inkml:channelProperties>
-      </inkml:inkSource>
-      <inkml:timestamp xml:id="ts0" timeString="2022-09-11T15:12:26.812"/>
-    </inkml:context>
-    <inkml:brush xml:id="br0">
-      <inkml:brushProperty name="width" value="0.1" units="cm"/>
-      <inkml:brushProperty name="height" value="0.1" units="cm"/>
-    </inkml:brush>
-  </inkml:definitions>
-  <inkml:trace contextRef="#ctx0" brushRef="#br0">1 0 24575,'28'0'0,"8"0"0,19 10 0,8 2 0,7 5 0,-2 2 0,-2 8 0,-9-4 0,3 17 0,-21-15 0,3 8 0,-19-7 0,7 1 0,-8-2 0,4 2 0,-4-10 0,3 8 0,-5-12 0,1 4 0,-3-3 0,-3-6 0,0 3 0,-4-1 0,3-1 0,-6 1 0,6 0 0,-7-2 0,7 2 0,-3-3 0,0 4 0,3-3 0,3 8 0,-5-10 0,4 3 0,-13-7 0,3-1 0,-2 2 0,8 0 0,-4 0 0,18 4 0,-13 0 0,27 1 0,-21-4 0,25-1 0,-22-3 0,24 0 0,-23 0 0,12 0 0,-26 0 0,0 0 0</inkml:trace>
-</inkml:ink>
-</file>
-
-<file path=ppt/ink/ink92.xml><?xml version="1.0" encoding="utf-8"?>
-<inkml:ink xmlns:inkml="http://www.w3.org/2003/InkML">
-  <inkml:definitions>
-    <inkml:context xml:id="ctx0">
-      <inkml:inkSource xml:id="inkSrc0">
-        <inkml:traceFormat>
-          <inkml:channel name="X" type="integer" min="-2.14748E9" max="2.14748E9" units="cm"/>
-          <inkml:channel name="Y" type="integer" min="-2.14748E9" max="2.14748E9" units="cm"/>
-          <inkml:channel name="F" type="integer" max="32767" units="dev"/>
-        </inkml:traceFormat>
-        <inkml:channelProperties>
-          <inkml:channelProperty channel="X" name="resolution" value="1000" units="1/cm"/>
-          <inkml:channelProperty channel="Y" name="resolution" value="1000" units="1/cm"/>
-          <inkml:channelProperty channel="F" name="resolution" value="0" units="1/dev"/>
-        </inkml:channelProperties>
-      </inkml:inkSource>
-      <inkml:timestamp xml:id="ts0" timeString="2022-09-11T15:12:28.529"/>
-    </inkml:context>
-    <inkml:brush xml:id="br0">
-      <inkml:brushProperty name="width" value="0.1" units="cm"/>
-      <inkml:brushProperty name="height" value="0.1" units="cm"/>
-    </inkml:brush>
-  </inkml:definitions>
-  <inkml:trace contextRef="#ctx0" brushRef="#br0">0 6 24575,'29'-3'0,"8"0"0,6 3 0,-4 0 0,6 0 0,-3 0 0,2 0 0,10 5 0,2 1 0,5 1 0,14 2 0,-1 2 0,-16 0 0,12 0 0,-1 0 0,-16-4 0,36 5 0,-67-12 0,-2 0 0,-10 3 0,1 1 0,3 4 0,1-4 0,-4 2 0,3-5 0,-7 2 0,4-3 0,-5 0 0,1 3 0,-1-3 0,1 3 0,-1 0 0,1 1 0,3-1 0,1 4 0,0-6 0,3 5 0,-7-5 0,4 5 0,-5-5 0,1 2 0,0-3 0,-1 0 0,1 0 0,-1 3 0,1-3 0,-1 6 0,1-5 0,0 2 0,-1-3 0,1 0 0,-1 0 0,0 0 0,0 0 0,-2 0 0,-1 0 0</inkml:trace>
-</inkml:ink>
-</file>
-
-<file path=ppt/ink/ink93.xml><?xml version="1.0" encoding="utf-8"?>
-<inkml:ink xmlns:inkml="http://www.w3.org/2003/InkML">
-  <inkml:definitions>
-    <inkml:context xml:id="ctx0">
-      <inkml:inkSource xml:id="inkSrc0">
-        <inkml:traceFormat>
-          <inkml:channel name="X" type="integer" min="-2.14748E9" max="2.14748E9" units="cm"/>
-          <inkml:channel name="Y" type="integer" min="-2.14748E9" max="2.14748E9" units="cm"/>
-          <inkml:channel name="F" type="integer" max="32767" units="dev"/>
-        </inkml:traceFormat>
-        <inkml:channelProperties>
-          <inkml:channelProperty channel="X" name="resolution" value="1000" units="1/cm"/>
-          <inkml:channelProperty channel="Y" name="resolution" value="1000" units="1/cm"/>
-          <inkml:channelProperty channel="F" name="resolution" value="0" units="1/dev"/>
-        </inkml:channelProperties>
-      </inkml:inkSource>
-      <inkml:timestamp xml:id="ts0" timeString="2022-09-11T15:12:30.464"/>
-    </inkml:context>
-    <inkml:brush xml:id="br0">
-      <inkml:brushProperty name="width" value="0.1" units="cm"/>
-      <inkml:brushProperty name="height" value="0.1" units="cm"/>
-    </inkml:brush>
-  </inkml:definitions>
-  <inkml:trace contextRef="#ctx0" brushRef="#br0">1 1 24575,'25'0'0,"8"0"0,9 0 0,0 0 0,4 0 0,9 0 0,-5 0 0,42 0 0,-43 4 0,6-3 0,-1 2 0,-15 6 0,37 4 0,-18 1 0,-5 1 0,5-2 0,-3 0 0,-26-4 0,15 3 0,-24-4 0,6 0 0,-6-1 0,20 1 0,-17-4 0,22 3 0,-27-6 0,20 5 0,-24-5 0,29 9 0,-27-8 0,32 8 0,-30-10 0,12 4 0,-18-4 0,0 0 0,-8 2 0,1-1 0,-1 2 0,2 0 0,1-2 0,0 1 0,-1 1 0,1-2 0,-1 2 0,1-3 0,-1 0 0,-2 3 0,1-2 0,-1 2 0,3 0 0,-1-3 0,1 6 0,-1-5 0,0 2 0,1-3 0,-1 0 0,1 0 0,3 0 0,-3 0 0,4 0 0,-5 0 0,1 0 0,-1 0 0,1 0 0,-1 0 0,-2 0 0,-1 0 0</inkml:trace>
-</inkml:ink>
-</file>
-
-<file path=ppt/ink/ink94.xml><?xml version="1.0" encoding="utf-8"?>
-<inkml:ink xmlns:inkml="http://www.w3.org/2003/InkML">
-  <inkml:definitions>
-    <inkml:context xml:id="ctx0">
-      <inkml:inkSource xml:id="inkSrc0">
-        <inkml:traceFormat>
-          <inkml:channel name="X" type="integer" min="-2.14748E9" max="2.14748E9" units="cm"/>
-          <inkml:channel name="Y" type="integer" min="-2.14748E9" max="2.14748E9" units="cm"/>
-          <inkml:channel name="F" type="integer" max="32767" units="dev"/>
-        </inkml:traceFormat>
-        <inkml:channelProperties>
-          <inkml:channelProperty channel="X" name="resolution" value="1000" units="1/cm"/>
-          <inkml:channelProperty channel="Y" name="resolution" value="1000" units="1/cm"/>
-          <inkml:channelProperty channel="F" name="resolution" value="0" units="1/dev"/>
-        </inkml:channelProperties>
-      </inkml:inkSource>
       <inkml:timestamp xml:id="ts0" timeString="2022-09-11T15:12:32.239"/>
     </inkml:context>
     <inkml:brush xml:id="br0">
@@ -4290,7 +4074,7 @@
 </inkml:ink>
 </file>
 
-<file path=ppt/ink/ink95.xml><?xml version="1.0" encoding="utf-8"?>
+<file path=ppt/ink/ink91.xml><?xml version="1.0" encoding="utf-8"?>
 <inkml:ink xmlns:inkml="http://www.w3.org/2003/InkML">
   <inkml:definitions>
     <inkml:context xml:id="ctx0">
@@ -4317,7 +4101,7 @@
 </inkml:ink>
 </file>
 
-<file path=ppt/ink/ink96.xml><?xml version="1.0" encoding="utf-8"?>
+<file path=ppt/ink/ink92.xml><?xml version="1.0" encoding="utf-8"?>
 <inkml:ink xmlns:inkml="http://www.w3.org/2003/InkML">
   <inkml:definitions>
     <inkml:context xml:id="ctx0">
@@ -4344,7 +4128,7 @@
 </inkml:ink>
 </file>
 
-<file path=ppt/ink/ink97.xml><?xml version="1.0" encoding="utf-8"?>
+<file path=ppt/ink/ink93.xml><?xml version="1.0" encoding="utf-8"?>
 <inkml:ink xmlns:inkml="http://www.w3.org/2003/InkML">
   <inkml:definitions>
     <inkml:context xml:id="ctx0">
@@ -4371,7 +4155,7 @@
 </inkml:ink>
 </file>
 
-<file path=ppt/ink/ink98.xml><?xml version="1.0" encoding="utf-8"?>
+<file path=ppt/ink/ink94.xml><?xml version="1.0" encoding="utf-8"?>
 <inkml:ink xmlns:inkml="http://www.w3.org/2003/InkML">
   <inkml:definitions>
     <inkml:context xml:id="ctx0">
@@ -4398,7 +4182,7 @@
 </inkml:ink>
 </file>
 
-<file path=ppt/ink/ink99.xml><?xml version="1.0" encoding="utf-8"?>
+<file path=ppt/ink/ink95.xml><?xml version="1.0" encoding="utf-8"?>
 <inkml:ink xmlns:inkml="http://www.w3.org/2003/InkML">
   <inkml:definitions>
     <inkml:context xml:id="ctx0">
@@ -4422,6 +4206,114 @@
     </inkml:brush>
   </inkml:definitions>
   <inkml:trace contextRef="#ctx0" brushRef="#br0">1 1110 24575,'0'-20'0,"12"-12"0,19-39 0,1 15 0,-7 11 0,-1 1 0,1 5 0,4-6 0,1-1 0,-6 5 0,11-10 0,-2 0 0,-15 15 0,18-17 0,-19 28 0,15-32 0,-9 28 0,9-32 0,-20 47 0,5-18 0,-10 18 0,10-27 0,-8 22 0,6-13 0,-8 21 0,3-2 0,-6 5 0,8-7 0,-8 4 0,6-2 0,-3-1 0,0 3 0,0 0 0,0 0 0,-3 5 0,-1-3 0,-3 2 0,2 1 0,-1 1 0,2 4 0,-3-2 0</inkml:trace>
+</inkml:ink>
+</file>
+
+<file path=ppt/ink/ink96.xml><?xml version="1.0" encoding="utf-8"?>
+<inkml:ink xmlns:inkml="http://www.w3.org/2003/InkML">
+  <inkml:definitions>
+    <inkml:context xml:id="ctx0">
+      <inkml:inkSource xml:id="inkSrc0">
+        <inkml:traceFormat>
+          <inkml:channel name="X" type="integer" min="-2.14748E9" max="2.14748E9" units="cm"/>
+          <inkml:channel name="Y" type="integer" min="-2.14748E9" max="2.14748E9" units="cm"/>
+          <inkml:channel name="F" type="integer" max="32767" units="dev"/>
+        </inkml:traceFormat>
+        <inkml:channelProperties>
+          <inkml:channelProperty channel="X" name="resolution" value="1000" units="1/cm"/>
+          <inkml:channelProperty channel="Y" name="resolution" value="1000" units="1/cm"/>
+          <inkml:channelProperty channel="F" name="resolution" value="0" units="1/dev"/>
+        </inkml:channelProperties>
+      </inkml:inkSource>
+      <inkml:timestamp xml:id="ts0" timeString="2022-09-11T15:12:44.180"/>
+    </inkml:context>
+    <inkml:brush xml:id="br0">
+      <inkml:brushProperty name="width" value="0.1" units="cm"/>
+      <inkml:brushProperty name="height" value="0.1" units="cm"/>
+    </inkml:brush>
+  </inkml:definitions>
+  <inkml:trace contextRef="#ctx0" brushRef="#br0">0 1223 24575,'0'-13'0,"0"-7"0,0-1 0,0-9 0,0 4 0,0-2 0,0 2 0,0 0 0,0 0 0,0 7 0,4-5 0,-3 3 0,26-40 0,-13 18 0,12-12 0,1-1 0,-4 4 0,16-36 0,-25 56 0,2-3 0,-5 15 0,1-9 0,-1 7 0,0-4 0,-3 7 0,3-9 0,-3 14 0,-1-13 0,-1 19 0,-2-11 0,3 0 0,0-4 0,0 2 0,7 1 0,-9 7 0,7-6 0,-8 12 0,2-2 0,1-1 0,6-14 0,-8 6 0,8-8 0,-12 15 0,4 5 0,-1 3 0,-1 0 0,0-1 0,0 1 0,-3-3 0,3 2 0,0-3 0,-2 1 0,2-1 0,0 1 0,-2-1 0,2 0 0,0 4 0,-3-3 0,3 2 0,-3 1 0,0 0 0</inkml:trace>
+</inkml:ink>
+</file>
+
+<file path=ppt/ink/ink97.xml><?xml version="1.0" encoding="utf-8"?>
+<inkml:ink xmlns:inkml="http://www.w3.org/2003/InkML">
+  <inkml:definitions>
+    <inkml:context xml:id="ctx0">
+      <inkml:inkSource xml:id="inkSrc0">
+        <inkml:traceFormat>
+          <inkml:channel name="X" type="integer" min="-2.14748E9" max="2.14748E9" units="cm"/>
+          <inkml:channel name="Y" type="integer" min="-2.14748E9" max="2.14748E9" units="cm"/>
+          <inkml:channel name="F" type="integer" max="32767" units="dev"/>
+        </inkml:traceFormat>
+        <inkml:channelProperties>
+          <inkml:channelProperty channel="X" name="resolution" value="1000" units="1/cm"/>
+          <inkml:channelProperty channel="Y" name="resolution" value="1000" units="1/cm"/>
+          <inkml:channelProperty channel="F" name="resolution" value="0" units="1/dev"/>
+        </inkml:channelProperties>
+      </inkml:inkSource>
+      <inkml:timestamp xml:id="ts0" timeString="2022-09-11T15:12:55.167"/>
+    </inkml:context>
+    <inkml:brush xml:id="br0">
+      <inkml:brushProperty name="width" value="0.1" units="cm"/>
+      <inkml:brushProperty name="height" value="0.1" units="cm"/>
+    </inkml:brush>
+  </inkml:definitions>
+  <inkml:trace contextRef="#ctx0" brushRef="#br0">0 1 24575,'7'13'0,"0"1"0,4 1 0,-3-1 0,6 1 0,-6 0 0,10 14 0,-6-10 0,4 14 0,-5-13 0,4 16 0,-5-13 0,22 49 0,-16-43 0,25 55 0,-22-55 0,15 44 0,-16-42 0,2 19 0,-8-26 0,-4 0 0,3-4 0,-3-1 0,6-4 0,4 13 0,-2-4 0,2 2 0,-7-6 0,-1-2 0,-2-2 0,3 5 0,-4-10 0,0 10 0,0-12 0,3 18 0,-5-18 0,8 17 0,-9-16 0,7 10 0,-8-13 0,4 13 0,-3-11 0,0 7 0,1-6 0,-1-3 0,2 2 0,1 8 0,0-8 0,-3 11 0,2-13 0,-5 6 0,2-6 0,-3 2 0,0-3 0,0 0 0,0 0 0,0 1 0,0-1 0,0 0 0,0 0 0,0 0 0,0 0 0,0 0 0,0 0 0,0 1 0,0-1 0,0-3 0,0 0 0</inkml:trace>
+</inkml:ink>
+</file>
+
+<file path=ppt/ink/ink98.xml><?xml version="1.0" encoding="utf-8"?>
+<inkml:ink xmlns:inkml="http://www.w3.org/2003/InkML">
+  <inkml:definitions>
+    <inkml:context xml:id="ctx0">
+      <inkml:inkSource xml:id="inkSrc0">
+        <inkml:traceFormat>
+          <inkml:channel name="X" type="integer" min="-2.14748E9" max="2.14748E9" units="cm"/>
+          <inkml:channel name="Y" type="integer" min="-2.14748E9" max="2.14748E9" units="cm"/>
+          <inkml:channel name="F" type="integer" max="32767" units="dev"/>
+        </inkml:traceFormat>
+        <inkml:channelProperties>
+          <inkml:channelProperty channel="X" name="resolution" value="1000" units="1/cm"/>
+          <inkml:channelProperty channel="Y" name="resolution" value="1000" units="1/cm"/>
+          <inkml:channelProperty channel="F" name="resolution" value="0" units="1/dev"/>
+        </inkml:channelProperties>
+      </inkml:inkSource>
+      <inkml:timestamp xml:id="ts0" timeString="2022-09-11T15:12:57.092"/>
+    </inkml:context>
+    <inkml:brush xml:id="br0">
+      <inkml:brushProperty name="width" value="0.1" units="cm"/>
+      <inkml:brushProperty name="height" value="0.1" units="cm"/>
+    </inkml:brush>
+  </inkml:definitions>
+  <inkml:trace contextRef="#ctx0" brushRef="#br0">1 0 24575,'13'0'0,"8"17"0,-1-5 0,4 17 0,-1-12 0,-6 7 0,11-7 0,18 31 0,-5-19 0,10 20 0,-19-16 0,5 1 0,-1 6 0,-2-10 0,-11 0 0,-3-8 0,-6-1 0,18 7 0,-15-7 0,26 15 0,-27-17 0,28 18 0,-33-27 0,26 20 0,-27-21 0,15 8 0,-19-10 0,5-4 0,-10 3 0,4-5 0,-1 5 0,9 0 0,-5-1 0,10 7 0,-10-8 0,4 2 0,-6-3 0,-2 0 0,1-2 0,-4 4 0,5-4 0,-5 5 0,4-6 0,-1 6 0,2-5 0,1 2 0,-4 0 0,3-3 0,-2 6 0,2-5 0,-2 5 0,2-5 0,-3 2 0,4-1 0,-1-1 0,1 5 0,-1-5 0,1 4 0,-3-4 0,-1 2 0</inkml:trace>
+</inkml:ink>
+</file>
+
+<file path=ppt/ink/ink99.xml><?xml version="1.0" encoding="utf-8"?>
+<inkml:ink xmlns:inkml="http://www.w3.org/2003/InkML">
+  <inkml:definitions>
+    <inkml:context xml:id="ctx0">
+      <inkml:inkSource xml:id="inkSrc0">
+        <inkml:traceFormat>
+          <inkml:channel name="X" type="integer" min="-2.14748E9" max="2.14748E9" units="cm"/>
+          <inkml:channel name="Y" type="integer" min="-2.14748E9" max="2.14748E9" units="cm"/>
+          <inkml:channel name="F" type="integer" max="32767" units="dev"/>
+        </inkml:traceFormat>
+        <inkml:channelProperties>
+          <inkml:channelProperty channel="X" name="resolution" value="1000" units="1/cm"/>
+          <inkml:channelProperty channel="Y" name="resolution" value="1000" units="1/cm"/>
+          <inkml:channelProperty channel="F" name="resolution" value="0" units="1/dev"/>
+        </inkml:channelProperties>
+      </inkml:inkSource>
+      <inkml:timestamp xml:id="ts0" timeString="2022-09-11T15:12:59.102"/>
+    </inkml:context>
+    <inkml:brush xml:id="br0">
+      <inkml:brushProperty name="width" value="0.1" units="cm"/>
+      <inkml:brushProperty name="height" value="0.1" units="cm"/>
+    </inkml:brush>
+  </inkml:definitions>
+  <inkml:trace contextRef="#ctx0" brushRef="#br0">0 0 24575,'15'4'0,"5"4"0,3 11 0,3-2 0,5 11 0,0-6 0,3 11 0,-7-9 0,5 7 0,-16-12 0,3 2 0,0-3 0,15 12 0,-7-7 0,6 7 0,-10-10 0,-8-9 0,4 4 0,-8-8 0,3 4 0,4 3 0,-2-6 0,16 10 0,-15-10 0,22 13 0,-25-12 0,13 8 0,-20-10 0,9 3 0,-8-6 0,5 5 0,-7-5 0,4 2 0,-3 1 0,6 3 0,-2-3 0,2 6 0,2-8 0,4 10 0,-2-10 0,3 8 0,-9-6 0,12 7 0,-9-6 0,6 6 0,-6-7 0,3 3 0,-1-2 0,7 2 0,-11-6 0,3 2 0,-7-6 0,4 6 0,-5-5 0,3 5 0,-1-3 0,-2 4 0,2-1 0,-2 0 0,-1 1 0,-2-4 0,-2 0 0</inkml:trace>
 </inkml:ink>
 </file>
 
@@ -4572,7 +4464,7 @@
           <a:p>
             <a:fld id="{8A705F57-814E-9D46-B35B-F85622D18201}" type="datetimeFigureOut">
               <a:rPr lang="en-US" smtClean="0"/>
-              <a:t>12/19/23</a:t>
+              <a:t>12/20/23</a:t>
             </a:fld>
             <a:endParaRPr lang="en-US"/>
           </a:p>
@@ -4770,7 +4662,7 @@
           <a:p>
             <a:fld id="{8A705F57-814E-9D46-B35B-F85622D18201}" type="datetimeFigureOut">
               <a:rPr lang="en-US" smtClean="0"/>
-              <a:t>12/19/23</a:t>
+              <a:t>12/20/23</a:t>
             </a:fld>
             <a:endParaRPr lang="en-US"/>
           </a:p>
@@ -4978,7 +4870,7 @@
           <a:p>
             <a:fld id="{8A705F57-814E-9D46-B35B-F85622D18201}" type="datetimeFigureOut">
               <a:rPr lang="en-US" smtClean="0"/>
-              <a:t>12/19/23</a:t>
+              <a:t>12/20/23</a:t>
             </a:fld>
             <a:endParaRPr lang="en-US"/>
           </a:p>
@@ -5176,7 +5068,7 @@
           <a:p>
             <a:fld id="{8A705F57-814E-9D46-B35B-F85622D18201}" type="datetimeFigureOut">
               <a:rPr lang="en-US" smtClean="0"/>
-              <a:t>12/19/23</a:t>
+              <a:t>12/20/23</a:t>
             </a:fld>
             <a:endParaRPr lang="en-US"/>
           </a:p>
@@ -5451,7 +5343,7 @@
           <a:p>
             <a:fld id="{8A705F57-814E-9D46-B35B-F85622D18201}" type="datetimeFigureOut">
               <a:rPr lang="en-US" smtClean="0"/>
-              <a:t>12/19/23</a:t>
+              <a:t>12/20/23</a:t>
             </a:fld>
             <a:endParaRPr lang="en-US"/>
           </a:p>
@@ -5716,7 +5608,7 @@
           <a:p>
             <a:fld id="{8A705F57-814E-9D46-B35B-F85622D18201}" type="datetimeFigureOut">
               <a:rPr lang="en-US" smtClean="0"/>
-              <a:t>12/19/23</a:t>
+              <a:t>12/20/23</a:t>
             </a:fld>
             <a:endParaRPr lang="en-US"/>
           </a:p>
@@ -6128,7 +6020,7 @@
           <a:p>
             <a:fld id="{8A705F57-814E-9D46-B35B-F85622D18201}" type="datetimeFigureOut">
               <a:rPr lang="en-US" smtClean="0"/>
-              <a:t>12/19/23</a:t>
+              <a:t>12/20/23</a:t>
             </a:fld>
             <a:endParaRPr lang="en-US"/>
           </a:p>
@@ -6269,7 +6161,7 @@
           <a:p>
             <a:fld id="{8A705F57-814E-9D46-B35B-F85622D18201}" type="datetimeFigureOut">
               <a:rPr lang="en-US" smtClean="0"/>
-              <a:t>12/19/23</a:t>
+              <a:t>12/20/23</a:t>
             </a:fld>
             <a:endParaRPr lang="en-US"/>
           </a:p>
@@ -6382,7 +6274,7 @@
           <a:p>
             <a:fld id="{8A705F57-814E-9D46-B35B-F85622D18201}" type="datetimeFigureOut">
               <a:rPr lang="en-US" smtClean="0"/>
-              <a:t>12/19/23</a:t>
+              <a:t>12/20/23</a:t>
             </a:fld>
             <a:endParaRPr lang="en-US"/>
           </a:p>
@@ -6693,7 +6585,7 @@
           <a:p>
             <a:fld id="{8A705F57-814E-9D46-B35B-F85622D18201}" type="datetimeFigureOut">
               <a:rPr lang="en-US" smtClean="0"/>
-              <a:t>12/19/23</a:t>
+              <a:t>12/20/23</a:t>
             </a:fld>
             <a:endParaRPr lang="en-US"/>
           </a:p>
@@ -6981,7 +6873,7 @@
           <a:p>
             <a:fld id="{8A705F57-814E-9D46-B35B-F85622D18201}" type="datetimeFigureOut">
               <a:rPr lang="en-US" smtClean="0"/>
-              <a:t>12/19/23</a:t>
+              <a:t>12/20/23</a:t>
             </a:fld>
             <a:endParaRPr lang="en-US"/>
           </a:p>
@@ -7222,7 +7114,7 @@
           <a:p>
             <a:fld id="{8A705F57-814E-9D46-B35B-F85622D18201}" type="datetimeFigureOut">
               <a:rPr lang="en-US" smtClean="0"/>
-              <a:t>12/19/23</a:t>
+              <a:t>12/20/23</a:t>
             </a:fld>
             <a:endParaRPr lang="en-US"/>
           </a:p>
@@ -13072,60 +12964,9 @@
           </a:p>
         </p:txBody>
       </p:sp>
-      <mc:AlternateContent xmlns:mc="http://schemas.openxmlformats.org/markup-compatibility/2006">
-        <mc:Choice xmlns:p14="http://schemas.microsoft.com/office/powerpoint/2010/main" Requires="p14">
+      <mc:AlternateContent xmlns:mc="http://schemas.openxmlformats.org/markup-compatibility/2006" xmlns:p14="http://schemas.microsoft.com/office/powerpoint/2010/main">
+        <mc:Choice Requires="p14">
           <p:contentPart p14:bwMode="auto" r:id="rId2">
-            <p14:nvContentPartPr>
-              <p14:cNvPr id="12" name="Ink 11">
-                <a:extLst>
-                  <a:ext uri="{FF2B5EF4-FFF2-40B4-BE49-F238E27FC236}">
-                    <a16:creationId xmlns:a16="http://schemas.microsoft.com/office/drawing/2014/main" id="{15287B7F-C07A-18D5-FF9B-6C1932B31B4D}"/>
-                  </a:ext>
-                </a:extLst>
-              </p14:cNvPr>
-              <p14:cNvContentPartPr/>
-              <p14:nvPr/>
-            </p14:nvContentPartPr>
-            <p14:xfrm>
-              <a:off x="3962992" y="1228633"/>
-              <a:ext cx="1261440" cy="432595"/>
-            </p14:xfrm>
-          </p:contentPart>
-        </mc:Choice>
-        <mc:Fallback>
-          <p:pic>
-            <p:nvPicPr>
-              <p:cNvPr id="12" name="Ink 11">
-                <a:extLst>
-                  <a:ext uri="{FF2B5EF4-FFF2-40B4-BE49-F238E27FC236}">
-                    <a16:creationId xmlns:a16="http://schemas.microsoft.com/office/drawing/2014/main" id="{15287B7F-C07A-18D5-FF9B-6C1932B31B4D}"/>
-                  </a:ext>
-                </a:extLst>
-              </p:cNvPr>
-              <p:cNvPicPr/>
-              <p:nvPr/>
-            </p:nvPicPr>
-            <p:blipFill>
-              <a:blip r:embed="rId3"/>
-              <a:stretch>
-                <a:fillRect/>
-              </a:stretch>
-            </p:blipFill>
-            <p:spPr>
-              <a:xfrm>
-                <a:off x="3953992" y="1219995"/>
-                <a:ext cx="1279080" cy="450230"/>
-              </a:xfrm>
-              <a:prstGeom prst="rect">
-                <a:avLst/>
-              </a:prstGeom>
-            </p:spPr>
-          </p:pic>
-        </mc:Fallback>
-      </mc:AlternateContent>
-      <mc:AlternateContent xmlns:mc="http://schemas.openxmlformats.org/markup-compatibility/2006">
-        <mc:Choice xmlns:p14="http://schemas.microsoft.com/office/powerpoint/2010/main" Requires="p14">
-          <p:contentPart p14:bwMode="auto" r:id="rId4">
             <p14:nvContentPartPr>
               <p14:cNvPr id="19" name="Ink 18">
                 <a:extLst>
@@ -13143,7 +12984,7 @@
             </p14:xfrm>
           </p:contentPart>
         </mc:Choice>
-        <mc:Fallback>
+        <mc:Fallback xmlns="">
           <p:pic>
             <p:nvPicPr>
               <p:cNvPr id="19" name="Ink 18">
@@ -13213,162 +13054,9 @@
           </a:p>
         </p:txBody>
       </p:sp>
-      <mc:AlternateContent xmlns:mc="http://schemas.openxmlformats.org/markup-compatibility/2006">
-        <mc:Choice xmlns:p14="http://schemas.microsoft.com/office/powerpoint/2010/main" Requires="p14">
+      <mc:AlternateContent xmlns:mc="http://schemas.openxmlformats.org/markup-compatibility/2006" xmlns:p14="http://schemas.microsoft.com/office/powerpoint/2010/main">
+        <mc:Choice Requires="p14">
           <p:contentPart p14:bwMode="auto" r:id="rId6">
-            <p14:nvContentPartPr>
-              <p14:cNvPr id="24" name="Ink 23">
-                <a:extLst>
-                  <a:ext uri="{FF2B5EF4-FFF2-40B4-BE49-F238E27FC236}">
-                    <a16:creationId xmlns:a16="http://schemas.microsoft.com/office/drawing/2014/main" id="{C7B6535E-94B0-FCA3-6387-095492481D75}"/>
-                  </a:ext>
-                </a:extLst>
-              </p14:cNvPr>
-              <p14:cNvContentPartPr/>
-              <p14:nvPr/>
-            </p14:nvContentPartPr>
-            <p14:xfrm>
-              <a:off x="3679050" y="3658468"/>
-              <a:ext cx="1843920" cy="458640"/>
-            </p14:xfrm>
-          </p:contentPart>
-        </mc:Choice>
-        <mc:Fallback>
-          <p:pic>
-            <p:nvPicPr>
-              <p:cNvPr id="24" name="Ink 23">
-                <a:extLst>
-                  <a:ext uri="{FF2B5EF4-FFF2-40B4-BE49-F238E27FC236}">
-                    <a16:creationId xmlns:a16="http://schemas.microsoft.com/office/drawing/2014/main" id="{C7B6535E-94B0-FCA3-6387-095492481D75}"/>
-                  </a:ext>
-                </a:extLst>
-              </p:cNvPr>
-              <p:cNvPicPr/>
-              <p:nvPr/>
-            </p:nvPicPr>
-            <p:blipFill>
-              <a:blip r:embed="rId7"/>
-              <a:stretch>
-                <a:fillRect/>
-              </a:stretch>
-            </p:blipFill>
-            <p:spPr>
-              <a:xfrm>
-                <a:off x="3670050" y="3649468"/>
-                <a:ext cx="1861560" cy="476280"/>
-              </a:xfrm>
-              <a:prstGeom prst="rect">
-                <a:avLst/>
-              </a:prstGeom>
-            </p:spPr>
-          </p:pic>
-        </mc:Fallback>
-      </mc:AlternateContent>
-      <mc:AlternateContent xmlns:mc="http://schemas.openxmlformats.org/markup-compatibility/2006">
-        <mc:Choice xmlns:p14="http://schemas.microsoft.com/office/powerpoint/2010/main" Requires="p14">
-          <p:contentPart p14:bwMode="auto" r:id="rId8">
-            <p14:nvContentPartPr>
-              <p14:cNvPr id="35" name="Ink 34">
-                <a:extLst>
-                  <a:ext uri="{FF2B5EF4-FFF2-40B4-BE49-F238E27FC236}">
-                    <a16:creationId xmlns:a16="http://schemas.microsoft.com/office/drawing/2014/main" id="{D561C3E3-1C6E-39A4-714B-DDBA6AD89195}"/>
-                  </a:ext>
-                </a:extLst>
-              </p14:cNvPr>
-              <p14:cNvContentPartPr/>
-              <p14:nvPr/>
-            </p14:nvContentPartPr>
-            <p14:xfrm>
-              <a:off x="3447954" y="2859570"/>
-              <a:ext cx="2398572" cy="433080"/>
-            </p14:xfrm>
-          </p:contentPart>
-        </mc:Choice>
-        <mc:Fallback>
-          <p:pic>
-            <p:nvPicPr>
-              <p:cNvPr id="35" name="Ink 34">
-                <a:extLst>
-                  <a:ext uri="{FF2B5EF4-FFF2-40B4-BE49-F238E27FC236}">
-                    <a16:creationId xmlns:a16="http://schemas.microsoft.com/office/drawing/2014/main" id="{D561C3E3-1C6E-39A4-714B-DDBA6AD89195}"/>
-                  </a:ext>
-                </a:extLst>
-              </p:cNvPr>
-              <p:cNvPicPr/>
-              <p:nvPr/>
-            </p:nvPicPr>
-            <p:blipFill>
-              <a:blip r:embed="rId9"/>
-              <a:stretch>
-                <a:fillRect/>
-              </a:stretch>
-            </p:blipFill>
-            <p:spPr>
-              <a:xfrm>
-                <a:off x="3439314" y="2850930"/>
-                <a:ext cx="2416211" cy="450720"/>
-              </a:xfrm>
-              <a:prstGeom prst="rect">
-                <a:avLst/>
-              </a:prstGeom>
-            </p:spPr>
-          </p:pic>
-        </mc:Fallback>
-      </mc:AlternateContent>
-      <mc:AlternateContent xmlns:mc="http://schemas.openxmlformats.org/markup-compatibility/2006">
-        <mc:Choice xmlns:p14="http://schemas.microsoft.com/office/powerpoint/2010/main" Requires="p14">
-          <p:contentPart p14:bwMode="auto" r:id="rId10">
-            <p14:nvContentPartPr>
-              <p14:cNvPr id="37" name="Ink 36">
-                <a:extLst>
-                  <a:ext uri="{FF2B5EF4-FFF2-40B4-BE49-F238E27FC236}">
-                    <a16:creationId xmlns:a16="http://schemas.microsoft.com/office/drawing/2014/main" id="{B901FC40-DFCE-52EE-A5E5-0242BB5FCC69}"/>
-                  </a:ext>
-                </a:extLst>
-              </p14:cNvPr>
-              <p14:cNvContentPartPr/>
-              <p14:nvPr/>
-            </p14:nvContentPartPr>
-            <p14:xfrm>
-              <a:off x="4175355" y="2087010"/>
-              <a:ext cx="840960" cy="323280"/>
-            </p14:xfrm>
-          </p:contentPart>
-        </mc:Choice>
-        <mc:Fallback>
-          <p:pic>
-            <p:nvPicPr>
-              <p:cNvPr id="37" name="Ink 36">
-                <a:extLst>
-                  <a:ext uri="{FF2B5EF4-FFF2-40B4-BE49-F238E27FC236}">
-                    <a16:creationId xmlns:a16="http://schemas.microsoft.com/office/drawing/2014/main" id="{B901FC40-DFCE-52EE-A5E5-0242BB5FCC69}"/>
-                  </a:ext>
-                </a:extLst>
-              </p:cNvPr>
-              <p:cNvPicPr/>
-              <p:nvPr/>
-            </p:nvPicPr>
-            <p:blipFill>
-              <a:blip r:embed="rId11"/>
-              <a:stretch>
-                <a:fillRect/>
-              </a:stretch>
-            </p:blipFill>
-            <p:spPr>
-              <a:xfrm>
-                <a:off x="4166355" y="2078370"/>
-                <a:ext cx="858600" cy="340920"/>
-              </a:xfrm>
-              <a:prstGeom prst="rect">
-                <a:avLst/>
-              </a:prstGeom>
-            </p:spPr>
-          </p:pic>
-        </mc:Fallback>
-      </mc:AlternateContent>
-      <mc:AlternateContent xmlns:mc="http://schemas.openxmlformats.org/markup-compatibility/2006">
-        <mc:Choice xmlns:p14="http://schemas.microsoft.com/office/powerpoint/2010/main" Requires="p14">
-          <p:contentPart p14:bwMode="auto" r:id="rId12">
             <p14:nvContentPartPr>
               <p14:cNvPr id="38" name="Ink 37">
                 <a:extLst>
@@ -13386,7 +13074,7 @@
             </p14:xfrm>
           </p:contentPart>
         </mc:Choice>
-        <mc:Fallback>
+        <mc:Fallback xmlns="">
           <p:pic>
             <p:nvPicPr>
               <p:cNvPr id="38" name="Ink 37">
@@ -13417,8 +13105,8 @@
           </p:pic>
         </mc:Fallback>
       </mc:AlternateContent>
-      <mc:AlternateContent xmlns:mc="http://schemas.openxmlformats.org/markup-compatibility/2006">
-        <mc:Choice xmlns:p14="http://schemas.microsoft.com/office/powerpoint/2010/main" Requires="p14">
+      <mc:AlternateContent xmlns:mc="http://schemas.openxmlformats.org/markup-compatibility/2006" xmlns:p14="http://schemas.microsoft.com/office/powerpoint/2010/main">
+        <mc:Choice Requires="p14">
           <p:contentPart p14:bwMode="auto" r:id="rId14">
             <p14:nvContentPartPr>
               <p14:cNvPr id="39" name="Ink 38">
@@ -13437,7 +13125,7 @@
             </p14:xfrm>
           </p:contentPart>
         </mc:Choice>
-        <mc:Fallback>
+        <mc:Fallback xmlns="">
           <p:pic>
             <p:nvPicPr>
               <p:cNvPr id="39" name="Ink 38">

</xml_diff>